<commit_message>
curse of dim: sparse data
</commit_message>
<xml_diff>
--- a/slides_x_mas_2023.pptx
+++ b/slides_x_mas_2023.pptx
@@ -6,6 +6,7 @@
   </p:sldMasterIdLst>
   <p:sldIdLst>
     <p:sldId id="257" r:id="rId2"/>
+    <p:sldId id="258" r:id="rId3"/>
   </p:sldIdLst>
   <p:sldSz cx="12192000" cy="6858000"/>
   <p:notesSz cx="6858000" cy="9144000"/>
@@ -113,7 +114,9 @@
           </p14:sldIdLst>
         </p14:section>
         <p14:section name="Classics" id="{0ABD531E-7037-41B9-B2F6-9C12BB1FC624}">
-          <p14:sldIdLst/>
+          <p14:sldIdLst>
+            <p14:sldId id="258"/>
+          </p14:sldIdLst>
         </p14:section>
         <p14:section name="Unusual" id="{42EB159F-85B8-41F3-970F-2D80DA23F3BA}">
           <p14:sldIdLst/>
@@ -3515,6 +3518,175 @@
 </p:sld>
 </file>
 
+<file path=ppt/slides/slide2.xml><?xml version="1.0" encoding="utf-8"?>
+<p:sld xmlns:a="http://schemas.openxmlformats.org/drawingml/2006/main" xmlns:r="http://schemas.openxmlformats.org/officeDocument/2006/relationships" xmlns:p="http://schemas.openxmlformats.org/presentationml/2006/main">
+  <p:cSld>
+    <p:spTree>
+      <p:nvGrpSpPr>
+        <p:cNvPr id="1" name=""/>
+        <p:cNvGrpSpPr/>
+        <p:nvPr/>
+      </p:nvGrpSpPr>
+      <p:grpSpPr>
+        <a:xfrm>
+          <a:off x="0" y="0"/>
+          <a:ext cx="0" cy="0"/>
+          <a:chOff x="0" y="0"/>
+          <a:chExt cx="0" cy="0"/>
+        </a:xfrm>
+      </p:grpSpPr>
+      <p:sp>
+        <p:nvSpPr>
+          <p:cNvPr id="2" name="Title 1">
+            <a:extLst>
+              <a:ext uri="{FF2B5EF4-FFF2-40B4-BE49-F238E27FC236}">
+                <a16:creationId xmlns:a16="http://schemas.microsoft.com/office/drawing/2014/main" id="{2DBCC9A2-D9E4-867F-A8AD-CF8A895A41F0}"/>
+              </a:ext>
+            </a:extLst>
+          </p:cNvPr>
+          <p:cNvSpPr>
+            <a:spLocks noGrp="1"/>
+          </p:cNvSpPr>
+          <p:nvPr>
+            <p:ph type="title"/>
+          </p:nvPr>
+        </p:nvSpPr>
+        <p:spPr/>
+        <p:txBody>
+          <a:bodyPr/>
+          <a:lstStyle/>
+          <a:p>
+            <a:r>
+              <a:rPr lang="en-US" dirty="0"/>
+              <a:t>Curse of dimensionality</a:t>
+            </a:r>
+          </a:p>
+        </p:txBody>
+      </p:sp>
+      <p:grpSp>
+        <p:nvGrpSpPr>
+          <p:cNvPr id="15" name="Group 14">
+            <a:extLst>
+              <a:ext uri="{FF2B5EF4-FFF2-40B4-BE49-F238E27FC236}">
+                <a16:creationId xmlns:a16="http://schemas.microsoft.com/office/drawing/2014/main" id="{6F45F9D5-7FBE-0698-E932-F30949803EF4}"/>
+              </a:ext>
+            </a:extLst>
+          </p:cNvPr>
+          <p:cNvGrpSpPr/>
+          <p:nvPr/>
+        </p:nvGrpSpPr>
+        <p:grpSpPr>
+          <a:xfrm>
+            <a:off x="91440" y="1690688"/>
+            <a:ext cx="12009119" cy="4038600"/>
+            <a:chOff x="91441" y="1673126"/>
+            <a:chExt cx="12009119" cy="4038600"/>
+          </a:xfrm>
+        </p:grpSpPr>
+        <p:pic>
+          <p:nvPicPr>
+            <p:cNvPr id="9" name="Picture 8">
+              <a:extLst>
+                <a:ext uri="{FF2B5EF4-FFF2-40B4-BE49-F238E27FC236}">
+                  <a16:creationId xmlns:a16="http://schemas.microsoft.com/office/drawing/2014/main" id="{D7E0FFB0-0C9D-FDC7-1C0A-C47C6DE37009}"/>
+                </a:ext>
+              </a:extLst>
+            </p:cNvPr>
+            <p:cNvPicPr>
+              <a:picLocks noChangeAspect="1"/>
+            </p:cNvPicPr>
+            <p:nvPr/>
+          </p:nvPicPr>
+          <p:blipFill>
+            <a:blip r:embed="rId2"/>
+            <a:stretch>
+              <a:fillRect/>
+            </a:stretch>
+          </p:blipFill>
+          <p:spPr>
+            <a:xfrm>
+              <a:off x="8195310" y="1673126"/>
+              <a:ext cx="3905250" cy="4038600"/>
+            </a:xfrm>
+            <a:prstGeom prst="rect">
+              <a:avLst/>
+            </a:prstGeom>
+          </p:spPr>
+        </p:pic>
+        <p:pic>
+          <p:nvPicPr>
+            <p:cNvPr id="11" name="Picture 10">
+              <a:extLst>
+                <a:ext uri="{FF2B5EF4-FFF2-40B4-BE49-F238E27FC236}">
+                  <a16:creationId xmlns:a16="http://schemas.microsoft.com/office/drawing/2014/main" id="{9B74F283-FE08-257B-9B09-00584EFACC46}"/>
+                </a:ext>
+              </a:extLst>
+            </p:cNvPr>
+            <p:cNvPicPr>
+              <a:picLocks noChangeAspect="1"/>
+            </p:cNvPicPr>
+            <p:nvPr/>
+          </p:nvPicPr>
+          <p:blipFill>
+            <a:blip r:embed="rId3"/>
+            <a:stretch>
+              <a:fillRect/>
+            </a:stretch>
+          </p:blipFill>
+          <p:spPr>
+            <a:xfrm>
+              <a:off x="4143376" y="1673126"/>
+              <a:ext cx="3905250" cy="4038600"/>
+            </a:xfrm>
+            <a:prstGeom prst="rect">
+              <a:avLst/>
+            </a:prstGeom>
+          </p:spPr>
+        </p:pic>
+        <p:pic>
+          <p:nvPicPr>
+            <p:cNvPr id="13" name="Picture 12">
+              <a:extLst>
+                <a:ext uri="{FF2B5EF4-FFF2-40B4-BE49-F238E27FC236}">
+                  <a16:creationId xmlns:a16="http://schemas.microsoft.com/office/drawing/2014/main" id="{BCFC0D4E-BB56-639A-A579-EF1AF2A2D2CF}"/>
+                </a:ext>
+              </a:extLst>
+            </p:cNvPr>
+            <p:cNvPicPr>
+              <a:picLocks noChangeAspect="1"/>
+            </p:cNvPicPr>
+            <p:nvPr/>
+          </p:nvPicPr>
+          <p:blipFill>
+            <a:blip r:embed="rId4"/>
+            <a:stretch>
+              <a:fillRect/>
+            </a:stretch>
+          </p:blipFill>
+          <p:spPr>
+            <a:xfrm>
+              <a:off x="91441" y="1673126"/>
+              <a:ext cx="3905250" cy="4038600"/>
+            </a:xfrm>
+            <a:prstGeom prst="rect">
+              <a:avLst/>
+            </a:prstGeom>
+          </p:spPr>
+        </p:pic>
+      </p:grpSp>
+    </p:spTree>
+    <p:extLst>
+      <p:ext uri="{BB962C8B-B14F-4D97-AF65-F5344CB8AC3E}">
+        <p14:creationId xmlns:p14="http://schemas.microsoft.com/office/powerpoint/2010/main" val="3037618925"/>
+      </p:ext>
+    </p:extLst>
+  </p:cSld>
+  <p:clrMapOvr>
+    <a:masterClrMapping/>
+  </p:clrMapOvr>
+</p:sld>
+</file>
+
 <file path=ppt/theme/theme1.xml><?xml version="1.0" encoding="utf-8"?>
 <a:theme xmlns:a="http://schemas.openxmlformats.org/drawingml/2006/main" name="Office Theme">
   <a:themeElements>

</xml_diff>

<commit_message>
curse of dim: n-dim cube nb of pts
</commit_message>
<xml_diff>
--- a/slides_x_mas_2023.pptx
+++ b/slides_x_mas_2023.pptx
@@ -7,6 +7,7 @@
   <p:sldIdLst>
     <p:sldId id="257" r:id="rId2"/>
     <p:sldId id="258" r:id="rId3"/>
+    <p:sldId id="259" r:id="rId4"/>
   </p:sldIdLst>
   <p:sldSz cx="12192000" cy="6858000"/>
   <p:notesSz cx="6858000" cy="9144000"/>
@@ -116,6 +117,7 @@
         <p14:section name="Classics" id="{0ABD531E-7037-41B9-B2F6-9C12BB1FC624}">
           <p14:sldIdLst>
             <p14:sldId id="258"/>
+            <p14:sldId id="259"/>
           </p14:sldIdLst>
         </p14:section>
         <p14:section name="Unusual" id="{42EB159F-85B8-41F3-970F-2D80DA23F3BA}">
@@ -3687,6 +3689,93 @@
 </p:sld>
 </file>
 
+<file path=ppt/slides/slide3.xml><?xml version="1.0" encoding="utf-8"?>
+<p:sld xmlns:a="http://schemas.openxmlformats.org/drawingml/2006/main" xmlns:r="http://schemas.openxmlformats.org/officeDocument/2006/relationships" xmlns:p="http://schemas.openxmlformats.org/presentationml/2006/main">
+  <p:cSld>
+    <p:spTree>
+      <p:nvGrpSpPr>
+        <p:cNvPr id="1" name=""/>
+        <p:cNvGrpSpPr/>
+        <p:nvPr/>
+      </p:nvGrpSpPr>
+      <p:grpSpPr>
+        <a:xfrm>
+          <a:off x="0" y="0"/>
+          <a:ext cx="0" cy="0"/>
+          <a:chOff x="0" y="0"/>
+          <a:chExt cx="0" cy="0"/>
+        </a:xfrm>
+      </p:grpSpPr>
+      <p:sp>
+        <p:nvSpPr>
+          <p:cNvPr id="2" name="Title 1">
+            <a:extLst>
+              <a:ext uri="{FF2B5EF4-FFF2-40B4-BE49-F238E27FC236}">
+                <a16:creationId xmlns:a16="http://schemas.microsoft.com/office/drawing/2014/main" id="{CC4E5699-F629-549D-6652-8D97A182EC5D}"/>
+              </a:ext>
+            </a:extLst>
+          </p:cNvPr>
+          <p:cNvSpPr>
+            <a:spLocks noGrp="1"/>
+          </p:cNvSpPr>
+          <p:nvPr>
+            <p:ph type="title"/>
+          </p:nvPr>
+        </p:nvSpPr>
+        <p:spPr/>
+        <p:txBody>
+          <a:bodyPr/>
+          <a:lstStyle/>
+          <a:p>
+            <a:r>
+              <a:rPr lang="en-US" dirty="0"/>
+              <a:t>Curse of dimensionality</a:t>
+            </a:r>
+          </a:p>
+        </p:txBody>
+      </p:sp>
+      <p:pic>
+        <p:nvPicPr>
+          <p:cNvPr id="9" name="Content Placeholder 8">
+            <a:extLst>
+              <a:ext uri="{FF2B5EF4-FFF2-40B4-BE49-F238E27FC236}">
+                <a16:creationId xmlns:a16="http://schemas.microsoft.com/office/drawing/2014/main" id="{5A9EDBF9-D77D-D77B-137E-F61D5A6A3146}"/>
+              </a:ext>
+            </a:extLst>
+          </p:cNvPr>
+          <p:cNvPicPr>
+            <a:picLocks noGrp="1" noChangeAspect="1"/>
+          </p:cNvPicPr>
+          <p:nvPr>
+            <p:ph idx="1"/>
+          </p:nvPr>
+        </p:nvPicPr>
+        <p:blipFill>
+          <a:blip r:embed="rId2"/>
+          <a:stretch>
+            <a:fillRect/>
+          </a:stretch>
+        </p:blipFill>
+        <p:spPr>
+          <a:xfrm>
+            <a:off x="3163502" y="1690688"/>
+            <a:ext cx="5864996" cy="4621212"/>
+          </a:xfrm>
+        </p:spPr>
+      </p:pic>
+    </p:spTree>
+    <p:extLst>
+      <p:ext uri="{BB962C8B-B14F-4D97-AF65-F5344CB8AC3E}">
+        <p14:creationId xmlns:p14="http://schemas.microsoft.com/office/powerpoint/2010/main" val="3992215378"/>
+      </p:ext>
+    </p:extLst>
+  </p:cSld>
+  <p:clrMapOvr>
+    <a:masterClrMapping/>
+  </p:clrMapOvr>
+</p:sld>
+</file>
+
 <file path=ppt/theme/theme1.xml><?xml version="1.0" encoding="utf-8"?>
 <a:theme xmlns:a="http://schemas.openxmlformats.org/drawingml/2006/main" name="Office Theme">
   <a:themeElements>

</xml_diff>

<commit_message>
slides for dim blessing (split data)
</commit_message>
<xml_diff>
--- a/slides_x_mas_2023.pptx
+++ b/slides_x_mas_2023.pptx
@@ -8,6 +8,10 @@
     <p:sldId id="257" r:id="rId2"/>
     <p:sldId id="258" r:id="rId3"/>
     <p:sldId id="259" r:id="rId4"/>
+    <p:sldId id="260" r:id="rId5"/>
+    <p:sldId id="261" r:id="rId6"/>
+    <p:sldId id="262" r:id="rId7"/>
+    <p:sldId id="263" r:id="rId8"/>
   </p:sldIdLst>
   <p:sldSz cx="12192000" cy="6858000"/>
   <p:notesSz cx="6858000" cy="9144000"/>
@@ -118,6 +122,10 @@
           <p14:sldIdLst>
             <p14:sldId id="258"/>
             <p14:sldId id="259"/>
+            <p14:sldId id="260"/>
+            <p14:sldId id="261"/>
+            <p14:sldId id="262"/>
+            <p14:sldId id="263"/>
           </p14:sldIdLst>
         </p14:section>
         <p14:section name="Unusual" id="{42EB159F-85B8-41F3-970F-2D80DA23F3BA}">
@@ -3776,6 +3784,526 @@
 </p:sld>
 </file>
 
+<file path=ppt/slides/slide4.xml><?xml version="1.0" encoding="utf-8"?>
+<p:sld xmlns:a="http://schemas.openxmlformats.org/drawingml/2006/main" xmlns:r="http://schemas.openxmlformats.org/officeDocument/2006/relationships" xmlns:p="http://schemas.openxmlformats.org/presentationml/2006/main">
+  <p:cSld>
+    <p:spTree>
+      <p:nvGrpSpPr>
+        <p:cNvPr id="1" name=""/>
+        <p:cNvGrpSpPr/>
+        <p:nvPr/>
+      </p:nvGrpSpPr>
+      <p:grpSpPr>
+        <a:xfrm>
+          <a:off x="0" y="0"/>
+          <a:ext cx="0" cy="0"/>
+          <a:chOff x="0" y="0"/>
+          <a:chExt cx="0" cy="0"/>
+        </a:xfrm>
+      </p:grpSpPr>
+      <p:pic>
+        <p:nvPicPr>
+          <p:cNvPr id="34" name="Content Placeholder 33">
+            <a:extLst>
+              <a:ext uri="{FF2B5EF4-FFF2-40B4-BE49-F238E27FC236}">
+                <a16:creationId xmlns:a16="http://schemas.microsoft.com/office/drawing/2014/main" id="{74974D9D-F991-14E2-9F5E-BCDD4D27875C}"/>
+              </a:ext>
+            </a:extLst>
+          </p:cNvPr>
+          <p:cNvPicPr>
+            <a:picLocks noGrp="1" noChangeAspect="1"/>
+          </p:cNvPicPr>
+          <p:nvPr>
+            <p:ph sz="half" idx="2"/>
+          </p:nvPr>
+        </p:nvPicPr>
+        <p:blipFill>
+          <a:blip r:embed="rId2">
+            <a:extLst>
+              <a:ext uri="{28A0092B-C50C-407E-A947-70E740481C1C}">
+                <a14:useLocalDpi xmlns:a14="http://schemas.microsoft.com/office/drawing/2010/main" val="0"/>
+              </a:ext>
+            </a:extLst>
+          </a:blip>
+          <a:srcRect/>
+          <a:stretch/>
+        </p:blipFill>
+        <p:spPr>
+          <a:xfrm>
+            <a:off x="4361463" y="700141"/>
+            <a:ext cx="8803074" cy="6602306"/>
+          </a:xfrm>
+        </p:spPr>
+      </p:pic>
+      <p:sp>
+        <p:nvSpPr>
+          <p:cNvPr id="2" name="Title 1">
+            <a:extLst>
+              <a:ext uri="{FF2B5EF4-FFF2-40B4-BE49-F238E27FC236}">
+                <a16:creationId xmlns:a16="http://schemas.microsoft.com/office/drawing/2014/main" id="{700307F2-5E8C-3DAE-5E1A-E3298FD9C257}"/>
+              </a:ext>
+            </a:extLst>
+          </p:cNvPr>
+          <p:cNvSpPr>
+            <a:spLocks noGrp="1"/>
+          </p:cNvSpPr>
+          <p:nvPr>
+            <p:ph type="title"/>
+          </p:nvPr>
+        </p:nvSpPr>
+        <p:spPr/>
+        <p:txBody>
+          <a:bodyPr/>
+          <a:lstStyle/>
+          <a:p>
+            <a:r>
+              <a:rPr lang="en-US" dirty="0"/>
+              <a:t>Blessing of dimensionality</a:t>
+            </a:r>
+          </a:p>
+        </p:txBody>
+      </p:sp>
+      <p:pic>
+        <p:nvPicPr>
+          <p:cNvPr id="16" name="Content Placeholder 15">
+            <a:extLst>
+              <a:ext uri="{FF2B5EF4-FFF2-40B4-BE49-F238E27FC236}">
+                <a16:creationId xmlns:a16="http://schemas.microsoft.com/office/drawing/2014/main" id="{41619761-8EF1-3FA0-E281-B56A9EAB7EC7}"/>
+              </a:ext>
+            </a:extLst>
+          </p:cNvPr>
+          <p:cNvPicPr>
+            <a:picLocks noGrp="1" noChangeAspect="1"/>
+          </p:cNvPicPr>
+          <p:nvPr>
+            <p:ph sz="half" idx="1"/>
+          </p:nvPr>
+        </p:nvPicPr>
+        <p:blipFill>
+          <a:blip r:embed="rId3"/>
+          <a:stretch>
+            <a:fillRect/>
+          </a:stretch>
+        </p:blipFill>
+        <p:spPr>
+          <a:xfrm>
+            <a:off x="685800" y="2238444"/>
+            <a:ext cx="5181600" cy="3919415"/>
+          </a:xfrm>
+        </p:spPr>
+      </p:pic>
+    </p:spTree>
+    <p:extLst>
+      <p:ext uri="{BB962C8B-B14F-4D97-AF65-F5344CB8AC3E}">
+        <p14:creationId xmlns:p14="http://schemas.microsoft.com/office/powerpoint/2010/main" val="2507578720"/>
+      </p:ext>
+    </p:extLst>
+  </p:cSld>
+  <p:clrMapOvr>
+    <a:masterClrMapping/>
+  </p:clrMapOvr>
+</p:sld>
+</file>
+
+<file path=ppt/slides/slide5.xml><?xml version="1.0" encoding="utf-8"?>
+<p:sld xmlns:a="http://schemas.openxmlformats.org/drawingml/2006/main" xmlns:r="http://schemas.openxmlformats.org/officeDocument/2006/relationships" xmlns:p="http://schemas.openxmlformats.org/presentationml/2006/main">
+  <p:cSld>
+    <p:spTree>
+      <p:nvGrpSpPr>
+        <p:cNvPr id="1" name=""/>
+        <p:cNvGrpSpPr/>
+        <p:nvPr/>
+      </p:nvGrpSpPr>
+      <p:grpSpPr>
+        <a:xfrm>
+          <a:off x="0" y="0"/>
+          <a:ext cx="0" cy="0"/>
+          <a:chOff x="0" y="0"/>
+          <a:chExt cx="0" cy="0"/>
+        </a:xfrm>
+      </p:grpSpPr>
+      <p:pic>
+        <p:nvPicPr>
+          <p:cNvPr id="34" name="Content Placeholder 33">
+            <a:extLst>
+              <a:ext uri="{FF2B5EF4-FFF2-40B4-BE49-F238E27FC236}">
+                <a16:creationId xmlns:a16="http://schemas.microsoft.com/office/drawing/2014/main" id="{74974D9D-F991-14E2-9F5E-BCDD4D27875C}"/>
+              </a:ext>
+            </a:extLst>
+          </p:cNvPr>
+          <p:cNvPicPr>
+            <a:picLocks noGrp="1" noChangeAspect="1"/>
+          </p:cNvPicPr>
+          <p:nvPr>
+            <p:ph sz="half" idx="2"/>
+          </p:nvPr>
+        </p:nvPicPr>
+        <p:blipFill>
+          <a:blip r:embed="rId2">
+            <a:extLst>
+              <a:ext uri="{28A0092B-C50C-407E-A947-70E740481C1C}">
+                <a14:useLocalDpi xmlns:a14="http://schemas.microsoft.com/office/drawing/2010/main" val="0"/>
+              </a:ext>
+            </a:extLst>
+          </a:blip>
+          <a:srcRect/>
+          <a:stretch/>
+        </p:blipFill>
+        <p:spPr>
+          <a:xfrm>
+            <a:off x="4361463" y="700141"/>
+            <a:ext cx="8803074" cy="6602306"/>
+          </a:xfrm>
+        </p:spPr>
+      </p:pic>
+      <p:sp>
+        <p:nvSpPr>
+          <p:cNvPr id="2" name="Title 1">
+            <a:extLst>
+              <a:ext uri="{FF2B5EF4-FFF2-40B4-BE49-F238E27FC236}">
+                <a16:creationId xmlns:a16="http://schemas.microsoft.com/office/drawing/2014/main" id="{700307F2-5E8C-3DAE-5E1A-E3298FD9C257}"/>
+              </a:ext>
+            </a:extLst>
+          </p:cNvPr>
+          <p:cNvSpPr>
+            <a:spLocks noGrp="1"/>
+          </p:cNvSpPr>
+          <p:nvPr>
+            <p:ph type="title"/>
+          </p:nvPr>
+        </p:nvSpPr>
+        <p:spPr/>
+        <p:txBody>
+          <a:bodyPr/>
+          <a:lstStyle/>
+          <a:p>
+            <a:r>
+              <a:rPr lang="en-US" dirty="0"/>
+              <a:t>Blessing of dimensionality</a:t>
+            </a:r>
+          </a:p>
+        </p:txBody>
+      </p:sp>
+      <p:pic>
+        <p:nvPicPr>
+          <p:cNvPr id="16" name="Content Placeholder 15">
+            <a:extLst>
+              <a:ext uri="{FF2B5EF4-FFF2-40B4-BE49-F238E27FC236}">
+                <a16:creationId xmlns:a16="http://schemas.microsoft.com/office/drawing/2014/main" id="{41619761-8EF1-3FA0-E281-B56A9EAB7EC7}"/>
+              </a:ext>
+            </a:extLst>
+          </p:cNvPr>
+          <p:cNvPicPr>
+            <a:picLocks noGrp="1" noChangeAspect="1"/>
+          </p:cNvPicPr>
+          <p:nvPr>
+            <p:ph sz="half" idx="1"/>
+          </p:nvPr>
+        </p:nvPicPr>
+        <p:blipFill>
+          <a:blip r:embed="rId3"/>
+          <a:stretch>
+            <a:fillRect/>
+          </a:stretch>
+        </p:blipFill>
+        <p:spPr>
+          <a:xfrm>
+            <a:off x="685800" y="2238444"/>
+            <a:ext cx="5181600" cy="3919415"/>
+          </a:xfrm>
+        </p:spPr>
+      </p:pic>
+    </p:spTree>
+    <p:extLst>
+      <p:ext uri="{BB962C8B-B14F-4D97-AF65-F5344CB8AC3E}">
+        <p14:creationId xmlns:p14="http://schemas.microsoft.com/office/powerpoint/2010/main" val="4098112524"/>
+      </p:ext>
+    </p:extLst>
+  </p:cSld>
+  <p:clrMapOvr>
+    <a:masterClrMapping/>
+  </p:clrMapOvr>
+  <mc:AlternateContent xmlns:mc="http://schemas.openxmlformats.org/markup-compatibility/2006">
+    <mc:Choice xmlns:p14="http://schemas.microsoft.com/office/powerpoint/2010/main" Requires="p14">
+      <p:transition spd="med" p14:dur="700">
+        <p:fade/>
+      </p:transition>
+    </mc:Choice>
+    <mc:Fallback>
+      <p:transition spd="med">
+        <p:fade/>
+      </p:transition>
+    </mc:Fallback>
+  </mc:AlternateContent>
+</p:sld>
+</file>
+
+<file path=ppt/slides/slide6.xml><?xml version="1.0" encoding="utf-8"?>
+<p:sld xmlns:a="http://schemas.openxmlformats.org/drawingml/2006/main" xmlns:r="http://schemas.openxmlformats.org/officeDocument/2006/relationships" xmlns:p="http://schemas.openxmlformats.org/presentationml/2006/main">
+  <p:cSld>
+    <p:spTree>
+      <p:nvGrpSpPr>
+        <p:cNvPr id="1" name=""/>
+        <p:cNvGrpSpPr/>
+        <p:nvPr/>
+      </p:nvGrpSpPr>
+      <p:grpSpPr>
+        <a:xfrm>
+          <a:off x="0" y="0"/>
+          <a:ext cx="0" cy="0"/>
+          <a:chOff x="0" y="0"/>
+          <a:chExt cx="0" cy="0"/>
+        </a:xfrm>
+      </p:grpSpPr>
+      <p:pic>
+        <p:nvPicPr>
+          <p:cNvPr id="34" name="Content Placeholder 33">
+            <a:extLst>
+              <a:ext uri="{FF2B5EF4-FFF2-40B4-BE49-F238E27FC236}">
+                <a16:creationId xmlns:a16="http://schemas.microsoft.com/office/drawing/2014/main" id="{74974D9D-F991-14E2-9F5E-BCDD4D27875C}"/>
+              </a:ext>
+            </a:extLst>
+          </p:cNvPr>
+          <p:cNvPicPr>
+            <a:picLocks noGrp="1" noChangeAspect="1"/>
+          </p:cNvPicPr>
+          <p:nvPr>
+            <p:ph sz="half" idx="2"/>
+          </p:nvPr>
+        </p:nvPicPr>
+        <p:blipFill>
+          <a:blip r:embed="rId2">
+            <a:extLst>
+              <a:ext uri="{28A0092B-C50C-407E-A947-70E740481C1C}">
+                <a14:useLocalDpi xmlns:a14="http://schemas.microsoft.com/office/drawing/2010/main" val="0"/>
+              </a:ext>
+            </a:extLst>
+          </a:blip>
+          <a:srcRect/>
+          <a:stretch/>
+        </p:blipFill>
+        <p:spPr>
+          <a:xfrm>
+            <a:off x="4361463" y="700141"/>
+            <a:ext cx="8803074" cy="6602306"/>
+          </a:xfrm>
+        </p:spPr>
+      </p:pic>
+      <p:sp>
+        <p:nvSpPr>
+          <p:cNvPr id="2" name="Title 1">
+            <a:extLst>
+              <a:ext uri="{FF2B5EF4-FFF2-40B4-BE49-F238E27FC236}">
+                <a16:creationId xmlns:a16="http://schemas.microsoft.com/office/drawing/2014/main" id="{700307F2-5E8C-3DAE-5E1A-E3298FD9C257}"/>
+              </a:ext>
+            </a:extLst>
+          </p:cNvPr>
+          <p:cNvSpPr>
+            <a:spLocks noGrp="1"/>
+          </p:cNvSpPr>
+          <p:nvPr>
+            <p:ph type="title"/>
+          </p:nvPr>
+        </p:nvSpPr>
+        <p:spPr/>
+        <p:txBody>
+          <a:bodyPr/>
+          <a:lstStyle/>
+          <a:p>
+            <a:r>
+              <a:rPr lang="en-US" dirty="0"/>
+              <a:t>Blessing of dimensionality</a:t>
+            </a:r>
+          </a:p>
+        </p:txBody>
+      </p:sp>
+      <p:pic>
+        <p:nvPicPr>
+          <p:cNvPr id="16" name="Content Placeholder 15">
+            <a:extLst>
+              <a:ext uri="{FF2B5EF4-FFF2-40B4-BE49-F238E27FC236}">
+                <a16:creationId xmlns:a16="http://schemas.microsoft.com/office/drawing/2014/main" id="{41619761-8EF1-3FA0-E281-B56A9EAB7EC7}"/>
+              </a:ext>
+            </a:extLst>
+          </p:cNvPr>
+          <p:cNvPicPr>
+            <a:picLocks noGrp="1" noChangeAspect="1"/>
+          </p:cNvPicPr>
+          <p:nvPr>
+            <p:ph sz="half" idx="1"/>
+          </p:nvPr>
+        </p:nvPicPr>
+        <p:blipFill>
+          <a:blip r:embed="rId3"/>
+          <a:stretch>
+            <a:fillRect/>
+          </a:stretch>
+        </p:blipFill>
+        <p:spPr>
+          <a:xfrm>
+            <a:off x="685800" y="2238444"/>
+            <a:ext cx="5181600" cy="3919415"/>
+          </a:xfrm>
+        </p:spPr>
+      </p:pic>
+    </p:spTree>
+    <p:extLst>
+      <p:ext uri="{BB962C8B-B14F-4D97-AF65-F5344CB8AC3E}">
+        <p14:creationId xmlns:p14="http://schemas.microsoft.com/office/powerpoint/2010/main" val="613027965"/>
+      </p:ext>
+    </p:extLst>
+  </p:cSld>
+  <p:clrMapOvr>
+    <a:masterClrMapping/>
+  </p:clrMapOvr>
+  <mc:AlternateContent xmlns:mc="http://schemas.openxmlformats.org/markup-compatibility/2006">
+    <mc:Choice xmlns:p14="http://schemas.microsoft.com/office/powerpoint/2010/main" Requires="p14">
+      <p:transition spd="med" p14:dur="700">
+        <p:fade/>
+      </p:transition>
+    </mc:Choice>
+    <mc:Fallback>
+      <p:transition spd="med">
+        <p:fade/>
+      </p:transition>
+    </mc:Fallback>
+  </mc:AlternateContent>
+</p:sld>
+</file>
+
+<file path=ppt/slides/slide7.xml><?xml version="1.0" encoding="utf-8"?>
+<p:sld xmlns:a="http://schemas.openxmlformats.org/drawingml/2006/main" xmlns:r="http://schemas.openxmlformats.org/officeDocument/2006/relationships" xmlns:p="http://schemas.openxmlformats.org/presentationml/2006/main">
+  <p:cSld>
+    <p:spTree>
+      <p:nvGrpSpPr>
+        <p:cNvPr id="1" name=""/>
+        <p:cNvGrpSpPr/>
+        <p:nvPr/>
+      </p:nvGrpSpPr>
+      <p:grpSpPr>
+        <a:xfrm>
+          <a:off x="0" y="0"/>
+          <a:ext cx="0" cy="0"/>
+          <a:chOff x="0" y="0"/>
+          <a:chExt cx="0" cy="0"/>
+        </a:xfrm>
+      </p:grpSpPr>
+      <p:pic>
+        <p:nvPicPr>
+          <p:cNvPr id="34" name="Content Placeholder 33">
+            <a:extLst>
+              <a:ext uri="{FF2B5EF4-FFF2-40B4-BE49-F238E27FC236}">
+                <a16:creationId xmlns:a16="http://schemas.microsoft.com/office/drawing/2014/main" id="{74974D9D-F991-14E2-9F5E-BCDD4D27875C}"/>
+              </a:ext>
+            </a:extLst>
+          </p:cNvPr>
+          <p:cNvPicPr>
+            <a:picLocks noGrp="1" noChangeAspect="1"/>
+          </p:cNvPicPr>
+          <p:nvPr>
+            <p:ph sz="half" idx="2"/>
+          </p:nvPr>
+        </p:nvPicPr>
+        <p:blipFill>
+          <a:blip r:embed="rId2">
+            <a:extLst>
+              <a:ext uri="{28A0092B-C50C-407E-A947-70E740481C1C}">
+                <a14:useLocalDpi xmlns:a14="http://schemas.microsoft.com/office/drawing/2010/main" val="0"/>
+              </a:ext>
+            </a:extLst>
+          </a:blip>
+          <a:srcRect/>
+          <a:stretch/>
+        </p:blipFill>
+        <p:spPr>
+          <a:xfrm>
+            <a:off x="4361463" y="700141"/>
+            <a:ext cx="8803074" cy="6602306"/>
+          </a:xfrm>
+        </p:spPr>
+      </p:pic>
+      <p:sp>
+        <p:nvSpPr>
+          <p:cNvPr id="2" name="Title 1">
+            <a:extLst>
+              <a:ext uri="{FF2B5EF4-FFF2-40B4-BE49-F238E27FC236}">
+                <a16:creationId xmlns:a16="http://schemas.microsoft.com/office/drawing/2014/main" id="{700307F2-5E8C-3DAE-5E1A-E3298FD9C257}"/>
+              </a:ext>
+            </a:extLst>
+          </p:cNvPr>
+          <p:cNvSpPr>
+            <a:spLocks noGrp="1"/>
+          </p:cNvSpPr>
+          <p:nvPr>
+            <p:ph type="title"/>
+          </p:nvPr>
+        </p:nvSpPr>
+        <p:spPr/>
+        <p:txBody>
+          <a:bodyPr/>
+          <a:lstStyle/>
+          <a:p>
+            <a:r>
+              <a:rPr lang="en-US" dirty="0"/>
+              <a:t>Blessing of dimensionality</a:t>
+            </a:r>
+          </a:p>
+        </p:txBody>
+      </p:sp>
+      <p:pic>
+        <p:nvPicPr>
+          <p:cNvPr id="16" name="Content Placeholder 15">
+            <a:extLst>
+              <a:ext uri="{FF2B5EF4-FFF2-40B4-BE49-F238E27FC236}">
+                <a16:creationId xmlns:a16="http://schemas.microsoft.com/office/drawing/2014/main" id="{41619761-8EF1-3FA0-E281-B56A9EAB7EC7}"/>
+              </a:ext>
+            </a:extLst>
+          </p:cNvPr>
+          <p:cNvPicPr>
+            <a:picLocks noGrp="1" noChangeAspect="1"/>
+          </p:cNvPicPr>
+          <p:nvPr>
+            <p:ph sz="half" idx="1"/>
+          </p:nvPr>
+        </p:nvPicPr>
+        <p:blipFill>
+          <a:blip r:embed="rId3"/>
+          <a:stretch>
+            <a:fillRect/>
+          </a:stretch>
+        </p:blipFill>
+        <p:spPr>
+          <a:xfrm>
+            <a:off x="685800" y="2238444"/>
+            <a:ext cx="5181600" cy="3919415"/>
+          </a:xfrm>
+        </p:spPr>
+      </p:pic>
+    </p:spTree>
+    <p:extLst>
+      <p:ext uri="{BB962C8B-B14F-4D97-AF65-F5344CB8AC3E}">
+        <p14:creationId xmlns:p14="http://schemas.microsoft.com/office/powerpoint/2010/main" val="209094979"/>
+      </p:ext>
+    </p:extLst>
+  </p:cSld>
+  <p:clrMapOvr>
+    <a:masterClrMapping/>
+  </p:clrMapOvr>
+  <mc:AlternateContent xmlns:mc="http://schemas.openxmlformats.org/markup-compatibility/2006">
+    <mc:Choice xmlns:p14="http://schemas.microsoft.com/office/powerpoint/2010/main" Requires="p14">
+      <p:transition spd="med" p14:dur="700">
+        <p:fade/>
+      </p:transition>
+    </mc:Choice>
+    <mc:Fallback>
+      <p:transition spd="med">
+        <p:fade/>
+      </p:transition>
+    </mc:Fallback>
+  </mc:AlternateContent>
+</p:sld>
+</file>
+
 <file path=ppt/theme/theme1.xml><?xml version="1.0" encoding="utf-8"?>
 <a:theme xmlns:a="http://schemas.openxmlformats.org/drawingml/2006/main" name="Office Theme">
   <a:themeElements>

</xml_diff>

<commit_message>
slides of blessing of dim: GD
</commit_message>
<xml_diff>
--- a/slides_x_mas_2023.pptx
+++ b/slides_x_mas_2023.pptx
@@ -12,6 +12,8 @@
     <p:sldId id="261" r:id="rId6"/>
     <p:sldId id="262" r:id="rId7"/>
     <p:sldId id="263" r:id="rId8"/>
+    <p:sldId id="266" r:id="rId9"/>
+    <p:sldId id="267" r:id="rId10"/>
   </p:sldIdLst>
   <p:sldSz cx="12192000" cy="6858000"/>
   <p:notesSz cx="6858000" cy="9144000"/>
@@ -126,6 +128,8 @@
             <p14:sldId id="261"/>
             <p14:sldId id="262"/>
             <p14:sldId id="263"/>
+            <p14:sldId id="266"/>
+            <p14:sldId id="267"/>
           </p14:sldIdLst>
         </p14:section>
         <p14:section name="Unusual" id="{42EB159F-85B8-41F3-970F-2D80DA23F3BA}">
@@ -4304,6 +4308,331 @@
 </p:sld>
 </file>
 
+<file path=ppt/slides/slide8.xml><?xml version="1.0" encoding="utf-8"?>
+<p:sld xmlns:a="http://schemas.openxmlformats.org/drawingml/2006/main" xmlns:r="http://schemas.openxmlformats.org/officeDocument/2006/relationships" xmlns:p="http://schemas.openxmlformats.org/presentationml/2006/main">
+  <p:cSld>
+    <p:spTree>
+      <p:nvGrpSpPr>
+        <p:cNvPr id="1" name=""/>
+        <p:cNvGrpSpPr/>
+        <p:nvPr/>
+      </p:nvGrpSpPr>
+      <p:grpSpPr>
+        <a:xfrm>
+          <a:off x="0" y="0"/>
+          <a:ext cx="0" cy="0"/>
+          <a:chOff x="0" y="0"/>
+          <a:chExt cx="0" cy="0"/>
+        </a:xfrm>
+      </p:grpSpPr>
+      <p:sp>
+        <p:nvSpPr>
+          <p:cNvPr id="2" name="Title 1">
+            <a:extLst>
+              <a:ext uri="{FF2B5EF4-FFF2-40B4-BE49-F238E27FC236}">
+                <a16:creationId xmlns:a16="http://schemas.microsoft.com/office/drawing/2014/main" id="{8C3FB273-FE68-C30D-A53C-3507DBEC15D6}"/>
+              </a:ext>
+            </a:extLst>
+          </p:cNvPr>
+          <p:cNvSpPr>
+            <a:spLocks noGrp="1"/>
+          </p:cNvSpPr>
+          <p:nvPr>
+            <p:ph type="title"/>
+          </p:nvPr>
+        </p:nvSpPr>
+        <p:spPr/>
+        <p:txBody>
+          <a:bodyPr/>
+          <a:lstStyle/>
+          <a:p>
+            <a:r>
+              <a:rPr lang="en-US" dirty="0"/>
+              <a:t>Blessing of dimensionality</a:t>
+            </a:r>
+          </a:p>
+        </p:txBody>
+      </p:sp>
+      <p:pic>
+        <p:nvPicPr>
+          <p:cNvPr id="23" name="Content Placeholder 22">
+            <a:extLst>
+              <a:ext uri="{FF2B5EF4-FFF2-40B4-BE49-F238E27FC236}">
+                <a16:creationId xmlns:a16="http://schemas.microsoft.com/office/drawing/2014/main" id="{721D2B8A-8ABE-10E7-DBDC-35F26E68A760}"/>
+              </a:ext>
+            </a:extLst>
+          </p:cNvPr>
+          <p:cNvPicPr>
+            <a:picLocks noGrp="1" noChangeAspect="1"/>
+          </p:cNvPicPr>
+          <p:nvPr>
+            <p:ph sz="half" idx="2"/>
+          </p:nvPr>
+        </p:nvPicPr>
+        <p:blipFill>
+          <a:blip r:embed="rId2">
+            <a:extLst>
+              <a:ext uri="{28A0092B-C50C-407E-A947-70E740481C1C}">
+                <a14:useLocalDpi xmlns:a14="http://schemas.microsoft.com/office/drawing/2010/main" val="0"/>
+              </a:ext>
+            </a:extLst>
+          </a:blip>
+          <a:srcRect/>
+          <a:stretch/>
+        </p:blipFill>
+        <p:spPr>
+          <a:xfrm>
+            <a:off x="5334000" y="1429544"/>
+            <a:ext cx="6858000" cy="5143500"/>
+          </a:xfrm>
+        </p:spPr>
+      </p:pic>
+      <p:pic>
+        <p:nvPicPr>
+          <p:cNvPr id="27" name="Content Placeholder 26">
+            <a:extLst>
+              <a:ext uri="{FF2B5EF4-FFF2-40B4-BE49-F238E27FC236}">
+                <a16:creationId xmlns:a16="http://schemas.microsoft.com/office/drawing/2014/main" id="{53F9E061-2CA3-91A6-03FC-5AF1A5384C06}"/>
+              </a:ext>
+            </a:extLst>
+          </p:cNvPr>
+          <p:cNvPicPr>
+            <a:picLocks noGrp="1" noChangeAspect="1"/>
+          </p:cNvPicPr>
+          <p:nvPr>
+            <p:ph sz="half" idx="1"/>
+          </p:nvPr>
+        </p:nvPicPr>
+        <p:blipFill>
+          <a:blip r:embed="rId3"/>
+          <a:stretch>
+            <a:fillRect/>
+          </a:stretch>
+        </p:blipFill>
+        <p:spPr>
+          <a:xfrm>
+            <a:off x="177820" y="2118858"/>
+            <a:ext cx="5816560" cy="4026016"/>
+          </a:xfrm>
+        </p:spPr>
+      </p:pic>
+    </p:spTree>
+    <p:extLst>
+      <p:ext uri="{BB962C8B-B14F-4D97-AF65-F5344CB8AC3E}">
+        <p14:creationId xmlns:p14="http://schemas.microsoft.com/office/powerpoint/2010/main" val="2507836805"/>
+      </p:ext>
+    </p:extLst>
+  </p:cSld>
+  <p:clrMapOvr>
+    <a:masterClrMapping/>
+  </p:clrMapOvr>
+  <p:timing>
+    <p:tnLst>
+      <p:par>
+        <p:cTn id="1" dur="indefinite" restart="never" nodeType="tmRoot">
+          <p:childTnLst>
+            <p:seq concurrent="1" nextAc="seek">
+              <p:cTn id="2" dur="indefinite" nodeType="mainSeq">
+                <p:childTnLst>
+                  <p:par>
+                    <p:cTn id="3" fill="hold">
+                      <p:stCondLst>
+                        <p:cond delay="indefinite"/>
+                      </p:stCondLst>
+                      <p:childTnLst>
+                        <p:par>
+                          <p:cTn id="4" fill="hold">
+                            <p:stCondLst>
+                              <p:cond delay="0"/>
+                            </p:stCondLst>
+                            <p:childTnLst>
+                              <p:par>
+                                <p:cTn id="5" presetID="10" presetClass="entr" presetSubtype="0" fill="hold" nodeType="clickEffect">
+                                  <p:stCondLst>
+                                    <p:cond delay="0"/>
+                                  </p:stCondLst>
+                                  <p:childTnLst>
+                                    <p:set>
+                                      <p:cBhvr>
+                                        <p:cTn id="6" dur="1" fill="hold">
+                                          <p:stCondLst>
+                                            <p:cond delay="0"/>
+                                          </p:stCondLst>
+                                        </p:cTn>
+                                        <p:tgtEl>
+                                          <p:spTgt spid="23"/>
+                                        </p:tgtEl>
+                                        <p:attrNameLst>
+                                          <p:attrName>style.visibility</p:attrName>
+                                        </p:attrNameLst>
+                                      </p:cBhvr>
+                                      <p:to>
+                                        <p:strVal val="visible"/>
+                                      </p:to>
+                                    </p:set>
+                                    <p:animEffect transition="in" filter="fade">
+                                      <p:cBhvr>
+                                        <p:cTn id="7" dur="500"/>
+                                        <p:tgtEl>
+                                          <p:spTgt spid="23"/>
+                                        </p:tgtEl>
+                                      </p:cBhvr>
+                                    </p:animEffect>
+                                  </p:childTnLst>
+                                </p:cTn>
+                              </p:par>
+                            </p:childTnLst>
+                          </p:cTn>
+                        </p:par>
+                      </p:childTnLst>
+                    </p:cTn>
+                  </p:par>
+                </p:childTnLst>
+              </p:cTn>
+              <p:prevCondLst>
+                <p:cond evt="onPrev" delay="0">
+                  <p:tgtEl>
+                    <p:sldTgt/>
+                  </p:tgtEl>
+                </p:cond>
+              </p:prevCondLst>
+              <p:nextCondLst>
+                <p:cond evt="onNext" delay="0">
+                  <p:tgtEl>
+                    <p:sldTgt/>
+                  </p:tgtEl>
+                </p:cond>
+              </p:nextCondLst>
+            </p:seq>
+          </p:childTnLst>
+        </p:cTn>
+      </p:par>
+    </p:tnLst>
+  </p:timing>
+</p:sld>
+</file>
+
+<file path=ppt/slides/slide9.xml><?xml version="1.0" encoding="utf-8"?>
+<p:sld xmlns:a="http://schemas.openxmlformats.org/drawingml/2006/main" xmlns:r="http://schemas.openxmlformats.org/officeDocument/2006/relationships" xmlns:p="http://schemas.openxmlformats.org/presentationml/2006/main">
+  <p:cSld>
+    <p:spTree>
+      <p:nvGrpSpPr>
+        <p:cNvPr id="1" name=""/>
+        <p:cNvGrpSpPr/>
+        <p:nvPr/>
+      </p:nvGrpSpPr>
+      <p:grpSpPr>
+        <a:xfrm>
+          <a:off x="0" y="0"/>
+          <a:ext cx="0" cy="0"/>
+          <a:chOff x="0" y="0"/>
+          <a:chExt cx="0" cy="0"/>
+        </a:xfrm>
+      </p:grpSpPr>
+      <p:sp>
+        <p:nvSpPr>
+          <p:cNvPr id="2" name="Title 1">
+            <a:extLst>
+              <a:ext uri="{FF2B5EF4-FFF2-40B4-BE49-F238E27FC236}">
+                <a16:creationId xmlns:a16="http://schemas.microsoft.com/office/drawing/2014/main" id="{8C3FB273-FE68-C30D-A53C-3507DBEC15D6}"/>
+              </a:ext>
+            </a:extLst>
+          </p:cNvPr>
+          <p:cNvSpPr>
+            <a:spLocks noGrp="1"/>
+          </p:cNvSpPr>
+          <p:nvPr>
+            <p:ph type="title"/>
+          </p:nvPr>
+        </p:nvSpPr>
+        <p:spPr/>
+        <p:txBody>
+          <a:bodyPr/>
+          <a:lstStyle/>
+          <a:p>
+            <a:r>
+              <a:rPr lang="en-US" dirty="0"/>
+              <a:t>Blessing of dimensionality</a:t>
+            </a:r>
+          </a:p>
+        </p:txBody>
+      </p:sp>
+      <p:pic>
+        <p:nvPicPr>
+          <p:cNvPr id="23" name="Content Placeholder 22">
+            <a:extLst>
+              <a:ext uri="{FF2B5EF4-FFF2-40B4-BE49-F238E27FC236}">
+                <a16:creationId xmlns:a16="http://schemas.microsoft.com/office/drawing/2014/main" id="{721D2B8A-8ABE-10E7-DBDC-35F26E68A760}"/>
+              </a:ext>
+            </a:extLst>
+          </p:cNvPr>
+          <p:cNvPicPr>
+            <a:picLocks noGrp="1" noChangeAspect="1"/>
+          </p:cNvPicPr>
+          <p:nvPr>
+            <p:ph sz="half" idx="2"/>
+          </p:nvPr>
+        </p:nvPicPr>
+        <p:blipFill>
+          <a:blip r:embed="rId2">
+            <a:extLst>
+              <a:ext uri="{28A0092B-C50C-407E-A947-70E740481C1C}">
+                <a14:useLocalDpi xmlns:a14="http://schemas.microsoft.com/office/drawing/2010/main" val="0"/>
+              </a:ext>
+            </a:extLst>
+          </a:blip>
+          <a:srcRect/>
+          <a:stretch/>
+        </p:blipFill>
+        <p:spPr>
+          <a:xfrm>
+            <a:off x="5334000" y="1429544"/>
+            <a:ext cx="6858000" cy="5143500"/>
+          </a:xfrm>
+        </p:spPr>
+      </p:pic>
+      <p:pic>
+        <p:nvPicPr>
+          <p:cNvPr id="6" name="Content Placeholder 6">
+            <a:extLst>
+              <a:ext uri="{FF2B5EF4-FFF2-40B4-BE49-F238E27FC236}">
+                <a16:creationId xmlns:a16="http://schemas.microsoft.com/office/drawing/2014/main" id="{BB034BC8-B45D-FF25-8886-F3E69BC819FB}"/>
+              </a:ext>
+            </a:extLst>
+          </p:cNvPr>
+          <p:cNvPicPr>
+            <a:picLocks noGrp="1" noChangeAspect="1"/>
+          </p:cNvPicPr>
+          <p:nvPr>
+            <p:ph sz="half" idx="1"/>
+          </p:nvPr>
+        </p:nvPicPr>
+        <p:blipFill>
+          <a:blip r:embed="rId3"/>
+          <a:stretch>
+            <a:fillRect/>
+          </a:stretch>
+        </p:blipFill>
+        <p:spPr>
+          <a:xfrm>
+            <a:off x="177820" y="2118860"/>
+            <a:ext cx="5816561" cy="4026015"/>
+          </a:xfrm>
+        </p:spPr>
+      </p:pic>
+    </p:spTree>
+    <p:extLst>
+      <p:ext uri="{BB962C8B-B14F-4D97-AF65-F5344CB8AC3E}">
+        <p14:creationId xmlns:p14="http://schemas.microsoft.com/office/powerpoint/2010/main" val="4094674770"/>
+      </p:ext>
+    </p:extLst>
+  </p:cSld>
+  <p:clrMapOvr>
+    <a:masterClrMapping/>
+  </p:clrMapOvr>
+</p:sld>
+</file>
+
 <file path=ppt/theme/theme1.xml><?xml version="1.0" encoding="utf-8"?>
 <a:theme xmlns:a="http://schemas.openxmlformats.org/drawingml/2006/main" name="Office Theme">
   <a:themeElements>

</xml_diff>

<commit_message>
4 circles paradox: axes
</commit_message>
<xml_diff>
--- a/slides_x_mas_2023.pptx
+++ b/slides_x_mas_2023.pptx
@@ -14,6 +14,7 @@
     <p:sldId id="263" r:id="rId8"/>
     <p:sldId id="266" r:id="rId9"/>
     <p:sldId id="267" r:id="rId10"/>
+    <p:sldId id="268" r:id="rId11"/>
   </p:sldIdLst>
   <p:sldSz cx="12192000" cy="6858000"/>
   <p:notesSz cx="6858000" cy="9144000"/>
@@ -136,12 +137,17 @@
           <p14:sldIdLst/>
         </p14:section>
         <p14:section name="Paradoxical" id="{E2223571-FAC5-4589-B421-244975766BB0}">
-          <p14:sldIdLst/>
+          <p14:sldIdLst>
+            <p14:sldId id="268"/>
+          </p14:sldIdLst>
         </p14:section>
         <p14:section name="Over-Interpretations" id="{9711BCF0-0EF2-435D-A2E2-B5014891C597}">
           <p14:sldIdLst/>
         </p14:section>
       </p14:sectionLst>
+    </p:ext>
+    <p:ext uri="{EFAFB233-063F-42B5-8137-9DF3F51BA10A}">
+      <p15:sldGuideLst xmlns:p15="http://schemas.microsoft.com/office/powerpoint/2012/main"/>
     </p:ext>
   </p:extLst>
 </p:presentation>
@@ -294,7 +300,7 @@
           <a:p>
             <a:fld id="{673F8373-671D-44AA-9EC2-8110D5755A06}" type="datetimeFigureOut">
               <a:rPr lang="en-US" smtClean="0"/>
-              <a:t>12/8/2023</a:t>
+              <a:t>12/12/2023</a:t>
             </a:fld>
             <a:endParaRPr lang="en-US"/>
           </a:p>
@@ -492,7 +498,7 @@
           <a:p>
             <a:fld id="{673F8373-671D-44AA-9EC2-8110D5755A06}" type="datetimeFigureOut">
               <a:rPr lang="en-US" smtClean="0"/>
-              <a:t>12/8/2023</a:t>
+              <a:t>12/12/2023</a:t>
             </a:fld>
             <a:endParaRPr lang="en-US"/>
           </a:p>
@@ -700,7 +706,7 @@
           <a:p>
             <a:fld id="{673F8373-671D-44AA-9EC2-8110D5755A06}" type="datetimeFigureOut">
               <a:rPr lang="en-US" smtClean="0"/>
-              <a:t>12/8/2023</a:t>
+              <a:t>12/12/2023</a:t>
             </a:fld>
             <a:endParaRPr lang="en-US"/>
           </a:p>
@@ -898,7 +904,7 @@
           <a:p>
             <a:fld id="{673F8373-671D-44AA-9EC2-8110D5755A06}" type="datetimeFigureOut">
               <a:rPr lang="en-US" smtClean="0"/>
-              <a:t>12/8/2023</a:t>
+              <a:t>12/12/2023</a:t>
             </a:fld>
             <a:endParaRPr lang="en-US"/>
           </a:p>
@@ -1173,7 +1179,7 @@
           <a:p>
             <a:fld id="{673F8373-671D-44AA-9EC2-8110D5755A06}" type="datetimeFigureOut">
               <a:rPr lang="en-US" smtClean="0"/>
-              <a:t>12/8/2023</a:t>
+              <a:t>12/12/2023</a:t>
             </a:fld>
             <a:endParaRPr lang="en-US"/>
           </a:p>
@@ -1438,7 +1444,7 @@
           <a:p>
             <a:fld id="{673F8373-671D-44AA-9EC2-8110D5755A06}" type="datetimeFigureOut">
               <a:rPr lang="en-US" smtClean="0"/>
-              <a:t>12/8/2023</a:t>
+              <a:t>12/12/2023</a:t>
             </a:fld>
             <a:endParaRPr lang="en-US"/>
           </a:p>
@@ -1850,7 +1856,7 @@
           <a:p>
             <a:fld id="{673F8373-671D-44AA-9EC2-8110D5755A06}" type="datetimeFigureOut">
               <a:rPr lang="en-US" smtClean="0"/>
-              <a:t>12/8/2023</a:t>
+              <a:t>12/12/2023</a:t>
             </a:fld>
             <a:endParaRPr lang="en-US"/>
           </a:p>
@@ -1991,7 +1997,7 @@
           <a:p>
             <a:fld id="{673F8373-671D-44AA-9EC2-8110D5755A06}" type="datetimeFigureOut">
               <a:rPr lang="en-US" smtClean="0"/>
-              <a:t>12/8/2023</a:t>
+              <a:t>12/12/2023</a:t>
             </a:fld>
             <a:endParaRPr lang="en-US"/>
           </a:p>
@@ -2104,7 +2110,7 @@
           <a:p>
             <a:fld id="{673F8373-671D-44AA-9EC2-8110D5755A06}" type="datetimeFigureOut">
               <a:rPr lang="en-US" smtClean="0"/>
-              <a:t>12/8/2023</a:t>
+              <a:t>12/12/2023</a:t>
             </a:fld>
             <a:endParaRPr lang="en-US"/>
           </a:p>
@@ -2415,7 +2421,7 @@
           <a:p>
             <a:fld id="{673F8373-671D-44AA-9EC2-8110D5755A06}" type="datetimeFigureOut">
               <a:rPr lang="en-US" smtClean="0"/>
-              <a:t>12/8/2023</a:t>
+              <a:t>12/12/2023</a:t>
             </a:fld>
             <a:endParaRPr lang="en-US"/>
           </a:p>
@@ -2703,7 +2709,7 @@
           <a:p>
             <a:fld id="{673F8373-671D-44AA-9EC2-8110D5755A06}" type="datetimeFigureOut">
               <a:rPr lang="en-US" smtClean="0"/>
-              <a:t>12/8/2023</a:t>
+              <a:t>12/12/2023</a:t>
             </a:fld>
             <a:endParaRPr lang="en-US"/>
           </a:p>
@@ -2944,7 +2950,7 @@
           <a:p>
             <a:fld id="{673F8373-671D-44AA-9EC2-8110D5755A06}" type="datetimeFigureOut">
               <a:rPr lang="en-US" smtClean="0"/>
-              <a:t>12/8/2023</a:t>
+              <a:t>12/12/2023</a:t>
             </a:fld>
             <a:endParaRPr lang="en-US"/>
           </a:p>
@@ -3532,6 +3538,200 @@
 </p:sld>
 </file>
 
+<file path=ppt/slides/slide10.xml><?xml version="1.0" encoding="utf-8"?>
+<p:sld xmlns:a="http://schemas.openxmlformats.org/drawingml/2006/main" xmlns:r="http://schemas.openxmlformats.org/officeDocument/2006/relationships" xmlns:p="http://schemas.openxmlformats.org/presentationml/2006/main">
+  <p:cSld>
+    <p:spTree>
+      <p:nvGrpSpPr>
+        <p:cNvPr id="1" name=""/>
+        <p:cNvGrpSpPr/>
+        <p:nvPr/>
+      </p:nvGrpSpPr>
+      <p:grpSpPr>
+        <a:xfrm>
+          <a:off x="0" y="0"/>
+          <a:ext cx="0" cy="0"/>
+          <a:chOff x="0" y="0"/>
+          <a:chExt cx="0" cy="0"/>
+        </a:xfrm>
+      </p:grpSpPr>
+      <p:sp>
+        <p:nvSpPr>
+          <p:cNvPr id="2" name="Title 1">
+            <a:extLst>
+              <a:ext uri="{FF2B5EF4-FFF2-40B4-BE49-F238E27FC236}">
+                <a16:creationId xmlns:a16="http://schemas.microsoft.com/office/drawing/2014/main" id="{43AB76A5-DDCA-2DC9-EBD8-9B80787C8E1F}"/>
+              </a:ext>
+            </a:extLst>
+          </p:cNvPr>
+          <p:cNvSpPr>
+            <a:spLocks noGrp="1"/>
+          </p:cNvSpPr>
+          <p:nvPr>
+            <p:ph type="title"/>
+          </p:nvPr>
+        </p:nvSpPr>
+        <p:spPr/>
+        <p:txBody>
+          <a:bodyPr/>
+          <a:lstStyle/>
+          <a:p>
+            <a:r>
+              <a:rPr lang="en-US" dirty="0"/>
+              <a:t>4 circles paradox</a:t>
+            </a:r>
+          </a:p>
+        </p:txBody>
+      </p:sp>
+      <p:sp>
+        <p:nvSpPr>
+          <p:cNvPr id="11" name="Freeform: Shape 10">
+            <a:extLst>
+              <a:ext uri="{FF2B5EF4-FFF2-40B4-BE49-F238E27FC236}">
+                <a16:creationId xmlns:a16="http://schemas.microsoft.com/office/drawing/2014/main" id="{E033A28E-0C8A-AF71-25E9-358F61F4736E}"/>
+              </a:ext>
+            </a:extLst>
+          </p:cNvPr>
+          <p:cNvSpPr/>
+          <p:nvPr/>
+        </p:nvSpPr>
+        <p:spPr>
+          <a:xfrm>
+            <a:off x="6100644" y="1172419"/>
+            <a:ext cx="57134" cy="5673416"/>
+          </a:xfrm>
+          <a:custGeom>
+            <a:avLst/>
+            <a:gdLst>
+              <a:gd name="connsiteX0" fmla="*/ 0 w 57134"/>
+              <a:gd name="connsiteY0" fmla="*/ 5673417 h 5673416"/>
+              <a:gd name="connsiteX1" fmla="*/ 0 w 57134"/>
+              <a:gd name="connsiteY1" fmla="*/ 0 h 5673416"/>
+            </a:gdLst>
+            <a:ahLst/>
+            <a:cxnLst>
+              <a:cxn ang="0">
+                <a:pos x="connsiteX0" y="connsiteY0"/>
+              </a:cxn>
+              <a:cxn ang="0">
+                <a:pos x="connsiteX1" y="connsiteY1"/>
+              </a:cxn>
+            </a:cxnLst>
+            <a:rect l="l" t="t" r="r" b="b"/>
+            <a:pathLst>
+              <a:path w="57134" h="5673416">
+                <a:moveTo>
+                  <a:pt x="0" y="5673417"/>
+                </a:moveTo>
+                <a:lnTo>
+                  <a:pt x="0" y="0"/>
+                </a:lnTo>
+              </a:path>
+            </a:pathLst>
+          </a:custGeom>
+          <a:solidFill>
+            <a:srgbClr val="000000">
+              <a:alpha val="50000"/>
+            </a:srgbClr>
+          </a:solidFill>
+          <a:ln w="34233" cap="sq">
+            <a:solidFill>
+              <a:srgbClr val="000000"/>
+            </a:solidFill>
+            <a:prstDash val="solid"/>
+            <a:miter/>
+            <a:tailEnd type="arrow"/>
+          </a:ln>
+        </p:spPr>
+        <p:txBody>
+          <a:bodyPr rtlCol="0" anchor="ctr"/>
+          <a:lstStyle/>
+          <a:p>
+            <a:endParaRPr lang="en-US"/>
+          </a:p>
+        </p:txBody>
+      </p:sp>
+      <p:sp>
+        <p:nvSpPr>
+          <p:cNvPr id="12" name="Freeform: Shape 11">
+            <a:extLst>
+              <a:ext uri="{FF2B5EF4-FFF2-40B4-BE49-F238E27FC236}">
+                <a16:creationId xmlns:a16="http://schemas.microsoft.com/office/drawing/2014/main" id="{AF57F973-4873-579E-B69C-60C91206DBB9}"/>
+              </a:ext>
+            </a:extLst>
+          </p:cNvPr>
+          <p:cNvSpPr/>
+          <p:nvPr/>
+        </p:nvSpPr>
+        <p:spPr>
+          <a:xfrm>
+            <a:off x="3243940" y="3989130"/>
+            <a:ext cx="5673416" cy="57134"/>
+          </a:xfrm>
+          <a:custGeom>
+            <a:avLst/>
+            <a:gdLst>
+              <a:gd name="connsiteX0" fmla="*/ 0 w 5673416"/>
+              <a:gd name="connsiteY0" fmla="*/ 0 h 57134"/>
+              <a:gd name="connsiteX1" fmla="*/ 5673417 w 5673416"/>
+              <a:gd name="connsiteY1" fmla="*/ 0 h 57134"/>
+            </a:gdLst>
+            <a:ahLst/>
+            <a:cxnLst>
+              <a:cxn ang="0">
+                <a:pos x="connsiteX0" y="connsiteY0"/>
+              </a:cxn>
+              <a:cxn ang="0">
+                <a:pos x="connsiteX1" y="connsiteY1"/>
+              </a:cxn>
+            </a:cxnLst>
+            <a:rect l="l" t="t" r="r" b="b"/>
+            <a:pathLst>
+              <a:path w="5673416" h="57134">
+                <a:moveTo>
+                  <a:pt x="0" y="0"/>
+                </a:moveTo>
+                <a:lnTo>
+                  <a:pt x="5673417" y="0"/>
+                </a:lnTo>
+              </a:path>
+            </a:pathLst>
+          </a:custGeom>
+          <a:solidFill>
+            <a:srgbClr val="000000">
+              <a:alpha val="50000"/>
+            </a:srgbClr>
+          </a:solidFill>
+          <a:ln w="34233" cap="sq">
+            <a:solidFill>
+              <a:srgbClr val="000000"/>
+            </a:solidFill>
+            <a:prstDash val="solid"/>
+            <a:miter/>
+            <a:tailEnd type="arrow"/>
+          </a:ln>
+        </p:spPr>
+        <p:txBody>
+          <a:bodyPr rtlCol="0" anchor="ctr"/>
+          <a:lstStyle/>
+          <a:p>
+            <a:endParaRPr lang="en-US"/>
+          </a:p>
+        </p:txBody>
+      </p:sp>
+    </p:spTree>
+    <p:extLst>
+      <p:ext uri="{BB962C8B-B14F-4D97-AF65-F5344CB8AC3E}">
+        <p14:creationId xmlns:p14="http://schemas.microsoft.com/office/powerpoint/2010/main" val="2072907754"/>
+      </p:ext>
+    </p:extLst>
+  </p:cSld>
+  <p:clrMapOvr>
+    <a:masterClrMapping/>
+  </p:clrMapOvr>
+</p:sld>
+</file>
+
 <file path=ppt/slides/slide2.xml><?xml version="1.0" encoding="utf-8"?>
 <p:sld xmlns:a="http://schemas.openxmlformats.org/drawingml/2006/main" xmlns:r="http://schemas.openxmlformats.org/officeDocument/2006/relationships" xmlns:p="http://schemas.openxmlformats.org/presentationml/2006/main">
   <p:cSld>
@@ -4027,13 +4227,13 @@
   <p:clrMapOvr>
     <a:masterClrMapping/>
   </p:clrMapOvr>
-  <mc:AlternateContent xmlns:mc="http://schemas.openxmlformats.org/markup-compatibility/2006">
-    <mc:Choice xmlns:p14="http://schemas.microsoft.com/office/powerpoint/2010/main" Requires="p14">
+  <mc:AlternateContent xmlns:mc="http://schemas.openxmlformats.org/markup-compatibility/2006" xmlns:p14="http://schemas.microsoft.com/office/powerpoint/2010/main">
+    <mc:Choice Requires="p14">
       <p:transition spd="med" p14:dur="700">
         <p:fade/>
       </p:transition>
     </mc:Choice>
-    <mc:Fallback>
+    <mc:Fallback xmlns="">
       <p:transition spd="med">
         <p:fade/>
       </p:transition>
@@ -4160,13 +4360,13 @@
   <p:clrMapOvr>
     <a:masterClrMapping/>
   </p:clrMapOvr>
-  <mc:AlternateContent xmlns:mc="http://schemas.openxmlformats.org/markup-compatibility/2006">
-    <mc:Choice xmlns:p14="http://schemas.microsoft.com/office/powerpoint/2010/main" Requires="p14">
+  <mc:AlternateContent xmlns:mc="http://schemas.openxmlformats.org/markup-compatibility/2006" xmlns:p14="http://schemas.microsoft.com/office/powerpoint/2010/main">
+    <mc:Choice Requires="p14">
       <p:transition spd="med" p14:dur="700">
         <p:fade/>
       </p:transition>
     </mc:Choice>
-    <mc:Fallback>
+    <mc:Fallback xmlns="">
       <p:transition spd="med">
         <p:fade/>
       </p:transition>
@@ -4293,13 +4493,13 @@
   <p:clrMapOvr>
     <a:masterClrMapping/>
   </p:clrMapOvr>
-  <mc:AlternateContent xmlns:mc="http://schemas.openxmlformats.org/markup-compatibility/2006">
-    <mc:Choice xmlns:p14="http://schemas.microsoft.com/office/powerpoint/2010/main" Requires="p14">
+  <mc:AlternateContent xmlns:mc="http://schemas.openxmlformats.org/markup-compatibility/2006" xmlns:p14="http://schemas.microsoft.com/office/powerpoint/2010/main">
+    <mc:Choice Requires="p14">
       <p:transition spd="med" p14:dur="700">
         <p:fade/>
       </p:transition>
     </mc:Choice>
-    <mc:Fallback>
+    <mc:Fallback xmlns="">
       <p:transition spd="med">
         <p:fade/>
       </p:transition>

</xml_diff>

<commit_message>
4 circles paradox: square
</commit_message>
<xml_diff>
--- a/slides_x_mas_2023.pptx
+++ b/slides_x_mas_2023.pptx
@@ -15,6 +15,7 @@
     <p:sldId id="266" r:id="rId9"/>
     <p:sldId id="267" r:id="rId10"/>
     <p:sldId id="268" r:id="rId11"/>
+    <p:sldId id="272" r:id="rId12"/>
   </p:sldIdLst>
   <p:sldSz cx="12192000" cy="6858000"/>
   <p:notesSz cx="6858000" cy="9144000"/>
@@ -139,6 +140,7 @@
         <p14:section name="Paradoxical" id="{E2223571-FAC5-4589-B421-244975766BB0}">
           <p14:sldIdLst>
             <p14:sldId id="268"/>
+            <p14:sldId id="272"/>
           </p14:sldIdLst>
         </p14:section>
         <p14:section name="Over-Interpretations" id="{9711BCF0-0EF2-435D-A2E2-B5014891C597}">
@@ -3732,6 +3734,645 @@
 </p:sld>
 </file>
 
+<file path=ppt/slides/slide11.xml><?xml version="1.0" encoding="utf-8"?>
+<p:sld xmlns:a="http://schemas.openxmlformats.org/drawingml/2006/main" xmlns:r="http://schemas.openxmlformats.org/officeDocument/2006/relationships" xmlns:p="http://schemas.openxmlformats.org/presentationml/2006/main">
+  <p:cSld>
+    <p:spTree>
+      <p:nvGrpSpPr>
+        <p:cNvPr id="1" name=""/>
+        <p:cNvGrpSpPr/>
+        <p:nvPr/>
+      </p:nvGrpSpPr>
+      <p:grpSpPr>
+        <a:xfrm>
+          <a:off x="0" y="0"/>
+          <a:ext cx="0" cy="0"/>
+          <a:chOff x="0" y="0"/>
+          <a:chExt cx="0" cy="0"/>
+        </a:xfrm>
+      </p:grpSpPr>
+      <p:sp>
+        <p:nvSpPr>
+          <p:cNvPr id="2" name="Title 1">
+            <a:extLst>
+              <a:ext uri="{FF2B5EF4-FFF2-40B4-BE49-F238E27FC236}">
+                <a16:creationId xmlns:a16="http://schemas.microsoft.com/office/drawing/2014/main" id="{43AB76A5-DDCA-2DC9-EBD8-9B80787C8E1F}"/>
+              </a:ext>
+            </a:extLst>
+          </p:cNvPr>
+          <p:cNvSpPr>
+            <a:spLocks noGrp="1"/>
+          </p:cNvSpPr>
+          <p:nvPr>
+            <p:ph type="title"/>
+          </p:nvPr>
+        </p:nvSpPr>
+        <p:spPr/>
+        <p:txBody>
+          <a:bodyPr/>
+          <a:lstStyle/>
+          <a:p>
+            <a:r>
+              <a:rPr lang="en-US" dirty="0"/>
+              <a:t>4 circles paradox</a:t>
+            </a:r>
+          </a:p>
+        </p:txBody>
+      </p:sp>
+      <p:sp>
+        <p:nvSpPr>
+          <p:cNvPr id="11" name="Freeform: Shape 10">
+            <a:extLst>
+              <a:ext uri="{FF2B5EF4-FFF2-40B4-BE49-F238E27FC236}">
+                <a16:creationId xmlns:a16="http://schemas.microsoft.com/office/drawing/2014/main" id="{E033A28E-0C8A-AF71-25E9-358F61F4736E}"/>
+              </a:ext>
+            </a:extLst>
+          </p:cNvPr>
+          <p:cNvSpPr/>
+          <p:nvPr/>
+        </p:nvSpPr>
+        <p:spPr>
+          <a:xfrm>
+            <a:off x="6100644" y="1172419"/>
+            <a:ext cx="57134" cy="5673416"/>
+          </a:xfrm>
+          <a:custGeom>
+            <a:avLst/>
+            <a:gdLst>
+              <a:gd name="connsiteX0" fmla="*/ 0 w 57134"/>
+              <a:gd name="connsiteY0" fmla="*/ 5673417 h 5673416"/>
+              <a:gd name="connsiteX1" fmla="*/ 0 w 57134"/>
+              <a:gd name="connsiteY1" fmla="*/ 0 h 5673416"/>
+            </a:gdLst>
+            <a:ahLst/>
+            <a:cxnLst>
+              <a:cxn ang="0">
+                <a:pos x="connsiteX0" y="connsiteY0"/>
+              </a:cxn>
+              <a:cxn ang="0">
+                <a:pos x="connsiteX1" y="connsiteY1"/>
+              </a:cxn>
+            </a:cxnLst>
+            <a:rect l="l" t="t" r="r" b="b"/>
+            <a:pathLst>
+              <a:path w="57134" h="5673416">
+                <a:moveTo>
+                  <a:pt x="0" y="5673417"/>
+                </a:moveTo>
+                <a:lnTo>
+                  <a:pt x="0" y="0"/>
+                </a:lnTo>
+              </a:path>
+            </a:pathLst>
+          </a:custGeom>
+          <a:solidFill>
+            <a:srgbClr val="000000">
+              <a:alpha val="50000"/>
+            </a:srgbClr>
+          </a:solidFill>
+          <a:ln w="34233" cap="sq">
+            <a:solidFill>
+              <a:srgbClr val="000000"/>
+            </a:solidFill>
+            <a:prstDash val="solid"/>
+            <a:miter/>
+            <a:tailEnd type="arrow"/>
+          </a:ln>
+        </p:spPr>
+        <p:txBody>
+          <a:bodyPr rtlCol="0" anchor="ctr"/>
+          <a:lstStyle/>
+          <a:p>
+            <a:endParaRPr lang="en-US"/>
+          </a:p>
+        </p:txBody>
+      </p:sp>
+      <p:sp>
+        <p:nvSpPr>
+          <p:cNvPr id="12" name="Freeform: Shape 11">
+            <a:extLst>
+              <a:ext uri="{FF2B5EF4-FFF2-40B4-BE49-F238E27FC236}">
+                <a16:creationId xmlns:a16="http://schemas.microsoft.com/office/drawing/2014/main" id="{AF57F973-4873-579E-B69C-60C91206DBB9}"/>
+              </a:ext>
+            </a:extLst>
+          </p:cNvPr>
+          <p:cNvSpPr/>
+          <p:nvPr/>
+        </p:nvSpPr>
+        <p:spPr>
+          <a:xfrm>
+            <a:off x="3243940" y="3989130"/>
+            <a:ext cx="5673416" cy="57134"/>
+          </a:xfrm>
+          <a:custGeom>
+            <a:avLst/>
+            <a:gdLst>
+              <a:gd name="connsiteX0" fmla="*/ 0 w 5673416"/>
+              <a:gd name="connsiteY0" fmla="*/ 0 h 57134"/>
+              <a:gd name="connsiteX1" fmla="*/ 5673417 w 5673416"/>
+              <a:gd name="connsiteY1" fmla="*/ 0 h 57134"/>
+            </a:gdLst>
+            <a:ahLst/>
+            <a:cxnLst>
+              <a:cxn ang="0">
+                <a:pos x="connsiteX0" y="connsiteY0"/>
+              </a:cxn>
+              <a:cxn ang="0">
+                <a:pos x="connsiteX1" y="connsiteY1"/>
+              </a:cxn>
+            </a:cxnLst>
+            <a:rect l="l" t="t" r="r" b="b"/>
+            <a:pathLst>
+              <a:path w="5673416" h="57134">
+                <a:moveTo>
+                  <a:pt x="0" y="0"/>
+                </a:moveTo>
+                <a:lnTo>
+                  <a:pt x="5673417" y="0"/>
+                </a:lnTo>
+              </a:path>
+            </a:pathLst>
+          </a:custGeom>
+          <a:solidFill>
+            <a:srgbClr val="000000">
+              <a:alpha val="50000"/>
+            </a:srgbClr>
+          </a:solidFill>
+          <a:ln w="34233" cap="sq">
+            <a:solidFill>
+              <a:srgbClr val="000000"/>
+            </a:solidFill>
+            <a:prstDash val="solid"/>
+            <a:miter/>
+            <a:tailEnd type="arrow"/>
+          </a:ln>
+        </p:spPr>
+        <p:txBody>
+          <a:bodyPr rtlCol="0" anchor="ctr"/>
+          <a:lstStyle/>
+          <a:p>
+            <a:endParaRPr lang="en-US"/>
+          </a:p>
+        </p:txBody>
+      </p:sp>
+      <p:sp>
+        <p:nvSpPr>
+          <p:cNvPr id="17" name="Freeform: Shape 16">
+            <a:extLst>
+              <a:ext uri="{FF2B5EF4-FFF2-40B4-BE49-F238E27FC236}">
+                <a16:creationId xmlns:a16="http://schemas.microsoft.com/office/drawing/2014/main" id="{B27FA6BC-CF38-97C4-A294-8716A7C43D75}"/>
+              </a:ext>
+            </a:extLst>
+          </p:cNvPr>
+          <p:cNvSpPr/>
+          <p:nvPr/>
+        </p:nvSpPr>
+        <p:spPr>
+          <a:xfrm>
+            <a:off x="3772431" y="1660916"/>
+            <a:ext cx="4656430" cy="4656430"/>
+          </a:xfrm>
+          <a:custGeom>
+            <a:avLst/>
+            <a:gdLst>
+              <a:gd name="connsiteX0" fmla="*/ 0 w 4656430"/>
+              <a:gd name="connsiteY0" fmla="*/ 0 h 4656430"/>
+              <a:gd name="connsiteX1" fmla="*/ 4656431 w 4656430"/>
+              <a:gd name="connsiteY1" fmla="*/ 0 h 4656430"/>
+              <a:gd name="connsiteX2" fmla="*/ 4656431 w 4656430"/>
+              <a:gd name="connsiteY2" fmla="*/ 4656431 h 4656430"/>
+              <a:gd name="connsiteX3" fmla="*/ 0 w 4656430"/>
+              <a:gd name="connsiteY3" fmla="*/ 4656431 h 4656430"/>
+            </a:gdLst>
+            <a:ahLst/>
+            <a:cxnLst>
+              <a:cxn ang="0">
+                <a:pos x="connsiteX0" y="connsiteY0"/>
+              </a:cxn>
+              <a:cxn ang="0">
+                <a:pos x="connsiteX1" y="connsiteY1"/>
+              </a:cxn>
+              <a:cxn ang="0">
+                <a:pos x="connsiteX2" y="connsiteY2"/>
+              </a:cxn>
+              <a:cxn ang="0">
+                <a:pos x="connsiteX3" y="connsiteY3"/>
+              </a:cxn>
+            </a:cxnLst>
+            <a:rect l="l" t="t" r="r" b="b"/>
+            <a:pathLst>
+              <a:path w="4656430" h="4656430">
+                <a:moveTo>
+                  <a:pt x="0" y="0"/>
+                </a:moveTo>
+                <a:lnTo>
+                  <a:pt x="4656431" y="0"/>
+                </a:lnTo>
+                <a:lnTo>
+                  <a:pt x="4656431" y="4656431"/>
+                </a:lnTo>
+                <a:lnTo>
+                  <a:pt x="0" y="4656431"/>
+                </a:lnTo>
+                <a:close/>
+              </a:path>
+            </a:pathLst>
+          </a:custGeom>
+          <a:noFill/>
+          <a:ln w="57055" cap="rnd">
+            <a:solidFill>
+              <a:srgbClr val="5AA02C"/>
+            </a:solidFill>
+            <a:prstDash val="solid"/>
+            <a:miter/>
+          </a:ln>
+        </p:spPr>
+        <p:txBody>
+          <a:bodyPr rtlCol="0" anchor="ctr"/>
+          <a:lstStyle/>
+          <a:p>
+            <a:endParaRPr lang="en-US"/>
+          </a:p>
+        </p:txBody>
+      </p:sp>
+      <p:sp>
+        <p:nvSpPr>
+          <p:cNvPr id="3" name="TextBox 2">
+            <a:extLst>
+              <a:ext uri="{FF2B5EF4-FFF2-40B4-BE49-F238E27FC236}">
+                <a16:creationId xmlns:a16="http://schemas.microsoft.com/office/drawing/2014/main" id="{4CEE73D8-6E14-CDCF-430A-84F6B51DA367}"/>
+              </a:ext>
+            </a:extLst>
+          </p:cNvPr>
+          <p:cNvSpPr txBox="1"/>
+          <p:nvPr/>
+        </p:nvSpPr>
+        <p:spPr>
+          <a:xfrm>
+            <a:off x="8485991" y="1221938"/>
+            <a:ext cx="867545" cy="523220"/>
+          </a:xfrm>
+          <a:prstGeom prst="rect">
+            <a:avLst/>
+          </a:prstGeom>
+          <a:noFill/>
+        </p:spPr>
+        <p:txBody>
+          <a:bodyPr wrap="none" rtlCol="0">
+            <a:spAutoFit/>
+          </a:bodyPr>
+          <a:lstStyle/>
+          <a:p>
+            <a:r>
+              <a:rPr lang="en-US" sz="2800" b="1" dirty="0">
+                <a:solidFill>
+                  <a:srgbClr val="5AA02C"/>
+                </a:solidFill>
+              </a:rPr>
+              <a:t>(2,2)</a:t>
+            </a:r>
+          </a:p>
+        </p:txBody>
+      </p:sp>
+      <p:sp>
+        <p:nvSpPr>
+          <p:cNvPr id="4" name="TextBox 3">
+            <a:extLst>
+              <a:ext uri="{FF2B5EF4-FFF2-40B4-BE49-F238E27FC236}">
+                <a16:creationId xmlns:a16="http://schemas.microsoft.com/office/drawing/2014/main" id="{B2BE5C75-FC1C-0285-4A5C-22FB5FF69C3C}"/>
+              </a:ext>
+            </a:extLst>
+          </p:cNvPr>
+          <p:cNvSpPr txBox="1"/>
+          <p:nvPr/>
+        </p:nvSpPr>
+        <p:spPr>
+          <a:xfrm>
+            <a:off x="8485991" y="6083096"/>
+            <a:ext cx="978153" cy="523220"/>
+          </a:xfrm>
+          <a:prstGeom prst="rect">
+            <a:avLst/>
+          </a:prstGeom>
+          <a:noFill/>
+        </p:spPr>
+        <p:txBody>
+          <a:bodyPr wrap="none" rtlCol="0">
+            <a:spAutoFit/>
+          </a:bodyPr>
+          <a:lstStyle/>
+          <a:p>
+            <a:r>
+              <a:rPr lang="en-US" sz="2800" b="1" dirty="0">
+                <a:solidFill>
+                  <a:srgbClr val="5AA02C"/>
+                </a:solidFill>
+              </a:rPr>
+              <a:t>(2,-2)</a:t>
+            </a:r>
+          </a:p>
+        </p:txBody>
+      </p:sp>
+      <p:sp>
+        <p:nvSpPr>
+          <p:cNvPr id="5" name="TextBox 4">
+            <a:extLst>
+              <a:ext uri="{FF2B5EF4-FFF2-40B4-BE49-F238E27FC236}">
+                <a16:creationId xmlns:a16="http://schemas.microsoft.com/office/drawing/2014/main" id="{C02B12DB-7192-8DD9-89CF-67119D99014F}"/>
+              </a:ext>
+            </a:extLst>
+          </p:cNvPr>
+          <p:cNvSpPr txBox="1"/>
+          <p:nvPr/>
+        </p:nvSpPr>
+        <p:spPr>
+          <a:xfrm>
+            <a:off x="2794278" y="1221938"/>
+            <a:ext cx="978153" cy="523220"/>
+          </a:xfrm>
+          <a:prstGeom prst="rect">
+            <a:avLst/>
+          </a:prstGeom>
+          <a:noFill/>
+        </p:spPr>
+        <p:txBody>
+          <a:bodyPr wrap="none" rtlCol="0">
+            <a:spAutoFit/>
+          </a:bodyPr>
+          <a:lstStyle/>
+          <a:p>
+            <a:r>
+              <a:rPr lang="en-US" sz="2800" b="1" dirty="0">
+                <a:solidFill>
+                  <a:srgbClr val="5AA02C"/>
+                </a:solidFill>
+              </a:rPr>
+              <a:t>(-2,2)</a:t>
+            </a:r>
+          </a:p>
+        </p:txBody>
+      </p:sp>
+      <p:sp>
+        <p:nvSpPr>
+          <p:cNvPr id="6" name="TextBox 5">
+            <a:extLst>
+              <a:ext uri="{FF2B5EF4-FFF2-40B4-BE49-F238E27FC236}">
+                <a16:creationId xmlns:a16="http://schemas.microsoft.com/office/drawing/2014/main" id="{5465E91C-816D-8080-D54D-B7802BDF925B}"/>
+              </a:ext>
+            </a:extLst>
+          </p:cNvPr>
+          <p:cNvSpPr txBox="1"/>
+          <p:nvPr/>
+        </p:nvSpPr>
+        <p:spPr>
+          <a:xfrm>
+            <a:off x="2683671" y="6083096"/>
+            <a:ext cx="1088760" cy="523220"/>
+          </a:xfrm>
+          <a:prstGeom prst="rect">
+            <a:avLst/>
+          </a:prstGeom>
+          <a:noFill/>
+        </p:spPr>
+        <p:txBody>
+          <a:bodyPr wrap="none" rtlCol="0">
+            <a:spAutoFit/>
+          </a:bodyPr>
+          <a:lstStyle/>
+          <a:p>
+            <a:r>
+              <a:rPr lang="en-US" sz="2800" b="1" dirty="0">
+                <a:solidFill>
+                  <a:srgbClr val="5AA02C"/>
+                </a:solidFill>
+              </a:rPr>
+              <a:t>(-2,-2)</a:t>
+            </a:r>
+          </a:p>
+        </p:txBody>
+      </p:sp>
+    </p:spTree>
+    <p:extLst>
+      <p:ext uri="{BB962C8B-B14F-4D97-AF65-F5344CB8AC3E}">
+        <p14:creationId xmlns:p14="http://schemas.microsoft.com/office/powerpoint/2010/main" val="1121042291"/>
+      </p:ext>
+    </p:extLst>
+  </p:cSld>
+  <p:clrMapOvr>
+    <a:masterClrMapping/>
+  </p:clrMapOvr>
+  <mc:AlternateContent xmlns:mc="http://schemas.openxmlformats.org/markup-compatibility/2006">
+    <mc:Choice xmlns:p14="http://schemas.microsoft.com/office/powerpoint/2010/main" Requires="p14">
+      <p:transition spd="med" p14:dur="700">
+        <p:fade/>
+      </p:transition>
+    </mc:Choice>
+    <mc:Fallback>
+      <p:transition spd="med">
+        <p:fade/>
+      </p:transition>
+    </mc:Fallback>
+  </mc:AlternateContent>
+  <p:timing>
+    <p:tnLst>
+      <p:par>
+        <p:cTn id="1" dur="indefinite" restart="never" nodeType="tmRoot">
+          <p:childTnLst>
+            <p:seq concurrent="1" nextAc="seek">
+              <p:cTn id="2" dur="indefinite" nodeType="mainSeq">
+                <p:childTnLst>
+                  <p:par>
+                    <p:cTn id="3" fill="hold">
+                      <p:stCondLst>
+                        <p:cond delay="indefinite"/>
+                        <p:cond evt="onBegin" delay="0">
+                          <p:tn val="2"/>
+                        </p:cond>
+                      </p:stCondLst>
+                      <p:childTnLst>
+                        <p:par>
+                          <p:cTn id="4" fill="hold">
+                            <p:stCondLst>
+                              <p:cond delay="0"/>
+                            </p:stCondLst>
+                            <p:childTnLst>
+                              <p:par>
+                                <p:cTn id="5" presetID="10" presetClass="entr" presetSubtype="0" fill="hold" grpId="0" nodeType="afterEffect">
+                                  <p:stCondLst>
+                                    <p:cond delay="0"/>
+                                  </p:stCondLst>
+                                  <p:childTnLst>
+                                    <p:set>
+                                      <p:cBhvr>
+                                        <p:cTn id="6" dur="1" fill="hold">
+                                          <p:stCondLst>
+                                            <p:cond delay="0"/>
+                                          </p:stCondLst>
+                                        </p:cTn>
+                                        <p:tgtEl>
+                                          <p:spTgt spid="3"/>
+                                        </p:tgtEl>
+                                        <p:attrNameLst>
+                                          <p:attrName>style.visibility</p:attrName>
+                                        </p:attrNameLst>
+                                      </p:cBhvr>
+                                      <p:to>
+                                        <p:strVal val="visible"/>
+                                      </p:to>
+                                    </p:set>
+                                    <p:animEffect transition="in" filter="fade">
+                                      <p:cBhvr>
+                                        <p:cTn id="7" dur="500"/>
+                                        <p:tgtEl>
+                                          <p:spTgt spid="3"/>
+                                        </p:tgtEl>
+                                      </p:cBhvr>
+                                    </p:animEffect>
+                                  </p:childTnLst>
+                                </p:cTn>
+                              </p:par>
+                              <p:par>
+                                <p:cTn id="8" presetID="10" presetClass="entr" presetSubtype="0" fill="hold" grpId="0" nodeType="withEffect">
+                                  <p:stCondLst>
+                                    <p:cond delay="0"/>
+                                  </p:stCondLst>
+                                  <p:childTnLst>
+                                    <p:set>
+                                      <p:cBhvr>
+                                        <p:cTn id="9" dur="1" fill="hold">
+                                          <p:stCondLst>
+                                            <p:cond delay="0"/>
+                                          </p:stCondLst>
+                                        </p:cTn>
+                                        <p:tgtEl>
+                                          <p:spTgt spid="4"/>
+                                        </p:tgtEl>
+                                        <p:attrNameLst>
+                                          <p:attrName>style.visibility</p:attrName>
+                                        </p:attrNameLst>
+                                      </p:cBhvr>
+                                      <p:to>
+                                        <p:strVal val="visible"/>
+                                      </p:to>
+                                    </p:set>
+                                    <p:animEffect transition="in" filter="fade">
+                                      <p:cBhvr>
+                                        <p:cTn id="10" dur="500"/>
+                                        <p:tgtEl>
+                                          <p:spTgt spid="4"/>
+                                        </p:tgtEl>
+                                      </p:cBhvr>
+                                    </p:animEffect>
+                                  </p:childTnLst>
+                                </p:cTn>
+                              </p:par>
+                              <p:par>
+                                <p:cTn id="11" presetID="10" presetClass="entr" presetSubtype="0" fill="hold" grpId="0" nodeType="withEffect">
+                                  <p:stCondLst>
+                                    <p:cond delay="0"/>
+                                  </p:stCondLst>
+                                  <p:childTnLst>
+                                    <p:set>
+                                      <p:cBhvr>
+                                        <p:cTn id="12" dur="1" fill="hold">
+                                          <p:stCondLst>
+                                            <p:cond delay="0"/>
+                                          </p:stCondLst>
+                                        </p:cTn>
+                                        <p:tgtEl>
+                                          <p:spTgt spid="6"/>
+                                        </p:tgtEl>
+                                        <p:attrNameLst>
+                                          <p:attrName>style.visibility</p:attrName>
+                                        </p:attrNameLst>
+                                      </p:cBhvr>
+                                      <p:to>
+                                        <p:strVal val="visible"/>
+                                      </p:to>
+                                    </p:set>
+                                    <p:animEffect transition="in" filter="fade">
+                                      <p:cBhvr>
+                                        <p:cTn id="13" dur="500"/>
+                                        <p:tgtEl>
+                                          <p:spTgt spid="6"/>
+                                        </p:tgtEl>
+                                      </p:cBhvr>
+                                    </p:animEffect>
+                                  </p:childTnLst>
+                                </p:cTn>
+                              </p:par>
+                              <p:par>
+                                <p:cTn id="14" presetID="10" presetClass="entr" presetSubtype="0" fill="hold" grpId="0" nodeType="withEffect">
+                                  <p:stCondLst>
+                                    <p:cond delay="0"/>
+                                  </p:stCondLst>
+                                  <p:childTnLst>
+                                    <p:set>
+                                      <p:cBhvr>
+                                        <p:cTn id="15" dur="1" fill="hold">
+                                          <p:stCondLst>
+                                            <p:cond delay="0"/>
+                                          </p:stCondLst>
+                                        </p:cTn>
+                                        <p:tgtEl>
+                                          <p:spTgt spid="5"/>
+                                        </p:tgtEl>
+                                        <p:attrNameLst>
+                                          <p:attrName>style.visibility</p:attrName>
+                                        </p:attrNameLst>
+                                      </p:cBhvr>
+                                      <p:to>
+                                        <p:strVal val="visible"/>
+                                      </p:to>
+                                    </p:set>
+                                    <p:animEffect transition="in" filter="fade">
+                                      <p:cBhvr>
+                                        <p:cTn id="16" dur="500"/>
+                                        <p:tgtEl>
+                                          <p:spTgt spid="5"/>
+                                        </p:tgtEl>
+                                      </p:cBhvr>
+                                    </p:animEffect>
+                                  </p:childTnLst>
+                                </p:cTn>
+                              </p:par>
+                            </p:childTnLst>
+                          </p:cTn>
+                        </p:par>
+                      </p:childTnLst>
+                    </p:cTn>
+                  </p:par>
+                </p:childTnLst>
+              </p:cTn>
+              <p:prevCondLst>
+                <p:cond evt="onPrev" delay="0">
+                  <p:tgtEl>
+                    <p:sldTgt/>
+                  </p:tgtEl>
+                </p:cond>
+              </p:prevCondLst>
+              <p:nextCondLst>
+                <p:cond evt="onNext" delay="0">
+                  <p:tgtEl>
+                    <p:sldTgt/>
+                  </p:tgtEl>
+                </p:cond>
+              </p:nextCondLst>
+            </p:seq>
+          </p:childTnLst>
+        </p:cTn>
+      </p:par>
+    </p:tnLst>
+    <p:bldLst>
+      <p:bldP spid="3" grpId="0"/>
+      <p:bldP spid="4" grpId="0"/>
+      <p:bldP spid="5" grpId="0"/>
+      <p:bldP spid="6" grpId="0"/>
+    </p:bldLst>
+  </p:timing>
+</p:sld>
+</file>
+
 <file path=ppt/slides/slide2.xml><?xml version="1.0" encoding="utf-8"?>
 <p:sld xmlns:a="http://schemas.openxmlformats.org/drawingml/2006/main" xmlns:r="http://schemas.openxmlformats.org/officeDocument/2006/relationships" xmlns:p="http://schemas.openxmlformats.org/presentationml/2006/main">
   <p:cSld>

</xml_diff>

<commit_message>
4 circles paradox: circles
</commit_message>
<xml_diff>
--- a/slides_x_mas_2023.pptx
+++ b/slides_x_mas_2023.pptx
@@ -16,6 +16,7 @@
     <p:sldId id="267" r:id="rId10"/>
     <p:sldId id="268" r:id="rId11"/>
     <p:sldId id="272" r:id="rId12"/>
+    <p:sldId id="273" r:id="rId13"/>
   </p:sldIdLst>
   <p:sldSz cx="12192000" cy="6858000"/>
   <p:notesSz cx="6858000" cy="9144000"/>
@@ -141,6 +142,7 @@
           <p14:sldIdLst>
             <p14:sldId id="268"/>
             <p14:sldId id="272"/>
+            <p14:sldId id="273"/>
           </p14:sldIdLst>
         </p14:section>
         <p14:section name="Over-Interpretations" id="{9711BCF0-0EF2-435D-A2E2-B5014891C597}">
@@ -4373,6 +4375,1917 @@
 </p:sld>
 </file>
 
+<file path=ppt/slides/slide12.xml><?xml version="1.0" encoding="utf-8"?>
+<p:sld xmlns:a="http://schemas.openxmlformats.org/drawingml/2006/main" xmlns:r="http://schemas.openxmlformats.org/officeDocument/2006/relationships" xmlns:p="http://schemas.openxmlformats.org/presentationml/2006/main">
+  <p:cSld>
+    <p:spTree>
+      <p:nvGrpSpPr>
+        <p:cNvPr id="1" name=""/>
+        <p:cNvGrpSpPr/>
+        <p:nvPr/>
+      </p:nvGrpSpPr>
+      <p:grpSpPr>
+        <a:xfrm>
+          <a:off x="0" y="0"/>
+          <a:ext cx="0" cy="0"/>
+          <a:chOff x="0" y="0"/>
+          <a:chExt cx="0" cy="0"/>
+        </a:xfrm>
+      </p:grpSpPr>
+      <p:sp>
+        <p:nvSpPr>
+          <p:cNvPr id="2" name="Title 1">
+            <a:extLst>
+              <a:ext uri="{FF2B5EF4-FFF2-40B4-BE49-F238E27FC236}">
+                <a16:creationId xmlns:a16="http://schemas.microsoft.com/office/drawing/2014/main" id="{43AB76A5-DDCA-2DC9-EBD8-9B80787C8E1F}"/>
+              </a:ext>
+            </a:extLst>
+          </p:cNvPr>
+          <p:cNvSpPr>
+            <a:spLocks noGrp="1"/>
+          </p:cNvSpPr>
+          <p:nvPr>
+            <p:ph type="title"/>
+          </p:nvPr>
+        </p:nvSpPr>
+        <p:spPr/>
+        <p:txBody>
+          <a:bodyPr/>
+          <a:lstStyle/>
+          <a:p>
+            <a:r>
+              <a:rPr lang="en-US" dirty="0"/>
+              <a:t>4 circles paradox</a:t>
+            </a:r>
+          </a:p>
+        </p:txBody>
+      </p:sp>
+      <p:sp>
+        <p:nvSpPr>
+          <p:cNvPr id="11" name="Freeform: Shape 10">
+            <a:extLst>
+              <a:ext uri="{FF2B5EF4-FFF2-40B4-BE49-F238E27FC236}">
+                <a16:creationId xmlns:a16="http://schemas.microsoft.com/office/drawing/2014/main" id="{E033A28E-0C8A-AF71-25E9-358F61F4736E}"/>
+              </a:ext>
+            </a:extLst>
+          </p:cNvPr>
+          <p:cNvSpPr/>
+          <p:nvPr/>
+        </p:nvSpPr>
+        <p:spPr>
+          <a:xfrm>
+            <a:off x="6100644" y="1172419"/>
+            <a:ext cx="57134" cy="5673416"/>
+          </a:xfrm>
+          <a:custGeom>
+            <a:avLst/>
+            <a:gdLst>
+              <a:gd name="connsiteX0" fmla="*/ 0 w 57134"/>
+              <a:gd name="connsiteY0" fmla="*/ 5673417 h 5673416"/>
+              <a:gd name="connsiteX1" fmla="*/ 0 w 57134"/>
+              <a:gd name="connsiteY1" fmla="*/ 0 h 5673416"/>
+            </a:gdLst>
+            <a:ahLst/>
+            <a:cxnLst>
+              <a:cxn ang="0">
+                <a:pos x="connsiteX0" y="connsiteY0"/>
+              </a:cxn>
+              <a:cxn ang="0">
+                <a:pos x="connsiteX1" y="connsiteY1"/>
+              </a:cxn>
+            </a:cxnLst>
+            <a:rect l="l" t="t" r="r" b="b"/>
+            <a:pathLst>
+              <a:path w="57134" h="5673416">
+                <a:moveTo>
+                  <a:pt x="0" y="5673417"/>
+                </a:moveTo>
+                <a:lnTo>
+                  <a:pt x="0" y="0"/>
+                </a:lnTo>
+              </a:path>
+            </a:pathLst>
+          </a:custGeom>
+          <a:solidFill>
+            <a:srgbClr val="000000">
+              <a:alpha val="50000"/>
+            </a:srgbClr>
+          </a:solidFill>
+          <a:ln w="34233" cap="sq">
+            <a:solidFill>
+              <a:srgbClr val="000000"/>
+            </a:solidFill>
+            <a:prstDash val="solid"/>
+            <a:miter/>
+            <a:tailEnd type="arrow"/>
+          </a:ln>
+        </p:spPr>
+        <p:txBody>
+          <a:bodyPr rtlCol="0" anchor="ctr"/>
+          <a:lstStyle/>
+          <a:p>
+            <a:endParaRPr lang="en-US"/>
+          </a:p>
+        </p:txBody>
+      </p:sp>
+      <p:sp>
+        <p:nvSpPr>
+          <p:cNvPr id="12" name="Freeform: Shape 11">
+            <a:extLst>
+              <a:ext uri="{FF2B5EF4-FFF2-40B4-BE49-F238E27FC236}">
+                <a16:creationId xmlns:a16="http://schemas.microsoft.com/office/drawing/2014/main" id="{AF57F973-4873-579E-B69C-60C91206DBB9}"/>
+              </a:ext>
+            </a:extLst>
+          </p:cNvPr>
+          <p:cNvSpPr/>
+          <p:nvPr/>
+        </p:nvSpPr>
+        <p:spPr>
+          <a:xfrm>
+            <a:off x="3243940" y="3989130"/>
+            <a:ext cx="5673416" cy="57134"/>
+          </a:xfrm>
+          <a:custGeom>
+            <a:avLst/>
+            <a:gdLst>
+              <a:gd name="connsiteX0" fmla="*/ 0 w 5673416"/>
+              <a:gd name="connsiteY0" fmla="*/ 0 h 57134"/>
+              <a:gd name="connsiteX1" fmla="*/ 5673417 w 5673416"/>
+              <a:gd name="connsiteY1" fmla="*/ 0 h 57134"/>
+            </a:gdLst>
+            <a:ahLst/>
+            <a:cxnLst>
+              <a:cxn ang="0">
+                <a:pos x="connsiteX0" y="connsiteY0"/>
+              </a:cxn>
+              <a:cxn ang="0">
+                <a:pos x="connsiteX1" y="connsiteY1"/>
+              </a:cxn>
+            </a:cxnLst>
+            <a:rect l="l" t="t" r="r" b="b"/>
+            <a:pathLst>
+              <a:path w="5673416" h="57134">
+                <a:moveTo>
+                  <a:pt x="0" y="0"/>
+                </a:moveTo>
+                <a:lnTo>
+                  <a:pt x="5673417" y="0"/>
+                </a:lnTo>
+              </a:path>
+            </a:pathLst>
+          </a:custGeom>
+          <a:solidFill>
+            <a:srgbClr val="000000">
+              <a:alpha val="50000"/>
+            </a:srgbClr>
+          </a:solidFill>
+          <a:ln w="34233" cap="sq">
+            <a:solidFill>
+              <a:srgbClr val="000000"/>
+            </a:solidFill>
+            <a:prstDash val="solid"/>
+            <a:miter/>
+            <a:tailEnd type="arrow"/>
+          </a:ln>
+        </p:spPr>
+        <p:txBody>
+          <a:bodyPr rtlCol="0" anchor="ctr"/>
+          <a:lstStyle/>
+          <a:p>
+            <a:endParaRPr lang="en-US"/>
+          </a:p>
+        </p:txBody>
+      </p:sp>
+      <p:sp>
+        <p:nvSpPr>
+          <p:cNvPr id="13" name="Freeform: Shape 12">
+            <a:extLst>
+              <a:ext uri="{FF2B5EF4-FFF2-40B4-BE49-F238E27FC236}">
+                <a16:creationId xmlns:a16="http://schemas.microsoft.com/office/drawing/2014/main" id="{EBB250A9-01B5-A9A8-C2E0-63EC801B8D27}"/>
+              </a:ext>
+            </a:extLst>
+          </p:cNvPr>
+          <p:cNvSpPr/>
+          <p:nvPr/>
+        </p:nvSpPr>
+        <p:spPr>
+          <a:xfrm>
+            <a:off x="7198454" y="2773007"/>
+            <a:ext cx="118313" cy="118319"/>
+          </a:xfrm>
+          <a:custGeom>
+            <a:avLst/>
+            <a:gdLst>
+              <a:gd name="connsiteX0" fmla="*/ 118313 w 118313"/>
+              <a:gd name="connsiteY0" fmla="*/ 0 h 118319"/>
+              <a:gd name="connsiteX1" fmla="*/ 1211 w 118313"/>
+              <a:gd name="connsiteY1" fmla="*/ 117474 h 118319"/>
+              <a:gd name="connsiteX2" fmla="*/ 0 w 118313"/>
+              <a:gd name="connsiteY2" fmla="*/ 846 h 118319"/>
+              <a:gd name="connsiteX3" fmla="*/ 117102 w 118313"/>
+              <a:gd name="connsiteY3" fmla="*/ 118319 h 118319"/>
+            </a:gdLst>
+            <a:ahLst/>
+            <a:cxnLst>
+              <a:cxn ang="0">
+                <a:pos x="connsiteX0" y="connsiteY0"/>
+              </a:cxn>
+              <a:cxn ang="0">
+                <a:pos x="connsiteX1" y="connsiteY1"/>
+              </a:cxn>
+              <a:cxn ang="0">
+                <a:pos x="connsiteX2" y="connsiteY2"/>
+              </a:cxn>
+              <a:cxn ang="0">
+                <a:pos x="connsiteX3" y="connsiteY3"/>
+              </a:cxn>
+            </a:cxnLst>
+            <a:rect l="l" t="t" r="r" b="b"/>
+            <a:pathLst>
+              <a:path w="118313" h="118319">
+                <a:moveTo>
+                  <a:pt x="118313" y="0"/>
+                </a:moveTo>
+                <a:lnTo>
+                  <a:pt x="1211" y="117474"/>
+                </a:lnTo>
+                <a:moveTo>
+                  <a:pt x="0" y="846"/>
+                </a:moveTo>
+                <a:lnTo>
+                  <a:pt x="117102" y="118319"/>
+                </a:lnTo>
+              </a:path>
+            </a:pathLst>
+          </a:custGeom>
+          <a:noFill/>
+          <a:ln w="24486" cap="rnd">
+            <a:solidFill>
+              <a:srgbClr val="808080"/>
+            </a:solidFill>
+            <a:prstDash val="solid"/>
+            <a:miter/>
+          </a:ln>
+        </p:spPr>
+        <p:txBody>
+          <a:bodyPr rtlCol="0" anchor="ctr"/>
+          <a:lstStyle/>
+          <a:p>
+            <a:endParaRPr lang="en-US"/>
+          </a:p>
+        </p:txBody>
+      </p:sp>
+      <p:sp>
+        <p:nvSpPr>
+          <p:cNvPr id="14" name="Freeform: Shape 13">
+            <a:extLst>
+              <a:ext uri="{FF2B5EF4-FFF2-40B4-BE49-F238E27FC236}">
+                <a16:creationId xmlns:a16="http://schemas.microsoft.com/office/drawing/2014/main" id="{A4DDC5C8-D3CF-896F-1915-6DD2393BDE25}"/>
+              </a:ext>
+            </a:extLst>
+          </p:cNvPr>
+          <p:cNvSpPr/>
+          <p:nvPr/>
+        </p:nvSpPr>
+        <p:spPr>
+          <a:xfrm>
+            <a:off x="4884522" y="2773007"/>
+            <a:ext cx="118313" cy="118319"/>
+          </a:xfrm>
+          <a:custGeom>
+            <a:avLst/>
+            <a:gdLst>
+              <a:gd name="connsiteX0" fmla="*/ 118313 w 118313"/>
+              <a:gd name="connsiteY0" fmla="*/ 0 h 118319"/>
+              <a:gd name="connsiteX1" fmla="*/ 1211 w 118313"/>
+              <a:gd name="connsiteY1" fmla="*/ 117474 h 118319"/>
+              <a:gd name="connsiteX2" fmla="*/ 0 w 118313"/>
+              <a:gd name="connsiteY2" fmla="*/ 846 h 118319"/>
+              <a:gd name="connsiteX3" fmla="*/ 117102 w 118313"/>
+              <a:gd name="connsiteY3" fmla="*/ 118319 h 118319"/>
+            </a:gdLst>
+            <a:ahLst/>
+            <a:cxnLst>
+              <a:cxn ang="0">
+                <a:pos x="connsiteX0" y="connsiteY0"/>
+              </a:cxn>
+              <a:cxn ang="0">
+                <a:pos x="connsiteX1" y="connsiteY1"/>
+              </a:cxn>
+              <a:cxn ang="0">
+                <a:pos x="connsiteX2" y="connsiteY2"/>
+              </a:cxn>
+              <a:cxn ang="0">
+                <a:pos x="connsiteX3" y="connsiteY3"/>
+              </a:cxn>
+            </a:cxnLst>
+            <a:rect l="l" t="t" r="r" b="b"/>
+            <a:pathLst>
+              <a:path w="118313" h="118319">
+                <a:moveTo>
+                  <a:pt x="118313" y="0"/>
+                </a:moveTo>
+                <a:lnTo>
+                  <a:pt x="1211" y="117474"/>
+                </a:lnTo>
+                <a:moveTo>
+                  <a:pt x="0" y="846"/>
+                </a:moveTo>
+                <a:lnTo>
+                  <a:pt x="117102" y="118319"/>
+                </a:lnTo>
+              </a:path>
+            </a:pathLst>
+          </a:custGeom>
+          <a:noFill/>
+          <a:ln w="24486" cap="rnd">
+            <a:solidFill>
+              <a:srgbClr val="808080"/>
+            </a:solidFill>
+            <a:prstDash val="solid"/>
+            <a:miter/>
+          </a:ln>
+        </p:spPr>
+        <p:txBody>
+          <a:bodyPr rtlCol="0" anchor="ctr"/>
+          <a:lstStyle/>
+          <a:p>
+            <a:endParaRPr lang="en-US"/>
+          </a:p>
+        </p:txBody>
+      </p:sp>
+      <p:sp>
+        <p:nvSpPr>
+          <p:cNvPr id="15" name="Freeform: Shape 14">
+            <a:extLst>
+              <a:ext uri="{FF2B5EF4-FFF2-40B4-BE49-F238E27FC236}">
+                <a16:creationId xmlns:a16="http://schemas.microsoft.com/office/drawing/2014/main" id="{FC309EB5-9A19-0F14-FE29-80DB88C82A77}"/>
+              </a:ext>
+            </a:extLst>
+          </p:cNvPr>
+          <p:cNvSpPr/>
+          <p:nvPr/>
+        </p:nvSpPr>
+        <p:spPr>
+          <a:xfrm>
+            <a:off x="4884522" y="5086939"/>
+            <a:ext cx="118313" cy="118313"/>
+          </a:xfrm>
+          <a:custGeom>
+            <a:avLst/>
+            <a:gdLst>
+              <a:gd name="connsiteX0" fmla="*/ 118313 w 118313"/>
+              <a:gd name="connsiteY0" fmla="*/ 0 h 118313"/>
+              <a:gd name="connsiteX1" fmla="*/ 1211 w 118313"/>
+              <a:gd name="connsiteY1" fmla="*/ 117473 h 118313"/>
+              <a:gd name="connsiteX2" fmla="*/ 0 w 118313"/>
+              <a:gd name="connsiteY2" fmla="*/ 846 h 118313"/>
+              <a:gd name="connsiteX3" fmla="*/ 117102 w 118313"/>
+              <a:gd name="connsiteY3" fmla="*/ 118313 h 118313"/>
+            </a:gdLst>
+            <a:ahLst/>
+            <a:cxnLst>
+              <a:cxn ang="0">
+                <a:pos x="connsiteX0" y="connsiteY0"/>
+              </a:cxn>
+              <a:cxn ang="0">
+                <a:pos x="connsiteX1" y="connsiteY1"/>
+              </a:cxn>
+              <a:cxn ang="0">
+                <a:pos x="connsiteX2" y="connsiteY2"/>
+              </a:cxn>
+              <a:cxn ang="0">
+                <a:pos x="connsiteX3" y="connsiteY3"/>
+              </a:cxn>
+            </a:cxnLst>
+            <a:rect l="l" t="t" r="r" b="b"/>
+            <a:pathLst>
+              <a:path w="118313" h="118313">
+                <a:moveTo>
+                  <a:pt x="118313" y="0"/>
+                </a:moveTo>
+                <a:lnTo>
+                  <a:pt x="1211" y="117473"/>
+                </a:lnTo>
+                <a:moveTo>
+                  <a:pt x="0" y="846"/>
+                </a:moveTo>
+                <a:lnTo>
+                  <a:pt x="117102" y="118313"/>
+                </a:lnTo>
+              </a:path>
+            </a:pathLst>
+          </a:custGeom>
+          <a:noFill/>
+          <a:ln w="24486" cap="rnd">
+            <a:solidFill>
+              <a:srgbClr val="808080"/>
+            </a:solidFill>
+            <a:prstDash val="solid"/>
+            <a:miter/>
+          </a:ln>
+        </p:spPr>
+        <p:txBody>
+          <a:bodyPr rtlCol="0" anchor="ctr"/>
+          <a:lstStyle/>
+          <a:p>
+            <a:endParaRPr lang="en-US"/>
+          </a:p>
+        </p:txBody>
+      </p:sp>
+      <p:sp>
+        <p:nvSpPr>
+          <p:cNvPr id="16" name="Freeform: Shape 15">
+            <a:extLst>
+              <a:ext uri="{FF2B5EF4-FFF2-40B4-BE49-F238E27FC236}">
+                <a16:creationId xmlns:a16="http://schemas.microsoft.com/office/drawing/2014/main" id="{3F831900-4E44-A885-9ADE-2BB52E0324DC}"/>
+              </a:ext>
+            </a:extLst>
+          </p:cNvPr>
+          <p:cNvSpPr/>
+          <p:nvPr/>
+        </p:nvSpPr>
+        <p:spPr>
+          <a:xfrm>
+            <a:off x="7198454" y="5086939"/>
+            <a:ext cx="118313" cy="118313"/>
+          </a:xfrm>
+          <a:custGeom>
+            <a:avLst/>
+            <a:gdLst>
+              <a:gd name="connsiteX0" fmla="*/ 118313 w 118313"/>
+              <a:gd name="connsiteY0" fmla="*/ 0 h 118313"/>
+              <a:gd name="connsiteX1" fmla="*/ 1211 w 118313"/>
+              <a:gd name="connsiteY1" fmla="*/ 117473 h 118313"/>
+              <a:gd name="connsiteX2" fmla="*/ 0 w 118313"/>
+              <a:gd name="connsiteY2" fmla="*/ 846 h 118313"/>
+              <a:gd name="connsiteX3" fmla="*/ 117102 w 118313"/>
+              <a:gd name="connsiteY3" fmla="*/ 118313 h 118313"/>
+            </a:gdLst>
+            <a:ahLst/>
+            <a:cxnLst>
+              <a:cxn ang="0">
+                <a:pos x="connsiteX0" y="connsiteY0"/>
+              </a:cxn>
+              <a:cxn ang="0">
+                <a:pos x="connsiteX1" y="connsiteY1"/>
+              </a:cxn>
+              <a:cxn ang="0">
+                <a:pos x="connsiteX2" y="connsiteY2"/>
+              </a:cxn>
+              <a:cxn ang="0">
+                <a:pos x="connsiteX3" y="connsiteY3"/>
+              </a:cxn>
+            </a:cxnLst>
+            <a:rect l="l" t="t" r="r" b="b"/>
+            <a:pathLst>
+              <a:path w="118313" h="118313">
+                <a:moveTo>
+                  <a:pt x="118313" y="0"/>
+                </a:moveTo>
+                <a:lnTo>
+                  <a:pt x="1211" y="117473"/>
+                </a:lnTo>
+                <a:moveTo>
+                  <a:pt x="0" y="846"/>
+                </a:moveTo>
+                <a:lnTo>
+                  <a:pt x="117102" y="118313"/>
+                </a:lnTo>
+              </a:path>
+            </a:pathLst>
+          </a:custGeom>
+          <a:noFill/>
+          <a:ln w="24486" cap="rnd">
+            <a:solidFill>
+              <a:srgbClr val="808080"/>
+            </a:solidFill>
+            <a:prstDash val="solid"/>
+            <a:miter/>
+          </a:ln>
+        </p:spPr>
+        <p:txBody>
+          <a:bodyPr rtlCol="0" anchor="ctr"/>
+          <a:lstStyle/>
+          <a:p>
+            <a:endParaRPr lang="en-US"/>
+          </a:p>
+        </p:txBody>
+      </p:sp>
+      <p:sp>
+        <p:nvSpPr>
+          <p:cNvPr id="17" name="Freeform: Shape 16">
+            <a:extLst>
+              <a:ext uri="{FF2B5EF4-FFF2-40B4-BE49-F238E27FC236}">
+                <a16:creationId xmlns:a16="http://schemas.microsoft.com/office/drawing/2014/main" id="{B27FA6BC-CF38-97C4-A294-8716A7C43D75}"/>
+              </a:ext>
+            </a:extLst>
+          </p:cNvPr>
+          <p:cNvSpPr/>
+          <p:nvPr/>
+        </p:nvSpPr>
+        <p:spPr>
+          <a:xfrm>
+            <a:off x="3772431" y="1660916"/>
+            <a:ext cx="4656430" cy="4656430"/>
+          </a:xfrm>
+          <a:custGeom>
+            <a:avLst/>
+            <a:gdLst>
+              <a:gd name="connsiteX0" fmla="*/ 0 w 4656430"/>
+              <a:gd name="connsiteY0" fmla="*/ 0 h 4656430"/>
+              <a:gd name="connsiteX1" fmla="*/ 4656431 w 4656430"/>
+              <a:gd name="connsiteY1" fmla="*/ 0 h 4656430"/>
+              <a:gd name="connsiteX2" fmla="*/ 4656431 w 4656430"/>
+              <a:gd name="connsiteY2" fmla="*/ 4656431 h 4656430"/>
+              <a:gd name="connsiteX3" fmla="*/ 0 w 4656430"/>
+              <a:gd name="connsiteY3" fmla="*/ 4656431 h 4656430"/>
+            </a:gdLst>
+            <a:ahLst/>
+            <a:cxnLst>
+              <a:cxn ang="0">
+                <a:pos x="connsiteX0" y="connsiteY0"/>
+              </a:cxn>
+              <a:cxn ang="0">
+                <a:pos x="connsiteX1" y="connsiteY1"/>
+              </a:cxn>
+              <a:cxn ang="0">
+                <a:pos x="connsiteX2" y="connsiteY2"/>
+              </a:cxn>
+              <a:cxn ang="0">
+                <a:pos x="connsiteX3" y="connsiteY3"/>
+              </a:cxn>
+            </a:cxnLst>
+            <a:rect l="l" t="t" r="r" b="b"/>
+            <a:pathLst>
+              <a:path w="4656430" h="4656430">
+                <a:moveTo>
+                  <a:pt x="0" y="0"/>
+                </a:moveTo>
+                <a:lnTo>
+                  <a:pt x="4656431" y="0"/>
+                </a:lnTo>
+                <a:lnTo>
+                  <a:pt x="4656431" y="4656431"/>
+                </a:lnTo>
+                <a:lnTo>
+                  <a:pt x="0" y="4656431"/>
+                </a:lnTo>
+                <a:close/>
+              </a:path>
+            </a:pathLst>
+          </a:custGeom>
+          <a:noFill/>
+          <a:ln w="57055" cap="rnd">
+            <a:solidFill>
+              <a:srgbClr val="5AA02C"/>
+            </a:solidFill>
+            <a:prstDash val="solid"/>
+            <a:miter/>
+          </a:ln>
+        </p:spPr>
+        <p:txBody>
+          <a:bodyPr rtlCol="0" anchor="ctr"/>
+          <a:lstStyle/>
+          <a:p>
+            <a:endParaRPr lang="en-US"/>
+          </a:p>
+        </p:txBody>
+      </p:sp>
+      <p:sp>
+        <p:nvSpPr>
+          <p:cNvPr id="18" name="Freeform: Shape 17">
+            <a:extLst>
+              <a:ext uri="{FF2B5EF4-FFF2-40B4-BE49-F238E27FC236}">
+                <a16:creationId xmlns:a16="http://schemas.microsoft.com/office/drawing/2014/main" id="{255D245B-8679-F95D-DF14-A8426BF2EA6F}"/>
+              </a:ext>
+            </a:extLst>
+          </p:cNvPr>
+          <p:cNvSpPr/>
+          <p:nvPr/>
+        </p:nvSpPr>
+        <p:spPr>
+          <a:xfrm>
+            <a:off x="6137530" y="1712084"/>
+            <a:ext cx="2240160" cy="2240160"/>
+          </a:xfrm>
+          <a:custGeom>
+            <a:avLst/>
+            <a:gdLst>
+              <a:gd name="connsiteX0" fmla="*/ 2240160 w 2240160"/>
+              <a:gd name="connsiteY0" fmla="*/ 1120080 h 2240160"/>
+              <a:gd name="connsiteX1" fmla="*/ 1120080 w 2240160"/>
+              <a:gd name="connsiteY1" fmla="*/ 2240160 h 2240160"/>
+              <a:gd name="connsiteX2" fmla="*/ 0 w 2240160"/>
+              <a:gd name="connsiteY2" fmla="*/ 1120080 h 2240160"/>
+              <a:gd name="connsiteX3" fmla="*/ 1120080 w 2240160"/>
+              <a:gd name="connsiteY3" fmla="*/ 0 h 2240160"/>
+              <a:gd name="connsiteX4" fmla="*/ 2240160 w 2240160"/>
+              <a:gd name="connsiteY4" fmla="*/ 1120080 h 2240160"/>
+            </a:gdLst>
+            <a:ahLst/>
+            <a:cxnLst>
+              <a:cxn ang="0">
+                <a:pos x="connsiteX0" y="connsiteY0"/>
+              </a:cxn>
+              <a:cxn ang="0">
+                <a:pos x="connsiteX1" y="connsiteY1"/>
+              </a:cxn>
+              <a:cxn ang="0">
+                <a:pos x="connsiteX2" y="connsiteY2"/>
+              </a:cxn>
+              <a:cxn ang="0">
+                <a:pos x="connsiteX3" y="connsiteY3"/>
+              </a:cxn>
+              <a:cxn ang="0">
+                <a:pos x="connsiteX4" y="connsiteY4"/>
+              </a:cxn>
+            </a:cxnLst>
+            <a:rect l="l" t="t" r="r" b="b"/>
+            <a:pathLst>
+              <a:path w="2240160" h="2240160">
+                <a:moveTo>
+                  <a:pt x="2240160" y="1120080"/>
+                </a:moveTo>
+                <a:cubicBezTo>
+                  <a:pt x="2240160" y="1738683"/>
+                  <a:pt x="1738683" y="2240160"/>
+                  <a:pt x="1120080" y="2240160"/>
+                </a:cubicBezTo>
+                <a:cubicBezTo>
+                  <a:pt x="501477" y="2240160"/>
+                  <a:pt x="0" y="1738683"/>
+                  <a:pt x="0" y="1120080"/>
+                </a:cubicBezTo>
+                <a:cubicBezTo>
+                  <a:pt x="0" y="501477"/>
+                  <a:pt x="501477" y="0"/>
+                  <a:pt x="1120080" y="0"/>
+                </a:cubicBezTo>
+                <a:cubicBezTo>
+                  <a:pt x="1738683" y="0"/>
+                  <a:pt x="2240160" y="501477"/>
+                  <a:pt x="2240160" y="1120080"/>
+                </a:cubicBezTo>
+                <a:close/>
+              </a:path>
+            </a:pathLst>
+          </a:custGeom>
+          <a:noFill/>
+          <a:ln w="45138" cap="sq">
+            <a:solidFill>
+              <a:srgbClr val="37ABC8"/>
+            </a:solidFill>
+            <a:prstDash val="solid"/>
+            <a:miter/>
+          </a:ln>
+        </p:spPr>
+        <p:txBody>
+          <a:bodyPr rtlCol="0" anchor="ctr"/>
+          <a:lstStyle/>
+          <a:p>
+            <a:endParaRPr lang="en-US"/>
+          </a:p>
+        </p:txBody>
+      </p:sp>
+      <p:sp>
+        <p:nvSpPr>
+          <p:cNvPr id="19" name="Freeform: Shape 18">
+            <a:extLst>
+              <a:ext uri="{FF2B5EF4-FFF2-40B4-BE49-F238E27FC236}">
+                <a16:creationId xmlns:a16="http://schemas.microsoft.com/office/drawing/2014/main" id="{D2500A33-AE17-252C-E174-D1197C4C3128}"/>
+              </a:ext>
+            </a:extLst>
+          </p:cNvPr>
+          <p:cNvSpPr/>
+          <p:nvPr/>
+        </p:nvSpPr>
+        <p:spPr>
+          <a:xfrm>
+            <a:off x="3823598" y="1712084"/>
+            <a:ext cx="2240160" cy="2240160"/>
+          </a:xfrm>
+          <a:custGeom>
+            <a:avLst/>
+            <a:gdLst>
+              <a:gd name="connsiteX0" fmla="*/ 2240160 w 2240160"/>
+              <a:gd name="connsiteY0" fmla="*/ 1120080 h 2240160"/>
+              <a:gd name="connsiteX1" fmla="*/ 1120080 w 2240160"/>
+              <a:gd name="connsiteY1" fmla="*/ 2240160 h 2240160"/>
+              <a:gd name="connsiteX2" fmla="*/ 0 w 2240160"/>
+              <a:gd name="connsiteY2" fmla="*/ 1120080 h 2240160"/>
+              <a:gd name="connsiteX3" fmla="*/ 1120080 w 2240160"/>
+              <a:gd name="connsiteY3" fmla="*/ 0 h 2240160"/>
+              <a:gd name="connsiteX4" fmla="*/ 2240160 w 2240160"/>
+              <a:gd name="connsiteY4" fmla="*/ 1120080 h 2240160"/>
+            </a:gdLst>
+            <a:ahLst/>
+            <a:cxnLst>
+              <a:cxn ang="0">
+                <a:pos x="connsiteX0" y="connsiteY0"/>
+              </a:cxn>
+              <a:cxn ang="0">
+                <a:pos x="connsiteX1" y="connsiteY1"/>
+              </a:cxn>
+              <a:cxn ang="0">
+                <a:pos x="connsiteX2" y="connsiteY2"/>
+              </a:cxn>
+              <a:cxn ang="0">
+                <a:pos x="connsiteX3" y="connsiteY3"/>
+              </a:cxn>
+              <a:cxn ang="0">
+                <a:pos x="connsiteX4" y="connsiteY4"/>
+              </a:cxn>
+            </a:cxnLst>
+            <a:rect l="l" t="t" r="r" b="b"/>
+            <a:pathLst>
+              <a:path w="2240160" h="2240160">
+                <a:moveTo>
+                  <a:pt x="2240160" y="1120080"/>
+                </a:moveTo>
+                <a:cubicBezTo>
+                  <a:pt x="2240160" y="1738683"/>
+                  <a:pt x="1738683" y="2240160"/>
+                  <a:pt x="1120080" y="2240160"/>
+                </a:cubicBezTo>
+                <a:cubicBezTo>
+                  <a:pt x="501477" y="2240160"/>
+                  <a:pt x="0" y="1738683"/>
+                  <a:pt x="0" y="1120080"/>
+                </a:cubicBezTo>
+                <a:cubicBezTo>
+                  <a:pt x="0" y="501477"/>
+                  <a:pt x="501477" y="0"/>
+                  <a:pt x="1120080" y="0"/>
+                </a:cubicBezTo>
+                <a:cubicBezTo>
+                  <a:pt x="1738683" y="0"/>
+                  <a:pt x="2240160" y="501477"/>
+                  <a:pt x="2240160" y="1120080"/>
+                </a:cubicBezTo>
+                <a:close/>
+              </a:path>
+            </a:pathLst>
+          </a:custGeom>
+          <a:noFill/>
+          <a:ln w="45138" cap="sq">
+            <a:solidFill>
+              <a:srgbClr val="37ABC8"/>
+            </a:solidFill>
+            <a:prstDash val="solid"/>
+            <a:miter/>
+          </a:ln>
+        </p:spPr>
+        <p:txBody>
+          <a:bodyPr rtlCol="0" anchor="ctr"/>
+          <a:lstStyle/>
+          <a:p>
+            <a:endParaRPr lang="en-US"/>
+          </a:p>
+        </p:txBody>
+      </p:sp>
+      <p:sp>
+        <p:nvSpPr>
+          <p:cNvPr id="20" name="Freeform: Shape 19">
+            <a:extLst>
+              <a:ext uri="{FF2B5EF4-FFF2-40B4-BE49-F238E27FC236}">
+                <a16:creationId xmlns:a16="http://schemas.microsoft.com/office/drawing/2014/main" id="{DD038C99-415F-73A9-C25F-5DC759A1DEFF}"/>
+              </a:ext>
+            </a:extLst>
+          </p:cNvPr>
+          <p:cNvSpPr/>
+          <p:nvPr/>
+        </p:nvSpPr>
+        <p:spPr>
+          <a:xfrm>
+            <a:off x="3823598" y="4026015"/>
+            <a:ext cx="2240160" cy="2240160"/>
+          </a:xfrm>
+          <a:custGeom>
+            <a:avLst/>
+            <a:gdLst>
+              <a:gd name="connsiteX0" fmla="*/ 2240160 w 2240160"/>
+              <a:gd name="connsiteY0" fmla="*/ 1120080 h 2240160"/>
+              <a:gd name="connsiteX1" fmla="*/ 1120080 w 2240160"/>
+              <a:gd name="connsiteY1" fmla="*/ 2240161 h 2240160"/>
+              <a:gd name="connsiteX2" fmla="*/ 0 w 2240160"/>
+              <a:gd name="connsiteY2" fmla="*/ 1120080 h 2240160"/>
+              <a:gd name="connsiteX3" fmla="*/ 1120080 w 2240160"/>
+              <a:gd name="connsiteY3" fmla="*/ 0 h 2240160"/>
+              <a:gd name="connsiteX4" fmla="*/ 2240160 w 2240160"/>
+              <a:gd name="connsiteY4" fmla="*/ 1120080 h 2240160"/>
+            </a:gdLst>
+            <a:ahLst/>
+            <a:cxnLst>
+              <a:cxn ang="0">
+                <a:pos x="connsiteX0" y="connsiteY0"/>
+              </a:cxn>
+              <a:cxn ang="0">
+                <a:pos x="connsiteX1" y="connsiteY1"/>
+              </a:cxn>
+              <a:cxn ang="0">
+                <a:pos x="connsiteX2" y="connsiteY2"/>
+              </a:cxn>
+              <a:cxn ang="0">
+                <a:pos x="connsiteX3" y="connsiteY3"/>
+              </a:cxn>
+              <a:cxn ang="0">
+                <a:pos x="connsiteX4" y="connsiteY4"/>
+              </a:cxn>
+            </a:cxnLst>
+            <a:rect l="l" t="t" r="r" b="b"/>
+            <a:pathLst>
+              <a:path w="2240160" h="2240160">
+                <a:moveTo>
+                  <a:pt x="2240160" y="1120080"/>
+                </a:moveTo>
+                <a:cubicBezTo>
+                  <a:pt x="2240160" y="1738683"/>
+                  <a:pt x="1738683" y="2240161"/>
+                  <a:pt x="1120080" y="2240161"/>
+                </a:cubicBezTo>
+                <a:cubicBezTo>
+                  <a:pt x="501477" y="2240161"/>
+                  <a:pt x="0" y="1738683"/>
+                  <a:pt x="0" y="1120080"/>
+                </a:cubicBezTo>
+                <a:cubicBezTo>
+                  <a:pt x="0" y="501477"/>
+                  <a:pt x="501477" y="0"/>
+                  <a:pt x="1120080" y="0"/>
+                </a:cubicBezTo>
+                <a:cubicBezTo>
+                  <a:pt x="1738683" y="0"/>
+                  <a:pt x="2240160" y="501477"/>
+                  <a:pt x="2240160" y="1120080"/>
+                </a:cubicBezTo>
+                <a:close/>
+              </a:path>
+            </a:pathLst>
+          </a:custGeom>
+          <a:noFill/>
+          <a:ln w="45138" cap="sq">
+            <a:solidFill>
+              <a:srgbClr val="37ABC8"/>
+            </a:solidFill>
+            <a:prstDash val="solid"/>
+            <a:miter/>
+          </a:ln>
+        </p:spPr>
+        <p:txBody>
+          <a:bodyPr rtlCol="0" anchor="ctr"/>
+          <a:lstStyle/>
+          <a:p>
+            <a:endParaRPr lang="en-US"/>
+          </a:p>
+        </p:txBody>
+      </p:sp>
+      <p:sp>
+        <p:nvSpPr>
+          <p:cNvPr id="21" name="Freeform: Shape 20">
+            <a:extLst>
+              <a:ext uri="{FF2B5EF4-FFF2-40B4-BE49-F238E27FC236}">
+                <a16:creationId xmlns:a16="http://schemas.microsoft.com/office/drawing/2014/main" id="{F31E3D6C-86AD-CEAA-E4AD-F010A76C3EDE}"/>
+              </a:ext>
+            </a:extLst>
+          </p:cNvPr>
+          <p:cNvSpPr/>
+          <p:nvPr/>
+        </p:nvSpPr>
+        <p:spPr>
+          <a:xfrm>
+            <a:off x="6137530" y="4026015"/>
+            <a:ext cx="2240160" cy="2240160"/>
+          </a:xfrm>
+          <a:custGeom>
+            <a:avLst/>
+            <a:gdLst>
+              <a:gd name="connsiteX0" fmla="*/ 2240160 w 2240160"/>
+              <a:gd name="connsiteY0" fmla="*/ 1120080 h 2240160"/>
+              <a:gd name="connsiteX1" fmla="*/ 1120080 w 2240160"/>
+              <a:gd name="connsiteY1" fmla="*/ 2240161 h 2240160"/>
+              <a:gd name="connsiteX2" fmla="*/ 0 w 2240160"/>
+              <a:gd name="connsiteY2" fmla="*/ 1120080 h 2240160"/>
+              <a:gd name="connsiteX3" fmla="*/ 1120080 w 2240160"/>
+              <a:gd name="connsiteY3" fmla="*/ 0 h 2240160"/>
+              <a:gd name="connsiteX4" fmla="*/ 2240160 w 2240160"/>
+              <a:gd name="connsiteY4" fmla="*/ 1120080 h 2240160"/>
+            </a:gdLst>
+            <a:ahLst/>
+            <a:cxnLst>
+              <a:cxn ang="0">
+                <a:pos x="connsiteX0" y="connsiteY0"/>
+              </a:cxn>
+              <a:cxn ang="0">
+                <a:pos x="connsiteX1" y="connsiteY1"/>
+              </a:cxn>
+              <a:cxn ang="0">
+                <a:pos x="connsiteX2" y="connsiteY2"/>
+              </a:cxn>
+              <a:cxn ang="0">
+                <a:pos x="connsiteX3" y="connsiteY3"/>
+              </a:cxn>
+              <a:cxn ang="0">
+                <a:pos x="connsiteX4" y="connsiteY4"/>
+              </a:cxn>
+            </a:cxnLst>
+            <a:rect l="l" t="t" r="r" b="b"/>
+            <a:pathLst>
+              <a:path w="2240160" h="2240160">
+                <a:moveTo>
+                  <a:pt x="2240160" y="1120080"/>
+                </a:moveTo>
+                <a:cubicBezTo>
+                  <a:pt x="2240160" y="1738683"/>
+                  <a:pt x="1738683" y="2240161"/>
+                  <a:pt x="1120080" y="2240161"/>
+                </a:cubicBezTo>
+                <a:cubicBezTo>
+                  <a:pt x="501477" y="2240161"/>
+                  <a:pt x="0" y="1738683"/>
+                  <a:pt x="0" y="1120080"/>
+                </a:cubicBezTo>
+                <a:cubicBezTo>
+                  <a:pt x="0" y="501477"/>
+                  <a:pt x="501477" y="0"/>
+                  <a:pt x="1120080" y="0"/>
+                </a:cubicBezTo>
+                <a:cubicBezTo>
+                  <a:pt x="1738683" y="0"/>
+                  <a:pt x="2240160" y="501477"/>
+                  <a:pt x="2240160" y="1120080"/>
+                </a:cubicBezTo>
+                <a:close/>
+              </a:path>
+            </a:pathLst>
+          </a:custGeom>
+          <a:noFill/>
+          <a:ln w="45138" cap="sq">
+            <a:solidFill>
+              <a:srgbClr val="37ABC8"/>
+            </a:solidFill>
+            <a:prstDash val="solid"/>
+            <a:miter/>
+          </a:ln>
+        </p:spPr>
+        <p:txBody>
+          <a:bodyPr rtlCol="0" anchor="ctr"/>
+          <a:lstStyle/>
+          <a:p>
+            <a:endParaRPr lang="en-US"/>
+          </a:p>
+        </p:txBody>
+      </p:sp>
+      <p:sp>
+        <p:nvSpPr>
+          <p:cNvPr id="3" name="TextBox 2">
+            <a:extLst>
+              <a:ext uri="{FF2B5EF4-FFF2-40B4-BE49-F238E27FC236}">
+                <a16:creationId xmlns:a16="http://schemas.microsoft.com/office/drawing/2014/main" id="{5E3C077B-D075-6A22-3C25-9997F7CC2A70}"/>
+              </a:ext>
+            </a:extLst>
+          </p:cNvPr>
+          <p:cNvSpPr txBox="1"/>
+          <p:nvPr/>
+        </p:nvSpPr>
+        <p:spPr>
+          <a:xfrm>
+            <a:off x="8485991" y="1221938"/>
+            <a:ext cx="867545" cy="523220"/>
+          </a:xfrm>
+          <a:prstGeom prst="rect">
+            <a:avLst/>
+          </a:prstGeom>
+          <a:noFill/>
+        </p:spPr>
+        <p:txBody>
+          <a:bodyPr wrap="none" rtlCol="0">
+            <a:spAutoFit/>
+          </a:bodyPr>
+          <a:lstStyle/>
+          <a:p>
+            <a:r>
+              <a:rPr lang="en-US" sz="2800" b="1" dirty="0">
+                <a:solidFill>
+                  <a:srgbClr val="5AA02C"/>
+                </a:solidFill>
+              </a:rPr>
+              <a:t>(2,2)</a:t>
+            </a:r>
+          </a:p>
+        </p:txBody>
+      </p:sp>
+      <p:sp>
+        <p:nvSpPr>
+          <p:cNvPr id="4" name="TextBox 3">
+            <a:extLst>
+              <a:ext uri="{FF2B5EF4-FFF2-40B4-BE49-F238E27FC236}">
+                <a16:creationId xmlns:a16="http://schemas.microsoft.com/office/drawing/2014/main" id="{AC8B8175-1C27-39E7-DD5B-F088B5CB27EC}"/>
+              </a:ext>
+            </a:extLst>
+          </p:cNvPr>
+          <p:cNvSpPr txBox="1"/>
+          <p:nvPr/>
+        </p:nvSpPr>
+        <p:spPr>
+          <a:xfrm>
+            <a:off x="8485991" y="6083096"/>
+            <a:ext cx="978153" cy="523220"/>
+          </a:xfrm>
+          <a:prstGeom prst="rect">
+            <a:avLst/>
+          </a:prstGeom>
+          <a:noFill/>
+        </p:spPr>
+        <p:txBody>
+          <a:bodyPr wrap="none" rtlCol="0">
+            <a:spAutoFit/>
+          </a:bodyPr>
+          <a:lstStyle/>
+          <a:p>
+            <a:r>
+              <a:rPr lang="en-US" sz="2800" b="1" dirty="0">
+                <a:solidFill>
+                  <a:srgbClr val="5AA02C"/>
+                </a:solidFill>
+              </a:rPr>
+              <a:t>(2,-2)</a:t>
+            </a:r>
+          </a:p>
+        </p:txBody>
+      </p:sp>
+      <p:sp>
+        <p:nvSpPr>
+          <p:cNvPr id="5" name="TextBox 4">
+            <a:extLst>
+              <a:ext uri="{FF2B5EF4-FFF2-40B4-BE49-F238E27FC236}">
+                <a16:creationId xmlns:a16="http://schemas.microsoft.com/office/drawing/2014/main" id="{696F98FE-5E1B-66BF-6346-4538B87F2537}"/>
+              </a:ext>
+            </a:extLst>
+          </p:cNvPr>
+          <p:cNvSpPr txBox="1"/>
+          <p:nvPr/>
+        </p:nvSpPr>
+        <p:spPr>
+          <a:xfrm>
+            <a:off x="2794278" y="1221938"/>
+            <a:ext cx="978153" cy="523220"/>
+          </a:xfrm>
+          <a:prstGeom prst="rect">
+            <a:avLst/>
+          </a:prstGeom>
+          <a:noFill/>
+        </p:spPr>
+        <p:txBody>
+          <a:bodyPr wrap="none" rtlCol="0">
+            <a:spAutoFit/>
+          </a:bodyPr>
+          <a:lstStyle/>
+          <a:p>
+            <a:r>
+              <a:rPr lang="en-US" sz="2800" b="1" dirty="0">
+                <a:solidFill>
+                  <a:srgbClr val="5AA02C"/>
+                </a:solidFill>
+              </a:rPr>
+              <a:t>(-2,2)</a:t>
+            </a:r>
+          </a:p>
+        </p:txBody>
+      </p:sp>
+      <p:sp>
+        <p:nvSpPr>
+          <p:cNvPr id="6" name="TextBox 5">
+            <a:extLst>
+              <a:ext uri="{FF2B5EF4-FFF2-40B4-BE49-F238E27FC236}">
+                <a16:creationId xmlns:a16="http://schemas.microsoft.com/office/drawing/2014/main" id="{4385B6FD-C01E-6944-EC97-3564824F308A}"/>
+              </a:ext>
+            </a:extLst>
+          </p:cNvPr>
+          <p:cNvSpPr txBox="1"/>
+          <p:nvPr/>
+        </p:nvSpPr>
+        <p:spPr>
+          <a:xfrm>
+            <a:off x="2683671" y="6083096"/>
+            <a:ext cx="1088760" cy="523220"/>
+          </a:xfrm>
+          <a:prstGeom prst="rect">
+            <a:avLst/>
+          </a:prstGeom>
+          <a:noFill/>
+        </p:spPr>
+        <p:txBody>
+          <a:bodyPr wrap="none" rtlCol="0">
+            <a:spAutoFit/>
+          </a:bodyPr>
+          <a:lstStyle/>
+          <a:p>
+            <a:r>
+              <a:rPr lang="en-US" sz="2800" b="1" dirty="0">
+                <a:solidFill>
+                  <a:srgbClr val="5AA02C"/>
+                </a:solidFill>
+              </a:rPr>
+              <a:t>(-2,-2)</a:t>
+            </a:r>
+          </a:p>
+        </p:txBody>
+      </p:sp>
+      <p:sp>
+        <p:nvSpPr>
+          <p:cNvPr id="7" name="TextBox 6">
+            <a:extLst>
+              <a:ext uri="{FF2B5EF4-FFF2-40B4-BE49-F238E27FC236}">
+                <a16:creationId xmlns:a16="http://schemas.microsoft.com/office/drawing/2014/main" id="{AE9D11E5-F058-BC49-F428-74C00EA3943A}"/>
+              </a:ext>
+            </a:extLst>
+          </p:cNvPr>
+          <p:cNvSpPr txBox="1"/>
+          <p:nvPr/>
+        </p:nvSpPr>
+        <p:spPr>
+          <a:xfrm>
+            <a:off x="7235238" y="2408746"/>
+            <a:ext cx="768159" cy="461665"/>
+          </a:xfrm>
+          <a:prstGeom prst="rect">
+            <a:avLst/>
+          </a:prstGeom>
+          <a:noFill/>
+        </p:spPr>
+        <p:txBody>
+          <a:bodyPr wrap="none" rtlCol="0">
+            <a:spAutoFit/>
+          </a:bodyPr>
+          <a:lstStyle/>
+          <a:p>
+            <a:r>
+              <a:rPr lang="en-US" sz="2400" b="1" dirty="0">
+                <a:solidFill>
+                  <a:srgbClr val="808080"/>
+                </a:solidFill>
+              </a:rPr>
+              <a:t>(1,1)</a:t>
+            </a:r>
+          </a:p>
+        </p:txBody>
+      </p:sp>
+      <p:sp>
+        <p:nvSpPr>
+          <p:cNvPr id="8" name="TextBox 7">
+            <a:extLst>
+              <a:ext uri="{FF2B5EF4-FFF2-40B4-BE49-F238E27FC236}">
+                <a16:creationId xmlns:a16="http://schemas.microsoft.com/office/drawing/2014/main" id="{0B98B083-1A0E-FD4D-AD4B-3E027043C751}"/>
+              </a:ext>
+            </a:extLst>
+          </p:cNvPr>
+          <p:cNvSpPr txBox="1"/>
+          <p:nvPr/>
+        </p:nvSpPr>
+        <p:spPr>
+          <a:xfrm>
+            <a:off x="4121626" y="2405479"/>
+            <a:ext cx="862737" cy="461665"/>
+          </a:xfrm>
+          <a:prstGeom prst="rect">
+            <a:avLst/>
+          </a:prstGeom>
+          <a:noFill/>
+        </p:spPr>
+        <p:txBody>
+          <a:bodyPr wrap="none" rtlCol="0">
+            <a:spAutoFit/>
+          </a:bodyPr>
+          <a:lstStyle/>
+          <a:p>
+            <a:r>
+              <a:rPr lang="en-US" sz="2400" b="1" dirty="0">
+                <a:solidFill>
+                  <a:srgbClr val="808080"/>
+                </a:solidFill>
+              </a:rPr>
+              <a:t>(-1,1)</a:t>
+            </a:r>
+          </a:p>
+        </p:txBody>
+      </p:sp>
+      <p:sp>
+        <p:nvSpPr>
+          <p:cNvPr id="9" name="TextBox 8">
+            <a:extLst>
+              <a:ext uri="{FF2B5EF4-FFF2-40B4-BE49-F238E27FC236}">
+                <a16:creationId xmlns:a16="http://schemas.microsoft.com/office/drawing/2014/main" id="{590A9D52-E68B-0CB8-115F-26BC5CC7D90C}"/>
+              </a:ext>
+            </a:extLst>
+          </p:cNvPr>
+          <p:cNvSpPr txBox="1"/>
+          <p:nvPr/>
+        </p:nvSpPr>
+        <p:spPr>
+          <a:xfrm>
+            <a:off x="3986365" y="5080836"/>
+            <a:ext cx="957313" cy="461665"/>
+          </a:xfrm>
+          <a:prstGeom prst="rect">
+            <a:avLst/>
+          </a:prstGeom>
+          <a:noFill/>
+        </p:spPr>
+        <p:txBody>
+          <a:bodyPr wrap="none" rtlCol="0">
+            <a:spAutoFit/>
+          </a:bodyPr>
+          <a:lstStyle/>
+          <a:p>
+            <a:r>
+              <a:rPr lang="en-US" sz="2400" b="1" dirty="0">
+                <a:solidFill>
+                  <a:srgbClr val="808080"/>
+                </a:solidFill>
+              </a:rPr>
+              <a:t>(-1,-1)</a:t>
+            </a:r>
+          </a:p>
+        </p:txBody>
+      </p:sp>
+      <p:sp>
+        <p:nvSpPr>
+          <p:cNvPr id="10" name="TextBox 9">
+            <a:extLst>
+              <a:ext uri="{FF2B5EF4-FFF2-40B4-BE49-F238E27FC236}">
+                <a16:creationId xmlns:a16="http://schemas.microsoft.com/office/drawing/2014/main" id="{A0B09937-F624-692A-E9CC-A457CD82DD31}"/>
+              </a:ext>
+            </a:extLst>
+          </p:cNvPr>
+          <p:cNvSpPr txBox="1"/>
+          <p:nvPr/>
+        </p:nvSpPr>
+        <p:spPr>
+          <a:xfrm>
+            <a:off x="7246538" y="5080835"/>
+            <a:ext cx="862737" cy="461665"/>
+          </a:xfrm>
+          <a:prstGeom prst="rect">
+            <a:avLst/>
+          </a:prstGeom>
+          <a:noFill/>
+        </p:spPr>
+        <p:txBody>
+          <a:bodyPr wrap="none" rtlCol="0">
+            <a:spAutoFit/>
+          </a:bodyPr>
+          <a:lstStyle/>
+          <a:p>
+            <a:r>
+              <a:rPr lang="en-US" sz="2400" b="1" dirty="0">
+                <a:solidFill>
+                  <a:srgbClr val="808080"/>
+                </a:solidFill>
+              </a:rPr>
+              <a:t>(1,-1)</a:t>
+            </a:r>
+          </a:p>
+        </p:txBody>
+      </p:sp>
+      <mc:AlternateContent xmlns:mc="http://schemas.openxmlformats.org/markup-compatibility/2006">
+        <mc:Choice xmlns:a14="http://schemas.microsoft.com/office/drawing/2010/main" Requires="a14">
+          <p:sp>
+            <p:nvSpPr>
+              <p:cNvPr id="23" name="Rectangle: Rounded Corners 22">
+                <a:extLst>
+                  <a:ext uri="{FF2B5EF4-FFF2-40B4-BE49-F238E27FC236}">
+                    <a16:creationId xmlns:a16="http://schemas.microsoft.com/office/drawing/2014/main" id="{00845C87-91AD-323E-A065-55F1089BAECD}"/>
+                  </a:ext>
+                </a:extLst>
+              </p:cNvPr>
+              <p:cNvSpPr/>
+              <p:nvPr/>
+            </p:nvSpPr>
+            <p:spPr>
+              <a:xfrm>
+                <a:off x="6817110" y="2023960"/>
+                <a:ext cx="317473" cy="458070"/>
+              </a:xfrm>
+              <a:prstGeom prst="roundRect">
+                <a:avLst>
+                  <a:gd name="adj" fmla="val 50000"/>
+                </a:avLst>
+              </a:prstGeom>
+              <a:solidFill>
+                <a:schemeClr val="bg1">
+                  <a:alpha val="67000"/>
+                </a:schemeClr>
+              </a:solidFill>
+              <a:ln>
+                <a:noFill/>
+              </a:ln>
+            </p:spPr>
+            <p:style>
+              <a:lnRef idx="2">
+                <a:schemeClr val="accent1">
+                  <a:shade val="15000"/>
+                </a:schemeClr>
+              </a:lnRef>
+              <a:fillRef idx="1">
+                <a:schemeClr val="accent1"/>
+              </a:fillRef>
+              <a:effectRef idx="0">
+                <a:schemeClr val="accent1"/>
+              </a:effectRef>
+              <a:fontRef idx="minor">
+                <a:schemeClr val="lt1"/>
+              </a:fontRef>
+            </p:style>
+            <p:txBody>
+              <a:bodyPr rtlCol="0" anchor="ctr"/>
+              <a:lstStyle/>
+              <a:p>
+                <a:pPr algn="ctr"/>
+                <a14:m>
+                  <m:oMath xmlns:m="http://schemas.openxmlformats.org/officeDocument/2006/math">
+                    <m:r>
+                      <a:rPr lang="en-US" sz="2400" b="1" i="1" smtClean="0">
+                        <a:solidFill>
+                          <a:schemeClr val="accent5"/>
+                        </a:solidFill>
+                        <a:latin typeface="Cambria Math" panose="02040503050406030204" pitchFamily="18" charset="0"/>
+                      </a:rPr>
+                      <m:t>𝟏</m:t>
+                    </m:r>
+                  </m:oMath>
+                </a14:m>
+                <a:r>
+                  <a:rPr lang="en-US" sz="2400" b="1" dirty="0">
+                    <a:solidFill>
+                      <a:schemeClr val="accent5"/>
+                    </a:solidFill>
+                  </a:rPr>
+                  <a:t> </a:t>
+                </a:r>
+              </a:p>
+            </p:txBody>
+          </p:sp>
+        </mc:Choice>
+        <mc:Fallback>
+          <p:sp>
+            <p:nvSpPr>
+              <p:cNvPr id="23" name="Rectangle: Rounded Corners 22">
+                <a:extLst>
+                  <a:ext uri="{FF2B5EF4-FFF2-40B4-BE49-F238E27FC236}">
+                    <a16:creationId xmlns:a16="http://schemas.microsoft.com/office/drawing/2014/main" id="{00845C87-91AD-323E-A065-55F1089BAECD}"/>
+                  </a:ext>
+                </a:extLst>
+              </p:cNvPr>
+              <p:cNvSpPr>
+                <a:spLocks noRot="1" noChangeAspect="1" noMove="1" noResize="1" noEditPoints="1" noAdjustHandles="1" noChangeArrowheads="1" noChangeShapeType="1" noTextEdit="1"/>
+              </p:cNvSpPr>
+              <p:nvPr/>
+            </p:nvSpPr>
+            <p:spPr>
+              <a:xfrm>
+                <a:off x="6817110" y="2023960"/>
+                <a:ext cx="317473" cy="458070"/>
+              </a:xfrm>
+              <a:prstGeom prst="roundRect">
+                <a:avLst>
+                  <a:gd name="adj" fmla="val 50000"/>
+                </a:avLst>
+              </a:prstGeom>
+              <a:blipFill>
+                <a:blip r:embed="rId2"/>
+                <a:stretch>
+                  <a:fillRect l="-11538" r="-13462"/>
+                </a:stretch>
+              </a:blipFill>
+              <a:ln>
+                <a:noFill/>
+              </a:ln>
+            </p:spPr>
+            <p:txBody>
+              <a:bodyPr/>
+              <a:lstStyle/>
+              <a:p>
+                <a:r>
+                  <a:rPr lang="en-US">
+                    <a:noFill/>
+                  </a:rPr>
+                  <a:t> </a:t>
+                </a:r>
+              </a:p>
+            </p:txBody>
+          </p:sp>
+        </mc:Fallback>
+      </mc:AlternateContent>
+      <p:cxnSp>
+        <p:nvCxnSpPr>
+          <p:cNvPr id="24" name="Straight Arrow Connector 23">
+            <a:extLst>
+              <a:ext uri="{FF2B5EF4-FFF2-40B4-BE49-F238E27FC236}">
+                <a16:creationId xmlns:a16="http://schemas.microsoft.com/office/drawing/2014/main" id="{5A8E1EF9-8CB8-AAD5-61BB-944A0F9D7E33}"/>
+              </a:ext>
+            </a:extLst>
+          </p:cNvPr>
+          <p:cNvCxnSpPr>
+            <a:cxnSpLocks/>
+          </p:cNvCxnSpPr>
+          <p:nvPr/>
+        </p:nvCxnSpPr>
+        <p:spPr>
+          <a:xfrm>
+            <a:off x="6534150" y="1981200"/>
+            <a:ext cx="712388" cy="847725"/>
+          </a:xfrm>
+          <a:prstGeom prst="straightConnector1">
+            <a:avLst/>
+          </a:prstGeom>
+          <a:ln w="38100">
+            <a:solidFill>
+              <a:schemeClr val="accent5"/>
+            </a:solidFill>
+            <a:headEnd type="arrow" w="med" len="med"/>
+            <a:tailEnd type="arrow" w="med" len="med"/>
+          </a:ln>
+        </p:spPr>
+        <p:style>
+          <a:lnRef idx="1">
+            <a:schemeClr val="accent1"/>
+          </a:lnRef>
+          <a:fillRef idx="0">
+            <a:schemeClr val="accent1"/>
+          </a:fillRef>
+          <a:effectRef idx="0">
+            <a:schemeClr val="accent1"/>
+          </a:effectRef>
+          <a:fontRef idx="minor">
+            <a:schemeClr val="tx1"/>
+          </a:fontRef>
+        </p:style>
+      </p:cxnSp>
+    </p:spTree>
+    <p:extLst>
+      <p:ext uri="{BB962C8B-B14F-4D97-AF65-F5344CB8AC3E}">
+        <p14:creationId xmlns:p14="http://schemas.microsoft.com/office/powerpoint/2010/main" val="132181447"/>
+      </p:ext>
+    </p:extLst>
+  </p:cSld>
+  <p:clrMapOvr>
+    <a:masterClrMapping/>
+  </p:clrMapOvr>
+  <mc:AlternateContent xmlns:mc="http://schemas.openxmlformats.org/markup-compatibility/2006">
+    <mc:Choice xmlns:p14="http://schemas.microsoft.com/office/powerpoint/2010/main" Requires="p14">
+      <p:transition spd="med" p14:dur="700">
+        <p:fade/>
+      </p:transition>
+    </mc:Choice>
+    <mc:Fallback>
+      <p:transition spd="med">
+        <p:fade/>
+      </p:transition>
+    </mc:Fallback>
+  </mc:AlternateContent>
+  <p:timing>
+    <p:tnLst>
+      <p:par>
+        <p:cTn id="1" dur="indefinite" restart="never" nodeType="tmRoot">
+          <p:childTnLst>
+            <p:seq concurrent="1" nextAc="seek">
+              <p:cTn id="2" dur="indefinite" nodeType="mainSeq">
+                <p:childTnLst>
+                  <p:par>
+                    <p:cTn id="3" fill="hold">
+                      <p:stCondLst>
+                        <p:cond delay="indefinite"/>
+                        <p:cond evt="onBegin" delay="0">
+                          <p:tn val="2"/>
+                        </p:cond>
+                      </p:stCondLst>
+                      <p:childTnLst>
+                        <p:par>
+                          <p:cTn id="4" fill="hold">
+                            <p:stCondLst>
+                              <p:cond delay="0"/>
+                            </p:stCondLst>
+                            <p:childTnLst>
+                              <p:par>
+                                <p:cTn id="5" presetID="10" presetClass="entr" presetSubtype="0" fill="hold" grpId="0" nodeType="afterEffect">
+                                  <p:stCondLst>
+                                    <p:cond delay="0"/>
+                                  </p:stCondLst>
+                                  <p:childTnLst>
+                                    <p:set>
+                                      <p:cBhvr>
+                                        <p:cTn id="6" dur="1" fill="hold">
+                                          <p:stCondLst>
+                                            <p:cond delay="0"/>
+                                          </p:stCondLst>
+                                        </p:cTn>
+                                        <p:tgtEl>
+                                          <p:spTgt spid="13"/>
+                                        </p:tgtEl>
+                                        <p:attrNameLst>
+                                          <p:attrName>style.visibility</p:attrName>
+                                        </p:attrNameLst>
+                                      </p:cBhvr>
+                                      <p:to>
+                                        <p:strVal val="visible"/>
+                                      </p:to>
+                                    </p:set>
+                                    <p:animEffect transition="in" filter="fade">
+                                      <p:cBhvr>
+                                        <p:cTn id="7" dur="500"/>
+                                        <p:tgtEl>
+                                          <p:spTgt spid="13"/>
+                                        </p:tgtEl>
+                                      </p:cBhvr>
+                                    </p:animEffect>
+                                  </p:childTnLst>
+                                </p:cTn>
+                              </p:par>
+                              <p:par>
+                                <p:cTn id="8" presetID="10" presetClass="entr" presetSubtype="0" fill="hold" grpId="0" nodeType="withEffect">
+                                  <p:stCondLst>
+                                    <p:cond delay="0"/>
+                                  </p:stCondLst>
+                                  <p:childTnLst>
+                                    <p:set>
+                                      <p:cBhvr>
+                                        <p:cTn id="9" dur="1" fill="hold">
+                                          <p:stCondLst>
+                                            <p:cond delay="0"/>
+                                          </p:stCondLst>
+                                        </p:cTn>
+                                        <p:tgtEl>
+                                          <p:spTgt spid="14"/>
+                                        </p:tgtEl>
+                                        <p:attrNameLst>
+                                          <p:attrName>style.visibility</p:attrName>
+                                        </p:attrNameLst>
+                                      </p:cBhvr>
+                                      <p:to>
+                                        <p:strVal val="visible"/>
+                                      </p:to>
+                                    </p:set>
+                                    <p:animEffect transition="in" filter="fade">
+                                      <p:cBhvr>
+                                        <p:cTn id="10" dur="500"/>
+                                        <p:tgtEl>
+                                          <p:spTgt spid="14"/>
+                                        </p:tgtEl>
+                                      </p:cBhvr>
+                                    </p:animEffect>
+                                  </p:childTnLst>
+                                </p:cTn>
+                              </p:par>
+                              <p:par>
+                                <p:cTn id="11" presetID="10" presetClass="entr" presetSubtype="0" fill="hold" grpId="0" nodeType="withEffect">
+                                  <p:stCondLst>
+                                    <p:cond delay="0"/>
+                                  </p:stCondLst>
+                                  <p:childTnLst>
+                                    <p:set>
+                                      <p:cBhvr>
+                                        <p:cTn id="12" dur="1" fill="hold">
+                                          <p:stCondLst>
+                                            <p:cond delay="0"/>
+                                          </p:stCondLst>
+                                        </p:cTn>
+                                        <p:tgtEl>
+                                          <p:spTgt spid="15"/>
+                                        </p:tgtEl>
+                                        <p:attrNameLst>
+                                          <p:attrName>style.visibility</p:attrName>
+                                        </p:attrNameLst>
+                                      </p:cBhvr>
+                                      <p:to>
+                                        <p:strVal val="visible"/>
+                                      </p:to>
+                                    </p:set>
+                                    <p:animEffect transition="in" filter="fade">
+                                      <p:cBhvr>
+                                        <p:cTn id="13" dur="500"/>
+                                        <p:tgtEl>
+                                          <p:spTgt spid="15"/>
+                                        </p:tgtEl>
+                                      </p:cBhvr>
+                                    </p:animEffect>
+                                  </p:childTnLst>
+                                </p:cTn>
+                              </p:par>
+                              <p:par>
+                                <p:cTn id="14" presetID="10" presetClass="entr" presetSubtype="0" fill="hold" grpId="0" nodeType="withEffect">
+                                  <p:stCondLst>
+                                    <p:cond delay="0"/>
+                                  </p:stCondLst>
+                                  <p:childTnLst>
+                                    <p:set>
+                                      <p:cBhvr>
+                                        <p:cTn id="15" dur="1" fill="hold">
+                                          <p:stCondLst>
+                                            <p:cond delay="0"/>
+                                          </p:stCondLst>
+                                        </p:cTn>
+                                        <p:tgtEl>
+                                          <p:spTgt spid="16"/>
+                                        </p:tgtEl>
+                                        <p:attrNameLst>
+                                          <p:attrName>style.visibility</p:attrName>
+                                        </p:attrNameLst>
+                                      </p:cBhvr>
+                                      <p:to>
+                                        <p:strVal val="visible"/>
+                                      </p:to>
+                                    </p:set>
+                                    <p:animEffect transition="in" filter="fade">
+                                      <p:cBhvr>
+                                        <p:cTn id="16" dur="500"/>
+                                        <p:tgtEl>
+                                          <p:spTgt spid="16"/>
+                                        </p:tgtEl>
+                                      </p:cBhvr>
+                                    </p:animEffect>
+                                  </p:childTnLst>
+                                </p:cTn>
+                              </p:par>
+                            </p:childTnLst>
+                          </p:cTn>
+                        </p:par>
+                        <p:par>
+                          <p:cTn id="17" fill="hold">
+                            <p:stCondLst>
+                              <p:cond delay="500"/>
+                            </p:stCondLst>
+                            <p:childTnLst>
+                              <p:par>
+                                <p:cTn id="18" presetID="10" presetClass="entr" presetSubtype="0" fill="hold" grpId="0" nodeType="afterEffect">
+                                  <p:stCondLst>
+                                    <p:cond delay="0"/>
+                                  </p:stCondLst>
+                                  <p:childTnLst>
+                                    <p:set>
+                                      <p:cBhvr>
+                                        <p:cTn id="19" dur="1" fill="hold">
+                                          <p:stCondLst>
+                                            <p:cond delay="0"/>
+                                          </p:stCondLst>
+                                        </p:cTn>
+                                        <p:tgtEl>
+                                          <p:spTgt spid="7"/>
+                                        </p:tgtEl>
+                                        <p:attrNameLst>
+                                          <p:attrName>style.visibility</p:attrName>
+                                        </p:attrNameLst>
+                                      </p:cBhvr>
+                                      <p:to>
+                                        <p:strVal val="visible"/>
+                                      </p:to>
+                                    </p:set>
+                                    <p:animEffect transition="in" filter="fade">
+                                      <p:cBhvr>
+                                        <p:cTn id="20" dur="500"/>
+                                        <p:tgtEl>
+                                          <p:spTgt spid="7"/>
+                                        </p:tgtEl>
+                                      </p:cBhvr>
+                                    </p:animEffect>
+                                  </p:childTnLst>
+                                </p:cTn>
+                              </p:par>
+                              <p:par>
+                                <p:cTn id="21" presetID="10" presetClass="entr" presetSubtype="0" fill="hold" grpId="0" nodeType="withEffect">
+                                  <p:stCondLst>
+                                    <p:cond delay="0"/>
+                                  </p:stCondLst>
+                                  <p:childTnLst>
+                                    <p:set>
+                                      <p:cBhvr>
+                                        <p:cTn id="22" dur="1" fill="hold">
+                                          <p:stCondLst>
+                                            <p:cond delay="0"/>
+                                          </p:stCondLst>
+                                        </p:cTn>
+                                        <p:tgtEl>
+                                          <p:spTgt spid="8"/>
+                                        </p:tgtEl>
+                                        <p:attrNameLst>
+                                          <p:attrName>style.visibility</p:attrName>
+                                        </p:attrNameLst>
+                                      </p:cBhvr>
+                                      <p:to>
+                                        <p:strVal val="visible"/>
+                                      </p:to>
+                                    </p:set>
+                                    <p:animEffect transition="in" filter="fade">
+                                      <p:cBhvr>
+                                        <p:cTn id="23" dur="500"/>
+                                        <p:tgtEl>
+                                          <p:spTgt spid="8"/>
+                                        </p:tgtEl>
+                                      </p:cBhvr>
+                                    </p:animEffect>
+                                  </p:childTnLst>
+                                </p:cTn>
+                              </p:par>
+                              <p:par>
+                                <p:cTn id="24" presetID="10" presetClass="entr" presetSubtype="0" fill="hold" grpId="0" nodeType="withEffect">
+                                  <p:stCondLst>
+                                    <p:cond delay="0"/>
+                                  </p:stCondLst>
+                                  <p:childTnLst>
+                                    <p:set>
+                                      <p:cBhvr>
+                                        <p:cTn id="25" dur="1" fill="hold">
+                                          <p:stCondLst>
+                                            <p:cond delay="0"/>
+                                          </p:stCondLst>
+                                        </p:cTn>
+                                        <p:tgtEl>
+                                          <p:spTgt spid="9"/>
+                                        </p:tgtEl>
+                                        <p:attrNameLst>
+                                          <p:attrName>style.visibility</p:attrName>
+                                        </p:attrNameLst>
+                                      </p:cBhvr>
+                                      <p:to>
+                                        <p:strVal val="visible"/>
+                                      </p:to>
+                                    </p:set>
+                                    <p:animEffect transition="in" filter="fade">
+                                      <p:cBhvr>
+                                        <p:cTn id="26" dur="500"/>
+                                        <p:tgtEl>
+                                          <p:spTgt spid="9"/>
+                                        </p:tgtEl>
+                                      </p:cBhvr>
+                                    </p:animEffect>
+                                  </p:childTnLst>
+                                </p:cTn>
+                              </p:par>
+                              <p:par>
+                                <p:cTn id="27" presetID="10" presetClass="entr" presetSubtype="0" fill="hold" grpId="0" nodeType="withEffect">
+                                  <p:stCondLst>
+                                    <p:cond delay="0"/>
+                                  </p:stCondLst>
+                                  <p:childTnLst>
+                                    <p:set>
+                                      <p:cBhvr>
+                                        <p:cTn id="28" dur="1" fill="hold">
+                                          <p:stCondLst>
+                                            <p:cond delay="0"/>
+                                          </p:stCondLst>
+                                        </p:cTn>
+                                        <p:tgtEl>
+                                          <p:spTgt spid="10"/>
+                                        </p:tgtEl>
+                                        <p:attrNameLst>
+                                          <p:attrName>style.visibility</p:attrName>
+                                        </p:attrNameLst>
+                                      </p:cBhvr>
+                                      <p:to>
+                                        <p:strVal val="visible"/>
+                                      </p:to>
+                                    </p:set>
+                                    <p:animEffect transition="in" filter="fade">
+                                      <p:cBhvr>
+                                        <p:cTn id="29" dur="500"/>
+                                        <p:tgtEl>
+                                          <p:spTgt spid="10"/>
+                                        </p:tgtEl>
+                                      </p:cBhvr>
+                                    </p:animEffect>
+                                  </p:childTnLst>
+                                </p:cTn>
+                              </p:par>
+                            </p:childTnLst>
+                          </p:cTn>
+                        </p:par>
+                        <p:par>
+                          <p:cTn id="30" fill="hold">
+                            <p:stCondLst>
+                              <p:cond delay="1000"/>
+                            </p:stCondLst>
+                            <p:childTnLst>
+                              <p:par>
+                                <p:cTn id="31" presetID="10" presetClass="entr" presetSubtype="0" fill="hold" nodeType="afterEffect">
+                                  <p:stCondLst>
+                                    <p:cond delay="0"/>
+                                  </p:stCondLst>
+                                  <p:childTnLst>
+                                    <p:set>
+                                      <p:cBhvr>
+                                        <p:cTn id="32" dur="1" fill="hold">
+                                          <p:stCondLst>
+                                            <p:cond delay="0"/>
+                                          </p:stCondLst>
+                                        </p:cTn>
+                                        <p:tgtEl>
+                                          <p:spTgt spid="24"/>
+                                        </p:tgtEl>
+                                        <p:attrNameLst>
+                                          <p:attrName>style.visibility</p:attrName>
+                                        </p:attrNameLst>
+                                      </p:cBhvr>
+                                      <p:to>
+                                        <p:strVal val="visible"/>
+                                      </p:to>
+                                    </p:set>
+                                    <p:animEffect transition="in" filter="fade">
+                                      <p:cBhvr>
+                                        <p:cTn id="33" dur="500"/>
+                                        <p:tgtEl>
+                                          <p:spTgt spid="24"/>
+                                        </p:tgtEl>
+                                      </p:cBhvr>
+                                    </p:animEffect>
+                                  </p:childTnLst>
+                                </p:cTn>
+                              </p:par>
+                            </p:childTnLst>
+                          </p:cTn>
+                        </p:par>
+                        <p:par>
+                          <p:cTn id="34" fill="hold">
+                            <p:stCondLst>
+                              <p:cond delay="1500"/>
+                            </p:stCondLst>
+                            <p:childTnLst>
+                              <p:par>
+                                <p:cTn id="35" presetID="10" presetClass="entr" presetSubtype="0" fill="hold" grpId="0" nodeType="afterEffect">
+                                  <p:stCondLst>
+                                    <p:cond delay="0"/>
+                                  </p:stCondLst>
+                                  <p:childTnLst>
+                                    <p:set>
+                                      <p:cBhvr>
+                                        <p:cTn id="36" dur="1" fill="hold">
+                                          <p:stCondLst>
+                                            <p:cond delay="0"/>
+                                          </p:stCondLst>
+                                        </p:cTn>
+                                        <p:tgtEl>
+                                          <p:spTgt spid="23"/>
+                                        </p:tgtEl>
+                                        <p:attrNameLst>
+                                          <p:attrName>style.visibility</p:attrName>
+                                        </p:attrNameLst>
+                                      </p:cBhvr>
+                                      <p:to>
+                                        <p:strVal val="visible"/>
+                                      </p:to>
+                                    </p:set>
+                                    <p:animEffect transition="in" filter="fade">
+                                      <p:cBhvr>
+                                        <p:cTn id="37" dur="500"/>
+                                        <p:tgtEl>
+                                          <p:spTgt spid="23"/>
+                                        </p:tgtEl>
+                                      </p:cBhvr>
+                                    </p:animEffect>
+                                  </p:childTnLst>
+                                </p:cTn>
+                              </p:par>
+                            </p:childTnLst>
+                          </p:cTn>
+                        </p:par>
+                      </p:childTnLst>
+                    </p:cTn>
+                  </p:par>
+                </p:childTnLst>
+              </p:cTn>
+              <p:prevCondLst>
+                <p:cond evt="onPrev" delay="0">
+                  <p:tgtEl>
+                    <p:sldTgt/>
+                  </p:tgtEl>
+                </p:cond>
+              </p:prevCondLst>
+              <p:nextCondLst>
+                <p:cond evt="onNext" delay="0">
+                  <p:tgtEl>
+                    <p:sldTgt/>
+                  </p:tgtEl>
+                </p:cond>
+              </p:nextCondLst>
+            </p:seq>
+          </p:childTnLst>
+        </p:cTn>
+      </p:par>
+    </p:tnLst>
+    <p:bldLst>
+      <p:bldP spid="13" grpId="0" animBg="1"/>
+      <p:bldP spid="14" grpId="0" animBg="1"/>
+      <p:bldP spid="15" grpId="0" animBg="1"/>
+      <p:bldP spid="16" grpId="0" animBg="1"/>
+      <p:bldP spid="7" grpId="0"/>
+      <p:bldP spid="8" grpId="0"/>
+      <p:bldP spid="9" grpId="0"/>
+      <p:bldP spid="10" grpId="0"/>
+      <p:bldP spid="23" grpId="0" animBg="1"/>
+    </p:bldLst>
+  </p:timing>
+</p:sld>
+</file>
+
 <file path=ppt/slides/slide2.xml><?xml version="1.0" encoding="utf-8"?>
 <p:sld xmlns:a="http://schemas.openxmlformats.org/drawingml/2006/main" xmlns:r="http://schemas.openxmlformats.org/officeDocument/2006/relationships" xmlns:p="http://schemas.openxmlformats.org/presentationml/2006/main">
   <p:cSld>

</xml_diff>

<commit_message>
4 circles paradox: inside circle
</commit_message>
<xml_diff>
--- a/slides_x_mas_2023.pptx
+++ b/slides_x_mas_2023.pptx
@@ -17,6 +17,7 @@
     <p:sldId id="268" r:id="rId11"/>
     <p:sldId id="272" r:id="rId12"/>
     <p:sldId id="273" r:id="rId13"/>
+    <p:sldId id="269" r:id="rId14"/>
   </p:sldIdLst>
   <p:sldSz cx="12192000" cy="6858000"/>
   <p:notesSz cx="6858000" cy="9144000"/>
@@ -143,6 +144,7 @@
             <p14:sldId id="268"/>
             <p14:sldId id="272"/>
             <p14:sldId id="273"/>
+            <p14:sldId id="269"/>
           </p14:sldIdLst>
         </p14:section>
         <p14:section name="Over-Interpretations" id="{9711BCF0-0EF2-435D-A2E2-B5014891C597}">
@@ -6286,6 +6288,1915 @@
 </p:sld>
 </file>
 
+<file path=ppt/slides/slide13.xml><?xml version="1.0" encoding="utf-8"?>
+<p:sld xmlns:a="http://schemas.openxmlformats.org/drawingml/2006/main" xmlns:r="http://schemas.openxmlformats.org/officeDocument/2006/relationships" xmlns:p="http://schemas.openxmlformats.org/presentationml/2006/main">
+  <p:cSld>
+    <p:spTree>
+      <p:nvGrpSpPr>
+        <p:cNvPr id="1" name=""/>
+        <p:cNvGrpSpPr/>
+        <p:nvPr/>
+      </p:nvGrpSpPr>
+      <p:grpSpPr>
+        <a:xfrm>
+          <a:off x="0" y="0"/>
+          <a:ext cx="0" cy="0"/>
+          <a:chOff x="0" y="0"/>
+          <a:chExt cx="0" cy="0"/>
+        </a:xfrm>
+      </p:grpSpPr>
+      <p:sp>
+        <p:nvSpPr>
+          <p:cNvPr id="2" name="Title 1">
+            <a:extLst>
+              <a:ext uri="{FF2B5EF4-FFF2-40B4-BE49-F238E27FC236}">
+                <a16:creationId xmlns:a16="http://schemas.microsoft.com/office/drawing/2014/main" id="{43AB76A5-DDCA-2DC9-EBD8-9B80787C8E1F}"/>
+              </a:ext>
+            </a:extLst>
+          </p:cNvPr>
+          <p:cNvSpPr>
+            <a:spLocks noGrp="1"/>
+          </p:cNvSpPr>
+          <p:nvPr>
+            <p:ph type="title"/>
+          </p:nvPr>
+        </p:nvSpPr>
+        <p:spPr/>
+        <p:txBody>
+          <a:bodyPr/>
+          <a:lstStyle/>
+          <a:p>
+            <a:r>
+              <a:rPr lang="en-US" dirty="0"/>
+              <a:t>4 circles paradox</a:t>
+            </a:r>
+          </a:p>
+        </p:txBody>
+      </p:sp>
+      <p:sp>
+        <p:nvSpPr>
+          <p:cNvPr id="11" name="Freeform: Shape 10">
+            <a:extLst>
+              <a:ext uri="{FF2B5EF4-FFF2-40B4-BE49-F238E27FC236}">
+                <a16:creationId xmlns:a16="http://schemas.microsoft.com/office/drawing/2014/main" id="{E033A28E-0C8A-AF71-25E9-358F61F4736E}"/>
+              </a:ext>
+            </a:extLst>
+          </p:cNvPr>
+          <p:cNvSpPr/>
+          <p:nvPr/>
+        </p:nvSpPr>
+        <p:spPr>
+          <a:xfrm>
+            <a:off x="6100644" y="1172419"/>
+            <a:ext cx="57134" cy="5673416"/>
+          </a:xfrm>
+          <a:custGeom>
+            <a:avLst/>
+            <a:gdLst>
+              <a:gd name="connsiteX0" fmla="*/ 0 w 57134"/>
+              <a:gd name="connsiteY0" fmla="*/ 5673417 h 5673416"/>
+              <a:gd name="connsiteX1" fmla="*/ 0 w 57134"/>
+              <a:gd name="connsiteY1" fmla="*/ 0 h 5673416"/>
+            </a:gdLst>
+            <a:ahLst/>
+            <a:cxnLst>
+              <a:cxn ang="0">
+                <a:pos x="connsiteX0" y="connsiteY0"/>
+              </a:cxn>
+              <a:cxn ang="0">
+                <a:pos x="connsiteX1" y="connsiteY1"/>
+              </a:cxn>
+            </a:cxnLst>
+            <a:rect l="l" t="t" r="r" b="b"/>
+            <a:pathLst>
+              <a:path w="57134" h="5673416">
+                <a:moveTo>
+                  <a:pt x="0" y="5673417"/>
+                </a:moveTo>
+                <a:lnTo>
+                  <a:pt x="0" y="0"/>
+                </a:lnTo>
+              </a:path>
+            </a:pathLst>
+          </a:custGeom>
+          <a:solidFill>
+            <a:srgbClr val="000000">
+              <a:alpha val="50000"/>
+            </a:srgbClr>
+          </a:solidFill>
+          <a:ln w="34233" cap="sq">
+            <a:solidFill>
+              <a:srgbClr val="000000"/>
+            </a:solidFill>
+            <a:prstDash val="solid"/>
+            <a:miter/>
+            <a:tailEnd type="arrow"/>
+          </a:ln>
+        </p:spPr>
+        <p:txBody>
+          <a:bodyPr rtlCol="0" anchor="ctr"/>
+          <a:lstStyle/>
+          <a:p>
+            <a:endParaRPr lang="en-US"/>
+          </a:p>
+        </p:txBody>
+      </p:sp>
+      <p:sp>
+        <p:nvSpPr>
+          <p:cNvPr id="12" name="Freeform: Shape 11">
+            <a:extLst>
+              <a:ext uri="{FF2B5EF4-FFF2-40B4-BE49-F238E27FC236}">
+                <a16:creationId xmlns:a16="http://schemas.microsoft.com/office/drawing/2014/main" id="{AF57F973-4873-579E-B69C-60C91206DBB9}"/>
+              </a:ext>
+            </a:extLst>
+          </p:cNvPr>
+          <p:cNvSpPr/>
+          <p:nvPr/>
+        </p:nvSpPr>
+        <p:spPr>
+          <a:xfrm>
+            <a:off x="3243940" y="3989130"/>
+            <a:ext cx="5673416" cy="57134"/>
+          </a:xfrm>
+          <a:custGeom>
+            <a:avLst/>
+            <a:gdLst>
+              <a:gd name="connsiteX0" fmla="*/ 0 w 5673416"/>
+              <a:gd name="connsiteY0" fmla="*/ 0 h 57134"/>
+              <a:gd name="connsiteX1" fmla="*/ 5673417 w 5673416"/>
+              <a:gd name="connsiteY1" fmla="*/ 0 h 57134"/>
+            </a:gdLst>
+            <a:ahLst/>
+            <a:cxnLst>
+              <a:cxn ang="0">
+                <a:pos x="connsiteX0" y="connsiteY0"/>
+              </a:cxn>
+              <a:cxn ang="0">
+                <a:pos x="connsiteX1" y="connsiteY1"/>
+              </a:cxn>
+            </a:cxnLst>
+            <a:rect l="l" t="t" r="r" b="b"/>
+            <a:pathLst>
+              <a:path w="5673416" h="57134">
+                <a:moveTo>
+                  <a:pt x="0" y="0"/>
+                </a:moveTo>
+                <a:lnTo>
+                  <a:pt x="5673417" y="0"/>
+                </a:lnTo>
+              </a:path>
+            </a:pathLst>
+          </a:custGeom>
+          <a:solidFill>
+            <a:srgbClr val="000000">
+              <a:alpha val="50000"/>
+            </a:srgbClr>
+          </a:solidFill>
+          <a:ln w="34233" cap="sq">
+            <a:solidFill>
+              <a:srgbClr val="000000"/>
+            </a:solidFill>
+            <a:prstDash val="solid"/>
+            <a:miter/>
+            <a:tailEnd type="arrow"/>
+          </a:ln>
+        </p:spPr>
+        <p:txBody>
+          <a:bodyPr rtlCol="0" anchor="ctr"/>
+          <a:lstStyle/>
+          <a:p>
+            <a:endParaRPr lang="en-US"/>
+          </a:p>
+        </p:txBody>
+      </p:sp>
+      <p:sp>
+        <p:nvSpPr>
+          <p:cNvPr id="13" name="Freeform: Shape 12">
+            <a:extLst>
+              <a:ext uri="{FF2B5EF4-FFF2-40B4-BE49-F238E27FC236}">
+                <a16:creationId xmlns:a16="http://schemas.microsoft.com/office/drawing/2014/main" id="{EBB250A9-01B5-A9A8-C2E0-63EC801B8D27}"/>
+              </a:ext>
+            </a:extLst>
+          </p:cNvPr>
+          <p:cNvSpPr/>
+          <p:nvPr/>
+        </p:nvSpPr>
+        <p:spPr>
+          <a:xfrm>
+            <a:off x="7198454" y="2773007"/>
+            <a:ext cx="118313" cy="118319"/>
+          </a:xfrm>
+          <a:custGeom>
+            <a:avLst/>
+            <a:gdLst>
+              <a:gd name="connsiteX0" fmla="*/ 118313 w 118313"/>
+              <a:gd name="connsiteY0" fmla="*/ 0 h 118319"/>
+              <a:gd name="connsiteX1" fmla="*/ 1211 w 118313"/>
+              <a:gd name="connsiteY1" fmla="*/ 117474 h 118319"/>
+              <a:gd name="connsiteX2" fmla="*/ 0 w 118313"/>
+              <a:gd name="connsiteY2" fmla="*/ 846 h 118319"/>
+              <a:gd name="connsiteX3" fmla="*/ 117102 w 118313"/>
+              <a:gd name="connsiteY3" fmla="*/ 118319 h 118319"/>
+            </a:gdLst>
+            <a:ahLst/>
+            <a:cxnLst>
+              <a:cxn ang="0">
+                <a:pos x="connsiteX0" y="connsiteY0"/>
+              </a:cxn>
+              <a:cxn ang="0">
+                <a:pos x="connsiteX1" y="connsiteY1"/>
+              </a:cxn>
+              <a:cxn ang="0">
+                <a:pos x="connsiteX2" y="connsiteY2"/>
+              </a:cxn>
+              <a:cxn ang="0">
+                <a:pos x="connsiteX3" y="connsiteY3"/>
+              </a:cxn>
+            </a:cxnLst>
+            <a:rect l="l" t="t" r="r" b="b"/>
+            <a:pathLst>
+              <a:path w="118313" h="118319">
+                <a:moveTo>
+                  <a:pt x="118313" y="0"/>
+                </a:moveTo>
+                <a:lnTo>
+                  <a:pt x="1211" y="117474"/>
+                </a:lnTo>
+                <a:moveTo>
+                  <a:pt x="0" y="846"/>
+                </a:moveTo>
+                <a:lnTo>
+                  <a:pt x="117102" y="118319"/>
+                </a:lnTo>
+              </a:path>
+            </a:pathLst>
+          </a:custGeom>
+          <a:noFill/>
+          <a:ln w="24486" cap="rnd">
+            <a:solidFill>
+              <a:srgbClr val="808080"/>
+            </a:solidFill>
+            <a:prstDash val="solid"/>
+            <a:miter/>
+          </a:ln>
+        </p:spPr>
+        <p:txBody>
+          <a:bodyPr rtlCol="0" anchor="ctr"/>
+          <a:lstStyle/>
+          <a:p>
+            <a:endParaRPr lang="en-US"/>
+          </a:p>
+        </p:txBody>
+      </p:sp>
+      <p:sp>
+        <p:nvSpPr>
+          <p:cNvPr id="14" name="Freeform: Shape 13">
+            <a:extLst>
+              <a:ext uri="{FF2B5EF4-FFF2-40B4-BE49-F238E27FC236}">
+                <a16:creationId xmlns:a16="http://schemas.microsoft.com/office/drawing/2014/main" id="{A4DDC5C8-D3CF-896F-1915-6DD2393BDE25}"/>
+              </a:ext>
+            </a:extLst>
+          </p:cNvPr>
+          <p:cNvSpPr/>
+          <p:nvPr/>
+        </p:nvSpPr>
+        <p:spPr>
+          <a:xfrm>
+            <a:off x="4884522" y="2773007"/>
+            <a:ext cx="118313" cy="118319"/>
+          </a:xfrm>
+          <a:custGeom>
+            <a:avLst/>
+            <a:gdLst>
+              <a:gd name="connsiteX0" fmla="*/ 118313 w 118313"/>
+              <a:gd name="connsiteY0" fmla="*/ 0 h 118319"/>
+              <a:gd name="connsiteX1" fmla="*/ 1211 w 118313"/>
+              <a:gd name="connsiteY1" fmla="*/ 117474 h 118319"/>
+              <a:gd name="connsiteX2" fmla="*/ 0 w 118313"/>
+              <a:gd name="connsiteY2" fmla="*/ 846 h 118319"/>
+              <a:gd name="connsiteX3" fmla="*/ 117102 w 118313"/>
+              <a:gd name="connsiteY3" fmla="*/ 118319 h 118319"/>
+            </a:gdLst>
+            <a:ahLst/>
+            <a:cxnLst>
+              <a:cxn ang="0">
+                <a:pos x="connsiteX0" y="connsiteY0"/>
+              </a:cxn>
+              <a:cxn ang="0">
+                <a:pos x="connsiteX1" y="connsiteY1"/>
+              </a:cxn>
+              <a:cxn ang="0">
+                <a:pos x="connsiteX2" y="connsiteY2"/>
+              </a:cxn>
+              <a:cxn ang="0">
+                <a:pos x="connsiteX3" y="connsiteY3"/>
+              </a:cxn>
+            </a:cxnLst>
+            <a:rect l="l" t="t" r="r" b="b"/>
+            <a:pathLst>
+              <a:path w="118313" h="118319">
+                <a:moveTo>
+                  <a:pt x="118313" y="0"/>
+                </a:moveTo>
+                <a:lnTo>
+                  <a:pt x="1211" y="117474"/>
+                </a:lnTo>
+                <a:moveTo>
+                  <a:pt x="0" y="846"/>
+                </a:moveTo>
+                <a:lnTo>
+                  <a:pt x="117102" y="118319"/>
+                </a:lnTo>
+              </a:path>
+            </a:pathLst>
+          </a:custGeom>
+          <a:noFill/>
+          <a:ln w="24486" cap="rnd">
+            <a:solidFill>
+              <a:srgbClr val="808080"/>
+            </a:solidFill>
+            <a:prstDash val="solid"/>
+            <a:miter/>
+          </a:ln>
+        </p:spPr>
+        <p:txBody>
+          <a:bodyPr rtlCol="0" anchor="ctr"/>
+          <a:lstStyle/>
+          <a:p>
+            <a:endParaRPr lang="en-US"/>
+          </a:p>
+        </p:txBody>
+      </p:sp>
+      <p:sp>
+        <p:nvSpPr>
+          <p:cNvPr id="15" name="Freeform: Shape 14">
+            <a:extLst>
+              <a:ext uri="{FF2B5EF4-FFF2-40B4-BE49-F238E27FC236}">
+                <a16:creationId xmlns:a16="http://schemas.microsoft.com/office/drawing/2014/main" id="{FC309EB5-9A19-0F14-FE29-80DB88C82A77}"/>
+              </a:ext>
+            </a:extLst>
+          </p:cNvPr>
+          <p:cNvSpPr/>
+          <p:nvPr/>
+        </p:nvSpPr>
+        <p:spPr>
+          <a:xfrm>
+            <a:off x="4884522" y="5086939"/>
+            <a:ext cx="118313" cy="118313"/>
+          </a:xfrm>
+          <a:custGeom>
+            <a:avLst/>
+            <a:gdLst>
+              <a:gd name="connsiteX0" fmla="*/ 118313 w 118313"/>
+              <a:gd name="connsiteY0" fmla="*/ 0 h 118313"/>
+              <a:gd name="connsiteX1" fmla="*/ 1211 w 118313"/>
+              <a:gd name="connsiteY1" fmla="*/ 117473 h 118313"/>
+              <a:gd name="connsiteX2" fmla="*/ 0 w 118313"/>
+              <a:gd name="connsiteY2" fmla="*/ 846 h 118313"/>
+              <a:gd name="connsiteX3" fmla="*/ 117102 w 118313"/>
+              <a:gd name="connsiteY3" fmla="*/ 118313 h 118313"/>
+            </a:gdLst>
+            <a:ahLst/>
+            <a:cxnLst>
+              <a:cxn ang="0">
+                <a:pos x="connsiteX0" y="connsiteY0"/>
+              </a:cxn>
+              <a:cxn ang="0">
+                <a:pos x="connsiteX1" y="connsiteY1"/>
+              </a:cxn>
+              <a:cxn ang="0">
+                <a:pos x="connsiteX2" y="connsiteY2"/>
+              </a:cxn>
+              <a:cxn ang="0">
+                <a:pos x="connsiteX3" y="connsiteY3"/>
+              </a:cxn>
+            </a:cxnLst>
+            <a:rect l="l" t="t" r="r" b="b"/>
+            <a:pathLst>
+              <a:path w="118313" h="118313">
+                <a:moveTo>
+                  <a:pt x="118313" y="0"/>
+                </a:moveTo>
+                <a:lnTo>
+                  <a:pt x="1211" y="117473"/>
+                </a:lnTo>
+                <a:moveTo>
+                  <a:pt x="0" y="846"/>
+                </a:moveTo>
+                <a:lnTo>
+                  <a:pt x="117102" y="118313"/>
+                </a:lnTo>
+              </a:path>
+            </a:pathLst>
+          </a:custGeom>
+          <a:noFill/>
+          <a:ln w="24486" cap="rnd">
+            <a:solidFill>
+              <a:srgbClr val="808080"/>
+            </a:solidFill>
+            <a:prstDash val="solid"/>
+            <a:miter/>
+          </a:ln>
+        </p:spPr>
+        <p:txBody>
+          <a:bodyPr rtlCol="0" anchor="ctr"/>
+          <a:lstStyle/>
+          <a:p>
+            <a:endParaRPr lang="en-US"/>
+          </a:p>
+        </p:txBody>
+      </p:sp>
+      <p:sp>
+        <p:nvSpPr>
+          <p:cNvPr id="16" name="Freeform: Shape 15">
+            <a:extLst>
+              <a:ext uri="{FF2B5EF4-FFF2-40B4-BE49-F238E27FC236}">
+                <a16:creationId xmlns:a16="http://schemas.microsoft.com/office/drawing/2014/main" id="{3F831900-4E44-A885-9ADE-2BB52E0324DC}"/>
+              </a:ext>
+            </a:extLst>
+          </p:cNvPr>
+          <p:cNvSpPr/>
+          <p:nvPr/>
+        </p:nvSpPr>
+        <p:spPr>
+          <a:xfrm>
+            <a:off x="7198454" y="5086939"/>
+            <a:ext cx="118313" cy="118313"/>
+          </a:xfrm>
+          <a:custGeom>
+            <a:avLst/>
+            <a:gdLst>
+              <a:gd name="connsiteX0" fmla="*/ 118313 w 118313"/>
+              <a:gd name="connsiteY0" fmla="*/ 0 h 118313"/>
+              <a:gd name="connsiteX1" fmla="*/ 1211 w 118313"/>
+              <a:gd name="connsiteY1" fmla="*/ 117473 h 118313"/>
+              <a:gd name="connsiteX2" fmla="*/ 0 w 118313"/>
+              <a:gd name="connsiteY2" fmla="*/ 846 h 118313"/>
+              <a:gd name="connsiteX3" fmla="*/ 117102 w 118313"/>
+              <a:gd name="connsiteY3" fmla="*/ 118313 h 118313"/>
+            </a:gdLst>
+            <a:ahLst/>
+            <a:cxnLst>
+              <a:cxn ang="0">
+                <a:pos x="connsiteX0" y="connsiteY0"/>
+              </a:cxn>
+              <a:cxn ang="0">
+                <a:pos x="connsiteX1" y="connsiteY1"/>
+              </a:cxn>
+              <a:cxn ang="0">
+                <a:pos x="connsiteX2" y="connsiteY2"/>
+              </a:cxn>
+              <a:cxn ang="0">
+                <a:pos x="connsiteX3" y="connsiteY3"/>
+              </a:cxn>
+            </a:cxnLst>
+            <a:rect l="l" t="t" r="r" b="b"/>
+            <a:pathLst>
+              <a:path w="118313" h="118313">
+                <a:moveTo>
+                  <a:pt x="118313" y="0"/>
+                </a:moveTo>
+                <a:lnTo>
+                  <a:pt x="1211" y="117473"/>
+                </a:lnTo>
+                <a:moveTo>
+                  <a:pt x="0" y="846"/>
+                </a:moveTo>
+                <a:lnTo>
+                  <a:pt x="117102" y="118313"/>
+                </a:lnTo>
+              </a:path>
+            </a:pathLst>
+          </a:custGeom>
+          <a:noFill/>
+          <a:ln w="24486" cap="rnd">
+            <a:solidFill>
+              <a:srgbClr val="808080"/>
+            </a:solidFill>
+            <a:prstDash val="solid"/>
+            <a:miter/>
+          </a:ln>
+        </p:spPr>
+        <p:txBody>
+          <a:bodyPr rtlCol="0" anchor="ctr"/>
+          <a:lstStyle/>
+          <a:p>
+            <a:endParaRPr lang="en-US"/>
+          </a:p>
+        </p:txBody>
+      </p:sp>
+      <p:sp>
+        <p:nvSpPr>
+          <p:cNvPr id="17" name="Freeform: Shape 16">
+            <a:extLst>
+              <a:ext uri="{FF2B5EF4-FFF2-40B4-BE49-F238E27FC236}">
+                <a16:creationId xmlns:a16="http://schemas.microsoft.com/office/drawing/2014/main" id="{B27FA6BC-CF38-97C4-A294-8716A7C43D75}"/>
+              </a:ext>
+            </a:extLst>
+          </p:cNvPr>
+          <p:cNvSpPr/>
+          <p:nvPr/>
+        </p:nvSpPr>
+        <p:spPr>
+          <a:xfrm>
+            <a:off x="3772431" y="1660916"/>
+            <a:ext cx="4656430" cy="4656430"/>
+          </a:xfrm>
+          <a:custGeom>
+            <a:avLst/>
+            <a:gdLst>
+              <a:gd name="connsiteX0" fmla="*/ 0 w 4656430"/>
+              <a:gd name="connsiteY0" fmla="*/ 0 h 4656430"/>
+              <a:gd name="connsiteX1" fmla="*/ 4656431 w 4656430"/>
+              <a:gd name="connsiteY1" fmla="*/ 0 h 4656430"/>
+              <a:gd name="connsiteX2" fmla="*/ 4656431 w 4656430"/>
+              <a:gd name="connsiteY2" fmla="*/ 4656431 h 4656430"/>
+              <a:gd name="connsiteX3" fmla="*/ 0 w 4656430"/>
+              <a:gd name="connsiteY3" fmla="*/ 4656431 h 4656430"/>
+            </a:gdLst>
+            <a:ahLst/>
+            <a:cxnLst>
+              <a:cxn ang="0">
+                <a:pos x="connsiteX0" y="connsiteY0"/>
+              </a:cxn>
+              <a:cxn ang="0">
+                <a:pos x="connsiteX1" y="connsiteY1"/>
+              </a:cxn>
+              <a:cxn ang="0">
+                <a:pos x="connsiteX2" y="connsiteY2"/>
+              </a:cxn>
+              <a:cxn ang="0">
+                <a:pos x="connsiteX3" y="connsiteY3"/>
+              </a:cxn>
+            </a:cxnLst>
+            <a:rect l="l" t="t" r="r" b="b"/>
+            <a:pathLst>
+              <a:path w="4656430" h="4656430">
+                <a:moveTo>
+                  <a:pt x="0" y="0"/>
+                </a:moveTo>
+                <a:lnTo>
+                  <a:pt x="4656431" y="0"/>
+                </a:lnTo>
+                <a:lnTo>
+                  <a:pt x="4656431" y="4656431"/>
+                </a:lnTo>
+                <a:lnTo>
+                  <a:pt x="0" y="4656431"/>
+                </a:lnTo>
+                <a:close/>
+              </a:path>
+            </a:pathLst>
+          </a:custGeom>
+          <a:noFill/>
+          <a:ln w="57055" cap="rnd">
+            <a:solidFill>
+              <a:srgbClr val="5AA02C"/>
+            </a:solidFill>
+            <a:prstDash val="solid"/>
+            <a:miter/>
+          </a:ln>
+        </p:spPr>
+        <p:txBody>
+          <a:bodyPr rtlCol="0" anchor="ctr"/>
+          <a:lstStyle/>
+          <a:p>
+            <a:endParaRPr lang="en-US"/>
+          </a:p>
+        </p:txBody>
+      </p:sp>
+      <p:sp>
+        <p:nvSpPr>
+          <p:cNvPr id="18" name="Freeform: Shape 17">
+            <a:extLst>
+              <a:ext uri="{FF2B5EF4-FFF2-40B4-BE49-F238E27FC236}">
+                <a16:creationId xmlns:a16="http://schemas.microsoft.com/office/drawing/2014/main" id="{255D245B-8679-F95D-DF14-A8426BF2EA6F}"/>
+              </a:ext>
+            </a:extLst>
+          </p:cNvPr>
+          <p:cNvSpPr/>
+          <p:nvPr/>
+        </p:nvSpPr>
+        <p:spPr>
+          <a:xfrm>
+            <a:off x="6137530" y="1712084"/>
+            <a:ext cx="2240160" cy="2240160"/>
+          </a:xfrm>
+          <a:custGeom>
+            <a:avLst/>
+            <a:gdLst>
+              <a:gd name="connsiteX0" fmla="*/ 2240160 w 2240160"/>
+              <a:gd name="connsiteY0" fmla="*/ 1120080 h 2240160"/>
+              <a:gd name="connsiteX1" fmla="*/ 1120080 w 2240160"/>
+              <a:gd name="connsiteY1" fmla="*/ 2240160 h 2240160"/>
+              <a:gd name="connsiteX2" fmla="*/ 0 w 2240160"/>
+              <a:gd name="connsiteY2" fmla="*/ 1120080 h 2240160"/>
+              <a:gd name="connsiteX3" fmla="*/ 1120080 w 2240160"/>
+              <a:gd name="connsiteY3" fmla="*/ 0 h 2240160"/>
+              <a:gd name="connsiteX4" fmla="*/ 2240160 w 2240160"/>
+              <a:gd name="connsiteY4" fmla="*/ 1120080 h 2240160"/>
+            </a:gdLst>
+            <a:ahLst/>
+            <a:cxnLst>
+              <a:cxn ang="0">
+                <a:pos x="connsiteX0" y="connsiteY0"/>
+              </a:cxn>
+              <a:cxn ang="0">
+                <a:pos x="connsiteX1" y="connsiteY1"/>
+              </a:cxn>
+              <a:cxn ang="0">
+                <a:pos x="connsiteX2" y="connsiteY2"/>
+              </a:cxn>
+              <a:cxn ang="0">
+                <a:pos x="connsiteX3" y="connsiteY3"/>
+              </a:cxn>
+              <a:cxn ang="0">
+                <a:pos x="connsiteX4" y="connsiteY4"/>
+              </a:cxn>
+            </a:cxnLst>
+            <a:rect l="l" t="t" r="r" b="b"/>
+            <a:pathLst>
+              <a:path w="2240160" h="2240160">
+                <a:moveTo>
+                  <a:pt x="2240160" y="1120080"/>
+                </a:moveTo>
+                <a:cubicBezTo>
+                  <a:pt x="2240160" y="1738683"/>
+                  <a:pt x="1738683" y="2240160"/>
+                  <a:pt x="1120080" y="2240160"/>
+                </a:cubicBezTo>
+                <a:cubicBezTo>
+                  <a:pt x="501477" y="2240160"/>
+                  <a:pt x="0" y="1738683"/>
+                  <a:pt x="0" y="1120080"/>
+                </a:cubicBezTo>
+                <a:cubicBezTo>
+                  <a:pt x="0" y="501477"/>
+                  <a:pt x="501477" y="0"/>
+                  <a:pt x="1120080" y="0"/>
+                </a:cubicBezTo>
+                <a:cubicBezTo>
+                  <a:pt x="1738683" y="0"/>
+                  <a:pt x="2240160" y="501477"/>
+                  <a:pt x="2240160" y="1120080"/>
+                </a:cubicBezTo>
+                <a:close/>
+              </a:path>
+            </a:pathLst>
+          </a:custGeom>
+          <a:noFill/>
+          <a:ln w="45138" cap="sq">
+            <a:solidFill>
+              <a:srgbClr val="37ABC8"/>
+            </a:solidFill>
+            <a:prstDash val="solid"/>
+            <a:miter/>
+          </a:ln>
+        </p:spPr>
+        <p:txBody>
+          <a:bodyPr rtlCol="0" anchor="ctr"/>
+          <a:lstStyle/>
+          <a:p>
+            <a:endParaRPr lang="en-US"/>
+          </a:p>
+        </p:txBody>
+      </p:sp>
+      <p:sp>
+        <p:nvSpPr>
+          <p:cNvPr id="19" name="Freeform: Shape 18">
+            <a:extLst>
+              <a:ext uri="{FF2B5EF4-FFF2-40B4-BE49-F238E27FC236}">
+                <a16:creationId xmlns:a16="http://schemas.microsoft.com/office/drawing/2014/main" id="{D2500A33-AE17-252C-E174-D1197C4C3128}"/>
+              </a:ext>
+            </a:extLst>
+          </p:cNvPr>
+          <p:cNvSpPr/>
+          <p:nvPr/>
+        </p:nvSpPr>
+        <p:spPr>
+          <a:xfrm>
+            <a:off x="3823598" y="1712084"/>
+            <a:ext cx="2240160" cy="2240160"/>
+          </a:xfrm>
+          <a:custGeom>
+            <a:avLst/>
+            <a:gdLst>
+              <a:gd name="connsiteX0" fmla="*/ 2240160 w 2240160"/>
+              <a:gd name="connsiteY0" fmla="*/ 1120080 h 2240160"/>
+              <a:gd name="connsiteX1" fmla="*/ 1120080 w 2240160"/>
+              <a:gd name="connsiteY1" fmla="*/ 2240160 h 2240160"/>
+              <a:gd name="connsiteX2" fmla="*/ 0 w 2240160"/>
+              <a:gd name="connsiteY2" fmla="*/ 1120080 h 2240160"/>
+              <a:gd name="connsiteX3" fmla="*/ 1120080 w 2240160"/>
+              <a:gd name="connsiteY3" fmla="*/ 0 h 2240160"/>
+              <a:gd name="connsiteX4" fmla="*/ 2240160 w 2240160"/>
+              <a:gd name="connsiteY4" fmla="*/ 1120080 h 2240160"/>
+            </a:gdLst>
+            <a:ahLst/>
+            <a:cxnLst>
+              <a:cxn ang="0">
+                <a:pos x="connsiteX0" y="connsiteY0"/>
+              </a:cxn>
+              <a:cxn ang="0">
+                <a:pos x="connsiteX1" y="connsiteY1"/>
+              </a:cxn>
+              <a:cxn ang="0">
+                <a:pos x="connsiteX2" y="connsiteY2"/>
+              </a:cxn>
+              <a:cxn ang="0">
+                <a:pos x="connsiteX3" y="connsiteY3"/>
+              </a:cxn>
+              <a:cxn ang="0">
+                <a:pos x="connsiteX4" y="connsiteY4"/>
+              </a:cxn>
+            </a:cxnLst>
+            <a:rect l="l" t="t" r="r" b="b"/>
+            <a:pathLst>
+              <a:path w="2240160" h="2240160">
+                <a:moveTo>
+                  <a:pt x="2240160" y="1120080"/>
+                </a:moveTo>
+                <a:cubicBezTo>
+                  <a:pt x="2240160" y="1738683"/>
+                  <a:pt x="1738683" y="2240160"/>
+                  <a:pt x="1120080" y="2240160"/>
+                </a:cubicBezTo>
+                <a:cubicBezTo>
+                  <a:pt x="501477" y="2240160"/>
+                  <a:pt x="0" y="1738683"/>
+                  <a:pt x="0" y="1120080"/>
+                </a:cubicBezTo>
+                <a:cubicBezTo>
+                  <a:pt x="0" y="501477"/>
+                  <a:pt x="501477" y="0"/>
+                  <a:pt x="1120080" y="0"/>
+                </a:cubicBezTo>
+                <a:cubicBezTo>
+                  <a:pt x="1738683" y="0"/>
+                  <a:pt x="2240160" y="501477"/>
+                  <a:pt x="2240160" y="1120080"/>
+                </a:cubicBezTo>
+                <a:close/>
+              </a:path>
+            </a:pathLst>
+          </a:custGeom>
+          <a:noFill/>
+          <a:ln w="45138" cap="sq">
+            <a:solidFill>
+              <a:srgbClr val="37ABC8"/>
+            </a:solidFill>
+            <a:prstDash val="solid"/>
+            <a:miter/>
+          </a:ln>
+        </p:spPr>
+        <p:txBody>
+          <a:bodyPr rtlCol="0" anchor="ctr"/>
+          <a:lstStyle/>
+          <a:p>
+            <a:endParaRPr lang="en-US"/>
+          </a:p>
+        </p:txBody>
+      </p:sp>
+      <p:sp>
+        <p:nvSpPr>
+          <p:cNvPr id="20" name="Freeform: Shape 19">
+            <a:extLst>
+              <a:ext uri="{FF2B5EF4-FFF2-40B4-BE49-F238E27FC236}">
+                <a16:creationId xmlns:a16="http://schemas.microsoft.com/office/drawing/2014/main" id="{DD038C99-415F-73A9-C25F-5DC759A1DEFF}"/>
+              </a:ext>
+            </a:extLst>
+          </p:cNvPr>
+          <p:cNvSpPr/>
+          <p:nvPr/>
+        </p:nvSpPr>
+        <p:spPr>
+          <a:xfrm>
+            <a:off x="3823598" y="4026015"/>
+            <a:ext cx="2240160" cy="2240160"/>
+          </a:xfrm>
+          <a:custGeom>
+            <a:avLst/>
+            <a:gdLst>
+              <a:gd name="connsiteX0" fmla="*/ 2240160 w 2240160"/>
+              <a:gd name="connsiteY0" fmla="*/ 1120080 h 2240160"/>
+              <a:gd name="connsiteX1" fmla="*/ 1120080 w 2240160"/>
+              <a:gd name="connsiteY1" fmla="*/ 2240161 h 2240160"/>
+              <a:gd name="connsiteX2" fmla="*/ 0 w 2240160"/>
+              <a:gd name="connsiteY2" fmla="*/ 1120080 h 2240160"/>
+              <a:gd name="connsiteX3" fmla="*/ 1120080 w 2240160"/>
+              <a:gd name="connsiteY3" fmla="*/ 0 h 2240160"/>
+              <a:gd name="connsiteX4" fmla="*/ 2240160 w 2240160"/>
+              <a:gd name="connsiteY4" fmla="*/ 1120080 h 2240160"/>
+            </a:gdLst>
+            <a:ahLst/>
+            <a:cxnLst>
+              <a:cxn ang="0">
+                <a:pos x="connsiteX0" y="connsiteY0"/>
+              </a:cxn>
+              <a:cxn ang="0">
+                <a:pos x="connsiteX1" y="connsiteY1"/>
+              </a:cxn>
+              <a:cxn ang="0">
+                <a:pos x="connsiteX2" y="connsiteY2"/>
+              </a:cxn>
+              <a:cxn ang="0">
+                <a:pos x="connsiteX3" y="connsiteY3"/>
+              </a:cxn>
+              <a:cxn ang="0">
+                <a:pos x="connsiteX4" y="connsiteY4"/>
+              </a:cxn>
+            </a:cxnLst>
+            <a:rect l="l" t="t" r="r" b="b"/>
+            <a:pathLst>
+              <a:path w="2240160" h="2240160">
+                <a:moveTo>
+                  <a:pt x="2240160" y="1120080"/>
+                </a:moveTo>
+                <a:cubicBezTo>
+                  <a:pt x="2240160" y="1738683"/>
+                  <a:pt x="1738683" y="2240161"/>
+                  <a:pt x="1120080" y="2240161"/>
+                </a:cubicBezTo>
+                <a:cubicBezTo>
+                  <a:pt x="501477" y="2240161"/>
+                  <a:pt x="0" y="1738683"/>
+                  <a:pt x="0" y="1120080"/>
+                </a:cubicBezTo>
+                <a:cubicBezTo>
+                  <a:pt x="0" y="501477"/>
+                  <a:pt x="501477" y="0"/>
+                  <a:pt x="1120080" y="0"/>
+                </a:cubicBezTo>
+                <a:cubicBezTo>
+                  <a:pt x="1738683" y="0"/>
+                  <a:pt x="2240160" y="501477"/>
+                  <a:pt x="2240160" y="1120080"/>
+                </a:cubicBezTo>
+                <a:close/>
+              </a:path>
+            </a:pathLst>
+          </a:custGeom>
+          <a:noFill/>
+          <a:ln w="45138" cap="sq">
+            <a:solidFill>
+              <a:srgbClr val="37ABC8"/>
+            </a:solidFill>
+            <a:prstDash val="solid"/>
+            <a:miter/>
+          </a:ln>
+        </p:spPr>
+        <p:txBody>
+          <a:bodyPr rtlCol="0" anchor="ctr"/>
+          <a:lstStyle/>
+          <a:p>
+            <a:endParaRPr lang="en-US"/>
+          </a:p>
+        </p:txBody>
+      </p:sp>
+      <p:sp>
+        <p:nvSpPr>
+          <p:cNvPr id="21" name="Freeform: Shape 20">
+            <a:extLst>
+              <a:ext uri="{FF2B5EF4-FFF2-40B4-BE49-F238E27FC236}">
+                <a16:creationId xmlns:a16="http://schemas.microsoft.com/office/drawing/2014/main" id="{F31E3D6C-86AD-CEAA-E4AD-F010A76C3EDE}"/>
+              </a:ext>
+            </a:extLst>
+          </p:cNvPr>
+          <p:cNvSpPr/>
+          <p:nvPr/>
+        </p:nvSpPr>
+        <p:spPr>
+          <a:xfrm>
+            <a:off x="6137530" y="4026015"/>
+            <a:ext cx="2240160" cy="2240160"/>
+          </a:xfrm>
+          <a:custGeom>
+            <a:avLst/>
+            <a:gdLst>
+              <a:gd name="connsiteX0" fmla="*/ 2240160 w 2240160"/>
+              <a:gd name="connsiteY0" fmla="*/ 1120080 h 2240160"/>
+              <a:gd name="connsiteX1" fmla="*/ 1120080 w 2240160"/>
+              <a:gd name="connsiteY1" fmla="*/ 2240161 h 2240160"/>
+              <a:gd name="connsiteX2" fmla="*/ 0 w 2240160"/>
+              <a:gd name="connsiteY2" fmla="*/ 1120080 h 2240160"/>
+              <a:gd name="connsiteX3" fmla="*/ 1120080 w 2240160"/>
+              <a:gd name="connsiteY3" fmla="*/ 0 h 2240160"/>
+              <a:gd name="connsiteX4" fmla="*/ 2240160 w 2240160"/>
+              <a:gd name="connsiteY4" fmla="*/ 1120080 h 2240160"/>
+            </a:gdLst>
+            <a:ahLst/>
+            <a:cxnLst>
+              <a:cxn ang="0">
+                <a:pos x="connsiteX0" y="connsiteY0"/>
+              </a:cxn>
+              <a:cxn ang="0">
+                <a:pos x="connsiteX1" y="connsiteY1"/>
+              </a:cxn>
+              <a:cxn ang="0">
+                <a:pos x="connsiteX2" y="connsiteY2"/>
+              </a:cxn>
+              <a:cxn ang="0">
+                <a:pos x="connsiteX3" y="connsiteY3"/>
+              </a:cxn>
+              <a:cxn ang="0">
+                <a:pos x="connsiteX4" y="connsiteY4"/>
+              </a:cxn>
+            </a:cxnLst>
+            <a:rect l="l" t="t" r="r" b="b"/>
+            <a:pathLst>
+              <a:path w="2240160" h="2240160">
+                <a:moveTo>
+                  <a:pt x="2240160" y="1120080"/>
+                </a:moveTo>
+                <a:cubicBezTo>
+                  <a:pt x="2240160" y="1738683"/>
+                  <a:pt x="1738683" y="2240161"/>
+                  <a:pt x="1120080" y="2240161"/>
+                </a:cubicBezTo>
+                <a:cubicBezTo>
+                  <a:pt x="501477" y="2240161"/>
+                  <a:pt x="0" y="1738683"/>
+                  <a:pt x="0" y="1120080"/>
+                </a:cubicBezTo>
+                <a:cubicBezTo>
+                  <a:pt x="0" y="501477"/>
+                  <a:pt x="501477" y="0"/>
+                  <a:pt x="1120080" y="0"/>
+                </a:cubicBezTo>
+                <a:cubicBezTo>
+                  <a:pt x="1738683" y="0"/>
+                  <a:pt x="2240160" y="501477"/>
+                  <a:pt x="2240160" y="1120080"/>
+                </a:cubicBezTo>
+                <a:close/>
+              </a:path>
+            </a:pathLst>
+          </a:custGeom>
+          <a:noFill/>
+          <a:ln w="45138" cap="sq">
+            <a:solidFill>
+              <a:srgbClr val="37ABC8"/>
+            </a:solidFill>
+            <a:prstDash val="solid"/>
+            <a:miter/>
+          </a:ln>
+        </p:spPr>
+        <p:txBody>
+          <a:bodyPr rtlCol="0" anchor="ctr"/>
+          <a:lstStyle/>
+          <a:p>
+            <a:endParaRPr lang="en-US"/>
+          </a:p>
+        </p:txBody>
+      </p:sp>
+      <p:sp>
+        <p:nvSpPr>
+          <p:cNvPr id="22" name="Freeform: Shape 21">
+            <a:extLst>
+              <a:ext uri="{FF2B5EF4-FFF2-40B4-BE49-F238E27FC236}">
+                <a16:creationId xmlns:a16="http://schemas.microsoft.com/office/drawing/2014/main" id="{C8D7CF88-D832-CE93-A09C-74E13B415924}"/>
+              </a:ext>
+            </a:extLst>
+          </p:cNvPr>
+          <p:cNvSpPr/>
+          <p:nvPr/>
+        </p:nvSpPr>
+        <p:spPr>
+          <a:xfrm>
+            <a:off x="5616209" y="3504694"/>
+            <a:ext cx="968871" cy="968871"/>
+          </a:xfrm>
+          <a:custGeom>
+            <a:avLst/>
+            <a:gdLst>
+              <a:gd name="connsiteX0" fmla="*/ 968871 w 968871"/>
+              <a:gd name="connsiteY0" fmla="*/ 484436 h 968871"/>
+              <a:gd name="connsiteX1" fmla="*/ 484436 w 968871"/>
+              <a:gd name="connsiteY1" fmla="*/ 968871 h 968871"/>
+              <a:gd name="connsiteX2" fmla="*/ 0 w 968871"/>
+              <a:gd name="connsiteY2" fmla="*/ 484436 h 968871"/>
+              <a:gd name="connsiteX3" fmla="*/ 484436 w 968871"/>
+              <a:gd name="connsiteY3" fmla="*/ 0 h 968871"/>
+              <a:gd name="connsiteX4" fmla="*/ 968871 w 968871"/>
+              <a:gd name="connsiteY4" fmla="*/ 484436 h 968871"/>
+            </a:gdLst>
+            <a:ahLst/>
+            <a:cxnLst>
+              <a:cxn ang="0">
+                <a:pos x="connsiteX0" y="connsiteY0"/>
+              </a:cxn>
+              <a:cxn ang="0">
+                <a:pos x="connsiteX1" y="connsiteY1"/>
+              </a:cxn>
+              <a:cxn ang="0">
+                <a:pos x="connsiteX2" y="connsiteY2"/>
+              </a:cxn>
+              <a:cxn ang="0">
+                <a:pos x="connsiteX3" y="connsiteY3"/>
+              </a:cxn>
+              <a:cxn ang="0">
+                <a:pos x="connsiteX4" y="connsiteY4"/>
+              </a:cxn>
+            </a:cxnLst>
+            <a:rect l="l" t="t" r="r" b="b"/>
+            <a:pathLst>
+              <a:path w="968871" h="968871">
+                <a:moveTo>
+                  <a:pt x="968871" y="484436"/>
+                </a:moveTo>
+                <a:cubicBezTo>
+                  <a:pt x="968871" y="751982"/>
+                  <a:pt x="751982" y="968871"/>
+                  <a:pt x="484436" y="968871"/>
+                </a:cubicBezTo>
+                <a:cubicBezTo>
+                  <a:pt x="216889" y="968871"/>
+                  <a:pt x="0" y="751982"/>
+                  <a:pt x="0" y="484436"/>
+                </a:cubicBezTo>
+                <a:cubicBezTo>
+                  <a:pt x="0" y="216889"/>
+                  <a:pt x="216889" y="0"/>
+                  <a:pt x="484436" y="0"/>
+                </a:cubicBezTo>
+                <a:cubicBezTo>
+                  <a:pt x="751982" y="0"/>
+                  <a:pt x="968871" y="216889"/>
+                  <a:pt x="968871" y="484436"/>
+                </a:cubicBezTo>
+                <a:close/>
+              </a:path>
+            </a:pathLst>
+          </a:custGeom>
+          <a:noFill/>
+          <a:ln w="45644" cap="sq">
+            <a:solidFill>
+              <a:srgbClr val="D40000"/>
+            </a:solidFill>
+            <a:prstDash val="solid"/>
+            <a:miter/>
+          </a:ln>
+        </p:spPr>
+        <p:txBody>
+          <a:bodyPr rtlCol="0" anchor="ctr"/>
+          <a:lstStyle/>
+          <a:p>
+            <a:endParaRPr lang="en-US"/>
+          </a:p>
+        </p:txBody>
+      </p:sp>
+      <p:sp>
+        <p:nvSpPr>
+          <p:cNvPr id="3" name="TextBox 2">
+            <a:extLst>
+              <a:ext uri="{FF2B5EF4-FFF2-40B4-BE49-F238E27FC236}">
+                <a16:creationId xmlns:a16="http://schemas.microsoft.com/office/drawing/2014/main" id="{D61EF389-FC72-0078-BBD3-404C56EB8C9D}"/>
+              </a:ext>
+            </a:extLst>
+          </p:cNvPr>
+          <p:cNvSpPr txBox="1"/>
+          <p:nvPr/>
+        </p:nvSpPr>
+        <p:spPr>
+          <a:xfrm>
+            <a:off x="8485991" y="1221938"/>
+            <a:ext cx="867545" cy="523220"/>
+          </a:xfrm>
+          <a:prstGeom prst="rect">
+            <a:avLst/>
+          </a:prstGeom>
+          <a:noFill/>
+        </p:spPr>
+        <p:txBody>
+          <a:bodyPr wrap="none" rtlCol="0">
+            <a:spAutoFit/>
+          </a:bodyPr>
+          <a:lstStyle/>
+          <a:p>
+            <a:r>
+              <a:rPr lang="en-US" sz="2800" b="1" dirty="0">
+                <a:solidFill>
+                  <a:srgbClr val="5AA02C"/>
+                </a:solidFill>
+              </a:rPr>
+              <a:t>(2,2)</a:t>
+            </a:r>
+          </a:p>
+        </p:txBody>
+      </p:sp>
+      <p:sp>
+        <p:nvSpPr>
+          <p:cNvPr id="4" name="TextBox 3">
+            <a:extLst>
+              <a:ext uri="{FF2B5EF4-FFF2-40B4-BE49-F238E27FC236}">
+                <a16:creationId xmlns:a16="http://schemas.microsoft.com/office/drawing/2014/main" id="{D89FC7BA-57D9-A58E-A819-22AE1520DE76}"/>
+              </a:ext>
+            </a:extLst>
+          </p:cNvPr>
+          <p:cNvSpPr txBox="1"/>
+          <p:nvPr/>
+        </p:nvSpPr>
+        <p:spPr>
+          <a:xfrm>
+            <a:off x="8485991" y="6083096"/>
+            <a:ext cx="978153" cy="523220"/>
+          </a:xfrm>
+          <a:prstGeom prst="rect">
+            <a:avLst/>
+          </a:prstGeom>
+          <a:noFill/>
+        </p:spPr>
+        <p:txBody>
+          <a:bodyPr wrap="none" rtlCol="0">
+            <a:spAutoFit/>
+          </a:bodyPr>
+          <a:lstStyle/>
+          <a:p>
+            <a:r>
+              <a:rPr lang="en-US" sz="2800" b="1" dirty="0">
+                <a:solidFill>
+                  <a:srgbClr val="5AA02C"/>
+                </a:solidFill>
+              </a:rPr>
+              <a:t>(2,-2)</a:t>
+            </a:r>
+          </a:p>
+        </p:txBody>
+      </p:sp>
+      <p:sp>
+        <p:nvSpPr>
+          <p:cNvPr id="5" name="TextBox 4">
+            <a:extLst>
+              <a:ext uri="{FF2B5EF4-FFF2-40B4-BE49-F238E27FC236}">
+                <a16:creationId xmlns:a16="http://schemas.microsoft.com/office/drawing/2014/main" id="{38FB6535-D3F8-C022-4ED1-22989CC869DE}"/>
+              </a:ext>
+            </a:extLst>
+          </p:cNvPr>
+          <p:cNvSpPr txBox="1"/>
+          <p:nvPr/>
+        </p:nvSpPr>
+        <p:spPr>
+          <a:xfrm>
+            <a:off x="2794278" y="1221938"/>
+            <a:ext cx="978153" cy="523220"/>
+          </a:xfrm>
+          <a:prstGeom prst="rect">
+            <a:avLst/>
+          </a:prstGeom>
+          <a:noFill/>
+        </p:spPr>
+        <p:txBody>
+          <a:bodyPr wrap="none" rtlCol="0">
+            <a:spAutoFit/>
+          </a:bodyPr>
+          <a:lstStyle/>
+          <a:p>
+            <a:r>
+              <a:rPr lang="en-US" sz="2800" b="1" dirty="0">
+                <a:solidFill>
+                  <a:srgbClr val="5AA02C"/>
+                </a:solidFill>
+              </a:rPr>
+              <a:t>(-2,2)</a:t>
+            </a:r>
+          </a:p>
+        </p:txBody>
+      </p:sp>
+      <p:sp>
+        <p:nvSpPr>
+          <p:cNvPr id="6" name="TextBox 5">
+            <a:extLst>
+              <a:ext uri="{FF2B5EF4-FFF2-40B4-BE49-F238E27FC236}">
+                <a16:creationId xmlns:a16="http://schemas.microsoft.com/office/drawing/2014/main" id="{70ED16BB-BD4A-7687-B613-EBA2FE7C24A4}"/>
+              </a:ext>
+            </a:extLst>
+          </p:cNvPr>
+          <p:cNvSpPr txBox="1"/>
+          <p:nvPr/>
+        </p:nvSpPr>
+        <p:spPr>
+          <a:xfrm>
+            <a:off x="2683671" y="6083096"/>
+            <a:ext cx="1088760" cy="523220"/>
+          </a:xfrm>
+          <a:prstGeom prst="rect">
+            <a:avLst/>
+          </a:prstGeom>
+          <a:noFill/>
+        </p:spPr>
+        <p:txBody>
+          <a:bodyPr wrap="none" rtlCol="0">
+            <a:spAutoFit/>
+          </a:bodyPr>
+          <a:lstStyle/>
+          <a:p>
+            <a:r>
+              <a:rPr lang="en-US" sz="2800" b="1" dirty="0">
+                <a:solidFill>
+                  <a:srgbClr val="5AA02C"/>
+                </a:solidFill>
+              </a:rPr>
+              <a:t>(-2,-2)</a:t>
+            </a:r>
+          </a:p>
+        </p:txBody>
+      </p:sp>
+      <p:sp>
+        <p:nvSpPr>
+          <p:cNvPr id="7" name="TextBox 6">
+            <a:extLst>
+              <a:ext uri="{FF2B5EF4-FFF2-40B4-BE49-F238E27FC236}">
+                <a16:creationId xmlns:a16="http://schemas.microsoft.com/office/drawing/2014/main" id="{CC1C85EE-3EE0-CEB6-EB96-E0DB464833E0}"/>
+              </a:ext>
+            </a:extLst>
+          </p:cNvPr>
+          <p:cNvSpPr txBox="1"/>
+          <p:nvPr/>
+        </p:nvSpPr>
+        <p:spPr>
+          <a:xfrm>
+            <a:off x="7235238" y="2408746"/>
+            <a:ext cx="768159" cy="461665"/>
+          </a:xfrm>
+          <a:prstGeom prst="rect">
+            <a:avLst/>
+          </a:prstGeom>
+          <a:noFill/>
+        </p:spPr>
+        <p:txBody>
+          <a:bodyPr wrap="none" rtlCol="0">
+            <a:spAutoFit/>
+          </a:bodyPr>
+          <a:lstStyle/>
+          <a:p>
+            <a:r>
+              <a:rPr lang="en-US" sz="2400" b="1" dirty="0">
+                <a:solidFill>
+                  <a:srgbClr val="808080"/>
+                </a:solidFill>
+              </a:rPr>
+              <a:t>(1,1)</a:t>
+            </a:r>
+          </a:p>
+        </p:txBody>
+      </p:sp>
+      <p:sp>
+        <p:nvSpPr>
+          <p:cNvPr id="8" name="TextBox 7">
+            <a:extLst>
+              <a:ext uri="{FF2B5EF4-FFF2-40B4-BE49-F238E27FC236}">
+                <a16:creationId xmlns:a16="http://schemas.microsoft.com/office/drawing/2014/main" id="{19FDC371-EED0-6B3F-DAE5-A091155065C8}"/>
+              </a:ext>
+            </a:extLst>
+          </p:cNvPr>
+          <p:cNvSpPr txBox="1"/>
+          <p:nvPr/>
+        </p:nvSpPr>
+        <p:spPr>
+          <a:xfrm>
+            <a:off x="4121626" y="2405479"/>
+            <a:ext cx="862737" cy="461665"/>
+          </a:xfrm>
+          <a:prstGeom prst="rect">
+            <a:avLst/>
+          </a:prstGeom>
+          <a:noFill/>
+        </p:spPr>
+        <p:txBody>
+          <a:bodyPr wrap="none" rtlCol="0">
+            <a:spAutoFit/>
+          </a:bodyPr>
+          <a:lstStyle/>
+          <a:p>
+            <a:r>
+              <a:rPr lang="en-US" sz="2400" b="1" dirty="0">
+                <a:solidFill>
+                  <a:srgbClr val="808080"/>
+                </a:solidFill>
+              </a:rPr>
+              <a:t>(-1,1)</a:t>
+            </a:r>
+          </a:p>
+        </p:txBody>
+      </p:sp>
+      <p:sp>
+        <p:nvSpPr>
+          <p:cNvPr id="9" name="TextBox 8">
+            <a:extLst>
+              <a:ext uri="{FF2B5EF4-FFF2-40B4-BE49-F238E27FC236}">
+                <a16:creationId xmlns:a16="http://schemas.microsoft.com/office/drawing/2014/main" id="{5D09E3FD-DC10-8FCE-38FE-D434B0B36101}"/>
+              </a:ext>
+            </a:extLst>
+          </p:cNvPr>
+          <p:cNvSpPr txBox="1"/>
+          <p:nvPr/>
+        </p:nvSpPr>
+        <p:spPr>
+          <a:xfrm>
+            <a:off x="3986365" y="5080836"/>
+            <a:ext cx="957313" cy="461665"/>
+          </a:xfrm>
+          <a:prstGeom prst="rect">
+            <a:avLst/>
+          </a:prstGeom>
+          <a:noFill/>
+        </p:spPr>
+        <p:txBody>
+          <a:bodyPr wrap="none" rtlCol="0">
+            <a:spAutoFit/>
+          </a:bodyPr>
+          <a:lstStyle/>
+          <a:p>
+            <a:r>
+              <a:rPr lang="en-US" sz="2400" b="1" dirty="0">
+                <a:solidFill>
+                  <a:srgbClr val="808080"/>
+                </a:solidFill>
+              </a:rPr>
+              <a:t>(-1,-1)</a:t>
+            </a:r>
+          </a:p>
+        </p:txBody>
+      </p:sp>
+      <p:sp>
+        <p:nvSpPr>
+          <p:cNvPr id="10" name="TextBox 9">
+            <a:extLst>
+              <a:ext uri="{FF2B5EF4-FFF2-40B4-BE49-F238E27FC236}">
+                <a16:creationId xmlns:a16="http://schemas.microsoft.com/office/drawing/2014/main" id="{884E0711-4700-B0F1-C9CA-062F06932625}"/>
+              </a:ext>
+            </a:extLst>
+          </p:cNvPr>
+          <p:cNvSpPr txBox="1"/>
+          <p:nvPr/>
+        </p:nvSpPr>
+        <p:spPr>
+          <a:xfrm>
+            <a:off x="7246538" y="5080835"/>
+            <a:ext cx="862737" cy="461665"/>
+          </a:xfrm>
+          <a:prstGeom prst="rect">
+            <a:avLst/>
+          </a:prstGeom>
+          <a:noFill/>
+        </p:spPr>
+        <p:txBody>
+          <a:bodyPr wrap="none" rtlCol="0">
+            <a:spAutoFit/>
+          </a:bodyPr>
+          <a:lstStyle/>
+          <a:p>
+            <a:r>
+              <a:rPr lang="en-US" sz="2400" b="1" dirty="0">
+                <a:solidFill>
+                  <a:srgbClr val="808080"/>
+                </a:solidFill>
+              </a:rPr>
+              <a:t>(1,-1)</a:t>
+            </a:r>
+          </a:p>
+        </p:txBody>
+      </p:sp>
+      <p:cxnSp>
+        <p:nvCxnSpPr>
+          <p:cNvPr id="24" name="Straight Arrow Connector 23">
+            <a:extLst>
+              <a:ext uri="{FF2B5EF4-FFF2-40B4-BE49-F238E27FC236}">
+                <a16:creationId xmlns:a16="http://schemas.microsoft.com/office/drawing/2014/main" id="{68D454B7-403C-56DA-5DB8-5AA6F18651E2}"/>
+              </a:ext>
+            </a:extLst>
+          </p:cNvPr>
+          <p:cNvCxnSpPr>
+            <a:cxnSpLocks/>
+          </p:cNvCxnSpPr>
+          <p:nvPr/>
+        </p:nvCxnSpPr>
+        <p:spPr>
+          <a:xfrm flipV="1">
+            <a:off x="6091357" y="3605213"/>
+            <a:ext cx="295156" cy="383917"/>
+          </a:xfrm>
+          <a:prstGeom prst="straightConnector1">
+            <a:avLst/>
+          </a:prstGeom>
+          <a:ln w="38100">
+            <a:solidFill>
+              <a:srgbClr val="C00000"/>
+            </a:solidFill>
+            <a:headEnd type="arrow" w="med" len="med"/>
+            <a:tailEnd type="arrow" w="med" len="med"/>
+          </a:ln>
+        </p:spPr>
+        <p:style>
+          <a:lnRef idx="1">
+            <a:schemeClr val="accent1"/>
+          </a:lnRef>
+          <a:fillRef idx="0">
+            <a:schemeClr val="accent1"/>
+          </a:fillRef>
+          <a:effectRef idx="0">
+            <a:schemeClr val="accent1"/>
+          </a:effectRef>
+          <a:fontRef idx="minor">
+            <a:schemeClr val="tx1"/>
+          </a:fontRef>
+        </p:style>
+      </p:cxnSp>
+      <mc:AlternateContent xmlns:mc="http://schemas.openxmlformats.org/markup-compatibility/2006">
+        <mc:Choice xmlns:a14="http://schemas.microsoft.com/office/drawing/2010/main" Requires="a14">
+          <p:sp>
+            <p:nvSpPr>
+              <p:cNvPr id="29" name="Rectangle: Rounded Corners 28">
+                <a:extLst>
+                  <a:ext uri="{FF2B5EF4-FFF2-40B4-BE49-F238E27FC236}">
+                    <a16:creationId xmlns:a16="http://schemas.microsoft.com/office/drawing/2014/main" id="{1160DBA6-44A0-49C1-8DDC-47BE0FD042A9}"/>
+                  </a:ext>
+                </a:extLst>
+              </p:cNvPr>
+              <p:cNvSpPr/>
+              <p:nvPr/>
+            </p:nvSpPr>
+            <p:spPr>
+              <a:xfrm>
+                <a:off x="6267360" y="3751011"/>
+                <a:ext cx="1322883" cy="458070"/>
+              </a:xfrm>
+              <a:prstGeom prst="roundRect">
+                <a:avLst>
+                  <a:gd name="adj" fmla="val 50000"/>
+                </a:avLst>
+              </a:prstGeom>
+              <a:solidFill>
+                <a:schemeClr val="bg1">
+                  <a:alpha val="67000"/>
+                </a:schemeClr>
+              </a:solidFill>
+              <a:ln>
+                <a:noFill/>
+              </a:ln>
+            </p:spPr>
+            <p:style>
+              <a:lnRef idx="2">
+                <a:schemeClr val="accent1">
+                  <a:shade val="15000"/>
+                </a:schemeClr>
+              </a:lnRef>
+              <a:fillRef idx="1">
+                <a:schemeClr val="accent1"/>
+              </a:fillRef>
+              <a:effectRef idx="0">
+                <a:schemeClr val="accent1"/>
+              </a:effectRef>
+              <a:fontRef idx="minor">
+                <a:schemeClr val="lt1"/>
+              </a:fontRef>
+            </p:style>
+            <p:txBody>
+              <a:bodyPr rtlCol="0" anchor="ctr"/>
+              <a:lstStyle/>
+              <a:p>
+                <a:pPr algn="ctr"/>
+                <a14:m>
+                  <m:oMath xmlns:m="http://schemas.openxmlformats.org/officeDocument/2006/math">
+                    <m:rad>
+                      <m:radPr>
+                        <m:degHide m:val="on"/>
+                        <m:ctrlPr>
+                          <a:rPr lang="en-US" sz="2400" b="1" i="1" smtClean="0">
+                            <a:solidFill>
+                              <a:srgbClr val="C00000"/>
+                            </a:solidFill>
+                            <a:latin typeface="Cambria Math" panose="02040503050406030204" pitchFamily="18" charset="0"/>
+                          </a:rPr>
+                        </m:ctrlPr>
+                      </m:radPr>
+                      <m:deg/>
+                      <m:e>
+                        <m:r>
+                          <a:rPr lang="en-US" sz="2400" b="1" i="1" smtClean="0">
+                            <a:solidFill>
+                              <a:srgbClr val="C00000"/>
+                            </a:solidFill>
+                            <a:latin typeface="Cambria Math" panose="02040503050406030204" pitchFamily="18" charset="0"/>
+                          </a:rPr>
+                          <m:t>𝟐</m:t>
+                        </m:r>
+                      </m:e>
+                    </m:rad>
+                    <m:r>
+                      <a:rPr lang="en-US" sz="2400" b="1" i="1" smtClean="0">
+                        <a:solidFill>
+                          <a:srgbClr val="C00000"/>
+                        </a:solidFill>
+                        <a:latin typeface="Cambria Math" panose="02040503050406030204" pitchFamily="18" charset="0"/>
+                      </a:rPr>
+                      <m:t>−</m:t>
+                    </m:r>
+                    <m:r>
+                      <a:rPr lang="en-US" sz="2400" b="1" i="1" smtClean="0">
+                        <a:solidFill>
+                          <a:srgbClr val="C00000"/>
+                        </a:solidFill>
+                        <a:latin typeface="Cambria Math" panose="02040503050406030204" pitchFamily="18" charset="0"/>
+                      </a:rPr>
+                      <m:t>𝟏</m:t>
+                    </m:r>
+                  </m:oMath>
+                </a14:m>
+                <a:r>
+                  <a:rPr lang="en-US" sz="2400" b="1" dirty="0">
+                    <a:solidFill>
+                      <a:srgbClr val="C00000"/>
+                    </a:solidFill>
+                  </a:rPr>
+                  <a:t> </a:t>
+                </a:r>
+              </a:p>
+            </p:txBody>
+          </p:sp>
+        </mc:Choice>
+        <mc:Fallback>
+          <p:sp>
+            <p:nvSpPr>
+              <p:cNvPr id="29" name="Rectangle: Rounded Corners 28">
+                <a:extLst>
+                  <a:ext uri="{FF2B5EF4-FFF2-40B4-BE49-F238E27FC236}">
+                    <a16:creationId xmlns:a16="http://schemas.microsoft.com/office/drawing/2014/main" id="{1160DBA6-44A0-49C1-8DDC-47BE0FD042A9}"/>
+                  </a:ext>
+                </a:extLst>
+              </p:cNvPr>
+              <p:cNvSpPr>
+                <a:spLocks noRot="1" noChangeAspect="1" noMove="1" noResize="1" noEditPoints="1" noAdjustHandles="1" noChangeArrowheads="1" noChangeShapeType="1" noTextEdit="1"/>
+              </p:cNvSpPr>
+              <p:nvPr/>
+            </p:nvSpPr>
+            <p:spPr>
+              <a:xfrm>
+                <a:off x="6267360" y="3751011"/>
+                <a:ext cx="1322883" cy="458070"/>
+              </a:xfrm>
+              <a:prstGeom prst="roundRect">
+                <a:avLst>
+                  <a:gd name="adj" fmla="val 50000"/>
+                </a:avLst>
+              </a:prstGeom>
+              <a:blipFill>
+                <a:blip r:embed="rId2"/>
+                <a:stretch>
+                  <a:fillRect/>
+                </a:stretch>
+              </a:blipFill>
+              <a:ln>
+                <a:noFill/>
+              </a:ln>
+            </p:spPr>
+            <p:txBody>
+              <a:bodyPr/>
+              <a:lstStyle/>
+              <a:p>
+                <a:r>
+                  <a:rPr lang="en-US">
+                    <a:noFill/>
+                  </a:rPr>
+                  <a:t> </a:t>
+                </a:r>
+              </a:p>
+            </p:txBody>
+          </p:sp>
+        </mc:Fallback>
+      </mc:AlternateContent>
+      <mc:AlternateContent xmlns:mc="http://schemas.openxmlformats.org/markup-compatibility/2006">
+        <mc:Choice xmlns:a14="http://schemas.microsoft.com/office/drawing/2010/main" Requires="a14">
+          <p:sp>
+            <p:nvSpPr>
+              <p:cNvPr id="30" name="Rectangle: Rounded Corners 29">
+                <a:extLst>
+                  <a:ext uri="{FF2B5EF4-FFF2-40B4-BE49-F238E27FC236}">
+                    <a16:creationId xmlns:a16="http://schemas.microsoft.com/office/drawing/2014/main" id="{3CDB28E5-E1F2-1EA9-B344-257601632D00}"/>
+                  </a:ext>
+                </a:extLst>
+              </p:cNvPr>
+              <p:cNvSpPr/>
+              <p:nvPr/>
+            </p:nvSpPr>
+            <p:spPr>
+              <a:xfrm>
+                <a:off x="6817110" y="2023960"/>
+                <a:ext cx="317473" cy="458070"/>
+              </a:xfrm>
+              <a:prstGeom prst="roundRect">
+                <a:avLst>
+                  <a:gd name="adj" fmla="val 50000"/>
+                </a:avLst>
+              </a:prstGeom>
+              <a:solidFill>
+                <a:schemeClr val="bg1">
+                  <a:alpha val="67000"/>
+                </a:schemeClr>
+              </a:solidFill>
+              <a:ln>
+                <a:noFill/>
+              </a:ln>
+            </p:spPr>
+            <p:style>
+              <a:lnRef idx="2">
+                <a:schemeClr val="accent1">
+                  <a:shade val="15000"/>
+                </a:schemeClr>
+              </a:lnRef>
+              <a:fillRef idx="1">
+                <a:schemeClr val="accent1"/>
+              </a:fillRef>
+              <a:effectRef idx="0">
+                <a:schemeClr val="accent1"/>
+              </a:effectRef>
+              <a:fontRef idx="minor">
+                <a:schemeClr val="lt1"/>
+              </a:fontRef>
+            </p:style>
+            <p:txBody>
+              <a:bodyPr rtlCol="0" anchor="ctr"/>
+              <a:lstStyle/>
+              <a:p>
+                <a:pPr algn="ctr"/>
+                <a14:m>
+                  <m:oMath xmlns:m="http://schemas.openxmlformats.org/officeDocument/2006/math">
+                    <m:r>
+                      <a:rPr lang="en-US" sz="2400" b="1" i="1" smtClean="0">
+                        <a:solidFill>
+                          <a:schemeClr val="accent5"/>
+                        </a:solidFill>
+                        <a:latin typeface="Cambria Math" panose="02040503050406030204" pitchFamily="18" charset="0"/>
+                      </a:rPr>
+                      <m:t>𝟏</m:t>
+                    </m:r>
+                  </m:oMath>
+                </a14:m>
+                <a:r>
+                  <a:rPr lang="en-US" sz="2400" b="1" dirty="0">
+                    <a:solidFill>
+                      <a:schemeClr val="accent5"/>
+                    </a:solidFill>
+                  </a:rPr>
+                  <a:t> </a:t>
+                </a:r>
+              </a:p>
+            </p:txBody>
+          </p:sp>
+        </mc:Choice>
+        <mc:Fallback>
+          <p:sp>
+            <p:nvSpPr>
+              <p:cNvPr id="30" name="Rectangle: Rounded Corners 29">
+                <a:extLst>
+                  <a:ext uri="{FF2B5EF4-FFF2-40B4-BE49-F238E27FC236}">
+                    <a16:creationId xmlns:a16="http://schemas.microsoft.com/office/drawing/2014/main" id="{3CDB28E5-E1F2-1EA9-B344-257601632D00}"/>
+                  </a:ext>
+                </a:extLst>
+              </p:cNvPr>
+              <p:cNvSpPr>
+                <a:spLocks noRot="1" noChangeAspect="1" noMove="1" noResize="1" noEditPoints="1" noAdjustHandles="1" noChangeArrowheads="1" noChangeShapeType="1" noTextEdit="1"/>
+              </p:cNvSpPr>
+              <p:nvPr/>
+            </p:nvSpPr>
+            <p:spPr>
+              <a:xfrm>
+                <a:off x="6817110" y="2023960"/>
+                <a:ext cx="317473" cy="458070"/>
+              </a:xfrm>
+              <a:prstGeom prst="roundRect">
+                <a:avLst>
+                  <a:gd name="adj" fmla="val 50000"/>
+                </a:avLst>
+              </a:prstGeom>
+              <a:blipFill>
+                <a:blip r:embed="rId3"/>
+                <a:stretch>
+                  <a:fillRect l="-11538" r="-13462"/>
+                </a:stretch>
+              </a:blipFill>
+              <a:ln>
+                <a:noFill/>
+              </a:ln>
+            </p:spPr>
+            <p:txBody>
+              <a:bodyPr/>
+              <a:lstStyle/>
+              <a:p>
+                <a:r>
+                  <a:rPr lang="en-US">
+                    <a:noFill/>
+                  </a:rPr>
+                  <a:t> </a:t>
+                </a:r>
+              </a:p>
+            </p:txBody>
+          </p:sp>
+        </mc:Fallback>
+      </mc:AlternateContent>
+      <p:cxnSp>
+        <p:nvCxnSpPr>
+          <p:cNvPr id="31" name="Straight Arrow Connector 30">
+            <a:extLst>
+              <a:ext uri="{FF2B5EF4-FFF2-40B4-BE49-F238E27FC236}">
+                <a16:creationId xmlns:a16="http://schemas.microsoft.com/office/drawing/2014/main" id="{2C122249-8963-97A5-B1A6-3F895ECD21A8}"/>
+              </a:ext>
+            </a:extLst>
+          </p:cNvPr>
+          <p:cNvCxnSpPr>
+            <a:cxnSpLocks/>
+          </p:cNvCxnSpPr>
+          <p:nvPr/>
+        </p:nvCxnSpPr>
+        <p:spPr>
+          <a:xfrm>
+            <a:off x="6534150" y="1981200"/>
+            <a:ext cx="712388" cy="847725"/>
+          </a:xfrm>
+          <a:prstGeom prst="straightConnector1">
+            <a:avLst/>
+          </a:prstGeom>
+          <a:ln w="38100">
+            <a:solidFill>
+              <a:schemeClr val="accent5"/>
+            </a:solidFill>
+            <a:headEnd type="arrow" w="med" len="med"/>
+            <a:tailEnd type="arrow" w="med" len="med"/>
+          </a:ln>
+        </p:spPr>
+        <p:style>
+          <a:lnRef idx="1">
+            <a:schemeClr val="accent1"/>
+          </a:lnRef>
+          <a:fillRef idx="0">
+            <a:schemeClr val="accent1"/>
+          </a:fillRef>
+          <a:effectRef idx="0">
+            <a:schemeClr val="accent1"/>
+          </a:effectRef>
+          <a:fontRef idx="minor">
+            <a:schemeClr val="tx1"/>
+          </a:fontRef>
+        </p:style>
+      </p:cxnSp>
+    </p:spTree>
+    <p:extLst>
+      <p:ext uri="{BB962C8B-B14F-4D97-AF65-F5344CB8AC3E}">
+        <p14:creationId xmlns:p14="http://schemas.microsoft.com/office/powerpoint/2010/main" val="2402910508"/>
+      </p:ext>
+    </p:extLst>
+  </p:cSld>
+  <p:clrMapOvr>
+    <a:masterClrMapping/>
+  </p:clrMapOvr>
+  <mc:AlternateContent xmlns:mc="http://schemas.openxmlformats.org/markup-compatibility/2006">
+    <mc:Choice xmlns:p14="http://schemas.microsoft.com/office/powerpoint/2010/main" Requires="p14">
+      <p:transition spd="med" p14:dur="700">
+        <p:fade/>
+      </p:transition>
+    </mc:Choice>
+    <mc:Fallback>
+      <p:transition spd="med">
+        <p:fade/>
+      </p:transition>
+    </mc:Fallback>
+  </mc:AlternateContent>
+  <p:timing>
+    <p:tnLst>
+      <p:par>
+        <p:cTn id="1" dur="indefinite" restart="never" nodeType="tmRoot">
+          <p:childTnLst>
+            <p:seq concurrent="1" nextAc="seek">
+              <p:cTn id="2" dur="indefinite" nodeType="mainSeq">
+                <p:childTnLst>
+                  <p:par>
+                    <p:cTn id="3" fill="hold">
+                      <p:stCondLst>
+                        <p:cond delay="indefinite"/>
+                        <p:cond evt="onBegin" delay="0">
+                          <p:tn val="2"/>
+                        </p:cond>
+                      </p:stCondLst>
+                      <p:childTnLst>
+                        <p:par>
+                          <p:cTn id="4" fill="hold">
+                            <p:stCondLst>
+                              <p:cond delay="0"/>
+                            </p:stCondLst>
+                            <p:childTnLst>
+                              <p:par>
+                                <p:cTn id="5" presetID="10" presetClass="entr" presetSubtype="0" fill="hold" nodeType="afterEffect">
+                                  <p:stCondLst>
+                                    <p:cond delay="0"/>
+                                  </p:stCondLst>
+                                  <p:childTnLst>
+                                    <p:set>
+                                      <p:cBhvr>
+                                        <p:cTn id="6" dur="1" fill="hold">
+                                          <p:stCondLst>
+                                            <p:cond delay="0"/>
+                                          </p:stCondLst>
+                                        </p:cTn>
+                                        <p:tgtEl>
+                                          <p:spTgt spid="24"/>
+                                        </p:tgtEl>
+                                        <p:attrNameLst>
+                                          <p:attrName>style.visibility</p:attrName>
+                                        </p:attrNameLst>
+                                      </p:cBhvr>
+                                      <p:to>
+                                        <p:strVal val="visible"/>
+                                      </p:to>
+                                    </p:set>
+                                    <p:animEffect transition="in" filter="fade">
+                                      <p:cBhvr>
+                                        <p:cTn id="7" dur="500"/>
+                                        <p:tgtEl>
+                                          <p:spTgt spid="24"/>
+                                        </p:tgtEl>
+                                      </p:cBhvr>
+                                    </p:animEffect>
+                                  </p:childTnLst>
+                                </p:cTn>
+                              </p:par>
+                            </p:childTnLst>
+                          </p:cTn>
+                        </p:par>
+                        <p:par>
+                          <p:cTn id="8" fill="hold">
+                            <p:stCondLst>
+                              <p:cond delay="500"/>
+                            </p:stCondLst>
+                            <p:childTnLst>
+                              <p:par>
+                                <p:cTn id="9" presetID="10" presetClass="entr" presetSubtype="0" fill="hold" grpId="0" nodeType="afterEffect">
+                                  <p:stCondLst>
+                                    <p:cond delay="0"/>
+                                  </p:stCondLst>
+                                  <p:childTnLst>
+                                    <p:set>
+                                      <p:cBhvr>
+                                        <p:cTn id="10" dur="1" fill="hold">
+                                          <p:stCondLst>
+                                            <p:cond delay="0"/>
+                                          </p:stCondLst>
+                                        </p:cTn>
+                                        <p:tgtEl>
+                                          <p:spTgt spid="29"/>
+                                        </p:tgtEl>
+                                        <p:attrNameLst>
+                                          <p:attrName>style.visibility</p:attrName>
+                                        </p:attrNameLst>
+                                      </p:cBhvr>
+                                      <p:to>
+                                        <p:strVal val="visible"/>
+                                      </p:to>
+                                    </p:set>
+                                    <p:animEffect transition="in" filter="fade">
+                                      <p:cBhvr>
+                                        <p:cTn id="11" dur="500"/>
+                                        <p:tgtEl>
+                                          <p:spTgt spid="29"/>
+                                        </p:tgtEl>
+                                      </p:cBhvr>
+                                    </p:animEffect>
+                                  </p:childTnLst>
+                                </p:cTn>
+                              </p:par>
+                            </p:childTnLst>
+                          </p:cTn>
+                        </p:par>
+                      </p:childTnLst>
+                    </p:cTn>
+                  </p:par>
+                </p:childTnLst>
+              </p:cTn>
+              <p:prevCondLst>
+                <p:cond evt="onPrev" delay="0">
+                  <p:tgtEl>
+                    <p:sldTgt/>
+                  </p:tgtEl>
+                </p:cond>
+              </p:prevCondLst>
+              <p:nextCondLst>
+                <p:cond evt="onNext" delay="0">
+                  <p:tgtEl>
+                    <p:sldTgt/>
+                  </p:tgtEl>
+                </p:cond>
+              </p:nextCondLst>
+            </p:seq>
+          </p:childTnLst>
+        </p:cTn>
+      </p:par>
+    </p:tnLst>
+    <p:bldLst>
+      <p:bldP spid="29" grpId="0" animBg="1"/>
+    </p:bldLst>
+  </p:timing>
+</p:sld>
+</file>
+
 <file path=ppt/slides/slide2.xml><?xml version="1.0" encoding="utf-8"?>
 <p:sld xmlns:a="http://schemas.openxmlformats.org/drawingml/2006/main" xmlns:r="http://schemas.openxmlformats.org/officeDocument/2006/relationships" xmlns:p="http://schemas.openxmlformats.org/presentationml/2006/main">
   <p:cSld>

</xml_diff>

<commit_message>
4 circles paradox: no label (hidden)
</commit_message>
<xml_diff>
--- a/slides_x_mas_2023.pptx
+++ b/slides_x_mas_2023.pptx
@@ -14,10 +14,11 @@
     <p:sldId id="263" r:id="rId8"/>
     <p:sldId id="266" r:id="rId9"/>
     <p:sldId id="267" r:id="rId10"/>
-    <p:sldId id="268" r:id="rId11"/>
-    <p:sldId id="272" r:id="rId12"/>
-    <p:sldId id="273" r:id="rId13"/>
-    <p:sldId id="269" r:id="rId14"/>
+    <p:sldId id="270" r:id="rId11"/>
+    <p:sldId id="268" r:id="rId12"/>
+    <p:sldId id="272" r:id="rId13"/>
+    <p:sldId id="273" r:id="rId14"/>
+    <p:sldId id="269" r:id="rId15"/>
   </p:sldIdLst>
   <p:sldSz cx="12192000" cy="6858000"/>
   <p:notesSz cx="6858000" cy="9144000"/>
@@ -141,6 +142,7 @@
         </p14:section>
         <p14:section name="Paradoxical" id="{E2223571-FAC5-4589-B421-244975766BB0}">
           <p14:sldIdLst>
+            <p14:sldId id="270"/>
             <p14:sldId id="268"/>
             <p14:sldId id="272"/>
             <p14:sldId id="273"/>
@@ -3545,7 +3547,7 @@
 </file>
 
 <file path=ppt/slides/slide10.xml><?xml version="1.0" encoding="utf-8"?>
-<p:sld xmlns:a="http://schemas.openxmlformats.org/drawingml/2006/main" xmlns:r="http://schemas.openxmlformats.org/officeDocument/2006/relationships" xmlns:p="http://schemas.openxmlformats.org/presentationml/2006/main">
+<p:sld xmlns:a="http://schemas.openxmlformats.org/drawingml/2006/main" xmlns:r="http://schemas.openxmlformats.org/officeDocument/2006/relationships" xmlns:p="http://schemas.openxmlformats.org/presentationml/2006/main" show="0">
   <p:cSld>
     <p:spTree>
       <p:nvGrpSpPr>
@@ -3725,6 +3727,1076 @@
           </a:p>
         </p:txBody>
       </p:sp>
+      <p:sp>
+        <p:nvSpPr>
+          <p:cNvPr id="13" name="Freeform: Shape 12">
+            <a:extLst>
+              <a:ext uri="{FF2B5EF4-FFF2-40B4-BE49-F238E27FC236}">
+                <a16:creationId xmlns:a16="http://schemas.microsoft.com/office/drawing/2014/main" id="{EBB250A9-01B5-A9A8-C2E0-63EC801B8D27}"/>
+              </a:ext>
+            </a:extLst>
+          </p:cNvPr>
+          <p:cNvSpPr/>
+          <p:nvPr/>
+        </p:nvSpPr>
+        <p:spPr>
+          <a:xfrm>
+            <a:off x="7198454" y="2773007"/>
+            <a:ext cx="118313" cy="118319"/>
+          </a:xfrm>
+          <a:custGeom>
+            <a:avLst/>
+            <a:gdLst>
+              <a:gd name="connsiteX0" fmla="*/ 118313 w 118313"/>
+              <a:gd name="connsiteY0" fmla="*/ 0 h 118319"/>
+              <a:gd name="connsiteX1" fmla="*/ 1211 w 118313"/>
+              <a:gd name="connsiteY1" fmla="*/ 117474 h 118319"/>
+              <a:gd name="connsiteX2" fmla="*/ 0 w 118313"/>
+              <a:gd name="connsiteY2" fmla="*/ 846 h 118319"/>
+              <a:gd name="connsiteX3" fmla="*/ 117102 w 118313"/>
+              <a:gd name="connsiteY3" fmla="*/ 118319 h 118319"/>
+            </a:gdLst>
+            <a:ahLst/>
+            <a:cxnLst>
+              <a:cxn ang="0">
+                <a:pos x="connsiteX0" y="connsiteY0"/>
+              </a:cxn>
+              <a:cxn ang="0">
+                <a:pos x="connsiteX1" y="connsiteY1"/>
+              </a:cxn>
+              <a:cxn ang="0">
+                <a:pos x="connsiteX2" y="connsiteY2"/>
+              </a:cxn>
+              <a:cxn ang="0">
+                <a:pos x="connsiteX3" y="connsiteY3"/>
+              </a:cxn>
+            </a:cxnLst>
+            <a:rect l="l" t="t" r="r" b="b"/>
+            <a:pathLst>
+              <a:path w="118313" h="118319">
+                <a:moveTo>
+                  <a:pt x="118313" y="0"/>
+                </a:moveTo>
+                <a:lnTo>
+                  <a:pt x="1211" y="117474"/>
+                </a:lnTo>
+                <a:moveTo>
+                  <a:pt x="0" y="846"/>
+                </a:moveTo>
+                <a:lnTo>
+                  <a:pt x="117102" y="118319"/>
+                </a:lnTo>
+              </a:path>
+            </a:pathLst>
+          </a:custGeom>
+          <a:noFill/>
+          <a:ln w="24486" cap="rnd">
+            <a:solidFill>
+              <a:srgbClr val="808080"/>
+            </a:solidFill>
+            <a:prstDash val="solid"/>
+            <a:miter/>
+          </a:ln>
+        </p:spPr>
+        <p:txBody>
+          <a:bodyPr rtlCol="0" anchor="ctr"/>
+          <a:lstStyle/>
+          <a:p>
+            <a:endParaRPr lang="en-US"/>
+          </a:p>
+        </p:txBody>
+      </p:sp>
+      <p:sp>
+        <p:nvSpPr>
+          <p:cNvPr id="14" name="Freeform: Shape 13">
+            <a:extLst>
+              <a:ext uri="{FF2B5EF4-FFF2-40B4-BE49-F238E27FC236}">
+                <a16:creationId xmlns:a16="http://schemas.microsoft.com/office/drawing/2014/main" id="{A4DDC5C8-D3CF-896F-1915-6DD2393BDE25}"/>
+              </a:ext>
+            </a:extLst>
+          </p:cNvPr>
+          <p:cNvSpPr/>
+          <p:nvPr/>
+        </p:nvSpPr>
+        <p:spPr>
+          <a:xfrm>
+            <a:off x="4884522" y="2773007"/>
+            <a:ext cx="118313" cy="118319"/>
+          </a:xfrm>
+          <a:custGeom>
+            <a:avLst/>
+            <a:gdLst>
+              <a:gd name="connsiteX0" fmla="*/ 118313 w 118313"/>
+              <a:gd name="connsiteY0" fmla="*/ 0 h 118319"/>
+              <a:gd name="connsiteX1" fmla="*/ 1211 w 118313"/>
+              <a:gd name="connsiteY1" fmla="*/ 117474 h 118319"/>
+              <a:gd name="connsiteX2" fmla="*/ 0 w 118313"/>
+              <a:gd name="connsiteY2" fmla="*/ 846 h 118319"/>
+              <a:gd name="connsiteX3" fmla="*/ 117102 w 118313"/>
+              <a:gd name="connsiteY3" fmla="*/ 118319 h 118319"/>
+            </a:gdLst>
+            <a:ahLst/>
+            <a:cxnLst>
+              <a:cxn ang="0">
+                <a:pos x="connsiteX0" y="connsiteY0"/>
+              </a:cxn>
+              <a:cxn ang="0">
+                <a:pos x="connsiteX1" y="connsiteY1"/>
+              </a:cxn>
+              <a:cxn ang="0">
+                <a:pos x="connsiteX2" y="connsiteY2"/>
+              </a:cxn>
+              <a:cxn ang="0">
+                <a:pos x="connsiteX3" y="connsiteY3"/>
+              </a:cxn>
+            </a:cxnLst>
+            <a:rect l="l" t="t" r="r" b="b"/>
+            <a:pathLst>
+              <a:path w="118313" h="118319">
+                <a:moveTo>
+                  <a:pt x="118313" y="0"/>
+                </a:moveTo>
+                <a:lnTo>
+                  <a:pt x="1211" y="117474"/>
+                </a:lnTo>
+                <a:moveTo>
+                  <a:pt x="0" y="846"/>
+                </a:moveTo>
+                <a:lnTo>
+                  <a:pt x="117102" y="118319"/>
+                </a:lnTo>
+              </a:path>
+            </a:pathLst>
+          </a:custGeom>
+          <a:noFill/>
+          <a:ln w="24486" cap="rnd">
+            <a:solidFill>
+              <a:srgbClr val="808080"/>
+            </a:solidFill>
+            <a:prstDash val="solid"/>
+            <a:miter/>
+          </a:ln>
+        </p:spPr>
+        <p:txBody>
+          <a:bodyPr rtlCol="0" anchor="ctr"/>
+          <a:lstStyle/>
+          <a:p>
+            <a:endParaRPr lang="en-US"/>
+          </a:p>
+        </p:txBody>
+      </p:sp>
+      <p:sp>
+        <p:nvSpPr>
+          <p:cNvPr id="15" name="Freeform: Shape 14">
+            <a:extLst>
+              <a:ext uri="{FF2B5EF4-FFF2-40B4-BE49-F238E27FC236}">
+                <a16:creationId xmlns:a16="http://schemas.microsoft.com/office/drawing/2014/main" id="{FC309EB5-9A19-0F14-FE29-80DB88C82A77}"/>
+              </a:ext>
+            </a:extLst>
+          </p:cNvPr>
+          <p:cNvSpPr/>
+          <p:nvPr/>
+        </p:nvSpPr>
+        <p:spPr>
+          <a:xfrm>
+            <a:off x="4884522" y="5086939"/>
+            <a:ext cx="118313" cy="118313"/>
+          </a:xfrm>
+          <a:custGeom>
+            <a:avLst/>
+            <a:gdLst>
+              <a:gd name="connsiteX0" fmla="*/ 118313 w 118313"/>
+              <a:gd name="connsiteY0" fmla="*/ 0 h 118313"/>
+              <a:gd name="connsiteX1" fmla="*/ 1211 w 118313"/>
+              <a:gd name="connsiteY1" fmla="*/ 117473 h 118313"/>
+              <a:gd name="connsiteX2" fmla="*/ 0 w 118313"/>
+              <a:gd name="connsiteY2" fmla="*/ 846 h 118313"/>
+              <a:gd name="connsiteX3" fmla="*/ 117102 w 118313"/>
+              <a:gd name="connsiteY3" fmla="*/ 118313 h 118313"/>
+            </a:gdLst>
+            <a:ahLst/>
+            <a:cxnLst>
+              <a:cxn ang="0">
+                <a:pos x="connsiteX0" y="connsiteY0"/>
+              </a:cxn>
+              <a:cxn ang="0">
+                <a:pos x="connsiteX1" y="connsiteY1"/>
+              </a:cxn>
+              <a:cxn ang="0">
+                <a:pos x="connsiteX2" y="connsiteY2"/>
+              </a:cxn>
+              <a:cxn ang="0">
+                <a:pos x="connsiteX3" y="connsiteY3"/>
+              </a:cxn>
+            </a:cxnLst>
+            <a:rect l="l" t="t" r="r" b="b"/>
+            <a:pathLst>
+              <a:path w="118313" h="118313">
+                <a:moveTo>
+                  <a:pt x="118313" y="0"/>
+                </a:moveTo>
+                <a:lnTo>
+                  <a:pt x="1211" y="117473"/>
+                </a:lnTo>
+                <a:moveTo>
+                  <a:pt x="0" y="846"/>
+                </a:moveTo>
+                <a:lnTo>
+                  <a:pt x="117102" y="118313"/>
+                </a:lnTo>
+              </a:path>
+            </a:pathLst>
+          </a:custGeom>
+          <a:noFill/>
+          <a:ln w="24486" cap="rnd">
+            <a:solidFill>
+              <a:srgbClr val="808080"/>
+            </a:solidFill>
+            <a:prstDash val="solid"/>
+            <a:miter/>
+          </a:ln>
+        </p:spPr>
+        <p:txBody>
+          <a:bodyPr rtlCol="0" anchor="ctr"/>
+          <a:lstStyle/>
+          <a:p>
+            <a:endParaRPr lang="en-US"/>
+          </a:p>
+        </p:txBody>
+      </p:sp>
+      <p:sp>
+        <p:nvSpPr>
+          <p:cNvPr id="16" name="Freeform: Shape 15">
+            <a:extLst>
+              <a:ext uri="{FF2B5EF4-FFF2-40B4-BE49-F238E27FC236}">
+                <a16:creationId xmlns:a16="http://schemas.microsoft.com/office/drawing/2014/main" id="{3F831900-4E44-A885-9ADE-2BB52E0324DC}"/>
+              </a:ext>
+            </a:extLst>
+          </p:cNvPr>
+          <p:cNvSpPr/>
+          <p:nvPr/>
+        </p:nvSpPr>
+        <p:spPr>
+          <a:xfrm>
+            <a:off x="7198454" y="5086939"/>
+            <a:ext cx="118313" cy="118313"/>
+          </a:xfrm>
+          <a:custGeom>
+            <a:avLst/>
+            <a:gdLst>
+              <a:gd name="connsiteX0" fmla="*/ 118313 w 118313"/>
+              <a:gd name="connsiteY0" fmla="*/ 0 h 118313"/>
+              <a:gd name="connsiteX1" fmla="*/ 1211 w 118313"/>
+              <a:gd name="connsiteY1" fmla="*/ 117473 h 118313"/>
+              <a:gd name="connsiteX2" fmla="*/ 0 w 118313"/>
+              <a:gd name="connsiteY2" fmla="*/ 846 h 118313"/>
+              <a:gd name="connsiteX3" fmla="*/ 117102 w 118313"/>
+              <a:gd name="connsiteY3" fmla="*/ 118313 h 118313"/>
+            </a:gdLst>
+            <a:ahLst/>
+            <a:cxnLst>
+              <a:cxn ang="0">
+                <a:pos x="connsiteX0" y="connsiteY0"/>
+              </a:cxn>
+              <a:cxn ang="0">
+                <a:pos x="connsiteX1" y="connsiteY1"/>
+              </a:cxn>
+              <a:cxn ang="0">
+                <a:pos x="connsiteX2" y="connsiteY2"/>
+              </a:cxn>
+              <a:cxn ang="0">
+                <a:pos x="connsiteX3" y="connsiteY3"/>
+              </a:cxn>
+            </a:cxnLst>
+            <a:rect l="l" t="t" r="r" b="b"/>
+            <a:pathLst>
+              <a:path w="118313" h="118313">
+                <a:moveTo>
+                  <a:pt x="118313" y="0"/>
+                </a:moveTo>
+                <a:lnTo>
+                  <a:pt x="1211" y="117473"/>
+                </a:lnTo>
+                <a:moveTo>
+                  <a:pt x="0" y="846"/>
+                </a:moveTo>
+                <a:lnTo>
+                  <a:pt x="117102" y="118313"/>
+                </a:lnTo>
+              </a:path>
+            </a:pathLst>
+          </a:custGeom>
+          <a:noFill/>
+          <a:ln w="24486" cap="rnd">
+            <a:solidFill>
+              <a:srgbClr val="808080"/>
+            </a:solidFill>
+            <a:prstDash val="solid"/>
+            <a:miter/>
+          </a:ln>
+        </p:spPr>
+        <p:txBody>
+          <a:bodyPr rtlCol="0" anchor="ctr"/>
+          <a:lstStyle/>
+          <a:p>
+            <a:endParaRPr lang="en-US"/>
+          </a:p>
+        </p:txBody>
+      </p:sp>
+      <p:sp>
+        <p:nvSpPr>
+          <p:cNvPr id="17" name="Freeform: Shape 16">
+            <a:extLst>
+              <a:ext uri="{FF2B5EF4-FFF2-40B4-BE49-F238E27FC236}">
+                <a16:creationId xmlns:a16="http://schemas.microsoft.com/office/drawing/2014/main" id="{B27FA6BC-CF38-97C4-A294-8716A7C43D75}"/>
+              </a:ext>
+            </a:extLst>
+          </p:cNvPr>
+          <p:cNvSpPr/>
+          <p:nvPr/>
+        </p:nvSpPr>
+        <p:spPr>
+          <a:xfrm>
+            <a:off x="3772431" y="1660916"/>
+            <a:ext cx="4656430" cy="4656430"/>
+          </a:xfrm>
+          <a:custGeom>
+            <a:avLst/>
+            <a:gdLst>
+              <a:gd name="connsiteX0" fmla="*/ 0 w 4656430"/>
+              <a:gd name="connsiteY0" fmla="*/ 0 h 4656430"/>
+              <a:gd name="connsiteX1" fmla="*/ 4656431 w 4656430"/>
+              <a:gd name="connsiteY1" fmla="*/ 0 h 4656430"/>
+              <a:gd name="connsiteX2" fmla="*/ 4656431 w 4656430"/>
+              <a:gd name="connsiteY2" fmla="*/ 4656431 h 4656430"/>
+              <a:gd name="connsiteX3" fmla="*/ 0 w 4656430"/>
+              <a:gd name="connsiteY3" fmla="*/ 4656431 h 4656430"/>
+            </a:gdLst>
+            <a:ahLst/>
+            <a:cxnLst>
+              <a:cxn ang="0">
+                <a:pos x="connsiteX0" y="connsiteY0"/>
+              </a:cxn>
+              <a:cxn ang="0">
+                <a:pos x="connsiteX1" y="connsiteY1"/>
+              </a:cxn>
+              <a:cxn ang="0">
+                <a:pos x="connsiteX2" y="connsiteY2"/>
+              </a:cxn>
+              <a:cxn ang="0">
+                <a:pos x="connsiteX3" y="connsiteY3"/>
+              </a:cxn>
+            </a:cxnLst>
+            <a:rect l="l" t="t" r="r" b="b"/>
+            <a:pathLst>
+              <a:path w="4656430" h="4656430">
+                <a:moveTo>
+                  <a:pt x="0" y="0"/>
+                </a:moveTo>
+                <a:lnTo>
+                  <a:pt x="4656431" y="0"/>
+                </a:lnTo>
+                <a:lnTo>
+                  <a:pt x="4656431" y="4656431"/>
+                </a:lnTo>
+                <a:lnTo>
+                  <a:pt x="0" y="4656431"/>
+                </a:lnTo>
+                <a:close/>
+              </a:path>
+            </a:pathLst>
+          </a:custGeom>
+          <a:noFill/>
+          <a:ln w="57055" cap="rnd">
+            <a:solidFill>
+              <a:srgbClr val="5AA02C"/>
+            </a:solidFill>
+            <a:prstDash val="solid"/>
+            <a:miter/>
+          </a:ln>
+        </p:spPr>
+        <p:txBody>
+          <a:bodyPr rtlCol="0" anchor="ctr"/>
+          <a:lstStyle/>
+          <a:p>
+            <a:endParaRPr lang="en-US"/>
+          </a:p>
+        </p:txBody>
+      </p:sp>
+      <p:sp>
+        <p:nvSpPr>
+          <p:cNvPr id="18" name="Freeform: Shape 17">
+            <a:extLst>
+              <a:ext uri="{FF2B5EF4-FFF2-40B4-BE49-F238E27FC236}">
+                <a16:creationId xmlns:a16="http://schemas.microsoft.com/office/drawing/2014/main" id="{255D245B-8679-F95D-DF14-A8426BF2EA6F}"/>
+              </a:ext>
+            </a:extLst>
+          </p:cNvPr>
+          <p:cNvSpPr/>
+          <p:nvPr/>
+        </p:nvSpPr>
+        <p:spPr>
+          <a:xfrm>
+            <a:off x="6137530" y="1712084"/>
+            <a:ext cx="2240160" cy="2240160"/>
+          </a:xfrm>
+          <a:custGeom>
+            <a:avLst/>
+            <a:gdLst>
+              <a:gd name="connsiteX0" fmla="*/ 2240160 w 2240160"/>
+              <a:gd name="connsiteY0" fmla="*/ 1120080 h 2240160"/>
+              <a:gd name="connsiteX1" fmla="*/ 1120080 w 2240160"/>
+              <a:gd name="connsiteY1" fmla="*/ 2240160 h 2240160"/>
+              <a:gd name="connsiteX2" fmla="*/ 0 w 2240160"/>
+              <a:gd name="connsiteY2" fmla="*/ 1120080 h 2240160"/>
+              <a:gd name="connsiteX3" fmla="*/ 1120080 w 2240160"/>
+              <a:gd name="connsiteY3" fmla="*/ 0 h 2240160"/>
+              <a:gd name="connsiteX4" fmla="*/ 2240160 w 2240160"/>
+              <a:gd name="connsiteY4" fmla="*/ 1120080 h 2240160"/>
+            </a:gdLst>
+            <a:ahLst/>
+            <a:cxnLst>
+              <a:cxn ang="0">
+                <a:pos x="connsiteX0" y="connsiteY0"/>
+              </a:cxn>
+              <a:cxn ang="0">
+                <a:pos x="connsiteX1" y="connsiteY1"/>
+              </a:cxn>
+              <a:cxn ang="0">
+                <a:pos x="connsiteX2" y="connsiteY2"/>
+              </a:cxn>
+              <a:cxn ang="0">
+                <a:pos x="connsiteX3" y="connsiteY3"/>
+              </a:cxn>
+              <a:cxn ang="0">
+                <a:pos x="connsiteX4" y="connsiteY4"/>
+              </a:cxn>
+            </a:cxnLst>
+            <a:rect l="l" t="t" r="r" b="b"/>
+            <a:pathLst>
+              <a:path w="2240160" h="2240160">
+                <a:moveTo>
+                  <a:pt x="2240160" y="1120080"/>
+                </a:moveTo>
+                <a:cubicBezTo>
+                  <a:pt x="2240160" y="1738683"/>
+                  <a:pt x="1738683" y="2240160"/>
+                  <a:pt x="1120080" y="2240160"/>
+                </a:cubicBezTo>
+                <a:cubicBezTo>
+                  <a:pt x="501477" y="2240160"/>
+                  <a:pt x="0" y="1738683"/>
+                  <a:pt x="0" y="1120080"/>
+                </a:cubicBezTo>
+                <a:cubicBezTo>
+                  <a:pt x="0" y="501477"/>
+                  <a:pt x="501477" y="0"/>
+                  <a:pt x="1120080" y="0"/>
+                </a:cubicBezTo>
+                <a:cubicBezTo>
+                  <a:pt x="1738683" y="0"/>
+                  <a:pt x="2240160" y="501477"/>
+                  <a:pt x="2240160" y="1120080"/>
+                </a:cubicBezTo>
+                <a:close/>
+              </a:path>
+            </a:pathLst>
+          </a:custGeom>
+          <a:noFill/>
+          <a:ln w="45138" cap="sq">
+            <a:solidFill>
+              <a:srgbClr val="37ABC8"/>
+            </a:solidFill>
+            <a:prstDash val="solid"/>
+            <a:miter/>
+          </a:ln>
+        </p:spPr>
+        <p:txBody>
+          <a:bodyPr rtlCol="0" anchor="ctr"/>
+          <a:lstStyle/>
+          <a:p>
+            <a:endParaRPr lang="en-US"/>
+          </a:p>
+        </p:txBody>
+      </p:sp>
+      <p:sp>
+        <p:nvSpPr>
+          <p:cNvPr id="19" name="Freeform: Shape 18">
+            <a:extLst>
+              <a:ext uri="{FF2B5EF4-FFF2-40B4-BE49-F238E27FC236}">
+                <a16:creationId xmlns:a16="http://schemas.microsoft.com/office/drawing/2014/main" id="{D2500A33-AE17-252C-E174-D1197C4C3128}"/>
+              </a:ext>
+            </a:extLst>
+          </p:cNvPr>
+          <p:cNvSpPr/>
+          <p:nvPr/>
+        </p:nvSpPr>
+        <p:spPr>
+          <a:xfrm>
+            <a:off x="3823598" y="1712084"/>
+            <a:ext cx="2240160" cy="2240160"/>
+          </a:xfrm>
+          <a:custGeom>
+            <a:avLst/>
+            <a:gdLst>
+              <a:gd name="connsiteX0" fmla="*/ 2240160 w 2240160"/>
+              <a:gd name="connsiteY0" fmla="*/ 1120080 h 2240160"/>
+              <a:gd name="connsiteX1" fmla="*/ 1120080 w 2240160"/>
+              <a:gd name="connsiteY1" fmla="*/ 2240160 h 2240160"/>
+              <a:gd name="connsiteX2" fmla="*/ 0 w 2240160"/>
+              <a:gd name="connsiteY2" fmla="*/ 1120080 h 2240160"/>
+              <a:gd name="connsiteX3" fmla="*/ 1120080 w 2240160"/>
+              <a:gd name="connsiteY3" fmla="*/ 0 h 2240160"/>
+              <a:gd name="connsiteX4" fmla="*/ 2240160 w 2240160"/>
+              <a:gd name="connsiteY4" fmla="*/ 1120080 h 2240160"/>
+            </a:gdLst>
+            <a:ahLst/>
+            <a:cxnLst>
+              <a:cxn ang="0">
+                <a:pos x="connsiteX0" y="connsiteY0"/>
+              </a:cxn>
+              <a:cxn ang="0">
+                <a:pos x="connsiteX1" y="connsiteY1"/>
+              </a:cxn>
+              <a:cxn ang="0">
+                <a:pos x="connsiteX2" y="connsiteY2"/>
+              </a:cxn>
+              <a:cxn ang="0">
+                <a:pos x="connsiteX3" y="connsiteY3"/>
+              </a:cxn>
+              <a:cxn ang="0">
+                <a:pos x="connsiteX4" y="connsiteY4"/>
+              </a:cxn>
+            </a:cxnLst>
+            <a:rect l="l" t="t" r="r" b="b"/>
+            <a:pathLst>
+              <a:path w="2240160" h="2240160">
+                <a:moveTo>
+                  <a:pt x="2240160" y="1120080"/>
+                </a:moveTo>
+                <a:cubicBezTo>
+                  <a:pt x="2240160" y="1738683"/>
+                  <a:pt x="1738683" y="2240160"/>
+                  <a:pt x="1120080" y="2240160"/>
+                </a:cubicBezTo>
+                <a:cubicBezTo>
+                  <a:pt x="501477" y="2240160"/>
+                  <a:pt x="0" y="1738683"/>
+                  <a:pt x="0" y="1120080"/>
+                </a:cubicBezTo>
+                <a:cubicBezTo>
+                  <a:pt x="0" y="501477"/>
+                  <a:pt x="501477" y="0"/>
+                  <a:pt x="1120080" y="0"/>
+                </a:cubicBezTo>
+                <a:cubicBezTo>
+                  <a:pt x="1738683" y="0"/>
+                  <a:pt x="2240160" y="501477"/>
+                  <a:pt x="2240160" y="1120080"/>
+                </a:cubicBezTo>
+                <a:close/>
+              </a:path>
+            </a:pathLst>
+          </a:custGeom>
+          <a:noFill/>
+          <a:ln w="45138" cap="sq">
+            <a:solidFill>
+              <a:srgbClr val="37ABC8"/>
+            </a:solidFill>
+            <a:prstDash val="solid"/>
+            <a:miter/>
+          </a:ln>
+        </p:spPr>
+        <p:txBody>
+          <a:bodyPr rtlCol="0" anchor="ctr"/>
+          <a:lstStyle/>
+          <a:p>
+            <a:endParaRPr lang="en-US"/>
+          </a:p>
+        </p:txBody>
+      </p:sp>
+      <p:sp>
+        <p:nvSpPr>
+          <p:cNvPr id="20" name="Freeform: Shape 19">
+            <a:extLst>
+              <a:ext uri="{FF2B5EF4-FFF2-40B4-BE49-F238E27FC236}">
+                <a16:creationId xmlns:a16="http://schemas.microsoft.com/office/drawing/2014/main" id="{DD038C99-415F-73A9-C25F-5DC759A1DEFF}"/>
+              </a:ext>
+            </a:extLst>
+          </p:cNvPr>
+          <p:cNvSpPr/>
+          <p:nvPr/>
+        </p:nvSpPr>
+        <p:spPr>
+          <a:xfrm>
+            <a:off x="3823598" y="4026015"/>
+            <a:ext cx="2240160" cy="2240160"/>
+          </a:xfrm>
+          <a:custGeom>
+            <a:avLst/>
+            <a:gdLst>
+              <a:gd name="connsiteX0" fmla="*/ 2240160 w 2240160"/>
+              <a:gd name="connsiteY0" fmla="*/ 1120080 h 2240160"/>
+              <a:gd name="connsiteX1" fmla="*/ 1120080 w 2240160"/>
+              <a:gd name="connsiteY1" fmla="*/ 2240161 h 2240160"/>
+              <a:gd name="connsiteX2" fmla="*/ 0 w 2240160"/>
+              <a:gd name="connsiteY2" fmla="*/ 1120080 h 2240160"/>
+              <a:gd name="connsiteX3" fmla="*/ 1120080 w 2240160"/>
+              <a:gd name="connsiteY3" fmla="*/ 0 h 2240160"/>
+              <a:gd name="connsiteX4" fmla="*/ 2240160 w 2240160"/>
+              <a:gd name="connsiteY4" fmla="*/ 1120080 h 2240160"/>
+            </a:gdLst>
+            <a:ahLst/>
+            <a:cxnLst>
+              <a:cxn ang="0">
+                <a:pos x="connsiteX0" y="connsiteY0"/>
+              </a:cxn>
+              <a:cxn ang="0">
+                <a:pos x="connsiteX1" y="connsiteY1"/>
+              </a:cxn>
+              <a:cxn ang="0">
+                <a:pos x="connsiteX2" y="connsiteY2"/>
+              </a:cxn>
+              <a:cxn ang="0">
+                <a:pos x="connsiteX3" y="connsiteY3"/>
+              </a:cxn>
+              <a:cxn ang="0">
+                <a:pos x="connsiteX4" y="connsiteY4"/>
+              </a:cxn>
+            </a:cxnLst>
+            <a:rect l="l" t="t" r="r" b="b"/>
+            <a:pathLst>
+              <a:path w="2240160" h="2240160">
+                <a:moveTo>
+                  <a:pt x="2240160" y="1120080"/>
+                </a:moveTo>
+                <a:cubicBezTo>
+                  <a:pt x="2240160" y="1738683"/>
+                  <a:pt x="1738683" y="2240161"/>
+                  <a:pt x="1120080" y="2240161"/>
+                </a:cubicBezTo>
+                <a:cubicBezTo>
+                  <a:pt x="501477" y="2240161"/>
+                  <a:pt x="0" y="1738683"/>
+                  <a:pt x="0" y="1120080"/>
+                </a:cubicBezTo>
+                <a:cubicBezTo>
+                  <a:pt x="0" y="501477"/>
+                  <a:pt x="501477" y="0"/>
+                  <a:pt x="1120080" y="0"/>
+                </a:cubicBezTo>
+                <a:cubicBezTo>
+                  <a:pt x="1738683" y="0"/>
+                  <a:pt x="2240160" y="501477"/>
+                  <a:pt x="2240160" y="1120080"/>
+                </a:cubicBezTo>
+                <a:close/>
+              </a:path>
+            </a:pathLst>
+          </a:custGeom>
+          <a:noFill/>
+          <a:ln w="45138" cap="sq">
+            <a:solidFill>
+              <a:srgbClr val="37ABC8"/>
+            </a:solidFill>
+            <a:prstDash val="solid"/>
+            <a:miter/>
+          </a:ln>
+        </p:spPr>
+        <p:txBody>
+          <a:bodyPr rtlCol="0" anchor="ctr"/>
+          <a:lstStyle/>
+          <a:p>
+            <a:endParaRPr lang="en-US"/>
+          </a:p>
+        </p:txBody>
+      </p:sp>
+      <p:sp>
+        <p:nvSpPr>
+          <p:cNvPr id="21" name="Freeform: Shape 20">
+            <a:extLst>
+              <a:ext uri="{FF2B5EF4-FFF2-40B4-BE49-F238E27FC236}">
+                <a16:creationId xmlns:a16="http://schemas.microsoft.com/office/drawing/2014/main" id="{F31E3D6C-86AD-CEAA-E4AD-F010A76C3EDE}"/>
+              </a:ext>
+            </a:extLst>
+          </p:cNvPr>
+          <p:cNvSpPr/>
+          <p:nvPr/>
+        </p:nvSpPr>
+        <p:spPr>
+          <a:xfrm>
+            <a:off x="6137530" y="4026015"/>
+            <a:ext cx="2240160" cy="2240160"/>
+          </a:xfrm>
+          <a:custGeom>
+            <a:avLst/>
+            <a:gdLst>
+              <a:gd name="connsiteX0" fmla="*/ 2240160 w 2240160"/>
+              <a:gd name="connsiteY0" fmla="*/ 1120080 h 2240160"/>
+              <a:gd name="connsiteX1" fmla="*/ 1120080 w 2240160"/>
+              <a:gd name="connsiteY1" fmla="*/ 2240161 h 2240160"/>
+              <a:gd name="connsiteX2" fmla="*/ 0 w 2240160"/>
+              <a:gd name="connsiteY2" fmla="*/ 1120080 h 2240160"/>
+              <a:gd name="connsiteX3" fmla="*/ 1120080 w 2240160"/>
+              <a:gd name="connsiteY3" fmla="*/ 0 h 2240160"/>
+              <a:gd name="connsiteX4" fmla="*/ 2240160 w 2240160"/>
+              <a:gd name="connsiteY4" fmla="*/ 1120080 h 2240160"/>
+            </a:gdLst>
+            <a:ahLst/>
+            <a:cxnLst>
+              <a:cxn ang="0">
+                <a:pos x="connsiteX0" y="connsiteY0"/>
+              </a:cxn>
+              <a:cxn ang="0">
+                <a:pos x="connsiteX1" y="connsiteY1"/>
+              </a:cxn>
+              <a:cxn ang="0">
+                <a:pos x="connsiteX2" y="connsiteY2"/>
+              </a:cxn>
+              <a:cxn ang="0">
+                <a:pos x="connsiteX3" y="connsiteY3"/>
+              </a:cxn>
+              <a:cxn ang="0">
+                <a:pos x="connsiteX4" y="connsiteY4"/>
+              </a:cxn>
+            </a:cxnLst>
+            <a:rect l="l" t="t" r="r" b="b"/>
+            <a:pathLst>
+              <a:path w="2240160" h="2240160">
+                <a:moveTo>
+                  <a:pt x="2240160" y="1120080"/>
+                </a:moveTo>
+                <a:cubicBezTo>
+                  <a:pt x="2240160" y="1738683"/>
+                  <a:pt x="1738683" y="2240161"/>
+                  <a:pt x="1120080" y="2240161"/>
+                </a:cubicBezTo>
+                <a:cubicBezTo>
+                  <a:pt x="501477" y="2240161"/>
+                  <a:pt x="0" y="1738683"/>
+                  <a:pt x="0" y="1120080"/>
+                </a:cubicBezTo>
+                <a:cubicBezTo>
+                  <a:pt x="0" y="501477"/>
+                  <a:pt x="501477" y="0"/>
+                  <a:pt x="1120080" y="0"/>
+                </a:cubicBezTo>
+                <a:cubicBezTo>
+                  <a:pt x="1738683" y="0"/>
+                  <a:pt x="2240160" y="501477"/>
+                  <a:pt x="2240160" y="1120080"/>
+                </a:cubicBezTo>
+                <a:close/>
+              </a:path>
+            </a:pathLst>
+          </a:custGeom>
+          <a:noFill/>
+          <a:ln w="45138" cap="sq">
+            <a:solidFill>
+              <a:srgbClr val="37ABC8"/>
+            </a:solidFill>
+            <a:prstDash val="solid"/>
+            <a:miter/>
+          </a:ln>
+        </p:spPr>
+        <p:txBody>
+          <a:bodyPr rtlCol="0" anchor="ctr"/>
+          <a:lstStyle/>
+          <a:p>
+            <a:endParaRPr lang="en-US"/>
+          </a:p>
+        </p:txBody>
+      </p:sp>
+      <p:sp>
+        <p:nvSpPr>
+          <p:cNvPr id="22" name="Freeform: Shape 21">
+            <a:extLst>
+              <a:ext uri="{FF2B5EF4-FFF2-40B4-BE49-F238E27FC236}">
+                <a16:creationId xmlns:a16="http://schemas.microsoft.com/office/drawing/2014/main" id="{C8D7CF88-D832-CE93-A09C-74E13B415924}"/>
+              </a:ext>
+            </a:extLst>
+          </p:cNvPr>
+          <p:cNvSpPr/>
+          <p:nvPr/>
+        </p:nvSpPr>
+        <p:spPr>
+          <a:xfrm>
+            <a:off x="5616209" y="3504694"/>
+            <a:ext cx="968871" cy="968871"/>
+          </a:xfrm>
+          <a:custGeom>
+            <a:avLst/>
+            <a:gdLst>
+              <a:gd name="connsiteX0" fmla="*/ 968871 w 968871"/>
+              <a:gd name="connsiteY0" fmla="*/ 484436 h 968871"/>
+              <a:gd name="connsiteX1" fmla="*/ 484436 w 968871"/>
+              <a:gd name="connsiteY1" fmla="*/ 968871 h 968871"/>
+              <a:gd name="connsiteX2" fmla="*/ 0 w 968871"/>
+              <a:gd name="connsiteY2" fmla="*/ 484436 h 968871"/>
+              <a:gd name="connsiteX3" fmla="*/ 484436 w 968871"/>
+              <a:gd name="connsiteY3" fmla="*/ 0 h 968871"/>
+              <a:gd name="connsiteX4" fmla="*/ 968871 w 968871"/>
+              <a:gd name="connsiteY4" fmla="*/ 484436 h 968871"/>
+            </a:gdLst>
+            <a:ahLst/>
+            <a:cxnLst>
+              <a:cxn ang="0">
+                <a:pos x="connsiteX0" y="connsiteY0"/>
+              </a:cxn>
+              <a:cxn ang="0">
+                <a:pos x="connsiteX1" y="connsiteY1"/>
+              </a:cxn>
+              <a:cxn ang="0">
+                <a:pos x="connsiteX2" y="connsiteY2"/>
+              </a:cxn>
+              <a:cxn ang="0">
+                <a:pos x="connsiteX3" y="connsiteY3"/>
+              </a:cxn>
+              <a:cxn ang="0">
+                <a:pos x="connsiteX4" y="connsiteY4"/>
+              </a:cxn>
+            </a:cxnLst>
+            <a:rect l="l" t="t" r="r" b="b"/>
+            <a:pathLst>
+              <a:path w="968871" h="968871">
+                <a:moveTo>
+                  <a:pt x="968871" y="484436"/>
+                </a:moveTo>
+                <a:cubicBezTo>
+                  <a:pt x="968871" y="751982"/>
+                  <a:pt x="751982" y="968871"/>
+                  <a:pt x="484436" y="968871"/>
+                </a:cubicBezTo>
+                <a:cubicBezTo>
+                  <a:pt x="216889" y="968871"/>
+                  <a:pt x="0" y="751982"/>
+                  <a:pt x="0" y="484436"/>
+                </a:cubicBezTo>
+                <a:cubicBezTo>
+                  <a:pt x="0" y="216889"/>
+                  <a:pt x="216889" y="0"/>
+                  <a:pt x="484436" y="0"/>
+                </a:cubicBezTo>
+                <a:cubicBezTo>
+                  <a:pt x="751982" y="0"/>
+                  <a:pt x="968871" y="216889"/>
+                  <a:pt x="968871" y="484436"/>
+                </a:cubicBezTo>
+                <a:close/>
+              </a:path>
+            </a:pathLst>
+          </a:custGeom>
+          <a:noFill/>
+          <a:ln w="45644" cap="sq">
+            <a:solidFill>
+              <a:srgbClr val="D40000"/>
+            </a:solidFill>
+            <a:prstDash val="solid"/>
+            <a:miter/>
+          </a:ln>
+        </p:spPr>
+        <p:txBody>
+          <a:bodyPr rtlCol="0" anchor="ctr"/>
+          <a:lstStyle/>
+          <a:p>
+            <a:endParaRPr lang="en-US"/>
+          </a:p>
+        </p:txBody>
+      </p:sp>
+    </p:spTree>
+    <p:extLst>
+      <p:ext uri="{BB962C8B-B14F-4D97-AF65-F5344CB8AC3E}">
+        <p14:creationId xmlns:p14="http://schemas.microsoft.com/office/powerpoint/2010/main" val="312179760"/>
+      </p:ext>
+    </p:extLst>
+  </p:cSld>
+  <p:clrMapOvr>
+    <a:masterClrMapping/>
+  </p:clrMapOvr>
+</p:sld>
+</file>
+
+<file path=ppt/slides/slide11.xml><?xml version="1.0" encoding="utf-8"?>
+<p:sld xmlns:a="http://schemas.openxmlformats.org/drawingml/2006/main" xmlns:r="http://schemas.openxmlformats.org/officeDocument/2006/relationships" xmlns:p="http://schemas.openxmlformats.org/presentationml/2006/main">
+  <p:cSld>
+    <p:spTree>
+      <p:nvGrpSpPr>
+        <p:cNvPr id="1" name=""/>
+        <p:cNvGrpSpPr/>
+        <p:nvPr/>
+      </p:nvGrpSpPr>
+      <p:grpSpPr>
+        <a:xfrm>
+          <a:off x="0" y="0"/>
+          <a:ext cx="0" cy="0"/>
+          <a:chOff x="0" y="0"/>
+          <a:chExt cx="0" cy="0"/>
+        </a:xfrm>
+      </p:grpSpPr>
+      <p:sp>
+        <p:nvSpPr>
+          <p:cNvPr id="2" name="Title 1">
+            <a:extLst>
+              <a:ext uri="{FF2B5EF4-FFF2-40B4-BE49-F238E27FC236}">
+                <a16:creationId xmlns:a16="http://schemas.microsoft.com/office/drawing/2014/main" id="{43AB76A5-DDCA-2DC9-EBD8-9B80787C8E1F}"/>
+              </a:ext>
+            </a:extLst>
+          </p:cNvPr>
+          <p:cNvSpPr>
+            <a:spLocks noGrp="1"/>
+          </p:cNvSpPr>
+          <p:nvPr>
+            <p:ph type="title"/>
+          </p:nvPr>
+        </p:nvSpPr>
+        <p:spPr/>
+        <p:txBody>
+          <a:bodyPr/>
+          <a:lstStyle/>
+          <a:p>
+            <a:r>
+              <a:rPr lang="en-US" dirty="0"/>
+              <a:t>4 circles paradox</a:t>
+            </a:r>
+          </a:p>
+        </p:txBody>
+      </p:sp>
+      <p:sp>
+        <p:nvSpPr>
+          <p:cNvPr id="11" name="Freeform: Shape 10">
+            <a:extLst>
+              <a:ext uri="{FF2B5EF4-FFF2-40B4-BE49-F238E27FC236}">
+                <a16:creationId xmlns:a16="http://schemas.microsoft.com/office/drawing/2014/main" id="{E033A28E-0C8A-AF71-25E9-358F61F4736E}"/>
+              </a:ext>
+            </a:extLst>
+          </p:cNvPr>
+          <p:cNvSpPr/>
+          <p:nvPr/>
+        </p:nvSpPr>
+        <p:spPr>
+          <a:xfrm>
+            <a:off x="6100644" y="1172419"/>
+            <a:ext cx="57134" cy="5673416"/>
+          </a:xfrm>
+          <a:custGeom>
+            <a:avLst/>
+            <a:gdLst>
+              <a:gd name="connsiteX0" fmla="*/ 0 w 57134"/>
+              <a:gd name="connsiteY0" fmla="*/ 5673417 h 5673416"/>
+              <a:gd name="connsiteX1" fmla="*/ 0 w 57134"/>
+              <a:gd name="connsiteY1" fmla="*/ 0 h 5673416"/>
+            </a:gdLst>
+            <a:ahLst/>
+            <a:cxnLst>
+              <a:cxn ang="0">
+                <a:pos x="connsiteX0" y="connsiteY0"/>
+              </a:cxn>
+              <a:cxn ang="0">
+                <a:pos x="connsiteX1" y="connsiteY1"/>
+              </a:cxn>
+            </a:cxnLst>
+            <a:rect l="l" t="t" r="r" b="b"/>
+            <a:pathLst>
+              <a:path w="57134" h="5673416">
+                <a:moveTo>
+                  <a:pt x="0" y="5673417"/>
+                </a:moveTo>
+                <a:lnTo>
+                  <a:pt x="0" y="0"/>
+                </a:lnTo>
+              </a:path>
+            </a:pathLst>
+          </a:custGeom>
+          <a:solidFill>
+            <a:srgbClr val="000000">
+              <a:alpha val="50000"/>
+            </a:srgbClr>
+          </a:solidFill>
+          <a:ln w="34233" cap="sq">
+            <a:solidFill>
+              <a:srgbClr val="000000"/>
+            </a:solidFill>
+            <a:prstDash val="solid"/>
+            <a:miter/>
+            <a:tailEnd type="arrow"/>
+          </a:ln>
+        </p:spPr>
+        <p:txBody>
+          <a:bodyPr rtlCol="0" anchor="ctr"/>
+          <a:lstStyle/>
+          <a:p>
+            <a:endParaRPr lang="en-US"/>
+          </a:p>
+        </p:txBody>
+      </p:sp>
+      <p:sp>
+        <p:nvSpPr>
+          <p:cNvPr id="12" name="Freeform: Shape 11">
+            <a:extLst>
+              <a:ext uri="{FF2B5EF4-FFF2-40B4-BE49-F238E27FC236}">
+                <a16:creationId xmlns:a16="http://schemas.microsoft.com/office/drawing/2014/main" id="{AF57F973-4873-579E-B69C-60C91206DBB9}"/>
+              </a:ext>
+            </a:extLst>
+          </p:cNvPr>
+          <p:cNvSpPr/>
+          <p:nvPr/>
+        </p:nvSpPr>
+        <p:spPr>
+          <a:xfrm>
+            <a:off x="3243940" y="3989130"/>
+            <a:ext cx="5673416" cy="57134"/>
+          </a:xfrm>
+          <a:custGeom>
+            <a:avLst/>
+            <a:gdLst>
+              <a:gd name="connsiteX0" fmla="*/ 0 w 5673416"/>
+              <a:gd name="connsiteY0" fmla="*/ 0 h 57134"/>
+              <a:gd name="connsiteX1" fmla="*/ 5673417 w 5673416"/>
+              <a:gd name="connsiteY1" fmla="*/ 0 h 57134"/>
+            </a:gdLst>
+            <a:ahLst/>
+            <a:cxnLst>
+              <a:cxn ang="0">
+                <a:pos x="connsiteX0" y="connsiteY0"/>
+              </a:cxn>
+              <a:cxn ang="0">
+                <a:pos x="connsiteX1" y="connsiteY1"/>
+              </a:cxn>
+            </a:cxnLst>
+            <a:rect l="l" t="t" r="r" b="b"/>
+            <a:pathLst>
+              <a:path w="5673416" h="57134">
+                <a:moveTo>
+                  <a:pt x="0" y="0"/>
+                </a:moveTo>
+                <a:lnTo>
+                  <a:pt x="5673417" y="0"/>
+                </a:lnTo>
+              </a:path>
+            </a:pathLst>
+          </a:custGeom>
+          <a:solidFill>
+            <a:srgbClr val="000000">
+              <a:alpha val="50000"/>
+            </a:srgbClr>
+          </a:solidFill>
+          <a:ln w="34233" cap="sq">
+            <a:solidFill>
+              <a:srgbClr val="000000"/>
+            </a:solidFill>
+            <a:prstDash val="solid"/>
+            <a:miter/>
+            <a:tailEnd type="arrow"/>
+          </a:ln>
+        </p:spPr>
+        <p:txBody>
+          <a:bodyPr rtlCol="0" anchor="ctr"/>
+          <a:lstStyle/>
+          <a:p>
+            <a:endParaRPr lang="en-US"/>
+          </a:p>
+        </p:txBody>
+      </p:sp>
     </p:spTree>
     <p:extLst>
       <p:ext uri="{BB962C8B-B14F-4D97-AF65-F5344CB8AC3E}">
@@ -3738,7 +4810,7 @@
 </p:sld>
 </file>
 
-<file path=ppt/slides/slide11.xml><?xml version="1.0" encoding="utf-8"?>
+<file path=ppt/slides/slide12.xml><?xml version="1.0" encoding="utf-8"?>
 <p:sld xmlns:a="http://schemas.openxmlformats.org/drawingml/2006/main" xmlns:r="http://schemas.openxmlformats.org/officeDocument/2006/relationships" xmlns:p="http://schemas.openxmlformats.org/presentationml/2006/main">
   <p:cSld>
     <p:spTree>
@@ -4377,7 +5449,7 @@
 </p:sld>
 </file>
 
-<file path=ppt/slides/slide12.xml><?xml version="1.0" encoding="utf-8"?>
+<file path=ppt/slides/slide13.xml><?xml version="1.0" encoding="utf-8"?>
 <p:sld xmlns:a="http://schemas.openxmlformats.org/drawingml/2006/main" xmlns:r="http://schemas.openxmlformats.org/officeDocument/2006/relationships" xmlns:p="http://schemas.openxmlformats.org/presentationml/2006/main">
   <p:cSld>
     <p:spTree>
@@ -6288,7 +7360,7 @@
 </p:sld>
 </file>
 
-<file path=ppt/slides/slide13.xml><?xml version="1.0" encoding="utf-8"?>
+<file path=ppt/slides/slide14.xml><?xml version="1.0" encoding="utf-8"?>
 <p:sld xmlns:a="http://schemas.openxmlformats.org/drawingml/2006/main" xmlns:r="http://schemas.openxmlformats.org/officeDocument/2006/relationships" xmlns:p="http://schemas.openxmlformats.org/presentationml/2006/main">
   <p:cSld>
     <p:spTree>

</xml_diff>

<commit_message>
8 balls paradox: hidden
</commit_message>
<xml_diff>
--- a/slides_x_mas_2023.pptx
+++ b/slides_x_mas_2023.pptx
@@ -19,6 +19,7 @@
     <p:sldId id="272" r:id="rId13"/>
     <p:sldId id="273" r:id="rId14"/>
     <p:sldId id="269" r:id="rId15"/>
+    <p:sldId id="274" r:id="rId16"/>
   </p:sldIdLst>
   <p:sldSz cx="12192000" cy="6858000"/>
   <p:notesSz cx="6858000" cy="9144000"/>
@@ -147,6 +148,7 @@
             <p14:sldId id="272"/>
             <p14:sldId id="273"/>
             <p14:sldId id="269"/>
+            <p14:sldId id="274"/>
           </p14:sldIdLst>
         </p14:section>
         <p14:section name="Over-Interpretations" id="{9711BCF0-0EF2-435D-A2E2-B5014891C597}">
@@ -9269,6 +9271,99 @@
 </p:sld>
 </file>
 
+<file path=ppt/slides/slide15.xml><?xml version="1.0" encoding="utf-8"?>
+<p:sld xmlns:a="http://schemas.openxmlformats.org/drawingml/2006/main" xmlns:r="http://schemas.openxmlformats.org/officeDocument/2006/relationships" xmlns:p="http://schemas.openxmlformats.org/presentationml/2006/main" show="0">
+  <p:cSld>
+    <p:spTree>
+      <p:nvGrpSpPr>
+        <p:cNvPr id="1" name=""/>
+        <p:cNvGrpSpPr/>
+        <p:nvPr/>
+      </p:nvGrpSpPr>
+      <p:grpSpPr>
+        <a:xfrm>
+          <a:off x="0" y="0"/>
+          <a:ext cx="0" cy="0"/>
+          <a:chOff x="0" y="0"/>
+          <a:chExt cx="0" cy="0"/>
+        </a:xfrm>
+      </p:grpSpPr>
+      <p:sp>
+        <p:nvSpPr>
+          <p:cNvPr id="2" name="Title 1">
+            <a:extLst>
+              <a:ext uri="{FF2B5EF4-FFF2-40B4-BE49-F238E27FC236}">
+                <a16:creationId xmlns:a16="http://schemas.microsoft.com/office/drawing/2014/main" id="{970BC690-40CA-30C2-4E91-661B86D51731}"/>
+              </a:ext>
+            </a:extLst>
+          </p:cNvPr>
+          <p:cNvSpPr>
+            <a:spLocks noGrp="1"/>
+          </p:cNvSpPr>
+          <p:nvPr>
+            <p:ph type="title"/>
+          </p:nvPr>
+        </p:nvSpPr>
+        <p:spPr/>
+        <p:txBody>
+          <a:bodyPr/>
+          <a:lstStyle/>
+          <a:p>
+            <a:r>
+              <a:rPr lang="en-US" dirty="0"/>
+              <a:t>8 balls paradox</a:t>
+            </a:r>
+          </a:p>
+        </p:txBody>
+      </p:sp>
+      <p:pic>
+        <p:nvPicPr>
+          <p:cNvPr id="5" name="Content Placeholder 4" descr="A group of spheres with a red center&#10;&#10;Description automatically generated">
+            <a:extLst>
+              <a:ext uri="{FF2B5EF4-FFF2-40B4-BE49-F238E27FC236}">
+                <a16:creationId xmlns:a16="http://schemas.microsoft.com/office/drawing/2014/main" id="{69A91BBA-9C9C-CD55-E284-F83F895A3387}"/>
+              </a:ext>
+            </a:extLst>
+          </p:cNvPr>
+          <p:cNvPicPr>
+            <a:picLocks noGrp="1" noChangeAspect="1"/>
+          </p:cNvPicPr>
+          <p:nvPr>
+            <p:ph idx="1"/>
+          </p:nvPr>
+        </p:nvPicPr>
+        <p:blipFill>
+          <a:blip r:embed="rId2">
+            <a:extLst>
+              <a:ext uri="{28A0092B-C50C-407E-A947-70E740481C1C}">
+                <a14:useLocalDpi xmlns:a14="http://schemas.microsoft.com/office/drawing/2010/main" val="0"/>
+              </a:ext>
+            </a:extLst>
+          </a:blip>
+          <a:stretch>
+            <a:fillRect/>
+          </a:stretch>
+        </p:blipFill>
+        <p:spPr>
+          <a:xfrm>
+            <a:off x="4178604" y="1825625"/>
+            <a:ext cx="3834792" cy="4351338"/>
+          </a:xfrm>
+        </p:spPr>
+      </p:pic>
+    </p:spTree>
+    <p:extLst>
+      <p:ext uri="{BB962C8B-B14F-4D97-AF65-F5344CB8AC3E}">
+        <p14:creationId xmlns:p14="http://schemas.microsoft.com/office/powerpoint/2010/main" val="3136315998"/>
+      </p:ext>
+    </p:extLst>
+  </p:cSld>
+  <p:clrMapOvr>
+    <a:masterClrMapping/>
+  </p:clrMapOvr>
+</p:sld>
+</file>
+
 <file path=ppt/slides/slide2.xml><?xml version="1.0" encoding="utf-8"?>
 <p:sld xmlns:a="http://schemas.openxmlformats.org/drawingml/2006/main" xmlns:r="http://schemas.openxmlformats.org/officeDocument/2006/relationships" xmlns:p="http://schemas.openxmlformats.org/presentationml/2006/main">
   <p:cSld>

</xml_diff>

<commit_message>
8 balls paradox: cube
</commit_message>
<xml_diff>
--- a/slides_x_mas_2023.pptx
+++ b/slides_x_mas_2023.pptx
@@ -20,6 +20,7 @@
     <p:sldId id="273" r:id="rId14"/>
     <p:sldId id="269" r:id="rId15"/>
     <p:sldId id="274" r:id="rId16"/>
+    <p:sldId id="275" r:id="rId17"/>
   </p:sldIdLst>
   <p:sldSz cx="12192000" cy="6858000"/>
   <p:notesSz cx="6858000" cy="9144000"/>
@@ -149,6 +150,7 @@
             <p14:sldId id="273"/>
             <p14:sldId id="269"/>
             <p14:sldId id="274"/>
+            <p14:sldId id="275"/>
           </p14:sldIdLst>
         </p14:section>
         <p14:section name="Over-Interpretations" id="{9711BCF0-0EF2-435D-A2E2-B5014891C597}">
@@ -9364,6 +9366,99 @@
 </p:sld>
 </file>
 
+<file path=ppt/slides/slide16.xml><?xml version="1.0" encoding="utf-8"?>
+<p:sld xmlns:a="http://schemas.openxmlformats.org/drawingml/2006/main" xmlns:r="http://schemas.openxmlformats.org/officeDocument/2006/relationships" xmlns:p="http://schemas.openxmlformats.org/presentationml/2006/main">
+  <p:cSld>
+    <p:spTree>
+      <p:nvGrpSpPr>
+        <p:cNvPr id="1" name=""/>
+        <p:cNvGrpSpPr/>
+        <p:nvPr/>
+      </p:nvGrpSpPr>
+      <p:grpSpPr>
+        <a:xfrm>
+          <a:off x="0" y="0"/>
+          <a:ext cx="0" cy="0"/>
+          <a:chOff x="0" y="0"/>
+          <a:chExt cx="0" cy="0"/>
+        </a:xfrm>
+      </p:grpSpPr>
+      <p:sp>
+        <p:nvSpPr>
+          <p:cNvPr id="2" name="Title 1">
+            <a:extLst>
+              <a:ext uri="{FF2B5EF4-FFF2-40B4-BE49-F238E27FC236}">
+                <a16:creationId xmlns:a16="http://schemas.microsoft.com/office/drawing/2014/main" id="{970BC690-40CA-30C2-4E91-661B86D51731}"/>
+              </a:ext>
+            </a:extLst>
+          </p:cNvPr>
+          <p:cNvSpPr>
+            <a:spLocks noGrp="1"/>
+          </p:cNvSpPr>
+          <p:nvPr>
+            <p:ph type="title"/>
+          </p:nvPr>
+        </p:nvSpPr>
+        <p:spPr/>
+        <p:txBody>
+          <a:bodyPr/>
+          <a:lstStyle/>
+          <a:p>
+            <a:r>
+              <a:rPr lang="en-US" dirty="0"/>
+              <a:t>8 balls paradox</a:t>
+            </a:r>
+          </a:p>
+        </p:txBody>
+      </p:sp>
+      <p:pic>
+        <p:nvPicPr>
+          <p:cNvPr id="7" name="Content Placeholder 6" descr="A green cube with black background&#10;&#10;Description automatically generated">
+            <a:extLst>
+              <a:ext uri="{FF2B5EF4-FFF2-40B4-BE49-F238E27FC236}">
+                <a16:creationId xmlns:a16="http://schemas.microsoft.com/office/drawing/2014/main" id="{3DDC1693-7FA6-3E7E-20F8-7710E6E90D0E}"/>
+              </a:ext>
+            </a:extLst>
+          </p:cNvPr>
+          <p:cNvPicPr>
+            <a:picLocks noGrp="1" noChangeAspect="1"/>
+          </p:cNvPicPr>
+          <p:nvPr>
+            <p:ph idx="1"/>
+          </p:nvPr>
+        </p:nvPicPr>
+        <p:blipFill>
+          <a:blip r:embed="rId2">
+            <a:extLst>
+              <a:ext uri="{28A0092B-C50C-407E-A947-70E740481C1C}">
+                <a14:useLocalDpi xmlns:a14="http://schemas.microsoft.com/office/drawing/2010/main" val="0"/>
+              </a:ext>
+            </a:extLst>
+          </a:blip>
+          <a:stretch>
+            <a:fillRect/>
+          </a:stretch>
+        </p:blipFill>
+        <p:spPr>
+          <a:xfrm>
+            <a:off x="4178604" y="1825625"/>
+            <a:ext cx="3834792" cy="4351338"/>
+          </a:xfrm>
+        </p:spPr>
+      </p:pic>
+    </p:spTree>
+    <p:extLst>
+      <p:ext uri="{BB962C8B-B14F-4D97-AF65-F5344CB8AC3E}">
+        <p14:creationId xmlns:p14="http://schemas.microsoft.com/office/powerpoint/2010/main" val="2126258275"/>
+      </p:ext>
+    </p:extLst>
+  </p:cSld>
+  <p:clrMapOvr>
+    <a:masterClrMapping/>
+  </p:clrMapOvr>
+</p:sld>
+</file>
+
 <file path=ppt/slides/slide2.xml><?xml version="1.0" encoding="utf-8"?>
 <p:sld xmlns:a="http://schemas.openxmlformats.org/drawingml/2006/main" xmlns:r="http://schemas.openxmlformats.org/officeDocument/2006/relationships" xmlns:p="http://schemas.openxmlformats.org/presentationml/2006/main">
   <p:cSld>

</xml_diff>

<commit_message>
8 balls paradox: balls
</commit_message>
<xml_diff>
--- a/slides_x_mas_2023.pptx
+++ b/slides_x_mas_2023.pptx
@@ -21,6 +21,7 @@
     <p:sldId id="269" r:id="rId15"/>
     <p:sldId id="274" r:id="rId16"/>
     <p:sldId id="275" r:id="rId17"/>
+    <p:sldId id="276" r:id="rId18"/>
   </p:sldIdLst>
   <p:sldSz cx="12192000" cy="6858000"/>
   <p:notesSz cx="6858000" cy="9144000"/>
@@ -151,6 +152,7 @@
             <p14:sldId id="269"/>
             <p14:sldId id="274"/>
             <p14:sldId id="275"/>
+            <p14:sldId id="276"/>
           </p14:sldIdLst>
         </p14:section>
         <p14:section name="Over-Interpretations" id="{9711BCF0-0EF2-435D-A2E2-B5014891C597}">
@@ -9459,6 +9461,99 @@
 </p:sld>
 </file>
 
+<file path=ppt/slides/slide17.xml><?xml version="1.0" encoding="utf-8"?>
+<p:sld xmlns:a="http://schemas.openxmlformats.org/drawingml/2006/main" xmlns:r="http://schemas.openxmlformats.org/officeDocument/2006/relationships" xmlns:p="http://schemas.openxmlformats.org/presentationml/2006/main">
+  <p:cSld>
+    <p:spTree>
+      <p:nvGrpSpPr>
+        <p:cNvPr id="1" name=""/>
+        <p:cNvGrpSpPr/>
+        <p:nvPr/>
+      </p:nvGrpSpPr>
+      <p:grpSpPr>
+        <a:xfrm>
+          <a:off x="0" y="0"/>
+          <a:ext cx="0" cy="0"/>
+          <a:chOff x="0" y="0"/>
+          <a:chExt cx="0" cy="0"/>
+        </a:xfrm>
+      </p:grpSpPr>
+      <p:sp>
+        <p:nvSpPr>
+          <p:cNvPr id="2" name="Title 1">
+            <a:extLst>
+              <a:ext uri="{FF2B5EF4-FFF2-40B4-BE49-F238E27FC236}">
+                <a16:creationId xmlns:a16="http://schemas.microsoft.com/office/drawing/2014/main" id="{970BC690-40CA-30C2-4E91-661B86D51731}"/>
+              </a:ext>
+            </a:extLst>
+          </p:cNvPr>
+          <p:cNvSpPr>
+            <a:spLocks noGrp="1"/>
+          </p:cNvSpPr>
+          <p:nvPr>
+            <p:ph type="title"/>
+          </p:nvPr>
+        </p:nvSpPr>
+        <p:spPr/>
+        <p:txBody>
+          <a:bodyPr/>
+          <a:lstStyle/>
+          <a:p>
+            <a:r>
+              <a:rPr lang="en-US" dirty="0"/>
+              <a:t>8 balls paradox</a:t>
+            </a:r>
+          </a:p>
+        </p:txBody>
+      </p:sp>
+      <p:pic>
+        <p:nvPicPr>
+          <p:cNvPr id="6" name="Content Placeholder 5" descr="A group of spheres in a cube&#10;&#10;Description automatically generated">
+            <a:extLst>
+              <a:ext uri="{FF2B5EF4-FFF2-40B4-BE49-F238E27FC236}">
+                <a16:creationId xmlns:a16="http://schemas.microsoft.com/office/drawing/2014/main" id="{3FFC988E-A684-4ADE-F155-BD857D3396A5}"/>
+              </a:ext>
+            </a:extLst>
+          </p:cNvPr>
+          <p:cNvPicPr>
+            <a:picLocks noGrp="1" noChangeAspect="1"/>
+          </p:cNvPicPr>
+          <p:nvPr>
+            <p:ph idx="1"/>
+          </p:nvPr>
+        </p:nvPicPr>
+        <p:blipFill>
+          <a:blip r:embed="rId2">
+            <a:extLst>
+              <a:ext uri="{28A0092B-C50C-407E-A947-70E740481C1C}">
+                <a14:useLocalDpi xmlns:a14="http://schemas.microsoft.com/office/drawing/2010/main" val="0"/>
+              </a:ext>
+            </a:extLst>
+          </a:blip>
+          <a:stretch>
+            <a:fillRect/>
+          </a:stretch>
+        </p:blipFill>
+        <p:spPr>
+          <a:xfrm>
+            <a:off x="4178604" y="1825625"/>
+            <a:ext cx="3834792" cy="4351338"/>
+          </a:xfrm>
+        </p:spPr>
+      </p:pic>
+    </p:spTree>
+    <p:extLst>
+      <p:ext uri="{BB962C8B-B14F-4D97-AF65-F5344CB8AC3E}">
+        <p14:creationId xmlns:p14="http://schemas.microsoft.com/office/powerpoint/2010/main" val="1650895677"/>
+      </p:ext>
+    </p:extLst>
+  </p:cSld>
+  <p:clrMapOvr>
+    <a:masterClrMapping/>
+  </p:clrMapOvr>
+</p:sld>
+</file>
+
 <file path=ppt/slides/slide2.xml><?xml version="1.0" encoding="utf-8"?>
 <p:sld xmlns:a="http://schemas.openxmlformats.org/drawingml/2006/main" xmlns:r="http://schemas.openxmlformats.org/officeDocument/2006/relationships" xmlns:p="http://schemas.openxmlformats.org/presentationml/2006/main">
   <p:cSld>

</xml_diff>

<commit_message>
8 balls paradox: balls transparent
</commit_message>
<xml_diff>
--- a/slides_x_mas_2023.pptx
+++ b/slides_x_mas_2023.pptx
@@ -22,6 +22,7 @@
     <p:sldId id="274" r:id="rId16"/>
     <p:sldId id="275" r:id="rId17"/>
     <p:sldId id="276" r:id="rId18"/>
+    <p:sldId id="277" r:id="rId19"/>
   </p:sldIdLst>
   <p:sldSz cx="12192000" cy="6858000"/>
   <p:notesSz cx="6858000" cy="9144000"/>
@@ -153,6 +154,7 @@
             <p14:sldId id="274"/>
             <p14:sldId id="275"/>
             <p14:sldId id="276"/>
+            <p14:sldId id="277"/>
           </p14:sldIdLst>
         </p14:section>
         <p14:section name="Over-Interpretations" id="{9711BCF0-0EF2-435D-A2E2-B5014891C597}">
@@ -9554,6 +9556,99 @@
 </p:sld>
 </file>
 
+<file path=ppt/slides/slide18.xml><?xml version="1.0" encoding="utf-8"?>
+<p:sld xmlns:a="http://schemas.openxmlformats.org/drawingml/2006/main" xmlns:r="http://schemas.openxmlformats.org/officeDocument/2006/relationships" xmlns:p="http://schemas.openxmlformats.org/presentationml/2006/main">
+  <p:cSld>
+    <p:spTree>
+      <p:nvGrpSpPr>
+        <p:cNvPr id="1" name=""/>
+        <p:cNvGrpSpPr/>
+        <p:nvPr/>
+      </p:nvGrpSpPr>
+      <p:grpSpPr>
+        <a:xfrm>
+          <a:off x="0" y="0"/>
+          <a:ext cx="0" cy="0"/>
+          <a:chOff x="0" y="0"/>
+          <a:chExt cx="0" cy="0"/>
+        </a:xfrm>
+      </p:grpSpPr>
+      <p:sp>
+        <p:nvSpPr>
+          <p:cNvPr id="2" name="Title 1">
+            <a:extLst>
+              <a:ext uri="{FF2B5EF4-FFF2-40B4-BE49-F238E27FC236}">
+                <a16:creationId xmlns:a16="http://schemas.microsoft.com/office/drawing/2014/main" id="{970BC690-40CA-30C2-4E91-661B86D51731}"/>
+              </a:ext>
+            </a:extLst>
+          </p:cNvPr>
+          <p:cNvSpPr>
+            <a:spLocks noGrp="1"/>
+          </p:cNvSpPr>
+          <p:nvPr>
+            <p:ph type="title"/>
+          </p:nvPr>
+        </p:nvSpPr>
+        <p:spPr/>
+        <p:txBody>
+          <a:bodyPr/>
+          <a:lstStyle/>
+          <a:p>
+            <a:r>
+              <a:rPr lang="en-US" dirty="0"/>
+              <a:t>8 balls paradox</a:t>
+            </a:r>
+          </a:p>
+        </p:txBody>
+      </p:sp>
+      <p:pic>
+        <p:nvPicPr>
+          <p:cNvPr id="6" name="Content Placeholder 5" descr="A group of spheres in a square&#10;&#10;Description automatically generated">
+            <a:extLst>
+              <a:ext uri="{FF2B5EF4-FFF2-40B4-BE49-F238E27FC236}">
+                <a16:creationId xmlns:a16="http://schemas.microsoft.com/office/drawing/2014/main" id="{06561C94-CF44-2D93-E931-30240647F922}"/>
+              </a:ext>
+            </a:extLst>
+          </p:cNvPr>
+          <p:cNvPicPr>
+            <a:picLocks noGrp="1" noChangeAspect="1"/>
+          </p:cNvPicPr>
+          <p:nvPr>
+            <p:ph idx="1"/>
+          </p:nvPr>
+        </p:nvPicPr>
+        <p:blipFill>
+          <a:blip r:embed="rId2">
+            <a:extLst>
+              <a:ext uri="{28A0092B-C50C-407E-A947-70E740481C1C}">
+                <a14:useLocalDpi xmlns:a14="http://schemas.microsoft.com/office/drawing/2010/main" val="0"/>
+              </a:ext>
+            </a:extLst>
+          </a:blip>
+          <a:stretch>
+            <a:fillRect/>
+          </a:stretch>
+        </p:blipFill>
+        <p:spPr>
+          <a:xfrm>
+            <a:off x="4178604" y="1825625"/>
+            <a:ext cx="3834792" cy="4351338"/>
+          </a:xfrm>
+        </p:spPr>
+      </p:pic>
+    </p:spTree>
+    <p:extLst>
+      <p:ext uri="{BB962C8B-B14F-4D97-AF65-F5344CB8AC3E}">
+        <p14:creationId xmlns:p14="http://schemas.microsoft.com/office/powerpoint/2010/main" val="41280229"/>
+      </p:ext>
+    </p:extLst>
+  </p:cSld>
+  <p:clrMapOvr>
+    <a:masterClrMapping/>
+  </p:clrMapOvr>
+</p:sld>
+</file>
+
 <file path=ppt/slides/slide2.xml><?xml version="1.0" encoding="utf-8"?>
 <p:sld xmlns:a="http://schemas.openxmlformats.org/drawingml/2006/main" xmlns:r="http://schemas.openxmlformats.org/officeDocument/2006/relationships" xmlns:p="http://schemas.openxmlformats.org/presentationml/2006/main">
   <p:cSld>

</xml_diff>

<commit_message>
8 balls paradox: central ball
</commit_message>
<xml_diff>
--- a/slides_x_mas_2023.pptx
+++ b/slides_x_mas_2023.pptx
@@ -23,6 +23,7 @@
     <p:sldId id="275" r:id="rId17"/>
     <p:sldId id="276" r:id="rId18"/>
     <p:sldId id="277" r:id="rId19"/>
+    <p:sldId id="278" r:id="rId20"/>
   </p:sldIdLst>
   <p:sldSz cx="12192000" cy="6858000"/>
   <p:notesSz cx="6858000" cy="9144000"/>
@@ -155,6 +156,7 @@
             <p14:sldId id="275"/>
             <p14:sldId id="276"/>
             <p14:sldId id="277"/>
+            <p14:sldId id="278"/>
           </p14:sldIdLst>
         </p14:section>
         <p14:section name="Over-Interpretations" id="{9711BCF0-0EF2-435D-A2E2-B5014891C597}">
@@ -9649,6 +9651,99 @@
 </p:sld>
 </file>
 
+<file path=ppt/slides/slide19.xml><?xml version="1.0" encoding="utf-8"?>
+<p:sld xmlns:a="http://schemas.openxmlformats.org/drawingml/2006/main" xmlns:r="http://schemas.openxmlformats.org/officeDocument/2006/relationships" xmlns:p="http://schemas.openxmlformats.org/presentationml/2006/main">
+  <p:cSld>
+    <p:spTree>
+      <p:nvGrpSpPr>
+        <p:cNvPr id="1" name=""/>
+        <p:cNvGrpSpPr/>
+        <p:nvPr/>
+      </p:nvGrpSpPr>
+      <p:grpSpPr>
+        <a:xfrm>
+          <a:off x="0" y="0"/>
+          <a:ext cx="0" cy="0"/>
+          <a:chOff x="0" y="0"/>
+          <a:chExt cx="0" cy="0"/>
+        </a:xfrm>
+      </p:grpSpPr>
+      <p:sp>
+        <p:nvSpPr>
+          <p:cNvPr id="2" name="Title 1">
+            <a:extLst>
+              <a:ext uri="{FF2B5EF4-FFF2-40B4-BE49-F238E27FC236}">
+                <a16:creationId xmlns:a16="http://schemas.microsoft.com/office/drawing/2014/main" id="{970BC690-40CA-30C2-4E91-661B86D51731}"/>
+              </a:ext>
+            </a:extLst>
+          </p:cNvPr>
+          <p:cNvSpPr>
+            <a:spLocks noGrp="1"/>
+          </p:cNvSpPr>
+          <p:nvPr>
+            <p:ph type="title"/>
+          </p:nvPr>
+        </p:nvSpPr>
+        <p:spPr/>
+        <p:txBody>
+          <a:bodyPr/>
+          <a:lstStyle/>
+          <a:p>
+            <a:r>
+              <a:rPr lang="en-US" dirty="0"/>
+              <a:t>8 balls paradox</a:t>
+            </a:r>
+          </a:p>
+        </p:txBody>
+      </p:sp>
+      <p:pic>
+        <p:nvPicPr>
+          <p:cNvPr id="6" name="Content Placeholder 5" descr="A group of spheres in a cube&#10;&#10;Description automatically generated">
+            <a:extLst>
+              <a:ext uri="{FF2B5EF4-FFF2-40B4-BE49-F238E27FC236}">
+                <a16:creationId xmlns:a16="http://schemas.microsoft.com/office/drawing/2014/main" id="{E81D848D-D1D5-B610-6A88-66EF607068CD}"/>
+              </a:ext>
+            </a:extLst>
+          </p:cNvPr>
+          <p:cNvPicPr>
+            <a:picLocks noGrp="1" noChangeAspect="1"/>
+          </p:cNvPicPr>
+          <p:nvPr>
+            <p:ph idx="1"/>
+          </p:nvPr>
+        </p:nvPicPr>
+        <p:blipFill>
+          <a:blip r:embed="rId2">
+            <a:extLst>
+              <a:ext uri="{28A0092B-C50C-407E-A947-70E740481C1C}">
+                <a14:useLocalDpi xmlns:a14="http://schemas.microsoft.com/office/drawing/2010/main" val="0"/>
+              </a:ext>
+            </a:extLst>
+          </a:blip>
+          <a:stretch>
+            <a:fillRect/>
+          </a:stretch>
+        </p:blipFill>
+        <p:spPr>
+          <a:xfrm>
+            <a:off x="4178604" y="1825625"/>
+            <a:ext cx="3834792" cy="4351338"/>
+          </a:xfrm>
+        </p:spPr>
+      </p:pic>
+    </p:spTree>
+    <p:extLst>
+      <p:ext uri="{BB962C8B-B14F-4D97-AF65-F5344CB8AC3E}">
+        <p14:creationId xmlns:p14="http://schemas.microsoft.com/office/powerpoint/2010/main" val="4094647934"/>
+      </p:ext>
+    </p:extLst>
+  </p:cSld>
+  <p:clrMapOvr>
+    <a:masterClrMapping/>
+  </p:clrMapOvr>
+</p:sld>
+</file>
+
 <file path=ppt/slides/slide2.xml><?xml version="1.0" encoding="utf-8"?>
 <p:sld xmlns:a="http://schemas.openxmlformats.org/drawingml/2006/main" xmlns:r="http://schemas.openxmlformats.org/officeDocument/2006/relationships" xmlns:p="http://schemas.openxmlformats.org/presentationml/2006/main">
   <p:cSld>

</xml_diff>

<commit_message>
8 balls paradox: central ball with transparency
</commit_message>
<xml_diff>
--- a/slides_x_mas_2023.pptx
+++ b/slides_x_mas_2023.pptx
@@ -24,6 +24,7 @@
     <p:sldId id="276" r:id="rId18"/>
     <p:sldId id="277" r:id="rId19"/>
     <p:sldId id="278" r:id="rId20"/>
+    <p:sldId id="279" r:id="rId21"/>
   </p:sldIdLst>
   <p:sldSz cx="12192000" cy="6858000"/>
   <p:notesSz cx="6858000" cy="9144000"/>
@@ -157,6 +158,7 @@
             <p14:sldId id="276"/>
             <p14:sldId id="277"/>
             <p14:sldId id="278"/>
+            <p14:sldId id="279"/>
           </p14:sldIdLst>
         </p14:section>
         <p14:section name="Over-Interpretations" id="{9711BCF0-0EF2-435D-A2E2-B5014891C597}">
@@ -9913,6 +9915,99 @@
 </p:sld>
 </file>
 
+<file path=ppt/slides/slide20.xml><?xml version="1.0" encoding="utf-8"?>
+<p:sld xmlns:a="http://schemas.openxmlformats.org/drawingml/2006/main" xmlns:r="http://schemas.openxmlformats.org/officeDocument/2006/relationships" xmlns:p="http://schemas.openxmlformats.org/presentationml/2006/main">
+  <p:cSld>
+    <p:spTree>
+      <p:nvGrpSpPr>
+        <p:cNvPr id="1" name=""/>
+        <p:cNvGrpSpPr/>
+        <p:nvPr/>
+      </p:nvGrpSpPr>
+      <p:grpSpPr>
+        <a:xfrm>
+          <a:off x="0" y="0"/>
+          <a:ext cx="0" cy="0"/>
+          <a:chOff x="0" y="0"/>
+          <a:chExt cx="0" cy="0"/>
+        </a:xfrm>
+      </p:grpSpPr>
+      <p:sp>
+        <p:nvSpPr>
+          <p:cNvPr id="2" name="Title 1">
+            <a:extLst>
+              <a:ext uri="{FF2B5EF4-FFF2-40B4-BE49-F238E27FC236}">
+                <a16:creationId xmlns:a16="http://schemas.microsoft.com/office/drawing/2014/main" id="{970BC690-40CA-30C2-4E91-661B86D51731}"/>
+              </a:ext>
+            </a:extLst>
+          </p:cNvPr>
+          <p:cNvSpPr>
+            <a:spLocks noGrp="1"/>
+          </p:cNvSpPr>
+          <p:nvPr>
+            <p:ph type="title"/>
+          </p:nvPr>
+        </p:nvSpPr>
+        <p:spPr/>
+        <p:txBody>
+          <a:bodyPr/>
+          <a:lstStyle/>
+          <a:p>
+            <a:r>
+              <a:rPr lang="en-US" dirty="0"/>
+              <a:t>8 balls paradox</a:t>
+            </a:r>
+          </a:p>
+        </p:txBody>
+      </p:sp>
+      <p:pic>
+        <p:nvPicPr>
+          <p:cNvPr id="5" name="Content Placeholder 4" descr="A group of spheres with a red center&#10;&#10;Description automatically generated">
+            <a:extLst>
+              <a:ext uri="{FF2B5EF4-FFF2-40B4-BE49-F238E27FC236}">
+                <a16:creationId xmlns:a16="http://schemas.microsoft.com/office/drawing/2014/main" id="{D77DA5D7-3765-F7C2-332A-1A3F3EBDE8C3}"/>
+              </a:ext>
+            </a:extLst>
+          </p:cNvPr>
+          <p:cNvPicPr>
+            <a:picLocks noGrp="1" noChangeAspect="1"/>
+          </p:cNvPicPr>
+          <p:nvPr>
+            <p:ph idx="1"/>
+          </p:nvPr>
+        </p:nvPicPr>
+        <p:blipFill>
+          <a:blip r:embed="rId2">
+            <a:extLst>
+              <a:ext uri="{28A0092B-C50C-407E-A947-70E740481C1C}">
+                <a14:useLocalDpi xmlns:a14="http://schemas.microsoft.com/office/drawing/2010/main" val="0"/>
+              </a:ext>
+            </a:extLst>
+          </a:blip>
+          <a:stretch>
+            <a:fillRect/>
+          </a:stretch>
+        </p:blipFill>
+        <p:spPr>
+          <a:xfrm>
+            <a:off x="4178604" y="1825625"/>
+            <a:ext cx="3834792" cy="4351338"/>
+          </a:xfrm>
+        </p:spPr>
+      </p:pic>
+    </p:spTree>
+    <p:extLst>
+      <p:ext uri="{BB962C8B-B14F-4D97-AF65-F5344CB8AC3E}">
+        <p14:creationId xmlns:p14="http://schemas.microsoft.com/office/powerpoint/2010/main" val="1652924092"/>
+      </p:ext>
+    </p:extLst>
+  </p:cSld>
+  <p:clrMapOvr>
+    <a:masterClrMapping/>
+  </p:clrMapOvr>
+</p:sld>
+</file>
+
 <file path=ppt/slides/slide3.xml><?xml version="1.0" encoding="utf-8"?>
 <p:sld xmlns:a="http://schemas.openxmlformats.org/drawingml/2006/main" xmlns:r="http://schemas.openxmlformats.org/officeDocument/2006/relationships" xmlns:p="http://schemas.openxmlformats.org/presentationml/2006/main">
   <p:cSld>

</xml_diff>

<commit_message>
8 balls paradox: cube arrow
</commit_message>
<xml_diff>
--- a/slides_x_mas_2023.pptx
+++ b/slides_x_mas_2023.pptx
@@ -9454,6 +9454,137 @@
           </a:xfrm>
         </p:spPr>
       </p:pic>
+      <p:sp>
+        <p:nvSpPr>
+          <p:cNvPr id="8" name="TextBox 7">
+            <a:extLst>
+              <a:ext uri="{FF2B5EF4-FFF2-40B4-BE49-F238E27FC236}">
+                <a16:creationId xmlns:a16="http://schemas.microsoft.com/office/drawing/2014/main" id="{532D97BA-7AC1-7348-F21B-E26D444F7B1D}"/>
+              </a:ext>
+            </a:extLst>
+          </p:cNvPr>
+          <p:cNvSpPr txBox="1"/>
+          <p:nvPr/>
+        </p:nvSpPr>
+        <p:spPr>
+          <a:xfrm>
+            <a:off x="8013396" y="1019175"/>
+            <a:ext cx="1593706" cy="461665"/>
+          </a:xfrm>
+          <a:prstGeom prst="rect">
+            <a:avLst/>
+          </a:prstGeom>
+          <a:noFill/>
+        </p:spPr>
+        <p:txBody>
+          <a:bodyPr wrap="none" rtlCol="0">
+            <a:spAutoFit/>
+          </a:bodyPr>
+          <a:lstStyle/>
+          <a:p>
+            <a:r>
+              <a:rPr lang="en-US" sz="2400" dirty="0">
+                <a:solidFill>
+                  <a:srgbClr val="5AA02C"/>
+                </a:solidFill>
+              </a:rPr>
+              <a:t>4x4x4 cube</a:t>
+            </a:r>
+          </a:p>
+        </p:txBody>
+      </p:sp>
+      <p:sp>
+        <p:nvSpPr>
+          <p:cNvPr id="16" name="Freeform: Shape 15">
+            <a:extLst>
+              <a:ext uri="{FF2B5EF4-FFF2-40B4-BE49-F238E27FC236}">
+                <a16:creationId xmlns:a16="http://schemas.microsoft.com/office/drawing/2014/main" id="{E6A953EF-9BD4-AD13-F7D5-2D81356EBB47}"/>
+              </a:ext>
+            </a:extLst>
+          </p:cNvPr>
+          <p:cNvSpPr/>
+          <p:nvPr/>
+        </p:nvSpPr>
+        <p:spPr>
+          <a:xfrm>
+            <a:off x="6610350" y="1247775"/>
+            <a:ext cx="1371600" cy="790575"/>
+          </a:xfrm>
+          <a:custGeom>
+            <a:avLst/>
+            <a:gdLst>
+              <a:gd name="connsiteX0" fmla="*/ 1371600 w 1371600"/>
+              <a:gd name="connsiteY0" fmla="*/ 0 h 790575"/>
+              <a:gd name="connsiteX1" fmla="*/ 628650 w 1371600"/>
+              <a:gd name="connsiteY1" fmla="*/ 228600 h 790575"/>
+              <a:gd name="connsiteX2" fmla="*/ 0 w 1371600"/>
+              <a:gd name="connsiteY2" fmla="*/ 790575 h 790575"/>
+            </a:gdLst>
+            <a:ahLst/>
+            <a:cxnLst>
+              <a:cxn ang="0">
+                <a:pos x="connsiteX0" y="connsiteY0"/>
+              </a:cxn>
+              <a:cxn ang="0">
+                <a:pos x="connsiteX1" y="connsiteY1"/>
+              </a:cxn>
+              <a:cxn ang="0">
+                <a:pos x="connsiteX2" y="connsiteY2"/>
+              </a:cxn>
+            </a:cxnLst>
+            <a:rect l="l" t="t" r="r" b="b"/>
+            <a:pathLst>
+              <a:path w="1371600" h="790575">
+                <a:moveTo>
+                  <a:pt x="1371600" y="0"/>
+                </a:moveTo>
+                <a:cubicBezTo>
+                  <a:pt x="1114425" y="48419"/>
+                  <a:pt x="857250" y="96838"/>
+                  <a:pt x="628650" y="228600"/>
+                </a:cubicBezTo>
+                <a:cubicBezTo>
+                  <a:pt x="400050" y="360363"/>
+                  <a:pt x="200025" y="575469"/>
+                  <a:pt x="0" y="790575"/>
+                </a:cubicBezTo>
+              </a:path>
+            </a:pathLst>
+          </a:custGeom>
+          <a:noFill/>
+          <a:ln w="57150">
+            <a:solidFill>
+              <a:srgbClr val="5AA02C"/>
+            </a:solidFill>
+            <a:headEnd type="none" w="med" len="med"/>
+            <a:tailEnd type="arrow" w="med" len="med"/>
+          </a:ln>
+        </p:spPr>
+        <p:style>
+          <a:lnRef idx="2">
+            <a:schemeClr val="accent1">
+              <a:shade val="15000"/>
+            </a:schemeClr>
+          </a:lnRef>
+          <a:fillRef idx="1">
+            <a:schemeClr val="accent1"/>
+          </a:fillRef>
+          <a:effectRef idx="0">
+            <a:schemeClr val="accent1"/>
+          </a:effectRef>
+          <a:fontRef idx="minor">
+            <a:schemeClr val="lt1"/>
+          </a:fontRef>
+        </p:style>
+        <p:txBody>
+          <a:bodyPr rtlCol="0" anchor="ctr"/>
+          <a:lstStyle/>
+          <a:p>
+            <a:pPr algn="ctr"/>
+            <a:endParaRPr lang="en-US"/>
+          </a:p>
+        </p:txBody>
+      </p:sp>
     </p:spTree>
     <p:extLst>
       <p:ext uri="{BB962C8B-B14F-4D97-AF65-F5344CB8AC3E}">
@@ -9464,6 +9595,175 @@
   <p:clrMapOvr>
     <a:masterClrMapping/>
   </p:clrMapOvr>
+  <p:timing>
+    <p:tnLst>
+      <p:par>
+        <p:cTn id="1" dur="indefinite" restart="never" nodeType="tmRoot">
+          <p:childTnLst>
+            <p:seq concurrent="1" nextAc="seek">
+              <p:cTn id="2" dur="indefinite" nodeType="mainSeq">
+                <p:childTnLst>
+                  <p:par>
+                    <p:cTn id="3" fill="hold">
+                      <p:stCondLst>
+                        <p:cond delay="indefinite"/>
+                        <p:cond evt="onBegin" delay="0">
+                          <p:tn val="2"/>
+                        </p:cond>
+                      </p:stCondLst>
+                      <p:childTnLst>
+                        <p:par>
+                          <p:cTn id="4" fill="hold">
+                            <p:stCondLst>
+                              <p:cond delay="0"/>
+                            </p:stCondLst>
+                            <p:childTnLst>
+                              <p:par>
+                                <p:cTn id="5" presetID="10" presetClass="entr" presetSubtype="0" fill="hold" nodeType="afterEffect">
+                                  <p:stCondLst>
+                                    <p:cond delay="0"/>
+                                  </p:stCondLst>
+                                  <p:childTnLst>
+                                    <p:set>
+                                      <p:cBhvr>
+                                        <p:cTn id="6" dur="1" fill="hold">
+                                          <p:stCondLst>
+                                            <p:cond delay="0"/>
+                                          </p:stCondLst>
+                                        </p:cTn>
+                                        <p:tgtEl>
+                                          <p:spTgt spid="7"/>
+                                        </p:tgtEl>
+                                        <p:attrNameLst>
+                                          <p:attrName>style.visibility</p:attrName>
+                                        </p:attrNameLst>
+                                      </p:cBhvr>
+                                      <p:to>
+                                        <p:strVal val="visible"/>
+                                      </p:to>
+                                    </p:set>
+                                    <p:animEffect transition="in" filter="fade">
+                                      <p:cBhvr>
+                                        <p:cTn id="7" dur="500"/>
+                                        <p:tgtEl>
+                                          <p:spTgt spid="7"/>
+                                        </p:tgtEl>
+                                      </p:cBhvr>
+                                    </p:animEffect>
+                                  </p:childTnLst>
+                                </p:cTn>
+                              </p:par>
+                            </p:childTnLst>
+                          </p:cTn>
+                        </p:par>
+                        <p:par>
+                          <p:cTn id="8" fill="hold">
+                            <p:stCondLst>
+                              <p:cond delay="500"/>
+                            </p:stCondLst>
+                            <p:childTnLst>
+                              <p:par>
+                                <p:cTn id="9" presetID="10" presetClass="entr" presetSubtype="0" fill="hold" grpId="0" nodeType="afterEffect">
+                                  <p:stCondLst>
+                                    <p:cond delay="0"/>
+                                  </p:stCondLst>
+                                  <p:childTnLst>
+                                    <p:set>
+                                      <p:cBhvr>
+                                        <p:cTn id="10" dur="1" fill="hold">
+                                          <p:stCondLst>
+                                            <p:cond delay="0"/>
+                                          </p:stCondLst>
+                                        </p:cTn>
+                                        <p:tgtEl>
+                                          <p:spTgt spid="8"/>
+                                        </p:tgtEl>
+                                        <p:attrNameLst>
+                                          <p:attrName>style.visibility</p:attrName>
+                                        </p:attrNameLst>
+                                      </p:cBhvr>
+                                      <p:to>
+                                        <p:strVal val="visible"/>
+                                      </p:to>
+                                    </p:set>
+                                    <p:animEffect transition="in" filter="fade">
+                                      <p:cBhvr>
+                                        <p:cTn id="11" dur="500"/>
+                                        <p:tgtEl>
+                                          <p:spTgt spid="8"/>
+                                        </p:tgtEl>
+                                      </p:cBhvr>
+                                    </p:animEffect>
+                                  </p:childTnLst>
+                                </p:cTn>
+                              </p:par>
+                              <p:par>
+                                <p:cTn id="12" presetID="10" presetClass="entr" presetSubtype="0" fill="hold" grpId="0" nodeType="withEffect">
+                                  <p:stCondLst>
+                                    <p:cond delay="0"/>
+                                  </p:stCondLst>
+                                  <p:childTnLst>
+                                    <p:set>
+                                      <p:cBhvr>
+                                        <p:cTn id="13" dur="1" fill="hold">
+                                          <p:stCondLst>
+                                            <p:cond delay="0"/>
+                                          </p:stCondLst>
+                                        </p:cTn>
+                                        <p:tgtEl>
+                                          <p:spTgt spid="16"/>
+                                        </p:tgtEl>
+                                        <p:attrNameLst>
+                                          <p:attrName>style.visibility</p:attrName>
+                                        </p:attrNameLst>
+                                      </p:cBhvr>
+                                      <p:to>
+                                        <p:strVal val="visible"/>
+                                      </p:to>
+                                    </p:set>
+                                    <p:animEffect transition="in" filter="fade">
+                                      <p:cBhvr>
+                                        <p:cTn id="14" dur="500"/>
+                                        <p:tgtEl>
+                                          <p:spTgt spid="16"/>
+                                        </p:tgtEl>
+                                      </p:cBhvr>
+                                    </p:animEffect>
+                                  </p:childTnLst>
+                                </p:cTn>
+                              </p:par>
+                            </p:childTnLst>
+                          </p:cTn>
+                        </p:par>
+                      </p:childTnLst>
+                    </p:cTn>
+                  </p:par>
+                </p:childTnLst>
+              </p:cTn>
+              <p:prevCondLst>
+                <p:cond evt="onPrev" delay="0">
+                  <p:tgtEl>
+                    <p:sldTgt/>
+                  </p:tgtEl>
+                </p:cond>
+              </p:prevCondLst>
+              <p:nextCondLst>
+                <p:cond evt="onNext" delay="0">
+                  <p:tgtEl>
+                    <p:sldTgt/>
+                  </p:tgtEl>
+                </p:cond>
+              </p:nextCondLst>
+            </p:seq>
+          </p:childTnLst>
+        </p:cTn>
+      </p:par>
+    </p:tnLst>
+    <p:bldLst>
+      <p:bldP spid="8" grpId="0"/>
+      <p:bldP spid="16" grpId="0" animBg="1"/>
+    </p:bldLst>
+  </p:timing>
 </p:sld>
 </file>
 
@@ -9547,6 +9847,137 @@
           </a:xfrm>
         </p:spPr>
       </p:pic>
+      <p:sp>
+        <p:nvSpPr>
+          <p:cNvPr id="8" name="TextBox 7">
+            <a:extLst>
+              <a:ext uri="{FF2B5EF4-FFF2-40B4-BE49-F238E27FC236}">
+                <a16:creationId xmlns:a16="http://schemas.microsoft.com/office/drawing/2014/main" id="{A8C2FB18-2A8C-44CC-A11C-8C15E54C59C4}"/>
+              </a:ext>
+            </a:extLst>
+          </p:cNvPr>
+          <p:cNvSpPr txBox="1"/>
+          <p:nvPr/>
+        </p:nvSpPr>
+        <p:spPr>
+          <a:xfrm>
+            <a:off x="8013396" y="1019175"/>
+            <a:ext cx="1593706" cy="461665"/>
+          </a:xfrm>
+          <a:prstGeom prst="rect">
+            <a:avLst/>
+          </a:prstGeom>
+          <a:noFill/>
+        </p:spPr>
+        <p:txBody>
+          <a:bodyPr wrap="none" rtlCol="0">
+            <a:spAutoFit/>
+          </a:bodyPr>
+          <a:lstStyle/>
+          <a:p>
+            <a:r>
+              <a:rPr lang="en-US" sz="2400" dirty="0">
+                <a:solidFill>
+                  <a:srgbClr val="5AA02C"/>
+                </a:solidFill>
+              </a:rPr>
+              <a:t>4x4x4 cube</a:t>
+            </a:r>
+          </a:p>
+        </p:txBody>
+      </p:sp>
+      <p:sp>
+        <p:nvSpPr>
+          <p:cNvPr id="10" name="Freeform: Shape 9">
+            <a:extLst>
+              <a:ext uri="{FF2B5EF4-FFF2-40B4-BE49-F238E27FC236}">
+                <a16:creationId xmlns:a16="http://schemas.microsoft.com/office/drawing/2014/main" id="{AB1F732A-3922-4C7E-7AD4-E27782C10DF5}"/>
+              </a:ext>
+            </a:extLst>
+          </p:cNvPr>
+          <p:cNvSpPr/>
+          <p:nvPr/>
+        </p:nvSpPr>
+        <p:spPr>
+          <a:xfrm>
+            <a:off x="6610350" y="1247775"/>
+            <a:ext cx="1371600" cy="790575"/>
+          </a:xfrm>
+          <a:custGeom>
+            <a:avLst/>
+            <a:gdLst>
+              <a:gd name="connsiteX0" fmla="*/ 1371600 w 1371600"/>
+              <a:gd name="connsiteY0" fmla="*/ 0 h 790575"/>
+              <a:gd name="connsiteX1" fmla="*/ 628650 w 1371600"/>
+              <a:gd name="connsiteY1" fmla="*/ 228600 h 790575"/>
+              <a:gd name="connsiteX2" fmla="*/ 0 w 1371600"/>
+              <a:gd name="connsiteY2" fmla="*/ 790575 h 790575"/>
+            </a:gdLst>
+            <a:ahLst/>
+            <a:cxnLst>
+              <a:cxn ang="0">
+                <a:pos x="connsiteX0" y="connsiteY0"/>
+              </a:cxn>
+              <a:cxn ang="0">
+                <a:pos x="connsiteX1" y="connsiteY1"/>
+              </a:cxn>
+              <a:cxn ang="0">
+                <a:pos x="connsiteX2" y="connsiteY2"/>
+              </a:cxn>
+            </a:cxnLst>
+            <a:rect l="l" t="t" r="r" b="b"/>
+            <a:pathLst>
+              <a:path w="1371600" h="790575">
+                <a:moveTo>
+                  <a:pt x="1371600" y="0"/>
+                </a:moveTo>
+                <a:cubicBezTo>
+                  <a:pt x="1114425" y="48419"/>
+                  <a:pt x="857250" y="96838"/>
+                  <a:pt x="628650" y="228600"/>
+                </a:cubicBezTo>
+                <a:cubicBezTo>
+                  <a:pt x="400050" y="360363"/>
+                  <a:pt x="200025" y="575469"/>
+                  <a:pt x="0" y="790575"/>
+                </a:cubicBezTo>
+              </a:path>
+            </a:pathLst>
+          </a:custGeom>
+          <a:noFill/>
+          <a:ln w="57150">
+            <a:solidFill>
+              <a:srgbClr val="5AA02C"/>
+            </a:solidFill>
+            <a:headEnd type="none" w="med" len="med"/>
+            <a:tailEnd type="arrow" w="med" len="med"/>
+          </a:ln>
+        </p:spPr>
+        <p:style>
+          <a:lnRef idx="2">
+            <a:schemeClr val="accent1">
+              <a:shade val="15000"/>
+            </a:schemeClr>
+          </a:lnRef>
+          <a:fillRef idx="1">
+            <a:schemeClr val="accent1"/>
+          </a:fillRef>
+          <a:effectRef idx="0">
+            <a:schemeClr val="accent1"/>
+          </a:effectRef>
+          <a:fontRef idx="minor">
+            <a:schemeClr val="lt1"/>
+          </a:fontRef>
+        </p:style>
+        <p:txBody>
+          <a:bodyPr rtlCol="0" anchor="ctr"/>
+          <a:lstStyle/>
+          <a:p>
+            <a:pPr algn="ctr"/>
+            <a:endParaRPr lang="en-US"/>
+          </a:p>
+        </p:txBody>
+      </p:sp>
     </p:spTree>
     <p:extLst>
       <p:ext uri="{BB962C8B-B14F-4D97-AF65-F5344CB8AC3E}">
@@ -9640,6 +10071,137 @@
           </a:xfrm>
         </p:spPr>
       </p:pic>
+      <p:sp>
+        <p:nvSpPr>
+          <p:cNvPr id="8" name="TextBox 7">
+            <a:extLst>
+              <a:ext uri="{FF2B5EF4-FFF2-40B4-BE49-F238E27FC236}">
+                <a16:creationId xmlns:a16="http://schemas.microsoft.com/office/drawing/2014/main" id="{656CFC9B-163C-6DE6-F22D-000C6E586C51}"/>
+              </a:ext>
+            </a:extLst>
+          </p:cNvPr>
+          <p:cNvSpPr txBox="1"/>
+          <p:nvPr/>
+        </p:nvSpPr>
+        <p:spPr>
+          <a:xfrm>
+            <a:off x="8013396" y="1019175"/>
+            <a:ext cx="1593706" cy="461665"/>
+          </a:xfrm>
+          <a:prstGeom prst="rect">
+            <a:avLst/>
+          </a:prstGeom>
+          <a:noFill/>
+        </p:spPr>
+        <p:txBody>
+          <a:bodyPr wrap="none" rtlCol="0">
+            <a:spAutoFit/>
+          </a:bodyPr>
+          <a:lstStyle/>
+          <a:p>
+            <a:r>
+              <a:rPr lang="en-US" sz="2400" dirty="0">
+                <a:solidFill>
+                  <a:srgbClr val="5AA02C"/>
+                </a:solidFill>
+              </a:rPr>
+              <a:t>4x4x4 cube</a:t>
+            </a:r>
+          </a:p>
+        </p:txBody>
+      </p:sp>
+      <p:sp>
+        <p:nvSpPr>
+          <p:cNvPr id="10" name="Freeform: Shape 9">
+            <a:extLst>
+              <a:ext uri="{FF2B5EF4-FFF2-40B4-BE49-F238E27FC236}">
+                <a16:creationId xmlns:a16="http://schemas.microsoft.com/office/drawing/2014/main" id="{B2BD53BB-88B7-5C0C-68B0-46D0115F1493}"/>
+              </a:ext>
+            </a:extLst>
+          </p:cNvPr>
+          <p:cNvSpPr/>
+          <p:nvPr/>
+        </p:nvSpPr>
+        <p:spPr>
+          <a:xfrm>
+            <a:off x="6610350" y="1247775"/>
+            <a:ext cx="1371600" cy="790575"/>
+          </a:xfrm>
+          <a:custGeom>
+            <a:avLst/>
+            <a:gdLst>
+              <a:gd name="connsiteX0" fmla="*/ 1371600 w 1371600"/>
+              <a:gd name="connsiteY0" fmla="*/ 0 h 790575"/>
+              <a:gd name="connsiteX1" fmla="*/ 628650 w 1371600"/>
+              <a:gd name="connsiteY1" fmla="*/ 228600 h 790575"/>
+              <a:gd name="connsiteX2" fmla="*/ 0 w 1371600"/>
+              <a:gd name="connsiteY2" fmla="*/ 790575 h 790575"/>
+            </a:gdLst>
+            <a:ahLst/>
+            <a:cxnLst>
+              <a:cxn ang="0">
+                <a:pos x="connsiteX0" y="connsiteY0"/>
+              </a:cxn>
+              <a:cxn ang="0">
+                <a:pos x="connsiteX1" y="connsiteY1"/>
+              </a:cxn>
+              <a:cxn ang="0">
+                <a:pos x="connsiteX2" y="connsiteY2"/>
+              </a:cxn>
+            </a:cxnLst>
+            <a:rect l="l" t="t" r="r" b="b"/>
+            <a:pathLst>
+              <a:path w="1371600" h="790575">
+                <a:moveTo>
+                  <a:pt x="1371600" y="0"/>
+                </a:moveTo>
+                <a:cubicBezTo>
+                  <a:pt x="1114425" y="48419"/>
+                  <a:pt x="857250" y="96838"/>
+                  <a:pt x="628650" y="228600"/>
+                </a:cubicBezTo>
+                <a:cubicBezTo>
+                  <a:pt x="400050" y="360363"/>
+                  <a:pt x="200025" y="575469"/>
+                  <a:pt x="0" y="790575"/>
+                </a:cubicBezTo>
+              </a:path>
+            </a:pathLst>
+          </a:custGeom>
+          <a:noFill/>
+          <a:ln w="57150">
+            <a:solidFill>
+              <a:srgbClr val="5AA02C"/>
+            </a:solidFill>
+            <a:headEnd type="none" w="med" len="med"/>
+            <a:tailEnd type="arrow" w="med" len="med"/>
+          </a:ln>
+        </p:spPr>
+        <p:style>
+          <a:lnRef idx="2">
+            <a:schemeClr val="accent1">
+              <a:shade val="15000"/>
+            </a:schemeClr>
+          </a:lnRef>
+          <a:fillRef idx="1">
+            <a:schemeClr val="accent1"/>
+          </a:fillRef>
+          <a:effectRef idx="0">
+            <a:schemeClr val="accent1"/>
+          </a:effectRef>
+          <a:fontRef idx="minor">
+            <a:schemeClr val="lt1"/>
+          </a:fontRef>
+        </p:style>
+        <p:txBody>
+          <a:bodyPr rtlCol="0" anchor="ctr"/>
+          <a:lstStyle/>
+          <a:p>
+            <a:pPr algn="ctr"/>
+            <a:endParaRPr lang="en-US"/>
+          </a:p>
+        </p:txBody>
+      </p:sp>
     </p:spTree>
     <p:extLst>
       <p:ext uri="{BB962C8B-B14F-4D97-AF65-F5344CB8AC3E}">
@@ -9733,6 +10295,137 @@
           </a:xfrm>
         </p:spPr>
       </p:pic>
+      <p:sp>
+        <p:nvSpPr>
+          <p:cNvPr id="8" name="TextBox 7">
+            <a:extLst>
+              <a:ext uri="{FF2B5EF4-FFF2-40B4-BE49-F238E27FC236}">
+                <a16:creationId xmlns:a16="http://schemas.microsoft.com/office/drawing/2014/main" id="{A61B7BC0-AB2A-38A5-A28A-F6415E438A2D}"/>
+              </a:ext>
+            </a:extLst>
+          </p:cNvPr>
+          <p:cNvSpPr txBox="1"/>
+          <p:nvPr/>
+        </p:nvSpPr>
+        <p:spPr>
+          <a:xfrm>
+            <a:off x="8013396" y="1019175"/>
+            <a:ext cx="1593706" cy="461665"/>
+          </a:xfrm>
+          <a:prstGeom prst="rect">
+            <a:avLst/>
+          </a:prstGeom>
+          <a:noFill/>
+        </p:spPr>
+        <p:txBody>
+          <a:bodyPr wrap="none" rtlCol="0">
+            <a:spAutoFit/>
+          </a:bodyPr>
+          <a:lstStyle/>
+          <a:p>
+            <a:r>
+              <a:rPr lang="en-US" sz="2400" dirty="0">
+                <a:solidFill>
+                  <a:srgbClr val="5AA02C"/>
+                </a:solidFill>
+              </a:rPr>
+              <a:t>4x4x4 cube</a:t>
+            </a:r>
+          </a:p>
+        </p:txBody>
+      </p:sp>
+      <p:sp>
+        <p:nvSpPr>
+          <p:cNvPr id="10" name="Freeform: Shape 9">
+            <a:extLst>
+              <a:ext uri="{FF2B5EF4-FFF2-40B4-BE49-F238E27FC236}">
+                <a16:creationId xmlns:a16="http://schemas.microsoft.com/office/drawing/2014/main" id="{3DD021CF-EA7B-B51C-69B9-A20D8B082CB3}"/>
+              </a:ext>
+            </a:extLst>
+          </p:cNvPr>
+          <p:cNvSpPr/>
+          <p:nvPr/>
+        </p:nvSpPr>
+        <p:spPr>
+          <a:xfrm>
+            <a:off x="6610350" y="1247775"/>
+            <a:ext cx="1371600" cy="790575"/>
+          </a:xfrm>
+          <a:custGeom>
+            <a:avLst/>
+            <a:gdLst>
+              <a:gd name="connsiteX0" fmla="*/ 1371600 w 1371600"/>
+              <a:gd name="connsiteY0" fmla="*/ 0 h 790575"/>
+              <a:gd name="connsiteX1" fmla="*/ 628650 w 1371600"/>
+              <a:gd name="connsiteY1" fmla="*/ 228600 h 790575"/>
+              <a:gd name="connsiteX2" fmla="*/ 0 w 1371600"/>
+              <a:gd name="connsiteY2" fmla="*/ 790575 h 790575"/>
+            </a:gdLst>
+            <a:ahLst/>
+            <a:cxnLst>
+              <a:cxn ang="0">
+                <a:pos x="connsiteX0" y="connsiteY0"/>
+              </a:cxn>
+              <a:cxn ang="0">
+                <a:pos x="connsiteX1" y="connsiteY1"/>
+              </a:cxn>
+              <a:cxn ang="0">
+                <a:pos x="connsiteX2" y="connsiteY2"/>
+              </a:cxn>
+            </a:cxnLst>
+            <a:rect l="l" t="t" r="r" b="b"/>
+            <a:pathLst>
+              <a:path w="1371600" h="790575">
+                <a:moveTo>
+                  <a:pt x="1371600" y="0"/>
+                </a:moveTo>
+                <a:cubicBezTo>
+                  <a:pt x="1114425" y="48419"/>
+                  <a:pt x="857250" y="96838"/>
+                  <a:pt x="628650" y="228600"/>
+                </a:cubicBezTo>
+                <a:cubicBezTo>
+                  <a:pt x="400050" y="360363"/>
+                  <a:pt x="200025" y="575469"/>
+                  <a:pt x="0" y="790575"/>
+                </a:cubicBezTo>
+              </a:path>
+            </a:pathLst>
+          </a:custGeom>
+          <a:noFill/>
+          <a:ln w="57150">
+            <a:solidFill>
+              <a:srgbClr val="5AA02C"/>
+            </a:solidFill>
+            <a:headEnd type="none" w="med" len="med"/>
+            <a:tailEnd type="arrow" w="med" len="med"/>
+          </a:ln>
+        </p:spPr>
+        <p:style>
+          <a:lnRef idx="2">
+            <a:schemeClr val="accent1">
+              <a:shade val="15000"/>
+            </a:schemeClr>
+          </a:lnRef>
+          <a:fillRef idx="1">
+            <a:schemeClr val="accent1"/>
+          </a:fillRef>
+          <a:effectRef idx="0">
+            <a:schemeClr val="accent1"/>
+          </a:effectRef>
+          <a:fontRef idx="minor">
+            <a:schemeClr val="lt1"/>
+          </a:fontRef>
+        </p:style>
+        <p:txBody>
+          <a:bodyPr rtlCol="0" anchor="ctr"/>
+          <a:lstStyle/>
+          <a:p>
+            <a:pPr algn="ctr"/>
+            <a:endParaRPr lang="en-US"/>
+          </a:p>
+        </p:txBody>
+      </p:sp>
     </p:spTree>
     <p:extLst>
       <p:ext uri="{BB962C8B-B14F-4D97-AF65-F5344CB8AC3E}">
@@ -9995,6 +10688,137 @@
           </a:xfrm>
         </p:spPr>
       </p:pic>
+      <p:sp>
+        <p:nvSpPr>
+          <p:cNvPr id="6" name="TextBox 5">
+            <a:extLst>
+              <a:ext uri="{FF2B5EF4-FFF2-40B4-BE49-F238E27FC236}">
+                <a16:creationId xmlns:a16="http://schemas.microsoft.com/office/drawing/2014/main" id="{56EC09E5-D96B-27FD-41EA-F48974270CB8}"/>
+              </a:ext>
+            </a:extLst>
+          </p:cNvPr>
+          <p:cNvSpPr txBox="1"/>
+          <p:nvPr/>
+        </p:nvSpPr>
+        <p:spPr>
+          <a:xfrm>
+            <a:off x="8013396" y="1019175"/>
+            <a:ext cx="1593706" cy="461665"/>
+          </a:xfrm>
+          <a:prstGeom prst="rect">
+            <a:avLst/>
+          </a:prstGeom>
+          <a:noFill/>
+        </p:spPr>
+        <p:txBody>
+          <a:bodyPr wrap="none" rtlCol="0">
+            <a:spAutoFit/>
+          </a:bodyPr>
+          <a:lstStyle/>
+          <a:p>
+            <a:r>
+              <a:rPr lang="en-US" sz="2400" dirty="0">
+                <a:solidFill>
+                  <a:srgbClr val="5AA02C"/>
+                </a:solidFill>
+              </a:rPr>
+              <a:t>4x4x4 cube</a:t>
+            </a:r>
+          </a:p>
+        </p:txBody>
+      </p:sp>
+      <p:sp>
+        <p:nvSpPr>
+          <p:cNvPr id="8" name="Freeform: Shape 7">
+            <a:extLst>
+              <a:ext uri="{FF2B5EF4-FFF2-40B4-BE49-F238E27FC236}">
+                <a16:creationId xmlns:a16="http://schemas.microsoft.com/office/drawing/2014/main" id="{5DB846E1-6276-EE97-921A-B03B32E3C452}"/>
+              </a:ext>
+            </a:extLst>
+          </p:cNvPr>
+          <p:cNvSpPr/>
+          <p:nvPr/>
+        </p:nvSpPr>
+        <p:spPr>
+          <a:xfrm>
+            <a:off x="6610350" y="1247775"/>
+            <a:ext cx="1371600" cy="790575"/>
+          </a:xfrm>
+          <a:custGeom>
+            <a:avLst/>
+            <a:gdLst>
+              <a:gd name="connsiteX0" fmla="*/ 1371600 w 1371600"/>
+              <a:gd name="connsiteY0" fmla="*/ 0 h 790575"/>
+              <a:gd name="connsiteX1" fmla="*/ 628650 w 1371600"/>
+              <a:gd name="connsiteY1" fmla="*/ 228600 h 790575"/>
+              <a:gd name="connsiteX2" fmla="*/ 0 w 1371600"/>
+              <a:gd name="connsiteY2" fmla="*/ 790575 h 790575"/>
+            </a:gdLst>
+            <a:ahLst/>
+            <a:cxnLst>
+              <a:cxn ang="0">
+                <a:pos x="connsiteX0" y="connsiteY0"/>
+              </a:cxn>
+              <a:cxn ang="0">
+                <a:pos x="connsiteX1" y="connsiteY1"/>
+              </a:cxn>
+              <a:cxn ang="0">
+                <a:pos x="connsiteX2" y="connsiteY2"/>
+              </a:cxn>
+            </a:cxnLst>
+            <a:rect l="l" t="t" r="r" b="b"/>
+            <a:pathLst>
+              <a:path w="1371600" h="790575">
+                <a:moveTo>
+                  <a:pt x="1371600" y="0"/>
+                </a:moveTo>
+                <a:cubicBezTo>
+                  <a:pt x="1114425" y="48419"/>
+                  <a:pt x="857250" y="96838"/>
+                  <a:pt x="628650" y="228600"/>
+                </a:cubicBezTo>
+                <a:cubicBezTo>
+                  <a:pt x="400050" y="360363"/>
+                  <a:pt x="200025" y="575469"/>
+                  <a:pt x="0" y="790575"/>
+                </a:cubicBezTo>
+              </a:path>
+            </a:pathLst>
+          </a:custGeom>
+          <a:noFill/>
+          <a:ln w="57150">
+            <a:solidFill>
+              <a:srgbClr val="5AA02C"/>
+            </a:solidFill>
+            <a:headEnd type="none" w="med" len="med"/>
+            <a:tailEnd type="arrow" w="med" len="med"/>
+          </a:ln>
+        </p:spPr>
+        <p:style>
+          <a:lnRef idx="2">
+            <a:schemeClr val="accent1">
+              <a:shade val="15000"/>
+            </a:schemeClr>
+          </a:lnRef>
+          <a:fillRef idx="1">
+            <a:schemeClr val="accent1"/>
+          </a:fillRef>
+          <a:effectRef idx="0">
+            <a:schemeClr val="accent1"/>
+          </a:effectRef>
+          <a:fontRef idx="minor">
+            <a:schemeClr val="lt1"/>
+          </a:fontRef>
+        </p:style>
+        <p:txBody>
+          <a:bodyPr rtlCol="0" anchor="ctr"/>
+          <a:lstStyle/>
+          <a:p>
+            <a:pPr algn="ctr"/>
+            <a:endParaRPr lang="en-US"/>
+          </a:p>
+        </p:txBody>
+      </p:sp>
     </p:spTree>
     <p:extLst>
       <p:ext uri="{BB962C8B-B14F-4D97-AF65-F5344CB8AC3E}">

</xml_diff>

<commit_message>
8 balls paradox: spheres arrow
</commit_message>
<xml_diff>
--- a/slides_x_mas_2023.pptx
+++ b/slides_x_mas_2023.pptx
@@ -9978,6 +9978,137 @@
           </a:p>
         </p:txBody>
       </p:sp>
+      <p:sp>
+        <p:nvSpPr>
+          <p:cNvPr id="11" name="Freeform: Shape 10">
+            <a:extLst>
+              <a:ext uri="{FF2B5EF4-FFF2-40B4-BE49-F238E27FC236}">
+                <a16:creationId xmlns:a16="http://schemas.microsoft.com/office/drawing/2014/main" id="{F19956BE-BB2E-98DF-E290-97892F2763C8}"/>
+              </a:ext>
+            </a:extLst>
+          </p:cNvPr>
+          <p:cNvSpPr/>
+          <p:nvPr/>
+        </p:nvSpPr>
+        <p:spPr>
+          <a:xfrm flipH="1">
+            <a:off x="3857624" y="2438399"/>
+            <a:ext cx="1038225" cy="614361"/>
+          </a:xfrm>
+          <a:custGeom>
+            <a:avLst/>
+            <a:gdLst>
+              <a:gd name="connsiteX0" fmla="*/ 1371600 w 1371600"/>
+              <a:gd name="connsiteY0" fmla="*/ 0 h 790575"/>
+              <a:gd name="connsiteX1" fmla="*/ 628650 w 1371600"/>
+              <a:gd name="connsiteY1" fmla="*/ 228600 h 790575"/>
+              <a:gd name="connsiteX2" fmla="*/ 0 w 1371600"/>
+              <a:gd name="connsiteY2" fmla="*/ 790575 h 790575"/>
+            </a:gdLst>
+            <a:ahLst/>
+            <a:cxnLst>
+              <a:cxn ang="0">
+                <a:pos x="connsiteX0" y="connsiteY0"/>
+              </a:cxn>
+              <a:cxn ang="0">
+                <a:pos x="connsiteX1" y="connsiteY1"/>
+              </a:cxn>
+              <a:cxn ang="0">
+                <a:pos x="connsiteX2" y="connsiteY2"/>
+              </a:cxn>
+            </a:cxnLst>
+            <a:rect l="l" t="t" r="r" b="b"/>
+            <a:pathLst>
+              <a:path w="1371600" h="790575">
+                <a:moveTo>
+                  <a:pt x="1371600" y="0"/>
+                </a:moveTo>
+                <a:cubicBezTo>
+                  <a:pt x="1114425" y="48419"/>
+                  <a:pt x="857250" y="96838"/>
+                  <a:pt x="628650" y="228600"/>
+                </a:cubicBezTo>
+                <a:cubicBezTo>
+                  <a:pt x="400050" y="360363"/>
+                  <a:pt x="200025" y="575469"/>
+                  <a:pt x="0" y="790575"/>
+                </a:cubicBezTo>
+              </a:path>
+            </a:pathLst>
+          </a:custGeom>
+          <a:noFill/>
+          <a:ln w="57150">
+            <a:solidFill>
+              <a:srgbClr val="37ABC8"/>
+            </a:solidFill>
+            <a:headEnd type="none" w="med" len="med"/>
+            <a:tailEnd type="arrow" w="med" len="med"/>
+          </a:ln>
+        </p:spPr>
+        <p:style>
+          <a:lnRef idx="2">
+            <a:schemeClr val="accent1">
+              <a:shade val="15000"/>
+            </a:schemeClr>
+          </a:lnRef>
+          <a:fillRef idx="1">
+            <a:schemeClr val="accent1"/>
+          </a:fillRef>
+          <a:effectRef idx="0">
+            <a:schemeClr val="accent1"/>
+          </a:effectRef>
+          <a:fontRef idx="minor">
+            <a:schemeClr val="lt1"/>
+          </a:fontRef>
+        </p:style>
+        <p:txBody>
+          <a:bodyPr rtlCol="0" anchor="ctr"/>
+          <a:lstStyle/>
+          <a:p>
+            <a:pPr algn="ctr"/>
+            <a:endParaRPr lang="en-US"/>
+          </a:p>
+        </p:txBody>
+      </p:sp>
+      <p:sp>
+        <p:nvSpPr>
+          <p:cNvPr id="12" name="TextBox 11">
+            <a:extLst>
+              <a:ext uri="{FF2B5EF4-FFF2-40B4-BE49-F238E27FC236}">
+                <a16:creationId xmlns:a16="http://schemas.microsoft.com/office/drawing/2014/main" id="{0B915850-8BFC-F005-5009-668A928153B3}"/>
+              </a:ext>
+            </a:extLst>
+          </p:cNvPr>
+          <p:cNvSpPr txBox="1"/>
+          <p:nvPr/>
+        </p:nvSpPr>
+        <p:spPr>
+          <a:xfrm>
+            <a:off x="2685381" y="2140892"/>
+            <a:ext cx="1172244" cy="461665"/>
+          </a:xfrm>
+          <a:prstGeom prst="rect">
+            <a:avLst/>
+          </a:prstGeom>
+          <a:noFill/>
+        </p:spPr>
+        <p:txBody>
+          <a:bodyPr wrap="square" rtlCol="0">
+            <a:spAutoFit/>
+          </a:bodyPr>
+          <a:lstStyle/>
+          <a:p>
+            <a:r>
+              <a:rPr lang="en-US" sz="2400" dirty="0">
+                <a:solidFill>
+                  <a:srgbClr val="37ABC8"/>
+                </a:solidFill>
+              </a:rPr>
+              <a:t>radius 1</a:t>
+            </a:r>
+          </a:p>
+        </p:txBody>
+      </p:sp>
     </p:spTree>
     <p:extLst>
       <p:ext uri="{BB962C8B-B14F-4D97-AF65-F5344CB8AC3E}">
@@ -9988,6 +10119,143 @@
   <p:clrMapOvr>
     <a:masterClrMapping/>
   </p:clrMapOvr>
+  <mc:AlternateContent xmlns:mc="http://schemas.openxmlformats.org/markup-compatibility/2006">
+    <mc:Choice xmlns:p14="http://schemas.microsoft.com/office/powerpoint/2010/main" Requires="p14">
+      <p:transition spd="med" p14:dur="700">
+        <p:fade/>
+      </p:transition>
+    </mc:Choice>
+    <mc:Fallback>
+      <p:transition spd="med">
+        <p:fade/>
+      </p:transition>
+    </mc:Fallback>
+  </mc:AlternateContent>
+  <p:timing>
+    <p:tnLst>
+      <p:par>
+        <p:cTn id="1" dur="indefinite" restart="never" nodeType="tmRoot">
+          <p:childTnLst>
+            <p:seq concurrent="1" nextAc="seek">
+              <p:cTn id="2" dur="indefinite" nodeType="mainSeq">
+                <p:childTnLst>
+                  <p:par>
+                    <p:cTn id="3" fill="hold">
+                      <p:stCondLst>
+                        <p:cond delay="indefinite"/>
+                        <p:cond evt="onBegin" delay="0">
+                          <p:tn val="2"/>
+                        </p:cond>
+                      </p:stCondLst>
+                      <p:childTnLst>
+                        <p:par>
+                          <p:cTn id="4" fill="hold">
+                            <p:stCondLst>
+                              <p:cond delay="0"/>
+                            </p:stCondLst>
+                            <p:childTnLst>
+                              <p:par>
+                                <p:cTn id="5" presetID="10" presetClass="entr" presetSubtype="0" fill="hold" grpId="0" nodeType="afterEffect">
+                                  <p:stCondLst>
+                                    <p:cond delay="0"/>
+                                  </p:stCondLst>
+                                  <p:childTnLst>
+                                    <p:set>
+                                      <p:cBhvr>
+                                        <p:cTn id="6" dur="1" fill="hold">
+                                          <p:stCondLst>
+                                            <p:cond delay="0"/>
+                                          </p:stCondLst>
+                                        </p:cTn>
+                                        <p:tgtEl>
+                                          <p:spTgt spid="12"/>
+                                        </p:tgtEl>
+                                        <p:attrNameLst>
+                                          <p:attrName>style.visibility</p:attrName>
+                                        </p:attrNameLst>
+                                      </p:cBhvr>
+                                      <p:to>
+                                        <p:strVal val="visible"/>
+                                      </p:to>
+                                    </p:set>
+                                    <p:animEffect transition="in" filter="fade">
+                                      <p:cBhvr>
+                                        <p:cTn id="7" dur="500"/>
+                                        <p:tgtEl>
+                                          <p:spTgt spid="12"/>
+                                        </p:tgtEl>
+                                      </p:cBhvr>
+                                    </p:animEffect>
+                                  </p:childTnLst>
+                                </p:cTn>
+                              </p:par>
+                              <p:par>
+                                <p:cTn id="8" presetID="10" presetClass="entr" presetSubtype="0" fill="hold" grpId="0" nodeType="withEffect">
+                                  <p:stCondLst>
+                                    <p:cond delay="0"/>
+                                  </p:stCondLst>
+                                  <p:childTnLst>
+                                    <p:set>
+                                      <p:cBhvr>
+                                        <p:cTn id="9" dur="1" fill="hold">
+                                          <p:stCondLst>
+                                            <p:cond delay="0"/>
+                                          </p:stCondLst>
+                                        </p:cTn>
+                                        <p:tgtEl>
+                                          <p:spTgt spid="11"/>
+                                        </p:tgtEl>
+                                        <p:attrNameLst>
+                                          <p:attrName>style.visibility</p:attrName>
+                                        </p:attrNameLst>
+                                      </p:cBhvr>
+                                      <p:to>
+                                        <p:strVal val="visible"/>
+                                      </p:to>
+                                    </p:set>
+                                    <p:animEffect transition="in" filter="fade">
+                                      <p:cBhvr>
+                                        <p:cTn id="10" dur="500"/>
+                                        <p:tgtEl>
+                                          <p:spTgt spid="11"/>
+                                        </p:tgtEl>
+                                      </p:cBhvr>
+                                    </p:animEffect>
+                                  </p:childTnLst>
+                                </p:cTn>
+                              </p:par>
+                            </p:childTnLst>
+                          </p:cTn>
+                        </p:par>
+                      </p:childTnLst>
+                    </p:cTn>
+                  </p:par>
+                </p:childTnLst>
+              </p:cTn>
+              <p:prevCondLst>
+                <p:cond evt="onPrev" delay="0">
+                  <p:tgtEl>
+                    <p:sldTgt/>
+                  </p:tgtEl>
+                </p:cond>
+              </p:prevCondLst>
+              <p:nextCondLst>
+                <p:cond evt="onNext" delay="0">
+                  <p:tgtEl>
+                    <p:sldTgt/>
+                  </p:tgtEl>
+                </p:cond>
+              </p:nextCondLst>
+            </p:seq>
+          </p:childTnLst>
+        </p:cTn>
+      </p:par>
+    </p:tnLst>
+    <p:bldLst>
+      <p:bldP spid="11" grpId="0" animBg="1"/>
+      <p:bldP spid="12" grpId="0"/>
+    </p:bldLst>
+  </p:timing>
 </p:sld>
 </file>
 
@@ -10202,6 +10470,137 @@
           </a:p>
         </p:txBody>
       </p:sp>
+      <p:sp>
+        <p:nvSpPr>
+          <p:cNvPr id="14" name="TextBox 13">
+            <a:extLst>
+              <a:ext uri="{FF2B5EF4-FFF2-40B4-BE49-F238E27FC236}">
+                <a16:creationId xmlns:a16="http://schemas.microsoft.com/office/drawing/2014/main" id="{69D99FC2-BC77-3012-C887-E7958BE17420}"/>
+              </a:ext>
+            </a:extLst>
+          </p:cNvPr>
+          <p:cNvSpPr txBox="1"/>
+          <p:nvPr/>
+        </p:nvSpPr>
+        <p:spPr>
+          <a:xfrm>
+            <a:off x="2685381" y="2140892"/>
+            <a:ext cx="1172244" cy="461665"/>
+          </a:xfrm>
+          <a:prstGeom prst="rect">
+            <a:avLst/>
+          </a:prstGeom>
+          <a:noFill/>
+        </p:spPr>
+        <p:txBody>
+          <a:bodyPr wrap="none" rtlCol="0">
+            <a:spAutoFit/>
+          </a:bodyPr>
+          <a:lstStyle/>
+          <a:p>
+            <a:r>
+              <a:rPr lang="en-US" sz="2400" dirty="0">
+                <a:solidFill>
+                  <a:srgbClr val="37ABC8"/>
+                </a:solidFill>
+              </a:rPr>
+              <a:t>radius 1</a:t>
+            </a:r>
+          </a:p>
+        </p:txBody>
+      </p:sp>
+      <p:sp>
+        <p:nvSpPr>
+          <p:cNvPr id="15" name="Freeform: Shape 14">
+            <a:extLst>
+              <a:ext uri="{FF2B5EF4-FFF2-40B4-BE49-F238E27FC236}">
+                <a16:creationId xmlns:a16="http://schemas.microsoft.com/office/drawing/2014/main" id="{889887A0-1E87-7DAD-87FD-7DB0FB97986F}"/>
+              </a:ext>
+            </a:extLst>
+          </p:cNvPr>
+          <p:cNvSpPr/>
+          <p:nvPr/>
+        </p:nvSpPr>
+        <p:spPr>
+          <a:xfrm flipH="1">
+            <a:off x="3857624" y="2438399"/>
+            <a:ext cx="1038225" cy="614361"/>
+          </a:xfrm>
+          <a:custGeom>
+            <a:avLst/>
+            <a:gdLst>
+              <a:gd name="connsiteX0" fmla="*/ 1371600 w 1371600"/>
+              <a:gd name="connsiteY0" fmla="*/ 0 h 790575"/>
+              <a:gd name="connsiteX1" fmla="*/ 628650 w 1371600"/>
+              <a:gd name="connsiteY1" fmla="*/ 228600 h 790575"/>
+              <a:gd name="connsiteX2" fmla="*/ 0 w 1371600"/>
+              <a:gd name="connsiteY2" fmla="*/ 790575 h 790575"/>
+            </a:gdLst>
+            <a:ahLst/>
+            <a:cxnLst>
+              <a:cxn ang="0">
+                <a:pos x="connsiteX0" y="connsiteY0"/>
+              </a:cxn>
+              <a:cxn ang="0">
+                <a:pos x="connsiteX1" y="connsiteY1"/>
+              </a:cxn>
+              <a:cxn ang="0">
+                <a:pos x="connsiteX2" y="connsiteY2"/>
+              </a:cxn>
+            </a:cxnLst>
+            <a:rect l="l" t="t" r="r" b="b"/>
+            <a:pathLst>
+              <a:path w="1371600" h="790575">
+                <a:moveTo>
+                  <a:pt x="1371600" y="0"/>
+                </a:moveTo>
+                <a:cubicBezTo>
+                  <a:pt x="1114425" y="48419"/>
+                  <a:pt x="857250" y="96838"/>
+                  <a:pt x="628650" y="228600"/>
+                </a:cubicBezTo>
+                <a:cubicBezTo>
+                  <a:pt x="400050" y="360363"/>
+                  <a:pt x="200025" y="575469"/>
+                  <a:pt x="0" y="790575"/>
+                </a:cubicBezTo>
+              </a:path>
+            </a:pathLst>
+          </a:custGeom>
+          <a:noFill/>
+          <a:ln w="57150">
+            <a:solidFill>
+              <a:srgbClr val="37ABC8"/>
+            </a:solidFill>
+            <a:headEnd type="none" w="med" len="med"/>
+            <a:tailEnd type="arrow" w="med" len="med"/>
+          </a:ln>
+        </p:spPr>
+        <p:style>
+          <a:lnRef idx="2">
+            <a:schemeClr val="accent1">
+              <a:shade val="15000"/>
+            </a:schemeClr>
+          </a:lnRef>
+          <a:fillRef idx="1">
+            <a:schemeClr val="accent1"/>
+          </a:fillRef>
+          <a:effectRef idx="0">
+            <a:schemeClr val="accent1"/>
+          </a:effectRef>
+          <a:fontRef idx="minor">
+            <a:schemeClr val="lt1"/>
+          </a:fontRef>
+        </p:style>
+        <p:txBody>
+          <a:bodyPr rtlCol="0" anchor="ctr"/>
+          <a:lstStyle/>
+          <a:p>
+            <a:pPr algn="ctr"/>
+            <a:endParaRPr lang="en-US"/>
+          </a:p>
+        </p:txBody>
+      </p:sp>
     </p:spTree>
     <p:extLst>
       <p:ext uri="{BB962C8B-B14F-4D97-AF65-F5344CB8AC3E}">
@@ -10212,6 +10611,18 @@
   <p:clrMapOvr>
     <a:masterClrMapping/>
   </p:clrMapOvr>
+  <mc:AlternateContent xmlns:mc="http://schemas.openxmlformats.org/markup-compatibility/2006">
+    <mc:Choice xmlns:p14="http://schemas.microsoft.com/office/powerpoint/2010/main" Requires="p14">
+      <p:transition spd="med" p14:dur="700">
+        <p:fade/>
+      </p:transition>
+    </mc:Choice>
+    <mc:Fallback>
+      <p:transition spd="med">
+        <p:fade/>
+      </p:transition>
+    </mc:Fallback>
+  </mc:AlternateContent>
 </p:sld>
 </file>
 
@@ -10396,6 +10807,137 @@
           <a:ln w="57150">
             <a:solidFill>
               <a:srgbClr val="5AA02C"/>
+            </a:solidFill>
+            <a:headEnd type="none" w="med" len="med"/>
+            <a:tailEnd type="arrow" w="med" len="med"/>
+          </a:ln>
+        </p:spPr>
+        <p:style>
+          <a:lnRef idx="2">
+            <a:schemeClr val="accent1">
+              <a:shade val="15000"/>
+            </a:schemeClr>
+          </a:lnRef>
+          <a:fillRef idx="1">
+            <a:schemeClr val="accent1"/>
+          </a:fillRef>
+          <a:effectRef idx="0">
+            <a:schemeClr val="accent1"/>
+          </a:effectRef>
+          <a:fontRef idx="minor">
+            <a:schemeClr val="lt1"/>
+          </a:fontRef>
+        </p:style>
+        <p:txBody>
+          <a:bodyPr rtlCol="0" anchor="ctr"/>
+          <a:lstStyle/>
+          <a:p>
+            <a:pPr algn="ctr"/>
+            <a:endParaRPr lang="en-US"/>
+          </a:p>
+        </p:txBody>
+      </p:sp>
+      <p:sp>
+        <p:nvSpPr>
+          <p:cNvPr id="14" name="TextBox 13">
+            <a:extLst>
+              <a:ext uri="{FF2B5EF4-FFF2-40B4-BE49-F238E27FC236}">
+                <a16:creationId xmlns:a16="http://schemas.microsoft.com/office/drawing/2014/main" id="{557D37B5-2136-2BC0-9C98-4A086A783B75}"/>
+              </a:ext>
+            </a:extLst>
+          </p:cNvPr>
+          <p:cNvSpPr txBox="1"/>
+          <p:nvPr/>
+        </p:nvSpPr>
+        <p:spPr>
+          <a:xfrm>
+            <a:off x="2685381" y="2140892"/>
+            <a:ext cx="1172244" cy="461665"/>
+          </a:xfrm>
+          <a:prstGeom prst="rect">
+            <a:avLst/>
+          </a:prstGeom>
+          <a:noFill/>
+        </p:spPr>
+        <p:txBody>
+          <a:bodyPr wrap="none" rtlCol="0">
+            <a:spAutoFit/>
+          </a:bodyPr>
+          <a:lstStyle/>
+          <a:p>
+            <a:r>
+              <a:rPr lang="en-US" sz="2400" dirty="0">
+                <a:solidFill>
+                  <a:srgbClr val="37ABC8"/>
+                </a:solidFill>
+              </a:rPr>
+              <a:t>radius 1</a:t>
+            </a:r>
+          </a:p>
+        </p:txBody>
+      </p:sp>
+      <p:sp>
+        <p:nvSpPr>
+          <p:cNvPr id="15" name="Freeform: Shape 14">
+            <a:extLst>
+              <a:ext uri="{FF2B5EF4-FFF2-40B4-BE49-F238E27FC236}">
+                <a16:creationId xmlns:a16="http://schemas.microsoft.com/office/drawing/2014/main" id="{DC334834-0E09-A952-6B66-D735DB1C5CFF}"/>
+              </a:ext>
+            </a:extLst>
+          </p:cNvPr>
+          <p:cNvSpPr/>
+          <p:nvPr/>
+        </p:nvSpPr>
+        <p:spPr>
+          <a:xfrm flipH="1">
+            <a:off x="3857624" y="2438399"/>
+            <a:ext cx="1038225" cy="614361"/>
+          </a:xfrm>
+          <a:custGeom>
+            <a:avLst/>
+            <a:gdLst>
+              <a:gd name="connsiteX0" fmla="*/ 1371600 w 1371600"/>
+              <a:gd name="connsiteY0" fmla="*/ 0 h 790575"/>
+              <a:gd name="connsiteX1" fmla="*/ 628650 w 1371600"/>
+              <a:gd name="connsiteY1" fmla="*/ 228600 h 790575"/>
+              <a:gd name="connsiteX2" fmla="*/ 0 w 1371600"/>
+              <a:gd name="connsiteY2" fmla="*/ 790575 h 790575"/>
+            </a:gdLst>
+            <a:ahLst/>
+            <a:cxnLst>
+              <a:cxn ang="0">
+                <a:pos x="connsiteX0" y="connsiteY0"/>
+              </a:cxn>
+              <a:cxn ang="0">
+                <a:pos x="connsiteX1" y="connsiteY1"/>
+              </a:cxn>
+              <a:cxn ang="0">
+                <a:pos x="connsiteX2" y="connsiteY2"/>
+              </a:cxn>
+            </a:cxnLst>
+            <a:rect l="l" t="t" r="r" b="b"/>
+            <a:pathLst>
+              <a:path w="1371600" h="790575">
+                <a:moveTo>
+                  <a:pt x="1371600" y="0"/>
+                </a:moveTo>
+                <a:cubicBezTo>
+                  <a:pt x="1114425" y="48419"/>
+                  <a:pt x="857250" y="96838"/>
+                  <a:pt x="628650" y="228600"/>
+                </a:cubicBezTo>
+                <a:cubicBezTo>
+                  <a:pt x="400050" y="360363"/>
+                  <a:pt x="200025" y="575469"/>
+                  <a:pt x="0" y="790575"/>
+                </a:cubicBezTo>
+              </a:path>
+            </a:pathLst>
+          </a:custGeom>
+          <a:noFill/>
+          <a:ln w="57150">
+            <a:solidFill>
+              <a:srgbClr val="37ABC8"/>
             </a:solidFill>
             <a:headEnd type="none" w="med" len="med"/>
             <a:tailEnd type="arrow" w="med" len="med"/>
@@ -10789,6 +11331,137 @@
           <a:ln w="57150">
             <a:solidFill>
               <a:srgbClr val="5AA02C"/>
+            </a:solidFill>
+            <a:headEnd type="none" w="med" len="med"/>
+            <a:tailEnd type="arrow" w="med" len="med"/>
+          </a:ln>
+        </p:spPr>
+        <p:style>
+          <a:lnRef idx="2">
+            <a:schemeClr val="accent1">
+              <a:shade val="15000"/>
+            </a:schemeClr>
+          </a:lnRef>
+          <a:fillRef idx="1">
+            <a:schemeClr val="accent1"/>
+          </a:fillRef>
+          <a:effectRef idx="0">
+            <a:schemeClr val="accent1"/>
+          </a:effectRef>
+          <a:fontRef idx="minor">
+            <a:schemeClr val="lt1"/>
+          </a:fontRef>
+        </p:style>
+        <p:txBody>
+          <a:bodyPr rtlCol="0" anchor="ctr"/>
+          <a:lstStyle/>
+          <a:p>
+            <a:pPr algn="ctr"/>
+            <a:endParaRPr lang="en-US"/>
+          </a:p>
+        </p:txBody>
+      </p:sp>
+      <p:sp>
+        <p:nvSpPr>
+          <p:cNvPr id="12" name="TextBox 11">
+            <a:extLst>
+              <a:ext uri="{FF2B5EF4-FFF2-40B4-BE49-F238E27FC236}">
+                <a16:creationId xmlns:a16="http://schemas.microsoft.com/office/drawing/2014/main" id="{6D0B8AF9-962A-078B-BBE1-4750CC8F8CB1}"/>
+              </a:ext>
+            </a:extLst>
+          </p:cNvPr>
+          <p:cNvSpPr txBox="1"/>
+          <p:nvPr/>
+        </p:nvSpPr>
+        <p:spPr>
+          <a:xfrm>
+            <a:off x="2685381" y="2140892"/>
+            <a:ext cx="1172244" cy="461665"/>
+          </a:xfrm>
+          <a:prstGeom prst="rect">
+            <a:avLst/>
+          </a:prstGeom>
+          <a:noFill/>
+        </p:spPr>
+        <p:txBody>
+          <a:bodyPr wrap="none" rtlCol="0">
+            <a:spAutoFit/>
+          </a:bodyPr>
+          <a:lstStyle/>
+          <a:p>
+            <a:r>
+              <a:rPr lang="en-US" sz="2400" dirty="0">
+                <a:solidFill>
+                  <a:srgbClr val="37ABC8"/>
+                </a:solidFill>
+              </a:rPr>
+              <a:t>radius 1</a:t>
+            </a:r>
+          </a:p>
+        </p:txBody>
+      </p:sp>
+      <p:sp>
+        <p:nvSpPr>
+          <p:cNvPr id="13" name="Freeform: Shape 12">
+            <a:extLst>
+              <a:ext uri="{FF2B5EF4-FFF2-40B4-BE49-F238E27FC236}">
+                <a16:creationId xmlns:a16="http://schemas.microsoft.com/office/drawing/2014/main" id="{72CFC16E-862C-69D7-1020-D3A066FBA224}"/>
+              </a:ext>
+            </a:extLst>
+          </p:cNvPr>
+          <p:cNvSpPr/>
+          <p:nvPr/>
+        </p:nvSpPr>
+        <p:spPr>
+          <a:xfrm flipH="1">
+            <a:off x="3857624" y="2438399"/>
+            <a:ext cx="1038225" cy="614361"/>
+          </a:xfrm>
+          <a:custGeom>
+            <a:avLst/>
+            <a:gdLst>
+              <a:gd name="connsiteX0" fmla="*/ 1371600 w 1371600"/>
+              <a:gd name="connsiteY0" fmla="*/ 0 h 790575"/>
+              <a:gd name="connsiteX1" fmla="*/ 628650 w 1371600"/>
+              <a:gd name="connsiteY1" fmla="*/ 228600 h 790575"/>
+              <a:gd name="connsiteX2" fmla="*/ 0 w 1371600"/>
+              <a:gd name="connsiteY2" fmla="*/ 790575 h 790575"/>
+            </a:gdLst>
+            <a:ahLst/>
+            <a:cxnLst>
+              <a:cxn ang="0">
+                <a:pos x="connsiteX0" y="connsiteY0"/>
+              </a:cxn>
+              <a:cxn ang="0">
+                <a:pos x="connsiteX1" y="connsiteY1"/>
+              </a:cxn>
+              <a:cxn ang="0">
+                <a:pos x="connsiteX2" y="connsiteY2"/>
+              </a:cxn>
+            </a:cxnLst>
+            <a:rect l="l" t="t" r="r" b="b"/>
+            <a:pathLst>
+              <a:path w="1371600" h="790575">
+                <a:moveTo>
+                  <a:pt x="1371600" y="0"/>
+                </a:moveTo>
+                <a:cubicBezTo>
+                  <a:pt x="1114425" y="48419"/>
+                  <a:pt x="857250" y="96838"/>
+                  <a:pt x="628650" y="228600"/>
+                </a:cubicBezTo>
+                <a:cubicBezTo>
+                  <a:pt x="400050" y="360363"/>
+                  <a:pt x="200025" y="575469"/>
+                  <a:pt x="0" y="790575"/>
+                </a:cubicBezTo>
+              </a:path>
+            </a:pathLst>
+          </a:custGeom>
+          <a:noFill/>
+          <a:ln w="57150">
+            <a:solidFill>
+              <a:srgbClr val="37ABC8"/>
             </a:solidFill>
             <a:headEnd type="none" w="med" len="med"/>
             <a:tailEnd type="arrow" w="med" len="med"/>

</xml_diff>

<commit_message>
8 balls paradox: central ball radius
</commit_message>
<xml_diff>
--- a/slides_x_mas_2023.pptx
+++ b/slides_x_mas_2023.pptx
@@ -10968,6 +10968,237 @@
           </a:p>
         </p:txBody>
       </p:sp>
+      <mc:AlternateContent xmlns:mc="http://schemas.openxmlformats.org/markup-compatibility/2006">
+        <mc:Choice xmlns:a14="http://schemas.microsoft.com/office/drawing/2010/main" Requires="a14">
+          <p:sp>
+            <p:nvSpPr>
+              <p:cNvPr id="14" name="TextBox 13">
+                <a:extLst>
+                  <a:ext uri="{FF2B5EF4-FFF2-40B4-BE49-F238E27FC236}">
+                    <a16:creationId xmlns:a16="http://schemas.microsoft.com/office/drawing/2014/main" id="{263FC9CD-2554-FEC7-5944-4153F0D4A52E}"/>
+                  </a:ext>
+                </a:extLst>
+              </p:cNvPr>
+              <p:cNvSpPr txBox="1"/>
+              <p:nvPr/>
+            </p:nvSpPr>
+            <p:spPr>
+              <a:xfrm>
+                <a:off x="8534400" y="4512320"/>
+                <a:ext cx="1974002" cy="496483"/>
+              </a:xfrm>
+              <a:prstGeom prst="rect">
+                <a:avLst/>
+              </a:prstGeom>
+              <a:noFill/>
+            </p:spPr>
+            <p:txBody>
+              <a:bodyPr wrap="none" rtlCol="0">
+                <a:spAutoFit/>
+              </a:bodyPr>
+              <a:lstStyle/>
+              <a:p>
+                <a:r>
+                  <a:rPr lang="en-US" sz="2400" b="1" dirty="0">
+                    <a:solidFill>
+                      <a:srgbClr val="C00000"/>
+                    </a:solidFill>
+                  </a:rPr>
+                  <a:t>radius </a:t>
+                </a:r>
+                <a14:m>
+                  <m:oMath xmlns:m="http://schemas.openxmlformats.org/officeDocument/2006/math">
+                    <m:rad>
+                      <m:radPr>
+                        <m:degHide m:val="on"/>
+                        <m:ctrlPr>
+                          <a:rPr lang="en-US" sz="2400" b="1" i="1" smtClean="0">
+                            <a:solidFill>
+                              <a:srgbClr val="C00000"/>
+                            </a:solidFill>
+                            <a:latin typeface="Cambria Math" panose="02040503050406030204" pitchFamily="18" charset="0"/>
+                          </a:rPr>
+                        </m:ctrlPr>
+                      </m:radPr>
+                      <m:deg/>
+                      <m:e>
+                        <m:r>
+                          <a:rPr lang="en-US" sz="2400" b="1" i="1" smtClean="0">
+                            <a:solidFill>
+                              <a:srgbClr val="C00000"/>
+                            </a:solidFill>
+                            <a:latin typeface="Cambria Math" panose="02040503050406030204" pitchFamily="18" charset="0"/>
+                          </a:rPr>
+                          <m:t>𝟑</m:t>
+                        </m:r>
+                      </m:e>
+                    </m:rad>
+                    <m:r>
+                      <a:rPr lang="en-US" sz="2400" b="1" i="1" smtClean="0">
+                        <a:solidFill>
+                          <a:srgbClr val="C00000"/>
+                        </a:solidFill>
+                        <a:latin typeface="Cambria Math" panose="02040503050406030204" pitchFamily="18" charset="0"/>
+                      </a:rPr>
+                      <m:t>−</m:t>
+                    </m:r>
+                    <m:r>
+                      <a:rPr lang="en-US" sz="2400" b="1" i="1" smtClean="0">
+                        <a:solidFill>
+                          <a:srgbClr val="C00000"/>
+                        </a:solidFill>
+                        <a:latin typeface="Cambria Math" panose="02040503050406030204" pitchFamily="18" charset="0"/>
+                      </a:rPr>
+                      <m:t>𝟏</m:t>
+                    </m:r>
+                  </m:oMath>
+                </a14:m>
+                <a:endParaRPr lang="en-US" sz="2400" b="1" dirty="0">
+                  <a:solidFill>
+                    <a:srgbClr val="C00000"/>
+                  </a:solidFill>
+                </a:endParaRPr>
+              </a:p>
+            </p:txBody>
+          </p:sp>
+        </mc:Choice>
+        <mc:Fallback>
+          <p:sp>
+            <p:nvSpPr>
+              <p:cNvPr id="14" name="TextBox 13">
+                <a:extLst>
+                  <a:ext uri="{FF2B5EF4-FFF2-40B4-BE49-F238E27FC236}">
+                    <a16:creationId xmlns:a16="http://schemas.microsoft.com/office/drawing/2014/main" id="{263FC9CD-2554-FEC7-5944-4153F0D4A52E}"/>
+                  </a:ext>
+                </a:extLst>
+              </p:cNvPr>
+              <p:cNvSpPr txBox="1">
+                <a:spLocks noRot="1" noChangeAspect="1" noMove="1" noResize="1" noEditPoints="1" noAdjustHandles="1" noChangeArrowheads="1" noChangeShapeType="1" noTextEdit="1"/>
+              </p:cNvSpPr>
+              <p:nvPr/>
+            </p:nvSpPr>
+            <p:spPr>
+              <a:xfrm>
+                <a:off x="8534400" y="4512320"/>
+                <a:ext cx="1974002" cy="496483"/>
+              </a:xfrm>
+              <a:prstGeom prst="rect">
+                <a:avLst/>
+              </a:prstGeom>
+              <a:blipFill>
+                <a:blip r:embed="rId3"/>
+                <a:stretch>
+                  <a:fillRect l="-4630" t="-2439" b="-26829"/>
+                </a:stretch>
+              </a:blipFill>
+            </p:spPr>
+            <p:txBody>
+              <a:bodyPr/>
+              <a:lstStyle/>
+              <a:p>
+                <a:r>
+                  <a:rPr lang="en-US">
+                    <a:noFill/>
+                  </a:rPr>
+                  <a:t> </a:t>
+                </a:r>
+              </a:p>
+            </p:txBody>
+          </p:sp>
+        </mc:Fallback>
+      </mc:AlternateContent>
+      <p:sp>
+        <p:nvSpPr>
+          <p:cNvPr id="15" name="Freeform: Shape 14">
+            <a:extLst>
+              <a:ext uri="{FF2B5EF4-FFF2-40B4-BE49-F238E27FC236}">
+                <a16:creationId xmlns:a16="http://schemas.microsoft.com/office/drawing/2014/main" id="{8723485F-552D-5C61-55A9-03566779893D}"/>
+              </a:ext>
+            </a:extLst>
+          </p:cNvPr>
+          <p:cNvSpPr/>
+          <p:nvPr/>
+        </p:nvSpPr>
+        <p:spPr>
+          <a:xfrm flipV="1">
+            <a:off x="6415756" y="4281488"/>
+            <a:ext cx="2118644" cy="461664"/>
+          </a:xfrm>
+          <a:custGeom>
+            <a:avLst/>
+            <a:gdLst>
+              <a:gd name="connsiteX0" fmla="*/ 1371600 w 1371600"/>
+              <a:gd name="connsiteY0" fmla="*/ 0 h 790575"/>
+              <a:gd name="connsiteX1" fmla="*/ 628650 w 1371600"/>
+              <a:gd name="connsiteY1" fmla="*/ 228600 h 790575"/>
+              <a:gd name="connsiteX2" fmla="*/ 0 w 1371600"/>
+              <a:gd name="connsiteY2" fmla="*/ 790575 h 790575"/>
+            </a:gdLst>
+            <a:ahLst/>
+            <a:cxnLst>
+              <a:cxn ang="0">
+                <a:pos x="connsiteX0" y="connsiteY0"/>
+              </a:cxn>
+              <a:cxn ang="0">
+                <a:pos x="connsiteX1" y="connsiteY1"/>
+              </a:cxn>
+              <a:cxn ang="0">
+                <a:pos x="connsiteX2" y="connsiteY2"/>
+              </a:cxn>
+            </a:cxnLst>
+            <a:rect l="l" t="t" r="r" b="b"/>
+            <a:pathLst>
+              <a:path w="1371600" h="790575">
+                <a:moveTo>
+                  <a:pt x="1371600" y="0"/>
+                </a:moveTo>
+                <a:cubicBezTo>
+                  <a:pt x="1114425" y="48419"/>
+                  <a:pt x="857250" y="96838"/>
+                  <a:pt x="628650" y="228600"/>
+                </a:cubicBezTo>
+                <a:cubicBezTo>
+                  <a:pt x="400050" y="360363"/>
+                  <a:pt x="200025" y="575469"/>
+                  <a:pt x="0" y="790575"/>
+                </a:cubicBezTo>
+              </a:path>
+            </a:pathLst>
+          </a:custGeom>
+          <a:noFill/>
+          <a:ln w="57150">
+            <a:solidFill>
+              <a:srgbClr val="C00000"/>
+            </a:solidFill>
+            <a:headEnd type="none" w="med" len="med"/>
+            <a:tailEnd type="arrow" w="med" len="med"/>
+          </a:ln>
+        </p:spPr>
+        <p:style>
+          <a:lnRef idx="2">
+            <a:schemeClr val="accent1">
+              <a:shade val="15000"/>
+            </a:schemeClr>
+          </a:lnRef>
+          <a:fillRef idx="1">
+            <a:schemeClr val="accent1"/>
+          </a:fillRef>
+          <a:effectRef idx="0">
+            <a:schemeClr val="accent1"/>
+          </a:effectRef>
+          <a:fontRef idx="minor">
+            <a:schemeClr val="lt1"/>
+          </a:fontRef>
+        </p:style>
+        <p:txBody>
+          <a:bodyPr rtlCol="0" anchor="ctr"/>
+          <a:lstStyle/>
+          <a:p>
+            <a:pPr algn="ctr"/>
+            <a:endParaRPr lang="en-US"/>
+          </a:p>
+        </p:txBody>
+      </p:sp>
     </p:spTree>
     <p:extLst>
       <p:ext uri="{BB962C8B-B14F-4D97-AF65-F5344CB8AC3E}">
@@ -10978,6 +11209,128 @@
   <p:clrMapOvr>
     <a:masterClrMapping/>
   </p:clrMapOvr>
+  <p:timing>
+    <p:tnLst>
+      <p:par>
+        <p:cTn id="1" dur="indefinite" restart="never" nodeType="tmRoot">
+          <p:childTnLst>
+            <p:seq concurrent="1" nextAc="seek">
+              <p:cTn id="2" dur="indefinite" nodeType="mainSeq">
+                <p:childTnLst>
+                  <p:par>
+                    <p:cTn id="3" fill="hold">
+                      <p:stCondLst>
+                        <p:cond delay="indefinite"/>
+                      </p:stCondLst>
+                      <p:childTnLst>
+                        <p:par>
+                          <p:cTn id="4" fill="hold">
+                            <p:stCondLst>
+                              <p:cond delay="0"/>
+                            </p:stCondLst>
+                            <p:childTnLst>
+                              <p:par>
+                                <p:cTn id="5" presetID="10" presetClass="entr" presetSubtype="0" fill="hold" grpId="0" nodeType="clickEffect">
+                                  <p:stCondLst>
+                                    <p:cond delay="0"/>
+                                  </p:stCondLst>
+                                  <p:childTnLst>
+                                    <p:set>
+                                      <p:cBhvr>
+                                        <p:cTn id="6" dur="1" fill="hold">
+                                          <p:stCondLst>
+                                            <p:cond delay="0"/>
+                                          </p:stCondLst>
+                                        </p:cTn>
+                                        <p:tgtEl>
+                                          <p:spTgt spid="15"/>
+                                        </p:tgtEl>
+                                        <p:attrNameLst>
+                                          <p:attrName>style.visibility</p:attrName>
+                                        </p:attrNameLst>
+                                      </p:cBhvr>
+                                      <p:to>
+                                        <p:strVal val="visible"/>
+                                      </p:to>
+                                    </p:set>
+                                    <p:animEffect transition="in" filter="fade">
+                                      <p:cBhvr>
+                                        <p:cTn id="7" dur="500"/>
+                                        <p:tgtEl>
+                                          <p:spTgt spid="15"/>
+                                        </p:tgtEl>
+                                      </p:cBhvr>
+                                    </p:animEffect>
+                                  </p:childTnLst>
+                                </p:cTn>
+                              </p:par>
+                              <p:par>
+                                <p:cTn id="8" presetID="10" presetClass="entr" presetSubtype="0" fill="hold" grpId="0" nodeType="withEffect">
+                                  <p:stCondLst>
+                                    <p:cond delay="0"/>
+                                  </p:stCondLst>
+                                  <p:childTnLst>
+                                    <p:set>
+                                      <p:cBhvr>
+                                        <p:cTn id="9" dur="1" fill="hold">
+                                          <p:stCondLst>
+                                            <p:cond delay="0"/>
+                                          </p:stCondLst>
+                                        </p:cTn>
+                                        <p:tgtEl>
+                                          <p:spTgt spid="14"/>
+                                        </p:tgtEl>
+                                        <p:attrNameLst>
+                                          <p:attrName>style.visibility</p:attrName>
+                                        </p:attrNameLst>
+                                      </p:cBhvr>
+                                      <p:to>
+                                        <p:strVal val="visible"/>
+                                      </p:to>
+                                    </p:set>
+                                    <p:animEffect transition="in" filter="fade">
+                                      <p:cBhvr>
+                                        <p:cTn id="10" dur="500"/>
+                                        <p:tgtEl>
+                                          <p:spTgt spid="14"/>
+                                        </p:tgtEl>
+                                      </p:cBhvr>
+                                    </p:animEffect>
+                                  </p:childTnLst>
+                                </p:cTn>
+                              </p:par>
+                            </p:childTnLst>
+                          </p:cTn>
+                        </p:par>
+                      </p:childTnLst>
+                    </p:cTn>
+                  </p:par>
+                </p:childTnLst>
+              </p:cTn>
+              <p:prevCondLst>
+                <p:cond evt="onPrev" delay="0">
+                  <p:tgtEl>
+                    <p:sldTgt/>
+                  </p:tgtEl>
+                </p:cond>
+              </p:prevCondLst>
+              <p:nextCondLst>
+                <p:cond evt="onNext" delay="0">
+                  <p:tgtEl>
+                    <p:sldTgt/>
+                  </p:tgtEl>
+                </p:cond>
+              </p:nextCondLst>
+            </p:seq>
+          </p:childTnLst>
+        </p:cTn>
+      </p:par>
+    </p:tnLst>
+    <p:bldLst>
+      <p:bldP spid="14" grpId="0"/>
+      <p:bldP spid="15" grpId="0" animBg="1"/>
+    </p:bldLst>
+  </p:timing>
 </p:sld>
 </file>
 
@@ -11463,6 +11816,238 @@
             <a:solidFill>
               <a:srgbClr val="37ABC8"/>
             </a:solidFill>
+            <a:headEnd type="none" w="med" len="med"/>
+            <a:tailEnd type="arrow" w="med" len="med"/>
+          </a:ln>
+        </p:spPr>
+        <p:style>
+          <a:lnRef idx="2">
+            <a:schemeClr val="accent1">
+              <a:shade val="15000"/>
+            </a:schemeClr>
+          </a:lnRef>
+          <a:fillRef idx="1">
+            <a:schemeClr val="accent1"/>
+          </a:fillRef>
+          <a:effectRef idx="0">
+            <a:schemeClr val="accent1"/>
+          </a:effectRef>
+          <a:fontRef idx="minor">
+            <a:schemeClr val="lt1"/>
+          </a:fontRef>
+        </p:style>
+        <p:txBody>
+          <a:bodyPr rtlCol="0" anchor="ctr"/>
+          <a:lstStyle/>
+          <a:p>
+            <a:pPr algn="ctr"/>
+            <a:endParaRPr lang="en-US"/>
+          </a:p>
+        </p:txBody>
+      </p:sp>
+      <mc:AlternateContent xmlns:mc="http://schemas.openxmlformats.org/markup-compatibility/2006">
+        <mc:Choice xmlns:a14="http://schemas.microsoft.com/office/drawing/2010/main" Requires="a14">
+          <p:sp>
+            <p:nvSpPr>
+              <p:cNvPr id="16" name="TextBox 15">
+                <a:extLst>
+                  <a:ext uri="{FF2B5EF4-FFF2-40B4-BE49-F238E27FC236}">
+                    <a16:creationId xmlns:a16="http://schemas.microsoft.com/office/drawing/2014/main" id="{40870D38-1437-F2A3-8D43-463690BDC0B3}"/>
+                  </a:ext>
+                </a:extLst>
+              </p:cNvPr>
+              <p:cNvSpPr txBox="1"/>
+              <p:nvPr/>
+            </p:nvSpPr>
+            <p:spPr>
+              <a:xfrm>
+                <a:off x="8534400" y="4512320"/>
+                <a:ext cx="1974002" cy="496483"/>
+              </a:xfrm>
+              <a:prstGeom prst="rect">
+                <a:avLst/>
+              </a:prstGeom>
+              <a:noFill/>
+            </p:spPr>
+            <p:txBody>
+              <a:bodyPr wrap="none" rtlCol="0">
+                <a:spAutoFit/>
+              </a:bodyPr>
+              <a:lstStyle/>
+              <a:p>
+                <a:r>
+                  <a:rPr lang="en-US" sz="2400" b="1" dirty="0">
+                    <a:solidFill>
+                      <a:srgbClr val="C00000"/>
+                    </a:solidFill>
+                  </a:rPr>
+                  <a:t>radius </a:t>
+                </a:r>
+                <a14:m>
+                  <m:oMath xmlns:m="http://schemas.openxmlformats.org/officeDocument/2006/math">
+                    <m:rad>
+                      <m:radPr>
+                        <m:degHide m:val="on"/>
+                        <m:ctrlPr>
+                          <a:rPr lang="en-US" sz="2400" b="1" i="1" smtClean="0">
+                            <a:solidFill>
+                              <a:srgbClr val="C00000"/>
+                            </a:solidFill>
+                            <a:latin typeface="Cambria Math" panose="02040503050406030204" pitchFamily="18" charset="0"/>
+                          </a:rPr>
+                        </m:ctrlPr>
+                      </m:radPr>
+                      <m:deg/>
+                      <m:e>
+                        <m:r>
+                          <a:rPr lang="en-US" sz="2400" b="1" i="1" smtClean="0">
+                            <a:solidFill>
+                              <a:srgbClr val="C00000"/>
+                            </a:solidFill>
+                            <a:latin typeface="Cambria Math" panose="02040503050406030204" pitchFamily="18" charset="0"/>
+                          </a:rPr>
+                          <m:t>𝟑</m:t>
+                        </m:r>
+                      </m:e>
+                    </m:rad>
+                    <m:r>
+                      <a:rPr lang="en-US" sz="2400" b="1" i="1" smtClean="0">
+                        <a:solidFill>
+                          <a:srgbClr val="C00000"/>
+                        </a:solidFill>
+                        <a:latin typeface="Cambria Math" panose="02040503050406030204" pitchFamily="18" charset="0"/>
+                      </a:rPr>
+                      <m:t>−</m:t>
+                    </m:r>
+                    <m:r>
+                      <a:rPr lang="en-US" sz="2400" b="1" i="1" smtClean="0">
+                        <a:solidFill>
+                          <a:srgbClr val="C00000"/>
+                        </a:solidFill>
+                        <a:latin typeface="Cambria Math" panose="02040503050406030204" pitchFamily="18" charset="0"/>
+                      </a:rPr>
+                      <m:t>𝟏</m:t>
+                    </m:r>
+                  </m:oMath>
+                </a14:m>
+                <a:endParaRPr lang="en-US" sz="2400" b="1" dirty="0">
+                  <a:solidFill>
+                    <a:srgbClr val="C00000"/>
+                  </a:solidFill>
+                </a:endParaRPr>
+              </a:p>
+            </p:txBody>
+          </p:sp>
+        </mc:Choice>
+        <mc:Fallback>
+          <p:sp>
+            <p:nvSpPr>
+              <p:cNvPr id="16" name="TextBox 15">
+                <a:extLst>
+                  <a:ext uri="{FF2B5EF4-FFF2-40B4-BE49-F238E27FC236}">
+                    <a16:creationId xmlns:a16="http://schemas.microsoft.com/office/drawing/2014/main" id="{40870D38-1437-F2A3-8D43-463690BDC0B3}"/>
+                  </a:ext>
+                </a:extLst>
+              </p:cNvPr>
+              <p:cNvSpPr txBox="1">
+                <a:spLocks noRot="1" noChangeAspect="1" noMove="1" noResize="1" noEditPoints="1" noAdjustHandles="1" noChangeArrowheads="1" noChangeShapeType="1" noTextEdit="1"/>
+              </p:cNvSpPr>
+              <p:nvPr/>
+            </p:nvSpPr>
+            <p:spPr>
+              <a:xfrm>
+                <a:off x="8534400" y="4512320"/>
+                <a:ext cx="1974002" cy="496483"/>
+              </a:xfrm>
+              <a:prstGeom prst="rect">
+                <a:avLst/>
+              </a:prstGeom>
+              <a:blipFill>
+                <a:blip r:embed="rId3"/>
+                <a:stretch>
+                  <a:fillRect l="-4630" t="-2439" b="-26829"/>
+                </a:stretch>
+              </a:blipFill>
+            </p:spPr>
+            <p:txBody>
+              <a:bodyPr/>
+              <a:lstStyle/>
+              <a:p>
+                <a:r>
+                  <a:rPr lang="en-US">
+                    <a:noFill/>
+                  </a:rPr>
+                  <a:t> </a:t>
+                </a:r>
+              </a:p>
+            </p:txBody>
+          </p:sp>
+        </mc:Fallback>
+      </mc:AlternateContent>
+      <p:sp>
+        <p:nvSpPr>
+          <p:cNvPr id="17" name="Freeform: Shape 16">
+            <a:extLst>
+              <a:ext uri="{FF2B5EF4-FFF2-40B4-BE49-F238E27FC236}">
+                <a16:creationId xmlns:a16="http://schemas.microsoft.com/office/drawing/2014/main" id="{2EBD2908-BB6A-C8BC-5EE5-3894D1B7105D}"/>
+              </a:ext>
+            </a:extLst>
+          </p:cNvPr>
+          <p:cNvSpPr/>
+          <p:nvPr/>
+        </p:nvSpPr>
+        <p:spPr>
+          <a:xfrm flipV="1">
+            <a:off x="6415756" y="4281488"/>
+            <a:ext cx="2118644" cy="461664"/>
+          </a:xfrm>
+          <a:custGeom>
+            <a:avLst/>
+            <a:gdLst>
+              <a:gd name="connsiteX0" fmla="*/ 1371600 w 1371600"/>
+              <a:gd name="connsiteY0" fmla="*/ 0 h 790575"/>
+              <a:gd name="connsiteX1" fmla="*/ 628650 w 1371600"/>
+              <a:gd name="connsiteY1" fmla="*/ 228600 h 790575"/>
+              <a:gd name="connsiteX2" fmla="*/ 0 w 1371600"/>
+              <a:gd name="connsiteY2" fmla="*/ 790575 h 790575"/>
+            </a:gdLst>
+            <a:ahLst/>
+            <a:cxnLst>
+              <a:cxn ang="0">
+                <a:pos x="connsiteX0" y="connsiteY0"/>
+              </a:cxn>
+              <a:cxn ang="0">
+                <a:pos x="connsiteX1" y="connsiteY1"/>
+              </a:cxn>
+              <a:cxn ang="0">
+                <a:pos x="connsiteX2" y="connsiteY2"/>
+              </a:cxn>
+            </a:cxnLst>
+            <a:rect l="l" t="t" r="r" b="b"/>
+            <a:pathLst>
+              <a:path w="1371600" h="790575">
+                <a:moveTo>
+                  <a:pt x="1371600" y="0"/>
+                </a:moveTo>
+                <a:cubicBezTo>
+                  <a:pt x="1114425" y="48419"/>
+                  <a:pt x="857250" y="96838"/>
+                  <a:pt x="628650" y="228600"/>
+                </a:cubicBezTo>
+                <a:cubicBezTo>
+                  <a:pt x="400050" y="360363"/>
+                  <a:pt x="200025" y="575469"/>
+                  <a:pt x="0" y="790575"/>
+                </a:cubicBezTo>
+              </a:path>
+            </a:pathLst>
+          </a:custGeom>
+          <a:noFill/>
+          <a:ln w="57150">
+            <a:solidFill>
+              <a:srgbClr val="C00000"/>
+            </a:solidFill>
+            <a:prstDash val="sysDot"/>
             <a:headEnd type="none" w="med" len="med"/>
             <a:tailEnd type="arrow" w="med" len="med"/>
           </a:ln>

</xml_diff>

<commit_message>
added wrong idea (2D)
</commit_message>
<xml_diff>
--- a/slides_x_mas_2023.pptx
+++ b/slides_x_mas_2023.pptx
@@ -26,6 +26,8 @@
     <p:sldId id="279" r:id="rId20"/>
     <p:sldId id="278" r:id="rId21"/>
     <p:sldId id="280" r:id="rId22"/>
+    <p:sldId id="281" r:id="rId23"/>
+    <p:sldId id="282" r:id="rId24"/>
   </p:sldIdLst>
   <p:sldSz cx="12192000" cy="6858000"/>
   <p:notesSz cx="6858000" cy="9144000"/>
@@ -161,6 +163,8 @@
             <p14:sldId id="279"/>
             <p14:sldId id="278"/>
             <p14:sldId id="280"/>
+            <p14:sldId id="281"/>
+            <p14:sldId id="282"/>
           </p14:sldIdLst>
         </p14:section>
         <p14:section name="Over-Interpretations" id="{9711BCF0-0EF2-435D-A2E2-B5014891C597}">
@@ -13771,6 +13775,2582 @@
 </p:sld>
 </file>
 
+<file path=ppt/slides/slide22.xml><?xml version="1.0" encoding="utf-8"?>
+<p:sld xmlns:a="http://schemas.openxmlformats.org/drawingml/2006/main" xmlns:r="http://schemas.openxmlformats.org/officeDocument/2006/relationships" xmlns:p="http://schemas.openxmlformats.org/presentationml/2006/main">
+  <p:cSld>
+    <p:spTree>
+      <p:nvGrpSpPr>
+        <p:cNvPr id="1" name=""/>
+        <p:cNvGrpSpPr/>
+        <p:nvPr/>
+      </p:nvGrpSpPr>
+      <p:grpSpPr>
+        <a:xfrm>
+          <a:off x="0" y="0"/>
+          <a:ext cx="0" cy="0"/>
+          <a:chOff x="0" y="0"/>
+          <a:chExt cx="0" cy="0"/>
+        </a:xfrm>
+      </p:grpSpPr>
+      <p:sp>
+        <p:nvSpPr>
+          <p:cNvPr id="2" name="Title 1">
+            <a:extLst>
+              <a:ext uri="{FF2B5EF4-FFF2-40B4-BE49-F238E27FC236}">
+                <a16:creationId xmlns:a16="http://schemas.microsoft.com/office/drawing/2014/main" id="{43AB76A5-DDCA-2DC9-EBD8-9B80787C8E1F}"/>
+              </a:ext>
+            </a:extLst>
+          </p:cNvPr>
+          <p:cNvSpPr>
+            <a:spLocks noGrp="1"/>
+          </p:cNvSpPr>
+          <p:nvPr>
+            <p:ph type="title"/>
+          </p:nvPr>
+        </p:nvSpPr>
+        <p:spPr/>
+        <p:txBody>
+          <a:bodyPr/>
+          <a:lstStyle/>
+          <a:p>
+            <a:r>
+              <a:rPr lang="en-US" dirty="0"/>
+              <a:t>4 circles paradox</a:t>
+            </a:r>
+          </a:p>
+        </p:txBody>
+      </p:sp>
+      <p:sp>
+        <p:nvSpPr>
+          <p:cNvPr id="11" name="Freeform: Shape 10">
+            <a:extLst>
+              <a:ext uri="{FF2B5EF4-FFF2-40B4-BE49-F238E27FC236}">
+                <a16:creationId xmlns:a16="http://schemas.microsoft.com/office/drawing/2014/main" id="{E033A28E-0C8A-AF71-25E9-358F61F4736E}"/>
+              </a:ext>
+            </a:extLst>
+          </p:cNvPr>
+          <p:cNvSpPr/>
+          <p:nvPr/>
+        </p:nvSpPr>
+        <p:spPr>
+          <a:xfrm>
+            <a:off x="6100644" y="1172419"/>
+            <a:ext cx="57134" cy="5673416"/>
+          </a:xfrm>
+          <a:custGeom>
+            <a:avLst/>
+            <a:gdLst>
+              <a:gd name="connsiteX0" fmla="*/ 0 w 57134"/>
+              <a:gd name="connsiteY0" fmla="*/ 5673417 h 5673416"/>
+              <a:gd name="connsiteX1" fmla="*/ 0 w 57134"/>
+              <a:gd name="connsiteY1" fmla="*/ 0 h 5673416"/>
+            </a:gdLst>
+            <a:ahLst/>
+            <a:cxnLst>
+              <a:cxn ang="0">
+                <a:pos x="connsiteX0" y="connsiteY0"/>
+              </a:cxn>
+              <a:cxn ang="0">
+                <a:pos x="connsiteX1" y="connsiteY1"/>
+              </a:cxn>
+            </a:cxnLst>
+            <a:rect l="l" t="t" r="r" b="b"/>
+            <a:pathLst>
+              <a:path w="57134" h="5673416">
+                <a:moveTo>
+                  <a:pt x="0" y="5673417"/>
+                </a:moveTo>
+                <a:lnTo>
+                  <a:pt x="0" y="0"/>
+                </a:lnTo>
+              </a:path>
+            </a:pathLst>
+          </a:custGeom>
+          <a:solidFill>
+            <a:srgbClr val="000000">
+              <a:alpha val="50000"/>
+            </a:srgbClr>
+          </a:solidFill>
+          <a:ln w="34233" cap="sq">
+            <a:solidFill>
+              <a:srgbClr val="000000"/>
+            </a:solidFill>
+            <a:prstDash val="solid"/>
+            <a:miter/>
+            <a:tailEnd type="arrow"/>
+          </a:ln>
+        </p:spPr>
+        <p:txBody>
+          <a:bodyPr rtlCol="0" anchor="ctr"/>
+          <a:lstStyle/>
+          <a:p>
+            <a:endParaRPr lang="en-US"/>
+          </a:p>
+        </p:txBody>
+      </p:sp>
+      <p:sp>
+        <p:nvSpPr>
+          <p:cNvPr id="12" name="Freeform: Shape 11">
+            <a:extLst>
+              <a:ext uri="{FF2B5EF4-FFF2-40B4-BE49-F238E27FC236}">
+                <a16:creationId xmlns:a16="http://schemas.microsoft.com/office/drawing/2014/main" id="{AF57F973-4873-579E-B69C-60C91206DBB9}"/>
+              </a:ext>
+            </a:extLst>
+          </p:cNvPr>
+          <p:cNvSpPr/>
+          <p:nvPr/>
+        </p:nvSpPr>
+        <p:spPr>
+          <a:xfrm>
+            <a:off x="3243940" y="3989130"/>
+            <a:ext cx="5673416" cy="57134"/>
+          </a:xfrm>
+          <a:custGeom>
+            <a:avLst/>
+            <a:gdLst>
+              <a:gd name="connsiteX0" fmla="*/ 0 w 5673416"/>
+              <a:gd name="connsiteY0" fmla="*/ 0 h 57134"/>
+              <a:gd name="connsiteX1" fmla="*/ 5673417 w 5673416"/>
+              <a:gd name="connsiteY1" fmla="*/ 0 h 57134"/>
+            </a:gdLst>
+            <a:ahLst/>
+            <a:cxnLst>
+              <a:cxn ang="0">
+                <a:pos x="connsiteX0" y="connsiteY0"/>
+              </a:cxn>
+              <a:cxn ang="0">
+                <a:pos x="connsiteX1" y="connsiteY1"/>
+              </a:cxn>
+            </a:cxnLst>
+            <a:rect l="l" t="t" r="r" b="b"/>
+            <a:pathLst>
+              <a:path w="5673416" h="57134">
+                <a:moveTo>
+                  <a:pt x="0" y="0"/>
+                </a:moveTo>
+                <a:lnTo>
+                  <a:pt x="5673417" y="0"/>
+                </a:lnTo>
+              </a:path>
+            </a:pathLst>
+          </a:custGeom>
+          <a:solidFill>
+            <a:srgbClr val="000000">
+              <a:alpha val="50000"/>
+            </a:srgbClr>
+          </a:solidFill>
+          <a:ln w="34233" cap="sq">
+            <a:solidFill>
+              <a:srgbClr val="000000"/>
+            </a:solidFill>
+            <a:prstDash val="solid"/>
+            <a:miter/>
+            <a:tailEnd type="arrow"/>
+          </a:ln>
+        </p:spPr>
+        <p:txBody>
+          <a:bodyPr rtlCol="0" anchor="ctr"/>
+          <a:lstStyle/>
+          <a:p>
+            <a:endParaRPr lang="en-US"/>
+          </a:p>
+        </p:txBody>
+      </p:sp>
+      <p:sp>
+        <p:nvSpPr>
+          <p:cNvPr id="13" name="Freeform: Shape 12">
+            <a:extLst>
+              <a:ext uri="{FF2B5EF4-FFF2-40B4-BE49-F238E27FC236}">
+                <a16:creationId xmlns:a16="http://schemas.microsoft.com/office/drawing/2014/main" id="{EBB250A9-01B5-A9A8-C2E0-63EC801B8D27}"/>
+              </a:ext>
+            </a:extLst>
+          </p:cNvPr>
+          <p:cNvSpPr/>
+          <p:nvPr/>
+        </p:nvSpPr>
+        <p:spPr>
+          <a:xfrm>
+            <a:off x="7198454" y="2773007"/>
+            <a:ext cx="118313" cy="118319"/>
+          </a:xfrm>
+          <a:custGeom>
+            <a:avLst/>
+            <a:gdLst>
+              <a:gd name="connsiteX0" fmla="*/ 118313 w 118313"/>
+              <a:gd name="connsiteY0" fmla="*/ 0 h 118319"/>
+              <a:gd name="connsiteX1" fmla="*/ 1211 w 118313"/>
+              <a:gd name="connsiteY1" fmla="*/ 117474 h 118319"/>
+              <a:gd name="connsiteX2" fmla="*/ 0 w 118313"/>
+              <a:gd name="connsiteY2" fmla="*/ 846 h 118319"/>
+              <a:gd name="connsiteX3" fmla="*/ 117102 w 118313"/>
+              <a:gd name="connsiteY3" fmla="*/ 118319 h 118319"/>
+            </a:gdLst>
+            <a:ahLst/>
+            <a:cxnLst>
+              <a:cxn ang="0">
+                <a:pos x="connsiteX0" y="connsiteY0"/>
+              </a:cxn>
+              <a:cxn ang="0">
+                <a:pos x="connsiteX1" y="connsiteY1"/>
+              </a:cxn>
+              <a:cxn ang="0">
+                <a:pos x="connsiteX2" y="connsiteY2"/>
+              </a:cxn>
+              <a:cxn ang="0">
+                <a:pos x="connsiteX3" y="connsiteY3"/>
+              </a:cxn>
+            </a:cxnLst>
+            <a:rect l="l" t="t" r="r" b="b"/>
+            <a:pathLst>
+              <a:path w="118313" h="118319">
+                <a:moveTo>
+                  <a:pt x="118313" y="0"/>
+                </a:moveTo>
+                <a:lnTo>
+                  <a:pt x="1211" y="117474"/>
+                </a:lnTo>
+                <a:moveTo>
+                  <a:pt x="0" y="846"/>
+                </a:moveTo>
+                <a:lnTo>
+                  <a:pt x="117102" y="118319"/>
+                </a:lnTo>
+              </a:path>
+            </a:pathLst>
+          </a:custGeom>
+          <a:noFill/>
+          <a:ln w="24486" cap="rnd">
+            <a:solidFill>
+              <a:srgbClr val="808080"/>
+            </a:solidFill>
+            <a:prstDash val="solid"/>
+            <a:miter/>
+          </a:ln>
+        </p:spPr>
+        <p:txBody>
+          <a:bodyPr rtlCol="0" anchor="ctr"/>
+          <a:lstStyle/>
+          <a:p>
+            <a:endParaRPr lang="en-US"/>
+          </a:p>
+        </p:txBody>
+      </p:sp>
+      <p:sp>
+        <p:nvSpPr>
+          <p:cNvPr id="14" name="Freeform: Shape 13">
+            <a:extLst>
+              <a:ext uri="{FF2B5EF4-FFF2-40B4-BE49-F238E27FC236}">
+                <a16:creationId xmlns:a16="http://schemas.microsoft.com/office/drawing/2014/main" id="{A4DDC5C8-D3CF-896F-1915-6DD2393BDE25}"/>
+              </a:ext>
+            </a:extLst>
+          </p:cNvPr>
+          <p:cNvSpPr/>
+          <p:nvPr/>
+        </p:nvSpPr>
+        <p:spPr>
+          <a:xfrm>
+            <a:off x="4884522" y="2773007"/>
+            <a:ext cx="118313" cy="118319"/>
+          </a:xfrm>
+          <a:custGeom>
+            <a:avLst/>
+            <a:gdLst>
+              <a:gd name="connsiteX0" fmla="*/ 118313 w 118313"/>
+              <a:gd name="connsiteY0" fmla="*/ 0 h 118319"/>
+              <a:gd name="connsiteX1" fmla="*/ 1211 w 118313"/>
+              <a:gd name="connsiteY1" fmla="*/ 117474 h 118319"/>
+              <a:gd name="connsiteX2" fmla="*/ 0 w 118313"/>
+              <a:gd name="connsiteY2" fmla="*/ 846 h 118319"/>
+              <a:gd name="connsiteX3" fmla="*/ 117102 w 118313"/>
+              <a:gd name="connsiteY3" fmla="*/ 118319 h 118319"/>
+            </a:gdLst>
+            <a:ahLst/>
+            <a:cxnLst>
+              <a:cxn ang="0">
+                <a:pos x="connsiteX0" y="connsiteY0"/>
+              </a:cxn>
+              <a:cxn ang="0">
+                <a:pos x="connsiteX1" y="connsiteY1"/>
+              </a:cxn>
+              <a:cxn ang="0">
+                <a:pos x="connsiteX2" y="connsiteY2"/>
+              </a:cxn>
+              <a:cxn ang="0">
+                <a:pos x="connsiteX3" y="connsiteY3"/>
+              </a:cxn>
+            </a:cxnLst>
+            <a:rect l="l" t="t" r="r" b="b"/>
+            <a:pathLst>
+              <a:path w="118313" h="118319">
+                <a:moveTo>
+                  <a:pt x="118313" y="0"/>
+                </a:moveTo>
+                <a:lnTo>
+                  <a:pt x="1211" y="117474"/>
+                </a:lnTo>
+                <a:moveTo>
+                  <a:pt x="0" y="846"/>
+                </a:moveTo>
+                <a:lnTo>
+                  <a:pt x="117102" y="118319"/>
+                </a:lnTo>
+              </a:path>
+            </a:pathLst>
+          </a:custGeom>
+          <a:noFill/>
+          <a:ln w="24486" cap="rnd">
+            <a:solidFill>
+              <a:srgbClr val="808080"/>
+            </a:solidFill>
+            <a:prstDash val="solid"/>
+            <a:miter/>
+          </a:ln>
+        </p:spPr>
+        <p:txBody>
+          <a:bodyPr rtlCol="0" anchor="ctr"/>
+          <a:lstStyle/>
+          <a:p>
+            <a:endParaRPr lang="en-US"/>
+          </a:p>
+        </p:txBody>
+      </p:sp>
+      <p:sp>
+        <p:nvSpPr>
+          <p:cNvPr id="15" name="Freeform: Shape 14">
+            <a:extLst>
+              <a:ext uri="{FF2B5EF4-FFF2-40B4-BE49-F238E27FC236}">
+                <a16:creationId xmlns:a16="http://schemas.microsoft.com/office/drawing/2014/main" id="{FC309EB5-9A19-0F14-FE29-80DB88C82A77}"/>
+              </a:ext>
+            </a:extLst>
+          </p:cNvPr>
+          <p:cNvSpPr/>
+          <p:nvPr/>
+        </p:nvSpPr>
+        <p:spPr>
+          <a:xfrm>
+            <a:off x="4884522" y="5086939"/>
+            <a:ext cx="118313" cy="118313"/>
+          </a:xfrm>
+          <a:custGeom>
+            <a:avLst/>
+            <a:gdLst>
+              <a:gd name="connsiteX0" fmla="*/ 118313 w 118313"/>
+              <a:gd name="connsiteY0" fmla="*/ 0 h 118313"/>
+              <a:gd name="connsiteX1" fmla="*/ 1211 w 118313"/>
+              <a:gd name="connsiteY1" fmla="*/ 117473 h 118313"/>
+              <a:gd name="connsiteX2" fmla="*/ 0 w 118313"/>
+              <a:gd name="connsiteY2" fmla="*/ 846 h 118313"/>
+              <a:gd name="connsiteX3" fmla="*/ 117102 w 118313"/>
+              <a:gd name="connsiteY3" fmla="*/ 118313 h 118313"/>
+            </a:gdLst>
+            <a:ahLst/>
+            <a:cxnLst>
+              <a:cxn ang="0">
+                <a:pos x="connsiteX0" y="connsiteY0"/>
+              </a:cxn>
+              <a:cxn ang="0">
+                <a:pos x="connsiteX1" y="connsiteY1"/>
+              </a:cxn>
+              <a:cxn ang="0">
+                <a:pos x="connsiteX2" y="connsiteY2"/>
+              </a:cxn>
+              <a:cxn ang="0">
+                <a:pos x="connsiteX3" y="connsiteY3"/>
+              </a:cxn>
+            </a:cxnLst>
+            <a:rect l="l" t="t" r="r" b="b"/>
+            <a:pathLst>
+              <a:path w="118313" h="118313">
+                <a:moveTo>
+                  <a:pt x="118313" y="0"/>
+                </a:moveTo>
+                <a:lnTo>
+                  <a:pt x="1211" y="117473"/>
+                </a:lnTo>
+                <a:moveTo>
+                  <a:pt x="0" y="846"/>
+                </a:moveTo>
+                <a:lnTo>
+                  <a:pt x="117102" y="118313"/>
+                </a:lnTo>
+              </a:path>
+            </a:pathLst>
+          </a:custGeom>
+          <a:noFill/>
+          <a:ln w="24486" cap="rnd">
+            <a:solidFill>
+              <a:srgbClr val="808080"/>
+            </a:solidFill>
+            <a:prstDash val="solid"/>
+            <a:miter/>
+          </a:ln>
+        </p:spPr>
+        <p:txBody>
+          <a:bodyPr rtlCol="0" anchor="ctr"/>
+          <a:lstStyle/>
+          <a:p>
+            <a:endParaRPr lang="en-US"/>
+          </a:p>
+        </p:txBody>
+      </p:sp>
+      <p:sp>
+        <p:nvSpPr>
+          <p:cNvPr id="16" name="Freeform: Shape 15">
+            <a:extLst>
+              <a:ext uri="{FF2B5EF4-FFF2-40B4-BE49-F238E27FC236}">
+                <a16:creationId xmlns:a16="http://schemas.microsoft.com/office/drawing/2014/main" id="{3F831900-4E44-A885-9ADE-2BB52E0324DC}"/>
+              </a:ext>
+            </a:extLst>
+          </p:cNvPr>
+          <p:cNvSpPr/>
+          <p:nvPr/>
+        </p:nvSpPr>
+        <p:spPr>
+          <a:xfrm>
+            <a:off x="7198454" y="5086939"/>
+            <a:ext cx="118313" cy="118313"/>
+          </a:xfrm>
+          <a:custGeom>
+            <a:avLst/>
+            <a:gdLst>
+              <a:gd name="connsiteX0" fmla="*/ 118313 w 118313"/>
+              <a:gd name="connsiteY0" fmla="*/ 0 h 118313"/>
+              <a:gd name="connsiteX1" fmla="*/ 1211 w 118313"/>
+              <a:gd name="connsiteY1" fmla="*/ 117473 h 118313"/>
+              <a:gd name="connsiteX2" fmla="*/ 0 w 118313"/>
+              <a:gd name="connsiteY2" fmla="*/ 846 h 118313"/>
+              <a:gd name="connsiteX3" fmla="*/ 117102 w 118313"/>
+              <a:gd name="connsiteY3" fmla="*/ 118313 h 118313"/>
+            </a:gdLst>
+            <a:ahLst/>
+            <a:cxnLst>
+              <a:cxn ang="0">
+                <a:pos x="connsiteX0" y="connsiteY0"/>
+              </a:cxn>
+              <a:cxn ang="0">
+                <a:pos x="connsiteX1" y="connsiteY1"/>
+              </a:cxn>
+              <a:cxn ang="0">
+                <a:pos x="connsiteX2" y="connsiteY2"/>
+              </a:cxn>
+              <a:cxn ang="0">
+                <a:pos x="connsiteX3" y="connsiteY3"/>
+              </a:cxn>
+            </a:cxnLst>
+            <a:rect l="l" t="t" r="r" b="b"/>
+            <a:pathLst>
+              <a:path w="118313" h="118313">
+                <a:moveTo>
+                  <a:pt x="118313" y="0"/>
+                </a:moveTo>
+                <a:lnTo>
+                  <a:pt x="1211" y="117473"/>
+                </a:lnTo>
+                <a:moveTo>
+                  <a:pt x="0" y="846"/>
+                </a:moveTo>
+                <a:lnTo>
+                  <a:pt x="117102" y="118313"/>
+                </a:lnTo>
+              </a:path>
+            </a:pathLst>
+          </a:custGeom>
+          <a:noFill/>
+          <a:ln w="24486" cap="rnd">
+            <a:solidFill>
+              <a:srgbClr val="808080"/>
+            </a:solidFill>
+            <a:prstDash val="solid"/>
+            <a:miter/>
+          </a:ln>
+        </p:spPr>
+        <p:txBody>
+          <a:bodyPr rtlCol="0" anchor="ctr"/>
+          <a:lstStyle/>
+          <a:p>
+            <a:endParaRPr lang="en-US"/>
+          </a:p>
+        </p:txBody>
+      </p:sp>
+      <p:sp>
+        <p:nvSpPr>
+          <p:cNvPr id="17" name="Freeform: Shape 16">
+            <a:extLst>
+              <a:ext uri="{FF2B5EF4-FFF2-40B4-BE49-F238E27FC236}">
+                <a16:creationId xmlns:a16="http://schemas.microsoft.com/office/drawing/2014/main" id="{B27FA6BC-CF38-97C4-A294-8716A7C43D75}"/>
+              </a:ext>
+            </a:extLst>
+          </p:cNvPr>
+          <p:cNvSpPr/>
+          <p:nvPr/>
+        </p:nvSpPr>
+        <p:spPr>
+          <a:xfrm>
+            <a:off x="3772431" y="1660916"/>
+            <a:ext cx="4656430" cy="4656430"/>
+          </a:xfrm>
+          <a:custGeom>
+            <a:avLst/>
+            <a:gdLst>
+              <a:gd name="connsiteX0" fmla="*/ 0 w 4656430"/>
+              <a:gd name="connsiteY0" fmla="*/ 0 h 4656430"/>
+              <a:gd name="connsiteX1" fmla="*/ 4656431 w 4656430"/>
+              <a:gd name="connsiteY1" fmla="*/ 0 h 4656430"/>
+              <a:gd name="connsiteX2" fmla="*/ 4656431 w 4656430"/>
+              <a:gd name="connsiteY2" fmla="*/ 4656431 h 4656430"/>
+              <a:gd name="connsiteX3" fmla="*/ 0 w 4656430"/>
+              <a:gd name="connsiteY3" fmla="*/ 4656431 h 4656430"/>
+            </a:gdLst>
+            <a:ahLst/>
+            <a:cxnLst>
+              <a:cxn ang="0">
+                <a:pos x="connsiteX0" y="connsiteY0"/>
+              </a:cxn>
+              <a:cxn ang="0">
+                <a:pos x="connsiteX1" y="connsiteY1"/>
+              </a:cxn>
+              <a:cxn ang="0">
+                <a:pos x="connsiteX2" y="connsiteY2"/>
+              </a:cxn>
+              <a:cxn ang="0">
+                <a:pos x="connsiteX3" y="connsiteY3"/>
+              </a:cxn>
+            </a:cxnLst>
+            <a:rect l="l" t="t" r="r" b="b"/>
+            <a:pathLst>
+              <a:path w="4656430" h="4656430">
+                <a:moveTo>
+                  <a:pt x="0" y="0"/>
+                </a:moveTo>
+                <a:lnTo>
+                  <a:pt x="4656431" y="0"/>
+                </a:lnTo>
+                <a:lnTo>
+                  <a:pt x="4656431" y="4656431"/>
+                </a:lnTo>
+                <a:lnTo>
+                  <a:pt x="0" y="4656431"/>
+                </a:lnTo>
+                <a:close/>
+              </a:path>
+            </a:pathLst>
+          </a:custGeom>
+          <a:noFill/>
+          <a:ln w="57055" cap="rnd">
+            <a:solidFill>
+              <a:srgbClr val="5AA02C"/>
+            </a:solidFill>
+            <a:prstDash val="solid"/>
+            <a:miter/>
+          </a:ln>
+        </p:spPr>
+        <p:txBody>
+          <a:bodyPr rtlCol="0" anchor="ctr"/>
+          <a:lstStyle/>
+          <a:p>
+            <a:endParaRPr lang="en-US"/>
+          </a:p>
+        </p:txBody>
+      </p:sp>
+      <p:sp>
+        <p:nvSpPr>
+          <p:cNvPr id="18" name="Freeform: Shape 17">
+            <a:extLst>
+              <a:ext uri="{FF2B5EF4-FFF2-40B4-BE49-F238E27FC236}">
+                <a16:creationId xmlns:a16="http://schemas.microsoft.com/office/drawing/2014/main" id="{255D245B-8679-F95D-DF14-A8426BF2EA6F}"/>
+              </a:ext>
+            </a:extLst>
+          </p:cNvPr>
+          <p:cNvSpPr/>
+          <p:nvPr/>
+        </p:nvSpPr>
+        <p:spPr>
+          <a:xfrm>
+            <a:off x="6137530" y="1712084"/>
+            <a:ext cx="2240160" cy="2240160"/>
+          </a:xfrm>
+          <a:custGeom>
+            <a:avLst/>
+            <a:gdLst>
+              <a:gd name="connsiteX0" fmla="*/ 2240160 w 2240160"/>
+              <a:gd name="connsiteY0" fmla="*/ 1120080 h 2240160"/>
+              <a:gd name="connsiteX1" fmla="*/ 1120080 w 2240160"/>
+              <a:gd name="connsiteY1" fmla="*/ 2240160 h 2240160"/>
+              <a:gd name="connsiteX2" fmla="*/ 0 w 2240160"/>
+              <a:gd name="connsiteY2" fmla="*/ 1120080 h 2240160"/>
+              <a:gd name="connsiteX3" fmla="*/ 1120080 w 2240160"/>
+              <a:gd name="connsiteY3" fmla="*/ 0 h 2240160"/>
+              <a:gd name="connsiteX4" fmla="*/ 2240160 w 2240160"/>
+              <a:gd name="connsiteY4" fmla="*/ 1120080 h 2240160"/>
+            </a:gdLst>
+            <a:ahLst/>
+            <a:cxnLst>
+              <a:cxn ang="0">
+                <a:pos x="connsiteX0" y="connsiteY0"/>
+              </a:cxn>
+              <a:cxn ang="0">
+                <a:pos x="connsiteX1" y="connsiteY1"/>
+              </a:cxn>
+              <a:cxn ang="0">
+                <a:pos x="connsiteX2" y="connsiteY2"/>
+              </a:cxn>
+              <a:cxn ang="0">
+                <a:pos x="connsiteX3" y="connsiteY3"/>
+              </a:cxn>
+              <a:cxn ang="0">
+                <a:pos x="connsiteX4" y="connsiteY4"/>
+              </a:cxn>
+            </a:cxnLst>
+            <a:rect l="l" t="t" r="r" b="b"/>
+            <a:pathLst>
+              <a:path w="2240160" h="2240160">
+                <a:moveTo>
+                  <a:pt x="2240160" y="1120080"/>
+                </a:moveTo>
+                <a:cubicBezTo>
+                  <a:pt x="2240160" y="1738683"/>
+                  <a:pt x="1738683" y="2240160"/>
+                  <a:pt x="1120080" y="2240160"/>
+                </a:cubicBezTo>
+                <a:cubicBezTo>
+                  <a:pt x="501477" y="2240160"/>
+                  <a:pt x="0" y="1738683"/>
+                  <a:pt x="0" y="1120080"/>
+                </a:cubicBezTo>
+                <a:cubicBezTo>
+                  <a:pt x="0" y="501477"/>
+                  <a:pt x="501477" y="0"/>
+                  <a:pt x="1120080" y="0"/>
+                </a:cubicBezTo>
+                <a:cubicBezTo>
+                  <a:pt x="1738683" y="0"/>
+                  <a:pt x="2240160" y="501477"/>
+                  <a:pt x="2240160" y="1120080"/>
+                </a:cubicBezTo>
+                <a:close/>
+              </a:path>
+            </a:pathLst>
+          </a:custGeom>
+          <a:noFill/>
+          <a:ln w="45138" cap="sq">
+            <a:solidFill>
+              <a:srgbClr val="37ABC8"/>
+            </a:solidFill>
+            <a:prstDash val="solid"/>
+            <a:miter/>
+          </a:ln>
+        </p:spPr>
+        <p:txBody>
+          <a:bodyPr rtlCol="0" anchor="ctr"/>
+          <a:lstStyle/>
+          <a:p>
+            <a:endParaRPr lang="en-US"/>
+          </a:p>
+        </p:txBody>
+      </p:sp>
+      <p:sp>
+        <p:nvSpPr>
+          <p:cNvPr id="19" name="Freeform: Shape 18">
+            <a:extLst>
+              <a:ext uri="{FF2B5EF4-FFF2-40B4-BE49-F238E27FC236}">
+                <a16:creationId xmlns:a16="http://schemas.microsoft.com/office/drawing/2014/main" id="{D2500A33-AE17-252C-E174-D1197C4C3128}"/>
+              </a:ext>
+            </a:extLst>
+          </p:cNvPr>
+          <p:cNvSpPr/>
+          <p:nvPr/>
+        </p:nvSpPr>
+        <p:spPr>
+          <a:xfrm>
+            <a:off x="3823598" y="1712084"/>
+            <a:ext cx="2240160" cy="2240160"/>
+          </a:xfrm>
+          <a:custGeom>
+            <a:avLst/>
+            <a:gdLst>
+              <a:gd name="connsiteX0" fmla="*/ 2240160 w 2240160"/>
+              <a:gd name="connsiteY0" fmla="*/ 1120080 h 2240160"/>
+              <a:gd name="connsiteX1" fmla="*/ 1120080 w 2240160"/>
+              <a:gd name="connsiteY1" fmla="*/ 2240160 h 2240160"/>
+              <a:gd name="connsiteX2" fmla="*/ 0 w 2240160"/>
+              <a:gd name="connsiteY2" fmla="*/ 1120080 h 2240160"/>
+              <a:gd name="connsiteX3" fmla="*/ 1120080 w 2240160"/>
+              <a:gd name="connsiteY3" fmla="*/ 0 h 2240160"/>
+              <a:gd name="connsiteX4" fmla="*/ 2240160 w 2240160"/>
+              <a:gd name="connsiteY4" fmla="*/ 1120080 h 2240160"/>
+            </a:gdLst>
+            <a:ahLst/>
+            <a:cxnLst>
+              <a:cxn ang="0">
+                <a:pos x="connsiteX0" y="connsiteY0"/>
+              </a:cxn>
+              <a:cxn ang="0">
+                <a:pos x="connsiteX1" y="connsiteY1"/>
+              </a:cxn>
+              <a:cxn ang="0">
+                <a:pos x="connsiteX2" y="connsiteY2"/>
+              </a:cxn>
+              <a:cxn ang="0">
+                <a:pos x="connsiteX3" y="connsiteY3"/>
+              </a:cxn>
+              <a:cxn ang="0">
+                <a:pos x="connsiteX4" y="connsiteY4"/>
+              </a:cxn>
+            </a:cxnLst>
+            <a:rect l="l" t="t" r="r" b="b"/>
+            <a:pathLst>
+              <a:path w="2240160" h="2240160">
+                <a:moveTo>
+                  <a:pt x="2240160" y="1120080"/>
+                </a:moveTo>
+                <a:cubicBezTo>
+                  <a:pt x="2240160" y="1738683"/>
+                  <a:pt x="1738683" y="2240160"/>
+                  <a:pt x="1120080" y="2240160"/>
+                </a:cubicBezTo>
+                <a:cubicBezTo>
+                  <a:pt x="501477" y="2240160"/>
+                  <a:pt x="0" y="1738683"/>
+                  <a:pt x="0" y="1120080"/>
+                </a:cubicBezTo>
+                <a:cubicBezTo>
+                  <a:pt x="0" y="501477"/>
+                  <a:pt x="501477" y="0"/>
+                  <a:pt x="1120080" y="0"/>
+                </a:cubicBezTo>
+                <a:cubicBezTo>
+                  <a:pt x="1738683" y="0"/>
+                  <a:pt x="2240160" y="501477"/>
+                  <a:pt x="2240160" y="1120080"/>
+                </a:cubicBezTo>
+                <a:close/>
+              </a:path>
+            </a:pathLst>
+          </a:custGeom>
+          <a:noFill/>
+          <a:ln w="45138" cap="sq">
+            <a:solidFill>
+              <a:srgbClr val="37ABC8"/>
+            </a:solidFill>
+            <a:prstDash val="solid"/>
+            <a:miter/>
+          </a:ln>
+        </p:spPr>
+        <p:txBody>
+          <a:bodyPr rtlCol="0" anchor="ctr"/>
+          <a:lstStyle/>
+          <a:p>
+            <a:endParaRPr lang="en-US"/>
+          </a:p>
+        </p:txBody>
+      </p:sp>
+      <p:sp>
+        <p:nvSpPr>
+          <p:cNvPr id="20" name="Freeform: Shape 19">
+            <a:extLst>
+              <a:ext uri="{FF2B5EF4-FFF2-40B4-BE49-F238E27FC236}">
+                <a16:creationId xmlns:a16="http://schemas.microsoft.com/office/drawing/2014/main" id="{DD038C99-415F-73A9-C25F-5DC759A1DEFF}"/>
+              </a:ext>
+            </a:extLst>
+          </p:cNvPr>
+          <p:cNvSpPr/>
+          <p:nvPr/>
+        </p:nvSpPr>
+        <p:spPr>
+          <a:xfrm>
+            <a:off x="3823598" y="4026015"/>
+            <a:ext cx="2240160" cy="2240160"/>
+          </a:xfrm>
+          <a:custGeom>
+            <a:avLst/>
+            <a:gdLst>
+              <a:gd name="connsiteX0" fmla="*/ 2240160 w 2240160"/>
+              <a:gd name="connsiteY0" fmla="*/ 1120080 h 2240160"/>
+              <a:gd name="connsiteX1" fmla="*/ 1120080 w 2240160"/>
+              <a:gd name="connsiteY1" fmla="*/ 2240161 h 2240160"/>
+              <a:gd name="connsiteX2" fmla="*/ 0 w 2240160"/>
+              <a:gd name="connsiteY2" fmla="*/ 1120080 h 2240160"/>
+              <a:gd name="connsiteX3" fmla="*/ 1120080 w 2240160"/>
+              <a:gd name="connsiteY3" fmla="*/ 0 h 2240160"/>
+              <a:gd name="connsiteX4" fmla="*/ 2240160 w 2240160"/>
+              <a:gd name="connsiteY4" fmla="*/ 1120080 h 2240160"/>
+            </a:gdLst>
+            <a:ahLst/>
+            <a:cxnLst>
+              <a:cxn ang="0">
+                <a:pos x="connsiteX0" y="connsiteY0"/>
+              </a:cxn>
+              <a:cxn ang="0">
+                <a:pos x="connsiteX1" y="connsiteY1"/>
+              </a:cxn>
+              <a:cxn ang="0">
+                <a:pos x="connsiteX2" y="connsiteY2"/>
+              </a:cxn>
+              <a:cxn ang="0">
+                <a:pos x="connsiteX3" y="connsiteY3"/>
+              </a:cxn>
+              <a:cxn ang="0">
+                <a:pos x="connsiteX4" y="connsiteY4"/>
+              </a:cxn>
+            </a:cxnLst>
+            <a:rect l="l" t="t" r="r" b="b"/>
+            <a:pathLst>
+              <a:path w="2240160" h="2240160">
+                <a:moveTo>
+                  <a:pt x="2240160" y="1120080"/>
+                </a:moveTo>
+                <a:cubicBezTo>
+                  <a:pt x="2240160" y="1738683"/>
+                  <a:pt x="1738683" y="2240161"/>
+                  <a:pt x="1120080" y="2240161"/>
+                </a:cubicBezTo>
+                <a:cubicBezTo>
+                  <a:pt x="501477" y="2240161"/>
+                  <a:pt x="0" y="1738683"/>
+                  <a:pt x="0" y="1120080"/>
+                </a:cubicBezTo>
+                <a:cubicBezTo>
+                  <a:pt x="0" y="501477"/>
+                  <a:pt x="501477" y="0"/>
+                  <a:pt x="1120080" y="0"/>
+                </a:cubicBezTo>
+                <a:cubicBezTo>
+                  <a:pt x="1738683" y="0"/>
+                  <a:pt x="2240160" y="501477"/>
+                  <a:pt x="2240160" y="1120080"/>
+                </a:cubicBezTo>
+                <a:close/>
+              </a:path>
+            </a:pathLst>
+          </a:custGeom>
+          <a:noFill/>
+          <a:ln w="45138" cap="sq">
+            <a:solidFill>
+              <a:srgbClr val="37ABC8"/>
+            </a:solidFill>
+            <a:prstDash val="solid"/>
+            <a:miter/>
+          </a:ln>
+        </p:spPr>
+        <p:txBody>
+          <a:bodyPr rtlCol="0" anchor="ctr"/>
+          <a:lstStyle/>
+          <a:p>
+            <a:endParaRPr lang="en-US"/>
+          </a:p>
+        </p:txBody>
+      </p:sp>
+      <p:sp>
+        <p:nvSpPr>
+          <p:cNvPr id="21" name="Freeform: Shape 20">
+            <a:extLst>
+              <a:ext uri="{FF2B5EF4-FFF2-40B4-BE49-F238E27FC236}">
+                <a16:creationId xmlns:a16="http://schemas.microsoft.com/office/drawing/2014/main" id="{F31E3D6C-86AD-CEAA-E4AD-F010A76C3EDE}"/>
+              </a:ext>
+            </a:extLst>
+          </p:cNvPr>
+          <p:cNvSpPr/>
+          <p:nvPr/>
+        </p:nvSpPr>
+        <p:spPr>
+          <a:xfrm>
+            <a:off x="6137530" y="4026015"/>
+            <a:ext cx="2240160" cy="2240160"/>
+          </a:xfrm>
+          <a:custGeom>
+            <a:avLst/>
+            <a:gdLst>
+              <a:gd name="connsiteX0" fmla="*/ 2240160 w 2240160"/>
+              <a:gd name="connsiteY0" fmla="*/ 1120080 h 2240160"/>
+              <a:gd name="connsiteX1" fmla="*/ 1120080 w 2240160"/>
+              <a:gd name="connsiteY1" fmla="*/ 2240161 h 2240160"/>
+              <a:gd name="connsiteX2" fmla="*/ 0 w 2240160"/>
+              <a:gd name="connsiteY2" fmla="*/ 1120080 h 2240160"/>
+              <a:gd name="connsiteX3" fmla="*/ 1120080 w 2240160"/>
+              <a:gd name="connsiteY3" fmla="*/ 0 h 2240160"/>
+              <a:gd name="connsiteX4" fmla="*/ 2240160 w 2240160"/>
+              <a:gd name="connsiteY4" fmla="*/ 1120080 h 2240160"/>
+            </a:gdLst>
+            <a:ahLst/>
+            <a:cxnLst>
+              <a:cxn ang="0">
+                <a:pos x="connsiteX0" y="connsiteY0"/>
+              </a:cxn>
+              <a:cxn ang="0">
+                <a:pos x="connsiteX1" y="connsiteY1"/>
+              </a:cxn>
+              <a:cxn ang="0">
+                <a:pos x="connsiteX2" y="connsiteY2"/>
+              </a:cxn>
+              <a:cxn ang="0">
+                <a:pos x="connsiteX3" y="connsiteY3"/>
+              </a:cxn>
+              <a:cxn ang="0">
+                <a:pos x="connsiteX4" y="connsiteY4"/>
+              </a:cxn>
+            </a:cxnLst>
+            <a:rect l="l" t="t" r="r" b="b"/>
+            <a:pathLst>
+              <a:path w="2240160" h="2240160">
+                <a:moveTo>
+                  <a:pt x="2240160" y="1120080"/>
+                </a:moveTo>
+                <a:cubicBezTo>
+                  <a:pt x="2240160" y="1738683"/>
+                  <a:pt x="1738683" y="2240161"/>
+                  <a:pt x="1120080" y="2240161"/>
+                </a:cubicBezTo>
+                <a:cubicBezTo>
+                  <a:pt x="501477" y="2240161"/>
+                  <a:pt x="0" y="1738683"/>
+                  <a:pt x="0" y="1120080"/>
+                </a:cubicBezTo>
+                <a:cubicBezTo>
+                  <a:pt x="0" y="501477"/>
+                  <a:pt x="501477" y="0"/>
+                  <a:pt x="1120080" y="0"/>
+                </a:cubicBezTo>
+                <a:cubicBezTo>
+                  <a:pt x="1738683" y="0"/>
+                  <a:pt x="2240160" y="501477"/>
+                  <a:pt x="2240160" y="1120080"/>
+                </a:cubicBezTo>
+                <a:close/>
+              </a:path>
+            </a:pathLst>
+          </a:custGeom>
+          <a:noFill/>
+          <a:ln w="45138" cap="sq">
+            <a:solidFill>
+              <a:srgbClr val="37ABC8"/>
+            </a:solidFill>
+            <a:prstDash val="solid"/>
+            <a:miter/>
+          </a:ln>
+        </p:spPr>
+        <p:txBody>
+          <a:bodyPr rtlCol="0" anchor="ctr"/>
+          <a:lstStyle/>
+          <a:p>
+            <a:endParaRPr lang="en-US"/>
+          </a:p>
+        </p:txBody>
+      </p:sp>
+      <p:sp>
+        <p:nvSpPr>
+          <p:cNvPr id="22" name="Freeform: Shape 21">
+            <a:extLst>
+              <a:ext uri="{FF2B5EF4-FFF2-40B4-BE49-F238E27FC236}">
+                <a16:creationId xmlns:a16="http://schemas.microsoft.com/office/drawing/2014/main" id="{C8D7CF88-D832-CE93-A09C-74E13B415924}"/>
+              </a:ext>
+            </a:extLst>
+          </p:cNvPr>
+          <p:cNvSpPr/>
+          <p:nvPr/>
+        </p:nvSpPr>
+        <p:spPr>
+          <a:xfrm>
+            <a:off x="5616209" y="3504694"/>
+            <a:ext cx="968871" cy="968871"/>
+          </a:xfrm>
+          <a:custGeom>
+            <a:avLst/>
+            <a:gdLst>
+              <a:gd name="connsiteX0" fmla="*/ 968871 w 968871"/>
+              <a:gd name="connsiteY0" fmla="*/ 484436 h 968871"/>
+              <a:gd name="connsiteX1" fmla="*/ 484436 w 968871"/>
+              <a:gd name="connsiteY1" fmla="*/ 968871 h 968871"/>
+              <a:gd name="connsiteX2" fmla="*/ 0 w 968871"/>
+              <a:gd name="connsiteY2" fmla="*/ 484436 h 968871"/>
+              <a:gd name="connsiteX3" fmla="*/ 484436 w 968871"/>
+              <a:gd name="connsiteY3" fmla="*/ 0 h 968871"/>
+              <a:gd name="connsiteX4" fmla="*/ 968871 w 968871"/>
+              <a:gd name="connsiteY4" fmla="*/ 484436 h 968871"/>
+            </a:gdLst>
+            <a:ahLst/>
+            <a:cxnLst>
+              <a:cxn ang="0">
+                <a:pos x="connsiteX0" y="connsiteY0"/>
+              </a:cxn>
+              <a:cxn ang="0">
+                <a:pos x="connsiteX1" y="connsiteY1"/>
+              </a:cxn>
+              <a:cxn ang="0">
+                <a:pos x="connsiteX2" y="connsiteY2"/>
+              </a:cxn>
+              <a:cxn ang="0">
+                <a:pos x="connsiteX3" y="connsiteY3"/>
+              </a:cxn>
+              <a:cxn ang="0">
+                <a:pos x="connsiteX4" y="connsiteY4"/>
+              </a:cxn>
+            </a:cxnLst>
+            <a:rect l="l" t="t" r="r" b="b"/>
+            <a:pathLst>
+              <a:path w="968871" h="968871">
+                <a:moveTo>
+                  <a:pt x="968871" y="484436"/>
+                </a:moveTo>
+                <a:cubicBezTo>
+                  <a:pt x="968871" y="751982"/>
+                  <a:pt x="751982" y="968871"/>
+                  <a:pt x="484436" y="968871"/>
+                </a:cubicBezTo>
+                <a:cubicBezTo>
+                  <a:pt x="216889" y="968871"/>
+                  <a:pt x="0" y="751982"/>
+                  <a:pt x="0" y="484436"/>
+                </a:cubicBezTo>
+                <a:cubicBezTo>
+                  <a:pt x="0" y="216889"/>
+                  <a:pt x="216889" y="0"/>
+                  <a:pt x="484436" y="0"/>
+                </a:cubicBezTo>
+                <a:cubicBezTo>
+                  <a:pt x="751982" y="0"/>
+                  <a:pt x="968871" y="216889"/>
+                  <a:pt x="968871" y="484436"/>
+                </a:cubicBezTo>
+                <a:close/>
+              </a:path>
+            </a:pathLst>
+          </a:custGeom>
+          <a:noFill/>
+          <a:ln w="45644" cap="sq">
+            <a:solidFill>
+              <a:srgbClr val="D40000"/>
+            </a:solidFill>
+            <a:prstDash val="solid"/>
+            <a:miter/>
+          </a:ln>
+        </p:spPr>
+        <p:txBody>
+          <a:bodyPr rtlCol="0" anchor="ctr"/>
+          <a:lstStyle/>
+          <a:p>
+            <a:endParaRPr lang="en-US"/>
+          </a:p>
+        </p:txBody>
+      </p:sp>
+    </p:spTree>
+    <p:extLst>
+      <p:ext uri="{BB962C8B-B14F-4D97-AF65-F5344CB8AC3E}">
+        <p14:creationId xmlns:p14="http://schemas.microsoft.com/office/powerpoint/2010/main" val="3722030007"/>
+      </p:ext>
+    </p:extLst>
+  </p:cSld>
+  <p:clrMapOvr>
+    <a:masterClrMapping/>
+  </p:clrMapOvr>
+</p:sld>
+</file>
+
+<file path=ppt/slides/slide23.xml><?xml version="1.0" encoding="utf-8"?>
+<p:sld xmlns:a="http://schemas.openxmlformats.org/drawingml/2006/main" xmlns:r="http://schemas.openxmlformats.org/officeDocument/2006/relationships" xmlns:p="http://schemas.openxmlformats.org/presentationml/2006/main">
+  <p:cSld>
+    <p:spTree>
+      <p:nvGrpSpPr>
+        <p:cNvPr id="1" name=""/>
+        <p:cNvGrpSpPr/>
+        <p:nvPr/>
+      </p:nvGrpSpPr>
+      <p:grpSpPr>
+        <a:xfrm>
+          <a:off x="0" y="0"/>
+          <a:ext cx="0" cy="0"/>
+          <a:chOff x="0" y="0"/>
+          <a:chExt cx="0" cy="0"/>
+        </a:xfrm>
+      </p:grpSpPr>
+      <p:sp>
+        <p:nvSpPr>
+          <p:cNvPr id="2" name="Title 1">
+            <a:extLst>
+              <a:ext uri="{FF2B5EF4-FFF2-40B4-BE49-F238E27FC236}">
+                <a16:creationId xmlns:a16="http://schemas.microsoft.com/office/drawing/2014/main" id="{8D9E4586-C3CF-1F32-B8CA-0C39C0D9EB76}"/>
+              </a:ext>
+            </a:extLst>
+          </p:cNvPr>
+          <p:cNvSpPr>
+            <a:spLocks noGrp="1"/>
+          </p:cNvSpPr>
+          <p:nvPr>
+            <p:ph type="title"/>
+          </p:nvPr>
+        </p:nvSpPr>
+        <p:spPr/>
+        <p:txBody>
+          <a:bodyPr/>
+          <a:lstStyle/>
+          <a:p>
+            <a:r>
+              <a:rPr lang="en-US" dirty="0"/>
+              <a:t>4 circles paradox</a:t>
+            </a:r>
+          </a:p>
+        </p:txBody>
+      </p:sp>
+      <p:sp>
+        <p:nvSpPr>
+          <p:cNvPr id="7" name="Freeform: Shape 6">
+            <a:extLst>
+              <a:ext uri="{FF2B5EF4-FFF2-40B4-BE49-F238E27FC236}">
+                <a16:creationId xmlns:a16="http://schemas.microsoft.com/office/drawing/2014/main" id="{402B474F-82F2-B7A1-C2A8-823B2AB464F5}"/>
+              </a:ext>
+            </a:extLst>
+          </p:cNvPr>
+          <p:cNvSpPr/>
+          <p:nvPr/>
+        </p:nvSpPr>
+        <p:spPr>
+          <a:xfrm>
+            <a:off x="6100644" y="1172419"/>
+            <a:ext cx="57134" cy="5673416"/>
+          </a:xfrm>
+          <a:custGeom>
+            <a:avLst/>
+            <a:gdLst>
+              <a:gd name="connsiteX0" fmla="*/ 0 w 57134"/>
+              <a:gd name="connsiteY0" fmla="*/ 5673417 h 5673416"/>
+              <a:gd name="connsiteX1" fmla="*/ 0 w 57134"/>
+              <a:gd name="connsiteY1" fmla="*/ 0 h 5673416"/>
+            </a:gdLst>
+            <a:ahLst/>
+            <a:cxnLst>
+              <a:cxn ang="0">
+                <a:pos x="connsiteX0" y="connsiteY0"/>
+              </a:cxn>
+              <a:cxn ang="0">
+                <a:pos x="connsiteX1" y="connsiteY1"/>
+              </a:cxn>
+            </a:cxnLst>
+            <a:rect l="l" t="t" r="r" b="b"/>
+            <a:pathLst>
+              <a:path w="57134" h="5673416">
+                <a:moveTo>
+                  <a:pt x="0" y="5673417"/>
+                </a:moveTo>
+                <a:lnTo>
+                  <a:pt x="0" y="0"/>
+                </a:lnTo>
+              </a:path>
+            </a:pathLst>
+          </a:custGeom>
+          <a:solidFill>
+            <a:srgbClr val="000000">
+              <a:alpha val="50000"/>
+            </a:srgbClr>
+          </a:solidFill>
+          <a:ln w="34233" cap="sq">
+            <a:solidFill>
+              <a:srgbClr val="000000"/>
+            </a:solidFill>
+            <a:prstDash val="solid"/>
+            <a:miter/>
+            <a:headEnd type="none" w="med" len="med"/>
+            <a:tailEnd type="arrow" w="med" len="med"/>
+          </a:ln>
+        </p:spPr>
+        <p:txBody>
+          <a:bodyPr rtlCol="0" anchor="ctr"/>
+          <a:lstStyle/>
+          <a:p>
+            <a:endParaRPr lang="en-US"/>
+          </a:p>
+        </p:txBody>
+      </p:sp>
+      <p:sp>
+        <p:nvSpPr>
+          <p:cNvPr id="8" name="Freeform: Shape 7">
+            <a:extLst>
+              <a:ext uri="{FF2B5EF4-FFF2-40B4-BE49-F238E27FC236}">
+                <a16:creationId xmlns:a16="http://schemas.microsoft.com/office/drawing/2014/main" id="{5D62A076-57A0-BB83-47AB-8036D2504A48}"/>
+              </a:ext>
+            </a:extLst>
+          </p:cNvPr>
+          <p:cNvSpPr/>
+          <p:nvPr/>
+        </p:nvSpPr>
+        <p:spPr>
+          <a:xfrm>
+            <a:off x="3243940" y="3989130"/>
+            <a:ext cx="5673416" cy="57134"/>
+          </a:xfrm>
+          <a:custGeom>
+            <a:avLst/>
+            <a:gdLst>
+              <a:gd name="connsiteX0" fmla="*/ 0 w 5673416"/>
+              <a:gd name="connsiteY0" fmla="*/ 0 h 57134"/>
+              <a:gd name="connsiteX1" fmla="*/ 5673417 w 5673416"/>
+              <a:gd name="connsiteY1" fmla="*/ 0 h 57134"/>
+            </a:gdLst>
+            <a:ahLst/>
+            <a:cxnLst>
+              <a:cxn ang="0">
+                <a:pos x="connsiteX0" y="connsiteY0"/>
+              </a:cxn>
+              <a:cxn ang="0">
+                <a:pos x="connsiteX1" y="connsiteY1"/>
+              </a:cxn>
+            </a:cxnLst>
+            <a:rect l="l" t="t" r="r" b="b"/>
+            <a:pathLst>
+              <a:path w="5673416" h="57134">
+                <a:moveTo>
+                  <a:pt x="0" y="0"/>
+                </a:moveTo>
+                <a:lnTo>
+                  <a:pt x="5673417" y="0"/>
+                </a:lnTo>
+              </a:path>
+            </a:pathLst>
+          </a:custGeom>
+          <a:solidFill>
+            <a:srgbClr val="000000">
+              <a:alpha val="50000"/>
+            </a:srgbClr>
+          </a:solidFill>
+          <a:ln w="34233" cap="sq">
+            <a:solidFill>
+              <a:srgbClr val="000000"/>
+            </a:solidFill>
+            <a:prstDash val="solid"/>
+            <a:miter/>
+            <a:headEnd type="none" w="med" len="med"/>
+            <a:tailEnd type="arrow" w="med" len="med"/>
+          </a:ln>
+        </p:spPr>
+        <p:txBody>
+          <a:bodyPr rtlCol="0" anchor="ctr"/>
+          <a:lstStyle/>
+          <a:p>
+            <a:endParaRPr lang="en-US"/>
+          </a:p>
+        </p:txBody>
+      </p:sp>
+      <p:sp>
+        <p:nvSpPr>
+          <p:cNvPr id="9" name="Freeform: Shape 8">
+            <a:extLst>
+              <a:ext uri="{FF2B5EF4-FFF2-40B4-BE49-F238E27FC236}">
+                <a16:creationId xmlns:a16="http://schemas.microsoft.com/office/drawing/2014/main" id="{00D49BF6-03B6-B663-F835-048ED6DBC047}"/>
+              </a:ext>
+            </a:extLst>
+          </p:cNvPr>
+          <p:cNvSpPr/>
+          <p:nvPr/>
+        </p:nvSpPr>
+        <p:spPr>
+          <a:xfrm>
+            <a:off x="7198454" y="2773007"/>
+            <a:ext cx="118313" cy="118313"/>
+          </a:xfrm>
+          <a:custGeom>
+            <a:avLst/>
+            <a:gdLst>
+              <a:gd name="connsiteX0" fmla="*/ 118313 w 118313"/>
+              <a:gd name="connsiteY0" fmla="*/ 0 h 118313"/>
+              <a:gd name="connsiteX1" fmla="*/ 1211 w 118313"/>
+              <a:gd name="connsiteY1" fmla="*/ 117474 h 118313"/>
+              <a:gd name="connsiteX2" fmla="*/ 0 w 118313"/>
+              <a:gd name="connsiteY2" fmla="*/ 846 h 118313"/>
+              <a:gd name="connsiteX3" fmla="*/ 117102 w 118313"/>
+              <a:gd name="connsiteY3" fmla="*/ 118313 h 118313"/>
+            </a:gdLst>
+            <a:ahLst/>
+            <a:cxnLst>
+              <a:cxn ang="0">
+                <a:pos x="connsiteX0" y="connsiteY0"/>
+              </a:cxn>
+              <a:cxn ang="0">
+                <a:pos x="connsiteX1" y="connsiteY1"/>
+              </a:cxn>
+              <a:cxn ang="0">
+                <a:pos x="connsiteX2" y="connsiteY2"/>
+              </a:cxn>
+              <a:cxn ang="0">
+                <a:pos x="connsiteX3" y="connsiteY3"/>
+              </a:cxn>
+            </a:cxnLst>
+            <a:rect l="l" t="t" r="r" b="b"/>
+            <a:pathLst>
+              <a:path w="118313" h="118313">
+                <a:moveTo>
+                  <a:pt x="118313" y="0"/>
+                </a:moveTo>
+                <a:lnTo>
+                  <a:pt x="1211" y="117474"/>
+                </a:lnTo>
+                <a:moveTo>
+                  <a:pt x="0" y="846"/>
+                </a:moveTo>
+                <a:lnTo>
+                  <a:pt x="117102" y="118313"/>
+                </a:lnTo>
+              </a:path>
+            </a:pathLst>
+          </a:custGeom>
+          <a:noFill/>
+          <a:ln w="24486" cap="rnd">
+            <a:solidFill>
+              <a:srgbClr val="808080"/>
+            </a:solidFill>
+            <a:prstDash val="solid"/>
+            <a:miter/>
+          </a:ln>
+        </p:spPr>
+        <p:txBody>
+          <a:bodyPr rtlCol="0" anchor="ctr"/>
+          <a:lstStyle/>
+          <a:p>
+            <a:endParaRPr lang="en-US"/>
+          </a:p>
+        </p:txBody>
+      </p:sp>
+      <p:sp>
+        <p:nvSpPr>
+          <p:cNvPr id="10" name="Freeform: Shape 9">
+            <a:extLst>
+              <a:ext uri="{FF2B5EF4-FFF2-40B4-BE49-F238E27FC236}">
+                <a16:creationId xmlns:a16="http://schemas.microsoft.com/office/drawing/2014/main" id="{C3CBEEB3-FB5C-FF45-7291-ADBE349ABAA3}"/>
+              </a:ext>
+            </a:extLst>
+          </p:cNvPr>
+          <p:cNvSpPr/>
+          <p:nvPr/>
+        </p:nvSpPr>
+        <p:spPr>
+          <a:xfrm>
+            <a:off x="4884522" y="2773007"/>
+            <a:ext cx="118313" cy="118313"/>
+          </a:xfrm>
+          <a:custGeom>
+            <a:avLst/>
+            <a:gdLst>
+              <a:gd name="connsiteX0" fmla="*/ 118313 w 118313"/>
+              <a:gd name="connsiteY0" fmla="*/ 0 h 118313"/>
+              <a:gd name="connsiteX1" fmla="*/ 1211 w 118313"/>
+              <a:gd name="connsiteY1" fmla="*/ 117474 h 118313"/>
+              <a:gd name="connsiteX2" fmla="*/ 0 w 118313"/>
+              <a:gd name="connsiteY2" fmla="*/ 846 h 118313"/>
+              <a:gd name="connsiteX3" fmla="*/ 117102 w 118313"/>
+              <a:gd name="connsiteY3" fmla="*/ 118313 h 118313"/>
+            </a:gdLst>
+            <a:ahLst/>
+            <a:cxnLst>
+              <a:cxn ang="0">
+                <a:pos x="connsiteX0" y="connsiteY0"/>
+              </a:cxn>
+              <a:cxn ang="0">
+                <a:pos x="connsiteX1" y="connsiteY1"/>
+              </a:cxn>
+              <a:cxn ang="0">
+                <a:pos x="connsiteX2" y="connsiteY2"/>
+              </a:cxn>
+              <a:cxn ang="0">
+                <a:pos x="connsiteX3" y="connsiteY3"/>
+              </a:cxn>
+            </a:cxnLst>
+            <a:rect l="l" t="t" r="r" b="b"/>
+            <a:pathLst>
+              <a:path w="118313" h="118313">
+                <a:moveTo>
+                  <a:pt x="118313" y="0"/>
+                </a:moveTo>
+                <a:lnTo>
+                  <a:pt x="1211" y="117474"/>
+                </a:lnTo>
+                <a:moveTo>
+                  <a:pt x="0" y="846"/>
+                </a:moveTo>
+                <a:lnTo>
+                  <a:pt x="117102" y="118313"/>
+                </a:lnTo>
+              </a:path>
+            </a:pathLst>
+          </a:custGeom>
+          <a:noFill/>
+          <a:ln w="24486" cap="rnd">
+            <a:solidFill>
+              <a:srgbClr val="808080"/>
+            </a:solidFill>
+            <a:prstDash val="solid"/>
+            <a:miter/>
+          </a:ln>
+        </p:spPr>
+        <p:txBody>
+          <a:bodyPr rtlCol="0" anchor="ctr"/>
+          <a:lstStyle/>
+          <a:p>
+            <a:endParaRPr lang="en-US"/>
+          </a:p>
+        </p:txBody>
+      </p:sp>
+      <p:sp>
+        <p:nvSpPr>
+          <p:cNvPr id="11" name="Freeform: Shape 10">
+            <a:extLst>
+              <a:ext uri="{FF2B5EF4-FFF2-40B4-BE49-F238E27FC236}">
+                <a16:creationId xmlns:a16="http://schemas.microsoft.com/office/drawing/2014/main" id="{0CE27A4C-A10B-B0D0-C9DC-3859E6B44041}"/>
+              </a:ext>
+            </a:extLst>
+          </p:cNvPr>
+          <p:cNvSpPr/>
+          <p:nvPr/>
+        </p:nvSpPr>
+        <p:spPr>
+          <a:xfrm>
+            <a:off x="4884522" y="5086939"/>
+            <a:ext cx="118313" cy="118313"/>
+          </a:xfrm>
+          <a:custGeom>
+            <a:avLst/>
+            <a:gdLst>
+              <a:gd name="connsiteX0" fmla="*/ 118313 w 118313"/>
+              <a:gd name="connsiteY0" fmla="*/ 0 h 118313"/>
+              <a:gd name="connsiteX1" fmla="*/ 1211 w 118313"/>
+              <a:gd name="connsiteY1" fmla="*/ 117473 h 118313"/>
+              <a:gd name="connsiteX2" fmla="*/ 0 w 118313"/>
+              <a:gd name="connsiteY2" fmla="*/ 840 h 118313"/>
+              <a:gd name="connsiteX3" fmla="*/ 117102 w 118313"/>
+              <a:gd name="connsiteY3" fmla="*/ 118313 h 118313"/>
+            </a:gdLst>
+            <a:ahLst/>
+            <a:cxnLst>
+              <a:cxn ang="0">
+                <a:pos x="connsiteX0" y="connsiteY0"/>
+              </a:cxn>
+              <a:cxn ang="0">
+                <a:pos x="connsiteX1" y="connsiteY1"/>
+              </a:cxn>
+              <a:cxn ang="0">
+                <a:pos x="connsiteX2" y="connsiteY2"/>
+              </a:cxn>
+              <a:cxn ang="0">
+                <a:pos x="connsiteX3" y="connsiteY3"/>
+              </a:cxn>
+            </a:cxnLst>
+            <a:rect l="l" t="t" r="r" b="b"/>
+            <a:pathLst>
+              <a:path w="118313" h="118313">
+                <a:moveTo>
+                  <a:pt x="118313" y="0"/>
+                </a:moveTo>
+                <a:lnTo>
+                  <a:pt x="1211" y="117473"/>
+                </a:lnTo>
+                <a:moveTo>
+                  <a:pt x="0" y="840"/>
+                </a:moveTo>
+                <a:lnTo>
+                  <a:pt x="117102" y="118313"/>
+                </a:lnTo>
+              </a:path>
+            </a:pathLst>
+          </a:custGeom>
+          <a:noFill/>
+          <a:ln w="24486" cap="rnd">
+            <a:solidFill>
+              <a:srgbClr val="808080"/>
+            </a:solidFill>
+            <a:prstDash val="solid"/>
+            <a:miter/>
+          </a:ln>
+        </p:spPr>
+        <p:txBody>
+          <a:bodyPr rtlCol="0" anchor="ctr"/>
+          <a:lstStyle/>
+          <a:p>
+            <a:endParaRPr lang="en-US"/>
+          </a:p>
+        </p:txBody>
+      </p:sp>
+      <p:sp>
+        <p:nvSpPr>
+          <p:cNvPr id="12" name="Freeform: Shape 11">
+            <a:extLst>
+              <a:ext uri="{FF2B5EF4-FFF2-40B4-BE49-F238E27FC236}">
+                <a16:creationId xmlns:a16="http://schemas.microsoft.com/office/drawing/2014/main" id="{B7A8AF2E-7B93-51E5-C292-EF29327932D4}"/>
+              </a:ext>
+            </a:extLst>
+          </p:cNvPr>
+          <p:cNvSpPr/>
+          <p:nvPr/>
+        </p:nvSpPr>
+        <p:spPr>
+          <a:xfrm>
+            <a:off x="7198454" y="5086939"/>
+            <a:ext cx="118313" cy="118313"/>
+          </a:xfrm>
+          <a:custGeom>
+            <a:avLst/>
+            <a:gdLst>
+              <a:gd name="connsiteX0" fmla="*/ 118313 w 118313"/>
+              <a:gd name="connsiteY0" fmla="*/ 0 h 118313"/>
+              <a:gd name="connsiteX1" fmla="*/ 1211 w 118313"/>
+              <a:gd name="connsiteY1" fmla="*/ 117473 h 118313"/>
+              <a:gd name="connsiteX2" fmla="*/ 0 w 118313"/>
+              <a:gd name="connsiteY2" fmla="*/ 840 h 118313"/>
+              <a:gd name="connsiteX3" fmla="*/ 117102 w 118313"/>
+              <a:gd name="connsiteY3" fmla="*/ 118313 h 118313"/>
+            </a:gdLst>
+            <a:ahLst/>
+            <a:cxnLst>
+              <a:cxn ang="0">
+                <a:pos x="connsiteX0" y="connsiteY0"/>
+              </a:cxn>
+              <a:cxn ang="0">
+                <a:pos x="connsiteX1" y="connsiteY1"/>
+              </a:cxn>
+              <a:cxn ang="0">
+                <a:pos x="connsiteX2" y="connsiteY2"/>
+              </a:cxn>
+              <a:cxn ang="0">
+                <a:pos x="connsiteX3" y="connsiteY3"/>
+              </a:cxn>
+            </a:cxnLst>
+            <a:rect l="l" t="t" r="r" b="b"/>
+            <a:pathLst>
+              <a:path w="118313" h="118313">
+                <a:moveTo>
+                  <a:pt x="118313" y="0"/>
+                </a:moveTo>
+                <a:lnTo>
+                  <a:pt x="1211" y="117473"/>
+                </a:lnTo>
+                <a:moveTo>
+                  <a:pt x="0" y="840"/>
+                </a:moveTo>
+                <a:lnTo>
+                  <a:pt x="117102" y="118313"/>
+                </a:lnTo>
+              </a:path>
+            </a:pathLst>
+          </a:custGeom>
+          <a:noFill/>
+          <a:ln w="24486" cap="rnd">
+            <a:solidFill>
+              <a:srgbClr val="808080"/>
+            </a:solidFill>
+            <a:prstDash val="solid"/>
+            <a:miter/>
+          </a:ln>
+        </p:spPr>
+        <p:txBody>
+          <a:bodyPr rtlCol="0" anchor="ctr"/>
+          <a:lstStyle/>
+          <a:p>
+            <a:endParaRPr lang="en-US"/>
+          </a:p>
+        </p:txBody>
+      </p:sp>
+      <p:sp>
+        <p:nvSpPr>
+          <p:cNvPr id="13" name="Freeform: Shape 12">
+            <a:extLst>
+              <a:ext uri="{FF2B5EF4-FFF2-40B4-BE49-F238E27FC236}">
+                <a16:creationId xmlns:a16="http://schemas.microsoft.com/office/drawing/2014/main" id="{BCF3C45F-09D5-D9D1-9904-3621CE697B16}"/>
+              </a:ext>
+            </a:extLst>
+          </p:cNvPr>
+          <p:cNvSpPr/>
+          <p:nvPr/>
+        </p:nvSpPr>
+        <p:spPr>
+          <a:xfrm>
+            <a:off x="3772431" y="1660916"/>
+            <a:ext cx="4656430" cy="4656430"/>
+          </a:xfrm>
+          <a:custGeom>
+            <a:avLst/>
+            <a:gdLst>
+              <a:gd name="connsiteX0" fmla="*/ 0 w 4656430"/>
+              <a:gd name="connsiteY0" fmla="*/ 0 h 4656430"/>
+              <a:gd name="connsiteX1" fmla="*/ 4656431 w 4656430"/>
+              <a:gd name="connsiteY1" fmla="*/ 0 h 4656430"/>
+              <a:gd name="connsiteX2" fmla="*/ 4656431 w 4656430"/>
+              <a:gd name="connsiteY2" fmla="*/ 4656431 h 4656430"/>
+              <a:gd name="connsiteX3" fmla="*/ 0 w 4656430"/>
+              <a:gd name="connsiteY3" fmla="*/ 4656431 h 4656430"/>
+            </a:gdLst>
+            <a:ahLst/>
+            <a:cxnLst>
+              <a:cxn ang="0">
+                <a:pos x="connsiteX0" y="connsiteY0"/>
+              </a:cxn>
+              <a:cxn ang="0">
+                <a:pos x="connsiteX1" y="connsiteY1"/>
+              </a:cxn>
+              <a:cxn ang="0">
+                <a:pos x="connsiteX2" y="connsiteY2"/>
+              </a:cxn>
+              <a:cxn ang="0">
+                <a:pos x="connsiteX3" y="connsiteY3"/>
+              </a:cxn>
+            </a:cxnLst>
+            <a:rect l="l" t="t" r="r" b="b"/>
+            <a:pathLst>
+              <a:path w="4656430" h="4656430">
+                <a:moveTo>
+                  <a:pt x="0" y="0"/>
+                </a:moveTo>
+                <a:lnTo>
+                  <a:pt x="4656431" y="0"/>
+                </a:lnTo>
+                <a:lnTo>
+                  <a:pt x="4656431" y="4656431"/>
+                </a:lnTo>
+                <a:lnTo>
+                  <a:pt x="0" y="4656431"/>
+                </a:lnTo>
+                <a:close/>
+              </a:path>
+            </a:pathLst>
+          </a:custGeom>
+          <a:noFill/>
+          <a:ln w="57055" cap="rnd">
+            <a:solidFill>
+              <a:srgbClr val="5AA02C"/>
+            </a:solidFill>
+            <a:prstDash val="solid"/>
+            <a:miter/>
+          </a:ln>
+        </p:spPr>
+        <p:txBody>
+          <a:bodyPr rtlCol="0" anchor="ctr"/>
+          <a:lstStyle/>
+          <a:p>
+            <a:endParaRPr lang="en-US"/>
+          </a:p>
+        </p:txBody>
+      </p:sp>
+      <p:sp>
+        <p:nvSpPr>
+          <p:cNvPr id="14" name="Freeform: Shape 13">
+            <a:extLst>
+              <a:ext uri="{FF2B5EF4-FFF2-40B4-BE49-F238E27FC236}">
+                <a16:creationId xmlns:a16="http://schemas.microsoft.com/office/drawing/2014/main" id="{EF9D74C7-71B0-45DA-FFCE-AE3EB565E6A6}"/>
+              </a:ext>
+            </a:extLst>
+          </p:cNvPr>
+          <p:cNvSpPr/>
+          <p:nvPr/>
+        </p:nvSpPr>
+        <p:spPr>
+          <a:xfrm>
+            <a:off x="6241137" y="1815691"/>
+            <a:ext cx="2032946" cy="2032946"/>
+          </a:xfrm>
+          <a:custGeom>
+            <a:avLst/>
+            <a:gdLst>
+              <a:gd name="connsiteX0" fmla="*/ 2032946 w 2032946"/>
+              <a:gd name="connsiteY0" fmla="*/ 1016473 h 2032946"/>
+              <a:gd name="connsiteX1" fmla="*/ 1016473 w 2032946"/>
+              <a:gd name="connsiteY1" fmla="*/ 2032946 h 2032946"/>
+              <a:gd name="connsiteX2" fmla="*/ 0 w 2032946"/>
+              <a:gd name="connsiteY2" fmla="*/ 1016473 h 2032946"/>
+              <a:gd name="connsiteX3" fmla="*/ 1016473 w 2032946"/>
+              <a:gd name="connsiteY3" fmla="*/ 0 h 2032946"/>
+              <a:gd name="connsiteX4" fmla="*/ 2032946 w 2032946"/>
+              <a:gd name="connsiteY4" fmla="*/ 1016473 h 2032946"/>
+            </a:gdLst>
+            <a:ahLst/>
+            <a:cxnLst>
+              <a:cxn ang="0">
+                <a:pos x="connsiteX0" y="connsiteY0"/>
+              </a:cxn>
+              <a:cxn ang="0">
+                <a:pos x="connsiteX1" y="connsiteY1"/>
+              </a:cxn>
+              <a:cxn ang="0">
+                <a:pos x="connsiteX2" y="connsiteY2"/>
+              </a:cxn>
+              <a:cxn ang="0">
+                <a:pos x="connsiteX3" y="connsiteY3"/>
+              </a:cxn>
+              <a:cxn ang="0">
+                <a:pos x="connsiteX4" y="connsiteY4"/>
+              </a:cxn>
+            </a:cxnLst>
+            <a:rect l="l" t="t" r="r" b="b"/>
+            <a:pathLst>
+              <a:path w="2032946" h="2032946">
+                <a:moveTo>
+                  <a:pt x="2032946" y="1016473"/>
+                </a:moveTo>
+                <a:cubicBezTo>
+                  <a:pt x="2032946" y="1577856"/>
+                  <a:pt x="1577856" y="2032946"/>
+                  <a:pt x="1016473" y="2032946"/>
+                </a:cubicBezTo>
+                <a:cubicBezTo>
+                  <a:pt x="455090" y="2032946"/>
+                  <a:pt x="0" y="1577856"/>
+                  <a:pt x="0" y="1016473"/>
+                </a:cubicBezTo>
+                <a:cubicBezTo>
+                  <a:pt x="0" y="455090"/>
+                  <a:pt x="455090" y="0"/>
+                  <a:pt x="1016473" y="0"/>
+                </a:cubicBezTo>
+                <a:cubicBezTo>
+                  <a:pt x="1577856" y="0"/>
+                  <a:pt x="2032946" y="455090"/>
+                  <a:pt x="2032946" y="1016473"/>
+                </a:cubicBezTo>
+                <a:close/>
+              </a:path>
+            </a:pathLst>
+          </a:custGeom>
+          <a:noFill/>
+          <a:ln w="40962" cap="sq">
+            <a:solidFill>
+              <a:srgbClr val="37ABC8"/>
+            </a:solidFill>
+            <a:prstDash val="solid"/>
+            <a:miter/>
+          </a:ln>
+        </p:spPr>
+        <p:txBody>
+          <a:bodyPr rtlCol="0" anchor="ctr"/>
+          <a:lstStyle/>
+          <a:p>
+            <a:endParaRPr lang="en-US"/>
+          </a:p>
+        </p:txBody>
+      </p:sp>
+      <p:sp>
+        <p:nvSpPr>
+          <p:cNvPr id="15" name="Freeform: Shape 14">
+            <a:extLst>
+              <a:ext uri="{FF2B5EF4-FFF2-40B4-BE49-F238E27FC236}">
+                <a16:creationId xmlns:a16="http://schemas.microsoft.com/office/drawing/2014/main" id="{48CC54B0-A2D9-6AB9-0D4C-5FDE77496E88}"/>
+              </a:ext>
+            </a:extLst>
+          </p:cNvPr>
+          <p:cNvSpPr/>
+          <p:nvPr/>
+        </p:nvSpPr>
+        <p:spPr>
+          <a:xfrm>
+            <a:off x="3927205" y="1815691"/>
+            <a:ext cx="2032946" cy="2032946"/>
+          </a:xfrm>
+          <a:custGeom>
+            <a:avLst/>
+            <a:gdLst>
+              <a:gd name="connsiteX0" fmla="*/ 2032946 w 2032946"/>
+              <a:gd name="connsiteY0" fmla="*/ 1016473 h 2032946"/>
+              <a:gd name="connsiteX1" fmla="*/ 1016473 w 2032946"/>
+              <a:gd name="connsiteY1" fmla="*/ 2032946 h 2032946"/>
+              <a:gd name="connsiteX2" fmla="*/ 0 w 2032946"/>
+              <a:gd name="connsiteY2" fmla="*/ 1016473 h 2032946"/>
+              <a:gd name="connsiteX3" fmla="*/ 1016473 w 2032946"/>
+              <a:gd name="connsiteY3" fmla="*/ 0 h 2032946"/>
+              <a:gd name="connsiteX4" fmla="*/ 2032946 w 2032946"/>
+              <a:gd name="connsiteY4" fmla="*/ 1016473 h 2032946"/>
+            </a:gdLst>
+            <a:ahLst/>
+            <a:cxnLst>
+              <a:cxn ang="0">
+                <a:pos x="connsiteX0" y="connsiteY0"/>
+              </a:cxn>
+              <a:cxn ang="0">
+                <a:pos x="connsiteX1" y="connsiteY1"/>
+              </a:cxn>
+              <a:cxn ang="0">
+                <a:pos x="connsiteX2" y="connsiteY2"/>
+              </a:cxn>
+              <a:cxn ang="0">
+                <a:pos x="connsiteX3" y="connsiteY3"/>
+              </a:cxn>
+              <a:cxn ang="0">
+                <a:pos x="connsiteX4" y="connsiteY4"/>
+              </a:cxn>
+            </a:cxnLst>
+            <a:rect l="l" t="t" r="r" b="b"/>
+            <a:pathLst>
+              <a:path w="2032946" h="2032946">
+                <a:moveTo>
+                  <a:pt x="2032946" y="1016473"/>
+                </a:moveTo>
+                <a:cubicBezTo>
+                  <a:pt x="2032946" y="1577856"/>
+                  <a:pt x="1577856" y="2032946"/>
+                  <a:pt x="1016473" y="2032946"/>
+                </a:cubicBezTo>
+                <a:cubicBezTo>
+                  <a:pt x="455090" y="2032946"/>
+                  <a:pt x="0" y="1577856"/>
+                  <a:pt x="0" y="1016473"/>
+                </a:cubicBezTo>
+                <a:cubicBezTo>
+                  <a:pt x="0" y="455090"/>
+                  <a:pt x="455090" y="0"/>
+                  <a:pt x="1016473" y="0"/>
+                </a:cubicBezTo>
+                <a:cubicBezTo>
+                  <a:pt x="1577856" y="0"/>
+                  <a:pt x="2032946" y="455090"/>
+                  <a:pt x="2032946" y="1016473"/>
+                </a:cubicBezTo>
+                <a:close/>
+              </a:path>
+            </a:pathLst>
+          </a:custGeom>
+          <a:noFill/>
+          <a:ln w="40962" cap="sq">
+            <a:solidFill>
+              <a:srgbClr val="37ABC8"/>
+            </a:solidFill>
+            <a:prstDash val="solid"/>
+            <a:miter/>
+          </a:ln>
+        </p:spPr>
+        <p:txBody>
+          <a:bodyPr rtlCol="0" anchor="ctr"/>
+          <a:lstStyle/>
+          <a:p>
+            <a:endParaRPr lang="en-US"/>
+          </a:p>
+        </p:txBody>
+      </p:sp>
+      <p:sp>
+        <p:nvSpPr>
+          <p:cNvPr id="16" name="Freeform: Shape 15">
+            <a:extLst>
+              <a:ext uri="{FF2B5EF4-FFF2-40B4-BE49-F238E27FC236}">
+                <a16:creationId xmlns:a16="http://schemas.microsoft.com/office/drawing/2014/main" id="{0057DA03-92DF-01AD-EE8B-ED884EAE46B8}"/>
+              </a:ext>
+            </a:extLst>
+          </p:cNvPr>
+          <p:cNvSpPr/>
+          <p:nvPr/>
+        </p:nvSpPr>
+        <p:spPr>
+          <a:xfrm>
+            <a:off x="3927205" y="4129622"/>
+            <a:ext cx="2032946" cy="2032946"/>
+          </a:xfrm>
+          <a:custGeom>
+            <a:avLst/>
+            <a:gdLst>
+              <a:gd name="connsiteX0" fmla="*/ 2032946 w 2032946"/>
+              <a:gd name="connsiteY0" fmla="*/ 1016473 h 2032946"/>
+              <a:gd name="connsiteX1" fmla="*/ 1016473 w 2032946"/>
+              <a:gd name="connsiteY1" fmla="*/ 2032946 h 2032946"/>
+              <a:gd name="connsiteX2" fmla="*/ 0 w 2032946"/>
+              <a:gd name="connsiteY2" fmla="*/ 1016473 h 2032946"/>
+              <a:gd name="connsiteX3" fmla="*/ 1016473 w 2032946"/>
+              <a:gd name="connsiteY3" fmla="*/ 0 h 2032946"/>
+              <a:gd name="connsiteX4" fmla="*/ 2032946 w 2032946"/>
+              <a:gd name="connsiteY4" fmla="*/ 1016473 h 2032946"/>
+            </a:gdLst>
+            <a:ahLst/>
+            <a:cxnLst>
+              <a:cxn ang="0">
+                <a:pos x="connsiteX0" y="connsiteY0"/>
+              </a:cxn>
+              <a:cxn ang="0">
+                <a:pos x="connsiteX1" y="connsiteY1"/>
+              </a:cxn>
+              <a:cxn ang="0">
+                <a:pos x="connsiteX2" y="connsiteY2"/>
+              </a:cxn>
+              <a:cxn ang="0">
+                <a:pos x="connsiteX3" y="connsiteY3"/>
+              </a:cxn>
+              <a:cxn ang="0">
+                <a:pos x="connsiteX4" y="connsiteY4"/>
+              </a:cxn>
+            </a:cxnLst>
+            <a:rect l="l" t="t" r="r" b="b"/>
+            <a:pathLst>
+              <a:path w="2032946" h="2032946">
+                <a:moveTo>
+                  <a:pt x="2032946" y="1016473"/>
+                </a:moveTo>
+                <a:cubicBezTo>
+                  <a:pt x="2032946" y="1577856"/>
+                  <a:pt x="1577856" y="2032946"/>
+                  <a:pt x="1016473" y="2032946"/>
+                </a:cubicBezTo>
+                <a:cubicBezTo>
+                  <a:pt x="455090" y="2032946"/>
+                  <a:pt x="0" y="1577856"/>
+                  <a:pt x="0" y="1016473"/>
+                </a:cubicBezTo>
+                <a:cubicBezTo>
+                  <a:pt x="0" y="455091"/>
+                  <a:pt x="455090" y="0"/>
+                  <a:pt x="1016473" y="0"/>
+                </a:cubicBezTo>
+                <a:cubicBezTo>
+                  <a:pt x="1577856" y="0"/>
+                  <a:pt x="2032946" y="455091"/>
+                  <a:pt x="2032946" y="1016473"/>
+                </a:cubicBezTo>
+                <a:close/>
+              </a:path>
+            </a:pathLst>
+          </a:custGeom>
+          <a:noFill/>
+          <a:ln w="40962" cap="sq">
+            <a:solidFill>
+              <a:srgbClr val="37ABC8"/>
+            </a:solidFill>
+            <a:prstDash val="solid"/>
+            <a:miter/>
+          </a:ln>
+        </p:spPr>
+        <p:txBody>
+          <a:bodyPr rtlCol="0" anchor="ctr"/>
+          <a:lstStyle/>
+          <a:p>
+            <a:endParaRPr lang="en-US"/>
+          </a:p>
+        </p:txBody>
+      </p:sp>
+      <p:sp>
+        <p:nvSpPr>
+          <p:cNvPr id="17" name="Freeform: Shape 16">
+            <a:extLst>
+              <a:ext uri="{FF2B5EF4-FFF2-40B4-BE49-F238E27FC236}">
+                <a16:creationId xmlns:a16="http://schemas.microsoft.com/office/drawing/2014/main" id="{C89A0A16-5BD3-2FCF-F8C7-A673A4C8EB89}"/>
+              </a:ext>
+            </a:extLst>
+          </p:cNvPr>
+          <p:cNvSpPr/>
+          <p:nvPr/>
+        </p:nvSpPr>
+        <p:spPr>
+          <a:xfrm>
+            <a:off x="6241137" y="4129622"/>
+            <a:ext cx="2032946" cy="2032946"/>
+          </a:xfrm>
+          <a:custGeom>
+            <a:avLst/>
+            <a:gdLst>
+              <a:gd name="connsiteX0" fmla="*/ 2032946 w 2032946"/>
+              <a:gd name="connsiteY0" fmla="*/ 1016473 h 2032946"/>
+              <a:gd name="connsiteX1" fmla="*/ 1016473 w 2032946"/>
+              <a:gd name="connsiteY1" fmla="*/ 2032946 h 2032946"/>
+              <a:gd name="connsiteX2" fmla="*/ 0 w 2032946"/>
+              <a:gd name="connsiteY2" fmla="*/ 1016473 h 2032946"/>
+              <a:gd name="connsiteX3" fmla="*/ 1016473 w 2032946"/>
+              <a:gd name="connsiteY3" fmla="*/ 0 h 2032946"/>
+              <a:gd name="connsiteX4" fmla="*/ 2032946 w 2032946"/>
+              <a:gd name="connsiteY4" fmla="*/ 1016473 h 2032946"/>
+            </a:gdLst>
+            <a:ahLst/>
+            <a:cxnLst>
+              <a:cxn ang="0">
+                <a:pos x="connsiteX0" y="connsiteY0"/>
+              </a:cxn>
+              <a:cxn ang="0">
+                <a:pos x="connsiteX1" y="connsiteY1"/>
+              </a:cxn>
+              <a:cxn ang="0">
+                <a:pos x="connsiteX2" y="connsiteY2"/>
+              </a:cxn>
+              <a:cxn ang="0">
+                <a:pos x="connsiteX3" y="connsiteY3"/>
+              </a:cxn>
+              <a:cxn ang="0">
+                <a:pos x="connsiteX4" y="connsiteY4"/>
+              </a:cxn>
+            </a:cxnLst>
+            <a:rect l="l" t="t" r="r" b="b"/>
+            <a:pathLst>
+              <a:path w="2032946" h="2032946">
+                <a:moveTo>
+                  <a:pt x="2032946" y="1016473"/>
+                </a:moveTo>
+                <a:cubicBezTo>
+                  <a:pt x="2032946" y="1577856"/>
+                  <a:pt x="1577856" y="2032946"/>
+                  <a:pt x="1016473" y="2032946"/>
+                </a:cubicBezTo>
+                <a:cubicBezTo>
+                  <a:pt x="455090" y="2032946"/>
+                  <a:pt x="0" y="1577856"/>
+                  <a:pt x="0" y="1016473"/>
+                </a:cubicBezTo>
+                <a:cubicBezTo>
+                  <a:pt x="0" y="455091"/>
+                  <a:pt x="455090" y="0"/>
+                  <a:pt x="1016473" y="0"/>
+                </a:cubicBezTo>
+                <a:cubicBezTo>
+                  <a:pt x="1577856" y="0"/>
+                  <a:pt x="2032946" y="455091"/>
+                  <a:pt x="2032946" y="1016473"/>
+                </a:cubicBezTo>
+                <a:close/>
+              </a:path>
+            </a:pathLst>
+          </a:custGeom>
+          <a:noFill/>
+          <a:ln w="40962" cap="sq">
+            <a:solidFill>
+              <a:srgbClr val="37ABC8"/>
+            </a:solidFill>
+            <a:prstDash val="solid"/>
+            <a:miter/>
+          </a:ln>
+        </p:spPr>
+        <p:txBody>
+          <a:bodyPr rtlCol="0" anchor="ctr"/>
+          <a:lstStyle/>
+          <a:p>
+            <a:endParaRPr lang="en-US"/>
+          </a:p>
+        </p:txBody>
+      </p:sp>
+      <p:sp>
+        <p:nvSpPr>
+          <p:cNvPr id="18" name="Freeform: Shape 17">
+            <a:extLst>
+              <a:ext uri="{FF2B5EF4-FFF2-40B4-BE49-F238E27FC236}">
+                <a16:creationId xmlns:a16="http://schemas.microsoft.com/office/drawing/2014/main" id="{20CFACD3-A0D9-67C3-84A7-D035DEA025E0}"/>
+              </a:ext>
+            </a:extLst>
+          </p:cNvPr>
+          <p:cNvSpPr/>
+          <p:nvPr/>
+        </p:nvSpPr>
+        <p:spPr>
+          <a:xfrm>
+            <a:off x="5529263" y="3417748"/>
+            <a:ext cx="1142762" cy="1142762"/>
+          </a:xfrm>
+          <a:custGeom>
+            <a:avLst/>
+            <a:gdLst>
+              <a:gd name="connsiteX0" fmla="*/ 1142762 w 1142762"/>
+              <a:gd name="connsiteY0" fmla="*/ 571381 h 1142762"/>
+              <a:gd name="connsiteX1" fmla="*/ 571381 w 1142762"/>
+              <a:gd name="connsiteY1" fmla="*/ 1142763 h 1142762"/>
+              <a:gd name="connsiteX2" fmla="*/ 0 w 1142762"/>
+              <a:gd name="connsiteY2" fmla="*/ 571381 h 1142762"/>
+              <a:gd name="connsiteX3" fmla="*/ 571381 w 1142762"/>
+              <a:gd name="connsiteY3" fmla="*/ 0 h 1142762"/>
+              <a:gd name="connsiteX4" fmla="*/ 1142762 w 1142762"/>
+              <a:gd name="connsiteY4" fmla="*/ 571381 h 1142762"/>
+            </a:gdLst>
+            <a:ahLst/>
+            <a:cxnLst>
+              <a:cxn ang="0">
+                <a:pos x="connsiteX0" y="connsiteY0"/>
+              </a:cxn>
+              <a:cxn ang="0">
+                <a:pos x="connsiteX1" y="connsiteY1"/>
+              </a:cxn>
+              <a:cxn ang="0">
+                <a:pos x="connsiteX2" y="connsiteY2"/>
+              </a:cxn>
+              <a:cxn ang="0">
+                <a:pos x="connsiteX3" y="connsiteY3"/>
+              </a:cxn>
+              <a:cxn ang="0">
+                <a:pos x="connsiteX4" y="connsiteY4"/>
+              </a:cxn>
+            </a:cxnLst>
+            <a:rect l="l" t="t" r="r" b="b"/>
+            <a:pathLst>
+              <a:path w="1142762" h="1142762">
+                <a:moveTo>
+                  <a:pt x="1142762" y="571381"/>
+                </a:moveTo>
+                <a:cubicBezTo>
+                  <a:pt x="1142762" y="886947"/>
+                  <a:pt x="886946" y="1142763"/>
+                  <a:pt x="571381" y="1142763"/>
+                </a:cubicBezTo>
+                <a:cubicBezTo>
+                  <a:pt x="255816" y="1142763"/>
+                  <a:pt x="0" y="886947"/>
+                  <a:pt x="0" y="571381"/>
+                </a:cubicBezTo>
+                <a:cubicBezTo>
+                  <a:pt x="0" y="255816"/>
+                  <a:pt x="255816" y="0"/>
+                  <a:pt x="571381" y="0"/>
+                </a:cubicBezTo>
+                <a:cubicBezTo>
+                  <a:pt x="886946" y="0"/>
+                  <a:pt x="1142762" y="255816"/>
+                  <a:pt x="1142762" y="571381"/>
+                </a:cubicBezTo>
+                <a:close/>
+              </a:path>
+            </a:pathLst>
+          </a:custGeom>
+          <a:noFill/>
+          <a:ln w="53836" cap="sq">
+            <a:solidFill>
+              <a:srgbClr val="D40000"/>
+            </a:solidFill>
+            <a:prstDash val="solid"/>
+            <a:miter/>
+          </a:ln>
+        </p:spPr>
+        <p:txBody>
+          <a:bodyPr rtlCol="0" anchor="ctr"/>
+          <a:lstStyle/>
+          <a:p>
+            <a:endParaRPr lang="en-US"/>
+          </a:p>
+        </p:txBody>
+      </p:sp>
+      <p:sp>
+        <p:nvSpPr>
+          <p:cNvPr id="19" name="Freeform: Shape 18">
+            <a:extLst>
+              <a:ext uri="{FF2B5EF4-FFF2-40B4-BE49-F238E27FC236}">
+                <a16:creationId xmlns:a16="http://schemas.microsoft.com/office/drawing/2014/main" id="{27307A87-992D-2A41-E04C-3A4F011CD740}"/>
+              </a:ext>
+            </a:extLst>
+          </p:cNvPr>
+          <p:cNvSpPr/>
+          <p:nvPr/>
+        </p:nvSpPr>
+        <p:spPr>
+          <a:xfrm>
+            <a:off x="3650785" y="1537819"/>
+            <a:ext cx="4901062" cy="4902358"/>
+          </a:xfrm>
+          <a:custGeom>
+            <a:avLst/>
+            <a:gdLst>
+              <a:gd name="connsiteX0" fmla="*/ 2134148 w 4901062"/>
+              <a:gd name="connsiteY0" fmla="*/ 2927015 h 4902358"/>
+              <a:gd name="connsiteX1" fmla="*/ 2382847 w 4901062"/>
+              <a:gd name="connsiteY1" fmla="*/ 3653253 h 4902358"/>
+              <a:gd name="connsiteX2" fmla="*/ 2144884 w 4901062"/>
+              <a:gd name="connsiteY2" fmla="*/ 4550887 h 4902358"/>
+              <a:gd name="connsiteX3" fmla="*/ 2450260 w 4901062"/>
+              <a:gd name="connsiteY3" fmla="*/ 4902359 h 4902358"/>
+              <a:gd name="connsiteX4" fmla="*/ 2755642 w 4901062"/>
+              <a:gd name="connsiteY4" fmla="*/ 4550887 h 4902358"/>
+              <a:gd name="connsiteX5" fmla="*/ 2517672 w 4901062"/>
+              <a:gd name="connsiteY5" fmla="*/ 3653253 h 4902358"/>
+              <a:gd name="connsiteX6" fmla="*/ 2766377 w 4901062"/>
+              <a:gd name="connsiteY6" fmla="*/ 2927015 h 4902358"/>
+              <a:gd name="connsiteX7" fmla="*/ 2925718 w 4901062"/>
+              <a:gd name="connsiteY7" fmla="*/ 2767263 h 4902358"/>
+              <a:gd name="connsiteX8" fmla="*/ 3651956 w 4901062"/>
+              <a:gd name="connsiteY8" fmla="*/ 2518558 h 4902358"/>
+              <a:gd name="connsiteX9" fmla="*/ 4549590 w 4901062"/>
+              <a:gd name="connsiteY9" fmla="*/ 2756527 h 4902358"/>
+              <a:gd name="connsiteX10" fmla="*/ 4901062 w 4901062"/>
+              <a:gd name="connsiteY10" fmla="*/ 2451145 h 4902358"/>
+              <a:gd name="connsiteX11" fmla="*/ 4549590 w 4901062"/>
+              <a:gd name="connsiteY11" fmla="*/ 2145769 h 4902358"/>
+              <a:gd name="connsiteX12" fmla="*/ 3651956 w 4901062"/>
+              <a:gd name="connsiteY12" fmla="*/ 2383733 h 4902358"/>
+              <a:gd name="connsiteX13" fmla="*/ 2925718 w 4901062"/>
+              <a:gd name="connsiteY13" fmla="*/ 2135028 h 4902358"/>
+              <a:gd name="connsiteX14" fmla="*/ 2765977 w 4901062"/>
+              <a:gd name="connsiteY14" fmla="*/ 1975344 h 4902358"/>
+              <a:gd name="connsiteX15" fmla="*/ 2517272 w 4901062"/>
+              <a:gd name="connsiteY15" fmla="*/ 1249106 h 4902358"/>
+              <a:gd name="connsiteX16" fmla="*/ 2755242 w 4901062"/>
+              <a:gd name="connsiteY16" fmla="*/ 351472 h 4902358"/>
+              <a:gd name="connsiteX17" fmla="*/ 2449860 w 4901062"/>
+              <a:gd name="connsiteY17" fmla="*/ 0 h 4902358"/>
+              <a:gd name="connsiteX18" fmla="*/ 2144484 w 4901062"/>
+              <a:gd name="connsiteY18" fmla="*/ 351472 h 4902358"/>
+              <a:gd name="connsiteX19" fmla="*/ 2382447 w 4901062"/>
+              <a:gd name="connsiteY19" fmla="*/ 1249106 h 4902358"/>
+              <a:gd name="connsiteX20" fmla="*/ 2133742 w 4901062"/>
+              <a:gd name="connsiteY20" fmla="*/ 1975344 h 4902358"/>
+              <a:gd name="connsiteX21" fmla="*/ 1975344 w 4901062"/>
+              <a:gd name="connsiteY21" fmla="*/ 2137370 h 4902358"/>
+              <a:gd name="connsiteX22" fmla="*/ 1249106 w 4901062"/>
+              <a:gd name="connsiteY22" fmla="*/ 2386075 h 4902358"/>
+              <a:gd name="connsiteX23" fmla="*/ 351472 w 4901062"/>
+              <a:gd name="connsiteY23" fmla="*/ 2148106 h 4902358"/>
+              <a:gd name="connsiteX24" fmla="*/ 0 w 4901062"/>
+              <a:gd name="connsiteY24" fmla="*/ 2453488 h 4902358"/>
+              <a:gd name="connsiteX25" fmla="*/ 351472 w 4901062"/>
+              <a:gd name="connsiteY25" fmla="*/ 2758864 h 4902358"/>
+              <a:gd name="connsiteX26" fmla="*/ 1249106 w 4901062"/>
+              <a:gd name="connsiteY26" fmla="*/ 2520900 h 4902358"/>
+              <a:gd name="connsiteX27" fmla="*/ 1975344 w 4901062"/>
+              <a:gd name="connsiteY27" fmla="*/ 2769605 h 4902358"/>
+              <a:gd name="connsiteX28" fmla="*/ 2134148 w 4901062"/>
+              <a:gd name="connsiteY28" fmla="*/ 2927015 h 4902358"/>
+            </a:gdLst>
+            <a:ahLst/>
+            <a:cxnLst>
+              <a:cxn ang="0">
+                <a:pos x="connsiteX0" y="connsiteY0"/>
+              </a:cxn>
+              <a:cxn ang="0">
+                <a:pos x="connsiteX1" y="connsiteY1"/>
+              </a:cxn>
+              <a:cxn ang="0">
+                <a:pos x="connsiteX2" y="connsiteY2"/>
+              </a:cxn>
+              <a:cxn ang="0">
+                <a:pos x="connsiteX3" y="connsiteY3"/>
+              </a:cxn>
+              <a:cxn ang="0">
+                <a:pos x="connsiteX4" y="connsiteY4"/>
+              </a:cxn>
+              <a:cxn ang="0">
+                <a:pos x="connsiteX5" y="connsiteY5"/>
+              </a:cxn>
+              <a:cxn ang="0">
+                <a:pos x="connsiteX6" y="connsiteY6"/>
+              </a:cxn>
+              <a:cxn ang="0">
+                <a:pos x="connsiteX7" y="connsiteY7"/>
+              </a:cxn>
+              <a:cxn ang="0">
+                <a:pos x="connsiteX8" y="connsiteY8"/>
+              </a:cxn>
+              <a:cxn ang="0">
+                <a:pos x="connsiteX9" y="connsiteY9"/>
+              </a:cxn>
+              <a:cxn ang="0">
+                <a:pos x="connsiteX10" y="connsiteY10"/>
+              </a:cxn>
+              <a:cxn ang="0">
+                <a:pos x="connsiteX11" y="connsiteY11"/>
+              </a:cxn>
+              <a:cxn ang="0">
+                <a:pos x="connsiteX12" y="connsiteY12"/>
+              </a:cxn>
+              <a:cxn ang="0">
+                <a:pos x="connsiteX13" y="connsiteY13"/>
+              </a:cxn>
+              <a:cxn ang="0">
+                <a:pos x="connsiteX14" y="connsiteY14"/>
+              </a:cxn>
+              <a:cxn ang="0">
+                <a:pos x="connsiteX15" y="connsiteY15"/>
+              </a:cxn>
+              <a:cxn ang="0">
+                <a:pos x="connsiteX16" y="connsiteY16"/>
+              </a:cxn>
+              <a:cxn ang="0">
+                <a:pos x="connsiteX17" y="connsiteY17"/>
+              </a:cxn>
+              <a:cxn ang="0">
+                <a:pos x="connsiteX18" y="connsiteY18"/>
+              </a:cxn>
+              <a:cxn ang="0">
+                <a:pos x="connsiteX19" y="connsiteY19"/>
+              </a:cxn>
+              <a:cxn ang="0">
+                <a:pos x="connsiteX20" y="connsiteY20"/>
+              </a:cxn>
+              <a:cxn ang="0">
+                <a:pos x="connsiteX21" y="connsiteY21"/>
+              </a:cxn>
+              <a:cxn ang="0">
+                <a:pos x="connsiteX22" y="connsiteY22"/>
+              </a:cxn>
+              <a:cxn ang="0">
+                <a:pos x="connsiteX23" y="connsiteY23"/>
+              </a:cxn>
+              <a:cxn ang="0">
+                <a:pos x="connsiteX24" y="connsiteY24"/>
+              </a:cxn>
+              <a:cxn ang="0">
+                <a:pos x="connsiteX25" y="connsiteY25"/>
+              </a:cxn>
+              <a:cxn ang="0">
+                <a:pos x="connsiteX26" y="connsiteY26"/>
+              </a:cxn>
+              <a:cxn ang="0">
+                <a:pos x="connsiteX27" y="connsiteY27"/>
+              </a:cxn>
+              <a:cxn ang="0">
+                <a:pos x="connsiteX28" y="connsiteY28"/>
+              </a:cxn>
+            </a:cxnLst>
+            <a:rect l="l" t="t" r="r" b="b"/>
+            <a:pathLst>
+              <a:path w="4901062" h="4902358">
+                <a:moveTo>
+                  <a:pt x="2134148" y="2927015"/>
+                </a:moveTo>
+                <a:cubicBezTo>
+                  <a:pt x="2335552" y="3064646"/>
+                  <a:pt x="2387721" y="3395247"/>
+                  <a:pt x="2382847" y="3653253"/>
+                </a:cubicBezTo>
+                <a:cubicBezTo>
+                  <a:pt x="2377979" y="3911253"/>
+                  <a:pt x="2249353" y="4331121"/>
+                  <a:pt x="2144884" y="4550887"/>
+                </a:cubicBezTo>
+                <a:cubicBezTo>
+                  <a:pt x="2040420" y="4770653"/>
+                  <a:pt x="2176844" y="4897737"/>
+                  <a:pt x="2450260" y="4902359"/>
+                </a:cubicBezTo>
+                <a:cubicBezTo>
+                  <a:pt x="2723681" y="4897737"/>
+                  <a:pt x="2860106" y="4770653"/>
+                  <a:pt x="2755642" y="4550887"/>
+                </a:cubicBezTo>
+                <a:cubicBezTo>
+                  <a:pt x="2651172" y="4331121"/>
+                  <a:pt x="2522546" y="3911253"/>
+                  <a:pt x="2517672" y="3653253"/>
+                </a:cubicBezTo>
+                <a:cubicBezTo>
+                  <a:pt x="2512804" y="3395247"/>
+                  <a:pt x="2564974" y="3064646"/>
+                  <a:pt x="2766377" y="2927015"/>
+                </a:cubicBezTo>
+                <a:cubicBezTo>
+                  <a:pt x="2824060" y="2887033"/>
+                  <a:pt x="2878931" y="2838909"/>
+                  <a:pt x="2925718" y="2767263"/>
+                </a:cubicBezTo>
+                <a:cubicBezTo>
+                  <a:pt x="3063349" y="2565859"/>
+                  <a:pt x="3393955" y="2513690"/>
+                  <a:pt x="3651956" y="2518558"/>
+                </a:cubicBezTo>
+                <a:cubicBezTo>
+                  <a:pt x="3909957" y="2523431"/>
+                  <a:pt x="4329824" y="2652057"/>
+                  <a:pt x="4549590" y="2756527"/>
+                </a:cubicBezTo>
+                <a:cubicBezTo>
+                  <a:pt x="4769357" y="2860991"/>
+                  <a:pt x="4896440" y="2724566"/>
+                  <a:pt x="4901062" y="2451145"/>
+                </a:cubicBezTo>
+                <a:cubicBezTo>
+                  <a:pt x="4896440" y="2177730"/>
+                  <a:pt x="4769357" y="2041305"/>
+                  <a:pt x="4549590" y="2145769"/>
+                </a:cubicBezTo>
+                <a:cubicBezTo>
+                  <a:pt x="4329824" y="2250233"/>
+                  <a:pt x="3909957" y="2378865"/>
+                  <a:pt x="3651956" y="2383733"/>
+                </a:cubicBezTo>
+                <a:cubicBezTo>
+                  <a:pt x="3393955" y="2388606"/>
+                  <a:pt x="3063349" y="2336437"/>
+                  <a:pt x="2925718" y="2135028"/>
+                </a:cubicBezTo>
+                <a:cubicBezTo>
+                  <a:pt x="2880994" y="2067718"/>
+                  <a:pt x="2826711" y="2016200"/>
+                  <a:pt x="2765977" y="1975344"/>
+                </a:cubicBezTo>
+                <a:cubicBezTo>
+                  <a:pt x="2564574" y="1837713"/>
+                  <a:pt x="2512404" y="1507113"/>
+                  <a:pt x="2517272" y="1249106"/>
+                </a:cubicBezTo>
+                <a:cubicBezTo>
+                  <a:pt x="2522146" y="991106"/>
+                  <a:pt x="2650772" y="571238"/>
+                  <a:pt x="2755242" y="351472"/>
+                </a:cubicBezTo>
+                <a:cubicBezTo>
+                  <a:pt x="2859706" y="131706"/>
+                  <a:pt x="2723281" y="4624"/>
+                  <a:pt x="2449860" y="0"/>
+                </a:cubicBezTo>
+                <a:cubicBezTo>
+                  <a:pt x="2176444" y="4624"/>
+                  <a:pt x="2040014" y="131706"/>
+                  <a:pt x="2144484" y="351472"/>
+                </a:cubicBezTo>
+                <a:cubicBezTo>
+                  <a:pt x="2248948" y="571238"/>
+                  <a:pt x="2377579" y="991106"/>
+                  <a:pt x="2382447" y="1249106"/>
+                </a:cubicBezTo>
+                <a:cubicBezTo>
+                  <a:pt x="2387321" y="1507113"/>
+                  <a:pt x="2335146" y="1837713"/>
+                  <a:pt x="2133742" y="1975344"/>
+                </a:cubicBezTo>
+                <a:cubicBezTo>
+                  <a:pt x="2072397" y="2017937"/>
+                  <a:pt x="2016417" y="2067701"/>
+                  <a:pt x="1975344" y="2137370"/>
+                </a:cubicBezTo>
+                <a:cubicBezTo>
+                  <a:pt x="1837713" y="2338774"/>
+                  <a:pt x="1507112" y="2390949"/>
+                  <a:pt x="1249106" y="2386075"/>
+                </a:cubicBezTo>
+                <a:cubicBezTo>
+                  <a:pt x="991106" y="2381202"/>
+                  <a:pt x="571238" y="2252576"/>
+                  <a:pt x="351472" y="2148106"/>
+                </a:cubicBezTo>
+                <a:cubicBezTo>
+                  <a:pt x="131707" y="2043642"/>
+                  <a:pt x="4624" y="2180067"/>
+                  <a:pt x="0" y="2453488"/>
+                </a:cubicBezTo>
+                <a:cubicBezTo>
+                  <a:pt x="4625" y="2726903"/>
+                  <a:pt x="131707" y="2863334"/>
+                  <a:pt x="351472" y="2758864"/>
+                </a:cubicBezTo>
+                <a:cubicBezTo>
+                  <a:pt x="571238" y="2654400"/>
+                  <a:pt x="991106" y="2525774"/>
+                  <a:pt x="1249106" y="2520900"/>
+                </a:cubicBezTo>
+                <a:cubicBezTo>
+                  <a:pt x="1507112" y="2516027"/>
+                  <a:pt x="1837713" y="2568202"/>
+                  <a:pt x="1975344" y="2769605"/>
+                </a:cubicBezTo>
+                <a:cubicBezTo>
+                  <a:pt x="2019840" y="2835538"/>
+                  <a:pt x="2073294" y="2887176"/>
+                  <a:pt x="2134148" y="2927015"/>
+                </a:cubicBezTo>
+                <a:close/>
+              </a:path>
+            </a:pathLst>
+          </a:custGeom>
+          <a:noFill/>
+          <a:ln w="57055" cap="rnd">
+            <a:solidFill>
+              <a:srgbClr val="FF6600"/>
+            </a:solidFill>
+            <a:prstDash val="solid"/>
+            <a:miter/>
+          </a:ln>
+        </p:spPr>
+        <p:txBody>
+          <a:bodyPr rtlCol="0" anchor="ctr"/>
+          <a:lstStyle/>
+          <a:p>
+            <a:endParaRPr lang="en-US"/>
+          </a:p>
+        </p:txBody>
+      </p:sp>
+    </p:spTree>
+    <p:extLst>
+      <p:ext uri="{BB962C8B-B14F-4D97-AF65-F5344CB8AC3E}">
+        <p14:creationId xmlns:p14="http://schemas.microsoft.com/office/powerpoint/2010/main" val="3708994668"/>
+      </p:ext>
+    </p:extLst>
+  </p:cSld>
+  <p:clrMapOvr>
+    <a:masterClrMapping/>
+  </p:clrMapOvr>
+  <mc:AlternateContent xmlns:mc="http://schemas.openxmlformats.org/markup-compatibility/2006">
+    <mc:Choice xmlns:p14="http://schemas.microsoft.com/office/powerpoint/2010/main" Requires="p14">
+      <p:transition spd="med" p14:dur="700">
+        <p:fade/>
+      </p:transition>
+    </mc:Choice>
+    <mc:Fallback>
+      <p:transition spd="med">
+        <p:fade/>
+      </p:transition>
+    </mc:Fallback>
+  </mc:AlternateContent>
+  <p:timing>
+    <p:tnLst>
+      <p:par>
+        <p:cTn id="1" dur="indefinite" restart="never" nodeType="tmRoot">
+          <p:childTnLst>
+            <p:seq concurrent="1" nextAc="seek">
+              <p:cTn id="2" dur="indefinite" nodeType="mainSeq">
+                <p:childTnLst>
+                  <p:par>
+                    <p:cTn id="3" fill="hold">
+                      <p:stCondLst>
+                        <p:cond delay="indefinite"/>
+                      </p:stCondLst>
+                      <p:childTnLst>
+                        <p:par>
+                          <p:cTn id="4" fill="hold">
+                            <p:stCondLst>
+                              <p:cond delay="0"/>
+                            </p:stCondLst>
+                            <p:childTnLst>
+                              <p:par>
+                                <p:cTn id="5" presetID="10" presetClass="entr" presetSubtype="0" fill="hold" grpId="0" nodeType="clickEffect">
+                                  <p:stCondLst>
+                                    <p:cond delay="0"/>
+                                  </p:stCondLst>
+                                  <p:childTnLst>
+                                    <p:set>
+                                      <p:cBhvr>
+                                        <p:cTn id="6" dur="1" fill="hold">
+                                          <p:stCondLst>
+                                            <p:cond delay="0"/>
+                                          </p:stCondLst>
+                                        </p:cTn>
+                                        <p:tgtEl>
+                                          <p:spTgt spid="19"/>
+                                        </p:tgtEl>
+                                        <p:attrNameLst>
+                                          <p:attrName>style.visibility</p:attrName>
+                                        </p:attrNameLst>
+                                      </p:cBhvr>
+                                      <p:to>
+                                        <p:strVal val="visible"/>
+                                      </p:to>
+                                    </p:set>
+                                    <p:animEffect transition="in" filter="fade">
+                                      <p:cBhvr>
+                                        <p:cTn id="7" dur="500"/>
+                                        <p:tgtEl>
+                                          <p:spTgt spid="19"/>
+                                        </p:tgtEl>
+                                      </p:cBhvr>
+                                    </p:animEffect>
+                                  </p:childTnLst>
+                                </p:cTn>
+                              </p:par>
+                            </p:childTnLst>
+                          </p:cTn>
+                        </p:par>
+                      </p:childTnLst>
+                    </p:cTn>
+                  </p:par>
+                </p:childTnLst>
+              </p:cTn>
+              <p:prevCondLst>
+                <p:cond evt="onPrev" delay="0">
+                  <p:tgtEl>
+                    <p:sldTgt/>
+                  </p:tgtEl>
+                </p:cond>
+              </p:prevCondLst>
+              <p:nextCondLst>
+                <p:cond evt="onNext" delay="0">
+                  <p:tgtEl>
+                    <p:sldTgt/>
+                  </p:tgtEl>
+                </p:cond>
+              </p:nextCondLst>
+            </p:seq>
+          </p:childTnLst>
+        </p:cTn>
+      </p:par>
+    </p:tnLst>
+    <p:bldLst>
+      <p:bldP spid="19" grpId="0" animBg="1"/>
+    </p:bldLst>
+  </p:timing>
+</p:sld>
+</file>
+
 <file path=ppt/slides/slide3.xml><?xml version="1.0" encoding="utf-8"?>
 <p:sld xmlns:a="http://schemas.openxmlformats.org/drawingml/2006/main" xmlns:r="http://schemas.openxmlformats.org/officeDocument/2006/relationships" xmlns:p="http://schemas.openxmlformats.org/presentationml/2006/main">
   <p:cSld>

</xml_diff>

<commit_message>
8 balls paradox (rminder)
</commit_message>
<xml_diff>
--- a/slides_x_mas_2023.pptx
+++ b/slides_x_mas_2023.pptx
@@ -28,6 +28,7 @@
     <p:sldId id="280" r:id="rId22"/>
     <p:sldId id="281" r:id="rId23"/>
     <p:sldId id="282" r:id="rId24"/>
+    <p:sldId id="283" r:id="rId25"/>
   </p:sldIdLst>
   <p:sldSz cx="12192000" cy="6858000"/>
   <p:notesSz cx="6858000" cy="9144000"/>
@@ -165,6 +166,7 @@
             <p14:sldId id="280"/>
             <p14:sldId id="281"/>
             <p14:sldId id="282"/>
+            <p14:sldId id="283"/>
           </p14:sldIdLst>
         </p14:section>
         <p14:section name="Over-Interpretations" id="{9711BCF0-0EF2-435D-A2E2-B5014891C597}">
@@ -16458,6 +16460,99 @@
 </p:sld>
 </file>
 
+<file path=ppt/slides/slide24.xml><?xml version="1.0" encoding="utf-8"?>
+<p:sld xmlns:a="http://schemas.openxmlformats.org/drawingml/2006/main" xmlns:r="http://schemas.openxmlformats.org/officeDocument/2006/relationships" xmlns:p="http://schemas.openxmlformats.org/presentationml/2006/main">
+  <p:cSld>
+    <p:spTree>
+      <p:nvGrpSpPr>
+        <p:cNvPr id="1" name=""/>
+        <p:cNvGrpSpPr/>
+        <p:nvPr/>
+      </p:nvGrpSpPr>
+      <p:grpSpPr>
+        <a:xfrm>
+          <a:off x="0" y="0"/>
+          <a:ext cx="0" cy="0"/>
+          <a:chOff x="0" y="0"/>
+          <a:chExt cx="0" cy="0"/>
+        </a:xfrm>
+      </p:grpSpPr>
+      <p:sp>
+        <p:nvSpPr>
+          <p:cNvPr id="6" name="Title 5">
+            <a:extLst>
+              <a:ext uri="{FF2B5EF4-FFF2-40B4-BE49-F238E27FC236}">
+                <a16:creationId xmlns:a16="http://schemas.microsoft.com/office/drawing/2014/main" id="{A570CDB5-419D-7CC8-D95D-ED649EC201C2}"/>
+              </a:ext>
+            </a:extLst>
+          </p:cNvPr>
+          <p:cNvSpPr>
+            <a:spLocks noGrp="1"/>
+          </p:cNvSpPr>
+          <p:nvPr>
+            <p:ph type="title"/>
+          </p:nvPr>
+        </p:nvSpPr>
+        <p:spPr/>
+        <p:txBody>
+          <a:bodyPr/>
+          <a:lstStyle/>
+          <a:p>
+            <a:r>
+              <a:rPr lang="en-US" dirty="0"/>
+              <a:t>8 balls paradox</a:t>
+            </a:r>
+          </a:p>
+        </p:txBody>
+      </p:sp>
+      <p:pic>
+        <p:nvPicPr>
+          <p:cNvPr id="5" name="Content Placeholder 4" descr="A group of spheres with a red center&#10;&#10;Description automatically generated">
+            <a:extLst>
+              <a:ext uri="{FF2B5EF4-FFF2-40B4-BE49-F238E27FC236}">
+                <a16:creationId xmlns:a16="http://schemas.microsoft.com/office/drawing/2014/main" id="{2F5548EC-845E-F170-7BF0-1917D0E20459}"/>
+              </a:ext>
+            </a:extLst>
+          </p:cNvPr>
+          <p:cNvPicPr>
+            <a:picLocks noGrp="1" noChangeAspect="1"/>
+          </p:cNvPicPr>
+          <p:nvPr>
+            <p:ph idx="1"/>
+          </p:nvPr>
+        </p:nvPicPr>
+        <p:blipFill>
+          <a:blip r:embed="rId2">
+            <a:extLst>
+              <a:ext uri="{28A0092B-C50C-407E-A947-70E740481C1C}">
+                <a14:useLocalDpi xmlns:a14="http://schemas.microsoft.com/office/drawing/2010/main" val="0"/>
+              </a:ext>
+            </a:extLst>
+          </a:blip>
+          <a:stretch>
+            <a:fillRect/>
+          </a:stretch>
+        </p:blipFill>
+        <p:spPr>
+          <a:xfrm>
+            <a:off x="4176292" y="1825625"/>
+            <a:ext cx="3839415" cy="4351338"/>
+          </a:xfrm>
+        </p:spPr>
+      </p:pic>
+    </p:spTree>
+    <p:extLst>
+      <p:ext uri="{BB962C8B-B14F-4D97-AF65-F5344CB8AC3E}">
+        <p14:creationId xmlns:p14="http://schemas.microsoft.com/office/powerpoint/2010/main" val="2060474436"/>
+      </p:ext>
+    </p:extLst>
+  </p:cSld>
+  <p:clrMapOvr>
+    <a:masterClrMapping/>
+  </p:clrMapOvr>
+</p:sld>
+</file>
+
 <file path=ppt/slides/slide3.xml><?xml version="1.0" encoding="utf-8"?>
 <p:sld xmlns:a="http://schemas.openxmlformats.org/drawingml/2006/main" xmlns:r="http://schemas.openxmlformats.org/officeDocument/2006/relationships" xmlns:p="http://schemas.openxmlformats.org/presentationml/2006/main">
   <p:cSld>

</xml_diff>

<commit_message>
8 balls paradox: added central blob
</commit_message>
<xml_diff>
--- a/slides_x_mas_2023.pptx
+++ b/slides_x_mas_2023.pptx
@@ -29,6 +29,7 @@
     <p:sldId id="281" r:id="rId23"/>
     <p:sldId id="282" r:id="rId24"/>
     <p:sldId id="283" r:id="rId25"/>
+    <p:sldId id="284" r:id="rId26"/>
   </p:sldIdLst>
   <p:sldSz cx="12192000" cy="6858000"/>
   <p:notesSz cx="6858000" cy="9144000"/>
@@ -167,6 +168,7 @@
             <p14:sldId id="281"/>
             <p14:sldId id="282"/>
             <p14:sldId id="283"/>
+            <p14:sldId id="284"/>
           </p14:sldIdLst>
         </p14:section>
         <p14:section name="Over-Interpretations" id="{9711BCF0-0EF2-435D-A2E2-B5014891C597}">
@@ -16553,6 +16555,99 @@
 </p:sld>
 </file>
 
+<file path=ppt/slides/slide25.xml><?xml version="1.0" encoding="utf-8"?>
+<p:sld xmlns:a="http://schemas.openxmlformats.org/drawingml/2006/main" xmlns:r="http://schemas.openxmlformats.org/officeDocument/2006/relationships" xmlns:p="http://schemas.openxmlformats.org/presentationml/2006/main">
+  <p:cSld>
+    <p:spTree>
+      <p:nvGrpSpPr>
+        <p:cNvPr id="1" name=""/>
+        <p:cNvGrpSpPr/>
+        <p:nvPr/>
+      </p:nvGrpSpPr>
+      <p:grpSpPr>
+        <a:xfrm>
+          <a:off x="0" y="0"/>
+          <a:ext cx="0" cy="0"/>
+          <a:chOff x="0" y="0"/>
+          <a:chExt cx="0" cy="0"/>
+        </a:xfrm>
+      </p:grpSpPr>
+      <p:sp>
+        <p:nvSpPr>
+          <p:cNvPr id="2" name="Title 1">
+            <a:extLst>
+              <a:ext uri="{FF2B5EF4-FFF2-40B4-BE49-F238E27FC236}">
+                <a16:creationId xmlns:a16="http://schemas.microsoft.com/office/drawing/2014/main" id="{16E7AE24-0106-3BCC-56A4-72CF1E795F4D}"/>
+              </a:ext>
+            </a:extLst>
+          </p:cNvPr>
+          <p:cNvSpPr>
+            <a:spLocks noGrp="1"/>
+          </p:cNvSpPr>
+          <p:nvPr>
+            <p:ph type="title"/>
+          </p:nvPr>
+        </p:nvSpPr>
+        <p:spPr/>
+        <p:txBody>
+          <a:bodyPr/>
+          <a:lstStyle/>
+          <a:p>
+            <a:r>
+              <a:rPr lang="en-US" dirty="0"/>
+              <a:t>8 balls paradox</a:t>
+            </a:r>
+          </a:p>
+        </p:txBody>
+      </p:sp>
+      <p:pic>
+        <p:nvPicPr>
+          <p:cNvPr id="5" name="Content Placeholder 4" descr="A white and orange spheres&#10;&#10;Description automatically generated">
+            <a:extLst>
+              <a:ext uri="{FF2B5EF4-FFF2-40B4-BE49-F238E27FC236}">
+                <a16:creationId xmlns:a16="http://schemas.microsoft.com/office/drawing/2014/main" id="{20FA5DD4-2AC9-DC34-AD23-14505684F328}"/>
+              </a:ext>
+            </a:extLst>
+          </p:cNvPr>
+          <p:cNvPicPr>
+            <a:picLocks noGrp="1" noChangeAspect="1"/>
+          </p:cNvPicPr>
+          <p:nvPr>
+            <p:ph idx="1"/>
+          </p:nvPr>
+        </p:nvPicPr>
+        <p:blipFill>
+          <a:blip r:embed="rId2">
+            <a:extLst>
+              <a:ext uri="{28A0092B-C50C-407E-A947-70E740481C1C}">
+                <a14:useLocalDpi xmlns:a14="http://schemas.microsoft.com/office/drawing/2010/main" val="0"/>
+              </a:ext>
+            </a:extLst>
+          </a:blip>
+          <a:stretch>
+            <a:fillRect/>
+          </a:stretch>
+        </p:blipFill>
+        <p:spPr>
+          <a:xfrm>
+            <a:off x="4176292" y="1825625"/>
+            <a:ext cx="3839415" cy="4351338"/>
+          </a:xfrm>
+        </p:spPr>
+      </p:pic>
+    </p:spTree>
+    <p:extLst>
+      <p:ext uri="{BB962C8B-B14F-4D97-AF65-F5344CB8AC3E}">
+        <p14:creationId xmlns:p14="http://schemas.microsoft.com/office/powerpoint/2010/main" val="4289066411"/>
+      </p:ext>
+    </p:extLst>
+  </p:cSld>
+  <p:clrMapOvr>
+    <a:masterClrMapping/>
+  </p:clrMapOvr>
+</p:sld>
+</file>
+
 <file path=ppt/slides/slide3.xml><?xml version="1.0" encoding="utf-8"?>
 <p:sld xmlns:a="http://schemas.openxmlformats.org/drawingml/2006/main" xmlns:r="http://schemas.openxmlformats.org/officeDocument/2006/relationships" xmlns:p="http://schemas.openxmlformats.org/presentationml/2006/main">
   <p:cSld>

</xml_diff>

<commit_message>
8 balls paradox: central blob (bis)
</commit_message>
<xml_diff>
--- a/slides_x_mas_2023.pptx
+++ b/slides_x_mas_2023.pptx
@@ -30,6 +30,7 @@
     <p:sldId id="282" r:id="rId24"/>
     <p:sldId id="283" r:id="rId25"/>
     <p:sldId id="284" r:id="rId26"/>
+    <p:sldId id="285" r:id="rId27"/>
   </p:sldIdLst>
   <p:sldSz cx="12192000" cy="6858000"/>
   <p:notesSz cx="6858000" cy="9144000"/>
@@ -169,6 +170,7 @@
             <p14:sldId id="282"/>
             <p14:sldId id="283"/>
             <p14:sldId id="284"/>
+            <p14:sldId id="285"/>
           </p14:sldIdLst>
         </p14:section>
         <p14:section name="Over-Interpretations" id="{9711BCF0-0EF2-435D-A2E2-B5014891C597}">
@@ -16648,6 +16650,99 @@
 </p:sld>
 </file>
 
+<file path=ppt/slides/slide26.xml><?xml version="1.0" encoding="utf-8"?>
+<p:sld xmlns:a="http://schemas.openxmlformats.org/drawingml/2006/main" xmlns:r="http://schemas.openxmlformats.org/officeDocument/2006/relationships" xmlns:p="http://schemas.openxmlformats.org/presentationml/2006/main">
+  <p:cSld>
+    <p:spTree>
+      <p:nvGrpSpPr>
+        <p:cNvPr id="1" name=""/>
+        <p:cNvGrpSpPr/>
+        <p:nvPr/>
+      </p:nvGrpSpPr>
+      <p:grpSpPr>
+        <a:xfrm>
+          <a:off x="0" y="0"/>
+          <a:ext cx="0" cy="0"/>
+          <a:chOff x="0" y="0"/>
+          <a:chExt cx="0" cy="0"/>
+        </a:xfrm>
+      </p:grpSpPr>
+      <p:sp>
+        <p:nvSpPr>
+          <p:cNvPr id="2" name="Title 1">
+            <a:extLst>
+              <a:ext uri="{FF2B5EF4-FFF2-40B4-BE49-F238E27FC236}">
+                <a16:creationId xmlns:a16="http://schemas.microsoft.com/office/drawing/2014/main" id="{B1C54E58-365D-2C97-236F-B27FE4C48435}"/>
+              </a:ext>
+            </a:extLst>
+          </p:cNvPr>
+          <p:cNvSpPr>
+            <a:spLocks noGrp="1"/>
+          </p:cNvSpPr>
+          <p:nvPr>
+            <p:ph type="title"/>
+          </p:nvPr>
+        </p:nvSpPr>
+        <p:spPr/>
+        <p:txBody>
+          <a:bodyPr/>
+          <a:lstStyle/>
+          <a:p>
+            <a:r>
+              <a:rPr lang="en-US" dirty="0"/>
+              <a:t>8 balls paradox</a:t>
+            </a:r>
+          </a:p>
+        </p:txBody>
+      </p:sp>
+      <p:pic>
+        <p:nvPicPr>
+          <p:cNvPr id="11" name="Content Placeholder 10" descr="A close-up of a molecule&#10;&#10;Description automatically generated">
+            <a:extLst>
+              <a:ext uri="{FF2B5EF4-FFF2-40B4-BE49-F238E27FC236}">
+                <a16:creationId xmlns:a16="http://schemas.microsoft.com/office/drawing/2014/main" id="{9F94347C-63B8-1039-61A4-3E46C581BE9E}"/>
+              </a:ext>
+            </a:extLst>
+          </p:cNvPr>
+          <p:cNvPicPr>
+            <a:picLocks noGrp="1" noChangeAspect="1"/>
+          </p:cNvPicPr>
+          <p:nvPr>
+            <p:ph idx="1"/>
+          </p:nvPr>
+        </p:nvPicPr>
+        <p:blipFill>
+          <a:blip r:embed="rId2">
+            <a:extLst>
+              <a:ext uri="{28A0092B-C50C-407E-A947-70E740481C1C}">
+                <a14:useLocalDpi xmlns:a14="http://schemas.microsoft.com/office/drawing/2010/main" val="0"/>
+              </a:ext>
+            </a:extLst>
+          </a:blip>
+          <a:stretch>
+            <a:fillRect/>
+          </a:stretch>
+        </p:blipFill>
+        <p:spPr>
+          <a:xfrm>
+            <a:off x="4176292" y="1825625"/>
+            <a:ext cx="3839415" cy="4351338"/>
+          </a:xfrm>
+        </p:spPr>
+      </p:pic>
+    </p:spTree>
+    <p:extLst>
+      <p:ext uri="{BB962C8B-B14F-4D97-AF65-F5344CB8AC3E}">
+        <p14:creationId xmlns:p14="http://schemas.microsoft.com/office/powerpoint/2010/main" val="2251451429"/>
+      </p:ext>
+    </p:extLst>
+  </p:cSld>
+  <p:clrMapOvr>
+    <a:masterClrMapping/>
+  </p:clrMapOvr>
+</p:sld>
+</file>
+
 <file path=ppt/slides/slide3.xml><?xml version="1.0" encoding="utf-8"?>
 <p:sld xmlns:a="http://schemas.openxmlformats.org/drawingml/2006/main" xmlns:r="http://schemas.openxmlformats.org/officeDocument/2006/relationships" xmlns:p="http://schemas.openxmlformats.org/presentationml/2006/main">
   <p:cSld>

</xml_diff>

<commit_message>
enlarged images + adapted legend
</commit_message>
<xml_diff>
--- a/slides_x_mas_2023.pptx
+++ b/slides_x_mas_2023.pptx
@@ -9368,8 +9368,8 @@
         </p:blipFill>
         <p:spPr>
           <a:xfrm>
-            <a:off x="4178604" y="1825625"/>
-            <a:ext cx="3834792" cy="4351338"/>
+            <a:off x="3578413" y="1144588"/>
+            <a:ext cx="5035174" cy="5713412"/>
           </a:xfrm>
         </p:spPr>
       </p:pic>
@@ -9461,8 +9461,8 @@
         </p:blipFill>
         <p:spPr>
           <a:xfrm>
-            <a:off x="4178604" y="1825625"/>
-            <a:ext cx="3834792" cy="4351338"/>
+            <a:off x="3578413" y="1144588"/>
+            <a:ext cx="5035174" cy="5713412"/>
           </a:xfrm>
         </p:spPr>
       </p:pic>
@@ -9519,8 +9519,8 @@
         </p:nvSpPr>
         <p:spPr>
           <a:xfrm>
-            <a:off x="6610350" y="1247775"/>
-            <a:ext cx="1371600" cy="790575"/>
+            <a:off x="6885432" y="1247776"/>
+            <a:ext cx="1096518" cy="461666"/>
           </a:xfrm>
           <a:custGeom>
             <a:avLst/>
@@ -9854,8 +9854,8 @@
         </p:blipFill>
         <p:spPr>
           <a:xfrm>
-            <a:off x="4178604" y="1825625"/>
-            <a:ext cx="3834792" cy="4351338"/>
+            <a:off x="3578413" y="1144588"/>
+            <a:ext cx="5035174" cy="5713412"/>
           </a:xfrm>
         </p:spPr>
       </p:pic>
@@ -9900,10 +9900,10 @@
       </p:sp>
       <p:sp>
         <p:nvSpPr>
-          <p:cNvPr id="10" name="Freeform: Shape 9">
-            <a:extLst>
-              <a:ext uri="{FF2B5EF4-FFF2-40B4-BE49-F238E27FC236}">
-                <a16:creationId xmlns:a16="http://schemas.microsoft.com/office/drawing/2014/main" id="{AB1F732A-3922-4C7E-7AD4-E27782C10DF5}"/>
+          <p:cNvPr id="11" name="Freeform: Shape 10">
+            <a:extLst>
+              <a:ext uri="{FF2B5EF4-FFF2-40B4-BE49-F238E27FC236}">
+                <a16:creationId xmlns:a16="http://schemas.microsoft.com/office/drawing/2014/main" id="{F19956BE-BB2E-98DF-E290-97892F2763C8}"/>
               </a:ext>
             </a:extLst>
           </p:cNvPr>
@@ -9911,9 +9911,140 @@
           <p:nvPr/>
         </p:nvSpPr>
         <p:spPr>
+          <a:xfrm flipH="1">
+            <a:off x="3391279" y="2438399"/>
+            <a:ext cx="1199008" cy="560833"/>
+          </a:xfrm>
+          <a:custGeom>
+            <a:avLst/>
+            <a:gdLst>
+              <a:gd name="connsiteX0" fmla="*/ 1371600 w 1371600"/>
+              <a:gd name="connsiteY0" fmla="*/ 0 h 790575"/>
+              <a:gd name="connsiteX1" fmla="*/ 628650 w 1371600"/>
+              <a:gd name="connsiteY1" fmla="*/ 228600 h 790575"/>
+              <a:gd name="connsiteX2" fmla="*/ 0 w 1371600"/>
+              <a:gd name="connsiteY2" fmla="*/ 790575 h 790575"/>
+            </a:gdLst>
+            <a:ahLst/>
+            <a:cxnLst>
+              <a:cxn ang="0">
+                <a:pos x="connsiteX0" y="connsiteY0"/>
+              </a:cxn>
+              <a:cxn ang="0">
+                <a:pos x="connsiteX1" y="connsiteY1"/>
+              </a:cxn>
+              <a:cxn ang="0">
+                <a:pos x="connsiteX2" y="connsiteY2"/>
+              </a:cxn>
+            </a:cxnLst>
+            <a:rect l="l" t="t" r="r" b="b"/>
+            <a:pathLst>
+              <a:path w="1371600" h="790575">
+                <a:moveTo>
+                  <a:pt x="1371600" y="0"/>
+                </a:moveTo>
+                <a:cubicBezTo>
+                  <a:pt x="1114425" y="48419"/>
+                  <a:pt x="857250" y="96838"/>
+                  <a:pt x="628650" y="228600"/>
+                </a:cubicBezTo>
+                <a:cubicBezTo>
+                  <a:pt x="400050" y="360363"/>
+                  <a:pt x="200025" y="575469"/>
+                  <a:pt x="0" y="790575"/>
+                </a:cubicBezTo>
+              </a:path>
+            </a:pathLst>
+          </a:custGeom>
+          <a:noFill/>
+          <a:ln w="57150">
+            <a:solidFill>
+              <a:srgbClr val="37ABC8"/>
+            </a:solidFill>
+            <a:headEnd type="none" w="med" len="med"/>
+            <a:tailEnd type="arrow" w="med" len="med"/>
+          </a:ln>
+        </p:spPr>
+        <p:style>
+          <a:lnRef idx="2">
+            <a:schemeClr val="accent1">
+              <a:shade val="15000"/>
+            </a:schemeClr>
+          </a:lnRef>
+          <a:fillRef idx="1">
+            <a:schemeClr val="accent1"/>
+          </a:fillRef>
+          <a:effectRef idx="0">
+            <a:schemeClr val="accent1"/>
+          </a:effectRef>
+          <a:fontRef idx="minor">
+            <a:schemeClr val="lt1"/>
+          </a:fontRef>
+        </p:style>
+        <p:txBody>
+          <a:bodyPr rtlCol="0" anchor="ctr"/>
+          <a:lstStyle/>
+          <a:p>
+            <a:pPr algn="ctr"/>
+            <a:endParaRPr lang="en-US"/>
+          </a:p>
+        </p:txBody>
+      </p:sp>
+      <p:sp>
+        <p:nvSpPr>
+          <p:cNvPr id="12" name="TextBox 11">
+            <a:extLst>
+              <a:ext uri="{FF2B5EF4-FFF2-40B4-BE49-F238E27FC236}">
+                <a16:creationId xmlns:a16="http://schemas.microsoft.com/office/drawing/2014/main" id="{0B915850-8BFC-F005-5009-668A928153B3}"/>
+              </a:ext>
+            </a:extLst>
+          </p:cNvPr>
+          <p:cNvSpPr txBox="1"/>
+          <p:nvPr/>
+        </p:nvSpPr>
+        <p:spPr>
           <a:xfrm>
-            <a:off x="6610350" y="1247775"/>
-            <a:ext cx="1371600" cy="790575"/>
+            <a:off x="2219037" y="2140892"/>
+            <a:ext cx="1353782" cy="461665"/>
+          </a:xfrm>
+          <a:prstGeom prst="rect">
+            <a:avLst/>
+          </a:prstGeom>
+          <a:noFill/>
+        </p:spPr>
+        <p:txBody>
+          <a:bodyPr wrap="square" rtlCol="0">
+            <a:spAutoFit/>
+          </a:bodyPr>
+          <a:lstStyle/>
+          <a:p>
+            <a:r>
+              <a:rPr lang="en-US" sz="2400" dirty="0">
+                <a:solidFill>
+                  <a:srgbClr val="37ABC8"/>
+                </a:solidFill>
+              </a:rPr>
+              <a:t>radius 1</a:t>
+            </a:r>
+          </a:p>
+        </p:txBody>
+      </p:sp>
+      <p:sp>
+        <p:nvSpPr>
+          <p:cNvPr id="13" name="Freeform: Shape 12">
+            <a:extLst>
+              <a:ext uri="{FF2B5EF4-FFF2-40B4-BE49-F238E27FC236}">
+                <a16:creationId xmlns:a16="http://schemas.microsoft.com/office/drawing/2014/main" id="{AE8EDB50-92A0-4046-8F03-C80629ADFD01}"/>
+              </a:ext>
+            </a:extLst>
+          </p:cNvPr>
+          <p:cNvSpPr/>
+          <p:nvPr/>
+        </p:nvSpPr>
+        <p:spPr>
+          <a:xfrm>
+            <a:off x="6885432" y="1247776"/>
+            <a:ext cx="1096518" cy="461666"/>
           </a:xfrm>
           <a:custGeom>
             <a:avLst/>
@@ -9987,137 +10118,6 @@
           <a:p>
             <a:pPr algn="ctr"/>
             <a:endParaRPr lang="en-US"/>
-          </a:p>
-        </p:txBody>
-      </p:sp>
-      <p:sp>
-        <p:nvSpPr>
-          <p:cNvPr id="11" name="Freeform: Shape 10">
-            <a:extLst>
-              <a:ext uri="{FF2B5EF4-FFF2-40B4-BE49-F238E27FC236}">
-                <a16:creationId xmlns:a16="http://schemas.microsoft.com/office/drawing/2014/main" id="{F19956BE-BB2E-98DF-E290-97892F2763C8}"/>
-              </a:ext>
-            </a:extLst>
-          </p:cNvPr>
-          <p:cNvSpPr/>
-          <p:nvPr/>
-        </p:nvSpPr>
-        <p:spPr>
-          <a:xfrm flipH="1">
-            <a:off x="3857624" y="2438399"/>
-            <a:ext cx="1038225" cy="614361"/>
-          </a:xfrm>
-          <a:custGeom>
-            <a:avLst/>
-            <a:gdLst>
-              <a:gd name="connsiteX0" fmla="*/ 1371600 w 1371600"/>
-              <a:gd name="connsiteY0" fmla="*/ 0 h 790575"/>
-              <a:gd name="connsiteX1" fmla="*/ 628650 w 1371600"/>
-              <a:gd name="connsiteY1" fmla="*/ 228600 h 790575"/>
-              <a:gd name="connsiteX2" fmla="*/ 0 w 1371600"/>
-              <a:gd name="connsiteY2" fmla="*/ 790575 h 790575"/>
-            </a:gdLst>
-            <a:ahLst/>
-            <a:cxnLst>
-              <a:cxn ang="0">
-                <a:pos x="connsiteX0" y="connsiteY0"/>
-              </a:cxn>
-              <a:cxn ang="0">
-                <a:pos x="connsiteX1" y="connsiteY1"/>
-              </a:cxn>
-              <a:cxn ang="0">
-                <a:pos x="connsiteX2" y="connsiteY2"/>
-              </a:cxn>
-            </a:cxnLst>
-            <a:rect l="l" t="t" r="r" b="b"/>
-            <a:pathLst>
-              <a:path w="1371600" h="790575">
-                <a:moveTo>
-                  <a:pt x="1371600" y="0"/>
-                </a:moveTo>
-                <a:cubicBezTo>
-                  <a:pt x="1114425" y="48419"/>
-                  <a:pt x="857250" y="96838"/>
-                  <a:pt x="628650" y="228600"/>
-                </a:cubicBezTo>
-                <a:cubicBezTo>
-                  <a:pt x="400050" y="360363"/>
-                  <a:pt x="200025" y="575469"/>
-                  <a:pt x="0" y="790575"/>
-                </a:cubicBezTo>
-              </a:path>
-            </a:pathLst>
-          </a:custGeom>
-          <a:noFill/>
-          <a:ln w="57150">
-            <a:solidFill>
-              <a:srgbClr val="37ABC8"/>
-            </a:solidFill>
-            <a:headEnd type="none" w="med" len="med"/>
-            <a:tailEnd type="arrow" w="med" len="med"/>
-          </a:ln>
-        </p:spPr>
-        <p:style>
-          <a:lnRef idx="2">
-            <a:schemeClr val="accent1">
-              <a:shade val="15000"/>
-            </a:schemeClr>
-          </a:lnRef>
-          <a:fillRef idx="1">
-            <a:schemeClr val="accent1"/>
-          </a:fillRef>
-          <a:effectRef idx="0">
-            <a:schemeClr val="accent1"/>
-          </a:effectRef>
-          <a:fontRef idx="minor">
-            <a:schemeClr val="lt1"/>
-          </a:fontRef>
-        </p:style>
-        <p:txBody>
-          <a:bodyPr rtlCol="0" anchor="ctr"/>
-          <a:lstStyle/>
-          <a:p>
-            <a:pPr algn="ctr"/>
-            <a:endParaRPr lang="en-US"/>
-          </a:p>
-        </p:txBody>
-      </p:sp>
-      <p:sp>
-        <p:nvSpPr>
-          <p:cNvPr id="12" name="TextBox 11">
-            <a:extLst>
-              <a:ext uri="{FF2B5EF4-FFF2-40B4-BE49-F238E27FC236}">
-                <a16:creationId xmlns:a16="http://schemas.microsoft.com/office/drawing/2014/main" id="{0B915850-8BFC-F005-5009-668A928153B3}"/>
-              </a:ext>
-            </a:extLst>
-          </p:cNvPr>
-          <p:cNvSpPr txBox="1"/>
-          <p:nvPr/>
-        </p:nvSpPr>
-        <p:spPr>
-          <a:xfrm>
-            <a:off x="2685381" y="2140892"/>
-            <a:ext cx="1172244" cy="461665"/>
-          </a:xfrm>
-          <a:prstGeom prst="rect">
-            <a:avLst/>
-          </a:prstGeom>
-          <a:noFill/>
-        </p:spPr>
-        <p:txBody>
-          <a:bodyPr wrap="square" rtlCol="0">
-            <a:spAutoFit/>
-          </a:bodyPr>
-          <a:lstStyle/>
-          <a:p>
-            <a:r>
-              <a:rPr lang="en-US" sz="2400" dirty="0">
-                <a:solidFill>
-                  <a:srgbClr val="37ABC8"/>
-                </a:solidFill>
-              </a:rPr>
-              <a:t>radius 1</a:t>
-            </a:r>
           </a:p>
         </p:txBody>
       </p:sp>
@@ -10346,8 +10346,8 @@
         </p:blipFill>
         <p:spPr>
           <a:xfrm>
-            <a:off x="4178604" y="1825625"/>
-            <a:ext cx="3834792" cy="4351338"/>
+            <a:off x="3578413" y="1144588"/>
+            <a:ext cx="5035174" cy="5713412"/>
           </a:xfrm>
         </p:spPr>
       </p:pic>
@@ -10392,10 +10392,10 @@
       </p:sp>
       <p:sp>
         <p:nvSpPr>
-          <p:cNvPr id="10" name="Freeform: Shape 9">
-            <a:extLst>
-              <a:ext uri="{FF2B5EF4-FFF2-40B4-BE49-F238E27FC236}">
-                <a16:creationId xmlns:a16="http://schemas.microsoft.com/office/drawing/2014/main" id="{B2BD53BB-88B7-5C0C-68B0-46D0115F1493}"/>
+          <p:cNvPr id="18" name="Freeform: Shape 17">
+            <a:extLst>
+              <a:ext uri="{FF2B5EF4-FFF2-40B4-BE49-F238E27FC236}">
+                <a16:creationId xmlns:a16="http://schemas.microsoft.com/office/drawing/2014/main" id="{4FEFDF00-386E-515D-4419-1068CE1BBD5F}"/>
               </a:ext>
             </a:extLst>
           </p:cNvPr>
@@ -10403,9 +10403,140 @@
           <p:nvPr/>
         </p:nvSpPr>
         <p:spPr>
+          <a:xfrm flipH="1">
+            <a:off x="3391279" y="2438399"/>
+            <a:ext cx="1199008" cy="560833"/>
+          </a:xfrm>
+          <a:custGeom>
+            <a:avLst/>
+            <a:gdLst>
+              <a:gd name="connsiteX0" fmla="*/ 1371600 w 1371600"/>
+              <a:gd name="connsiteY0" fmla="*/ 0 h 790575"/>
+              <a:gd name="connsiteX1" fmla="*/ 628650 w 1371600"/>
+              <a:gd name="connsiteY1" fmla="*/ 228600 h 790575"/>
+              <a:gd name="connsiteX2" fmla="*/ 0 w 1371600"/>
+              <a:gd name="connsiteY2" fmla="*/ 790575 h 790575"/>
+            </a:gdLst>
+            <a:ahLst/>
+            <a:cxnLst>
+              <a:cxn ang="0">
+                <a:pos x="connsiteX0" y="connsiteY0"/>
+              </a:cxn>
+              <a:cxn ang="0">
+                <a:pos x="connsiteX1" y="connsiteY1"/>
+              </a:cxn>
+              <a:cxn ang="0">
+                <a:pos x="connsiteX2" y="connsiteY2"/>
+              </a:cxn>
+            </a:cxnLst>
+            <a:rect l="l" t="t" r="r" b="b"/>
+            <a:pathLst>
+              <a:path w="1371600" h="790575">
+                <a:moveTo>
+                  <a:pt x="1371600" y="0"/>
+                </a:moveTo>
+                <a:cubicBezTo>
+                  <a:pt x="1114425" y="48419"/>
+                  <a:pt x="857250" y="96838"/>
+                  <a:pt x="628650" y="228600"/>
+                </a:cubicBezTo>
+                <a:cubicBezTo>
+                  <a:pt x="400050" y="360363"/>
+                  <a:pt x="200025" y="575469"/>
+                  <a:pt x="0" y="790575"/>
+                </a:cubicBezTo>
+              </a:path>
+            </a:pathLst>
+          </a:custGeom>
+          <a:noFill/>
+          <a:ln w="57150">
+            <a:solidFill>
+              <a:srgbClr val="37ABC8"/>
+            </a:solidFill>
+            <a:headEnd type="none" w="med" len="med"/>
+            <a:tailEnd type="arrow" w="med" len="med"/>
+          </a:ln>
+        </p:spPr>
+        <p:style>
+          <a:lnRef idx="2">
+            <a:schemeClr val="accent1">
+              <a:shade val="15000"/>
+            </a:schemeClr>
+          </a:lnRef>
+          <a:fillRef idx="1">
+            <a:schemeClr val="accent1"/>
+          </a:fillRef>
+          <a:effectRef idx="0">
+            <a:schemeClr val="accent1"/>
+          </a:effectRef>
+          <a:fontRef idx="minor">
+            <a:schemeClr val="lt1"/>
+          </a:fontRef>
+        </p:style>
+        <p:txBody>
+          <a:bodyPr rtlCol="0" anchor="ctr"/>
+          <a:lstStyle/>
+          <a:p>
+            <a:pPr algn="ctr"/>
+            <a:endParaRPr lang="en-US"/>
+          </a:p>
+        </p:txBody>
+      </p:sp>
+      <p:sp>
+        <p:nvSpPr>
+          <p:cNvPr id="19" name="TextBox 18">
+            <a:extLst>
+              <a:ext uri="{FF2B5EF4-FFF2-40B4-BE49-F238E27FC236}">
+                <a16:creationId xmlns:a16="http://schemas.microsoft.com/office/drawing/2014/main" id="{DF8F83F6-4CC2-C679-7CEB-81CAC7D81EE5}"/>
+              </a:ext>
+            </a:extLst>
+          </p:cNvPr>
+          <p:cNvSpPr txBox="1"/>
+          <p:nvPr/>
+        </p:nvSpPr>
+        <p:spPr>
           <a:xfrm>
-            <a:off x="6610350" y="1247775"/>
-            <a:ext cx="1371600" cy="790575"/>
+            <a:off x="2219037" y="2140892"/>
+            <a:ext cx="1353782" cy="461665"/>
+          </a:xfrm>
+          <a:prstGeom prst="rect">
+            <a:avLst/>
+          </a:prstGeom>
+          <a:noFill/>
+        </p:spPr>
+        <p:txBody>
+          <a:bodyPr wrap="square" rtlCol="0">
+            <a:spAutoFit/>
+          </a:bodyPr>
+          <a:lstStyle/>
+          <a:p>
+            <a:r>
+              <a:rPr lang="en-US" sz="2400" dirty="0">
+                <a:solidFill>
+                  <a:srgbClr val="37ABC8"/>
+                </a:solidFill>
+              </a:rPr>
+              <a:t>radius 1</a:t>
+            </a:r>
+          </a:p>
+        </p:txBody>
+      </p:sp>
+      <p:sp>
+        <p:nvSpPr>
+          <p:cNvPr id="20" name="Freeform: Shape 19">
+            <a:extLst>
+              <a:ext uri="{FF2B5EF4-FFF2-40B4-BE49-F238E27FC236}">
+                <a16:creationId xmlns:a16="http://schemas.microsoft.com/office/drawing/2014/main" id="{94DE9ADD-4F47-72D8-89E6-16B8E6632304}"/>
+              </a:ext>
+            </a:extLst>
+          </p:cNvPr>
+          <p:cNvSpPr/>
+          <p:nvPr/>
+        </p:nvSpPr>
+        <p:spPr>
+          <a:xfrm>
+            <a:off x="6885432" y="1247776"/>
+            <a:ext cx="1096518" cy="461666"/>
           </a:xfrm>
           <a:custGeom>
             <a:avLst/>
@@ -10482,137 +10613,6 @@
           </a:p>
         </p:txBody>
       </p:sp>
-      <p:sp>
-        <p:nvSpPr>
-          <p:cNvPr id="14" name="TextBox 13">
-            <a:extLst>
-              <a:ext uri="{FF2B5EF4-FFF2-40B4-BE49-F238E27FC236}">
-                <a16:creationId xmlns:a16="http://schemas.microsoft.com/office/drawing/2014/main" id="{69D99FC2-BC77-3012-C887-E7958BE17420}"/>
-              </a:ext>
-            </a:extLst>
-          </p:cNvPr>
-          <p:cNvSpPr txBox="1"/>
-          <p:nvPr/>
-        </p:nvSpPr>
-        <p:spPr>
-          <a:xfrm>
-            <a:off x="2685381" y="2140892"/>
-            <a:ext cx="1172244" cy="461665"/>
-          </a:xfrm>
-          <a:prstGeom prst="rect">
-            <a:avLst/>
-          </a:prstGeom>
-          <a:noFill/>
-        </p:spPr>
-        <p:txBody>
-          <a:bodyPr wrap="none" rtlCol="0">
-            <a:spAutoFit/>
-          </a:bodyPr>
-          <a:lstStyle/>
-          <a:p>
-            <a:r>
-              <a:rPr lang="en-US" sz="2400" dirty="0">
-                <a:solidFill>
-                  <a:srgbClr val="37ABC8"/>
-                </a:solidFill>
-              </a:rPr>
-              <a:t>radius 1</a:t>
-            </a:r>
-          </a:p>
-        </p:txBody>
-      </p:sp>
-      <p:sp>
-        <p:nvSpPr>
-          <p:cNvPr id="15" name="Freeform: Shape 14">
-            <a:extLst>
-              <a:ext uri="{FF2B5EF4-FFF2-40B4-BE49-F238E27FC236}">
-                <a16:creationId xmlns:a16="http://schemas.microsoft.com/office/drawing/2014/main" id="{889887A0-1E87-7DAD-87FD-7DB0FB97986F}"/>
-              </a:ext>
-            </a:extLst>
-          </p:cNvPr>
-          <p:cNvSpPr/>
-          <p:nvPr/>
-        </p:nvSpPr>
-        <p:spPr>
-          <a:xfrm flipH="1">
-            <a:off x="3857624" y="2438399"/>
-            <a:ext cx="1038225" cy="614361"/>
-          </a:xfrm>
-          <a:custGeom>
-            <a:avLst/>
-            <a:gdLst>
-              <a:gd name="connsiteX0" fmla="*/ 1371600 w 1371600"/>
-              <a:gd name="connsiteY0" fmla="*/ 0 h 790575"/>
-              <a:gd name="connsiteX1" fmla="*/ 628650 w 1371600"/>
-              <a:gd name="connsiteY1" fmla="*/ 228600 h 790575"/>
-              <a:gd name="connsiteX2" fmla="*/ 0 w 1371600"/>
-              <a:gd name="connsiteY2" fmla="*/ 790575 h 790575"/>
-            </a:gdLst>
-            <a:ahLst/>
-            <a:cxnLst>
-              <a:cxn ang="0">
-                <a:pos x="connsiteX0" y="connsiteY0"/>
-              </a:cxn>
-              <a:cxn ang="0">
-                <a:pos x="connsiteX1" y="connsiteY1"/>
-              </a:cxn>
-              <a:cxn ang="0">
-                <a:pos x="connsiteX2" y="connsiteY2"/>
-              </a:cxn>
-            </a:cxnLst>
-            <a:rect l="l" t="t" r="r" b="b"/>
-            <a:pathLst>
-              <a:path w="1371600" h="790575">
-                <a:moveTo>
-                  <a:pt x="1371600" y="0"/>
-                </a:moveTo>
-                <a:cubicBezTo>
-                  <a:pt x="1114425" y="48419"/>
-                  <a:pt x="857250" y="96838"/>
-                  <a:pt x="628650" y="228600"/>
-                </a:cubicBezTo>
-                <a:cubicBezTo>
-                  <a:pt x="400050" y="360363"/>
-                  <a:pt x="200025" y="575469"/>
-                  <a:pt x="0" y="790575"/>
-                </a:cubicBezTo>
-              </a:path>
-            </a:pathLst>
-          </a:custGeom>
-          <a:noFill/>
-          <a:ln w="57150">
-            <a:solidFill>
-              <a:srgbClr val="37ABC8"/>
-            </a:solidFill>
-            <a:headEnd type="none" w="med" len="med"/>
-            <a:tailEnd type="arrow" w="med" len="med"/>
-          </a:ln>
-        </p:spPr>
-        <p:style>
-          <a:lnRef idx="2">
-            <a:schemeClr val="accent1">
-              <a:shade val="15000"/>
-            </a:schemeClr>
-          </a:lnRef>
-          <a:fillRef idx="1">
-            <a:schemeClr val="accent1"/>
-          </a:fillRef>
-          <a:effectRef idx="0">
-            <a:schemeClr val="accent1"/>
-          </a:effectRef>
-          <a:fontRef idx="minor">
-            <a:schemeClr val="lt1"/>
-          </a:fontRef>
-        </p:style>
-        <p:txBody>
-          <a:bodyPr rtlCol="0" anchor="ctr"/>
-          <a:lstStyle/>
-          <a:p>
-            <a:pPr algn="ctr"/>
-            <a:endParaRPr lang="en-US"/>
-          </a:p>
-        </p:txBody>
-      </p:sp>
     </p:spTree>
     <p:extLst>
       <p:ext uri="{BB962C8B-B14F-4D97-AF65-F5344CB8AC3E}">
@@ -10713,8 +10713,8 @@
         </p:blipFill>
         <p:spPr>
           <a:xfrm>
-            <a:off x="4178604" y="1825625"/>
-            <a:ext cx="3834792" cy="4351338"/>
+            <a:off x="3578413" y="1144588"/>
+            <a:ext cx="5035174" cy="5713412"/>
           </a:xfrm>
         </p:spPr>
       </p:pic>
@@ -10754,229 +10754,6 @@
               </a:rPr>
               <a:t>4x4x4 cube</a:t>
             </a:r>
-          </a:p>
-        </p:txBody>
-      </p:sp>
-      <p:sp>
-        <p:nvSpPr>
-          <p:cNvPr id="8" name="Freeform: Shape 7">
-            <a:extLst>
-              <a:ext uri="{FF2B5EF4-FFF2-40B4-BE49-F238E27FC236}">
-                <a16:creationId xmlns:a16="http://schemas.microsoft.com/office/drawing/2014/main" id="{5DB846E1-6276-EE97-921A-B03B32E3C452}"/>
-              </a:ext>
-            </a:extLst>
-          </p:cNvPr>
-          <p:cNvSpPr/>
-          <p:nvPr/>
-        </p:nvSpPr>
-        <p:spPr>
-          <a:xfrm>
-            <a:off x="6610350" y="1247775"/>
-            <a:ext cx="1371600" cy="790575"/>
-          </a:xfrm>
-          <a:custGeom>
-            <a:avLst/>
-            <a:gdLst>
-              <a:gd name="connsiteX0" fmla="*/ 1371600 w 1371600"/>
-              <a:gd name="connsiteY0" fmla="*/ 0 h 790575"/>
-              <a:gd name="connsiteX1" fmla="*/ 628650 w 1371600"/>
-              <a:gd name="connsiteY1" fmla="*/ 228600 h 790575"/>
-              <a:gd name="connsiteX2" fmla="*/ 0 w 1371600"/>
-              <a:gd name="connsiteY2" fmla="*/ 790575 h 790575"/>
-            </a:gdLst>
-            <a:ahLst/>
-            <a:cxnLst>
-              <a:cxn ang="0">
-                <a:pos x="connsiteX0" y="connsiteY0"/>
-              </a:cxn>
-              <a:cxn ang="0">
-                <a:pos x="connsiteX1" y="connsiteY1"/>
-              </a:cxn>
-              <a:cxn ang="0">
-                <a:pos x="connsiteX2" y="connsiteY2"/>
-              </a:cxn>
-            </a:cxnLst>
-            <a:rect l="l" t="t" r="r" b="b"/>
-            <a:pathLst>
-              <a:path w="1371600" h="790575">
-                <a:moveTo>
-                  <a:pt x="1371600" y="0"/>
-                </a:moveTo>
-                <a:cubicBezTo>
-                  <a:pt x="1114425" y="48419"/>
-                  <a:pt x="857250" y="96838"/>
-                  <a:pt x="628650" y="228600"/>
-                </a:cubicBezTo>
-                <a:cubicBezTo>
-                  <a:pt x="400050" y="360363"/>
-                  <a:pt x="200025" y="575469"/>
-                  <a:pt x="0" y="790575"/>
-                </a:cubicBezTo>
-              </a:path>
-            </a:pathLst>
-          </a:custGeom>
-          <a:noFill/>
-          <a:ln w="57150">
-            <a:solidFill>
-              <a:srgbClr val="5AA02C"/>
-            </a:solidFill>
-            <a:headEnd type="none" w="med" len="med"/>
-            <a:tailEnd type="arrow" w="med" len="med"/>
-          </a:ln>
-        </p:spPr>
-        <p:style>
-          <a:lnRef idx="2">
-            <a:schemeClr val="accent1">
-              <a:shade val="15000"/>
-            </a:schemeClr>
-          </a:lnRef>
-          <a:fillRef idx="1">
-            <a:schemeClr val="accent1"/>
-          </a:fillRef>
-          <a:effectRef idx="0">
-            <a:schemeClr val="accent1"/>
-          </a:effectRef>
-          <a:fontRef idx="minor">
-            <a:schemeClr val="lt1"/>
-          </a:fontRef>
-        </p:style>
-        <p:txBody>
-          <a:bodyPr rtlCol="0" anchor="ctr"/>
-          <a:lstStyle/>
-          <a:p>
-            <a:pPr algn="ctr"/>
-            <a:endParaRPr lang="en-US"/>
-          </a:p>
-        </p:txBody>
-      </p:sp>
-      <p:sp>
-        <p:nvSpPr>
-          <p:cNvPr id="12" name="TextBox 11">
-            <a:extLst>
-              <a:ext uri="{FF2B5EF4-FFF2-40B4-BE49-F238E27FC236}">
-                <a16:creationId xmlns:a16="http://schemas.microsoft.com/office/drawing/2014/main" id="{6D0B8AF9-962A-078B-BBE1-4750CC8F8CB1}"/>
-              </a:ext>
-            </a:extLst>
-          </p:cNvPr>
-          <p:cNvSpPr txBox="1"/>
-          <p:nvPr/>
-        </p:nvSpPr>
-        <p:spPr>
-          <a:xfrm>
-            <a:off x="2685381" y="2140892"/>
-            <a:ext cx="1172244" cy="461665"/>
-          </a:xfrm>
-          <a:prstGeom prst="rect">
-            <a:avLst/>
-          </a:prstGeom>
-          <a:noFill/>
-        </p:spPr>
-        <p:txBody>
-          <a:bodyPr wrap="none" rtlCol="0">
-            <a:spAutoFit/>
-          </a:bodyPr>
-          <a:lstStyle/>
-          <a:p>
-            <a:r>
-              <a:rPr lang="en-US" sz="2400" dirty="0">
-                <a:solidFill>
-                  <a:srgbClr val="37ABC8"/>
-                </a:solidFill>
-              </a:rPr>
-              <a:t>radius 1</a:t>
-            </a:r>
-          </a:p>
-        </p:txBody>
-      </p:sp>
-      <p:sp>
-        <p:nvSpPr>
-          <p:cNvPr id="13" name="Freeform: Shape 12">
-            <a:extLst>
-              <a:ext uri="{FF2B5EF4-FFF2-40B4-BE49-F238E27FC236}">
-                <a16:creationId xmlns:a16="http://schemas.microsoft.com/office/drawing/2014/main" id="{72CFC16E-862C-69D7-1020-D3A066FBA224}"/>
-              </a:ext>
-            </a:extLst>
-          </p:cNvPr>
-          <p:cNvSpPr/>
-          <p:nvPr/>
-        </p:nvSpPr>
-        <p:spPr>
-          <a:xfrm flipH="1">
-            <a:off x="3857624" y="2438399"/>
-            <a:ext cx="1038225" cy="614361"/>
-          </a:xfrm>
-          <a:custGeom>
-            <a:avLst/>
-            <a:gdLst>
-              <a:gd name="connsiteX0" fmla="*/ 1371600 w 1371600"/>
-              <a:gd name="connsiteY0" fmla="*/ 0 h 790575"/>
-              <a:gd name="connsiteX1" fmla="*/ 628650 w 1371600"/>
-              <a:gd name="connsiteY1" fmla="*/ 228600 h 790575"/>
-              <a:gd name="connsiteX2" fmla="*/ 0 w 1371600"/>
-              <a:gd name="connsiteY2" fmla="*/ 790575 h 790575"/>
-            </a:gdLst>
-            <a:ahLst/>
-            <a:cxnLst>
-              <a:cxn ang="0">
-                <a:pos x="connsiteX0" y="connsiteY0"/>
-              </a:cxn>
-              <a:cxn ang="0">
-                <a:pos x="connsiteX1" y="connsiteY1"/>
-              </a:cxn>
-              <a:cxn ang="0">
-                <a:pos x="connsiteX2" y="connsiteY2"/>
-              </a:cxn>
-            </a:cxnLst>
-            <a:rect l="l" t="t" r="r" b="b"/>
-            <a:pathLst>
-              <a:path w="1371600" h="790575">
-                <a:moveTo>
-                  <a:pt x="1371600" y="0"/>
-                </a:moveTo>
-                <a:cubicBezTo>
-                  <a:pt x="1114425" y="48419"/>
-                  <a:pt x="857250" y="96838"/>
-                  <a:pt x="628650" y="228600"/>
-                </a:cubicBezTo>
-                <a:cubicBezTo>
-                  <a:pt x="400050" y="360363"/>
-                  <a:pt x="200025" y="575469"/>
-                  <a:pt x="0" y="790575"/>
-                </a:cubicBezTo>
-              </a:path>
-            </a:pathLst>
-          </a:custGeom>
-          <a:noFill/>
-          <a:ln w="57150">
-            <a:solidFill>
-              <a:srgbClr val="37ABC8"/>
-            </a:solidFill>
-            <a:headEnd type="none" w="med" len="med"/>
-            <a:tailEnd type="arrow" w="med" len="med"/>
-          </a:ln>
-        </p:spPr>
-        <p:style>
-          <a:lnRef idx="2">
-            <a:schemeClr val="accent1">
-              <a:shade val="15000"/>
-            </a:schemeClr>
-          </a:lnRef>
-          <a:fillRef idx="1">
-            <a:schemeClr val="accent1"/>
-          </a:fillRef>
-          <a:effectRef idx="0">
-            <a:schemeClr val="accent1"/>
-          </a:effectRef>
-          <a:fontRef idx="minor">
-            <a:schemeClr val="lt1"/>
-          </a:fontRef>
-        </p:style>
-        <p:txBody>
-          <a:bodyPr rtlCol="0" anchor="ctr"/>
-          <a:lstStyle/>
-          <a:p>
-            <a:pPr algn="ctr"/>
-            <a:endParaRPr lang="en-US"/>
           </a:p>
         </p:txBody>
       </p:sp>
@@ -10996,7 +10773,7 @@
             </p:nvSpPr>
             <p:spPr>
               <a:xfrm>
-                <a:off x="8534400" y="4512320"/>
+                <a:off x="8810249" y="4887224"/>
                 <a:ext cx="1974002" cy="496483"/>
               </a:xfrm>
               <a:prstGeom prst="rect">
@@ -11091,7 +10868,7 @@
             </p:nvSpPr>
             <p:spPr>
               <a:xfrm>
-                <a:off x="8534400" y="4512320"/>
+                <a:off x="8810249" y="4887224"/>
                 <a:ext cx="1974002" cy="496483"/>
               </a:xfrm>
               <a:prstGeom prst="rect">
@@ -11100,7 +10877,7 @@
               <a:blipFill>
                 <a:blip r:embed="rId3"/>
                 <a:stretch>
-                  <a:fillRect l="-4630" t="-2439" b="-26829"/>
+                  <a:fillRect l="-4630" t="-2469" b="-28395"/>
                 </a:stretch>
               </a:blipFill>
             </p:spPr>
@@ -11121,10 +10898,10 @@
       </mc:AlternateContent>
       <p:sp>
         <p:nvSpPr>
-          <p:cNvPr id="15" name="Freeform: Shape 14">
-            <a:extLst>
-              <a:ext uri="{FF2B5EF4-FFF2-40B4-BE49-F238E27FC236}">
-                <a16:creationId xmlns:a16="http://schemas.microsoft.com/office/drawing/2014/main" id="{8723485F-552D-5C61-55A9-03566779893D}"/>
+          <p:cNvPr id="16" name="Freeform: Shape 15">
+            <a:extLst>
+              <a:ext uri="{FF2B5EF4-FFF2-40B4-BE49-F238E27FC236}">
+                <a16:creationId xmlns:a16="http://schemas.microsoft.com/office/drawing/2014/main" id="{C42CEF0A-B8AF-6B29-916D-0CB1D3BF2A0E}"/>
               </a:ext>
             </a:extLst>
           </p:cNvPr>
@@ -11132,9 +10909,232 @@
           <p:nvPr/>
         </p:nvSpPr>
         <p:spPr>
+          <a:xfrm flipH="1">
+            <a:off x="3391279" y="2438399"/>
+            <a:ext cx="1199008" cy="560833"/>
+          </a:xfrm>
+          <a:custGeom>
+            <a:avLst/>
+            <a:gdLst>
+              <a:gd name="connsiteX0" fmla="*/ 1371600 w 1371600"/>
+              <a:gd name="connsiteY0" fmla="*/ 0 h 790575"/>
+              <a:gd name="connsiteX1" fmla="*/ 628650 w 1371600"/>
+              <a:gd name="connsiteY1" fmla="*/ 228600 h 790575"/>
+              <a:gd name="connsiteX2" fmla="*/ 0 w 1371600"/>
+              <a:gd name="connsiteY2" fmla="*/ 790575 h 790575"/>
+            </a:gdLst>
+            <a:ahLst/>
+            <a:cxnLst>
+              <a:cxn ang="0">
+                <a:pos x="connsiteX0" y="connsiteY0"/>
+              </a:cxn>
+              <a:cxn ang="0">
+                <a:pos x="connsiteX1" y="connsiteY1"/>
+              </a:cxn>
+              <a:cxn ang="0">
+                <a:pos x="connsiteX2" y="connsiteY2"/>
+              </a:cxn>
+            </a:cxnLst>
+            <a:rect l="l" t="t" r="r" b="b"/>
+            <a:pathLst>
+              <a:path w="1371600" h="790575">
+                <a:moveTo>
+                  <a:pt x="1371600" y="0"/>
+                </a:moveTo>
+                <a:cubicBezTo>
+                  <a:pt x="1114425" y="48419"/>
+                  <a:pt x="857250" y="96838"/>
+                  <a:pt x="628650" y="228600"/>
+                </a:cubicBezTo>
+                <a:cubicBezTo>
+                  <a:pt x="400050" y="360363"/>
+                  <a:pt x="200025" y="575469"/>
+                  <a:pt x="0" y="790575"/>
+                </a:cubicBezTo>
+              </a:path>
+            </a:pathLst>
+          </a:custGeom>
+          <a:noFill/>
+          <a:ln w="57150">
+            <a:solidFill>
+              <a:srgbClr val="37ABC8"/>
+            </a:solidFill>
+            <a:headEnd type="none" w="med" len="med"/>
+            <a:tailEnd type="arrow" w="med" len="med"/>
+          </a:ln>
+        </p:spPr>
+        <p:style>
+          <a:lnRef idx="2">
+            <a:schemeClr val="accent1">
+              <a:shade val="15000"/>
+            </a:schemeClr>
+          </a:lnRef>
+          <a:fillRef idx="1">
+            <a:schemeClr val="accent1"/>
+          </a:fillRef>
+          <a:effectRef idx="0">
+            <a:schemeClr val="accent1"/>
+          </a:effectRef>
+          <a:fontRef idx="minor">
+            <a:schemeClr val="lt1"/>
+          </a:fontRef>
+        </p:style>
+        <p:txBody>
+          <a:bodyPr rtlCol="0" anchor="ctr"/>
+          <a:lstStyle/>
+          <a:p>
+            <a:pPr algn="ctr"/>
+            <a:endParaRPr lang="en-US"/>
+          </a:p>
+        </p:txBody>
+      </p:sp>
+      <p:sp>
+        <p:nvSpPr>
+          <p:cNvPr id="17" name="TextBox 16">
+            <a:extLst>
+              <a:ext uri="{FF2B5EF4-FFF2-40B4-BE49-F238E27FC236}">
+                <a16:creationId xmlns:a16="http://schemas.microsoft.com/office/drawing/2014/main" id="{D34273C0-6F10-3DB8-1039-9E7D995B4D89}"/>
+              </a:ext>
+            </a:extLst>
+          </p:cNvPr>
+          <p:cNvSpPr txBox="1"/>
+          <p:nvPr/>
+        </p:nvSpPr>
+        <p:spPr>
+          <a:xfrm>
+            <a:off x="2219037" y="2140892"/>
+            <a:ext cx="1353782" cy="461665"/>
+          </a:xfrm>
+          <a:prstGeom prst="rect">
+            <a:avLst/>
+          </a:prstGeom>
+          <a:noFill/>
+        </p:spPr>
+        <p:txBody>
+          <a:bodyPr wrap="square" rtlCol="0">
+            <a:spAutoFit/>
+          </a:bodyPr>
+          <a:lstStyle/>
+          <a:p>
+            <a:r>
+              <a:rPr lang="en-US" sz="2400" dirty="0">
+                <a:solidFill>
+                  <a:srgbClr val="37ABC8"/>
+                </a:solidFill>
+              </a:rPr>
+              <a:t>radius 1</a:t>
+            </a:r>
+          </a:p>
+        </p:txBody>
+      </p:sp>
+      <p:sp>
+        <p:nvSpPr>
+          <p:cNvPr id="18" name="Freeform: Shape 17">
+            <a:extLst>
+              <a:ext uri="{FF2B5EF4-FFF2-40B4-BE49-F238E27FC236}">
+                <a16:creationId xmlns:a16="http://schemas.microsoft.com/office/drawing/2014/main" id="{95ECEF44-86ED-84FF-EE7C-B2527E73AFF3}"/>
+              </a:ext>
+            </a:extLst>
+          </p:cNvPr>
+          <p:cNvSpPr/>
+          <p:nvPr/>
+        </p:nvSpPr>
+        <p:spPr>
+          <a:xfrm>
+            <a:off x="6885432" y="1247776"/>
+            <a:ext cx="1096518" cy="461666"/>
+          </a:xfrm>
+          <a:custGeom>
+            <a:avLst/>
+            <a:gdLst>
+              <a:gd name="connsiteX0" fmla="*/ 1371600 w 1371600"/>
+              <a:gd name="connsiteY0" fmla="*/ 0 h 790575"/>
+              <a:gd name="connsiteX1" fmla="*/ 628650 w 1371600"/>
+              <a:gd name="connsiteY1" fmla="*/ 228600 h 790575"/>
+              <a:gd name="connsiteX2" fmla="*/ 0 w 1371600"/>
+              <a:gd name="connsiteY2" fmla="*/ 790575 h 790575"/>
+            </a:gdLst>
+            <a:ahLst/>
+            <a:cxnLst>
+              <a:cxn ang="0">
+                <a:pos x="connsiteX0" y="connsiteY0"/>
+              </a:cxn>
+              <a:cxn ang="0">
+                <a:pos x="connsiteX1" y="connsiteY1"/>
+              </a:cxn>
+              <a:cxn ang="0">
+                <a:pos x="connsiteX2" y="connsiteY2"/>
+              </a:cxn>
+            </a:cxnLst>
+            <a:rect l="l" t="t" r="r" b="b"/>
+            <a:pathLst>
+              <a:path w="1371600" h="790575">
+                <a:moveTo>
+                  <a:pt x="1371600" y="0"/>
+                </a:moveTo>
+                <a:cubicBezTo>
+                  <a:pt x="1114425" y="48419"/>
+                  <a:pt x="857250" y="96838"/>
+                  <a:pt x="628650" y="228600"/>
+                </a:cubicBezTo>
+                <a:cubicBezTo>
+                  <a:pt x="400050" y="360363"/>
+                  <a:pt x="200025" y="575469"/>
+                  <a:pt x="0" y="790575"/>
+                </a:cubicBezTo>
+              </a:path>
+            </a:pathLst>
+          </a:custGeom>
+          <a:noFill/>
+          <a:ln w="57150">
+            <a:solidFill>
+              <a:srgbClr val="5AA02C"/>
+            </a:solidFill>
+            <a:headEnd type="none" w="med" len="med"/>
+            <a:tailEnd type="arrow" w="med" len="med"/>
+          </a:ln>
+        </p:spPr>
+        <p:style>
+          <a:lnRef idx="2">
+            <a:schemeClr val="accent1">
+              <a:shade val="15000"/>
+            </a:schemeClr>
+          </a:lnRef>
+          <a:fillRef idx="1">
+            <a:schemeClr val="accent1"/>
+          </a:fillRef>
+          <a:effectRef idx="0">
+            <a:schemeClr val="accent1"/>
+          </a:effectRef>
+          <a:fontRef idx="minor">
+            <a:schemeClr val="lt1"/>
+          </a:fontRef>
+        </p:style>
+        <p:txBody>
+          <a:bodyPr rtlCol="0" anchor="ctr"/>
+          <a:lstStyle/>
+          <a:p>
+            <a:pPr algn="ctr"/>
+            <a:endParaRPr lang="en-US"/>
+          </a:p>
+        </p:txBody>
+      </p:sp>
+      <p:sp>
+        <p:nvSpPr>
+          <p:cNvPr id="26" name="Freeform: Shape 25">
+            <a:extLst>
+              <a:ext uri="{FF2B5EF4-FFF2-40B4-BE49-F238E27FC236}">
+                <a16:creationId xmlns:a16="http://schemas.microsoft.com/office/drawing/2014/main" id="{D870A3FF-BFDD-D327-93D8-8385AF2F1862}"/>
+              </a:ext>
+            </a:extLst>
+          </p:cNvPr>
+          <p:cNvSpPr/>
+          <p:nvPr/>
+        </p:nvSpPr>
+        <p:spPr>
           <a:xfrm flipV="1">
-            <a:off x="6415756" y="4281488"/>
-            <a:ext cx="2118644" cy="461664"/>
+            <a:off x="6501384" y="4462272"/>
+            <a:ext cx="2299336" cy="713232"/>
           </a:xfrm>
           <a:custGeom>
             <a:avLst/>
@@ -11182,6 +11182,7 @@
             <a:solidFill>
               <a:srgbClr val="C00000"/>
             </a:solidFill>
+            <a:prstDash val="solid"/>
             <a:headEnd type="none" w="med" len="med"/>
             <a:tailEnd type="arrow" w="med" len="med"/>
           </a:ln>
@@ -11270,7 +11271,7 @@
                                           </p:stCondLst>
                                         </p:cTn>
                                         <p:tgtEl>
-                                          <p:spTgt spid="15"/>
+                                          <p:spTgt spid="14"/>
                                         </p:tgtEl>
                                         <p:attrNameLst>
                                           <p:attrName>style.visibility</p:attrName>
@@ -11284,7 +11285,7 @@
                                       <p:cBhvr>
                                         <p:cTn id="7" dur="500"/>
                                         <p:tgtEl>
-                                          <p:spTgt spid="15"/>
+                                          <p:spTgt spid="14"/>
                                         </p:tgtEl>
                                       </p:cBhvr>
                                     </p:animEffect>
@@ -11305,7 +11306,7 @@
                                           </p:stCondLst>
                                         </p:cTn>
                                         <p:tgtEl>
-                                          <p:spTgt spid="14"/>
+                                          <p:spTgt spid="26"/>
                                         </p:tgtEl>
                                         <p:attrNameLst>
                                           <p:attrName>style.visibility</p:attrName>
@@ -11319,7 +11320,7 @@
                                       <p:cBhvr>
                                         <p:cTn id="10" dur="500"/>
                                         <p:tgtEl>
-                                          <p:spTgt spid="14"/>
+                                          <p:spTgt spid="26"/>
                                         </p:tgtEl>
                                       </p:cBhvr>
                                     </p:animEffect>
@@ -11355,7 +11356,7 @@
     </p:tnLst>
     <p:bldLst>
       <p:bldP spid="14" grpId="0"/>
-      <p:bldP spid="15" grpId="0" animBg="1"/>
+      <p:bldP spid="26" grpId="0" animBg="1"/>
     </p:bldLst>
   </p:timing>
 </p:sld>
@@ -11605,8 +11606,8 @@
         </p:blipFill>
         <p:spPr>
           <a:xfrm>
-            <a:off x="4178604" y="1825625"/>
-            <a:ext cx="3834792" cy="4351338"/>
+            <a:off x="3578413" y="1144588"/>
+            <a:ext cx="5035174" cy="5713412"/>
           </a:xfrm>
         </p:spPr>
       </p:pic>
@@ -11651,10 +11652,10 @@
       </p:sp>
       <p:sp>
         <p:nvSpPr>
-          <p:cNvPr id="10" name="Freeform: Shape 9">
-            <a:extLst>
-              <a:ext uri="{FF2B5EF4-FFF2-40B4-BE49-F238E27FC236}">
-                <a16:creationId xmlns:a16="http://schemas.microsoft.com/office/drawing/2014/main" id="{3DD021CF-EA7B-B51C-69B9-A20D8B082CB3}"/>
+          <p:cNvPr id="18" name="Freeform: Shape 17">
+            <a:extLst>
+              <a:ext uri="{FF2B5EF4-FFF2-40B4-BE49-F238E27FC236}">
+                <a16:creationId xmlns:a16="http://schemas.microsoft.com/office/drawing/2014/main" id="{6DE28F6B-D77D-5780-279A-047C61D19FAC}"/>
               </a:ext>
             </a:extLst>
           </p:cNvPr>
@@ -11662,9 +11663,140 @@
           <p:nvPr/>
         </p:nvSpPr>
         <p:spPr>
+          <a:xfrm flipH="1">
+            <a:off x="3391279" y="2438399"/>
+            <a:ext cx="1199008" cy="560833"/>
+          </a:xfrm>
+          <a:custGeom>
+            <a:avLst/>
+            <a:gdLst>
+              <a:gd name="connsiteX0" fmla="*/ 1371600 w 1371600"/>
+              <a:gd name="connsiteY0" fmla="*/ 0 h 790575"/>
+              <a:gd name="connsiteX1" fmla="*/ 628650 w 1371600"/>
+              <a:gd name="connsiteY1" fmla="*/ 228600 h 790575"/>
+              <a:gd name="connsiteX2" fmla="*/ 0 w 1371600"/>
+              <a:gd name="connsiteY2" fmla="*/ 790575 h 790575"/>
+            </a:gdLst>
+            <a:ahLst/>
+            <a:cxnLst>
+              <a:cxn ang="0">
+                <a:pos x="connsiteX0" y="connsiteY0"/>
+              </a:cxn>
+              <a:cxn ang="0">
+                <a:pos x="connsiteX1" y="connsiteY1"/>
+              </a:cxn>
+              <a:cxn ang="0">
+                <a:pos x="connsiteX2" y="connsiteY2"/>
+              </a:cxn>
+            </a:cxnLst>
+            <a:rect l="l" t="t" r="r" b="b"/>
+            <a:pathLst>
+              <a:path w="1371600" h="790575">
+                <a:moveTo>
+                  <a:pt x="1371600" y="0"/>
+                </a:moveTo>
+                <a:cubicBezTo>
+                  <a:pt x="1114425" y="48419"/>
+                  <a:pt x="857250" y="96838"/>
+                  <a:pt x="628650" y="228600"/>
+                </a:cubicBezTo>
+                <a:cubicBezTo>
+                  <a:pt x="400050" y="360363"/>
+                  <a:pt x="200025" y="575469"/>
+                  <a:pt x="0" y="790575"/>
+                </a:cubicBezTo>
+              </a:path>
+            </a:pathLst>
+          </a:custGeom>
+          <a:noFill/>
+          <a:ln w="57150">
+            <a:solidFill>
+              <a:srgbClr val="37ABC8"/>
+            </a:solidFill>
+            <a:headEnd type="none" w="med" len="med"/>
+            <a:tailEnd type="arrow" w="med" len="med"/>
+          </a:ln>
+        </p:spPr>
+        <p:style>
+          <a:lnRef idx="2">
+            <a:schemeClr val="accent1">
+              <a:shade val="15000"/>
+            </a:schemeClr>
+          </a:lnRef>
+          <a:fillRef idx="1">
+            <a:schemeClr val="accent1"/>
+          </a:fillRef>
+          <a:effectRef idx="0">
+            <a:schemeClr val="accent1"/>
+          </a:effectRef>
+          <a:fontRef idx="minor">
+            <a:schemeClr val="lt1"/>
+          </a:fontRef>
+        </p:style>
+        <p:txBody>
+          <a:bodyPr rtlCol="0" anchor="ctr"/>
+          <a:lstStyle/>
+          <a:p>
+            <a:pPr algn="ctr"/>
+            <a:endParaRPr lang="en-US"/>
+          </a:p>
+        </p:txBody>
+      </p:sp>
+      <p:sp>
+        <p:nvSpPr>
+          <p:cNvPr id="19" name="TextBox 18">
+            <a:extLst>
+              <a:ext uri="{FF2B5EF4-FFF2-40B4-BE49-F238E27FC236}">
+                <a16:creationId xmlns:a16="http://schemas.microsoft.com/office/drawing/2014/main" id="{0507C1A4-1C90-722A-91E8-FDC95AFCE9F2}"/>
+              </a:ext>
+            </a:extLst>
+          </p:cNvPr>
+          <p:cNvSpPr txBox="1"/>
+          <p:nvPr/>
+        </p:nvSpPr>
+        <p:spPr>
           <a:xfrm>
-            <a:off x="6610350" y="1247775"/>
-            <a:ext cx="1371600" cy="790575"/>
+            <a:off x="2219037" y="2140892"/>
+            <a:ext cx="1353782" cy="461665"/>
+          </a:xfrm>
+          <a:prstGeom prst="rect">
+            <a:avLst/>
+          </a:prstGeom>
+          <a:noFill/>
+        </p:spPr>
+        <p:txBody>
+          <a:bodyPr wrap="square" rtlCol="0">
+            <a:spAutoFit/>
+          </a:bodyPr>
+          <a:lstStyle/>
+          <a:p>
+            <a:r>
+              <a:rPr lang="en-US" sz="2400" dirty="0">
+                <a:solidFill>
+                  <a:srgbClr val="37ABC8"/>
+                </a:solidFill>
+              </a:rPr>
+              <a:t>radius 1</a:t>
+            </a:r>
+          </a:p>
+        </p:txBody>
+      </p:sp>
+      <p:sp>
+        <p:nvSpPr>
+          <p:cNvPr id="20" name="Freeform: Shape 19">
+            <a:extLst>
+              <a:ext uri="{FF2B5EF4-FFF2-40B4-BE49-F238E27FC236}">
+                <a16:creationId xmlns:a16="http://schemas.microsoft.com/office/drawing/2014/main" id="{864BDA63-25ED-6126-ACAB-327E35135A3A}"/>
+              </a:ext>
+            </a:extLst>
+          </p:cNvPr>
+          <p:cNvSpPr/>
+          <p:nvPr/>
+        </p:nvSpPr>
+        <p:spPr>
+          <a:xfrm>
+            <a:off x="6885432" y="1247776"/>
+            <a:ext cx="1096518" cy="461666"/>
           </a:xfrm>
           <a:custGeom>
             <a:avLst/>
@@ -11741,145 +11873,14 @@
           </a:p>
         </p:txBody>
       </p:sp>
-      <p:sp>
-        <p:nvSpPr>
-          <p:cNvPr id="14" name="TextBox 13">
-            <a:extLst>
-              <a:ext uri="{FF2B5EF4-FFF2-40B4-BE49-F238E27FC236}">
-                <a16:creationId xmlns:a16="http://schemas.microsoft.com/office/drawing/2014/main" id="{557D37B5-2136-2BC0-9C98-4A086A783B75}"/>
-              </a:ext>
-            </a:extLst>
-          </p:cNvPr>
-          <p:cNvSpPr txBox="1"/>
-          <p:nvPr/>
-        </p:nvSpPr>
-        <p:spPr>
-          <a:xfrm>
-            <a:off x="2685381" y="2140892"/>
-            <a:ext cx="1172244" cy="461665"/>
-          </a:xfrm>
-          <a:prstGeom prst="rect">
-            <a:avLst/>
-          </a:prstGeom>
-          <a:noFill/>
-        </p:spPr>
-        <p:txBody>
-          <a:bodyPr wrap="none" rtlCol="0">
-            <a:spAutoFit/>
-          </a:bodyPr>
-          <a:lstStyle/>
-          <a:p>
-            <a:r>
-              <a:rPr lang="en-US" sz="2400" dirty="0">
-                <a:solidFill>
-                  <a:srgbClr val="37ABC8"/>
-                </a:solidFill>
-              </a:rPr>
-              <a:t>radius 1</a:t>
-            </a:r>
-          </a:p>
-        </p:txBody>
-      </p:sp>
-      <p:sp>
-        <p:nvSpPr>
-          <p:cNvPr id="15" name="Freeform: Shape 14">
-            <a:extLst>
-              <a:ext uri="{FF2B5EF4-FFF2-40B4-BE49-F238E27FC236}">
-                <a16:creationId xmlns:a16="http://schemas.microsoft.com/office/drawing/2014/main" id="{DC334834-0E09-A952-6B66-D735DB1C5CFF}"/>
-              </a:ext>
-            </a:extLst>
-          </p:cNvPr>
-          <p:cNvSpPr/>
-          <p:nvPr/>
-        </p:nvSpPr>
-        <p:spPr>
-          <a:xfrm flipH="1">
-            <a:off x="3857624" y="2438399"/>
-            <a:ext cx="1038225" cy="614361"/>
-          </a:xfrm>
-          <a:custGeom>
-            <a:avLst/>
-            <a:gdLst>
-              <a:gd name="connsiteX0" fmla="*/ 1371600 w 1371600"/>
-              <a:gd name="connsiteY0" fmla="*/ 0 h 790575"/>
-              <a:gd name="connsiteX1" fmla="*/ 628650 w 1371600"/>
-              <a:gd name="connsiteY1" fmla="*/ 228600 h 790575"/>
-              <a:gd name="connsiteX2" fmla="*/ 0 w 1371600"/>
-              <a:gd name="connsiteY2" fmla="*/ 790575 h 790575"/>
-            </a:gdLst>
-            <a:ahLst/>
-            <a:cxnLst>
-              <a:cxn ang="0">
-                <a:pos x="connsiteX0" y="connsiteY0"/>
-              </a:cxn>
-              <a:cxn ang="0">
-                <a:pos x="connsiteX1" y="connsiteY1"/>
-              </a:cxn>
-              <a:cxn ang="0">
-                <a:pos x="connsiteX2" y="connsiteY2"/>
-              </a:cxn>
-            </a:cxnLst>
-            <a:rect l="l" t="t" r="r" b="b"/>
-            <a:pathLst>
-              <a:path w="1371600" h="790575">
-                <a:moveTo>
-                  <a:pt x="1371600" y="0"/>
-                </a:moveTo>
-                <a:cubicBezTo>
-                  <a:pt x="1114425" y="48419"/>
-                  <a:pt x="857250" y="96838"/>
-                  <a:pt x="628650" y="228600"/>
-                </a:cubicBezTo>
-                <a:cubicBezTo>
-                  <a:pt x="400050" y="360363"/>
-                  <a:pt x="200025" y="575469"/>
-                  <a:pt x="0" y="790575"/>
-                </a:cubicBezTo>
-              </a:path>
-            </a:pathLst>
-          </a:custGeom>
-          <a:noFill/>
-          <a:ln w="57150">
-            <a:solidFill>
-              <a:srgbClr val="37ABC8"/>
-            </a:solidFill>
-            <a:headEnd type="none" w="med" len="med"/>
-            <a:tailEnd type="arrow" w="med" len="med"/>
-          </a:ln>
-        </p:spPr>
-        <p:style>
-          <a:lnRef idx="2">
-            <a:schemeClr val="accent1">
-              <a:shade val="15000"/>
-            </a:schemeClr>
-          </a:lnRef>
-          <a:fillRef idx="1">
-            <a:schemeClr val="accent1"/>
-          </a:fillRef>
-          <a:effectRef idx="0">
-            <a:schemeClr val="accent1"/>
-          </a:effectRef>
-          <a:fontRef idx="minor">
-            <a:schemeClr val="lt1"/>
-          </a:fontRef>
-        </p:style>
-        <p:txBody>
-          <a:bodyPr rtlCol="0" anchor="ctr"/>
-          <a:lstStyle/>
-          <a:p>
-            <a:pPr algn="ctr"/>
-            <a:endParaRPr lang="en-US"/>
-          </a:p>
-        </p:txBody>
-      </p:sp>
       <mc:AlternateContent xmlns:mc="http://schemas.openxmlformats.org/markup-compatibility/2006">
         <mc:Choice xmlns:a14="http://schemas.microsoft.com/office/drawing/2010/main" Requires="a14">
           <p:sp>
             <p:nvSpPr>
-              <p:cNvPr id="16" name="TextBox 15">
+              <p:cNvPr id="21" name="TextBox 20">
                 <a:extLst>
                   <a:ext uri="{FF2B5EF4-FFF2-40B4-BE49-F238E27FC236}">
-                    <a16:creationId xmlns:a16="http://schemas.microsoft.com/office/drawing/2014/main" id="{40870D38-1437-F2A3-8D43-463690BDC0B3}"/>
+                    <a16:creationId xmlns:a16="http://schemas.microsoft.com/office/drawing/2014/main" id="{0D67F29A-A1F6-90BC-D874-25133F15BDEF}"/>
                   </a:ext>
                 </a:extLst>
               </p:cNvPr>
@@ -11888,7 +11889,7 @@
             </p:nvSpPr>
             <p:spPr>
               <a:xfrm>
-                <a:off x="8534400" y="4512320"/>
+                <a:off x="8810249" y="4887224"/>
                 <a:ext cx="1974002" cy="496483"/>
               </a:xfrm>
               <a:prstGeom prst="rect">
@@ -11969,10 +11970,10 @@
         <mc:Fallback>
           <p:sp>
             <p:nvSpPr>
-              <p:cNvPr id="16" name="TextBox 15">
+              <p:cNvPr id="21" name="TextBox 20">
                 <a:extLst>
                   <a:ext uri="{FF2B5EF4-FFF2-40B4-BE49-F238E27FC236}">
-                    <a16:creationId xmlns:a16="http://schemas.microsoft.com/office/drawing/2014/main" id="{40870D38-1437-F2A3-8D43-463690BDC0B3}"/>
+                    <a16:creationId xmlns:a16="http://schemas.microsoft.com/office/drawing/2014/main" id="{0D67F29A-A1F6-90BC-D874-25133F15BDEF}"/>
                   </a:ext>
                 </a:extLst>
               </p:cNvPr>
@@ -11983,7 +11984,7 @@
             </p:nvSpPr>
             <p:spPr>
               <a:xfrm>
-                <a:off x="8534400" y="4512320"/>
+                <a:off x="8810249" y="4887224"/>
                 <a:ext cx="1974002" cy="496483"/>
               </a:xfrm>
               <a:prstGeom prst="rect">
@@ -11992,7 +11993,7 @@
               <a:blipFill>
                 <a:blip r:embed="rId3"/>
                 <a:stretch>
-                  <a:fillRect l="-4630" t="-2439" b="-26829"/>
+                  <a:fillRect l="-4630" t="-2469" b="-28395"/>
                 </a:stretch>
               </a:blipFill>
             </p:spPr>
@@ -12013,10 +12014,10 @@
       </mc:AlternateContent>
       <p:sp>
         <p:nvSpPr>
-          <p:cNvPr id="17" name="Freeform: Shape 16">
-            <a:extLst>
-              <a:ext uri="{FF2B5EF4-FFF2-40B4-BE49-F238E27FC236}">
-                <a16:creationId xmlns:a16="http://schemas.microsoft.com/office/drawing/2014/main" id="{2EBD2908-BB6A-C8BC-5EE5-3894D1B7105D}"/>
+          <p:cNvPr id="22" name="Freeform: Shape 21">
+            <a:extLst>
+              <a:ext uri="{FF2B5EF4-FFF2-40B4-BE49-F238E27FC236}">
+                <a16:creationId xmlns:a16="http://schemas.microsoft.com/office/drawing/2014/main" id="{88FB97FA-5B38-B9C6-2552-49A404345057}"/>
               </a:ext>
             </a:extLst>
           </p:cNvPr>
@@ -12025,8 +12026,8 @@
         </p:nvSpPr>
         <p:spPr>
           <a:xfrm flipV="1">
-            <a:off x="6415756" y="4281488"/>
-            <a:ext cx="2118644" cy="461664"/>
+            <a:off x="6501384" y="4462272"/>
+            <a:ext cx="2299336" cy="713232"/>
           </a:xfrm>
           <a:custGeom>
             <a:avLst/>
@@ -16539,8 +16540,8 @@
         </p:blipFill>
         <p:spPr>
           <a:xfrm>
-            <a:off x="4176292" y="1825625"/>
-            <a:ext cx="3839415" cy="4351338"/>
+            <a:off x="3575377" y="1144588"/>
+            <a:ext cx="5041246" cy="5713412"/>
           </a:xfrm>
         </p:spPr>
       </p:pic>
@@ -16632,8 +16633,8 @@
         </p:blipFill>
         <p:spPr>
           <a:xfrm>
-            <a:off x="4176292" y="1825625"/>
-            <a:ext cx="3839415" cy="4351338"/>
+            <a:off x="3575377" y="1144588"/>
+            <a:ext cx="5041246" cy="5713412"/>
           </a:xfrm>
         </p:spPr>
       </p:pic>
@@ -16725,8 +16726,8 @@
         </p:blipFill>
         <p:spPr>
           <a:xfrm>
-            <a:off x="4176292" y="1825625"/>
-            <a:ext cx="3839415" cy="4351338"/>
+            <a:off x="3575377" y="1144588"/>
+            <a:ext cx="5041246" cy="5713412"/>
           </a:xfrm>
         </p:spPr>
       </p:pic>

</xml_diff>

<commit_message>
added non convex (legend)
</commit_message>
<xml_diff>
--- a/slides_x_mas_2023.pptx
+++ b/slides_x_mas_2023.pptx
@@ -16731,6 +16731,137 @@
           </a:xfrm>
         </p:spPr>
       </p:pic>
+      <p:sp>
+        <p:nvSpPr>
+          <p:cNvPr id="13" name="Freeform: Shape 12">
+            <a:extLst>
+              <a:ext uri="{FF2B5EF4-FFF2-40B4-BE49-F238E27FC236}">
+                <a16:creationId xmlns:a16="http://schemas.microsoft.com/office/drawing/2014/main" id="{44CC0122-1416-4A37-71B6-04D71CDFF3DE}"/>
+              </a:ext>
+            </a:extLst>
+          </p:cNvPr>
+          <p:cNvSpPr/>
+          <p:nvPr/>
+        </p:nvSpPr>
+        <p:spPr>
+          <a:xfrm>
+            <a:off x="6343650" y="2798952"/>
+            <a:ext cx="2790825" cy="268098"/>
+          </a:xfrm>
+          <a:custGeom>
+            <a:avLst/>
+            <a:gdLst>
+              <a:gd name="connsiteX0" fmla="*/ 2790825 w 2790825"/>
+              <a:gd name="connsiteY0" fmla="*/ 182373 h 268098"/>
+              <a:gd name="connsiteX1" fmla="*/ 1314450 w 2790825"/>
+              <a:gd name="connsiteY1" fmla="*/ 1398 h 268098"/>
+              <a:gd name="connsiteX2" fmla="*/ 0 w 2790825"/>
+              <a:gd name="connsiteY2" fmla="*/ 268098 h 268098"/>
+            </a:gdLst>
+            <a:ahLst/>
+            <a:cxnLst>
+              <a:cxn ang="0">
+                <a:pos x="connsiteX0" y="connsiteY0"/>
+              </a:cxn>
+              <a:cxn ang="0">
+                <a:pos x="connsiteX1" y="connsiteY1"/>
+              </a:cxn>
+              <a:cxn ang="0">
+                <a:pos x="connsiteX2" y="connsiteY2"/>
+              </a:cxn>
+            </a:cxnLst>
+            <a:rect l="l" t="t" r="r" b="b"/>
+            <a:pathLst>
+              <a:path w="2790825" h="268098">
+                <a:moveTo>
+                  <a:pt x="2790825" y="182373"/>
+                </a:moveTo>
+                <a:cubicBezTo>
+                  <a:pt x="2285206" y="84741"/>
+                  <a:pt x="1779587" y="-12890"/>
+                  <a:pt x="1314450" y="1398"/>
+                </a:cubicBezTo>
+                <a:cubicBezTo>
+                  <a:pt x="849312" y="15685"/>
+                  <a:pt x="424656" y="141891"/>
+                  <a:pt x="0" y="268098"/>
+                </a:cubicBezTo>
+              </a:path>
+            </a:pathLst>
+          </a:custGeom>
+          <a:noFill/>
+          <a:ln w="76200">
+            <a:solidFill>
+              <a:schemeClr val="accent2"/>
+            </a:solidFill>
+            <a:headEnd type="none" w="med" len="med"/>
+            <a:tailEnd type="arrow" w="med" len="med"/>
+          </a:ln>
+        </p:spPr>
+        <p:style>
+          <a:lnRef idx="2">
+            <a:schemeClr val="accent1">
+              <a:shade val="15000"/>
+            </a:schemeClr>
+          </a:lnRef>
+          <a:fillRef idx="1">
+            <a:schemeClr val="accent1"/>
+          </a:fillRef>
+          <a:effectRef idx="0">
+            <a:schemeClr val="accent1"/>
+          </a:effectRef>
+          <a:fontRef idx="minor">
+            <a:schemeClr val="lt1"/>
+          </a:fontRef>
+        </p:style>
+        <p:txBody>
+          <a:bodyPr rtlCol="0" anchor="ctr"/>
+          <a:lstStyle/>
+          <a:p>
+            <a:pPr algn="ctr"/>
+            <a:endParaRPr lang="en-US"/>
+          </a:p>
+        </p:txBody>
+      </p:sp>
+      <p:sp>
+        <p:nvSpPr>
+          <p:cNvPr id="14" name="TextBox 13">
+            <a:extLst>
+              <a:ext uri="{FF2B5EF4-FFF2-40B4-BE49-F238E27FC236}">
+                <a16:creationId xmlns:a16="http://schemas.microsoft.com/office/drawing/2014/main" id="{16539977-3C35-E044-663B-BEE93133A81C}"/>
+              </a:ext>
+            </a:extLst>
+          </p:cNvPr>
+          <p:cNvSpPr txBox="1"/>
+          <p:nvPr/>
+        </p:nvSpPr>
+        <p:spPr>
+          <a:xfrm>
+            <a:off x="9134475" y="2702168"/>
+            <a:ext cx="1652184" cy="461665"/>
+          </a:xfrm>
+          <a:prstGeom prst="rect">
+            <a:avLst/>
+          </a:prstGeom>
+          <a:noFill/>
+        </p:spPr>
+        <p:txBody>
+          <a:bodyPr wrap="none" rtlCol="0">
+            <a:spAutoFit/>
+          </a:bodyPr>
+          <a:lstStyle/>
+          <a:p>
+            <a:r>
+              <a:rPr lang="en-US" sz="2400" b="1" dirty="0">
+                <a:solidFill>
+                  <a:schemeClr val="accent2"/>
+                </a:solidFill>
+              </a:rPr>
+              <a:t>Not Convex</a:t>
+            </a:r>
+          </a:p>
+        </p:txBody>
+      </p:sp>
     </p:spTree>
     <p:extLst>
       <p:ext uri="{BB962C8B-B14F-4D97-AF65-F5344CB8AC3E}">

</xml_diff>

<commit_message>
added big black cross
</commit_message>
<xml_diff>
--- a/slides_x_mas_2023.pptx
+++ b/slides_x_mas_2023.pptx
@@ -16300,6 +16300,87 @@
           </a:p>
         </p:txBody>
       </p:sp>
+      <p:sp>
+        <p:nvSpPr>
+          <p:cNvPr id="21" name="Freeform: Shape 20">
+            <a:extLst>
+              <a:ext uri="{FF2B5EF4-FFF2-40B4-BE49-F238E27FC236}">
+                <a16:creationId xmlns:a16="http://schemas.microsoft.com/office/drawing/2014/main" id="{0F52BAC9-6DBD-81C5-42B8-B75D04138306}"/>
+              </a:ext>
+            </a:extLst>
+          </p:cNvPr>
+          <p:cNvSpPr/>
+          <p:nvPr/>
+        </p:nvSpPr>
+        <p:spPr>
+          <a:xfrm>
+            <a:off x="4448303" y="2310861"/>
+            <a:ext cx="3502310" cy="3470806"/>
+          </a:xfrm>
+          <a:custGeom>
+            <a:avLst/>
+            <a:gdLst>
+              <a:gd name="connsiteX0" fmla="*/ 118313 w 118313"/>
+              <a:gd name="connsiteY0" fmla="*/ 0 h 118313"/>
+              <a:gd name="connsiteX1" fmla="*/ 1211 w 118313"/>
+              <a:gd name="connsiteY1" fmla="*/ 117474 h 118313"/>
+              <a:gd name="connsiteX2" fmla="*/ 0 w 118313"/>
+              <a:gd name="connsiteY2" fmla="*/ 846 h 118313"/>
+              <a:gd name="connsiteX3" fmla="*/ 117102 w 118313"/>
+              <a:gd name="connsiteY3" fmla="*/ 118313 h 118313"/>
+            </a:gdLst>
+            <a:ahLst/>
+            <a:cxnLst>
+              <a:cxn ang="0">
+                <a:pos x="connsiteX0" y="connsiteY0"/>
+              </a:cxn>
+              <a:cxn ang="0">
+                <a:pos x="connsiteX1" y="connsiteY1"/>
+              </a:cxn>
+              <a:cxn ang="0">
+                <a:pos x="connsiteX2" y="connsiteY2"/>
+              </a:cxn>
+              <a:cxn ang="0">
+                <a:pos x="connsiteX3" y="connsiteY3"/>
+              </a:cxn>
+            </a:cxnLst>
+            <a:rect l="l" t="t" r="r" b="b"/>
+            <a:pathLst>
+              <a:path w="118313" h="118313">
+                <a:moveTo>
+                  <a:pt x="118313" y="0"/>
+                </a:moveTo>
+                <a:lnTo>
+                  <a:pt x="1211" y="117474"/>
+                </a:lnTo>
+                <a:moveTo>
+                  <a:pt x="0" y="846"/>
+                </a:moveTo>
+                <a:lnTo>
+                  <a:pt x="117102" y="118313"/>
+                </a:lnTo>
+              </a:path>
+            </a:pathLst>
+          </a:custGeom>
+          <a:noFill/>
+          <a:ln w="1905000" cap="rnd">
+            <a:solidFill>
+              <a:schemeClr val="tx1">
+                <a:alpha val="75000"/>
+              </a:schemeClr>
+            </a:solidFill>
+            <a:prstDash val="solid"/>
+            <a:miter/>
+          </a:ln>
+        </p:spPr>
+        <p:txBody>
+          <a:bodyPr rtlCol="0" anchor="ctr"/>
+          <a:lstStyle/>
+          <a:p>
+            <a:endParaRPr lang="en-US"/>
+          </a:p>
+        </p:txBody>
+      </p:sp>
     </p:spTree>
     <p:extLst>
       <p:ext uri="{BB962C8B-B14F-4D97-AF65-F5344CB8AC3E}">
@@ -16436,6 +16517,59 @@
                       </p:childTnLst>
                     </p:cTn>
                   </p:par>
+                  <p:par>
+                    <p:cTn id="13" fill="hold">
+                      <p:stCondLst>
+                        <p:cond delay="indefinite"/>
+                      </p:stCondLst>
+                      <p:childTnLst>
+                        <p:par>
+                          <p:cTn id="14" fill="hold">
+                            <p:stCondLst>
+                              <p:cond delay="0"/>
+                            </p:stCondLst>
+                            <p:childTnLst>
+                              <p:par>
+                                <p:cTn id="15" presetID="10" presetClass="entr" presetSubtype="0" fill="hold" grpId="0" nodeType="clickEffect">
+                                  <p:stCondLst>
+                                    <p:cond delay="0"/>
+                                  </p:stCondLst>
+                                  <p:childTnLst>
+                                    <p:set>
+                                      <p:cBhvr>
+                                        <p:cTn id="16" dur="1" fill="hold">
+                                          <p:stCondLst>
+                                            <p:cond delay="0"/>
+                                          </p:stCondLst>
+                                        </p:cTn>
+                                        <p:tgtEl>
+                                          <p:spTgt spid="21"/>
+                                        </p:tgtEl>
+                                        <p:attrNameLst>
+                                          <p:attrName>style.visibility</p:attrName>
+                                        </p:attrNameLst>
+                                      </p:cBhvr>
+                                      <p:to>
+                                        <p:strVal val="visible"/>
+                                      </p:to>
+                                    </p:set>
+                                    <p:animEffect transition="in" filter="fade">
+                                      <p:cBhvr>
+                                        <p:cTn id="17" dur="500"/>
+                                        <p:tgtEl>
+                                          <p:spTgt spid="21"/>
+                                        </p:tgtEl>
+                                      </p:cBhvr>
+                                    </p:animEffect>
+                                  </p:childTnLst>
+                                </p:cTn>
+                              </p:par>
+                            </p:childTnLst>
+                          </p:cTn>
+                        </p:par>
+                      </p:childTnLst>
+                    </p:cTn>
+                  </p:par>
                 </p:childTnLst>
               </p:cTn>
               <p:prevCondLst>
@@ -16460,6 +16594,7 @@
     <p:bldLst>
       <p:bldP spid="19" grpId="0" animBg="1"/>
       <p:bldP spid="20" grpId="0" animBg="1"/>
+      <p:bldP spid="21" grpId="0" animBg="1"/>
     </p:bldLst>
   </p:timing>
 </p:sld>
@@ -16731,6 +16866,87 @@
           </a:xfrm>
         </p:spPr>
       </p:pic>
+      <p:sp>
+        <p:nvSpPr>
+          <p:cNvPr id="12" name="Freeform: Shape 11">
+            <a:extLst>
+              <a:ext uri="{FF2B5EF4-FFF2-40B4-BE49-F238E27FC236}">
+                <a16:creationId xmlns:a16="http://schemas.microsoft.com/office/drawing/2014/main" id="{A377E0E4-C07F-B72A-030A-8A87EE91B46D}"/>
+              </a:ext>
+            </a:extLst>
+          </p:cNvPr>
+          <p:cNvSpPr/>
+          <p:nvPr/>
+        </p:nvSpPr>
+        <p:spPr>
+          <a:xfrm>
+            <a:off x="4448303" y="2310861"/>
+            <a:ext cx="3502310" cy="3470806"/>
+          </a:xfrm>
+          <a:custGeom>
+            <a:avLst/>
+            <a:gdLst>
+              <a:gd name="connsiteX0" fmla="*/ 118313 w 118313"/>
+              <a:gd name="connsiteY0" fmla="*/ 0 h 118313"/>
+              <a:gd name="connsiteX1" fmla="*/ 1211 w 118313"/>
+              <a:gd name="connsiteY1" fmla="*/ 117474 h 118313"/>
+              <a:gd name="connsiteX2" fmla="*/ 0 w 118313"/>
+              <a:gd name="connsiteY2" fmla="*/ 846 h 118313"/>
+              <a:gd name="connsiteX3" fmla="*/ 117102 w 118313"/>
+              <a:gd name="connsiteY3" fmla="*/ 118313 h 118313"/>
+            </a:gdLst>
+            <a:ahLst/>
+            <a:cxnLst>
+              <a:cxn ang="0">
+                <a:pos x="connsiteX0" y="connsiteY0"/>
+              </a:cxn>
+              <a:cxn ang="0">
+                <a:pos x="connsiteX1" y="connsiteY1"/>
+              </a:cxn>
+              <a:cxn ang="0">
+                <a:pos x="connsiteX2" y="connsiteY2"/>
+              </a:cxn>
+              <a:cxn ang="0">
+                <a:pos x="connsiteX3" y="connsiteY3"/>
+              </a:cxn>
+            </a:cxnLst>
+            <a:rect l="l" t="t" r="r" b="b"/>
+            <a:pathLst>
+              <a:path w="118313" h="118313">
+                <a:moveTo>
+                  <a:pt x="118313" y="0"/>
+                </a:moveTo>
+                <a:lnTo>
+                  <a:pt x="1211" y="117474"/>
+                </a:lnTo>
+                <a:moveTo>
+                  <a:pt x="0" y="846"/>
+                </a:moveTo>
+                <a:lnTo>
+                  <a:pt x="117102" y="118313"/>
+                </a:lnTo>
+              </a:path>
+            </a:pathLst>
+          </a:custGeom>
+          <a:noFill/>
+          <a:ln w="1905000" cap="rnd">
+            <a:solidFill>
+              <a:schemeClr val="tx1">
+                <a:alpha val="75000"/>
+              </a:schemeClr>
+            </a:solidFill>
+            <a:prstDash val="solid"/>
+            <a:miter/>
+          </a:ln>
+        </p:spPr>
+        <p:txBody>
+          <a:bodyPr rtlCol="0" anchor="ctr"/>
+          <a:lstStyle/>
+          <a:p>
+            <a:endParaRPr lang="en-US"/>
+          </a:p>
+        </p:txBody>
+      </p:sp>
       <p:sp>
         <p:nvSpPr>
           <p:cNvPr id="13" name="Freeform: Shape 12">

</xml_diff>

<commit_message>
added animations for black cross & legend
</commit_message>
<xml_diff>
--- a/slides_x_mas_2023.pptx
+++ b/slides_x_mas_2023.pptx
@@ -16868,87 +16868,6 @@
       </p:pic>
       <p:sp>
         <p:nvSpPr>
-          <p:cNvPr id="12" name="Freeform: Shape 11">
-            <a:extLst>
-              <a:ext uri="{FF2B5EF4-FFF2-40B4-BE49-F238E27FC236}">
-                <a16:creationId xmlns:a16="http://schemas.microsoft.com/office/drawing/2014/main" id="{A377E0E4-C07F-B72A-030A-8A87EE91B46D}"/>
-              </a:ext>
-            </a:extLst>
-          </p:cNvPr>
-          <p:cNvSpPr/>
-          <p:nvPr/>
-        </p:nvSpPr>
-        <p:spPr>
-          <a:xfrm>
-            <a:off x="4448303" y="2310861"/>
-            <a:ext cx="3502310" cy="3470806"/>
-          </a:xfrm>
-          <a:custGeom>
-            <a:avLst/>
-            <a:gdLst>
-              <a:gd name="connsiteX0" fmla="*/ 118313 w 118313"/>
-              <a:gd name="connsiteY0" fmla="*/ 0 h 118313"/>
-              <a:gd name="connsiteX1" fmla="*/ 1211 w 118313"/>
-              <a:gd name="connsiteY1" fmla="*/ 117474 h 118313"/>
-              <a:gd name="connsiteX2" fmla="*/ 0 w 118313"/>
-              <a:gd name="connsiteY2" fmla="*/ 846 h 118313"/>
-              <a:gd name="connsiteX3" fmla="*/ 117102 w 118313"/>
-              <a:gd name="connsiteY3" fmla="*/ 118313 h 118313"/>
-            </a:gdLst>
-            <a:ahLst/>
-            <a:cxnLst>
-              <a:cxn ang="0">
-                <a:pos x="connsiteX0" y="connsiteY0"/>
-              </a:cxn>
-              <a:cxn ang="0">
-                <a:pos x="connsiteX1" y="connsiteY1"/>
-              </a:cxn>
-              <a:cxn ang="0">
-                <a:pos x="connsiteX2" y="connsiteY2"/>
-              </a:cxn>
-              <a:cxn ang="0">
-                <a:pos x="connsiteX3" y="connsiteY3"/>
-              </a:cxn>
-            </a:cxnLst>
-            <a:rect l="l" t="t" r="r" b="b"/>
-            <a:pathLst>
-              <a:path w="118313" h="118313">
-                <a:moveTo>
-                  <a:pt x="118313" y="0"/>
-                </a:moveTo>
-                <a:lnTo>
-                  <a:pt x="1211" y="117474"/>
-                </a:lnTo>
-                <a:moveTo>
-                  <a:pt x="0" y="846"/>
-                </a:moveTo>
-                <a:lnTo>
-                  <a:pt x="117102" y="118313"/>
-                </a:lnTo>
-              </a:path>
-            </a:pathLst>
-          </a:custGeom>
-          <a:noFill/>
-          <a:ln w="1905000" cap="rnd">
-            <a:solidFill>
-              <a:schemeClr val="tx1">
-                <a:alpha val="75000"/>
-              </a:schemeClr>
-            </a:solidFill>
-            <a:prstDash val="solid"/>
-            <a:miter/>
-          </a:ln>
-        </p:spPr>
-        <p:txBody>
-          <a:bodyPr rtlCol="0" anchor="ctr"/>
-          <a:lstStyle/>
-          <a:p>
-            <a:endParaRPr lang="en-US"/>
-          </a:p>
-        </p:txBody>
-      </p:sp>
-      <p:sp>
-        <p:nvSpPr>
           <p:cNvPr id="13" name="Freeform: Shape 12">
             <a:extLst>
               <a:ext uri="{FF2B5EF4-FFF2-40B4-BE49-F238E27FC236}">
@@ -17078,6 +16997,87 @@
           </a:p>
         </p:txBody>
       </p:sp>
+      <p:sp>
+        <p:nvSpPr>
+          <p:cNvPr id="12" name="Freeform: Shape 11">
+            <a:extLst>
+              <a:ext uri="{FF2B5EF4-FFF2-40B4-BE49-F238E27FC236}">
+                <a16:creationId xmlns:a16="http://schemas.microsoft.com/office/drawing/2014/main" id="{A377E0E4-C07F-B72A-030A-8A87EE91B46D}"/>
+              </a:ext>
+            </a:extLst>
+          </p:cNvPr>
+          <p:cNvSpPr/>
+          <p:nvPr/>
+        </p:nvSpPr>
+        <p:spPr>
+          <a:xfrm>
+            <a:off x="4448303" y="2310861"/>
+            <a:ext cx="3502310" cy="3470806"/>
+          </a:xfrm>
+          <a:custGeom>
+            <a:avLst/>
+            <a:gdLst>
+              <a:gd name="connsiteX0" fmla="*/ 118313 w 118313"/>
+              <a:gd name="connsiteY0" fmla="*/ 0 h 118313"/>
+              <a:gd name="connsiteX1" fmla="*/ 1211 w 118313"/>
+              <a:gd name="connsiteY1" fmla="*/ 117474 h 118313"/>
+              <a:gd name="connsiteX2" fmla="*/ 0 w 118313"/>
+              <a:gd name="connsiteY2" fmla="*/ 846 h 118313"/>
+              <a:gd name="connsiteX3" fmla="*/ 117102 w 118313"/>
+              <a:gd name="connsiteY3" fmla="*/ 118313 h 118313"/>
+            </a:gdLst>
+            <a:ahLst/>
+            <a:cxnLst>
+              <a:cxn ang="0">
+                <a:pos x="connsiteX0" y="connsiteY0"/>
+              </a:cxn>
+              <a:cxn ang="0">
+                <a:pos x="connsiteX1" y="connsiteY1"/>
+              </a:cxn>
+              <a:cxn ang="0">
+                <a:pos x="connsiteX2" y="connsiteY2"/>
+              </a:cxn>
+              <a:cxn ang="0">
+                <a:pos x="connsiteX3" y="connsiteY3"/>
+              </a:cxn>
+            </a:cxnLst>
+            <a:rect l="l" t="t" r="r" b="b"/>
+            <a:pathLst>
+              <a:path w="118313" h="118313">
+                <a:moveTo>
+                  <a:pt x="118313" y="0"/>
+                </a:moveTo>
+                <a:lnTo>
+                  <a:pt x="1211" y="117474"/>
+                </a:lnTo>
+                <a:moveTo>
+                  <a:pt x="0" y="846"/>
+                </a:moveTo>
+                <a:lnTo>
+                  <a:pt x="117102" y="118313"/>
+                </a:lnTo>
+              </a:path>
+            </a:pathLst>
+          </a:custGeom>
+          <a:noFill/>
+          <a:ln w="1905000" cap="rnd">
+            <a:solidFill>
+              <a:schemeClr val="tx1">
+                <a:alpha val="75000"/>
+              </a:schemeClr>
+            </a:solidFill>
+            <a:prstDash val="solid"/>
+            <a:miter/>
+          </a:ln>
+        </p:spPr>
+        <p:txBody>
+          <a:bodyPr rtlCol="0" anchor="ctr"/>
+          <a:lstStyle/>
+          <a:p>
+            <a:endParaRPr lang="en-US"/>
+          </a:p>
+        </p:txBody>
+      </p:sp>
     </p:spTree>
     <p:extLst>
       <p:ext uri="{BB962C8B-B14F-4D97-AF65-F5344CB8AC3E}">
@@ -17088,6 +17088,182 @@
   <p:clrMapOvr>
     <a:masterClrMapping/>
   </p:clrMapOvr>
+  <p:timing>
+    <p:tnLst>
+      <p:par>
+        <p:cTn id="1" dur="indefinite" restart="never" nodeType="tmRoot">
+          <p:childTnLst>
+            <p:seq concurrent="1" nextAc="seek">
+              <p:cTn id="2" dur="indefinite" nodeType="mainSeq">
+                <p:childTnLst>
+                  <p:par>
+                    <p:cTn id="3" fill="hold">
+                      <p:stCondLst>
+                        <p:cond delay="indefinite"/>
+                      </p:stCondLst>
+                      <p:childTnLst>
+                        <p:par>
+                          <p:cTn id="4" fill="hold">
+                            <p:stCondLst>
+                              <p:cond delay="0"/>
+                            </p:stCondLst>
+                            <p:childTnLst>
+                              <p:par>
+                                <p:cTn id="5" presetID="10" presetClass="entr" presetSubtype="0" fill="hold" grpId="0" nodeType="clickEffect">
+                                  <p:stCondLst>
+                                    <p:cond delay="0"/>
+                                  </p:stCondLst>
+                                  <p:childTnLst>
+                                    <p:set>
+                                      <p:cBhvr>
+                                        <p:cTn id="6" dur="1" fill="hold">
+                                          <p:stCondLst>
+                                            <p:cond delay="0"/>
+                                          </p:stCondLst>
+                                        </p:cTn>
+                                        <p:tgtEl>
+                                          <p:spTgt spid="13"/>
+                                        </p:tgtEl>
+                                        <p:attrNameLst>
+                                          <p:attrName>style.visibility</p:attrName>
+                                        </p:attrNameLst>
+                                      </p:cBhvr>
+                                      <p:to>
+                                        <p:strVal val="visible"/>
+                                      </p:to>
+                                    </p:set>
+                                    <p:animEffect transition="in" filter="fade">
+                                      <p:cBhvr>
+                                        <p:cTn id="7" dur="500"/>
+                                        <p:tgtEl>
+                                          <p:spTgt spid="13"/>
+                                        </p:tgtEl>
+                                      </p:cBhvr>
+                                    </p:animEffect>
+                                  </p:childTnLst>
+                                </p:cTn>
+                              </p:par>
+                              <p:par>
+                                <p:cTn id="8" presetID="10" presetClass="entr" presetSubtype="0" fill="hold" grpId="0" nodeType="withEffect">
+                                  <p:stCondLst>
+                                    <p:cond delay="0"/>
+                                  </p:stCondLst>
+                                  <p:childTnLst>
+                                    <p:set>
+                                      <p:cBhvr>
+                                        <p:cTn id="9" dur="1" fill="hold">
+                                          <p:stCondLst>
+                                            <p:cond delay="0"/>
+                                          </p:stCondLst>
+                                        </p:cTn>
+                                        <p:tgtEl>
+                                          <p:spTgt spid="14"/>
+                                        </p:tgtEl>
+                                        <p:attrNameLst>
+                                          <p:attrName>style.visibility</p:attrName>
+                                        </p:attrNameLst>
+                                      </p:cBhvr>
+                                      <p:to>
+                                        <p:strVal val="visible"/>
+                                      </p:to>
+                                    </p:set>
+                                    <p:animEffect transition="in" filter="fade">
+                                      <p:cBhvr>
+                                        <p:cTn id="10" dur="500"/>
+                                        <p:tgtEl>
+                                          <p:spTgt spid="14"/>
+                                        </p:tgtEl>
+                                      </p:cBhvr>
+                                    </p:animEffect>
+                                  </p:childTnLst>
+                                </p:cTn>
+                              </p:par>
+                            </p:childTnLst>
+                          </p:cTn>
+                        </p:par>
+                      </p:childTnLst>
+                    </p:cTn>
+                  </p:par>
+                  <p:par>
+                    <p:cTn id="11" fill="hold">
+                      <p:stCondLst>
+                        <p:cond delay="indefinite"/>
+                      </p:stCondLst>
+                      <p:childTnLst>
+                        <p:par>
+                          <p:cTn id="12" fill="hold">
+                            <p:stCondLst>
+                              <p:cond delay="0"/>
+                            </p:stCondLst>
+                            <p:childTnLst>
+                              <p:par>
+                                <p:cTn id="13" presetID="10" presetClass="entr" presetSubtype="0" fill="hold" grpId="0" nodeType="clickEffect">
+                                  <p:stCondLst>
+                                    <p:cond delay="0"/>
+                                  </p:stCondLst>
+                                  <p:childTnLst>
+                                    <p:set>
+                                      <p:cBhvr>
+                                        <p:cTn id="14" dur="1" fill="hold">
+                                          <p:stCondLst>
+                                            <p:cond delay="0"/>
+                                          </p:stCondLst>
+                                        </p:cTn>
+                                        <p:tgtEl>
+                                          <p:spTgt spid="12"/>
+                                        </p:tgtEl>
+                                        <p:attrNameLst>
+                                          <p:attrName>style.visibility</p:attrName>
+                                        </p:attrNameLst>
+                                      </p:cBhvr>
+                                      <p:to>
+                                        <p:strVal val="visible"/>
+                                      </p:to>
+                                    </p:set>
+                                    <p:animEffect transition="in" filter="fade">
+                                      <p:cBhvr>
+                                        <p:cTn id="15" dur="500"/>
+                                        <p:tgtEl>
+                                          <p:spTgt spid="12"/>
+                                        </p:tgtEl>
+                                      </p:cBhvr>
+                                    </p:animEffect>
+                                  </p:childTnLst>
+                                </p:cTn>
+                              </p:par>
+                            </p:childTnLst>
+                          </p:cTn>
+                        </p:par>
+                      </p:childTnLst>
+                    </p:cTn>
+                  </p:par>
+                </p:childTnLst>
+              </p:cTn>
+              <p:prevCondLst>
+                <p:cond evt="onPrev" delay="0">
+                  <p:tgtEl>
+                    <p:sldTgt/>
+                  </p:tgtEl>
+                </p:cond>
+              </p:prevCondLst>
+              <p:nextCondLst>
+                <p:cond evt="onNext" delay="0">
+                  <p:tgtEl>
+                    <p:sldTgt/>
+                  </p:tgtEl>
+                </p:cond>
+              </p:nextCondLst>
+            </p:seq>
+          </p:childTnLst>
+        </p:cTn>
+      </p:par>
+    </p:tnLst>
+    <p:bldLst>
+      <p:bldP spid="13" grpId="0" animBg="1"/>
+      <p:bldP spid="14" grpId="0"/>
+      <p:bldP spid="12" grpId="0" animBg="1"/>
+    </p:bldLst>
+  </p:timing>
 </p:sld>
 </file>
 

</xml_diff>

<commit_message>
higher dimensions of 𝜋
</commit_message>
<xml_diff>
--- a/slides_x_mas_2023.pptx
+++ b/slides_x_mas_2023.pptx
@@ -14,22 +14,23 @@
     <p:sldId id="263" r:id="rId8"/>
     <p:sldId id="266" r:id="rId9"/>
     <p:sldId id="267" r:id="rId10"/>
-    <p:sldId id="270" r:id="rId11"/>
-    <p:sldId id="268" r:id="rId12"/>
-    <p:sldId id="272" r:id="rId13"/>
-    <p:sldId id="273" r:id="rId14"/>
-    <p:sldId id="269" r:id="rId15"/>
-    <p:sldId id="274" r:id="rId16"/>
-    <p:sldId id="275" r:id="rId17"/>
-    <p:sldId id="276" r:id="rId18"/>
-    <p:sldId id="277" r:id="rId19"/>
-    <p:sldId id="279" r:id="rId20"/>
-    <p:sldId id="278" r:id="rId21"/>
-    <p:sldId id="280" r:id="rId22"/>
-    <p:sldId id="281" r:id="rId23"/>
-    <p:sldId id="282" r:id="rId24"/>
-    <p:sldId id="283" r:id="rId25"/>
-    <p:sldId id="285" r:id="rId26"/>
+    <p:sldId id="286" r:id="rId11"/>
+    <p:sldId id="270" r:id="rId12"/>
+    <p:sldId id="268" r:id="rId13"/>
+    <p:sldId id="272" r:id="rId14"/>
+    <p:sldId id="273" r:id="rId15"/>
+    <p:sldId id="269" r:id="rId16"/>
+    <p:sldId id="274" r:id="rId17"/>
+    <p:sldId id="275" r:id="rId18"/>
+    <p:sldId id="276" r:id="rId19"/>
+    <p:sldId id="277" r:id="rId20"/>
+    <p:sldId id="279" r:id="rId21"/>
+    <p:sldId id="278" r:id="rId22"/>
+    <p:sldId id="280" r:id="rId23"/>
+    <p:sldId id="281" r:id="rId24"/>
+    <p:sldId id="282" r:id="rId25"/>
+    <p:sldId id="283" r:id="rId26"/>
+    <p:sldId id="285" r:id="rId27"/>
   </p:sldIdLst>
   <p:sldSz cx="12192000" cy="6858000"/>
   <p:notesSz cx="6858000" cy="9144000"/>
@@ -149,7 +150,9 @@
           </p14:sldIdLst>
         </p14:section>
         <p14:section name="Unusual" id="{42EB159F-85B8-41F3-970F-2D80DA23F3BA}">
-          <p14:sldIdLst/>
+          <p14:sldIdLst>
+            <p14:sldId id="286"/>
+          </p14:sldIdLst>
         </p14:section>
         <p14:section name="Paradoxical" id="{E2223571-FAC5-4589-B421-244975766BB0}">
           <p14:sldIdLst>
@@ -3569,6 +3572,1061 @@
 </file>
 
 <file path=ppt/slides/slide10.xml><?xml version="1.0" encoding="utf-8"?>
+<p:sld xmlns:a="http://schemas.openxmlformats.org/drawingml/2006/main" xmlns:r="http://schemas.openxmlformats.org/officeDocument/2006/relationships" xmlns:p="http://schemas.openxmlformats.org/presentationml/2006/main">
+  <p:cSld>
+    <p:spTree>
+      <p:nvGrpSpPr>
+        <p:cNvPr id="1" name=""/>
+        <p:cNvGrpSpPr/>
+        <p:nvPr/>
+      </p:nvGrpSpPr>
+      <p:grpSpPr>
+        <a:xfrm>
+          <a:off x="0" y="0"/>
+          <a:ext cx="0" cy="0"/>
+          <a:chOff x="0" y="0"/>
+          <a:chExt cx="0" cy="0"/>
+        </a:xfrm>
+      </p:grpSpPr>
+      <mc:AlternateContent xmlns:mc="http://schemas.openxmlformats.org/markup-compatibility/2006">
+        <mc:Choice xmlns:a14="http://schemas.microsoft.com/office/drawing/2010/main" Requires="a14">
+          <p:sp>
+            <p:nvSpPr>
+              <p:cNvPr id="2" name="Title 1">
+                <a:extLst>
+                  <a:ext uri="{FF2B5EF4-FFF2-40B4-BE49-F238E27FC236}">
+                    <a16:creationId xmlns:a16="http://schemas.microsoft.com/office/drawing/2014/main" id="{8C05AE3B-AE49-C871-060B-C8D7775FF581}"/>
+                  </a:ext>
+                </a:extLst>
+              </p:cNvPr>
+              <p:cNvSpPr>
+                <a:spLocks noGrp="1"/>
+              </p:cNvSpPr>
+              <p:nvPr>
+                <p:ph type="title"/>
+              </p:nvPr>
+            </p:nvSpPr>
+            <p:spPr/>
+            <p:txBody>
+              <a:bodyPr/>
+              <a:lstStyle/>
+              <a:p>
+                <a:r>
+                  <a:rPr lang="en-US" dirty="0"/>
+                  <a:t>Higher dimensions of </a:t>
+                </a:r>
+                <a14:m>
+                  <m:oMath xmlns:m="http://schemas.openxmlformats.org/officeDocument/2006/math">
+                    <m:r>
+                      <a:rPr lang="en-US" b="0" i="1" smtClean="0">
+                        <a:latin typeface="Cambria Math" panose="02040503050406030204" pitchFamily="18" charset="0"/>
+                      </a:rPr>
+                      <m:t>𝜋</m:t>
+                    </m:r>
+                  </m:oMath>
+                </a14:m>
+                <a:endParaRPr lang="en-US" dirty="0"/>
+              </a:p>
+            </p:txBody>
+          </p:sp>
+        </mc:Choice>
+        <mc:Fallback>
+          <p:sp>
+            <p:nvSpPr>
+              <p:cNvPr id="2" name="Title 1">
+                <a:extLst>
+                  <a:ext uri="{FF2B5EF4-FFF2-40B4-BE49-F238E27FC236}">
+                    <a16:creationId xmlns:a16="http://schemas.microsoft.com/office/drawing/2014/main" id="{8C05AE3B-AE49-C871-060B-C8D7775FF581}"/>
+                  </a:ext>
+                </a:extLst>
+              </p:cNvPr>
+              <p:cNvSpPr>
+                <a:spLocks noGrp="1" noRot="1" noChangeAspect="1" noMove="1" noResize="1" noEditPoints="1" noAdjustHandles="1" noChangeArrowheads="1" noChangeShapeType="1" noTextEdit="1"/>
+              </p:cNvSpPr>
+              <p:nvPr>
+                <p:ph type="title"/>
+              </p:nvPr>
+            </p:nvSpPr>
+            <p:spPr>
+              <a:blipFill>
+                <a:blip r:embed="rId2"/>
+                <a:stretch>
+                  <a:fillRect l="-2377"/>
+                </a:stretch>
+              </a:blipFill>
+            </p:spPr>
+            <p:txBody>
+              <a:bodyPr/>
+              <a:lstStyle/>
+              <a:p>
+                <a:r>
+                  <a:rPr lang="en-US">
+                    <a:noFill/>
+                  </a:rPr>
+                  <a:t> </a:t>
+                </a:r>
+              </a:p>
+            </p:txBody>
+          </p:sp>
+        </mc:Fallback>
+      </mc:AlternateContent>
+      <mc:AlternateContent xmlns:mc="http://schemas.openxmlformats.org/markup-compatibility/2006">
+        <mc:Choice xmlns:a14="http://schemas.microsoft.com/office/drawing/2010/main" Requires="a14">
+          <p:sp>
+            <p:nvSpPr>
+              <p:cNvPr id="3" name="Content Placeholder 2">
+                <a:extLst>
+                  <a:ext uri="{FF2B5EF4-FFF2-40B4-BE49-F238E27FC236}">
+                    <a16:creationId xmlns:a16="http://schemas.microsoft.com/office/drawing/2014/main" id="{71E87AF7-D3FD-BB99-B657-CDB74C1380BD}"/>
+                  </a:ext>
+                </a:extLst>
+              </p:cNvPr>
+              <p:cNvSpPr>
+                <a:spLocks noGrp="1"/>
+              </p:cNvSpPr>
+              <p:nvPr>
+                <p:ph idx="1"/>
+              </p:nvPr>
+            </p:nvSpPr>
+            <p:spPr>
+              <a:xfrm>
+                <a:off x="838200" y="1825624"/>
+                <a:ext cx="10515600" cy="5032375"/>
+              </a:xfrm>
+            </p:spPr>
+            <p:txBody>
+              <a:bodyPr>
+                <a:normAutofit lnSpcReduction="10000"/>
+              </a:bodyPr>
+              <a:lstStyle/>
+              <a:p>
+                <a:r>
+                  <a:rPr lang="en-US" dirty="0"/>
+                  <a:t>A </a:t>
+                </a:r>
+                <a14:m>
+                  <m:oMath xmlns:m="http://schemas.openxmlformats.org/officeDocument/2006/math">
+                    <m:r>
+                      <a:rPr lang="en-US" i="1" dirty="0">
+                        <a:latin typeface="Cambria Math" panose="02040503050406030204" pitchFamily="18" charset="0"/>
+                      </a:rPr>
+                      <m:t>1</m:t>
+                    </m:r>
+                    <m:r>
+                      <a:rPr lang="en-US" i="1" dirty="0">
+                        <a:latin typeface="Cambria Math" panose="02040503050406030204" pitchFamily="18" charset="0"/>
+                      </a:rPr>
+                      <m:t>𝐷</m:t>
+                    </m:r>
+                  </m:oMath>
+                </a14:m>
+                <a:r>
+                  <a:rPr lang="en-US" dirty="0"/>
+                  <a:t>-ball of radius </a:t>
+                </a:r>
+                <a14:m>
+                  <m:oMath xmlns:m="http://schemas.openxmlformats.org/officeDocument/2006/math">
+                    <m:r>
+                      <a:rPr lang="en-US" i="1" dirty="0">
+                        <a:latin typeface="Cambria Math" panose="02040503050406030204" pitchFamily="18" charset="0"/>
+                      </a:rPr>
+                      <m:t>1</m:t>
+                    </m:r>
+                  </m:oMath>
+                </a14:m>
+                <a:r>
+                  <a:rPr lang="en-US" dirty="0"/>
+                  <a:t> has </a:t>
+                </a:r>
+                <a14:m>
+                  <m:oMath xmlns:m="http://schemas.openxmlformats.org/officeDocument/2006/math">
+                    <m:r>
+                      <a:rPr lang="en-US" i="1" dirty="0">
+                        <a:latin typeface="Cambria Math" panose="02040503050406030204" pitchFamily="18" charset="0"/>
+                      </a:rPr>
+                      <m:t>1</m:t>
+                    </m:r>
+                    <m:r>
+                      <a:rPr lang="en-US" i="1" dirty="0">
+                        <a:latin typeface="Cambria Math" panose="02040503050406030204" pitchFamily="18" charset="0"/>
+                      </a:rPr>
+                      <m:t>𝐷</m:t>
+                    </m:r>
+                  </m:oMath>
+                </a14:m>
+                <a:r>
+                  <a:rPr lang="en-US" dirty="0"/>
+                  <a:t>-volume (length) of </a:t>
+                </a:r>
+                <a14:m>
+                  <m:oMath xmlns:m="http://schemas.openxmlformats.org/officeDocument/2006/math">
+                    <m:r>
+                      <a:rPr lang="en-US" i="1" dirty="0">
+                        <a:latin typeface="Cambria Math" panose="02040503050406030204" pitchFamily="18" charset="0"/>
+                      </a:rPr>
+                      <m:t>2</m:t>
+                    </m:r>
+                  </m:oMath>
+                </a14:m>
+                <a:endParaRPr lang="en-US" dirty="0"/>
+              </a:p>
+              <a:p>
+                <a:r>
+                  <a:rPr lang="en-US" dirty="0"/>
+                  <a:t>A </a:t>
+                </a:r>
+                <a14:m>
+                  <m:oMath xmlns:m="http://schemas.openxmlformats.org/officeDocument/2006/math">
+                    <m:r>
+                      <a:rPr lang="en-US" b="0" i="1" dirty="0" smtClean="0">
+                        <a:latin typeface="Cambria Math" panose="02040503050406030204" pitchFamily="18" charset="0"/>
+                      </a:rPr>
+                      <m:t>2</m:t>
+                    </m:r>
+                    <m:r>
+                      <a:rPr lang="en-US" b="0" i="1" dirty="0" smtClean="0">
+                        <a:latin typeface="Cambria Math" panose="02040503050406030204" pitchFamily="18" charset="0"/>
+                      </a:rPr>
+                      <m:t>𝐷</m:t>
+                    </m:r>
+                  </m:oMath>
+                </a14:m>
+                <a:r>
+                  <a:rPr lang="en-US" dirty="0"/>
+                  <a:t>-ball of radius </a:t>
+                </a:r>
+                <a14:m>
+                  <m:oMath xmlns:m="http://schemas.openxmlformats.org/officeDocument/2006/math">
+                    <m:r>
+                      <a:rPr lang="en-US" i="1" dirty="0" smtClean="0">
+                        <a:latin typeface="Cambria Math" panose="02040503050406030204" pitchFamily="18" charset="0"/>
+                      </a:rPr>
+                      <m:t>1</m:t>
+                    </m:r>
+                  </m:oMath>
+                </a14:m>
+                <a:r>
+                  <a:rPr lang="en-US" dirty="0"/>
+                  <a:t> has </a:t>
+                </a:r>
+                <a14:m>
+                  <m:oMath xmlns:m="http://schemas.openxmlformats.org/officeDocument/2006/math">
+                    <m:r>
+                      <a:rPr lang="en-US" b="0" i="1" dirty="0" smtClean="0">
+                        <a:latin typeface="Cambria Math" panose="02040503050406030204" pitchFamily="18" charset="0"/>
+                      </a:rPr>
+                      <m:t>2</m:t>
+                    </m:r>
+                    <m:r>
+                      <a:rPr lang="en-US" b="0" i="1" dirty="0" smtClean="0">
+                        <a:latin typeface="Cambria Math" panose="02040503050406030204" pitchFamily="18" charset="0"/>
+                      </a:rPr>
+                      <m:t>𝐷</m:t>
+                    </m:r>
+                  </m:oMath>
+                </a14:m>
+                <a:r>
+                  <a:rPr lang="en-US" dirty="0"/>
+                  <a:t>-volume (area) of </a:t>
+                </a:r>
+                <a14:m>
+                  <m:oMath xmlns:m="http://schemas.openxmlformats.org/officeDocument/2006/math">
+                    <m:r>
+                      <a:rPr lang="en-US" b="0" i="1" dirty="0" smtClean="0">
+                        <a:latin typeface="Cambria Math" panose="02040503050406030204" pitchFamily="18" charset="0"/>
+                      </a:rPr>
+                      <m:t>𝜋</m:t>
+                    </m:r>
+                    <m:r>
+                      <a:rPr lang="en-US" b="0" i="1" dirty="0" smtClean="0">
+                        <a:latin typeface="Cambria Math" panose="02040503050406030204" pitchFamily="18" charset="0"/>
+                      </a:rPr>
+                      <m:t>≈3.14159</m:t>
+                    </m:r>
+                  </m:oMath>
+                </a14:m>
+                <a:endParaRPr lang="en-US" dirty="0"/>
+              </a:p>
+              <a:p>
+                <a:r>
+                  <a:rPr lang="en-US" dirty="0"/>
+                  <a:t>A </a:t>
+                </a:r>
+                <a14:m>
+                  <m:oMath xmlns:m="http://schemas.openxmlformats.org/officeDocument/2006/math">
+                    <m:r>
+                      <a:rPr lang="en-US" b="0" i="1" dirty="0" smtClean="0">
+                        <a:latin typeface="Cambria Math" panose="02040503050406030204" pitchFamily="18" charset="0"/>
+                      </a:rPr>
+                      <m:t>3</m:t>
+                    </m:r>
+                    <m:r>
+                      <a:rPr lang="en-US" b="0" i="1" dirty="0" smtClean="0">
+                        <a:latin typeface="Cambria Math" panose="02040503050406030204" pitchFamily="18" charset="0"/>
+                      </a:rPr>
+                      <m:t>𝐷</m:t>
+                    </m:r>
+                  </m:oMath>
+                </a14:m>
+                <a:r>
+                  <a:rPr lang="en-US" dirty="0"/>
+                  <a:t>-ball of radius </a:t>
+                </a:r>
+                <a14:m>
+                  <m:oMath xmlns:m="http://schemas.openxmlformats.org/officeDocument/2006/math">
+                    <m:r>
+                      <a:rPr lang="en-US" i="1" dirty="0" smtClean="0">
+                        <a:latin typeface="Cambria Math" panose="02040503050406030204" pitchFamily="18" charset="0"/>
+                      </a:rPr>
+                      <m:t>1</m:t>
+                    </m:r>
+                  </m:oMath>
+                </a14:m>
+                <a:r>
+                  <a:rPr lang="en-US" dirty="0"/>
+                  <a:t> has </a:t>
+                </a:r>
+                <a14:m>
+                  <m:oMath xmlns:m="http://schemas.openxmlformats.org/officeDocument/2006/math">
+                    <m:r>
+                      <a:rPr lang="en-US" b="0" i="1" dirty="0" smtClean="0">
+                        <a:latin typeface="Cambria Math" panose="02040503050406030204" pitchFamily="18" charset="0"/>
+                      </a:rPr>
+                      <m:t>3</m:t>
+                    </m:r>
+                    <m:r>
+                      <a:rPr lang="en-US" b="0" i="1" dirty="0" smtClean="0">
+                        <a:latin typeface="Cambria Math" panose="02040503050406030204" pitchFamily="18" charset="0"/>
+                      </a:rPr>
+                      <m:t>𝐷</m:t>
+                    </m:r>
+                  </m:oMath>
+                </a14:m>
+                <a:r>
+                  <a:rPr lang="en-US" dirty="0"/>
+                  <a:t>-volume of </a:t>
+                </a:r>
+                <a14:m>
+                  <m:oMath xmlns:m="http://schemas.openxmlformats.org/officeDocument/2006/math">
+                    <m:f>
+                      <m:fPr>
+                        <m:ctrlPr>
+                          <a:rPr lang="en-US" b="0" i="0" dirty="0" smtClean="0">
+                            <a:latin typeface="Cambria Math" panose="02040503050406030204" pitchFamily="18" charset="0"/>
+                          </a:rPr>
+                        </m:ctrlPr>
+                      </m:fPr>
+                      <m:num>
+                        <m:r>
+                          <a:rPr lang="en-US" b="0" i="0" dirty="0" smtClean="0">
+                            <a:latin typeface="Cambria Math" panose="02040503050406030204" pitchFamily="18" charset="0"/>
+                          </a:rPr>
+                          <m:t>4 </m:t>
+                        </m:r>
+                        <m:r>
+                          <a:rPr lang="en-US" b="0" i="1" dirty="0" smtClean="0">
+                            <a:latin typeface="Cambria Math" panose="02040503050406030204" pitchFamily="18" charset="0"/>
+                          </a:rPr>
+                          <m:t>𝜋</m:t>
+                        </m:r>
+                      </m:num>
+                      <m:den>
+                        <m:r>
+                          <a:rPr lang="en-US" b="0" i="0" dirty="0" smtClean="0">
+                            <a:latin typeface="Cambria Math" panose="02040503050406030204" pitchFamily="18" charset="0"/>
+                          </a:rPr>
+                          <m:t>3</m:t>
+                        </m:r>
+                      </m:den>
+                    </m:f>
+                    <m:r>
+                      <a:rPr lang="en-US" b="0" i="1" dirty="0" smtClean="0">
+                        <a:latin typeface="Cambria Math" panose="02040503050406030204" pitchFamily="18" charset="0"/>
+                      </a:rPr>
+                      <m:t>≈4.18879</m:t>
+                    </m:r>
+                  </m:oMath>
+                </a14:m>
+                <a:endParaRPr lang="en-US" dirty="0"/>
+              </a:p>
+              <a:p>
+                <a:r>
+                  <a:rPr lang="en-US" dirty="0"/>
+                  <a:t>A </a:t>
+                </a:r>
+                <a14:m>
+                  <m:oMath xmlns:m="http://schemas.openxmlformats.org/officeDocument/2006/math">
+                    <m:r>
+                      <a:rPr lang="en-US" i="1" dirty="0">
+                        <a:latin typeface="Cambria Math" panose="02040503050406030204" pitchFamily="18" charset="0"/>
+                      </a:rPr>
+                      <m:t>4</m:t>
+                    </m:r>
+                    <m:r>
+                      <a:rPr lang="en-US" b="0" i="1" dirty="0" smtClean="0">
+                        <a:latin typeface="Cambria Math" panose="02040503050406030204" pitchFamily="18" charset="0"/>
+                      </a:rPr>
+                      <m:t>𝐷</m:t>
+                    </m:r>
+                  </m:oMath>
+                </a14:m>
+                <a:r>
+                  <a:rPr lang="en-US" dirty="0"/>
+                  <a:t>-ball of radius </a:t>
+                </a:r>
+                <a14:m>
+                  <m:oMath xmlns:m="http://schemas.openxmlformats.org/officeDocument/2006/math">
+                    <m:r>
+                      <a:rPr lang="en-US" i="1" dirty="0" smtClean="0">
+                        <a:latin typeface="Cambria Math" panose="02040503050406030204" pitchFamily="18" charset="0"/>
+                      </a:rPr>
+                      <m:t>1</m:t>
+                    </m:r>
+                  </m:oMath>
+                </a14:m>
+                <a:r>
+                  <a:rPr lang="en-US" dirty="0"/>
+                  <a:t> has </a:t>
+                </a:r>
+                <a14:m>
+                  <m:oMath xmlns:m="http://schemas.openxmlformats.org/officeDocument/2006/math">
+                    <m:r>
+                      <a:rPr lang="en-US" b="0" i="1" dirty="0" smtClean="0">
+                        <a:latin typeface="Cambria Math" panose="02040503050406030204" pitchFamily="18" charset="0"/>
+                      </a:rPr>
+                      <m:t>4</m:t>
+                    </m:r>
+                    <m:r>
+                      <a:rPr lang="en-US" b="0" i="1" dirty="0" smtClean="0">
+                        <a:latin typeface="Cambria Math" panose="02040503050406030204" pitchFamily="18" charset="0"/>
+                      </a:rPr>
+                      <m:t>𝐷</m:t>
+                    </m:r>
+                  </m:oMath>
+                </a14:m>
+                <a:r>
+                  <a:rPr lang="en-US" dirty="0"/>
+                  <a:t>-volume of </a:t>
+                </a:r>
+                <a14:m>
+                  <m:oMath xmlns:m="http://schemas.openxmlformats.org/officeDocument/2006/math">
+                    <m:f>
+                      <m:fPr>
+                        <m:ctrlPr>
+                          <a:rPr lang="en-US" b="0" i="1" dirty="0" smtClean="0">
+                            <a:latin typeface="Cambria Math" panose="02040503050406030204" pitchFamily="18" charset="0"/>
+                          </a:rPr>
+                        </m:ctrlPr>
+                      </m:fPr>
+                      <m:num>
+                        <m:sSup>
+                          <m:sSupPr>
+                            <m:ctrlPr>
+                              <a:rPr lang="en-US" b="0" i="1" dirty="0" smtClean="0">
+                                <a:latin typeface="Cambria Math" panose="02040503050406030204" pitchFamily="18" charset="0"/>
+                              </a:rPr>
+                            </m:ctrlPr>
+                          </m:sSupPr>
+                          <m:e>
+                            <m:r>
+                              <a:rPr lang="en-US" b="0" i="1" dirty="0" smtClean="0">
+                                <a:latin typeface="Cambria Math" panose="02040503050406030204" pitchFamily="18" charset="0"/>
+                              </a:rPr>
+                              <m:t>𝜋</m:t>
+                            </m:r>
+                          </m:e>
+                          <m:sup>
+                            <m:r>
+                              <a:rPr lang="en-US" b="0" i="1" dirty="0" smtClean="0">
+                                <a:latin typeface="Cambria Math" panose="02040503050406030204" pitchFamily="18" charset="0"/>
+                              </a:rPr>
+                              <m:t>2</m:t>
+                            </m:r>
+                          </m:sup>
+                        </m:sSup>
+                      </m:num>
+                      <m:den>
+                        <m:r>
+                          <a:rPr lang="en-US" b="0" i="1" dirty="0" smtClean="0">
+                            <a:latin typeface="Cambria Math" panose="02040503050406030204" pitchFamily="18" charset="0"/>
+                          </a:rPr>
+                          <m:t>2</m:t>
+                        </m:r>
+                      </m:den>
+                    </m:f>
+                    <m:r>
+                      <a:rPr lang="en-US" b="0" i="1" dirty="0" smtClean="0">
+                        <a:latin typeface="Cambria Math" panose="02040503050406030204" pitchFamily="18" charset="0"/>
+                      </a:rPr>
+                      <m:t>≈4.93480</m:t>
+                    </m:r>
+                  </m:oMath>
+                </a14:m>
+                <a:endParaRPr lang="en-US" dirty="0"/>
+              </a:p>
+              <a:p>
+                <a:r>
+                  <a:rPr lang="en-US" dirty="0"/>
+                  <a:t>A </a:t>
+                </a:r>
+                <a14:m>
+                  <m:oMath xmlns:m="http://schemas.openxmlformats.org/officeDocument/2006/math">
+                    <m:r>
+                      <a:rPr lang="en-US" i="1" dirty="0">
+                        <a:latin typeface="Cambria Math" panose="02040503050406030204" pitchFamily="18" charset="0"/>
+                      </a:rPr>
+                      <m:t>5</m:t>
+                    </m:r>
+                    <m:r>
+                      <a:rPr lang="en-US" i="1" dirty="0">
+                        <a:latin typeface="Cambria Math" panose="02040503050406030204" pitchFamily="18" charset="0"/>
+                      </a:rPr>
+                      <m:t>𝐷</m:t>
+                    </m:r>
+                  </m:oMath>
+                </a14:m>
+                <a:r>
+                  <a:rPr lang="en-US" dirty="0"/>
+                  <a:t>-ball of radius </a:t>
+                </a:r>
+                <a14:m>
+                  <m:oMath xmlns:m="http://schemas.openxmlformats.org/officeDocument/2006/math">
+                    <m:r>
+                      <a:rPr lang="en-US" i="1" dirty="0">
+                        <a:latin typeface="Cambria Math" panose="02040503050406030204" pitchFamily="18" charset="0"/>
+                      </a:rPr>
+                      <m:t>1</m:t>
+                    </m:r>
+                  </m:oMath>
+                </a14:m>
+                <a:r>
+                  <a:rPr lang="en-US" dirty="0"/>
+                  <a:t> has </a:t>
+                </a:r>
+                <a14:m>
+                  <m:oMath xmlns:m="http://schemas.openxmlformats.org/officeDocument/2006/math">
+                    <m:r>
+                      <a:rPr lang="en-US" i="1" dirty="0">
+                        <a:latin typeface="Cambria Math" panose="02040503050406030204" pitchFamily="18" charset="0"/>
+                      </a:rPr>
+                      <m:t>5</m:t>
+                    </m:r>
+                    <m:r>
+                      <a:rPr lang="en-US" i="1" dirty="0">
+                        <a:latin typeface="Cambria Math" panose="02040503050406030204" pitchFamily="18" charset="0"/>
+                      </a:rPr>
+                      <m:t>𝐷</m:t>
+                    </m:r>
+                  </m:oMath>
+                </a14:m>
+                <a:r>
+                  <a:rPr lang="en-US" dirty="0"/>
+                  <a:t>-volume of </a:t>
+                </a:r>
+                <a14:m>
+                  <m:oMath xmlns:m="http://schemas.openxmlformats.org/officeDocument/2006/math">
+                    <m:f>
+                      <m:fPr>
+                        <m:ctrlPr>
+                          <a:rPr lang="en-US" i="1" dirty="0">
+                            <a:latin typeface="Cambria Math" panose="02040503050406030204" pitchFamily="18" charset="0"/>
+                          </a:rPr>
+                        </m:ctrlPr>
+                      </m:fPr>
+                      <m:num>
+                        <m:r>
+                          <a:rPr lang="en-US" i="1" dirty="0">
+                            <a:latin typeface="Cambria Math" panose="02040503050406030204" pitchFamily="18" charset="0"/>
+                          </a:rPr>
+                          <m:t>8</m:t>
+                        </m:r>
+                        <m:sSup>
+                          <m:sSupPr>
+                            <m:ctrlPr>
+                              <a:rPr lang="en-US" i="1" dirty="0">
+                                <a:latin typeface="Cambria Math" panose="02040503050406030204" pitchFamily="18" charset="0"/>
+                              </a:rPr>
+                            </m:ctrlPr>
+                          </m:sSupPr>
+                          <m:e>
+                            <m:r>
+                              <a:rPr lang="en-US" i="1" dirty="0">
+                                <a:latin typeface="Cambria Math" panose="02040503050406030204" pitchFamily="18" charset="0"/>
+                              </a:rPr>
+                              <m:t>𝜋</m:t>
+                            </m:r>
+                          </m:e>
+                          <m:sup>
+                            <m:r>
+                              <a:rPr lang="en-US" i="1" dirty="0">
+                                <a:latin typeface="Cambria Math" panose="02040503050406030204" pitchFamily="18" charset="0"/>
+                              </a:rPr>
+                              <m:t>2</m:t>
+                            </m:r>
+                          </m:sup>
+                        </m:sSup>
+                      </m:num>
+                      <m:den>
+                        <m:r>
+                          <a:rPr lang="en-US" i="1" dirty="0">
+                            <a:latin typeface="Cambria Math" panose="02040503050406030204" pitchFamily="18" charset="0"/>
+                          </a:rPr>
+                          <m:t>15</m:t>
+                        </m:r>
+                      </m:den>
+                    </m:f>
+                    <m:r>
+                      <a:rPr lang="en-US" i="1" dirty="0">
+                        <a:latin typeface="Cambria Math" panose="02040503050406030204" pitchFamily="18" charset="0"/>
+                      </a:rPr>
+                      <m:t>≈5.26379</m:t>
+                    </m:r>
+                  </m:oMath>
+                </a14:m>
+                <a:endParaRPr lang="en-US" dirty="0"/>
+              </a:p>
+              <a:p>
+                <a:r>
+                  <a:rPr lang="en-US" dirty="0"/>
+                  <a:t>A </a:t>
+                </a:r>
+                <a14:m>
+                  <m:oMath xmlns:m="http://schemas.openxmlformats.org/officeDocument/2006/math">
+                    <m:r>
+                      <a:rPr lang="en-US" i="1" dirty="0">
+                        <a:latin typeface="Cambria Math" panose="02040503050406030204" pitchFamily="18" charset="0"/>
+                      </a:rPr>
+                      <m:t>6</m:t>
+                    </m:r>
+                    <m:r>
+                      <a:rPr lang="en-US" b="0" i="1" dirty="0" smtClean="0">
+                        <a:latin typeface="Cambria Math" panose="02040503050406030204" pitchFamily="18" charset="0"/>
+                      </a:rPr>
+                      <m:t>𝐷</m:t>
+                    </m:r>
+                  </m:oMath>
+                </a14:m>
+                <a:r>
+                  <a:rPr lang="en-US" dirty="0"/>
+                  <a:t>-ball of radius </a:t>
+                </a:r>
+                <a14:m>
+                  <m:oMath xmlns:m="http://schemas.openxmlformats.org/officeDocument/2006/math">
+                    <m:r>
+                      <a:rPr lang="en-US" i="1" dirty="0" smtClean="0">
+                        <a:latin typeface="Cambria Math" panose="02040503050406030204" pitchFamily="18" charset="0"/>
+                      </a:rPr>
+                      <m:t>1</m:t>
+                    </m:r>
+                  </m:oMath>
+                </a14:m>
+                <a:r>
+                  <a:rPr lang="en-US" dirty="0"/>
+                  <a:t> has </a:t>
+                </a:r>
+                <a14:m>
+                  <m:oMath xmlns:m="http://schemas.openxmlformats.org/officeDocument/2006/math">
+                    <m:r>
+                      <a:rPr lang="en-US" i="1" dirty="0">
+                        <a:latin typeface="Cambria Math" panose="02040503050406030204" pitchFamily="18" charset="0"/>
+                      </a:rPr>
+                      <m:t>6</m:t>
+                    </m:r>
+                    <m:r>
+                      <a:rPr lang="en-US" b="0" i="1" dirty="0" smtClean="0">
+                        <a:latin typeface="Cambria Math" panose="02040503050406030204" pitchFamily="18" charset="0"/>
+                      </a:rPr>
+                      <m:t>𝐷</m:t>
+                    </m:r>
+                  </m:oMath>
+                </a14:m>
+                <a:r>
+                  <a:rPr lang="en-US" dirty="0"/>
+                  <a:t>-volume of </a:t>
+                </a:r>
+                <a14:m>
+                  <m:oMath xmlns:m="http://schemas.openxmlformats.org/officeDocument/2006/math">
+                    <m:f>
+                      <m:fPr>
+                        <m:ctrlPr>
+                          <a:rPr lang="en-US" b="0" i="1" dirty="0" smtClean="0">
+                            <a:latin typeface="Cambria Math" panose="02040503050406030204" pitchFamily="18" charset="0"/>
+                          </a:rPr>
+                        </m:ctrlPr>
+                      </m:fPr>
+                      <m:num>
+                        <m:sSup>
+                          <m:sSupPr>
+                            <m:ctrlPr>
+                              <a:rPr lang="en-US" b="0" i="1" dirty="0" smtClean="0">
+                                <a:latin typeface="Cambria Math" panose="02040503050406030204" pitchFamily="18" charset="0"/>
+                              </a:rPr>
+                            </m:ctrlPr>
+                          </m:sSupPr>
+                          <m:e>
+                            <m:r>
+                              <a:rPr lang="en-US" b="0" i="1" dirty="0" smtClean="0">
+                                <a:latin typeface="Cambria Math" panose="02040503050406030204" pitchFamily="18" charset="0"/>
+                              </a:rPr>
+                              <m:t>𝜋</m:t>
+                            </m:r>
+                          </m:e>
+                          <m:sup>
+                            <m:r>
+                              <a:rPr lang="en-US" b="0" i="1" dirty="0" smtClean="0">
+                                <a:latin typeface="Cambria Math" panose="02040503050406030204" pitchFamily="18" charset="0"/>
+                              </a:rPr>
+                              <m:t>3</m:t>
+                            </m:r>
+                          </m:sup>
+                        </m:sSup>
+                      </m:num>
+                      <m:den>
+                        <m:r>
+                          <a:rPr lang="en-US" b="0" i="1" dirty="0" smtClean="0">
+                            <a:latin typeface="Cambria Math" panose="02040503050406030204" pitchFamily="18" charset="0"/>
+                          </a:rPr>
+                          <m:t>6</m:t>
+                        </m:r>
+                      </m:den>
+                    </m:f>
+                    <m:r>
+                      <a:rPr lang="en-US" b="0" i="1" dirty="0" smtClean="0">
+                        <a:latin typeface="Cambria Math" panose="02040503050406030204" pitchFamily="18" charset="0"/>
+                      </a:rPr>
+                      <m:t>≈</m:t>
+                    </m:r>
+                    <m:r>
+                      <a:rPr lang="en-US" b="0" i="1" dirty="0" smtClean="0">
+                        <a:latin typeface="Cambria Math" panose="02040503050406030204" pitchFamily="18" charset="0"/>
+                      </a:rPr>
+                      <m:t>5.16771</m:t>
+                    </m:r>
+                  </m:oMath>
+                </a14:m>
+                <a:endParaRPr lang="en-US" b="0" dirty="0"/>
+              </a:p>
+              <a:p>
+                <a:r>
+                  <a:rPr lang="en-US" dirty="0"/>
+                  <a:t>A </a:t>
+                </a:r>
+                <a14:m>
+                  <m:oMath xmlns:m="http://schemas.openxmlformats.org/officeDocument/2006/math">
+                    <m:r>
+                      <a:rPr lang="en-US" i="1" dirty="0">
+                        <a:latin typeface="Cambria Math" panose="02040503050406030204" pitchFamily="18" charset="0"/>
+                      </a:rPr>
+                      <m:t>7</m:t>
+                    </m:r>
+                    <m:r>
+                      <a:rPr lang="en-US" b="0" i="1" dirty="0" smtClean="0">
+                        <a:latin typeface="Cambria Math" panose="02040503050406030204" pitchFamily="18" charset="0"/>
+                      </a:rPr>
+                      <m:t>𝐷</m:t>
+                    </m:r>
+                  </m:oMath>
+                </a14:m>
+                <a:r>
+                  <a:rPr lang="en-US" dirty="0"/>
+                  <a:t>-ball of radius </a:t>
+                </a:r>
+                <a14:m>
+                  <m:oMath xmlns:m="http://schemas.openxmlformats.org/officeDocument/2006/math">
+                    <m:r>
+                      <a:rPr lang="en-US" i="1" dirty="0" smtClean="0">
+                        <a:latin typeface="Cambria Math" panose="02040503050406030204" pitchFamily="18" charset="0"/>
+                      </a:rPr>
+                      <m:t>1</m:t>
+                    </m:r>
+                  </m:oMath>
+                </a14:m>
+                <a:r>
+                  <a:rPr lang="en-US" dirty="0"/>
+                  <a:t> has </a:t>
+                </a:r>
+                <a14:m>
+                  <m:oMath xmlns:m="http://schemas.openxmlformats.org/officeDocument/2006/math">
+                    <m:r>
+                      <a:rPr lang="en-US" i="1" dirty="0">
+                        <a:latin typeface="Cambria Math" panose="02040503050406030204" pitchFamily="18" charset="0"/>
+                      </a:rPr>
+                      <m:t>7</m:t>
+                    </m:r>
+                    <m:r>
+                      <a:rPr lang="en-US" b="0" i="1" dirty="0" smtClean="0">
+                        <a:latin typeface="Cambria Math" panose="02040503050406030204" pitchFamily="18" charset="0"/>
+                      </a:rPr>
+                      <m:t>𝐷</m:t>
+                    </m:r>
+                  </m:oMath>
+                </a14:m>
+                <a:r>
+                  <a:rPr lang="en-US" dirty="0"/>
+                  <a:t>-volume of </a:t>
+                </a:r>
+                <a14:m>
+                  <m:oMath xmlns:m="http://schemas.openxmlformats.org/officeDocument/2006/math">
+                    <m:f>
+                      <m:fPr>
+                        <m:ctrlPr>
+                          <a:rPr lang="en-US" b="0" i="1" dirty="0" smtClean="0">
+                            <a:latin typeface="Cambria Math" panose="02040503050406030204" pitchFamily="18" charset="0"/>
+                          </a:rPr>
+                        </m:ctrlPr>
+                      </m:fPr>
+                      <m:num>
+                        <m:r>
+                          <a:rPr lang="en-US" b="0" i="1" dirty="0" smtClean="0">
+                            <a:latin typeface="Cambria Math" panose="02040503050406030204" pitchFamily="18" charset="0"/>
+                          </a:rPr>
+                          <m:t>16</m:t>
+                        </m:r>
+                        <m:sSup>
+                          <m:sSupPr>
+                            <m:ctrlPr>
+                              <a:rPr lang="en-US" b="0" i="1" dirty="0" smtClean="0">
+                                <a:latin typeface="Cambria Math" panose="02040503050406030204" pitchFamily="18" charset="0"/>
+                              </a:rPr>
+                            </m:ctrlPr>
+                          </m:sSupPr>
+                          <m:e>
+                            <m:r>
+                              <a:rPr lang="en-US" b="0" i="1" dirty="0" smtClean="0">
+                                <a:latin typeface="Cambria Math" panose="02040503050406030204" pitchFamily="18" charset="0"/>
+                              </a:rPr>
+                              <m:t>𝜋</m:t>
+                            </m:r>
+                          </m:e>
+                          <m:sup>
+                            <m:r>
+                              <a:rPr lang="en-US" b="0" i="1" dirty="0" smtClean="0">
+                                <a:latin typeface="Cambria Math" panose="02040503050406030204" pitchFamily="18" charset="0"/>
+                              </a:rPr>
+                              <m:t>3</m:t>
+                            </m:r>
+                          </m:sup>
+                        </m:sSup>
+                      </m:num>
+                      <m:den>
+                        <m:r>
+                          <a:rPr lang="en-US" b="0" i="1" dirty="0" smtClean="0">
+                            <a:latin typeface="Cambria Math" panose="02040503050406030204" pitchFamily="18" charset="0"/>
+                          </a:rPr>
+                          <m:t>1</m:t>
+                        </m:r>
+                        <m:r>
+                          <a:rPr lang="en-US" b="0" i="1" dirty="0" smtClean="0">
+                            <a:latin typeface="Cambria Math" panose="02040503050406030204" pitchFamily="18" charset="0"/>
+                          </a:rPr>
+                          <m:t>0</m:t>
+                        </m:r>
+                        <m:r>
+                          <a:rPr lang="en-US" b="0" i="1" dirty="0" smtClean="0">
+                            <a:latin typeface="Cambria Math" panose="02040503050406030204" pitchFamily="18" charset="0"/>
+                          </a:rPr>
+                          <m:t>5</m:t>
+                        </m:r>
+                      </m:den>
+                    </m:f>
+                    <m:r>
+                      <a:rPr lang="en-US" b="0" i="1" dirty="0" smtClean="0">
+                        <a:latin typeface="Cambria Math" panose="02040503050406030204" pitchFamily="18" charset="0"/>
+                      </a:rPr>
+                      <m:t>≈</m:t>
+                    </m:r>
+                    <m:r>
+                      <a:rPr lang="en-US" b="0" i="1" dirty="0" smtClean="0">
+                        <a:latin typeface="Cambria Math" panose="02040503050406030204" pitchFamily="18" charset="0"/>
+                      </a:rPr>
+                      <m:t>4.72477</m:t>
+                    </m:r>
+                  </m:oMath>
+                </a14:m>
+                <a:endParaRPr lang="en-US" dirty="0"/>
+              </a:p>
+              <a:p>
+                <a:r>
+                  <a:rPr lang="en-US" dirty="0"/>
+                  <a:t>A </a:t>
+                </a:r>
+                <a14:m>
+                  <m:oMath xmlns:m="http://schemas.openxmlformats.org/officeDocument/2006/math">
+                    <m:r>
+                      <a:rPr lang="en-US" i="1" dirty="0">
+                        <a:latin typeface="Cambria Math" panose="02040503050406030204" pitchFamily="18" charset="0"/>
+                      </a:rPr>
+                      <m:t>8</m:t>
+                    </m:r>
+                    <m:r>
+                      <a:rPr lang="en-US" b="0" i="1" dirty="0" smtClean="0">
+                        <a:latin typeface="Cambria Math" panose="02040503050406030204" pitchFamily="18" charset="0"/>
+                      </a:rPr>
+                      <m:t>𝐷</m:t>
+                    </m:r>
+                  </m:oMath>
+                </a14:m>
+                <a:r>
+                  <a:rPr lang="en-US" dirty="0"/>
+                  <a:t>-ball of radius </a:t>
+                </a:r>
+                <a14:m>
+                  <m:oMath xmlns:m="http://schemas.openxmlformats.org/officeDocument/2006/math">
+                    <m:r>
+                      <a:rPr lang="en-US" i="1" dirty="0" smtClean="0">
+                        <a:latin typeface="Cambria Math" panose="02040503050406030204" pitchFamily="18" charset="0"/>
+                      </a:rPr>
+                      <m:t>1</m:t>
+                    </m:r>
+                  </m:oMath>
+                </a14:m>
+                <a:r>
+                  <a:rPr lang="en-US" dirty="0"/>
+                  <a:t> has </a:t>
+                </a:r>
+                <a14:m>
+                  <m:oMath xmlns:m="http://schemas.openxmlformats.org/officeDocument/2006/math">
+                    <m:r>
+                      <a:rPr lang="en-US" i="1" dirty="0">
+                        <a:latin typeface="Cambria Math" panose="02040503050406030204" pitchFamily="18" charset="0"/>
+                      </a:rPr>
+                      <m:t>8</m:t>
+                    </m:r>
+                    <m:r>
+                      <a:rPr lang="en-US" b="0" i="1" dirty="0" smtClean="0">
+                        <a:latin typeface="Cambria Math" panose="02040503050406030204" pitchFamily="18" charset="0"/>
+                      </a:rPr>
+                      <m:t>𝐷</m:t>
+                    </m:r>
+                  </m:oMath>
+                </a14:m>
+                <a:r>
+                  <a:rPr lang="en-US" dirty="0"/>
+                  <a:t>-volume of </a:t>
+                </a:r>
+                <a14:m>
+                  <m:oMath xmlns:m="http://schemas.openxmlformats.org/officeDocument/2006/math">
+                    <m:f>
+                      <m:fPr>
+                        <m:ctrlPr>
+                          <a:rPr lang="en-US" b="0" i="1" dirty="0" smtClean="0">
+                            <a:latin typeface="Cambria Math" panose="02040503050406030204" pitchFamily="18" charset="0"/>
+                          </a:rPr>
+                        </m:ctrlPr>
+                      </m:fPr>
+                      <m:num>
+                        <m:sSup>
+                          <m:sSupPr>
+                            <m:ctrlPr>
+                              <a:rPr lang="en-US" b="0" i="1" dirty="0" smtClean="0">
+                                <a:latin typeface="Cambria Math" panose="02040503050406030204" pitchFamily="18" charset="0"/>
+                              </a:rPr>
+                            </m:ctrlPr>
+                          </m:sSupPr>
+                          <m:e>
+                            <m:r>
+                              <a:rPr lang="en-US" b="0" i="1" dirty="0" smtClean="0">
+                                <a:latin typeface="Cambria Math" panose="02040503050406030204" pitchFamily="18" charset="0"/>
+                              </a:rPr>
+                              <m:t>𝜋</m:t>
+                            </m:r>
+                          </m:e>
+                          <m:sup>
+                            <m:r>
+                              <a:rPr lang="en-US" b="0" i="1" dirty="0" smtClean="0">
+                                <a:latin typeface="Cambria Math" panose="02040503050406030204" pitchFamily="18" charset="0"/>
+                              </a:rPr>
+                              <m:t>4</m:t>
+                            </m:r>
+                          </m:sup>
+                        </m:sSup>
+                      </m:num>
+                      <m:den>
+                        <m:r>
+                          <a:rPr lang="en-US" b="0" i="1" dirty="0" smtClean="0">
+                            <a:latin typeface="Cambria Math" panose="02040503050406030204" pitchFamily="18" charset="0"/>
+                          </a:rPr>
+                          <m:t>24</m:t>
+                        </m:r>
+                      </m:den>
+                    </m:f>
+                    <m:r>
+                      <a:rPr lang="en-US" b="0" i="1" dirty="0" smtClean="0">
+                        <a:latin typeface="Cambria Math" panose="02040503050406030204" pitchFamily="18" charset="0"/>
+                      </a:rPr>
+                      <m:t>≈</m:t>
+                    </m:r>
+                    <m:r>
+                      <a:rPr lang="en-US" b="0" i="1" dirty="0" smtClean="0">
+                        <a:latin typeface="Cambria Math" panose="02040503050406030204" pitchFamily="18" charset="0"/>
+                      </a:rPr>
+                      <m:t>4.05871</m:t>
+                    </m:r>
+                  </m:oMath>
+                </a14:m>
+                <a:endParaRPr lang="en-US" dirty="0"/>
+              </a:p>
+            </p:txBody>
+          </p:sp>
+        </mc:Choice>
+        <mc:Fallback>
+          <p:sp>
+            <p:nvSpPr>
+              <p:cNvPr id="3" name="Content Placeholder 2">
+                <a:extLst>
+                  <a:ext uri="{FF2B5EF4-FFF2-40B4-BE49-F238E27FC236}">
+                    <a16:creationId xmlns:a16="http://schemas.microsoft.com/office/drawing/2014/main" id="{71E87AF7-D3FD-BB99-B657-CDB74C1380BD}"/>
+                  </a:ext>
+                </a:extLst>
+              </p:cNvPr>
+              <p:cNvSpPr>
+                <a:spLocks noGrp="1" noRot="1" noChangeAspect="1" noMove="1" noResize="1" noEditPoints="1" noAdjustHandles="1" noChangeArrowheads="1" noChangeShapeType="1" noTextEdit="1"/>
+              </p:cNvSpPr>
+              <p:nvPr>
+                <p:ph idx="1"/>
+              </p:nvPr>
+            </p:nvSpPr>
+            <p:spPr>
+              <a:xfrm>
+                <a:off x="838200" y="1825624"/>
+                <a:ext cx="10515600" cy="5032375"/>
+              </a:xfrm>
+              <a:blipFill>
+                <a:blip r:embed="rId3"/>
+                <a:stretch>
+                  <a:fillRect l="-1043" t="-2663"/>
+                </a:stretch>
+              </a:blipFill>
+            </p:spPr>
+            <p:txBody>
+              <a:bodyPr/>
+              <a:lstStyle/>
+              <a:p>
+                <a:r>
+                  <a:rPr lang="en-US">
+                    <a:noFill/>
+                  </a:rPr>
+                  <a:t> </a:t>
+                </a:r>
+              </a:p>
+            </p:txBody>
+          </p:sp>
+        </mc:Fallback>
+      </mc:AlternateContent>
+    </p:spTree>
+    <p:extLst>
+      <p:ext uri="{BB962C8B-B14F-4D97-AF65-F5344CB8AC3E}">
+        <p14:creationId xmlns:p14="http://schemas.microsoft.com/office/powerpoint/2010/main" val="2372816346"/>
+      </p:ext>
+    </p:extLst>
+  </p:cSld>
+  <p:clrMapOvr>
+    <a:masterClrMapping/>
+  </p:clrMapOvr>
+</p:sld>
+</file>
+
+<file path=ppt/slides/slide11.xml><?xml version="1.0" encoding="utf-8"?>
 <p:sld xmlns:a="http://schemas.openxmlformats.org/drawingml/2006/main" xmlns:r="http://schemas.openxmlformats.org/officeDocument/2006/relationships" xmlns:p="http://schemas.openxmlformats.org/presentationml/2006/main" show="0">
   <p:cSld>
     <p:spTree>
@@ -4638,7 +5696,7 @@
 </p:sld>
 </file>
 
-<file path=ppt/slides/slide11.xml><?xml version="1.0" encoding="utf-8"?>
+<file path=ppt/slides/slide12.xml><?xml version="1.0" encoding="utf-8"?>
 <p:sld xmlns:a="http://schemas.openxmlformats.org/drawingml/2006/main" xmlns:r="http://schemas.openxmlformats.org/officeDocument/2006/relationships" xmlns:p="http://schemas.openxmlformats.org/presentationml/2006/main">
   <p:cSld>
     <p:spTree>
@@ -4832,7 +5890,7 @@
 </p:sld>
 </file>
 
-<file path=ppt/slides/slide12.xml><?xml version="1.0" encoding="utf-8"?>
+<file path=ppt/slides/slide13.xml><?xml version="1.0" encoding="utf-8"?>
 <p:sld xmlns:a="http://schemas.openxmlformats.org/drawingml/2006/main" xmlns:r="http://schemas.openxmlformats.org/officeDocument/2006/relationships" xmlns:p="http://schemas.openxmlformats.org/presentationml/2006/main">
   <p:cSld>
     <p:spTree>
@@ -5471,7 +6529,7 @@
 </p:sld>
 </file>
 
-<file path=ppt/slides/slide13.xml><?xml version="1.0" encoding="utf-8"?>
+<file path=ppt/slides/slide14.xml><?xml version="1.0" encoding="utf-8"?>
 <p:sld xmlns:a="http://schemas.openxmlformats.org/drawingml/2006/main" xmlns:r="http://schemas.openxmlformats.org/officeDocument/2006/relationships" xmlns:p="http://schemas.openxmlformats.org/presentationml/2006/main">
   <p:cSld>
     <p:spTree>
@@ -7382,7 +8440,7 @@
 </p:sld>
 </file>
 
-<file path=ppt/slides/slide14.xml><?xml version="1.0" encoding="utf-8"?>
+<file path=ppt/slides/slide15.xml><?xml version="1.0" encoding="utf-8"?>
 <p:sld xmlns:a="http://schemas.openxmlformats.org/drawingml/2006/main" xmlns:r="http://schemas.openxmlformats.org/officeDocument/2006/relationships" xmlns:p="http://schemas.openxmlformats.org/presentationml/2006/main">
   <p:cSld>
     <p:spTree>
@@ -9291,7 +10349,7 @@
 </p:sld>
 </file>
 
-<file path=ppt/slides/slide15.xml><?xml version="1.0" encoding="utf-8"?>
+<file path=ppt/slides/slide16.xml><?xml version="1.0" encoding="utf-8"?>
 <p:sld xmlns:a="http://schemas.openxmlformats.org/drawingml/2006/main" xmlns:r="http://schemas.openxmlformats.org/officeDocument/2006/relationships" xmlns:p="http://schemas.openxmlformats.org/presentationml/2006/main" show="0">
   <p:cSld>
     <p:spTree>
@@ -9384,7 +10442,7 @@
 </p:sld>
 </file>
 
-<file path=ppt/slides/slide16.xml><?xml version="1.0" encoding="utf-8"?>
+<file path=ppt/slides/slide17.xml><?xml version="1.0" encoding="utf-8"?>
 <p:sld xmlns:a="http://schemas.openxmlformats.org/drawingml/2006/main" xmlns:r="http://schemas.openxmlformats.org/officeDocument/2006/relationships" xmlns:p="http://schemas.openxmlformats.org/presentationml/2006/main">
   <p:cSld>
     <p:spTree>
@@ -9777,7 +10835,7 @@
 </p:sld>
 </file>
 
-<file path=ppt/slides/slide17.xml><?xml version="1.0" encoding="utf-8"?>
+<file path=ppt/slides/slide18.xml><?xml version="1.0" encoding="utf-8"?>
 <p:sld xmlns:a="http://schemas.openxmlformats.org/drawingml/2006/main" xmlns:r="http://schemas.openxmlformats.org/officeDocument/2006/relationships" xmlns:p="http://schemas.openxmlformats.org/presentationml/2006/main">
   <p:cSld>
     <p:spTree>
@@ -10269,7 +11327,7 @@
 </p:sld>
 </file>
 
-<file path=ppt/slides/slide18.xml><?xml version="1.0" encoding="utf-8"?>
+<file path=ppt/slides/slide19.xml><?xml version="1.0" encoding="utf-8"?>
 <p:sld xmlns:a="http://schemas.openxmlformats.org/drawingml/2006/main" xmlns:r="http://schemas.openxmlformats.org/officeDocument/2006/relationships" xmlns:p="http://schemas.openxmlformats.org/presentationml/2006/main">
   <p:cSld>
     <p:spTree>
@@ -10636,7 +11694,176 @@
 </p:sld>
 </file>
 
-<file path=ppt/slides/slide19.xml><?xml version="1.0" encoding="utf-8"?>
+<file path=ppt/slides/slide2.xml><?xml version="1.0" encoding="utf-8"?>
+<p:sld xmlns:a="http://schemas.openxmlformats.org/drawingml/2006/main" xmlns:r="http://schemas.openxmlformats.org/officeDocument/2006/relationships" xmlns:p="http://schemas.openxmlformats.org/presentationml/2006/main">
+  <p:cSld>
+    <p:spTree>
+      <p:nvGrpSpPr>
+        <p:cNvPr id="1" name=""/>
+        <p:cNvGrpSpPr/>
+        <p:nvPr/>
+      </p:nvGrpSpPr>
+      <p:grpSpPr>
+        <a:xfrm>
+          <a:off x="0" y="0"/>
+          <a:ext cx="0" cy="0"/>
+          <a:chOff x="0" y="0"/>
+          <a:chExt cx="0" cy="0"/>
+        </a:xfrm>
+      </p:grpSpPr>
+      <p:sp>
+        <p:nvSpPr>
+          <p:cNvPr id="2" name="Title 1">
+            <a:extLst>
+              <a:ext uri="{FF2B5EF4-FFF2-40B4-BE49-F238E27FC236}">
+                <a16:creationId xmlns:a16="http://schemas.microsoft.com/office/drawing/2014/main" id="{2DBCC9A2-D9E4-867F-A8AD-CF8A895A41F0}"/>
+              </a:ext>
+            </a:extLst>
+          </p:cNvPr>
+          <p:cNvSpPr>
+            <a:spLocks noGrp="1"/>
+          </p:cNvSpPr>
+          <p:nvPr>
+            <p:ph type="title"/>
+          </p:nvPr>
+        </p:nvSpPr>
+        <p:spPr/>
+        <p:txBody>
+          <a:bodyPr/>
+          <a:lstStyle/>
+          <a:p>
+            <a:r>
+              <a:rPr lang="en-US" dirty="0"/>
+              <a:t>Curse of dimensionality</a:t>
+            </a:r>
+          </a:p>
+        </p:txBody>
+      </p:sp>
+      <p:grpSp>
+        <p:nvGrpSpPr>
+          <p:cNvPr id="15" name="Group 14">
+            <a:extLst>
+              <a:ext uri="{FF2B5EF4-FFF2-40B4-BE49-F238E27FC236}">
+                <a16:creationId xmlns:a16="http://schemas.microsoft.com/office/drawing/2014/main" id="{6F45F9D5-7FBE-0698-E932-F30949803EF4}"/>
+              </a:ext>
+            </a:extLst>
+          </p:cNvPr>
+          <p:cNvGrpSpPr/>
+          <p:nvPr/>
+        </p:nvGrpSpPr>
+        <p:grpSpPr>
+          <a:xfrm>
+            <a:off x="91440" y="1690688"/>
+            <a:ext cx="12009119" cy="4038600"/>
+            <a:chOff x="91441" y="1673126"/>
+            <a:chExt cx="12009119" cy="4038600"/>
+          </a:xfrm>
+        </p:grpSpPr>
+        <p:pic>
+          <p:nvPicPr>
+            <p:cNvPr id="9" name="Picture 8">
+              <a:extLst>
+                <a:ext uri="{FF2B5EF4-FFF2-40B4-BE49-F238E27FC236}">
+                  <a16:creationId xmlns:a16="http://schemas.microsoft.com/office/drawing/2014/main" id="{D7E0FFB0-0C9D-FDC7-1C0A-C47C6DE37009}"/>
+                </a:ext>
+              </a:extLst>
+            </p:cNvPr>
+            <p:cNvPicPr>
+              <a:picLocks noChangeAspect="1"/>
+            </p:cNvPicPr>
+            <p:nvPr/>
+          </p:nvPicPr>
+          <p:blipFill>
+            <a:blip r:embed="rId2"/>
+            <a:stretch>
+              <a:fillRect/>
+            </a:stretch>
+          </p:blipFill>
+          <p:spPr>
+            <a:xfrm>
+              <a:off x="8195310" y="1673126"/>
+              <a:ext cx="3905250" cy="4038600"/>
+            </a:xfrm>
+            <a:prstGeom prst="rect">
+              <a:avLst/>
+            </a:prstGeom>
+          </p:spPr>
+        </p:pic>
+        <p:pic>
+          <p:nvPicPr>
+            <p:cNvPr id="11" name="Picture 10">
+              <a:extLst>
+                <a:ext uri="{FF2B5EF4-FFF2-40B4-BE49-F238E27FC236}">
+                  <a16:creationId xmlns:a16="http://schemas.microsoft.com/office/drawing/2014/main" id="{9B74F283-FE08-257B-9B09-00584EFACC46}"/>
+                </a:ext>
+              </a:extLst>
+            </p:cNvPr>
+            <p:cNvPicPr>
+              <a:picLocks noChangeAspect="1"/>
+            </p:cNvPicPr>
+            <p:nvPr/>
+          </p:nvPicPr>
+          <p:blipFill>
+            <a:blip r:embed="rId3"/>
+            <a:stretch>
+              <a:fillRect/>
+            </a:stretch>
+          </p:blipFill>
+          <p:spPr>
+            <a:xfrm>
+              <a:off x="4143376" y="1673126"/>
+              <a:ext cx="3905250" cy="4038600"/>
+            </a:xfrm>
+            <a:prstGeom prst="rect">
+              <a:avLst/>
+            </a:prstGeom>
+          </p:spPr>
+        </p:pic>
+        <p:pic>
+          <p:nvPicPr>
+            <p:cNvPr id="13" name="Picture 12">
+              <a:extLst>
+                <a:ext uri="{FF2B5EF4-FFF2-40B4-BE49-F238E27FC236}">
+                  <a16:creationId xmlns:a16="http://schemas.microsoft.com/office/drawing/2014/main" id="{BCFC0D4E-BB56-639A-A579-EF1AF2A2D2CF}"/>
+                </a:ext>
+              </a:extLst>
+            </p:cNvPr>
+            <p:cNvPicPr>
+              <a:picLocks noChangeAspect="1"/>
+            </p:cNvPicPr>
+            <p:nvPr/>
+          </p:nvPicPr>
+          <p:blipFill>
+            <a:blip r:embed="rId4"/>
+            <a:stretch>
+              <a:fillRect/>
+            </a:stretch>
+          </p:blipFill>
+          <p:spPr>
+            <a:xfrm>
+              <a:off x="91441" y="1673126"/>
+              <a:ext cx="3905250" cy="4038600"/>
+            </a:xfrm>
+            <a:prstGeom prst="rect">
+              <a:avLst/>
+            </a:prstGeom>
+          </p:spPr>
+        </p:pic>
+      </p:grpSp>
+    </p:spTree>
+    <p:extLst>
+      <p:ext uri="{BB962C8B-B14F-4D97-AF65-F5344CB8AC3E}">
+        <p14:creationId xmlns:p14="http://schemas.microsoft.com/office/powerpoint/2010/main" val="3037618925"/>
+      </p:ext>
+    </p:extLst>
+  </p:cSld>
+  <p:clrMapOvr>
+    <a:masterClrMapping/>
+  </p:clrMapOvr>
+</p:sld>
+</file>
+
+<file path=ppt/slides/slide20.xml><?xml version="1.0" encoding="utf-8"?>
 <p:sld xmlns:a="http://schemas.openxmlformats.org/drawingml/2006/main" xmlns:r="http://schemas.openxmlformats.org/officeDocument/2006/relationships" xmlns:p="http://schemas.openxmlformats.org/presentationml/2006/main">
   <p:cSld>
     <p:spTree>
@@ -11360,176 +12587,7 @@
 </p:sld>
 </file>
 
-<file path=ppt/slides/slide2.xml><?xml version="1.0" encoding="utf-8"?>
-<p:sld xmlns:a="http://schemas.openxmlformats.org/drawingml/2006/main" xmlns:r="http://schemas.openxmlformats.org/officeDocument/2006/relationships" xmlns:p="http://schemas.openxmlformats.org/presentationml/2006/main">
-  <p:cSld>
-    <p:spTree>
-      <p:nvGrpSpPr>
-        <p:cNvPr id="1" name=""/>
-        <p:cNvGrpSpPr/>
-        <p:nvPr/>
-      </p:nvGrpSpPr>
-      <p:grpSpPr>
-        <a:xfrm>
-          <a:off x="0" y="0"/>
-          <a:ext cx="0" cy="0"/>
-          <a:chOff x="0" y="0"/>
-          <a:chExt cx="0" cy="0"/>
-        </a:xfrm>
-      </p:grpSpPr>
-      <p:sp>
-        <p:nvSpPr>
-          <p:cNvPr id="2" name="Title 1">
-            <a:extLst>
-              <a:ext uri="{FF2B5EF4-FFF2-40B4-BE49-F238E27FC236}">
-                <a16:creationId xmlns:a16="http://schemas.microsoft.com/office/drawing/2014/main" id="{2DBCC9A2-D9E4-867F-A8AD-CF8A895A41F0}"/>
-              </a:ext>
-            </a:extLst>
-          </p:cNvPr>
-          <p:cNvSpPr>
-            <a:spLocks noGrp="1"/>
-          </p:cNvSpPr>
-          <p:nvPr>
-            <p:ph type="title"/>
-          </p:nvPr>
-        </p:nvSpPr>
-        <p:spPr/>
-        <p:txBody>
-          <a:bodyPr/>
-          <a:lstStyle/>
-          <a:p>
-            <a:r>
-              <a:rPr lang="en-US" dirty="0"/>
-              <a:t>Curse of dimensionality</a:t>
-            </a:r>
-          </a:p>
-        </p:txBody>
-      </p:sp>
-      <p:grpSp>
-        <p:nvGrpSpPr>
-          <p:cNvPr id="15" name="Group 14">
-            <a:extLst>
-              <a:ext uri="{FF2B5EF4-FFF2-40B4-BE49-F238E27FC236}">
-                <a16:creationId xmlns:a16="http://schemas.microsoft.com/office/drawing/2014/main" id="{6F45F9D5-7FBE-0698-E932-F30949803EF4}"/>
-              </a:ext>
-            </a:extLst>
-          </p:cNvPr>
-          <p:cNvGrpSpPr/>
-          <p:nvPr/>
-        </p:nvGrpSpPr>
-        <p:grpSpPr>
-          <a:xfrm>
-            <a:off x="91440" y="1690688"/>
-            <a:ext cx="12009119" cy="4038600"/>
-            <a:chOff x="91441" y="1673126"/>
-            <a:chExt cx="12009119" cy="4038600"/>
-          </a:xfrm>
-        </p:grpSpPr>
-        <p:pic>
-          <p:nvPicPr>
-            <p:cNvPr id="9" name="Picture 8">
-              <a:extLst>
-                <a:ext uri="{FF2B5EF4-FFF2-40B4-BE49-F238E27FC236}">
-                  <a16:creationId xmlns:a16="http://schemas.microsoft.com/office/drawing/2014/main" id="{D7E0FFB0-0C9D-FDC7-1C0A-C47C6DE37009}"/>
-                </a:ext>
-              </a:extLst>
-            </p:cNvPr>
-            <p:cNvPicPr>
-              <a:picLocks noChangeAspect="1"/>
-            </p:cNvPicPr>
-            <p:nvPr/>
-          </p:nvPicPr>
-          <p:blipFill>
-            <a:blip r:embed="rId2"/>
-            <a:stretch>
-              <a:fillRect/>
-            </a:stretch>
-          </p:blipFill>
-          <p:spPr>
-            <a:xfrm>
-              <a:off x="8195310" y="1673126"/>
-              <a:ext cx="3905250" cy="4038600"/>
-            </a:xfrm>
-            <a:prstGeom prst="rect">
-              <a:avLst/>
-            </a:prstGeom>
-          </p:spPr>
-        </p:pic>
-        <p:pic>
-          <p:nvPicPr>
-            <p:cNvPr id="11" name="Picture 10">
-              <a:extLst>
-                <a:ext uri="{FF2B5EF4-FFF2-40B4-BE49-F238E27FC236}">
-                  <a16:creationId xmlns:a16="http://schemas.microsoft.com/office/drawing/2014/main" id="{9B74F283-FE08-257B-9B09-00584EFACC46}"/>
-                </a:ext>
-              </a:extLst>
-            </p:cNvPr>
-            <p:cNvPicPr>
-              <a:picLocks noChangeAspect="1"/>
-            </p:cNvPicPr>
-            <p:nvPr/>
-          </p:nvPicPr>
-          <p:blipFill>
-            <a:blip r:embed="rId3"/>
-            <a:stretch>
-              <a:fillRect/>
-            </a:stretch>
-          </p:blipFill>
-          <p:spPr>
-            <a:xfrm>
-              <a:off x="4143376" y="1673126"/>
-              <a:ext cx="3905250" cy="4038600"/>
-            </a:xfrm>
-            <a:prstGeom prst="rect">
-              <a:avLst/>
-            </a:prstGeom>
-          </p:spPr>
-        </p:pic>
-        <p:pic>
-          <p:nvPicPr>
-            <p:cNvPr id="13" name="Picture 12">
-              <a:extLst>
-                <a:ext uri="{FF2B5EF4-FFF2-40B4-BE49-F238E27FC236}">
-                  <a16:creationId xmlns:a16="http://schemas.microsoft.com/office/drawing/2014/main" id="{BCFC0D4E-BB56-639A-A579-EF1AF2A2D2CF}"/>
-                </a:ext>
-              </a:extLst>
-            </p:cNvPr>
-            <p:cNvPicPr>
-              <a:picLocks noChangeAspect="1"/>
-            </p:cNvPicPr>
-            <p:nvPr/>
-          </p:nvPicPr>
-          <p:blipFill>
-            <a:blip r:embed="rId4"/>
-            <a:stretch>
-              <a:fillRect/>
-            </a:stretch>
-          </p:blipFill>
-          <p:spPr>
-            <a:xfrm>
-              <a:off x="91441" y="1673126"/>
-              <a:ext cx="3905250" cy="4038600"/>
-            </a:xfrm>
-            <a:prstGeom prst="rect">
-              <a:avLst/>
-            </a:prstGeom>
-          </p:spPr>
-        </p:pic>
-      </p:grpSp>
-    </p:spTree>
-    <p:extLst>
-      <p:ext uri="{BB962C8B-B14F-4D97-AF65-F5344CB8AC3E}">
-        <p14:creationId xmlns:p14="http://schemas.microsoft.com/office/powerpoint/2010/main" val="3037618925"/>
-      </p:ext>
-    </p:extLst>
-  </p:cSld>
-  <p:clrMapOvr>
-    <a:masterClrMapping/>
-  </p:clrMapOvr>
-</p:sld>
-</file>
-
-<file path=ppt/slides/slide20.xml><?xml version="1.0" encoding="utf-8"?>
+<file path=ppt/slides/slide21.xml><?xml version="1.0" encoding="utf-8"?>
 <p:sld xmlns:a="http://schemas.openxmlformats.org/drawingml/2006/main" xmlns:r="http://schemas.openxmlformats.org/officeDocument/2006/relationships" xmlns:p="http://schemas.openxmlformats.org/presentationml/2006/main">
   <p:cSld>
     <p:spTree>
@@ -12128,7 +13186,7 @@
 </p:sld>
 </file>
 
-<file path=ppt/slides/slide21.xml><?xml version="1.0" encoding="utf-8"?>
+<file path=ppt/slides/slide22.xml><?xml version="1.0" encoding="utf-8"?>
 <p:sld xmlns:a="http://schemas.openxmlformats.org/drawingml/2006/main" xmlns:r="http://schemas.openxmlformats.org/officeDocument/2006/relationships" xmlns:p="http://schemas.openxmlformats.org/presentationml/2006/main">
   <p:cSld>
     <p:spTree>
@@ -13780,7 +14838,7 @@
 </p:sld>
 </file>
 
-<file path=ppt/slides/slide22.xml><?xml version="1.0" encoding="utf-8"?>
+<file path=ppt/slides/slide23.xml><?xml version="1.0" encoding="utf-8"?>
 <p:sld xmlns:a="http://schemas.openxmlformats.org/drawingml/2006/main" xmlns:r="http://schemas.openxmlformats.org/officeDocument/2006/relationships" xmlns:p="http://schemas.openxmlformats.org/presentationml/2006/main">
   <p:cSld>
     <p:spTree>
@@ -14850,7 +15908,7 @@
 </p:sld>
 </file>
 
-<file path=ppt/slides/slide23.xml><?xml version="1.0" encoding="utf-8"?>
+<file path=ppt/slides/slide24.xml><?xml version="1.0" encoding="utf-8"?>
 <p:sld xmlns:a="http://schemas.openxmlformats.org/drawingml/2006/main" xmlns:r="http://schemas.openxmlformats.org/officeDocument/2006/relationships" xmlns:p="http://schemas.openxmlformats.org/presentationml/2006/main">
   <p:cSld>
     <p:spTree>
@@ -16598,7 +17656,7 @@
 </p:sld>
 </file>
 
-<file path=ppt/slides/slide24.xml><?xml version="1.0" encoding="utf-8"?>
+<file path=ppt/slides/slide25.xml><?xml version="1.0" encoding="utf-8"?>
 <p:sld xmlns:a="http://schemas.openxmlformats.org/drawingml/2006/main" xmlns:r="http://schemas.openxmlformats.org/officeDocument/2006/relationships" xmlns:p="http://schemas.openxmlformats.org/presentationml/2006/main">
   <p:cSld>
     <p:spTree>
@@ -16691,7 +17749,7 @@
 </p:sld>
 </file>
 
-<file path=ppt/slides/slide25.xml><?xml version="1.0" encoding="utf-8"?>
+<file path=ppt/slides/slide26.xml><?xml version="1.0" encoding="utf-8"?>
 <p:sld xmlns:a="http://schemas.openxmlformats.org/drawingml/2006/main" xmlns:r="http://schemas.openxmlformats.org/officeDocument/2006/relationships" xmlns:p="http://schemas.openxmlformats.org/presentationml/2006/main">
   <p:cSld>
     <p:spTree>

</xml_diff>

<commit_message>
added 𝓥_𝒏=𝝅_𝒏 𝒓^𝒏 & common names for 1 & 2d volumes
</commit_message>
<xml_diff>
--- a/slides_x_mas_2023.pptx
+++ b/slides_x_mas_2023.pptx
@@ -3756,7 +3756,7 @@
                 </a14:m>
                 <a:r>
                   <a:rPr lang="en-US" dirty="0"/>
-                  <a:t>-volume (length) of </a:t>
+                  <a:t>-volume of </a:t>
                 </a:r>
                 <a14:m>
                   <m:oMath xmlns:m="http://schemas.openxmlformats.org/officeDocument/2006/math">
@@ -3827,7 +3827,7 @@
                 </a14:m>
                 <a:r>
                   <a:rPr lang="en-US" dirty="0"/>
-                  <a:t>-volume (area) of </a:t>
+                  <a:t>-volume of </a:t>
                 </a:r>
                 <a14:m>
                   <m:oMath xmlns:m="http://schemas.openxmlformats.org/officeDocument/2006/math">
@@ -4613,6 +4613,446 @@
           </p:sp>
         </mc:Fallback>
       </mc:AlternateContent>
+      <mc:AlternateContent xmlns:mc="http://schemas.openxmlformats.org/markup-compatibility/2006">
+        <mc:Choice xmlns:a14="http://schemas.microsoft.com/office/drawing/2010/main" Requires="a14">
+          <p:sp>
+            <p:nvSpPr>
+              <p:cNvPr id="4" name="TextBox 3">
+                <a:extLst>
+                  <a:ext uri="{FF2B5EF4-FFF2-40B4-BE49-F238E27FC236}">
+                    <a16:creationId xmlns:a16="http://schemas.microsoft.com/office/drawing/2014/main" id="{C814648F-1CF9-24EF-ABBC-C24E9814296F}"/>
+                  </a:ext>
+                </a:extLst>
+              </p:cNvPr>
+              <p:cNvSpPr txBox="1"/>
+              <p:nvPr/>
+            </p:nvSpPr>
+            <p:spPr>
+              <a:xfrm>
+                <a:off x="8360160" y="643185"/>
+                <a:ext cx="3004862" cy="769441"/>
+              </a:xfrm>
+              <a:prstGeom prst="rect">
+                <a:avLst/>
+              </a:prstGeom>
+              <a:noFill/>
+            </p:spPr>
+            <p:txBody>
+              <a:bodyPr wrap="none" rtlCol="0">
+                <a:spAutoFit/>
+              </a:bodyPr>
+              <a:lstStyle/>
+              <a:p>
+                <a14:m>
+                  <m:oMathPara xmlns:m="http://schemas.openxmlformats.org/officeDocument/2006/math">
+                    <m:oMathParaPr>
+                      <m:jc m:val="centerGroup"/>
+                    </m:oMathParaPr>
+                    <m:oMath xmlns:m="http://schemas.openxmlformats.org/officeDocument/2006/math">
+                      <m:sSub>
+                        <m:sSubPr>
+                          <m:ctrlPr>
+                            <a:rPr lang="en-US" sz="4400" b="1" i="1" smtClean="0">
+                              <a:latin typeface="Cambria Math" panose="02040503050406030204" pitchFamily="18" charset="0"/>
+                            </a:rPr>
+                          </m:ctrlPr>
+                        </m:sSubPr>
+                        <m:e>
+                          <m:r>
+                            <a:rPr lang="en-US" sz="4400" b="1" i="1" smtClean="0">
+                              <a:latin typeface="Cambria Math" panose="02040503050406030204" pitchFamily="18" charset="0"/>
+                            </a:rPr>
+                            <m:t>𝓥</m:t>
+                          </m:r>
+                        </m:e>
+                        <m:sub>
+                          <m:r>
+                            <a:rPr lang="en-US" sz="4400" b="1" i="1" smtClean="0">
+                              <a:latin typeface="Cambria Math" panose="02040503050406030204" pitchFamily="18" charset="0"/>
+                            </a:rPr>
+                            <m:t>𝒏</m:t>
+                          </m:r>
+                        </m:sub>
+                      </m:sSub>
+                      <m:r>
+                        <a:rPr lang="en-US" sz="4400" b="1" i="1" smtClean="0">
+                          <a:latin typeface="Cambria Math" panose="02040503050406030204" pitchFamily="18" charset="0"/>
+                        </a:rPr>
+                        <m:t>=</m:t>
+                      </m:r>
+                      <m:sSub>
+                        <m:sSubPr>
+                          <m:ctrlPr>
+                            <a:rPr lang="en-US" sz="4400" b="1" i="1" smtClean="0">
+                              <a:latin typeface="Cambria Math" panose="02040503050406030204" pitchFamily="18" charset="0"/>
+                            </a:rPr>
+                          </m:ctrlPr>
+                        </m:sSubPr>
+                        <m:e>
+                          <m:r>
+                            <a:rPr lang="en-US" sz="4400" b="1" i="1" smtClean="0">
+                              <a:latin typeface="Cambria Math" panose="02040503050406030204" pitchFamily="18" charset="0"/>
+                            </a:rPr>
+                            <m:t>𝝅</m:t>
+                          </m:r>
+                        </m:e>
+                        <m:sub>
+                          <m:r>
+                            <a:rPr lang="en-US" sz="4400" b="1" i="1" smtClean="0">
+                              <a:latin typeface="Cambria Math" panose="02040503050406030204" pitchFamily="18" charset="0"/>
+                            </a:rPr>
+                            <m:t>𝒏</m:t>
+                          </m:r>
+                        </m:sub>
+                      </m:sSub>
+                      <m:sSup>
+                        <m:sSupPr>
+                          <m:ctrlPr>
+                            <a:rPr lang="en-US" sz="4400" b="1" i="1" smtClean="0">
+                              <a:latin typeface="Cambria Math" panose="02040503050406030204" pitchFamily="18" charset="0"/>
+                            </a:rPr>
+                          </m:ctrlPr>
+                        </m:sSupPr>
+                        <m:e>
+                          <m:r>
+                            <a:rPr lang="en-US" sz="4400" b="1" i="1" smtClean="0">
+                              <a:latin typeface="Cambria Math" panose="02040503050406030204" pitchFamily="18" charset="0"/>
+                            </a:rPr>
+                            <m:t>𝒓</m:t>
+                          </m:r>
+                        </m:e>
+                        <m:sup>
+                          <m:r>
+                            <a:rPr lang="en-US" sz="4400" b="1" i="1" smtClean="0">
+                              <a:latin typeface="Cambria Math" panose="02040503050406030204" pitchFamily="18" charset="0"/>
+                            </a:rPr>
+                            <m:t>𝒏</m:t>
+                          </m:r>
+                        </m:sup>
+                      </m:sSup>
+                    </m:oMath>
+                  </m:oMathPara>
+                </a14:m>
+                <a:endParaRPr lang="en-US" sz="4400" b="1" dirty="0"/>
+              </a:p>
+            </p:txBody>
+          </p:sp>
+        </mc:Choice>
+        <mc:Fallback>
+          <p:sp>
+            <p:nvSpPr>
+              <p:cNvPr id="4" name="TextBox 3">
+                <a:extLst>
+                  <a:ext uri="{FF2B5EF4-FFF2-40B4-BE49-F238E27FC236}">
+                    <a16:creationId xmlns:a16="http://schemas.microsoft.com/office/drawing/2014/main" id="{C814648F-1CF9-24EF-ABBC-C24E9814296F}"/>
+                  </a:ext>
+                </a:extLst>
+              </p:cNvPr>
+              <p:cNvSpPr txBox="1">
+                <a:spLocks noRot="1" noChangeAspect="1" noMove="1" noResize="1" noEditPoints="1" noAdjustHandles="1" noChangeArrowheads="1" noChangeShapeType="1" noTextEdit="1"/>
+              </p:cNvSpPr>
+              <p:nvPr/>
+            </p:nvSpPr>
+            <p:spPr>
+              <a:xfrm>
+                <a:off x="8360160" y="643185"/>
+                <a:ext cx="3004862" cy="769441"/>
+              </a:xfrm>
+              <a:prstGeom prst="rect">
+                <a:avLst/>
+              </a:prstGeom>
+              <a:blipFill>
+                <a:blip r:embed="rId4"/>
+                <a:stretch>
+                  <a:fillRect/>
+                </a:stretch>
+              </a:blipFill>
+            </p:spPr>
+            <p:txBody>
+              <a:bodyPr/>
+              <a:lstStyle/>
+              <a:p>
+                <a:r>
+                  <a:rPr lang="en-US">
+                    <a:noFill/>
+                  </a:rPr>
+                  <a:t> </a:t>
+                </a:r>
+              </a:p>
+            </p:txBody>
+          </p:sp>
+        </mc:Fallback>
+      </mc:AlternateContent>
+      <p:sp>
+        <p:nvSpPr>
+          <p:cNvPr id="5" name="TextBox 4">
+            <a:extLst>
+              <a:ext uri="{FF2B5EF4-FFF2-40B4-BE49-F238E27FC236}">
+                <a16:creationId xmlns:a16="http://schemas.microsoft.com/office/drawing/2014/main" id="{E5A38152-BA43-8DFC-0FA1-A4E7B84DEC1D}"/>
+              </a:ext>
+            </a:extLst>
+          </p:cNvPr>
+          <p:cNvSpPr txBox="1"/>
+          <p:nvPr/>
+        </p:nvSpPr>
+        <p:spPr>
+          <a:xfrm>
+            <a:off x="3600450" y="1296491"/>
+            <a:ext cx="1161023" cy="461665"/>
+          </a:xfrm>
+          <a:prstGeom prst="rect">
+            <a:avLst/>
+          </a:prstGeom>
+          <a:noFill/>
+        </p:spPr>
+        <p:txBody>
+          <a:bodyPr wrap="none" rtlCol="0">
+            <a:spAutoFit/>
+          </a:bodyPr>
+          <a:lstStyle/>
+          <a:p>
+            <a:r>
+              <a:rPr lang="en-US" sz="2400" dirty="0">
+                <a:solidFill>
+                  <a:schemeClr val="bg1">
+                    <a:lumMod val="50000"/>
+                  </a:schemeClr>
+                </a:solidFill>
+              </a:rPr>
+              <a:t>(length)</a:t>
+            </a:r>
+          </a:p>
+        </p:txBody>
+      </p:sp>
+      <p:sp>
+        <p:nvSpPr>
+          <p:cNvPr id="6" name="TextBox 5">
+            <a:extLst>
+              <a:ext uri="{FF2B5EF4-FFF2-40B4-BE49-F238E27FC236}">
+                <a16:creationId xmlns:a16="http://schemas.microsoft.com/office/drawing/2014/main" id="{831549C1-14F0-9670-95D2-92B034276C7B}"/>
+              </a:ext>
+            </a:extLst>
+          </p:cNvPr>
+          <p:cNvSpPr txBox="1"/>
+          <p:nvPr/>
+        </p:nvSpPr>
+        <p:spPr>
+          <a:xfrm>
+            <a:off x="6600906" y="1346000"/>
+            <a:ext cx="922817" cy="461665"/>
+          </a:xfrm>
+          <a:prstGeom prst="rect">
+            <a:avLst/>
+          </a:prstGeom>
+          <a:noFill/>
+        </p:spPr>
+        <p:txBody>
+          <a:bodyPr wrap="none" rtlCol="0">
+            <a:spAutoFit/>
+          </a:bodyPr>
+          <a:lstStyle/>
+          <a:p>
+            <a:r>
+              <a:rPr lang="en-US" sz="2400" dirty="0">
+                <a:solidFill>
+                  <a:schemeClr val="bg1">
+                    <a:lumMod val="50000"/>
+                  </a:schemeClr>
+                </a:solidFill>
+              </a:rPr>
+              <a:t>(area)</a:t>
+            </a:r>
+          </a:p>
+        </p:txBody>
+      </p:sp>
+      <p:sp>
+        <p:nvSpPr>
+          <p:cNvPr id="7" name="Freeform: Shape 6">
+            <a:extLst>
+              <a:ext uri="{FF2B5EF4-FFF2-40B4-BE49-F238E27FC236}">
+                <a16:creationId xmlns:a16="http://schemas.microsoft.com/office/drawing/2014/main" id="{3FBACFE9-9D53-CAE6-5497-86986C125A01}"/>
+              </a:ext>
+            </a:extLst>
+          </p:cNvPr>
+          <p:cNvSpPr/>
+          <p:nvPr/>
+        </p:nvSpPr>
+        <p:spPr>
+          <a:xfrm>
+            <a:off x="5514976" y="1690688"/>
+            <a:ext cx="1134502" cy="766762"/>
+          </a:xfrm>
+          <a:custGeom>
+            <a:avLst/>
+            <a:gdLst>
+              <a:gd name="connsiteX0" fmla="*/ 723900 w 723900"/>
+              <a:gd name="connsiteY0" fmla="*/ 0 h 1000125"/>
+              <a:gd name="connsiteX1" fmla="*/ 200025 w 723900"/>
+              <a:gd name="connsiteY1" fmla="*/ 542925 h 1000125"/>
+              <a:gd name="connsiteX2" fmla="*/ 0 w 723900"/>
+              <a:gd name="connsiteY2" fmla="*/ 1000125 h 1000125"/>
+            </a:gdLst>
+            <a:ahLst/>
+            <a:cxnLst>
+              <a:cxn ang="0">
+                <a:pos x="connsiteX0" y="connsiteY0"/>
+              </a:cxn>
+              <a:cxn ang="0">
+                <a:pos x="connsiteX1" y="connsiteY1"/>
+              </a:cxn>
+              <a:cxn ang="0">
+                <a:pos x="connsiteX2" y="connsiteY2"/>
+              </a:cxn>
+            </a:cxnLst>
+            <a:rect l="l" t="t" r="r" b="b"/>
+            <a:pathLst>
+              <a:path w="723900" h="1000125">
+                <a:moveTo>
+                  <a:pt x="723900" y="0"/>
+                </a:moveTo>
+                <a:cubicBezTo>
+                  <a:pt x="522287" y="188119"/>
+                  <a:pt x="320675" y="376238"/>
+                  <a:pt x="200025" y="542925"/>
+                </a:cubicBezTo>
+                <a:cubicBezTo>
+                  <a:pt x="79375" y="709612"/>
+                  <a:pt x="39687" y="854868"/>
+                  <a:pt x="0" y="1000125"/>
+                </a:cubicBezTo>
+              </a:path>
+            </a:pathLst>
+          </a:custGeom>
+          <a:noFill/>
+          <a:ln w="28575">
+            <a:solidFill>
+              <a:schemeClr val="bg1">
+                <a:lumMod val="50000"/>
+              </a:schemeClr>
+            </a:solidFill>
+            <a:headEnd type="none" w="med" len="med"/>
+            <a:tailEnd type="arrow" w="med" len="med"/>
+          </a:ln>
+        </p:spPr>
+        <p:style>
+          <a:lnRef idx="2">
+            <a:schemeClr val="accent1">
+              <a:shade val="15000"/>
+            </a:schemeClr>
+          </a:lnRef>
+          <a:fillRef idx="1">
+            <a:schemeClr val="accent1"/>
+          </a:fillRef>
+          <a:effectRef idx="0">
+            <a:schemeClr val="accent1"/>
+          </a:effectRef>
+          <a:fontRef idx="minor">
+            <a:schemeClr val="lt1"/>
+          </a:fontRef>
+        </p:style>
+        <p:txBody>
+          <a:bodyPr rtlCol="0" anchor="ctr"/>
+          <a:lstStyle/>
+          <a:p>
+            <a:pPr algn="ctr"/>
+            <a:endParaRPr lang="en-US"/>
+          </a:p>
+        </p:txBody>
+      </p:sp>
+      <p:sp>
+        <p:nvSpPr>
+          <p:cNvPr id="8" name="Freeform: Shape 7">
+            <a:extLst>
+              <a:ext uri="{FF2B5EF4-FFF2-40B4-BE49-F238E27FC236}">
+                <a16:creationId xmlns:a16="http://schemas.microsoft.com/office/drawing/2014/main" id="{E131BBB0-82CC-6571-B468-73D51DD8623E}"/>
+              </a:ext>
+            </a:extLst>
+          </p:cNvPr>
+          <p:cNvSpPr/>
+          <p:nvPr/>
+        </p:nvSpPr>
+        <p:spPr>
+          <a:xfrm flipH="1">
+            <a:off x="4686300" y="1562100"/>
+            <a:ext cx="628650" cy="461665"/>
+          </a:xfrm>
+          <a:custGeom>
+            <a:avLst/>
+            <a:gdLst>
+              <a:gd name="connsiteX0" fmla="*/ 723900 w 723900"/>
+              <a:gd name="connsiteY0" fmla="*/ 0 h 1000125"/>
+              <a:gd name="connsiteX1" fmla="*/ 200025 w 723900"/>
+              <a:gd name="connsiteY1" fmla="*/ 542925 h 1000125"/>
+              <a:gd name="connsiteX2" fmla="*/ 0 w 723900"/>
+              <a:gd name="connsiteY2" fmla="*/ 1000125 h 1000125"/>
+            </a:gdLst>
+            <a:ahLst/>
+            <a:cxnLst>
+              <a:cxn ang="0">
+                <a:pos x="connsiteX0" y="connsiteY0"/>
+              </a:cxn>
+              <a:cxn ang="0">
+                <a:pos x="connsiteX1" y="connsiteY1"/>
+              </a:cxn>
+              <a:cxn ang="0">
+                <a:pos x="connsiteX2" y="connsiteY2"/>
+              </a:cxn>
+            </a:cxnLst>
+            <a:rect l="l" t="t" r="r" b="b"/>
+            <a:pathLst>
+              <a:path w="723900" h="1000125">
+                <a:moveTo>
+                  <a:pt x="723900" y="0"/>
+                </a:moveTo>
+                <a:cubicBezTo>
+                  <a:pt x="522287" y="188119"/>
+                  <a:pt x="320675" y="376238"/>
+                  <a:pt x="200025" y="542925"/>
+                </a:cubicBezTo>
+                <a:cubicBezTo>
+                  <a:pt x="79375" y="709612"/>
+                  <a:pt x="39687" y="854868"/>
+                  <a:pt x="0" y="1000125"/>
+                </a:cubicBezTo>
+              </a:path>
+            </a:pathLst>
+          </a:custGeom>
+          <a:noFill/>
+          <a:ln w="28575">
+            <a:solidFill>
+              <a:schemeClr val="bg1">
+                <a:lumMod val="50000"/>
+              </a:schemeClr>
+            </a:solidFill>
+            <a:headEnd type="none" w="med" len="med"/>
+            <a:tailEnd type="arrow" w="med" len="med"/>
+          </a:ln>
+        </p:spPr>
+        <p:style>
+          <a:lnRef idx="2">
+            <a:schemeClr val="accent1">
+              <a:shade val="15000"/>
+            </a:schemeClr>
+          </a:lnRef>
+          <a:fillRef idx="1">
+            <a:schemeClr val="accent1"/>
+          </a:fillRef>
+          <a:effectRef idx="0">
+            <a:schemeClr val="accent1"/>
+          </a:effectRef>
+          <a:fontRef idx="minor">
+            <a:schemeClr val="lt1"/>
+          </a:fontRef>
+        </p:style>
+        <p:txBody>
+          <a:bodyPr rtlCol="0" anchor="ctr"/>
+          <a:lstStyle/>
+          <a:p>
+            <a:pPr algn="ctr"/>
+            <a:endParaRPr lang="en-US"/>
+          </a:p>
+        </p:txBody>
+      </p:sp>
     </p:spTree>
     <p:extLst>
       <p:ext uri="{BB962C8B-B14F-4D97-AF65-F5344CB8AC3E}">

</xml_diff>

<commit_message>
split higher dim of pi
</commit_message>
<xml_diff>
--- a/slides_x_mas_2023.pptx
+++ b/slides_x_mas_2023.pptx
@@ -14,23 +14,24 @@
     <p:sldId id="263" r:id="rId8"/>
     <p:sldId id="266" r:id="rId9"/>
     <p:sldId id="267" r:id="rId10"/>
-    <p:sldId id="286" r:id="rId11"/>
-    <p:sldId id="270" r:id="rId12"/>
-    <p:sldId id="268" r:id="rId13"/>
-    <p:sldId id="272" r:id="rId14"/>
-    <p:sldId id="273" r:id="rId15"/>
-    <p:sldId id="269" r:id="rId16"/>
-    <p:sldId id="274" r:id="rId17"/>
-    <p:sldId id="275" r:id="rId18"/>
-    <p:sldId id="276" r:id="rId19"/>
-    <p:sldId id="277" r:id="rId20"/>
-    <p:sldId id="279" r:id="rId21"/>
-    <p:sldId id="278" r:id="rId22"/>
-    <p:sldId id="280" r:id="rId23"/>
-    <p:sldId id="281" r:id="rId24"/>
-    <p:sldId id="282" r:id="rId25"/>
-    <p:sldId id="283" r:id="rId26"/>
-    <p:sldId id="285" r:id="rId27"/>
+    <p:sldId id="287" r:id="rId11"/>
+    <p:sldId id="286" r:id="rId12"/>
+    <p:sldId id="270" r:id="rId13"/>
+    <p:sldId id="268" r:id="rId14"/>
+    <p:sldId id="272" r:id="rId15"/>
+    <p:sldId id="273" r:id="rId16"/>
+    <p:sldId id="269" r:id="rId17"/>
+    <p:sldId id="274" r:id="rId18"/>
+    <p:sldId id="275" r:id="rId19"/>
+    <p:sldId id="276" r:id="rId20"/>
+    <p:sldId id="277" r:id="rId21"/>
+    <p:sldId id="279" r:id="rId22"/>
+    <p:sldId id="278" r:id="rId23"/>
+    <p:sldId id="280" r:id="rId24"/>
+    <p:sldId id="281" r:id="rId25"/>
+    <p:sldId id="282" r:id="rId26"/>
+    <p:sldId id="283" r:id="rId27"/>
+    <p:sldId id="285" r:id="rId28"/>
   </p:sldIdLst>
   <p:sldSz cx="12192000" cy="6858000"/>
   <p:notesSz cx="6858000" cy="9144000"/>
@@ -151,6 +152,7 @@
         </p14:section>
         <p14:section name="Unusual" id="{42EB159F-85B8-41F3-970F-2D80DA23F3BA}">
           <p14:sldIdLst>
+            <p14:sldId id="287"/>
             <p14:sldId id="286"/>
           </p14:sldIdLst>
         </p14:section>
@@ -3572,6 +3574,1111 @@
 </file>
 
 <file path=ppt/slides/slide10.xml><?xml version="1.0" encoding="utf-8"?>
+<p:sld xmlns:a="http://schemas.openxmlformats.org/drawingml/2006/main" xmlns:r="http://schemas.openxmlformats.org/officeDocument/2006/relationships" xmlns:p="http://schemas.openxmlformats.org/presentationml/2006/main">
+  <p:cSld>
+    <p:spTree>
+      <p:nvGrpSpPr>
+        <p:cNvPr id="1" name=""/>
+        <p:cNvGrpSpPr/>
+        <p:nvPr/>
+      </p:nvGrpSpPr>
+      <p:grpSpPr>
+        <a:xfrm>
+          <a:off x="0" y="0"/>
+          <a:ext cx="0" cy="0"/>
+          <a:chOff x="0" y="0"/>
+          <a:chExt cx="0" cy="0"/>
+        </a:xfrm>
+      </p:grpSpPr>
+      <mc:AlternateContent xmlns:mc="http://schemas.openxmlformats.org/markup-compatibility/2006">
+        <mc:Choice xmlns:a14="http://schemas.microsoft.com/office/drawing/2010/main" Requires="a14">
+          <p:sp>
+            <p:nvSpPr>
+              <p:cNvPr id="2" name="Title 1">
+                <a:extLst>
+                  <a:ext uri="{FF2B5EF4-FFF2-40B4-BE49-F238E27FC236}">
+                    <a16:creationId xmlns:a16="http://schemas.microsoft.com/office/drawing/2014/main" id="{8C05AE3B-AE49-C871-060B-C8D7775FF581}"/>
+                  </a:ext>
+                </a:extLst>
+              </p:cNvPr>
+              <p:cNvSpPr>
+                <a:spLocks noGrp="1"/>
+              </p:cNvSpPr>
+              <p:nvPr>
+                <p:ph type="title"/>
+              </p:nvPr>
+            </p:nvSpPr>
+            <p:spPr/>
+            <p:txBody>
+              <a:bodyPr/>
+              <a:lstStyle/>
+              <a:p>
+                <a:r>
+                  <a:rPr lang="en-US" dirty="0"/>
+                  <a:t>Higher dimensions of </a:t>
+                </a:r>
+                <a14:m>
+                  <m:oMath xmlns:m="http://schemas.openxmlformats.org/officeDocument/2006/math">
+                    <m:r>
+                      <a:rPr lang="en-US" b="0" i="1" smtClean="0">
+                        <a:latin typeface="Cambria Math" panose="02040503050406030204" pitchFamily="18" charset="0"/>
+                      </a:rPr>
+                      <m:t>𝜋</m:t>
+                    </m:r>
+                  </m:oMath>
+                </a14:m>
+                <a:endParaRPr lang="en-US" dirty="0"/>
+              </a:p>
+            </p:txBody>
+          </p:sp>
+        </mc:Choice>
+        <mc:Fallback>
+          <p:sp>
+            <p:nvSpPr>
+              <p:cNvPr id="2" name="Title 1">
+                <a:extLst>
+                  <a:ext uri="{FF2B5EF4-FFF2-40B4-BE49-F238E27FC236}">
+                    <a16:creationId xmlns:a16="http://schemas.microsoft.com/office/drawing/2014/main" id="{8C05AE3B-AE49-C871-060B-C8D7775FF581}"/>
+                  </a:ext>
+                </a:extLst>
+              </p:cNvPr>
+              <p:cNvSpPr>
+                <a:spLocks noGrp="1" noRot="1" noChangeAspect="1" noMove="1" noResize="1" noEditPoints="1" noAdjustHandles="1" noChangeArrowheads="1" noChangeShapeType="1" noTextEdit="1"/>
+              </p:cNvSpPr>
+              <p:nvPr>
+                <p:ph type="title"/>
+              </p:nvPr>
+            </p:nvSpPr>
+            <p:spPr>
+              <a:blipFill>
+                <a:blip r:embed="rId2"/>
+                <a:stretch>
+                  <a:fillRect l="-2377"/>
+                </a:stretch>
+              </a:blipFill>
+            </p:spPr>
+            <p:txBody>
+              <a:bodyPr/>
+              <a:lstStyle/>
+              <a:p>
+                <a:r>
+                  <a:rPr lang="en-US">
+                    <a:noFill/>
+                  </a:rPr>
+                  <a:t> </a:t>
+                </a:r>
+              </a:p>
+            </p:txBody>
+          </p:sp>
+        </mc:Fallback>
+      </mc:AlternateContent>
+      <mc:AlternateContent xmlns:mc="http://schemas.openxmlformats.org/markup-compatibility/2006">
+        <mc:Choice xmlns:a14="http://schemas.microsoft.com/office/drawing/2010/main" Requires="a14">
+          <p:sp>
+            <p:nvSpPr>
+              <p:cNvPr id="3" name="Content Placeholder 2">
+                <a:extLst>
+                  <a:ext uri="{FF2B5EF4-FFF2-40B4-BE49-F238E27FC236}">
+                    <a16:creationId xmlns:a16="http://schemas.microsoft.com/office/drawing/2014/main" id="{71E87AF7-D3FD-BB99-B657-CDB74C1380BD}"/>
+                  </a:ext>
+                </a:extLst>
+              </p:cNvPr>
+              <p:cNvSpPr>
+                <a:spLocks noGrp="1"/>
+              </p:cNvSpPr>
+              <p:nvPr>
+                <p:ph idx="1"/>
+              </p:nvPr>
+            </p:nvSpPr>
+            <p:spPr/>
+            <p:txBody>
+              <a:bodyPr>
+                <a:normAutofit/>
+              </a:bodyPr>
+              <a:lstStyle/>
+              <a:p>
+                <a:r>
+                  <a:rPr lang="en-US" dirty="0"/>
+                  <a:t>A </a:t>
+                </a:r>
+                <a14:m>
+                  <m:oMath xmlns:m="http://schemas.openxmlformats.org/officeDocument/2006/math">
+                    <m:r>
+                      <a:rPr lang="en-US" i="1" dirty="0">
+                        <a:latin typeface="Cambria Math" panose="02040503050406030204" pitchFamily="18" charset="0"/>
+                      </a:rPr>
+                      <m:t>1</m:t>
+                    </m:r>
+                    <m:r>
+                      <a:rPr lang="en-US" i="1" dirty="0">
+                        <a:latin typeface="Cambria Math" panose="02040503050406030204" pitchFamily="18" charset="0"/>
+                      </a:rPr>
+                      <m:t>𝐷</m:t>
+                    </m:r>
+                  </m:oMath>
+                </a14:m>
+                <a:r>
+                  <a:rPr lang="en-US" dirty="0"/>
+                  <a:t>-ball of radius </a:t>
+                </a:r>
+                <a14:m>
+                  <m:oMath xmlns:m="http://schemas.openxmlformats.org/officeDocument/2006/math">
+                    <m:r>
+                      <a:rPr lang="en-US" i="1" dirty="0">
+                        <a:latin typeface="Cambria Math" panose="02040503050406030204" pitchFamily="18" charset="0"/>
+                      </a:rPr>
+                      <m:t>1</m:t>
+                    </m:r>
+                  </m:oMath>
+                </a14:m>
+                <a:r>
+                  <a:rPr lang="en-US" dirty="0"/>
+                  <a:t> has </a:t>
+                </a:r>
+                <a14:m>
+                  <m:oMath xmlns:m="http://schemas.openxmlformats.org/officeDocument/2006/math">
+                    <m:r>
+                      <a:rPr lang="en-US" i="1" dirty="0">
+                        <a:latin typeface="Cambria Math" panose="02040503050406030204" pitchFamily="18" charset="0"/>
+                      </a:rPr>
+                      <m:t>1</m:t>
+                    </m:r>
+                    <m:r>
+                      <a:rPr lang="en-US" i="1" dirty="0">
+                        <a:latin typeface="Cambria Math" panose="02040503050406030204" pitchFamily="18" charset="0"/>
+                      </a:rPr>
+                      <m:t>𝐷</m:t>
+                    </m:r>
+                  </m:oMath>
+                </a14:m>
+                <a:r>
+                  <a:rPr lang="en-US" dirty="0"/>
+                  <a:t>-volume of </a:t>
+                </a:r>
+                <a14:m>
+                  <m:oMath xmlns:m="http://schemas.openxmlformats.org/officeDocument/2006/math">
+                    <m:r>
+                      <a:rPr lang="en-US" i="1" dirty="0">
+                        <a:latin typeface="Cambria Math" panose="02040503050406030204" pitchFamily="18" charset="0"/>
+                      </a:rPr>
+                      <m:t>2</m:t>
+                    </m:r>
+                  </m:oMath>
+                </a14:m>
+                <a:endParaRPr lang="en-US" dirty="0"/>
+              </a:p>
+              <a:p>
+                <a:r>
+                  <a:rPr lang="en-US" dirty="0"/>
+                  <a:t>A </a:t>
+                </a:r>
+                <a14:m>
+                  <m:oMath xmlns:m="http://schemas.openxmlformats.org/officeDocument/2006/math">
+                    <m:r>
+                      <a:rPr lang="en-US" b="0" i="1" dirty="0" smtClean="0">
+                        <a:latin typeface="Cambria Math" panose="02040503050406030204" pitchFamily="18" charset="0"/>
+                      </a:rPr>
+                      <m:t>2</m:t>
+                    </m:r>
+                    <m:r>
+                      <a:rPr lang="en-US" b="0" i="1" dirty="0" smtClean="0">
+                        <a:latin typeface="Cambria Math" panose="02040503050406030204" pitchFamily="18" charset="0"/>
+                      </a:rPr>
+                      <m:t>𝐷</m:t>
+                    </m:r>
+                  </m:oMath>
+                </a14:m>
+                <a:r>
+                  <a:rPr lang="en-US" dirty="0"/>
+                  <a:t>-ball of radius </a:t>
+                </a:r>
+                <a14:m>
+                  <m:oMath xmlns:m="http://schemas.openxmlformats.org/officeDocument/2006/math">
+                    <m:r>
+                      <a:rPr lang="en-US" i="1" dirty="0" smtClean="0">
+                        <a:latin typeface="Cambria Math" panose="02040503050406030204" pitchFamily="18" charset="0"/>
+                      </a:rPr>
+                      <m:t>1</m:t>
+                    </m:r>
+                  </m:oMath>
+                </a14:m>
+                <a:r>
+                  <a:rPr lang="en-US" dirty="0"/>
+                  <a:t> has </a:t>
+                </a:r>
+                <a14:m>
+                  <m:oMath xmlns:m="http://schemas.openxmlformats.org/officeDocument/2006/math">
+                    <m:r>
+                      <a:rPr lang="en-US" b="0" i="1" dirty="0" smtClean="0">
+                        <a:latin typeface="Cambria Math" panose="02040503050406030204" pitchFamily="18" charset="0"/>
+                      </a:rPr>
+                      <m:t>2</m:t>
+                    </m:r>
+                    <m:r>
+                      <a:rPr lang="en-US" b="0" i="1" dirty="0" smtClean="0">
+                        <a:latin typeface="Cambria Math" panose="02040503050406030204" pitchFamily="18" charset="0"/>
+                      </a:rPr>
+                      <m:t>𝐷</m:t>
+                    </m:r>
+                  </m:oMath>
+                </a14:m>
+                <a:r>
+                  <a:rPr lang="en-US" dirty="0"/>
+                  <a:t>-volume of </a:t>
+                </a:r>
+                <a14:m>
+                  <m:oMath xmlns:m="http://schemas.openxmlformats.org/officeDocument/2006/math">
+                    <m:r>
+                      <a:rPr lang="en-US" b="0" i="1" dirty="0" smtClean="0">
+                        <a:latin typeface="Cambria Math" panose="02040503050406030204" pitchFamily="18" charset="0"/>
+                      </a:rPr>
+                      <m:t>𝜋</m:t>
+                    </m:r>
+                    <m:r>
+                      <a:rPr lang="en-US" b="0" i="1" dirty="0" smtClean="0">
+                        <a:latin typeface="Cambria Math" panose="02040503050406030204" pitchFamily="18" charset="0"/>
+                      </a:rPr>
+                      <m:t>≈3.14159</m:t>
+                    </m:r>
+                  </m:oMath>
+                </a14:m>
+                <a:endParaRPr lang="en-US" dirty="0"/>
+              </a:p>
+              <a:p>
+                <a:r>
+                  <a:rPr lang="en-US" dirty="0"/>
+                  <a:t>A </a:t>
+                </a:r>
+                <a14:m>
+                  <m:oMath xmlns:m="http://schemas.openxmlformats.org/officeDocument/2006/math">
+                    <m:r>
+                      <a:rPr lang="en-US" b="0" i="1" dirty="0" smtClean="0">
+                        <a:latin typeface="Cambria Math" panose="02040503050406030204" pitchFamily="18" charset="0"/>
+                      </a:rPr>
+                      <m:t>3</m:t>
+                    </m:r>
+                    <m:r>
+                      <a:rPr lang="en-US" b="0" i="1" dirty="0" smtClean="0">
+                        <a:latin typeface="Cambria Math" panose="02040503050406030204" pitchFamily="18" charset="0"/>
+                      </a:rPr>
+                      <m:t>𝐷</m:t>
+                    </m:r>
+                  </m:oMath>
+                </a14:m>
+                <a:r>
+                  <a:rPr lang="en-US" dirty="0"/>
+                  <a:t>-ball of radius </a:t>
+                </a:r>
+                <a14:m>
+                  <m:oMath xmlns:m="http://schemas.openxmlformats.org/officeDocument/2006/math">
+                    <m:r>
+                      <a:rPr lang="en-US" i="1" dirty="0" smtClean="0">
+                        <a:latin typeface="Cambria Math" panose="02040503050406030204" pitchFamily="18" charset="0"/>
+                      </a:rPr>
+                      <m:t>1</m:t>
+                    </m:r>
+                  </m:oMath>
+                </a14:m>
+                <a:r>
+                  <a:rPr lang="en-US" dirty="0"/>
+                  <a:t> has </a:t>
+                </a:r>
+                <a14:m>
+                  <m:oMath xmlns:m="http://schemas.openxmlformats.org/officeDocument/2006/math">
+                    <m:r>
+                      <a:rPr lang="en-US" b="0" i="1" dirty="0" smtClean="0">
+                        <a:latin typeface="Cambria Math" panose="02040503050406030204" pitchFamily="18" charset="0"/>
+                      </a:rPr>
+                      <m:t>3</m:t>
+                    </m:r>
+                    <m:r>
+                      <a:rPr lang="en-US" b="0" i="1" dirty="0" smtClean="0">
+                        <a:latin typeface="Cambria Math" panose="02040503050406030204" pitchFamily="18" charset="0"/>
+                      </a:rPr>
+                      <m:t>𝐷</m:t>
+                    </m:r>
+                  </m:oMath>
+                </a14:m>
+                <a:r>
+                  <a:rPr lang="en-US" dirty="0"/>
+                  <a:t>-volume of </a:t>
+                </a:r>
+                <a14:m>
+                  <m:oMath xmlns:m="http://schemas.openxmlformats.org/officeDocument/2006/math">
+                    <m:f>
+                      <m:fPr>
+                        <m:ctrlPr>
+                          <a:rPr lang="en-US" b="0" i="0" dirty="0" smtClean="0">
+                            <a:latin typeface="Cambria Math" panose="02040503050406030204" pitchFamily="18" charset="0"/>
+                          </a:rPr>
+                        </m:ctrlPr>
+                      </m:fPr>
+                      <m:num>
+                        <m:r>
+                          <a:rPr lang="en-US" b="0" i="0" dirty="0" smtClean="0">
+                            <a:latin typeface="Cambria Math" panose="02040503050406030204" pitchFamily="18" charset="0"/>
+                          </a:rPr>
+                          <m:t>4 </m:t>
+                        </m:r>
+                        <m:r>
+                          <a:rPr lang="en-US" b="0" i="1" dirty="0" smtClean="0">
+                            <a:latin typeface="Cambria Math" panose="02040503050406030204" pitchFamily="18" charset="0"/>
+                          </a:rPr>
+                          <m:t>𝜋</m:t>
+                        </m:r>
+                      </m:num>
+                      <m:den>
+                        <m:r>
+                          <a:rPr lang="en-US" b="0" i="0" dirty="0" smtClean="0">
+                            <a:latin typeface="Cambria Math" panose="02040503050406030204" pitchFamily="18" charset="0"/>
+                          </a:rPr>
+                          <m:t>3</m:t>
+                        </m:r>
+                      </m:den>
+                    </m:f>
+                    <m:r>
+                      <a:rPr lang="en-US" b="0" i="1" dirty="0" smtClean="0">
+                        <a:latin typeface="Cambria Math" panose="02040503050406030204" pitchFamily="18" charset="0"/>
+                      </a:rPr>
+                      <m:t>≈4.18879</m:t>
+                    </m:r>
+                  </m:oMath>
+                </a14:m>
+                <a:endParaRPr lang="en-US" dirty="0"/>
+              </a:p>
+              <a:p>
+                <a:r>
+                  <a:rPr lang="en-US" dirty="0"/>
+                  <a:t>A </a:t>
+                </a:r>
+                <a14:m>
+                  <m:oMath xmlns:m="http://schemas.openxmlformats.org/officeDocument/2006/math">
+                    <m:r>
+                      <a:rPr lang="en-US" i="1" dirty="0">
+                        <a:latin typeface="Cambria Math" panose="02040503050406030204" pitchFamily="18" charset="0"/>
+                      </a:rPr>
+                      <m:t>4</m:t>
+                    </m:r>
+                    <m:r>
+                      <a:rPr lang="en-US" b="0" i="1" dirty="0" smtClean="0">
+                        <a:latin typeface="Cambria Math" panose="02040503050406030204" pitchFamily="18" charset="0"/>
+                      </a:rPr>
+                      <m:t>𝐷</m:t>
+                    </m:r>
+                  </m:oMath>
+                </a14:m>
+                <a:r>
+                  <a:rPr lang="en-US" dirty="0"/>
+                  <a:t>-ball of radius </a:t>
+                </a:r>
+                <a14:m>
+                  <m:oMath xmlns:m="http://schemas.openxmlformats.org/officeDocument/2006/math">
+                    <m:r>
+                      <a:rPr lang="en-US" i="1" dirty="0" smtClean="0">
+                        <a:latin typeface="Cambria Math" panose="02040503050406030204" pitchFamily="18" charset="0"/>
+                      </a:rPr>
+                      <m:t>1</m:t>
+                    </m:r>
+                  </m:oMath>
+                </a14:m>
+                <a:r>
+                  <a:rPr lang="en-US" dirty="0"/>
+                  <a:t> has </a:t>
+                </a:r>
+                <a14:m>
+                  <m:oMath xmlns:m="http://schemas.openxmlformats.org/officeDocument/2006/math">
+                    <m:r>
+                      <a:rPr lang="en-US" b="0" i="1" dirty="0" smtClean="0">
+                        <a:latin typeface="Cambria Math" panose="02040503050406030204" pitchFamily="18" charset="0"/>
+                      </a:rPr>
+                      <m:t>4</m:t>
+                    </m:r>
+                    <m:r>
+                      <a:rPr lang="en-US" b="0" i="1" dirty="0" smtClean="0">
+                        <a:latin typeface="Cambria Math" panose="02040503050406030204" pitchFamily="18" charset="0"/>
+                      </a:rPr>
+                      <m:t>𝐷</m:t>
+                    </m:r>
+                  </m:oMath>
+                </a14:m>
+                <a:r>
+                  <a:rPr lang="en-US" dirty="0"/>
+                  <a:t>-volume of </a:t>
+                </a:r>
+                <a14:m>
+                  <m:oMath xmlns:m="http://schemas.openxmlformats.org/officeDocument/2006/math">
+                    <m:f>
+                      <m:fPr>
+                        <m:ctrlPr>
+                          <a:rPr lang="en-US" b="0" i="1" dirty="0" smtClean="0">
+                            <a:latin typeface="Cambria Math" panose="02040503050406030204" pitchFamily="18" charset="0"/>
+                          </a:rPr>
+                        </m:ctrlPr>
+                      </m:fPr>
+                      <m:num>
+                        <m:sSup>
+                          <m:sSupPr>
+                            <m:ctrlPr>
+                              <a:rPr lang="en-US" b="0" i="1" dirty="0" smtClean="0">
+                                <a:latin typeface="Cambria Math" panose="02040503050406030204" pitchFamily="18" charset="0"/>
+                              </a:rPr>
+                            </m:ctrlPr>
+                          </m:sSupPr>
+                          <m:e>
+                            <m:r>
+                              <a:rPr lang="en-US" b="0" i="1" dirty="0" smtClean="0">
+                                <a:latin typeface="Cambria Math" panose="02040503050406030204" pitchFamily="18" charset="0"/>
+                              </a:rPr>
+                              <m:t>𝜋</m:t>
+                            </m:r>
+                          </m:e>
+                          <m:sup>
+                            <m:r>
+                              <a:rPr lang="en-US" b="0" i="1" dirty="0" smtClean="0">
+                                <a:latin typeface="Cambria Math" panose="02040503050406030204" pitchFamily="18" charset="0"/>
+                              </a:rPr>
+                              <m:t>2</m:t>
+                            </m:r>
+                          </m:sup>
+                        </m:sSup>
+                      </m:num>
+                      <m:den>
+                        <m:r>
+                          <a:rPr lang="en-US" b="0" i="1" dirty="0" smtClean="0">
+                            <a:latin typeface="Cambria Math" panose="02040503050406030204" pitchFamily="18" charset="0"/>
+                          </a:rPr>
+                          <m:t>2</m:t>
+                        </m:r>
+                      </m:den>
+                    </m:f>
+                    <m:r>
+                      <a:rPr lang="en-US" b="0" i="1" dirty="0" smtClean="0">
+                        <a:latin typeface="Cambria Math" panose="02040503050406030204" pitchFamily="18" charset="0"/>
+                      </a:rPr>
+                      <m:t>≈4.93480</m:t>
+                    </m:r>
+                  </m:oMath>
+                </a14:m>
+                <a:endParaRPr lang="en-US" dirty="0"/>
+              </a:p>
+              <a:p>
+                <a:r>
+                  <a:rPr lang="en-US" dirty="0"/>
+                  <a:t>A </a:t>
+                </a:r>
+                <a14:m>
+                  <m:oMath xmlns:m="http://schemas.openxmlformats.org/officeDocument/2006/math">
+                    <m:r>
+                      <a:rPr lang="en-US" i="1" dirty="0">
+                        <a:latin typeface="Cambria Math" panose="02040503050406030204" pitchFamily="18" charset="0"/>
+                      </a:rPr>
+                      <m:t>5</m:t>
+                    </m:r>
+                    <m:r>
+                      <a:rPr lang="en-US" i="1" dirty="0">
+                        <a:latin typeface="Cambria Math" panose="02040503050406030204" pitchFamily="18" charset="0"/>
+                      </a:rPr>
+                      <m:t>𝐷</m:t>
+                    </m:r>
+                  </m:oMath>
+                </a14:m>
+                <a:r>
+                  <a:rPr lang="en-US" dirty="0"/>
+                  <a:t>-ball of radius </a:t>
+                </a:r>
+                <a14:m>
+                  <m:oMath xmlns:m="http://schemas.openxmlformats.org/officeDocument/2006/math">
+                    <m:r>
+                      <a:rPr lang="en-US" i="1" dirty="0">
+                        <a:latin typeface="Cambria Math" panose="02040503050406030204" pitchFamily="18" charset="0"/>
+                      </a:rPr>
+                      <m:t>1</m:t>
+                    </m:r>
+                  </m:oMath>
+                </a14:m>
+                <a:r>
+                  <a:rPr lang="en-US" dirty="0"/>
+                  <a:t> has </a:t>
+                </a:r>
+                <a14:m>
+                  <m:oMath xmlns:m="http://schemas.openxmlformats.org/officeDocument/2006/math">
+                    <m:r>
+                      <a:rPr lang="en-US" i="1" dirty="0">
+                        <a:latin typeface="Cambria Math" panose="02040503050406030204" pitchFamily="18" charset="0"/>
+                      </a:rPr>
+                      <m:t>5</m:t>
+                    </m:r>
+                    <m:r>
+                      <a:rPr lang="en-US" i="1" dirty="0">
+                        <a:latin typeface="Cambria Math" panose="02040503050406030204" pitchFamily="18" charset="0"/>
+                      </a:rPr>
+                      <m:t>𝐷</m:t>
+                    </m:r>
+                  </m:oMath>
+                </a14:m>
+                <a:r>
+                  <a:rPr lang="en-US" dirty="0"/>
+                  <a:t>-volume of </a:t>
+                </a:r>
+                <a14:m>
+                  <m:oMath xmlns:m="http://schemas.openxmlformats.org/officeDocument/2006/math">
+                    <m:f>
+                      <m:fPr>
+                        <m:ctrlPr>
+                          <a:rPr lang="en-US" i="1" dirty="0">
+                            <a:latin typeface="Cambria Math" panose="02040503050406030204" pitchFamily="18" charset="0"/>
+                          </a:rPr>
+                        </m:ctrlPr>
+                      </m:fPr>
+                      <m:num>
+                        <m:r>
+                          <a:rPr lang="en-US" i="1" dirty="0">
+                            <a:latin typeface="Cambria Math" panose="02040503050406030204" pitchFamily="18" charset="0"/>
+                          </a:rPr>
+                          <m:t>8</m:t>
+                        </m:r>
+                        <m:sSup>
+                          <m:sSupPr>
+                            <m:ctrlPr>
+                              <a:rPr lang="en-US" i="1" dirty="0">
+                                <a:latin typeface="Cambria Math" panose="02040503050406030204" pitchFamily="18" charset="0"/>
+                              </a:rPr>
+                            </m:ctrlPr>
+                          </m:sSupPr>
+                          <m:e>
+                            <m:r>
+                              <a:rPr lang="en-US" i="1" dirty="0">
+                                <a:latin typeface="Cambria Math" panose="02040503050406030204" pitchFamily="18" charset="0"/>
+                              </a:rPr>
+                              <m:t>𝜋</m:t>
+                            </m:r>
+                          </m:e>
+                          <m:sup>
+                            <m:r>
+                              <a:rPr lang="en-US" i="1" dirty="0">
+                                <a:latin typeface="Cambria Math" panose="02040503050406030204" pitchFamily="18" charset="0"/>
+                              </a:rPr>
+                              <m:t>2</m:t>
+                            </m:r>
+                          </m:sup>
+                        </m:sSup>
+                      </m:num>
+                      <m:den>
+                        <m:r>
+                          <a:rPr lang="en-US" i="1" dirty="0">
+                            <a:latin typeface="Cambria Math" panose="02040503050406030204" pitchFamily="18" charset="0"/>
+                          </a:rPr>
+                          <m:t>15</m:t>
+                        </m:r>
+                      </m:den>
+                    </m:f>
+                    <m:r>
+                      <a:rPr lang="en-US" i="1" dirty="0">
+                        <a:latin typeface="Cambria Math" panose="02040503050406030204" pitchFamily="18" charset="0"/>
+                      </a:rPr>
+                      <m:t>≈5.26379</m:t>
+                    </m:r>
+                  </m:oMath>
+                </a14:m>
+                <a:endParaRPr lang="en-US" dirty="0"/>
+              </a:p>
+            </p:txBody>
+          </p:sp>
+        </mc:Choice>
+        <mc:Fallback>
+          <p:sp>
+            <p:nvSpPr>
+              <p:cNvPr id="3" name="Content Placeholder 2">
+                <a:extLst>
+                  <a:ext uri="{FF2B5EF4-FFF2-40B4-BE49-F238E27FC236}">
+                    <a16:creationId xmlns:a16="http://schemas.microsoft.com/office/drawing/2014/main" id="{71E87AF7-D3FD-BB99-B657-CDB74C1380BD}"/>
+                  </a:ext>
+                </a:extLst>
+              </p:cNvPr>
+              <p:cNvSpPr>
+                <a:spLocks noGrp="1" noRot="1" noChangeAspect="1" noMove="1" noResize="1" noEditPoints="1" noAdjustHandles="1" noChangeArrowheads="1" noChangeShapeType="1" noTextEdit="1"/>
+              </p:cNvSpPr>
+              <p:nvPr>
+                <p:ph idx="1"/>
+              </p:nvPr>
+            </p:nvSpPr>
+            <p:spPr>
+              <a:blipFill>
+                <a:blip r:embed="rId3"/>
+                <a:stretch>
+                  <a:fillRect l="-1043" t="-2241"/>
+                </a:stretch>
+              </a:blipFill>
+            </p:spPr>
+            <p:txBody>
+              <a:bodyPr/>
+              <a:lstStyle/>
+              <a:p>
+                <a:r>
+                  <a:rPr lang="en-US">
+                    <a:noFill/>
+                  </a:rPr>
+                  <a:t> </a:t>
+                </a:r>
+              </a:p>
+            </p:txBody>
+          </p:sp>
+        </mc:Fallback>
+      </mc:AlternateContent>
+      <mc:AlternateContent xmlns:mc="http://schemas.openxmlformats.org/markup-compatibility/2006">
+        <mc:Choice xmlns:a14="http://schemas.microsoft.com/office/drawing/2010/main" Requires="a14">
+          <p:sp>
+            <p:nvSpPr>
+              <p:cNvPr id="4" name="TextBox 3">
+                <a:extLst>
+                  <a:ext uri="{FF2B5EF4-FFF2-40B4-BE49-F238E27FC236}">
+                    <a16:creationId xmlns:a16="http://schemas.microsoft.com/office/drawing/2014/main" id="{C814648F-1CF9-24EF-ABBC-C24E9814296F}"/>
+                  </a:ext>
+                </a:extLst>
+              </p:cNvPr>
+              <p:cNvSpPr txBox="1"/>
+              <p:nvPr/>
+            </p:nvSpPr>
+            <p:spPr>
+              <a:xfrm>
+                <a:off x="8360160" y="643185"/>
+                <a:ext cx="3004862" cy="769441"/>
+              </a:xfrm>
+              <a:prstGeom prst="rect">
+                <a:avLst/>
+              </a:prstGeom>
+              <a:noFill/>
+            </p:spPr>
+            <p:txBody>
+              <a:bodyPr wrap="none" rtlCol="0">
+                <a:spAutoFit/>
+              </a:bodyPr>
+              <a:lstStyle/>
+              <a:p>
+                <a14:m>
+                  <m:oMathPara xmlns:m="http://schemas.openxmlformats.org/officeDocument/2006/math">
+                    <m:oMathParaPr>
+                      <m:jc m:val="centerGroup"/>
+                    </m:oMathParaPr>
+                    <m:oMath xmlns:m="http://schemas.openxmlformats.org/officeDocument/2006/math">
+                      <m:sSub>
+                        <m:sSubPr>
+                          <m:ctrlPr>
+                            <a:rPr lang="en-US" sz="4400" b="1" i="1" smtClean="0">
+                              <a:latin typeface="Cambria Math" panose="02040503050406030204" pitchFamily="18" charset="0"/>
+                            </a:rPr>
+                          </m:ctrlPr>
+                        </m:sSubPr>
+                        <m:e>
+                          <m:r>
+                            <a:rPr lang="en-US" sz="4400" b="1" i="1" smtClean="0">
+                              <a:latin typeface="Cambria Math" panose="02040503050406030204" pitchFamily="18" charset="0"/>
+                            </a:rPr>
+                            <m:t>𝓥</m:t>
+                          </m:r>
+                        </m:e>
+                        <m:sub>
+                          <m:r>
+                            <a:rPr lang="en-US" sz="4400" b="1" i="1" smtClean="0">
+                              <a:latin typeface="Cambria Math" panose="02040503050406030204" pitchFamily="18" charset="0"/>
+                            </a:rPr>
+                            <m:t>𝒏</m:t>
+                          </m:r>
+                        </m:sub>
+                      </m:sSub>
+                      <m:r>
+                        <a:rPr lang="en-US" sz="4400" b="1" i="1" smtClean="0">
+                          <a:latin typeface="Cambria Math" panose="02040503050406030204" pitchFamily="18" charset="0"/>
+                        </a:rPr>
+                        <m:t>=</m:t>
+                      </m:r>
+                      <m:sSub>
+                        <m:sSubPr>
+                          <m:ctrlPr>
+                            <a:rPr lang="en-US" sz="4400" b="1" i="1" smtClean="0">
+                              <a:latin typeface="Cambria Math" panose="02040503050406030204" pitchFamily="18" charset="0"/>
+                            </a:rPr>
+                          </m:ctrlPr>
+                        </m:sSubPr>
+                        <m:e>
+                          <m:r>
+                            <a:rPr lang="en-US" sz="4400" b="1" i="1" smtClean="0">
+                              <a:latin typeface="Cambria Math" panose="02040503050406030204" pitchFamily="18" charset="0"/>
+                            </a:rPr>
+                            <m:t>𝝅</m:t>
+                          </m:r>
+                        </m:e>
+                        <m:sub>
+                          <m:r>
+                            <a:rPr lang="en-US" sz="4400" b="1" i="1" smtClean="0">
+                              <a:latin typeface="Cambria Math" panose="02040503050406030204" pitchFamily="18" charset="0"/>
+                            </a:rPr>
+                            <m:t>𝒏</m:t>
+                          </m:r>
+                        </m:sub>
+                      </m:sSub>
+                      <m:sSup>
+                        <m:sSupPr>
+                          <m:ctrlPr>
+                            <a:rPr lang="en-US" sz="4400" b="1" i="1" smtClean="0">
+                              <a:latin typeface="Cambria Math" panose="02040503050406030204" pitchFamily="18" charset="0"/>
+                            </a:rPr>
+                          </m:ctrlPr>
+                        </m:sSupPr>
+                        <m:e>
+                          <m:r>
+                            <a:rPr lang="en-US" sz="4400" b="1" i="1" smtClean="0">
+                              <a:latin typeface="Cambria Math" panose="02040503050406030204" pitchFamily="18" charset="0"/>
+                            </a:rPr>
+                            <m:t>𝒓</m:t>
+                          </m:r>
+                        </m:e>
+                        <m:sup>
+                          <m:r>
+                            <a:rPr lang="en-US" sz="4400" b="1" i="1" smtClean="0">
+                              <a:latin typeface="Cambria Math" panose="02040503050406030204" pitchFamily="18" charset="0"/>
+                            </a:rPr>
+                            <m:t>𝒏</m:t>
+                          </m:r>
+                        </m:sup>
+                      </m:sSup>
+                    </m:oMath>
+                  </m:oMathPara>
+                </a14:m>
+                <a:endParaRPr lang="en-US" sz="4400" b="1" dirty="0"/>
+              </a:p>
+            </p:txBody>
+          </p:sp>
+        </mc:Choice>
+        <mc:Fallback>
+          <p:sp>
+            <p:nvSpPr>
+              <p:cNvPr id="4" name="TextBox 3">
+                <a:extLst>
+                  <a:ext uri="{FF2B5EF4-FFF2-40B4-BE49-F238E27FC236}">
+                    <a16:creationId xmlns:a16="http://schemas.microsoft.com/office/drawing/2014/main" id="{C814648F-1CF9-24EF-ABBC-C24E9814296F}"/>
+                  </a:ext>
+                </a:extLst>
+              </p:cNvPr>
+              <p:cNvSpPr txBox="1">
+                <a:spLocks noRot="1" noChangeAspect="1" noMove="1" noResize="1" noEditPoints="1" noAdjustHandles="1" noChangeArrowheads="1" noChangeShapeType="1" noTextEdit="1"/>
+              </p:cNvSpPr>
+              <p:nvPr/>
+            </p:nvSpPr>
+            <p:spPr>
+              <a:xfrm>
+                <a:off x="8360160" y="643185"/>
+                <a:ext cx="3004862" cy="769441"/>
+              </a:xfrm>
+              <a:prstGeom prst="rect">
+                <a:avLst/>
+              </a:prstGeom>
+              <a:blipFill>
+                <a:blip r:embed="rId4"/>
+                <a:stretch>
+                  <a:fillRect/>
+                </a:stretch>
+              </a:blipFill>
+            </p:spPr>
+            <p:txBody>
+              <a:bodyPr/>
+              <a:lstStyle/>
+              <a:p>
+                <a:r>
+                  <a:rPr lang="en-US">
+                    <a:noFill/>
+                  </a:rPr>
+                  <a:t> </a:t>
+                </a:r>
+              </a:p>
+            </p:txBody>
+          </p:sp>
+        </mc:Fallback>
+      </mc:AlternateContent>
+      <p:sp>
+        <p:nvSpPr>
+          <p:cNvPr id="5" name="TextBox 4">
+            <a:extLst>
+              <a:ext uri="{FF2B5EF4-FFF2-40B4-BE49-F238E27FC236}">
+                <a16:creationId xmlns:a16="http://schemas.microsoft.com/office/drawing/2014/main" id="{E5A38152-BA43-8DFC-0FA1-A4E7B84DEC1D}"/>
+              </a:ext>
+            </a:extLst>
+          </p:cNvPr>
+          <p:cNvSpPr txBox="1"/>
+          <p:nvPr/>
+        </p:nvSpPr>
+        <p:spPr>
+          <a:xfrm>
+            <a:off x="3600450" y="1296491"/>
+            <a:ext cx="1161023" cy="461665"/>
+          </a:xfrm>
+          <a:prstGeom prst="rect">
+            <a:avLst/>
+          </a:prstGeom>
+          <a:noFill/>
+        </p:spPr>
+        <p:txBody>
+          <a:bodyPr wrap="none" rtlCol="0">
+            <a:spAutoFit/>
+          </a:bodyPr>
+          <a:lstStyle/>
+          <a:p>
+            <a:r>
+              <a:rPr lang="en-US" sz="2400" dirty="0">
+                <a:solidFill>
+                  <a:schemeClr val="bg1">
+                    <a:lumMod val="50000"/>
+                  </a:schemeClr>
+                </a:solidFill>
+              </a:rPr>
+              <a:t>(length)</a:t>
+            </a:r>
+          </a:p>
+        </p:txBody>
+      </p:sp>
+      <p:sp>
+        <p:nvSpPr>
+          <p:cNvPr id="6" name="TextBox 5">
+            <a:extLst>
+              <a:ext uri="{FF2B5EF4-FFF2-40B4-BE49-F238E27FC236}">
+                <a16:creationId xmlns:a16="http://schemas.microsoft.com/office/drawing/2014/main" id="{831549C1-14F0-9670-95D2-92B034276C7B}"/>
+              </a:ext>
+            </a:extLst>
+          </p:cNvPr>
+          <p:cNvSpPr txBox="1"/>
+          <p:nvPr/>
+        </p:nvSpPr>
+        <p:spPr>
+          <a:xfrm>
+            <a:off x="6600906" y="1346000"/>
+            <a:ext cx="922817" cy="461665"/>
+          </a:xfrm>
+          <a:prstGeom prst="rect">
+            <a:avLst/>
+          </a:prstGeom>
+          <a:noFill/>
+        </p:spPr>
+        <p:txBody>
+          <a:bodyPr wrap="none" rtlCol="0">
+            <a:spAutoFit/>
+          </a:bodyPr>
+          <a:lstStyle/>
+          <a:p>
+            <a:r>
+              <a:rPr lang="en-US" sz="2400" dirty="0">
+                <a:solidFill>
+                  <a:schemeClr val="bg1">
+                    <a:lumMod val="50000"/>
+                  </a:schemeClr>
+                </a:solidFill>
+              </a:rPr>
+              <a:t>(area)</a:t>
+            </a:r>
+          </a:p>
+        </p:txBody>
+      </p:sp>
+      <p:sp>
+        <p:nvSpPr>
+          <p:cNvPr id="7" name="Freeform: Shape 6">
+            <a:extLst>
+              <a:ext uri="{FF2B5EF4-FFF2-40B4-BE49-F238E27FC236}">
+                <a16:creationId xmlns:a16="http://schemas.microsoft.com/office/drawing/2014/main" id="{3FBACFE9-9D53-CAE6-5497-86986C125A01}"/>
+              </a:ext>
+            </a:extLst>
+          </p:cNvPr>
+          <p:cNvSpPr/>
+          <p:nvPr/>
+        </p:nvSpPr>
+        <p:spPr>
+          <a:xfrm>
+            <a:off x="5514976" y="1690688"/>
+            <a:ext cx="1134502" cy="766762"/>
+          </a:xfrm>
+          <a:custGeom>
+            <a:avLst/>
+            <a:gdLst>
+              <a:gd name="connsiteX0" fmla="*/ 723900 w 723900"/>
+              <a:gd name="connsiteY0" fmla="*/ 0 h 1000125"/>
+              <a:gd name="connsiteX1" fmla="*/ 200025 w 723900"/>
+              <a:gd name="connsiteY1" fmla="*/ 542925 h 1000125"/>
+              <a:gd name="connsiteX2" fmla="*/ 0 w 723900"/>
+              <a:gd name="connsiteY2" fmla="*/ 1000125 h 1000125"/>
+            </a:gdLst>
+            <a:ahLst/>
+            <a:cxnLst>
+              <a:cxn ang="0">
+                <a:pos x="connsiteX0" y="connsiteY0"/>
+              </a:cxn>
+              <a:cxn ang="0">
+                <a:pos x="connsiteX1" y="connsiteY1"/>
+              </a:cxn>
+              <a:cxn ang="0">
+                <a:pos x="connsiteX2" y="connsiteY2"/>
+              </a:cxn>
+            </a:cxnLst>
+            <a:rect l="l" t="t" r="r" b="b"/>
+            <a:pathLst>
+              <a:path w="723900" h="1000125">
+                <a:moveTo>
+                  <a:pt x="723900" y="0"/>
+                </a:moveTo>
+                <a:cubicBezTo>
+                  <a:pt x="522287" y="188119"/>
+                  <a:pt x="320675" y="376238"/>
+                  <a:pt x="200025" y="542925"/>
+                </a:cubicBezTo>
+                <a:cubicBezTo>
+                  <a:pt x="79375" y="709612"/>
+                  <a:pt x="39687" y="854868"/>
+                  <a:pt x="0" y="1000125"/>
+                </a:cubicBezTo>
+              </a:path>
+            </a:pathLst>
+          </a:custGeom>
+          <a:noFill/>
+          <a:ln w="28575">
+            <a:solidFill>
+              <a:schemeClr val="bg1">
+                <a:lumMod val="50000"/>
+              </a:schemeClr>
+            </a:solidFill>
+            <a:headEnd type="none" w="med" len="med"/>
+            <a:tailEnd type="arrow" w="med" len="med"/>
+          </a:ln>
+        </p:spPr>
+        <p:style>
+          <a:lnRef idx="2">
+            <a:schemeClr val="accent1">
+              <a:shade val="15000"/>
+            </a:schemeClr>
+          </a:lnRef>
+          <a:fillRef idx="1">
+            <a:schemeClr val="accent1"/>
+          </a:fillRef>
+          <a:effectRef idx="0">
+            <a:schemeClr val="accent1"/>
+          </a:effectRef>
+          <a:fontRef idx="minor">
+            <a:schemeClr val="lt1"/>
+          </a:fontRef>
+        </p:style>
+        <p:txBody>
+          <a:bodyPr rtlCol="0" anchor="ctr"/>
+          <a:lstStyle/>
+          <a:p>
+            <a:pPr algn="ctr"/>
+            <a:endParaRPr lang="en-US"/>
+          </a:p>
+        </p:txBody>
+      </p:sp>
+      <p:sp>
+        <p:nvSpPr>
+          <p:cNvPr id="8" name="Freeform: Shape 7">
+            <a:extLst>
+              <a:ext uri="{FF2B5EF4-FFF2-40B4-BE49-F238E27FC236}">
+                <a16:creationId xmlns:a16="http://schemas.microsoft.com/office/drawing/2014/main" id="{E131BBB0-82CC-6571-B468-73D51DD8623E}"/>
+              </a:ext>
+            </a:extLst>
+          </p:cNvPr>
+          <p:cNvSpPr/>
+          <p:nvPr/>
+        </p:nvSpPr>
+        <p:spPr>
+          <a:xfrm flipH="1">
+            <a:off x="4686300" y="1562100"/>
+            <a:ext cx="628650" cy="461665"/>
+          </a:xfrm>
+          <a:custGeom>
+            <a:avLst/>
+            <a:gdLst>
+              <a:gd name="connsiteX0" fmla="*/ 723900 w 723900"/>
+              <a:gd name="connsiteY0" fmla="*/ 0 h 1000125"/>
+              <a:gd name="connsiteX1" fmla="*/ 200025 w 723900"/>
+              <a:gd name="connsiteY1" fmla="*/ 542925 h 1000125"/>
+              <a:gd name="connsiteX2" fmla="*/ 0 w 723900"/>
+              <a:gd name="connsiteY2" fmla="*/ 1000125 h 1000125"/>
+            </a:gdLst>
+            <a:ahLst/>
+            <a:cxnLst>
+              <a:cxn ang="0">
+                <a:pos x="connsiteX0" y="connsiteY0"/>
+              </a:cxn>
+              <a:cxn ang="0">
+                <a:pos x="connsiteX1" y="connsiteY1"/>
+              </a:cxn>
+              <a:cxn ang="0">
+                <a:pos x="connsiteX2" y="connsiteY2"/>
+              </a:cxn>
+            </a:cxnLst>
+            <a:rect l="l" t="t" r="r" b="b"/>
+            <a:pathLst>
+              <a:path w="723900" h="1000125">
+                <a:moveTo>
+                  <a:pt x="723900" y="0"/>
+                </a:moveTo>
+                <a:cubicBezTo>
+                  <a:pt x="522287" y="188119"/>
+                  <a:pt x="320675" y="376238"/>
+                  <a:pt x="200025" y="542925"/>
+                </a:cubicBezTo>
+                <a:cubicBezTo>
+                  <a:pt x="79375" y="709612"/>
+                  <a:pt x="39687" y="854868"/>
+                  <a:pt x="0" y="1000125"/>
+                </a:cubicBezTo>
+              </a:path>
+            </a:pathLst>
+          </a:custGeom>
+          <a:noFill/>
+          <a:ln w="28575">
+            <a:solidFill>
+              <a:schemeClr val="bg1">
+                <a:lumMod val="50000"/>
+              </a:schemeClr>
+            </a:solidFill>
+            <a:headEnd type="none" w="med" len="med"/>
+            <a:tailEnd type="arrow" w="med" len="med"/>
+          </a:ln>
+        </p:spPr>
+        <p:style>
+          <a:lnRef idx="2">
+            <a:schemeClr val="accent1">
+              <a:shade val="15000"/>
+            </a:schemeClr>
+          </a:lnRef>
+          <a:fillRef idx="1">
+            <a:schemeClr val="accent1"/>
+          </a:fillRef>
+          <a:effectRef idx="0">
+            <a:schemeClr val="accent1"/>
+          </a:effectRef>
+          <a:fontRef idx="minor">
+            <a:schemeClr val="lt1"/>
+          </a:fontRef>
+        </p:style>
+        <p:txBody>
+          <a:bodyPr rtlCol="0" anchor="ctr"/>
+          <a:lstStyle/>
+          <a:p>
+            <a:pPr algn="ctr"/>
+            <a:endParaRPr lang="en-US"/>
+          </a:p>
+        </p:txBody>
+      </p:sp>
+    </p:spTree>
+    <p:extLst>
+      <p:ext uri="{BB962C8B-B14F-4D97-AF65-F5344CB8AC3E}">
+        <p14:creationId xmlns:p14="http://schemas.microsoft.com/office/powerpoint/2010/main" val="3412240957"/>
+      </p:ext>
+    </p:extLst>
+  </p:cSld>
+  <p:clrMapOvr>
+    <a:masterClrMapping/>
+  </p:clrMapOvr>
+</p:sld>
+</file>
+
+<file path=ppt/slides/slide11.xml><?xml version="1.0" encoding="utf-8"?>
 <p:sld xmlns:a="http://schemas.openxmlformats.org/drawingml/2006/main" xmlns:r="http://schemas.openxmlformats.org/officeDocument/2006/relationships" xmlns:p="http://schemas.openxmlformats.org/presentationml/2006/main">
   <p:cSld>
     <p:spTree>
@@ -5066,7 +6173,7 @@
 </p:sld>
 </file>
 
-<file path=ppt/slides/slide11.xml><?xml version="1.0" encoding="utf-8"?>
+<file path=ppt/slides/slide12.xml><?xml version="1.0" encoding="utf-8"?>
 <p:sld xmlns:a="http://schemas.openxmlformats.org/drawingml/2006/main" xmlns:r="http://schemas.openxmlformats.org/officeDocument/2006/relationships" xmlns:p="http://schemas.openxmlformats.org/presentationml/2006/main" show="0">
   <p:cSld>
     <p:spTree>
@@ -6136,7 +7243,7 @@
 </p:sld>
 </file>
 
-<file path=ppt/slides/slide12.xml><?xml version="1.0" encoding="utf-8"?>
+<file path=ppt/slides/slide13.xml><?xml version="1.0" encoding="utf-8"?>
 <p:sld xmlns:a="http://schemas.openxmlformats.org/drawingml/2006/main" xmlns:r="http://schemas.openxmlformats.org/officeDocument/2006/relationships" xmlns:p="http://schemas.openxmlformats.org/presentationml/2006/main">
   <p:cSld>
     <p:spTree>
@@ -6330,7 +7437,7 @@
 </p:sld>
 </file>
 
-<file path=ppt/slides/slide13.xml><?xml version="1.0" encoding="utf-8"?>
+<file path=ppt/slides/slide14.xml><?xml version="1.0" encoding="utf-8"?>
 <p:sld xmlns:a="http://schemas.openxmlformats.org/drawingml/2006/main" xmlns:r="http://schemas.openxmlformats.org/officeDocument/2006/relationships" xmlns:p="http://schemas.openxmlformats.org/presentationml/2006/main">
   <p:cSld>
     <p:spTree>
@@ -6969,7 +8076,7 @@
 </p:sld>
 </file>
 
-<file path=ppt/slides/slide14.xml><?xml version="1.0" encoding="utf-8"?>
+<file path=ppt/slides/slide15.xml><?xml version="1.0" encoding="utf-8"?>
 <p:sld xmlns:a="http://schemas.openxmlformats.org/drawingml/2006/main" xmlns:r="http://schemas.openxmlformats.org/officeDocument/2006/relationships" xmlns:p="http://schemas.openxmlformats.org/presentationml/2006/main">
   <p:cSld>
     <p:spTree>
@@ -8880,7 +9987,7 @@
 </p:sld>
 </file>
 
-<file path=ppt/slides/slide15.xml><?xml version="1.0" encoding="utf-8"?>
+<file path=ppt/slides/slide16.xml><?xml version="1.0" encoding="utf-8"?>
 <p:sld xmlns:a="http://schemas.openxmlformats.org/drawingml/2006/main" xmlns:r="http://schemas.openxmlformats.org/officeDocument/2006/relationships" xmlns:p="http://schemas.openxmlformats.org/presentationml/2006/main">
   <p:cSld>
     <p:spTree>
@@ -10789,7 +11896,7 @@
 </p:sld>
 </file>
 
-<file path=ppt/slides/slide16.xml><?xml version="1.0" encoding="utf-8"?>
+<file path=ppt/slides/slide17.xml><?xml version="1.0" encoding="utf-8"?>
 <p:sld xmlns:a="http://schemas.openxmlformats.org/drawingml/2006/main" xmlns:r="http://schemas.openxmlformats.org/officeDocument/2006/relationships" xmlns:p="http://schemas.openxmlformats.org/presentationml/2006/main" show="0">
   <p:cSld>
     <p:spTree>
@@ -10882,7 +11989,7 @@
 </p:sld>
 </file>
 
-<file path=ppt/slides/slide17.xml><?xml version="1.0" encoding="utf-8"?>
+<file path=ppt/slides/slide18.xml><?xml version="1.0" encoding="utf-8"?>
 <p:sld xmlns:a="http://schemas.openxmlformats.org/drawingml/2006/main" xmlns:r="http://schemas.openxmlformats.org/officeDocument/2006/relationships" xmlns:p="http://schemas.openxmlformats.org/presentationml/2006/main">
   <p:cSld>
     <p:spTree>
@@ -11275,7 +12382,7 @@
 </p:sld>
 </file>
 
-<file path=ppt/slides/slide18.xml><?xml version="1.0" encoding="utf-8"?>
+<file path=ppt/slides/slide19.xml><?xml version="1.0" encoding="utf-8"?>
 <p:sld xmlns:a="http://schemas.openxmlformats.org/drawingml/2006/main" xmlns:r="http://schemas.openxmlformats.org/officeDocument/2006/relationships" xmlns:p="http://schemas.openxmlformats.org/presentationml/2006/main">
   <p:cSld>
     <p:spTree>
@@ -11767,373 +12874,6 @@
 </p:sld>
 </file>
 
-<file path=ppt/slides/slide19.xml><?xml version="1.0" encoding="utf-8"?>
-<p:sld xmlns:a="http://schemas.openxmlformats.org/drawingml/2006/main" xmlns:r="http://schemas.openxmlformats.org/officeDocument/2006/relationships" xmlns:p="http://schemas.openxmlformats.org/presentationml/2006/main">
-  <p:cSld>
-    <p:spTree>
-      <p:nvGrpSpPr>
-        <p:cNvPr id="1" name=""/>
-        <p:cNvGrpSpPr/>
-        <p:nvPr/>
-      </p:nvGrpSpPr>
-      <p:grpSpPr>
-        <a:xfrm>
-          <a:off x="0" y="0"/>
-          <a:ext cx="0" cy="0"/>
-          <a:chOff x="0" y="0"/>
-          <a:chExt cx="0" cy="0"/>
-        </a:xfrm>
-      </p:grpSpPr>
-      <p:sp>
-        <p:nvSpPr>
-          <p:cNvPr id="2" name="Title 1">
-            <a:extLst>
-              <a:ext uri="{FF2B5EF4-FFF2-40B4-BE49-F238E27FC236}">
-                <a16:creationId xmlns:a16="http://schemas.microsoft.com/office/drawing/2014/main" id="{970BC690-40CA-30C2-4E91-661B86D51731}"/>
-              </a:ext>
-            </a:extLst>
-          </p:cNvPr>
-          <p:cNvSpPr>
-            <a:spLocks noGrp="1"/>
-          </p:cNvSpPr>
-          <p:nvPr>
-            <p:ph type="title"/>
-          </p:nvPr>
-        </p:nvSpPr>
-        <p:spPr/>
-        <p:txBody>
-          <a:bodyPr/>
-          <a:lstStyle/>
-          <a:p>
-            <a:r>
-              <a:rPr lang="en-US" dirty="0"/>
-              <a:t>8 balls paradox</a:t>
-            </a:r>
-          </a:p>
-        </p:txBody>
-      </p:sp>
-      <p:pic>
-        <p:nvPicPr>
-          <p:cNvPr id="6" name="Content Placeholder 5" descr="A group of spheres in a square&#10;&#10;Description automatically generated">
-            <a:extLst>
-              <a:ext uri="{FF2B5EF4-FFF2-40B4-BE49-F238E27FC236}">
-                <a16:creationId xmlns:a16="http://schemas.microsoft.com/office/drawing/2014/main" id="{06561C94-CF44-2D93-E931-30240647F922}"/>
-              </a:ext>
-            </a:extLst>
-          </p:cNvPr>
-          <p:cNvPicPr>
-            <a:picLocks noGrp="1" noChangeAspect="1"/>
-          </p:cNvPicPr>
-          <p:nvPr>
-            <p:ph idx="1"/>
-          </p:nvPr>
-        </p:nvPicPr>
-        <p:blipFill>
-          <a:blip r:embed="rId2">
-            <a:extLst>
-              <a:ext uri="{28A0092B-C50C-407E-A947-70E740481C1C}">
-                <a14:useLocalDpi xmlns:a14="http://schemas.microsoft.com/office/drawing/2010/main" val="0"/>
-              </a:ext>
-            </a:extLst>
-          </a:blip>
-          <a:stretch>
-            <a:fillRect/>
-          </a:stretch>
-        </p:blipFill>
-        <p:spPr>
-          <a:xfrm>
-            <a:off x="3578413" y="1144588"/>
-            <a:ext cx="5035174" cy="5713412"/>
-          </a:xfrm>
-        </p:spPr>
-      </p:pic>
-      <p:sp>
-        <p:nvSpPr>
-          <p:cNvPr id="8" name="TextBox 7">
-            <a:extLst>
-              <a:ext uri="{FF2B5EF4-FFF2-40B4-BE49-F238E27FC236}">
-                <a16:creationId xmlns:a16="http://schemas.microsoft.com/office/drawing/2014/main" id="{656CFC9B-163C-6DE6-F22D-000C6E586C51}"/>
-              </a:ext>
-            </a:extLst>
-          </p:cNvPr>
-          <p:cNvSpPr txBox="1"/>
-          <p:nvPr/>
-        </p:nvSpPr>
-        <p:spPr>
-          <a:xfrm>
-            <a:off x="8013396" y="1019175"/>
-            <a:ext cx="1593706" cy="461665"/>
-          </a:xfrm>
-          <a:prstGeom prst="rect">
-            <a:avLst/>
-          </a:prstGeom>
-          <a:noFill/>
-        </p:spPr>
-        <p:txBody>
-          <a:bodyPr wrap="none" rtlCol="0">
-            <a:spAutoFit/>
-          </a:bodyPr>
-          <a:lstStyle/>
-          <a:p>
-            <a:r>
-              <a:rPr lang="en-US" sz="2400" dirty="0">
-                <a:solidFill>
-                  <a:srgbClr val="5AA02C"/>
-                </a:solidFill>
-              </a:rPr>
-              <a:t>4x4x4 cube</a:t>
-            </a:r>
-          </a:p>
-        </p:txBody>
-      </p:sp>
-      <p:sp>
-        <p:nvSpPr>
-          <p:cNvPr id="18" name="Freeform: Shape 17">
-            <a:extLst>
-              <a:ext uri="{FF2B5EF4-FFF2-40B4-BE49-F238E27FC236}">
-                <a16:creationId xmlns:a16="http://schemas.microsoft.com/office/drawing/2014/main" id="{4FEFDF00-386E-515D-4419-1068CE1BBD5F}"/>
-              </a:ext>
-            </a:extLst>
-          </p:cNvPr>
-          <p:cNvSpPr/>
-          <p:nvPr/>
-        </p:nvSpPr>
-        <p:spPr>
-          <a:xfrm flipH="1">
-            <a:off x="3391279" y="2438399"/>
-            <a:ext cx="1199008" cy="560833"/>
-          </a:xfrm>
-          <a:custGeom>
-            <a:avLst/>
-            <a:gdLst>
-              <a:gd name="connsiteX0" fmla="*/ 1371600 w 1371600"/>
-              <a:gd name="connsiteY0" fmla="*/ 0 h 790575"/>
-              <a:gd name="connsiteX1" fmla="*/ 628650 w 1371600"/>
-              <a:gd name="connsiteY1" fmla="*/ 228600 h 790575"/>
-              <a:gd name="connsiteX2" fmla="*/ 0 w 1371600"/>
-              <a:gd name="connsiteY2" fmla="*/ 790575 h 790575"/>
-            </a:gdLst>
-            <a:ahLst/>
-            <a:cxnLst>
-              <a:cxn ang="0">
-                <a:pos x="connsiteX0" y="connsiteY0"/>
-              </a:cxn>
-              <a:cxn ang="0">
-                <a:pos x="connsiteX1" y="connsiteY1"/>
-              </a:cxn>
-              <a:cxn ang="0">
-                <a:pos x="connsiteX2" y="connsiteY2"/>
-              </a:cxn>
-            </a:cxnLst>
-            <a:rect l="l" t="t" r="r" b="b"/>
-            <a:pathLst>
-              <a:path w="1371600" h="790575">
-                <a:moveTo>
-                  <a:pt x="1371600" y="0"/>
-                </a:moveTo>
-                <a:cubicBezTo>
-                  <a:pt x="1114425" y="48419"/>
-                  <a:pt x="857250" y="96838"/>
-                  <a:pt x="628650" y="228600"/>
-                </a:cubicBezTo>
-                <a:cubicBezTo>
-                  <a:pt x="400050" y="360363"/>
-                  <a:pt x="200025" y="575469"/>
-                  <a:pt x="0" y="790575"/>
-                </a:cubicBezTo>
-              </a:path>
-            </a:pathLst>
-          </a:custGeom>
-          <a:noFill/>
-          <a:ln w="57150">
-            <a:solidFill>
-              <a:srgbClr val="37ABC8"/>
-            </a:solidFill>
-            <a:headEnd type="none" w="med" len="med"/>
-            <a:tailEnd type="arrow" w="med" len="med"/>
-          </a:ln>
-        </p:spPr>
-        <p:style>
-          <a:lnRef idx="2">
-            <a:schemeClr val="accent1">
-              <a:shade val="15000"/>
-            </a:schemeClr>
-          </a:lnRef>
-          <a:fillRef idx="1">
-            <a:schemeClr val="accent1"/>
-          </a:fillRef>
-          <a:effectRef idx="0">
-            <a:schemeClr val="accent1"/>
-          </a:effectRef>
-          <a:fontRef idx="minor">
-            <a:schemeClr val="lt1"/>
-          </a:fontRef>
-        </p:style>
-        <p:txBody>
-          <a:bodyPr rtlCol="0" anchor="ctr"/>
-          <a:lstStyle/>
-          <a:p>
-            <a:pPr algn="ctr"/>
-            <a:endParaRPr lang="en-US"/>
-          </a:p>
-        </p:txBody>
-      </p:sp>
-      <p:sp>
-        <p:nvSpPr>
-          <p:cNvPr id="19" name="TextBox 18">
-            <a:extLst>
-              <a:ext uri="{FF2B5EF4-FFF2-40B4-BE49-F238E27FC236}">
-                <a16:creationId xmlns:a16="http://schemas.microsoft.com/office/drawing/2014/main" id="{DF8F83F6-4CC2-C679-7CEB-81CAC7D81EE5}"/>
-              </a:ext>
-            </a:extLst>
-          </p:cNvPr>
-          <p:cNvSpPr txBox="1"/>
-          <p:nvPr/>
-        </p:nvSpPr>
-        <p:spPr>
-          <a:xfrm>
-            <a:off x="2219037" y="2140892"/>
-            <a:ext cx="1353782" cy="461665"/>
-          </a:xfrm>
-          <a:prstGeom prst="rect">
-            <a:avLst/>
-          </a:prstGeom>
-          <a:noFill/>
-        </p:spPr>
-        <p:txBody>
-          <a:bodyPr wrap="square" rtlCol="0">
-            <a:spAutoFit/>
-          </a:bodyPr>
-          <a:lstStyle/>
-          <a:p>
-            <a:r>
-              <a:rPr lang="en-US" sz="2400" dirty="0">
-                <a:solidFill>
-                  <a:srgbClr val="37ABC8"/>
-                </a:solidFill>
-              </a:rPr>
-              <a:t>radius 1</a:t>
-            </a:r>
-          </a:p>
-        </p:txBody>
-      </p:sp>
-      <p:sp>
-        <p:nvSpPr>
-          <p:cNvPr id="20" name="Freeform: Shape 19">
-            <a:extLst>
-              <a:ext uri="{FF2B5EF4-FFF2-40B4-BE49-F238E27FC236}">
-                <a16:creationId xmlns:a16="http://schemas.microsoft.com/office/drawing/2014/main" id="{94DE9ADD-4F47-72D8-89E6-16B8E6632304}"/>
-              </a:ext>
-            </a:extLst>
-          </p:cNvPr>
-          <p:cNvSpPr/>
-          <p:nvPr/>
-        </p:nvSpPr>
-        <p:spPr>
-          <a:xfrm>
-            <a:off x="6885432" y="1247776"/>
-            <a:ext cx="1096518" cy="461666"/>
-          </a:xfrm>
-          <a:custGeom>
-            <a:avLst/>
-            <a:gdLst>
-              <a:gd name="connsiteX0" fmla="*/ 1371600 w 1371600"/>
-              <a:gd name="connsiteY0" fmla="*/ 0 h 790575"/>
-              <a:gd name="connsiteX1" fmla="*/ 628650 w 1371600"/>
-              <a:gd name="connsiteY1" fmla="*/ 228600 h 790575"/>
-              <a:gd name="connsiteX2" fmla="*/ 0 w 1371600"/>
-              <a:gd name="connsiteY2" fmla="*/ 790575 h 790575"/>
-            </a:gdLst>
-            <a:ahLst/>
-            <a:cxnLst>
-              <a:cxn ang="0">
-                <a:pos x="connsiteX0" y="connsiteY0"/>
-              </a:cxn>
-              <a:cxn ang="0">
-                <a:pos x="connsiteX1" y="connsiteY1"/>
-              </a:cxn>
-              <a:cxn ang="0">
-                <a:pos x="connsiteX2" y="connsiteY2"/>
-              </a:cxn>
-            </a:cxnLst>
-            <a:rect l="l" t="t" r="r" b="b"/>
-            <a:pathLst>
-              <a:path w="1371600" h="790575">
-                <a:moveTo>
-                  <a:pt x="1371600" y="0"/>
-                </a:moveTo>
-                <a:cubicBezTo>
-                  <a:pt x="1114425" y="48419"/>
-                  <a:pt x="857250" y="96838"/>
-                  <a:pt x="628650" y="228600"/>
-                </a:cubicBezTo>
-                <a:cubicBezTo>
-                  <a:pt x="400050" y="360363"/>
-                  <a:pt x="200025" y="575469"/>
-                  <a:pt x="0" y="790575"/>
-                </a:cubicBezTo>
-              </a:path>
-            </a:pathLst>
-          </a:custGeom>
-          <a:noFill/>
-          <a:ln w="57150">
-            <a:solidFill>
-              <a:srgbClr val="5AA02C"/>
-            </a:solidFill>
-            <a:headEnd type="none" w="med" len="med"/>
-            <a:tailEnd type="arrow" w="med" len="med"/>
-          </a:ln>
-        </p:spPr>
-        <p:style>
-          <a:lnRef idx="2">
-            <a:schemeClr val="accent1">
-              <a:shade val="15000"/>
-            </a:schemeClr>
-          </a:lnRef>
-          <a:fillRef idx="1">
-            <a:schemeClr val="accent1"/>
-          </a:fillRef>
-          <a:effectRef idx="0">
-            <a:schemeClr val="accent1"/>
-          </a:effectRef>
-          <a:fontRef idx="minor">
-            <a:schemeClr val="lt1"/>
-          </a:fontRef>
-        </p:style>
-        <p:txBody>
-          <a:bodyPr rtlCol="0" anchor="ctr"/>
-          <a:lstStyle/>
-          <a:p>
-            <a:pPr algn="ctr"/>
-            <a:endParaRPr lang="en-US"/>
-          </a:p>
-        </p:txBody>
-      </p:sp>
-    </p:spTree>
-    <p:extLst>
-      <p:ext uri="{BB962C8B-B14F-4D97-AF65-F5344CB8AC3E}">
-        <p14:creationId xmlns:p14="http://schemas.microsoft.com/office/powerpoint/2010/main" val="41280229"/>
-      </p:ext>
-    </p:extLst>
-  </p:cSld>
-  <p:clrMapOvr>
-    <a:masterClrMapping/>
-  </p:clrMapOvr>
-  <mc:AlternateContent xmlns:mc="http://schemas.openxmlformats.org/markup-compatibility/2006">
-    <mc:Choice xmlns:p14="http://schemas.microsoft.com/office/powerpoint/2010/main" Requires="p14">
-      <p:transition spd="med" p14:dur="700">
-        <p:fade/>
-      </p:transition>
-    </mc:Choice>
-    <mc:Fallback>
-      <p:transition spd="med">
-        <p:fade/>
-      </p:transition>
-    </mc:Fallback>
-  </mc:AlternateContent>
-</p:sld>
-</file>
-
 <file path=ppt/slides/slide2.xml><?xml version="1.0" encoding="utf-8"?>
 <p:sld xmlns:a="http://schemas.openxmlformats.org/drawingml/2006/main" xmlns:r="http://schemas.openxmlformats.org/officeDocument/2006/relationships" xmlns:p="http://schemas.openxmlformats.org/presentationml/2006/main">
   <p:cSld>
@@ -12304,6 +13044,373 @@
 </file>
 
 <file path=ppt/slides/slide20.xml><?xml version="1.0" encoding="utf-8"?>
+<p:sld xmlns:a="http://schemas.openxmlformats.org/drawingml/2006/main" xmlns:r="http://schemas.openxmlformats.org/officeDocument/2006/relationships" xmlns:p="http://schemas.openxmlformats.org/presentationml/2006/main">
+  <p:cSld>
+    <p:spTree>
+      <p:nvGrpSpPr>
+        <p:cNvPr id="1" name=""/>
+        <p:cNvGrpSpPr/>
+        <p:nvPr/>
+      </p:nvGrpSpPr>
+      <p:grpSpPr>
+        <a:xfrm>
+          <a:off x="0" y="0"/>
+          <a:ext cx="0" cy="0"/>
+          <a:chOff x="0" y="0"/>
+          <a:chExt cx="0" cy="0"/>
+        </a:xfrm>
+      </p:grpSpPr>
+      <p:sp>
+        <p:nvSpPr>
+          <p:cNvPr id="2" name="Title 1">
+            <a:extLst>
+              <a:ext uri="{FF2B5EF4-FFF2-40B4-BE49-F238E27FC236}">
+                <a16:creationId xmlns:a16="http://schemas.microsoft.com/office/drawing/2014/main" id="{970BC690-40CA-30C2-4E91-661B86D51731}"/>
+              </a:ext>
+            </a:extLst>
+          </p:cNvPr>
+          <p:cNvSpPr>
+            <a:spLocks noGrp="1"/>
+          </p:cNvSpPr>
+          <p:nvPr>
+            <p:ph type="title"/>
+          </p:nvPr>
+        </p:nvSpPr>
+        <p:spPr/>
+        <p:txBody>
+          <a:bodyPr/>
+          <a:lstStyle/>
+          <a:p>
+            <a:r>
+              <a:rPr lang="en-US" dirty="0"/>
+              <a:t>8 balls paradox</a:t>
+            </a:r>
+          </a:p>
+        </p:txBody>
+      </p:sp>
+      <p:pic>
+        <p:nvPicPr>
+          <p:cNvPr id="6" name="Content Placeholder 5" descr="A group of spheres in a square&#10;&#10;Description automatically generated">
+            <a:extLst>
+              <a:ext uri="{FF2B5EF4-FFF2-40B4-BE49-F238E27FC236}">
+                <a16:creationId xmlns:a16="http://schemas.microsoft.com/office/drawing/2014/main" id="{06561C94-CF44-2D93-E931-30240647F922}"/>
+              </a:ext>
+            </a:extLst>
+          </p:cNvPr>
+          <p:cNvPicPr>
+            <a:picLocks noGrp="1" noChangeAspect="1"/>
+          </p:cNvPicPr>
+          <p:nvPr>
+            <p:ph idx="1"/>
+          </p:nvPr>
+        </p:nvPicPr>
+        <p:blipFill>
+          <a:blip r:embed="rId2">
+            <a:extLst>
+              <a:ext uri="{28A0092B-C50C-407E-A947-70E740481C1C}">
+                <a14:useLocalDpi xmlns:a14="http://schemas.microsoft.com/office/drawing/2010/main" val="0"/>
+              </a:ext>
+            </a:extLst>
+          </a:blip>
+          <a:stretch>
+            <a:fillRect/>
+          </a:stretch>
+        </p:blipFill>
+        <p:spPr>
+          <a:xfrm>
+            <a:off x="3578413" y="1144588"/>
+            <a:ext cx="5035174" cy="5713412"/>
+          </a:xfrm>
+        </p:spPr>
+      </p:pic>
+      <p:sp>
+        <p:nvSpPr>
+          <p:cNvPr id="8" name="TextBox 7">
+            <a:extLst>
+              <a:ext uri="{FF2B5EF4-FFF2-40B4-BE49-F238E27FC236}">
+                <a16:creationId xmlns:a16="http://schemas.microsoft.com/office/drawing/2014/main" id="{656CFC9B-163C-6DE6-F22D-000C6E586C51}"/>
+              </a:ext>
+            </a:extLst>
+          </p:cNvPr>
+          <p:cNvSpPr txBox="1"/>
+          <p:nvPr/>
+        </p:nvSpPr>
+        <p:spPr>
+          <a:xfrm>
+            <a:off x="8013396" y="1019175"/>
+            <a:ext cx="1593706" cy="461665"/>
+          </a:xfrm>
+          <a:prstGeom prst="rect">
+            <a:avLst/>
+          </a:prstGeom>
+          <a:noFill/>
+        </p:spPr>
+        <p:txBody>
+          <a:bodyPr wrap="none" rtlCol="0">
+            <a:spAutoFit/>
+          </a:bodyPr>
+          <a:lstStyle/>
+          <a:p>
+            <a:r>
+              <a:rPr lang="en-US" sz="2400" dirty="0">
+                <a:solidFill>
+                  <a:srgbClr val="5AA02C"/>
+                </a:solidFill>
+              </a:rPr>
+              <a:t>4x4x4 cube</a:t>
+            </a:r>
+          </a:p>
+        </p:txBody>
+      </p:sp>
+      <p:sp>
+        <p:nvSpPr>
+          <p:cNvPr id="18" name="Freeform: Shape 17">
+            <a:extLst>
+              <a:ext uri="{FF2B5EF4-FFF2-40B4-BE49-F238E27FC236}">
+                <a16:creationId xmlns:a16="http://schemas.microsoft.com/office/drawing/2014/main" id="{4FEFDF00-386E-515D-4419-1068CE1BBD5F}"/>
+              </a:ext>
+            </a:extLst>
+          </p:cNvPr>
+          <p:cNvSpPr/>
+          <p:nvPr/>
+        </p:nvSpPr>
+        <p:spPr>
+          <a:xfrm flipH="1">
+            <a:off x="3391279" y="2438399"/>
+            <a:ext cx="1199008" cy="560833"/>
+          </a:xfrm>
+          <a:custGeom>
+            <a:avLst/>
+            <a:gdLst>
+              <a:gd name="connsiteX0" fmla="*/ 1371600 w 1371600"/>
+              <a:gd name="connsiteY0" fmla="*/ 0 h 790575"/>
+              <a:gd name="connsiteX1" fmla="*/ 628650 w 1371600"/>
+              <a:gd name="connsiteY1" fmla="*/ 228600 h 790575"/>
+              <a:gd name="connsiteX2" fmla="*/ 0 w 1371600"/>
+              <a:gd name="connsiteY2" fmla="*/ 790575 h 790575"/>
+            </a:gdLst>
+            <a:ahLst/>
+            <a:cxnLst>
+              <a:cxn ang="0">
+                <a:pos x="connsiteX0" y="connsiteY0"/>
+              </a:cxn>
+              <a:cxn ang="0">
+                <a:pos x="connsiteX1" y="connsiteY1"/>
+              </a:cxn>
+              <a:cxn ang="0">
+                <a:pos x="connsiteX2" y="connsiteY2"/>
+              </a:cxn>
+            </a:cxnLst>
+            <a:rect l="l" t="t" r="r" b="b"/>
+            <a:pathLst>
+              <a:path w="1371600" h="790575">
+                <a:moveTo>
+                  <a:pt x="1371600" y="0"/>
+                </a:moveTo>
+                <a:cubicBezTo>
+                  <a:pt x="1114425" y="48419"/>
+                  <a:pt x="857250" y="96838"/>
+                  <a:pt x="628650" y="228600"/>
+                </a:cubicBezTo>
+                <a:cubicBezTo>
+                  <a:pt x="400050" y="360363"/>
+                  <a:pt x="200025" y="575469"/>
+                  <a:pt x="0" y="790575"/>
+                </a:cubicBezTo>
+              </a:path>
+            </a:pathLst>
+          </a:custGeom>
+          <a:noFill/>
+          <a:ln w="57150">
+            <a:solidFill>
+              <a:srgbClr val="37ABC8"/>
+            </a:solidFill>
+            <a:headEnd type="none" w="med" len="med"/>
+            <a:tailEnd type="arrow" w="med" len="med"/>
+          </a:ln>
+        </p:spPr>
+        <p:style>
+          <a:lnRef idx="2">
+            <a:schemeClr val="accent1">
+              <a:shade val="15000"/>
+            </a:schemeClr>
+          </a:lnRef>
+          <a:fillRef idx="1">
+            <a:schemeClr val="accent1"/>
+          </a:fillRef>
+          <a:effectRef idx="0">
+            <a:schemeClr val="accent1"/>
+          </a:effectRef>
+          <a:fontRef idx="minor">
+            <a:schemeClr val="lt1"/>
+          </a:fontRef>
+        </p:style>
+        <p:txBody>
+          <a:bodyPr rtlCol="0" anchor="ctr"/>
+          <a:lstStyle/>
+          <a:p>
+            <a:pPr algn="ctr"/>
+            <a:endParaRPr lang="en-US"/>
+          </a:p>
+        </p:txBody>
+      </p:sp>
+      <p:sp>
+        <p:nvSpPr>
+          <p:cNvPr id="19" name="TextBox 18">
+            <a:extLst>
+              <a:ext uri="{FF2B5EF4-FFF2-40B4-BE49-F238E27FC236}">
+                <a16:creationId xmlns:a16="http://schemas.microsoft.com/office/drawing/2014/main" id="{DF8F83F6-4CC2-C679-7CEB-81CAC7D81EE5}"/>
+              </a:ext>
+            </a:extLst>
+          </p:cNvPr>
+          <p:cNvSpPr txBox="1"/>
+          <p:nvPr/>
+        </p:nvSpPr>
+        <p:spPr>
+          <a:xfrm>
+            <a:off x="2219037" y="2140892"/>
+            <a:ext cx="1353782" cy="461665"/>
+          </a:xfrm>
+          <a:prstGeom prst="rect">
+            <a:avLst/>
+          </a:prstGeom>
+          <a:noFill/>
+        </p:spPr>
+        <p:txBody>
+          <a:bodyPr wrap="square" rtlCol="0">
+            <a:spAutoFit/>
+          </a:bodyPr>
+          <a:lstStyle/>
+          <a:p>
+            <a:r>
+              <a:rPr lang="en-US" sz="2400" dirty="0">
+                <a:solidFill>
+                  <a:srgbClr val="37ABC8"/>
+                </a:solidFill>
+              </a:rPr>
+              <a:t>radius 1</a:t>
+            </a:r>
+          </a:p>
+        </p:txBody>
+      </p:sp>
+      <p:sp>
+        <p:nvSpPr>
+          <p:cNvPr id="20" name="Freeform: Shape 19">
+            <a:extLst>
+              <a:ext uri="{FF2B5EF4-FFF2-40B4-BE49-F238E27FC236}">
+                <a16:creationId xmlns:a16="http://schemas.microsoft.com/office/drawing/2014/main" id="{94DE9ADD-4F47-72D8-89E6-16B8E6632304}"/>
+              </a:ext>
+            </a:extLst>
+          </p:cNvPr>
+          <p:cNvSpPr/>
+          <p:nvPr/>
+        </p:nvSpPr>
+        <p:spPr>
+          <a:xfrm>
+            <a:off x="6885432" y="1247776"/>
+            <a:ext cx="1096518" cy="461666"/>
+          </a:xfrm>
+          <a:custGeom>
+            <a:avLst/>
+            <a:gdLst>
+              <a:gd name="connsiteX0" fmla="*/ 1371600 w 1371600"/>
+              <a:gd name="connsiteY0" fmla="*/ 0 h 790575"/>
+              <a:gd name="connsiteX1" fmla="*/ 628650 w 1371600"/>
+              <a:gd name="connsiteY1" fmla="*/ 228600 h 790575"/>
+              <a:gd name="connsiteX2" fmla="*/ 0 w 1371600"/>
+              <a:gd name="connsiteY2" fmla="*/ 790575 h 790575"/>
+            </a:gdLst>
+            <a:ahLst/>
+            <a:cxnLst>
+              <a:cxn ang="0">
+                <a:pos x="connsiteX0" y="connsiteY0"/>
+              </a:cxn>
+              <a:cxn ang="0">
+                <a:pos x="connsiteX1" y="connsiteY1"/>
+              </a:cxn>
+              <a:cxn ang="0">
+                <a:pos x="connsiteX2" y="connsiteY2"/>
+              </a:cxn>
+            </a:cxnLst>
+            <a:rect l="l" t="t" r="r" b="b"/>
+            <a:pathLst>
+              <a:path w="1371600" h="790575">
+                <a:moveTo>
+                  <a:pt x="1371600" y="0"/>
+                </a:moveTo>
+                <a:cubicBezTo>
+                  <a:pt x="1114425" y="48419"/>
+                  <a:pt x="857250" y="96838"/>
+                  <a:pt x="628650" y="228600"/>
+                </a:cubicBezTo>
+                <a:cubicBezTo>
+                  <a:pt x="400050" y="360363"/>
+                  <a:pt x="200025" y="575469"/>
+                  <a:pt x="0" y="790575"/>
+                </a:cubicBezTo>
+              </a:path>
+            </a:pathLst>
+          </a:custGeom>
+          <a:noFill/>
+          <a:ln w="57150">
+            <a:solidFill>
+              <a:srgbClr val="5AA02C"/>
+            </a:solidFill>
+            <a:headEnd type="none" w="med" len="med"/>
+            <a:tailEnd type="arrow" w="med" len="med"/>
+          </a:ln>
+        </p:spPr>
+        <p:style>
+          <a:lnRef idx="2">
+            <a:schemeClr val="accent1">
+              <a:shade val="15000"/>
+            </a:schemeClr>
+          </a:lnRef>
+          <a:fillRef idx="1">
+            <a:schemeClr val="accent1"/>
+          </a:fillRef>
+          <a:effectRef idx="0">
+            <a:schemeClr val="accent1"/>
+          </a:effectRef>
+          <a:fontRef idx="minor">
+            <a:schemeClr val="lt1"/>
+          </a:fontRef>
+        </p:style>
+        <p:txBody>
+          <a:bodyPr rtlCol="0" anchor="ctr"/>
+          <a:lstStyle/>
+          <a:p>
+            <a:pPr algn="ctr"/>
+            <a:endParaRPr lang="en-US"/>
+          </a:p>
+        </p:txBody>
+      </p:sp>
+    </p:spTree>
+    <p:extLst>
+      <p:ext uri="{BB962C8B-B14F-4D97-AF65-F5344CB8AC3E}">
+        <p14:creationId xmlns:p14="http://schemas.microsoft.com/office/powerpoint/2010/main" val="41280229"/>
+      </p:ext>
+    </p:extLst>
+  </p:cSld>
+  <p:clrMapOvr>
+    <a:masterClrMapping/>
+  </p:clrMapOvr>
+  <mc:AlternateContent xmlns:mc="http://schemas.openxmlformats.org/markup-compatibility/2006">
+    <mc:Choice xmlns:p14="http://schemas.microsoft.com/office/powerpoint/2010/main" Requires="p14">
+      <p:transition spd="med" p14:dur="700">
+        <p:fade/>
+      </p:transition>
+    </mc:Choice>
+    <mc:Fallback>
+      <p:transition spd="med">
+        <p:fade/>
+      </p:transition>
+    </mc:Fallback>
+  </mc:AlternateContent>
+</p:sld>
+</file>
+
+<file path=ppt/slides/slide21.xml><?xml version="1.0" encoding="utf-8"?>
 <p:sld xmlns:a="http://schemas.openxmlformats.org/drawingml/2006/main" xmlns:r="http://schemas.openxmlformats.org/officeDocument/2006/relationships" xmlns:p="http://schemas.openxmlformats.org/presentationml/2006/main">
   <p:cSld>
     <p:spTree>
@@ -13027,7 +14134,7 @@
 </p:sld>
 </file>
 
-<file path=ppt/slides/slide21.xml><?xml version="1.0" encoding="utf-8"?>
+<file path=ppt/slides/slide22.xml><?xml version="1.0" encoding="utf-8"?>
 <p:sld xmlns:a="http://schemas.openxmlformats.org/drawingml/2006/main" xmlns:r="http://schemas.openxmlformats.org/officeDocument/2006/relationships" xmlns:p="http://schemas.openxmlformats.org/presentationml/2006/main">
   <p:cSld>
     <p:spTree>
@@ -13626,7 +14733,7 @@
 </p:sld>
 </file>
 
-<file path=ppt/slides/slide22.xml><?xml version="1.0" encoding="utf-8"?>
+<file path=ppt/slides/slide23.xml><?xml version="1.0" encoding="utf-8"?>
 <p:sld xmlns:a="http://schemas.openxmlformats.org/drawingml/2006/main" xmlns:r="http://schemas.openxmlformats.org/officeDocument/2006/relationships" xmlns:p="http://schemas.openxmlformats.org/presentationml/2006/main">
   <p:cSld>
     <p:spTree>
@@ -15278,7 +16385,7 @@
 </p:sld>
 </file>
 
-<file path=ppt/slides/slide23.xml><?xml version="1.0" encoding="utf-8"?>
+<file path=ppt/slides/slide24.xml><?xml version="1.0" encoding="utf-8"?>
 <p:sld xmlns:a="http://schemas.openxmlformats.org/drawingml/2006/main" xmlns:r="http://schemas.openxmlformats.org/officeDocument/2006/relationships" xmlns:p="http://schemas.openxmlformats.org/presentationml/2006/main">
   <p:cSld>
     <p:spTree>
@@ -16348,7 +17455,7 @@
 </p:sld>
 </file>
 
-<file path=ppt/slides/slide24.xml><?xml version="1.0" encoding="utf-8"?>
+<file path=ppt/slides/slide25.xml><?xml version="1.0" encoding="utf-8"?>
 <p:sld xmlns:a="http://schemas.openxmlformats.org/drawingml/2006/main" xmlns:r="http://schemas.openxmlformats.org/officeDocument/2006/relationships" xmlns:p="http://schemas.openxmlformats.org/presentationml/2006/main">
   <p:cSld>
     <p:spTree>
@@ -18096,7 +19203,7 @@
 </p:sld>
 </file>
 
-<file path=ppt/slides/slide25.xml><?xml version="1.0" encoding="utf-8"?>
+<file path=ppt/slides/slide26.xml><?xml version="1.0" encoding="utf-8"?>
 <p:sld xmlns:a="http://schemas.openxmlformats.org/drawingml/2006/main" xmlns:r="http://schemas.openxmlformats.org/officeDocument/2006/relationships" xmlns:p="http://schemas.openxmlformats.org/presentationml/2006/main">
   <p:cSld>
     <p:spTree>
@@ -18189,7 +19296,7 @@
 </p:sld>
 </file>
 
-<file path=ppt/slides/slide26.xml><?xml version="1.0" encoding="utf-8"?>
+<file path=ppt/slides/slide27.xml><?xml version="1.0" encoding="utf-8"?>
 <p:sld xmlns:a="http://schemas.openxmlformats.org/drawingml/2006/main" xmlns:r="http://schemas.openxmlformats.org/officeDocument/2006/relationships" xmlns:p="http://schemas.openxmlformats.org/presentationml/2006/main">
   <p:cSld>
     <p:spTree>

</xml_diff>

<commit_message>
added small dims of pi plot
</commit_message>
<xml_diff>
--- a/slides_x_mas_2023.pptx
+++ b/slides_x_mas_2023.pptx
@@ -15,23 +15,24 @@
     <p:sldId id="266" r:id="rId9"/>
     <p:sldId id="267" r:id="rId10"/>
     <p:sldId id="287" r:id="rId11"/>
-    <p:sldId id="286" r:id="rId12"/>
-    <p:sldId id="270" r:id="rId13"/>
-    <p:sldId id="268" r:id="rId14"/>
-    <p:sldId id="272" r:id="rId15"/>
-    <p:sldId id="273" r:id="rId16"/>
-    <p:sldId id="269" r:id="rId17"/>
-    <p:sldId id="274" r:id="rId18"/>
-    <p:sldId id="275" r:id="rId19"/>
-    <p:sldId id="276" r:id="rId20"/>
-    <p:sldId id="277" r:id="rId21"/>
-    <p:sldId id="279" r:id="rId22"/>
-    <p:sldId id="278" r:id="rId23"/>
-    <p:sldId id="280" r:id="rId24"/>
-    <p:sldId id="281" r:id="rId25"/>
-    <p:sldId id="282" r:id="rId26"/>
-    <p:sldId id="283" r:id="rId27"/>
-    <p:sldId id="285" r:id="rId28"/>
+    <p:sldId id="288" r:id="rId12"/>
+    <p:sldId id="286" r:id="rId13"/>
+    <p:sldId id="270" r:id="rId14"/>
+    <p:sldId id="268" r:id="rId15"/>
+    <p:sldId id="272" r:id="rId16"/>
+    <p:sldId id="273" r:id="rId17"/>
+    <p:sldId id="269" r:id="rId18"/>
+    <p:sldId id="274" r:id="rId19"/>
+    <p:sldId id="275" r:id="rId20"/>
+    <p:sldId id="276" r:id="rId21"/>
+    <p:sldId id="277" r:id="rId22"/>
+    <p:sldId id="279" r:id="rId23"/>
+    <p:sldId id="278" r:id="rId24"/>
+    <p:sldId id="280" r:id="rId25"/>
+    <p:sldId id="281" r:id="rId26"/>
+    <p:sldId id="282" r:id="rId27"/>
+    <p:sldId id="283" r:id="rId28"/>
+    <p:sldId id="285" r:id="rId29"/>
   </p:sldIdLst>
   <p:sldSz cx="12192000" cy="6858000"/>
   <p:notesSz cx="6858000" cy="9144000"/>
@@ -153,6 +154,7 @@
         <p14:section name="Unusual" id="{42EB159F-85B8-41F3-970F-2D80DA23F3BA}">
           <p14:sldIdLst>
             <p14:sldId id="287"/>
+            <p14:sldId id="288"/>
             <p14:sldId id="286"/>
           </p14:sldIdLst>
         </p14:section>
@@ -4679,6 +4681,152 @@
 </file>
 
 <file path=ppt/slides/slide11.xml><?xml version="1.0" encoding="utf-8"?>
+<p:sld xmlns:a="http://schemas.openxmlformats.org/drawingml/2006/main" xmlns:r="http://schemas.openxmlformats.org/officeDocument/2006/relationships" xmlns:p="http://schemas.openxmlformats.org/presentationml/2006/main">
+  <p:cSld>
+    <p:spTree>
+      <p:nvGrpSpPr>
+        <p:cNvPr id="1" name=""/>
+        <p:cNvGrpSpPr/>
+        <p:nvPr/>
+      </p:nvGrpSpPr>
+      <p:grpSpPr>
+        <a:xfrm>
+          <a:off x="0" y="0"/>
+          <a:ext cx="0" cy="0"/>
+          <a:chOff x="0" y="0"/>
+          <a:chExt cx="0" cy="0"/>
+        </a:xfrm>
+      </p:grpSpPr>
+      <mc:AlternateContent xmlns:mc="http://schemas.openxmlformats.org/markup-compatibility/2006">
+        <mc:Choice xmlns:a14="http://schemas.microsoft.com/office/drawing/2010/main" Requires="a14">
+          <p:sp>
+            <p:nvSpPr>
+              <p:cNvPr id="4" name="Title 3">
+                <a:extLst>
+                  <a:ext uri="{FF2B5EF4-FFF2-40B4-BE49-F238E27FC236}">
+                    <a16:creationId xmlns:a16="http://schemas.microsoft.com/office/drawing/2014/main" id="{04239906-D956-FC4B-B46D-187F39E79E51}"/>
+                  </a:ext>
+                </a:extLst>
+              </p:cNvPr>
+              <p:cNvSpPr>
+                <a:spLocks noGrp="1"/>
+              </p:cNvSpPr>
+              <p:nvPr>
+                <p:ph type="title"/>
+              </p:nvPr>
+            </p:nvSpPr>
+            <p:spPr/>
+            <p:txBody>
+              <a:bodyPr/>
+              <a:lstStyle/>
+              <a:p>
+                <a:r>
+                  <a:rPr lang="en-US" dirty="0"/>
+                  <a:t>Higher dimensions of </a:t>
+                </a:r>
+                <a14:m>
+                  <m:oMath xmlns:m="http://schemas.openxmlformats.org/officeDocument/2006/math">
+                    <m:r>
+                      <a:rPr lang="en-US" b="0" i="1" smtClean="0">
+                        <a:latin typeface="Cambria Math" panose="02040503050406030204" pitchFamily="18" charset="0"/>
+                      </a:rPr>
+                      <m:t>𝜋</m:t>
+                    </m:r>
+                  </m:oMath>
+                </a14:m>
+                <a:endParaRPr lang="en-US" dirty="0"/>
+              </a:p>
+            </p:txBody>
+          </p:sp>
+        </mc:Choice>
+        <mc:Fallback>
+          <p:sp>
+            <p:nvSpPr>
+              <p:cNvPr id="4" name="Title 3">
+                <a:extLst>
+                  <a:ext uri="{FF2B5EF4-FFF2-40B4-BE49-F238E27FC236}">
+                    <a16:creationId xmlns:a16="http://schemas.microsoft.com/office/drawing/2014/main" id="{04239906-D956-FC4B-B46D-187F39E79E51}"/>
+                  </a:ext>
+                </a:extLst>
+              </p:cNvPr>
+              <p:cNvSpPr>
+                <a:spLocks noGrp="1" noRot="1" noChangeAspect="1" noMove="1" noResize="1" noEditPoints="1" noAdjustHandles="1" noChangeArrowheads="1" noChangeShapeType="1" noTextEdit="1"/>
+              </p:cNvSpPr>
+              <p:nvPr>
+                <p:ph type="title"/>
+              </p:nvPr>
+            </p:nvSpPr>
+            <p:spPr>
+              <a:blipFill>
+                <a:blip r:embed="rId2"/>
+                <a:stretch>
+                  <a:fillRect l="-2377"/>
+                </a:stretch>
+              </a:blipFill>
+            </p:spPr>
+            <p:txBody>
+              <a:bodyPr/>
+              <a:lstStyle/>
+              <a:p>
+                <a:r>
+                  <a:rPr lang="en-US">
+                    <a:noFill/>
+                  </a:rPr>
+                  <a:t> </a:t>
+                </a:r>
+              </a:p>
+            </p:txBody>
+          </p:sp>
+        </mc:Fallback>
+      </mc:AlternateContent>
+      <p:pic>
+        <p:nvPicPr>
+          <p:cNvPr id="7" name="Content Placeholder 6">
+            <a:extLst>
+              <a:ext uri="{FF2B5EF4-FFF2-40B4-BE49-F238E27FC236}">
+                <a16:creationId xmlns:a16="http://schemas.microsoft.com/office/drawing/2014/main" id="{0896E48E-777C-2CF7-E005-279BBB2B862B}"/>
+              </a:ext>
+            </a:extLst>
+          </p:cNvPr>
+          <p:cNvPicPr>
+            <a:picLocks noGrp="1" noChangeAspect="1"/>
+          </p:cNvPicPr>
+          <p:nvPr>
+            <p:ph idx="1"/>
+          </p:nvPr>
+        </p:nvPicPr>
+        <p:blipFill>
+          <a:blip r:embed="rId3">
+            <a:extLst>
+              <a:ext uri="{28A0092B-C50C-407E-A947-70E740481C1C}">
+                <a14:useLocalDpi xmlns:a14="http://schemas.microsoft.com/office/drawing/2010/main" val="0"/>
+              </a:ext>
+            </a:extLst>
+          </a:blip>
+          <a:srcRect/>
+          <a:stretch/>
+        </p:blipFill>
+        <p:spPr>
+          <a:xfrm>
+            <a:off x="2924175" y="1755593"/>
+            <a:ext cx="6343650" cy="4491402"/>
+          </a:xfrm>
+        </p:spPr>
+      </p:pic>
+    </p:spTree>
+    <p:extLst>
+      <p:ext uri="{BB962C8B-B14F-4D97-AF65-F5344CB8AC3E}">
+        <p14:creationId xmlns:p14="http://schemas.microsoft.com/office/powerpoint/2010/main" val="2058071400"/>
+      </p:ext>
+    </p:extLst>
+  </p:cSld>
+  <p:clrMapOvr>
+    <a:masterClrMapping/>
+  </p:clrMapOvr>
+</p:sld>
+</file>
+
+<file path=ppt/slides/slide12.xml><?xml version="1.0" encoding="utf-8"?>
 <p:sld xmlns:a="http://schemas.openxmlformats.org/drawingml/2006/main" xmlns:r="http://schemas.openxmlformats.org/officeDocument/2006/relationships" xmlns:p="http://schemas.openxmlformats.org/presentationml/2006/main">
   <p:cSld>
     <p:spTree>
@@ -6173,7 +6321,7 @@
 </p:sld>
 </file>
 
-<file path=ppt/slides/slide12.xml><?xml version="1.0" encoding="utf-8"?>
+<file path=ppt/slides/slide13.xml><?xml version="1.0" encoding="utf-8"?>
 <p:sld xmlns:a="http://schemas.openxmlformats.org/drawingml/2006/main" xmlns:r="http://schemas.openxmlformats.org/officeDocument/2006/relationships" xmlns:p="http://schemas.openxmlformats.org/presentationml/2006/main" show="0">
   <p:cSld>
     <p:spTree>
@@ -7243,7 +7391,7 @@
 </p:sld>
 </file>
 
-<file path=ppt/slides/slide13.xml><?xml version="1.0" encoding="utf-8"?>
+<file path=ppt/slides/slide14.xml><?xml version="1.0" encoding="utf-8"?>
 <p:sld xmlns:a="http://schemas.openxmlformats.org/drawingml/2006/main" xmlns:r="http://schemas.openxmlformats.org/officeDocument/2006/relationships" xmlns:p="http://schemas.openxmlformats.org/presentationml/2006/main">
   <p:cSld>
     <p:spTree>
@@ -7437,7 +7585,7 @@
 </p:sld>
 </file>
 
-<file path=ppt/slides/slide14.xml><?xml version="1.0" encoding="utf-8"?>
+<file path=ppt/slides/slide15.xml><?xml version="1.0" encoding="utf-8"?>
 <p:sld xmlns:a="http://schemas.openxmlformats.org/drawingml/2006/main" xmlns:r="http://schemas.openxmlformats.org/officeDocument/2006/relationships" xmlns:p="http://schemas.openxmlformats.org/presentationml/2006/main">
   <p:cSld>
     <p:spTree>
@@ -8076,7 +8224,7 @@
 </p:sld>
 </file>
 
-<file path=ppt/slides/slide15.xml><?xml version="1.0" encoding="utf-8"?>
+<file path=ppt/slides/slide16.xml><?xml version="1.0" encoding="utf-8"?>
 <p:sld xmlns:a="http://schemas.openxmlformats.org/drawingml/2006/main" xmlns:r="http://schemas.openxmlformats.org/officeDocument/2006/relationships" xmlns:p="http://schemas.openxmlformats.org/presentationml/2006/main">
   <p:cSld>
     <p:spTree>
@@ -9987,7 +10135,7 @@
 </p:sld>
 </file>
 
-<file path=ppt/slides/slide16.xml><?xml version="1.0" encoding="utf-8"?>
+<file path=ppt/slides/slide17.xml><?xml version="1.0" encoding="utf-8"?>
 <p:sld xmlns:a="http://schemas.openxmlformats.org/drawingml/2006/main" xmlns:r="http://schemas.openxmlformats.org/officeDocument/2006/relationships" xmlns:p="http://schemas.openxmlformats.org/presentationml/2006/main">
   <p:cSld>
     <p:spTree>
@@ -11896,7 +12044,7 @@
 </p:sld>
 </file>
 
-<file path=ppt/slides/slide17.xml><?xml version="1.0" encoding="utf-8"?>
+<file path=ppt/slides/slide18.xml><?xml version="1.0" encoding="utf-8"?>
 <p:sld xmlns:a="http://schemas.openxmlformats.org/drawingml/2006/main" xmlns:r="http://schemas.openxmlformats.org/officeDocument/2006/relationships" xmlns:p="http://schemas.openxmlformats.org/presentationml/2006/main" show="0">
   <p:cSld>
     <p:spTree>
@@ -11989,7 +12137,7 @@
 </p:sld>
 </file>
 
-<file path=ppt/slides/slide18.xml><?xml version="1.0" encoding="utf-8"?>
+<file path=ppt/slides/slide19.xml><?xml version="1.0" encoding="utf-8"?>
 <p:sld xmlns:a="http://schemas.openxmlformats.org/drawingml/2006/main" xmlns:r="http://schemas.openxmlformats.org/officeDocument/2006/relationships" xmlns:p="http://schemas.openxmlformats.org/presentationml/2006/main">
   <p:cSld>
     <p:spTree>
@@ -12382,7 +12530,176 @@
 </p:sld>
 </file>
 
-<file path=ppt/slides/slide19.xml><?xml version="1.0" encoding="utf-8"?>
+<file path=ppt/slides/slide2.xml><?xml version="1.0" encoding="utf-8"?>
+<p:sld xmlns:a="http://schemas.openxmlformats.org/drawingml/2006/main" xmlns:r="http://schemas.openxmlformats.org/officeDocument/2006/relationships" xmlns:p="http://schemas.openxmlformats.org/presentationml/2006/main">
+  <p:cSld>
+    <p:spTree>
+      <p:nvGrpSpPr>
+        <p:cNvPr id="1" name=""/>
+        <p:cNvGrpSpPr/>
+        <p:nvPr/>
+      </p:nvGrpSpPr>
+      <p:grpSpPr>
+        <a:xfrm>
+          <a:off x="0" y="0"/>
+          <a:ext cx="0" cy="0"/>
+          <a:chOff x="0" y="0"/>
+          <a:chExt cx="0" cy="0"/>
+        </a:xfrm>
+      </p:grpSpPr>
+      <p:sp>
+        <p:nvSpPr>
+          <p:cNvPr id="2" name="Title 1">
+            <a:extLst>
+              <a:ext uri="{FF2B5EF4-FFF2-40B4-BE49-F238E27FC236}">
+                <a16:creationId xmlns:a16="http://schemas.microsoft.com/office/drawing/2014/main" id="{2DBCC9A2-D9E4-867F-A8AD-CF8A895A41F0}"/>
+              </a:ext>
+            </a:extLst>
+          </p:cNvPr>
+          <p:cNvSpPr>
+            <a:spLocks noGrp="1"/>
+          </p:cNvSpPr>
+          <p:nvPr>
+            <p:ph type="title"/>
+          </p:nvPr>
+        </p:nvSpPr>
+        <p:spPr/>
+        <p:txBody>
+          <a:bodyPr/>
+          <a:lstStyle/>
+          <a:p>
+            <a:r>
+              <a:rPr lang="en-US" dirty="0"/>
+              <a:t>Curse of dimensionality</a:t>
+            </a:r>
+          </a:p>
+        </p:txBody>
+      </p:sp>
+      <p:grpSp>
+        <p:nvGrpSpPr>
+          <p:cNvPr id="15" name="Group 14">
+            <a:extLst>
+              <a:ext uri="{FF2B5EF4-FFF2-40B4-BE49-F238E27FC236}">
+                <a16:creationId xmlns:a16="http://schemas.microsoft.com/office/drawing/2014/main" id="{6F45F9D5-7FBE-0698-E932-F30949803EF4}"/>
+              </a:ext>
+            </a:extLst>
+          </p:cNvPr>
+          <p:cNvGrpSpPr/>
+          <p:nvPr/>
+        </p:nvGrpSpPr>
+        <p:grpSpPr>
+          <a:xfrm>
+            <a:off x="91440" y="1690688"/>
+            <a:ext cx="12009119" cy="4038600"/>
+            <a:chOff x="91441" y="1673126"/>
+            <a:chExt cx="12009119" cy="4038600"/>
+          </a:xfrm>
+        </p:grpSpPr>
+        <p:pic>
+          <p:nvPicPr>
+            <p:cNvPr id="9" name="Picture 8">
+              <a:extLst>
+                <a:ext uri="{FF2B5EF4-FFF2-40B4-BE49-F238E27FC236}">
+                  <a16:creationId xmlns:a16="http://schemas.microsoft.com/office/drawing/2014/main" id="{D7E0FFB0-0C9D-FDC7-1C0A-C47C6DE37009}"/>
+                </a:ext>
+              </a:extLst>
+            </p:cNvPr>
+            <p:cNvPicPr>
+              <a:picLocks noChangeAspect="1"/>
+            </p:cNvPicPr>
+            <p:nvPr/>
+          </p:nvPicPr>
+          <p:blipFill>
+            <a:blip r:embed="rId2"/>
+            <a:stretch>
+              <a:fillRect/>
+            </a:stretch>
+          </p:blipFill>
+          <p:spPr>
+            <a:xfrm>
+              <a:off x="8195310" y="1673126"/>
+              <a:ext cx="3905250" cy="4038600"/>
+            </a:xfrm>
+            <a:prstGeom prst="rect">
+              <a:avLst/>
+            </a:prstGeom>
+          </p:spPr>
+        </p:pic>
+        <p:pic>
+          <p:nvPicPr>
+            <p:cNvPr id="11" name="Picture 10">
+              <a:extLst>
+                <a:ext uri="{FF2B5EF4-FFF2-40B4-BE49-F238E27FC236}">
+                  <a16:creationId xmlns:a16="http://schemas.microsoft.com/office/drawing/2014/main" id="{9B74F283-FE08-257B-9B09-00584EFACC46}"/>
+                </a:ext>
+              </a:extLst>
+            </p:cNvPr>
+            <p:cNvPicPr>
+              <a:picLocks noChangeAspect="1"/>
+            </p:cNvPicPr>
+            <p:nvPr/>
+          </p:nvPicPr>
+          <p:blipFill>
+            <a:blip r:embed="rId3"/>
+            <a:stretch>
+              <a:fillRect/>
+            </a:stretch>
+          </p:blipFill>
+          <p:spPr>
+            <a:xfrm>
+              <a:off x="4143376" y="1673126"/>
+              <a:ext cx="3905250" cy="4038600"/>
+            </a:xfrm>
+            <a:prstGeom prst="rect">
+              <a:avLst/>
+            </a:prstGeom>
+          </p:spPr>
+        </p:pic>
+        <p:pic>
+          <p:nvPicPr>
+            <p:cNvPr id="13" name="Picture 12">
+              <a:extLst>
+                <a:ext uri="{FF2B5EF4-FFF2-40B4-BE49-F238E27FC236}">
+                  <a16:creationId xmlns:a16="http://schemas.microsoft.com/office/drawing/2014/main" id="{BCFC0D4E-BB56-639A-A579-EF1AF2A2D2CF}"/>
+                </a:ext>
+              </a:extLst>
+            </p:cNvPr>
+            <p:cNvPicPr>
+              <a:picLocks noChangeAspect="1"/>
+            </p:cNvPicPr>
+            <p:nvPr/>
+          </p:nvPicPr>
+          <p:blipFill>
+            <a:blip r:embed="rId4"/>
+            <a:stretch>
+              <a:fillRect/>
+            </a:stretch>
+          </p:blipFill>
+          <p:spPr>
+            <a:xfrm>
+              <a:off x="91441" y="1673126"/>
+              <a:ext cx="3905250" cy="4038600"/>
+            </a:xfrm>
+            <a:prstGeom prst="rect">
+              <a:avLst/>
+            </a:prstGeom>
+          </p:spPr>
+        </p:pic>
+      </p:grpSp>
+    </p:spTree>
+    <p:extLst>
+      <p:ext uri="{BB962C8B-B14F-4D97-AF65-F5344CB8AC3E}">
+        <p14:creationId xmlns:p14="http://schemas.microsoft.com/office/powerpoint/2010/main" val="3037618925"/>
+      </p:ext>
+    </p:extLst>
+  </p:cSld>
+  <p:clrMapOvr>
+    <a:masterClrMapping/>
+  </p:clrMapOvr>
+</p:sld>
+</file>
+
+<file path=ppt/slides/slide20.xml><?xml version="1.0" encoding="utf-8"?>
 <p:sld xmlns:a="http://schemas.openxmlformats.org/drawingml/2006/main" xmlns:r="http://schemas.openxmlformats.org/officeDocument/2006/relationships" xmlns:p="http://schemas.openxmlformats.org/presentationml/2006/main">
   <p:cSld>
     <p:spTree>
@@ -12874,176 +13191,7 @@
 </p:sld>
 </file>
 
-<file path=ppt/slides/slide2.xml><?xml version="1.0" encoding="utf-8"?>
-<p:sld xmlns:a="http://schemas.openxmlformats.org/drawingml/2006/main" xmlns:r="http://schemas.openxmlformats.org/officeDocument/2006/relationships" xmlns:p="http://schemas.openxmlformats.org/presentationml/2006/main">
-  <p:cSld>
-    <p:spTree>
-      <p:nvGrpSpPr>
-        <p:cNvPr id="1" name=""/>
-        <p:cNvGrpSpPr/>
-        <p:nvPr/>
-      </p:nvGrpSpPr>
-      <p:grpSpPr>
-        <a:xfrm>
-          <a:off x="0" y="0"/>
-          <a:ext cx="0" cy="0"/>
-          <a:chOff x="0" y="0"/>
-          <a:chExt cx="0" cy="0"/>
-        </a:xfrm>
-      </p:grpSpPr>
-      <p:sp>
-        <p:nvSpPr>
-          <p:cNvPr id="2" name="Title 1">
-            <a:extLst>
-              <a:ext uri="{FF2B5EF4-FFF2-40B4-BE49-F238E27FC236}">
-                <a16:creationId xmlns:a16="http://schemas.microsoft.com/office/drawing/2014/main" id="{2DBCC9A2-D9E4-867F-A8AD-CF8A895A41F0}"/>
-              </a:ext>
-            </a:extLst>
-          </p:cNvPr>
-          <p:cNvSpPr>
-            <a:spLocks noGrp="1"/>
-          </p:cNvSpPr>
-          <p:nvPr>
-            <p:ph type="title"/>
-          </p:nvPr>
-        </p:nvSpPr>
-        <p:spPr/>
-        <p:txBody>
-          <a:bodyPr/>
-          <a:lstStyle/>
-          <a:p>
-            <a:r>
-              <a:rPr lang="en-US" dirty="0"/>
-              <a:t>Curse of dimensionality</a:t>
-            </a:r>
-          </a:p>
-        </p:txBody>
-      </p:sp>
-      <p:grpSp>
-        <p:nvGrpSpPr>
-          <p:cNvPr id="15" name="Group 14">
-            <a:extLst>
-              <a:ext uri="{FF2B5EF4-FFF2-40B4-BE49-F238E27FC236}">
-                <a16:creationId xmlns:a16="http://schemas.microsoft.com/office/drawing/2014/main" id="{6F45F9D5-7FBE-0698-E932-F30949803EF4}"/>
-              </a:ext>
-            </a:extLst>
-          </p:cNvPr>
-          <p:cNvGrpSpPr/>
-          <p:nvPr/>
-        </p:nvGrpSpPr>
-        <p:grpSpPr>
-          <a:xfrm>
-            <a:off x="91440" y="1690688"/>
-            <a:ext cx="12009119" cy="4038600"/>
-            <a:chOff x="91441" y="1673126"/>
-            <a:chExt cx="12009119" cy="4038600"/>
-          </a:xfrm>
-        </p:grpSpPr>
-        <p:pic>
-          <p:nvPicPr>
-            <p:cNvPr id="9" name="Picture 8">
-              <a:extLst>
-                <a:ext uri="{FF2B5EF4-FFF2-40B4-BE49-F238E27FC236}">
-                  <a16:creationId xmlns:a16="http://schemas.microsoft.com/office/drawing/2014/main" id="{D7E0FFB0-0C9D-FDC7-1C0A-C47C6DE37009}"/>
-                </a:ext>
-              </a:extLst>
-            </p:cNvPr>
-            <p:cNvPicPr>
-              <a:picLocks noChangeAspect="1"/>
-            </p:cNvPicPr>
-            <p:nvPr/>
-          </p:nvPicPr>
-          <p:blipFill>
-            <a:blip r:embed="rId2"/>
-            <a:stretch>
-              <a:fillRect/>
-            </a:stretch>
-          </p:blipFill>
-          <p:spPr>
-            <a:xfrm>
-              <a:off x="8195310" y="1673126"/>
-              <a:ext cx="3905250" cy="4038600"/>
-            </a:xfrm>
-            <a:prstGeom prst="rect">
-              <a:avLst/>
-            </a:prstGeom>
-          </p:spPr>
-        </p:pic>
-        <p:pic>
-          <p:nvPicPr>
-            <p:cNvPr id="11" name="Picture 10">
-              <a:extLst>
-                <a:ext uri="{FF2B5EF4-FFF2-40B4-BE49-F238E27FC236}">
-                  <a16:creationId xmlns:a16="http://schemas.microsoft.com/office/drawing/2014/main" id="{9B74F283-FE08-257B-9B09-00584EFACC46}"/>
-                </a:ext>
-              </a:extLst>
-            </p:cNvPr>
-            <p:cNvPicPr>
-              <a:picLocks noChangeAspect="1"/>
-            </p:cNvPicPr>
-            <p:nvPr/>
-          </p:nvPicPr>
-          <p:blipFill>
-            <a:blip r:embed="rId3"/>
-            <a:stretch>
-              <a:fillRect/>
-            </a:stretch>
-          </p:blipFill>
-          <p:spPr>
-            <a:xfrm>
-              <a:off x="4143376" y="1673126"/>
-              <a:ext cx="3905250" cy="4038600"/>
-            </a:xfrm>
-            <a:prstGeom prst="rect">
-              <a:avLst/>
-            </a:prstGeom>
-          </p:spPr>
-        </p:pic>
-        <p:pic>
-          <p:nvPicPr>
-            <p:cNvPr id="13" name="Picture 12">
-              <a:extLst>
-                <a:ext uri="{FF2B5EF4-FFF2-40B4-BE49-F238E27FC236}">
-                  <a16:creationId xmlns:a16="http://schemas.microsoft.com/office/drawing/2014/main" id="{BCFC0D4E-BB56-639A-A579-EF1AF2A2D2CF}"/>
-                </a:ext>
-              </a:extLst>
-            </p:cNvPr>
-            <p:cNvPicPr>
-              <a:picLocks noChangeAspect="1"/>
-            </p:cNvPicPr>
-            <p:nvPr/>
-          </p:nvPicPr>
-          <p:blipFill>
-            <a:blip r:embed="rId4"/>
-            <a:stretch>
-              <a:fillRect/>
-            </a:stretch>
-          </p:blipFill>
-          <p:spPr>
-            <a:xfrm>
-              <a:off x="91441" y="1673126"/>
-              <a:ext cx="3905250" cy="4038600"/>
-            </a:xfrm>
-            <a:prstGeom prst="rect">
-              <a:avLst/>
-            </a:prstGeom>
-          </p:spPr>
-        </p:pic>
-      </p:grpSp>
-    </p:spTree>
-    <p:extLst>
-      <p:ext uri="{BB962C8B-B14F-4D97-AF65-F5344CB8AC3E}">
-        <p14:creationId xmlns:p14="http://schemas.microsoft.com/office/powerpoint/2010/main" val="3037618925"/>
-      </p:ext>
-    </p:extLst>
-  </p:cSld>
-  <p:clrMapOvr>
-    <a:masterClrMapping/>
-  </p:clrMapOvr>
-</p:sld>
-</file>
-
-<file path=ppt/slides/slide20.xml><?xml version="1.0" encoding="utf-8"?>
+<file path=ppt/slides/slide21.xml><?xml version="1.0" encoding="utf-8"?>
 <p:sld xmlns:a="http://schemas.openxmlformats.org/drawingml/2006/main" xmlns:r="http://schemas.openxmlformats.org/officeDocument/2006/relationships" xmlns:p="http://schemas.openxmlformats.org/presentationml/2006/main">
   <p:cSld>
     <p:spTree>
@@ -13410,7 +13558,7 @@
 </p:sld>
 </file>
 
-<file path=ppt/slides/slide21.xml><?xml version="1.0" encoding="utf-8"?>
+<file path=ppt/slides/slide22.xml><?xml version="1.0" encoding="utf-8"?>
 <p:sld xmlns:a="http://schemas.openxmlformats.org/drawingml/2006/main" xmlns:r="http://schemas.openxmlformats.org/officeDocument/2006/relationships" xmlns:p="http://schemas.openxmlformats.org/presentationml/2006/main">
   <p:cSld>
     <p:spTree>
@@ -14134,7 +14282,7 @@
 </p:sld>
 </file>
 
-<file path=ppt/slides/slide22.xml><?xml version="1.0" encoding="utf-8"?>
+<file path=ppt/slides/slide23.xml><?xml version="1.0" encoding="utf-8"?>
 <p:sld xmlns:a="http://schemas.openxmlformats.org/drawingml/2006/main" xmlns:r="http://schemas.openxmlformats.org/officeDocument/2006/relationships" xmlns:p="http://schemas.openxmlformats.org/presentationml/2006/main">
   <p:cSld>
     <p:spTree>
@@ -14733,7 +14881,7 @@
 </p:sld>
 </file>
 
-<file path=ppt/slides/slide23.xml><?xml version="1.0" encoding="utf-8"?>
+<file path=ppt/slides/slide24.xml><?xml version="1.0" encoding="utf-8"?>
 <p:sld xmlns:a="http://schemas.openxmlformats.org/drawingml/2006/main" xmlns:r="http://schemas.openxmlformats.org/officeDocument/2006/relationships" xmlns:p="http://schemas.openxmlformats.org/presentationml/2006/main">
   <p:cSld>
     <p:spTree>
@@ -16385,7 +16533,7 @@
 </p:sld>
 </file>
 
-<file path=ppt/slides/slide24.xml><?xml version="1.0" encoding="utf-8"?>
+<file path=ppt/slides/slide25.xml><?xml version="1.0" encoding="utf-8"?>
 <p:sld xmlns:a="http://schemas.openxmlformats.org/drawingml/2006/main" xmlns:r="http://schemas.openxmlformats.org/officeDocument/2006/relationships" xmlns:p="http://schemas.openxmlformats.org/presentationml/2006/main">
   <p:cSld>
     <p:spTree>
@@ -17455,7 +17603,7 @@
 </p:sld>
 </file>
 
-<file path=ppt/slides/slide25.xml><?xml version="1.0" encoding="utf-8"?>
+<file path=ppt/slides/slide26.xml><?xml version="1.0" encoding="utf-8"?>
 <p:sld xmlns:a="http://schemas.openxmlformats.org/drawingml/2006/main" xmlns:r="http://schemas.openxmlformats.org/officeDocument/2006/relationships" xmlns:p="http://schemas.openxmlformats.org/presentationml/2006/main">
   <p:cSld>
     <p:spTree>
@@ -19203,7 +19351,7 @@
 </p:sld>
 </file>
 
-<file path=ppt/slides/slide26.xml><?xml version="1.0" encoding="utf-8"?>
+<file path=ppt/slides/slide27.xml><?xml version="1.0" encoding="utf-8"?>
 <p:sld xmlns:a="http://schemas.openxmlformats.org/drawingml/2006/main" xmlns:r="http://schemas.openxmlformats.org/officeDocument/2006/relationships" xmlns:p="http://schemas.openxmlformats.org/presentationml/2006/main">
   <p:cSld>
     <p:spTree>
@@ -19296,7 +19444,7 @@
 </p:sld>
 </file>
 
-<file path=ppt/slides/slide27.xml><?xml version="1.0" encoding="utf-8"?>
+<file path=ppt/slides/slide28.xml><?xml version="1.0" encoding="utf-8"?>
 <p:sld xmlns:a="http://schemas.openxmlformats.org/drawingml/2006/main" xmlns:r="http://schemas.openxmlformats.org/officeDocument/2006/relationships" xmlns:p="http://schemas.openxmlformats.org/presentationml/2006/main">
   <p:cSld>
     <p:spTree>

</xml_diff>

<commit_message>
added recursive formula for pi_n
</commit_message>
<xml_diff>
--- a/slides_x_mas_2023.pptx
+++ b/slides_x_mas_2023.pptx
@@ -5881,8 +5881,8 @@
             </p:nvSpPr>
             <p:spPr>
               <a:xfrm>
-                <a:off x="8360160" y="643185"/>
-                <a:ext cx="3004862" cy="769441"/>
+                <a:off x="7807710" y="231400"/>
+                <a:ext cx="4080284" cy="1364412"/>
               </a:xfrm>
               <a:prstGeom prst="rect">
                 <a:avLst/>
@@ -5914,7 +5914,7 @@
                             <a:rPr lang="en-US" sz="4400" b="1" i="1" smtClean="0">
                               <a:latin typeface="Cambria Math" panose="02040503050406030204" pitchFamily="18" charset="0"/>
                             </a:rPr>
-                            <m:t>𝓥</m:t>
+                            <m:t>𝝅</m:t>
                           </m:r>
                         </m:e>
                         <m:sub>
@@ -5931,6 +5931,44 @@
                           <a:latin typeface="Cambria Math" panose="02040503050406030204" pitchFamily="18" charset="0"/>
                         </a:rPr>
                         <m:t>=</m:t>
+                      </m:r>
+                      <m:f>
+                        <m:fPr>
+                          <m:ctrlPr>
+                            <a:rPr lang="en-US" sz="4400" b="1" i="1" smtClean="0">
+                              <a:latin typeface="Cambria Math" panose="02040503050406030204" pitchFamily="18" charset="0"/>
+                            </a:rPr>
+                          </m:ctrlPr>
+                        </m:fPr>
+                        <m:num>
+                          <m:r>
+                            <a:rPr lang="en-US" sz="4400" b="1" i="1" smtClean="0">
+                              <a:latin typeface="Cambria Math" panose="02040503050406030204" pitchFamily="18" charset="0"/>
+                            </a:rPr>
+                            <m:t>𝟐</m:t>
+                          </m:r>
+                          <m:r>
+                            <a:rPr lang="en-US" sz="4400" b="1" i="1" smtClean="0">
+                              <a:latin typeface="Cambria Math" panose="02040503050406030204" pitchFamily="18" charset="0"/>
+                            </a:rPr>
+                            <m:t>𝝅</m:t>
+                          </m:r>
+                        </m:num>
+                        <m:den>
+                          <m:r>
+                            <a:rPr lang="en-US" sz="4400" b="1" i="1" smtClean="0">
+                              <a:latin typeface="Cambria Math" panose="02040503050406030204" pitchFamily="18" charset="0"/>
+                            </a:rPr>
+                            <m:t>𝒏</m:t>
+                          </m:r>
+                        </m:den>
+                      </m:f>
+                      <m:r>
+                        <a:rPr lang="en-US" sz="4400" b="1" i="1" smtClean="0">
+                          <a:latin typeface="Cambria Math" panose="02040503050406030204" pitchFamily="18" charset="0"/>
+                          <a:ea typeface="Cambria Math" panose="02040503050406030204" pitchFamily="18" charset="0"/>
+                        </a:rPr>
+                        <m:t>∙</m:t>
                       </m:r>
                       <m:sSub>
                         <m:sSubPr>
@@ -5955,33 +5993,20 @@
                             </a:rPr>
                             <m:t>𝒏</m:t>
                           </m:r>
-                        </m:sub>
-                      </m:sSub>
-                      <m:sSup>
-                        <m:sSupPr>
-                          <m:ctrlPr>
-                            <a:rPr lang="en-US" sz="4400" b="1" i="1" smtClean="0">
-                              <a:latin typeface="Cambria Math" panose="02040503050406030204" pitchFamily="18" charset="0"/>
-                            </a:rPr>
-                          </m:ctrlPr>
-                        </m:sSupPr>
-                        <m:e>
                           <m:r>
                             <a:rPr lang="en-US" sz="4400" b="1" i="1" smtClean="0">
                               <a:latin typeface="Cambria Math" panose="02040503050406030204" pitchFamily="18" charset="0"/>
                             </a:rPr>
-                            <m:t>𝒓</m:t>
+                            <m:t>−</m:t>
                           </m:r>
-                        </m:e>
-                        <m:sup>
                           <m:r>
                             <a:rPr lang="en-US" sz="4400" b="1" i="1" smtClean="0">
                               <a:latin typeface="Cambria Math" panose="02040503050406030204" pitchFamily="18" charset="0"/>
                             </a:rPr>
-                            <m:t>𝒏</m:t>
+                            <m:t>𝟐</m:t>
                           </m:r>
-                        </m:sup>
-                      </m:sSup>
+                        </m:sub>
+                      </m:sSub>
                     </m:oMath>
                   </m:oMathPara>
                 </a14:m>
@@ -6007,8 +6032,8 @@
             </p:nvSpPr>
             <p:spPr>
               <a:xfrm>
-                <a:off x="8360160" y="643185"/>
-                <a:ext cx="3004862" cy="769441"/>
+                <a:off x="7807710" y="231400"/>
+                <a:ext cx="4080284" cy="1364412"/>
               </a:xfrm>
               <a:prstGeom prst="rect">
                 <a:avLst/>
@@ -6035,276 +6060,6 @@
           </p:sp>
         </mc:Fallback>
       </mc:AlternateContent>
-      <p:sp>
-        <p:nvSpPr>
-          <p:cNvPr id="5" name="TextBox 4">
-            <a:extLst>
-              <a:ext uri="{FF2B5EF4-FFF2-40B4-BE49-F238E27FC236}">
-                <a16:creationId xmlns:a16="http://schemas.microsoft.com/office/drawing/2014/main" id="{E5A38152-BA43-8DFC-0FA1-A4E7B84DEC1D}"/>
-              </a:ext>
-            </a:extLst>
-          </p:cNvPr>
-          <p:cNvSpPr txBox="1"/>
-          <p:nvPr/>
-        </p:nvSpPr>
-        <p:spPr>
-          <a:xfrm>
-            <a:off x="3600450" y="1296491"/>
-            <a:ext cx="1161023" cy="461665"/>
-          </a:xfrm>
-          <a:prstGeom prst="rect">
-            <a:avLst/>
-          </a:prstGeom>
-          <a:noFill/>
-        </p:spPr>
-        <p:txBody>
-          <a:bodyPr wrap="none" rtlCol="0">
-            <a:spAutoFit/>
-          </a:bodyPr>
-          <a:lstStyle/>
-          <a:p>
-            <a:r>
-              <a:rPr lang="en-US" sz="2400" dirty="0">
-                <a:solidFill>
-                  <a:schemeClr val="bg1">
-                    <a:lumMod val="50000"/>
-                  </a:schemeClr>
-                </a:solidFill>
-              </a:rPr>
-              <a:t>(length)</a:t>
-            </a:r>
-          </a:p>
-        </p:txBody>
-      </p:sp>
-      <p:sp>
-        <p:nvSpPr>
-          <p:cNvPr id="6" name="TextBox 5">
-            <a:extLst>
-              <a:ext uri="{FF2B5EF4-FFF2-40B4-BE49-F238E27FC236}">
-                <a16:creationId xmlns:a16="http://schemas.microsoft.com/office/drawing/2014/main" id="{831549C1-14F0-9670-95D2-92B034276C7B}"/>
-              </a:ext>
-            </a:extLst>
-          </p:cNvPr>
-          <p:cNvSpPr txBox="1"/>
-          <p:nvPr/>
-        </p:nvSpPr>
-        <p:spPr>
-          <a:xfrm>
-            <a:off x="6600906" y="1346000"/>
-            <a:ext cx="922817" cy="461665"/>
-          </a:xfrm>
-          <a:prstGeom prst="rect">
-            <a:avLst/>
-          </a:prstGeom>
-          <a:noFill/>
-        </p:spPr>
-        <p:txBody>
-          <a:bodyPr wrap="none" rtlCol="0">
-            <a:spAutoFit/>
-          </a:bodyPr>
-          <a:lstStyle/>
-          <a:p>
-            <a:r>
-              <a:rPr lang="en-US" sz="2400" dirty="0">
-                <a:solidFill>
-                  <a:schemeClr val="bg1">
-                    <a:lumMod val="50000"/>
-                  </a:schemeClr>
-                </a:solidFill>
-              </a:rPr>
-              <a:t>(area)</a:t>
-            </a:r>
-          </a:p>
-        </p:txBody>
-      </p:sp>
-      <p:sp>
-        <p:nvSpPr>
-          <p:cNvPr id="7" name="Freeform: Shape 6">
-            <a:extLst>
-              <a:ext uri="{FF2B5EF4-FFF2-40B4-BE49-F238E27FC236}">
-                <a16:creationId xmlns:a16="http://schemas.microsoft.com/office/drawing/2014/main" id="{3FBACFE9-9D53-CAE6-5497-86986C125A01}"/>
-              </a:ext>
-            </a:extLst>
-          </p:cNvPr>
-          <p:cNvSpPr/>
-          <p:nvPr/>
-        </p:nvSpPr>
-        <p:spPr>
-          <a:xfrm>
-            <a:off x="5514976" y="1690688"/>
-            <a:ext cx="1134502" cy="766762"/>
-          </a:xfrm>
-          <a:custGeom>
-            <a:avLst/>
-            <a:gdLst>
-              <a:gd name="connsiteX0" fmla="*/ 723900 w 723900"/>
-              <a:gd name="connsiteY0" fmla="*/ 0 h 1000125"/>
-              <a:gd name="connsiteX1" fmla="*/ 200025 w 723900"/>
-              <a:gd name="connsiteY1" fmla="*/ 542925 h 1000125"/>
-              <a:gd name="connsiteX2" fmla="*/ 0 w 723900"/>
-              <a:gd name="connsiteY2" fmla="*/ 1000125 h 1000125"/>
-            </a:gdLst>
-            <a:ahLst/>
-            <a:cxnLst>
-              <a:cxn ang="0">
-                <a:pos x="connsiteX0" y="connsiteY0"/>
-              </a:cxn>
-              <a:cxn ang="0">
-                <a:pos x="connsiteX1" y="connsiteY1"/>
-              </a:cxn>
-              <a:cxn ang="0">
-                <a:pos x="connsiteX2" y="connsiteY2"/>
-              </a:cxn>
-            </a:cxnLst>
-            <a:rect l="l" t="t" r="r" b="b"/>
-            <a:pathLst>
-              <a:path w="723900" h="1000125">
-                <a:moveTo>
-                  <a:pt x="723900" y="0"/>
-                </a:moveTo>
-                <a:cubicBezTo>
-                  <a:pt x="522287" y="188119"/>
-                  <a:pt x="320675" y="376238"/>
-                  <a:pt x="200025" y="542925"/>
-                </a:cubicBezTo>
-                <a:cubicBezTo>
-                  <a:pt x="79375" y="709612"/>
-                  <a:pt x="39687" y="854868"/>
-                  <a:pt x="0" y="1000125"/>
-                </a:cubicBezTo>
-              </a:path>
-            </a:pathLst>
-          </a:custGeom>
-          <a:noFill/>
-          <a:ln w="28575">
-            <a:solidFill>
-              <a:schemeClr val="bg1">
-                <a:lumMod val="50000"/>
-              </a:schemeClr>
-            </a:solidFill>
-            <a:headEnd type="none" w="med" len="med"/>
-            <a:tailEnd type="arrow" w="med" len="med"/>
-          </a:ln>
-        </p:spPr>
-        <p:style>
-          <a:lnRef idx="2">
-            <a:schemeClr val="accent1">
-              <a:shade val="15000"/>
-            </a:schemeClr>
-          </a:lnRef>
-          <a:fillRef idx="1">
-            <a:schemeClr val="accent1"/>
-          </a:fillRef>
-          <a:effectRef idx="0">
-            <a:schemeClr val="accent1"/>
-          </a:effectRef>
-          <a:fontRef idx="minor">
-            <a:schemeClr val="lt1"/>
-          </a:fontRef>
-        </p:style>
-        <p:txBody>
-          <a:bodyPr rtlCol="0" anchor="ctr"/>
-          <a:lstStyle/>
-          <a:p>
-            <a:pPr algn="ctr"/>
-            <a:endParaRPr lang="en-US"/>
-          </a:p>
-        </p:txBody>
-      </p:sp>
-      <p:sp>
-        <p:nvSpPr>
-          <p:cNvPr id="8" name="Freeform: Shape 7">
-            <a:extLst>
-              <a:ext uri="{FF2B5EF4-FFF2-40B4-BE49-F238E27FC236}">
-                <a16:creationId xmlns:a16="http://schemas.microsoft.com/office/drawing/2014/main" id="{E131BBB0-82CC-6571-B468-73D51DD8623E}"/>
-              </a:ext>
-            </a:extLst>
-          </p:cNvPr>
-          <p:cNvSpPr/>
-          <p:nvPr/>
-        </p:nvSpPr>
-        <p:spPr>
-          <a:xfrm flipH="1">
-            <a:off x="4686300" y="1562100"/>
-            <a:ext cx="628650" cy="461665"/>
-          </a:xfrm>
-          <a:custGeom>
-            <a:avLst/>
-            <a:gdLst>
-              <a:gd name="connsiteX0" fmla="*/ 723900 w 723900"/>
-              <a:gd name="connsiteY0" fmla="*/ 0 h 1000125"/>
-              <a:gd name="connsiteX1" fmla="*/ 200025 w 723900"/>
-              <a:gd name="connsiteY1" fmla="*/ 542925 h 1000125"/>
-              <a:gd name="connsiteX2" fmla="*/ 0 w 723900"/>
-              <a:gd name="connsiteY2" fmla="*/ 1000125 h 1000125"/>
-            </a:gdLst>
-            <a:ahLst/>
-            <a:cxnLst>
-              <a:cxn ang="0">
-                <a:pos x="connsiteX0" y="connsiteY0"/>
-              </a:cxn>
-              <a:cxn ang="0">
-                <a:pos x="connsiteX1" y="connsiteY1"/>
-              </a:cxn>
-              <a:cxn ang="0">
-                <a:pos x="connsiteX2" y="connsiteY2"/>
-              </a:cxn>
-            </a:cxnLst>
-            <a:rect l="l" t="t" r="r" b="b"/>
-            <a:pathLst>
-              <a:path w="723900" h="1000125">
-                <a:moveTo>
-                  <a:pt x="723900" y="0"/>
-                </a:moveTo>
-                <a:cubicBezTo>
-                  <a:pt x="522287" y="188119"/>
-                  <a:pt x="320675" y="376238"/>
-                  <a:pt x="200025" y="542925"/>
-                </a:cubicBezTo>
-                <a:cubicBezTo>
-                  <a:pt x="79375" y="709612"/>
-                  <a:pt x="39687" y="854868"/>
-                  <a:pt x="0" y="1000125"/>
-                </a:cubicBezTo>
-              </a:path>
-            </a:pathLst>
-          </a:custGeom>
-          <a:noFill/>
-          <a:ln w="28575">
-            <a:solidFill>
-              <a:schemeClr val="bg1">
-                <a:lumMod val="50000"/>
-              </a:schemeClr>
-            </a:solidFill>
-            <a:headEnd type="none" w="med" len="med"/>
-            <a:tailEnd type="arrow" w="med" len="med"/>
-          </a:ln>
-        </p:spPr>
-        <p:style>
-          <a:lnRef idx="2">
-            <a:schemeClr val="accent1">
-              <a:shade val="15000"/>
-            </a:schemeClr>
-          </a:lnRef>
-          <a:fillRef idx="1">
-            <a:schemeClr val="accent1"/>
-          </a:fillRef>
-          <a:effectRef idx="0">
-            <a:schemeClr val="accent1"/>
-          </a:effectRef>
-          <a:fontRef idx="minor">
-            <a:schemeClr val="lt1"/>
-          </a:fontRef>
-        </p:style>
-        <p:txBody>
-          <a:bodyPr rtlCol="0" anchor="ctr"/>
-          <a:lstStyle/>
-          <a:p>
-            <a:pPr algn="ctr"/>
-            <a:endParaRPr lang="en-US"/>
-          </a:p>
-        </p:txBody>
-      </p:sp>
     </p:spTree>
     <p:extLst>
       <p:ext uri="{BB962C8B-B14F-4D97-AF65-F5344CB8AC3E}">

</xml_diff>

<commit_message>
added animation for higher dims of pi (1/2)
</commit_message>
<xml_diff>
--- a/slides_x_mas_2023.pptx
+++ b/slides_x_mas_2023.pptx
@@ -4679,6 +4679,560 @@
   <p:clrMapOvr>
     <a:masterClrMapping/>
   </p:clrMapOvr>
+  <p:timing>
+    <p:tnLst>
+      <p:par>
+        <p:cTn id="1" dur="indefinite" restart="never" nodeType="tmRoot">
+          <p:childTnLst>
+            <p:seq concurrent="1" nextAc="seek">
+              <p:cTn id="2" dur="indefinite" nodeType="mainSeq">
+                <p:childTnLst>
+                  <p:par>
+                    <p:cTn id="3" fill="hold">
+                      <p:stCondLst>
+                        <p:cond delay="indefinite"/>
+                      </p:stCondLst>
+                      <p:childTnLst>
+                        <p:par>
+                          <p:cTn id="4" fill="hold">
+                            <p:stCondLst>
+                              <p:cond delay="0"/>
+                            </p:stCondLst>
+                            <p:childTnLst>
+                              <p:par>
+                                <p:cTn id="5" presetID="10" presetClass="entr" presetSubtype="0" fill="hold" grpId="0" nodeType="clickEffect">
+                                  <p:stCondLst>
+                                    <p:cond delay="0"/>
+                                  </p:stCondLst>
+                                  <p:childTnLst>
+                                    <p:set>
+                                      <p:cBhvr>
+                                        <p:cTn id="6" dur="1" fill="hold">
+                                          <p:stCondLst>
+                                            <p:cond delay="0"/>
+                                          </p:stCondLst>
+                                        </p:cTn>
+                                        <p:tgtEl>
+                                          <p:spTgt spid="4"/>
+                                        </p:tgtEl>
+                                        <p:attrNameLst>
+                                          <p:attrName>style.visibility</p:attrName>
+                                        </p:attrNameLst>
+                                      </p:cBhvr>
+                                      <p:to>
+                                        <p:strVal val="visible"/>
+                                      </p:to>
+                                    </p:set>
+                                    <p:animEffect transition="in" filter="fade">
+                                      <p:cBhvr>
+                                        <p:cTn id="7" dur="500"/>
+                                        <p:tgtEl>
+                                          <p:spTgt spid="4"/>
+                                        </p:tgtEl>
+                                      </p:cBhvr>
+                                    </p:animEffect>
+                                  </p:childTnLst>
+                                </p:cTn>
+                              </p:par>
+                            </p:childTnLst>
+                          </p:cTn>
+                        </p:par>
+                      </p:childTnLst>
+                    </p:cTn>
+                  </p:par>
+                  <p:par>
+                    <p:cTn id="8" fill="hold">
+                      <p:stCondLst>
+                        <p:cond delay="indefinite"/>
+                      </p:stCondLst>
+                      <p:childTnLst>
+                        <p:par>
+                          <p:cTn id="9" fill="hold">
+                            <p:stCondLst>
+                              <p:cond delay="0"/>
+                            </p:stCondLst>
+                            <p:childTnLst>
+                              <p:par>
+                                <p:cTn id="10" presetID="10" presetClass="entr" presetSubtype="0" fill="hold" grpId="0" nodeType="clickEffect">
+                                  <p:stCondLst>
+                                    <p:cond delay="0"/>
+                                  </p:stCondLst>
+                                  <p:childTnLst>
+                                    <p:set>
+                                      <p:cBhvr>
+                                        <p:cTn id="11" dur="1" fill="hold">
+                                          <p:stCondLst>
+                                            <p:cond delay="0"/>
+                                          </p:stCondLst>
+                                        </p:cTn>
+                                        <p:tgtEl>
+                                          <p:spTgt spid="3">
+                                            <p:txEl>
+                                              <p:pRg st="0" end="0"/>
+                                            </p:txEl>
+                                          </p:spTgt>
+                                        </p:tgtEl>
+                                        <p:attrNameLst>
+                                          <p:attrName>style.visibility</p:attrName>
+                                        </p:attrNameLst>
+                                      </p:cBhvr>
+                                      <p:to>
+                                        <p:strVal val="visible"/>
+                                      </p:to>
+                                    </p:set>
+                                    <p:animEffect transition="in" filter="fade">
+                                      <p:cBhvr>
+                                        <p:cTn id="12" dur="500"/>
+                                        <p:tgtEl>
+                                          <p:spTgt spid="3">
+                                            <p:txEl>
+                                              <p:pRg st="0" end="0"/>
+                                            </p:txEl>
+                                          </p:spTgt>
+                                        </p:tgtEl>
+                                      </p:cBhvr>
+                                    </p:animEffect>
+                                  </p:childTnLst>
+                                </p:cTn>
+                              </p:par>
+                            </p:childTnLst>
+                          </p:cTn>
+                        </p:par>
+                        <p:par>
+                          <p:cTn id="13" fill="hold">
+                            <p:stCondLst>
+                              <p:cond delay="500"/>
+                            </p:stCondLst>
+                            <p:childTnLst>
+                              <p:par>
+                                <p:cTn id="14" presetID="10" presetClass="entr" presetSubtype="0" fill="hold" grpId="0" nodeType="afterEffect">
+                                  <p:stCondLst>
+                                    <p:cond delay="0"/>
+                                  </p:stCondLst>
+                                  <p:childTnLst>
+                                    <p:set>
+                                      <p:cBhvr>
+                                        <p:cTn id="15" dur="1" fill="hold">
+                                          <p:stCondLst>
+                                            <p:cond delay="0"/>
+                                          </p:stCondLst>
+                                        </p:cTn>
+                                        <p:tgtEl>
+                                          <p:spTgt spid="5"/>
+                                        </p:tgtEl>
+                                        <p:attrNameLst>
+                                          <p:attrName>style.visibility</p:attrName>
+                                        </p:attrNameLst>
+                                      </p:cBhvr>
+                                      <p:to>
+                                        <p:strVal val="visible"/>
+                                      </p:to>
+                                    </p:set>
+                                    <p:animEffect transition="in" filter="fade">
+                                      <p:cBhvr>
+                                        <p:cTn id="16" dur="500"/>
+                                        <p:tgtEl>
+                                          <p:spTgt spid="5"/>
+                                        </p:tgtEl>
+                                      </p:cBhvr>
+                                    </p:animEffect>
+                                  </p:childTnLst>
+                                </p:cTn>
+                              </p:par>
+                              <p:par>
+                                <p:cTn id="17" presetID="10" presetClass="entr" presetSubtype="0" fill="hold" grpId="0" nodeType="withEffect">
+                                  <p:stCondLst>
+                                    <p:cond delay="0"/>
+                                  </p:stCondLst>
+                                  <p:childTnLst>
+                                    <p:set>
+                                      <p:cBhvr>
+                                        <p:cTn id="18" dur="1" fill="hold">
+                                          <p:stCondLst>
+                                            <p:cond delay="0"/>
+                                          </p:stCondLst>
+                                        </p:cTn>
+                                        <p:tgtEl>
+                                          <p:spTgt spid="8"/>
+                                        </p:tgtEl>
+                                        <p:attrNameLst>
+                                          <p:attrName>style.visibility</p:attrName>
+                                        </p:attrNameLst>
+                                      </p:cBhvr>
+                                      <p:to>
+                                        <p:strVal val="visible"/>
+                                      </p:to>
+                                    </p:set>
+                                    <p:animEffect transition="in" filter="fade">
+                                      <p:cBhvr>
+                                        <p:cTn id="19" dur="500"/>
+                                        <p:tgtEl>
+                                          <p:spTgt spid="8"/>
+                                        </p:tgtEl>
+                                      </p:cBhvr>
+                                    </p:animEffect>
+                                  </p:childTnLst>
+                                </p:cTn>
+                              </p:par>
+                            </p:childTnLst>
+                          </p:cTn>
+                        </p:par>
+                      </p:childTnLst>
+                    </p:cTn>
+                  </p:par>
+                  <p:par>
+                    <p:cTn id="20" fill="hold">
+                      <p:stCondLst>
+                        <p:cond delay="indefinite"/>
+                      </p:stCondLst>
+                      <p:childTnLst>
+                        <p:par>
+                          <p:cTn id="21" fill="hold">
+                            <p:stCondLst>
+                              <p:cond delay="0"/>
+                            </p:stCondLst>
+                            <p:childTnLst>
+                              <p:par>
+                                <p:cTn id="22" presetID="10" presetClass="entr" presetSubtype="0" fill="hold" grpId="0" nodeType="clickEffect">
+                                  <p:stCondLst>
+                                    <p:cond delay="0"/>
+                                  </p:stCondLst>
+                                  <p:childTnLst>
+                                    <p:set>
+                                      <p:cBhvr>
+                                        <p:cTn id="23" dur="1" fill="hold">
+                                          <p:stCondLst>
+                                            <p:cond delay="0"/>
+                                          </p:stCondLst>
+                                        </p:cTn>
+                                        <p:tgtEl>
+                                          <p:spTgt spid="3">
+                                            <p:txEl>
+                                              <p:pRg st="1" end="1"/>
+                                            </p:txEl>
+                                          </p:spTgt>
+                                        </p:tgtEl>
+                                        <p:attrNameLst>
+                                          <p:attrName>style.visibility</p:attrName>
+                                        </p:attrNameLst>
+                                      </p:cBhvr>
+                                      <p:to>
+                                        <p:strVal val="visible"/>
+                                      </p:to>
+                                    </p:set>
+                                    <p:animEffect transition="in" filter="fade">
+                                      <p:cBhvr>
+                                        <p:cTn id="24" dur="500"/>
+                                        <p:tgtEl>
+                                          <p:spTgt spid="3">
+                                            <p:txEl>
+                                              <p:pRg st="1" end="1"/>
+                                            </p:txEl>
+                                          </p:spTgt>
+                                        </p:tgtEl>
+                                      </p:cBhvr>
+                                    </p:animEffect>
+                                  </p:childTnLst>
+                                </p:cTn>
+                              </p:par>
+                            </p:childTnLst>
+                          </p:cTn>
+                        </p:par>
+                        <p:par>
+                          <p:cTn id="25" fill="hold">
+                            <p:stCondLst>
+                              <p:cond delay="500"/>
+                            </p:stCondLst>
+                            <p:childTnLst>
+                              <p:par>
+                                <p:cTn id="26" presetID="10" presetClass="entr" presetSubtype="0" fill="hold" grpId="0" nodeType="afterEffect">
+                                  <p:stCondLst>
+                                    <p:cond delay="0"/>
+                                  </p:stCondLst>
+                                  <p:childTnLst>
+                                    <p:set>
+                                      <p:cBhvr>
+                                        <p:cTn id="27" dur="1" fill="hold">
+                                          <p:stCondLst>
+                                            <p:cond delay="0"/>
+                                          </p:stCondLst>
+                                        </p:cTn>
+                                        <p:tgtEl>
+                                          <p:spTgt spid="7"/>
+                                        </p:tgtEl>
+                                        <p:attrNameLst>
+                                          <p:attrName>style.visibility</p:attrName>
+                                        </p:attrNameLst>
+                                      </p:cBhvr>
+                                      <p:to>
+                                        <p:strVal val="visible"/>
+                                      </p:to>
+                                    </p:set>
+                                    <p:animEffect transition="in" filter="fade">
+                                      <p:cBhvr>
+                                        <p:cTn id="28" dur="500"/>
+                                        <p:tgtEl>
+                                          <p:spTgt spid="7"/>
+                                        </p:tgtEl>
+                                      </p:cBhvr>
+                                    </p:animEffect>
+                                  </p:childTnLst>
+                                </p:cTn>
+                              </p:par>
+                              <p:par>
+                                <p:cTn id="29" presetID="10" presetClass="entr" presetSubtype="0" fill="hold" grpId="0" nodeType="withEffect">
+                                  <p:stCondLst>
+                                    <p:cond delay="0"/>
+                                  </p:stCondLst>
+                                  <p:childTnLst>
+                                    <p:set>
+                                      <p:cBhvr>
+                                        <p:cTn id="30" dur="1" fill="hold">
+                                          <p:stCondLst>
+                                            <p:cond delay="0"/>
+                                          </p:stCondLst>
+                                        </p:cTn>
+                                        <p:tgtEl>
+                                          <p:spTgt spid="6"/>
+                                        </p:tgtEl>
+                                        <p:attrNameLst>
+                                          <p:attrName>style.visibility</p:attrName>
+                                        </p:attrNameLst>
+                                      </p:cBhvr>
+                                      <p:to>
+                                        <p:strVal val="visible"/>
+                                      </p:to>
+                                    </p:set>
+                                    <p:animEffect transition="in" filter="fade">
+                                      <p:cBhvr>
+                                        <p:cTn id="31" dur="500"/>
+                                        <p:tgtEl>
+                                          <p:spTgt spid="6"/>
+                                        </p:tgtEl>
+                                      </p:cBhvr>
+                                    </p:animEffect>
+                                  </p:childTnLst>
+                                </p:cTn>
+                              </p:par>
+                            </p:childTnLst>
+                          </p:cTn>
+                        </p:par>
+                      </p:childTnLst>
+                    </p:cTn>
+                  </p:par>
+                  <p:par>
+                    <p:cTn id="32" fill="hold">
+                      <p:stCondLst>
+                        <p:cond delay="indefinite"/>
+                      </p:stCondLst>
+                      <p:childTnLst>
+                        <p:par>
+                          <p:cTn id="33" fill="hold">
+                            <p:stCondLst>
+                              <p:cond delay="0"/>
+                            </p:stCondLst>
+                            <p:childTnLst>
+                              <p:par>
+                                <p:cTn id="34" presetID="10" presetClass="entr" presetSubtype="0" fill="hold" grpId="0" nodeType="clickEffect">
+                                  <p:stCondLst>
+                                    <p:cond delay="0"/>
+                                  </p:stCondLst>
+                                  <p:childTnLst>
+                                    <p:set>
+                                      <p:cBhvr>
+                                        <p:cTn id="35" dur="1" fill="hold">
+                                          <p:stCondLst>
+                                            <p:cond delay="0"/>
+                                          </p:stCondLst>
+                                        </p:cTn>
+                                        <p:tgtEl>
+                                          <p:spTgt spid="3">
+                                            <p:txEl>
+                                              <p:pRg st="2" end="2"/>
+                                            </p:txEl>
+                                          </p:spTgt>
+                                        </p:tgtEl>
+                                        <p:attrNameLst>
+                                          <p:attrName>style.visibility</p:attrName>
+                                        </p:attrNameLst>
+                                      </p:cBhvr>
+                                      <p:to>
+                                        <p:strVal val="visible"/>
+                                      </p:to>
+                                    </p:set>
+                                    <p:animEffect transition="in" filter="fade">
+                                      <p:cBhvr>
+                                        <p:cTn id="36" dur="500"/>
+                                        <p:tgtEl>
+                                          <p:spTgt spid="3">
+                                            <p:txEl>
+                                              <p:pRg st="2" end="2"/>
+                                            </p:txEl>
+                                          </p:spTgt>
+                                        </p:tgtEl>
+                                      </p:cBhvr>
+                                    </p:animEffect>
+                                  </p:childTnLst>
+                                </p:cTn>
+                              </p:par>
+                            </p:childTnLst>
+                          </p:cTn>
+                        </p:par>
+                      </p:childTnLst>
+                    </p:cTn>
+                  </p:par>
+                  <p:par>
+                    <p:cTn id="37" fill="hold">
+                      <p:stCondLst>
+                        <p:cond delay="indefinite"/>
+                      </p:stCondLst>
+                      <p:childTnLst>
+                        <p:par>
+                          <p:cTn id="38" fill="hold">
+                            <p:stCondLst>
+                              <p:cond delay="0"/>
+                            </p:stCondLst>
+                            <p:childTnLst>
+                              <p:par>
+                                <p:cTn id="39" presetID="10" presetClass="entr" presetSubtype="0" fill="hold" grpId="0" nodeType="clickEffect">
+                                  <p:stCondLst>
+                                    <p:cond delay="0"/>
+                                  </p:stCondLst>
+                                  <p:childTnLst>
+                                    <p:set>
+                                      <p:cBhvr>
+                                        <p:cTn id="40" dur="1" fill="hold">
+                                          <p:stCondLst>
+                                            <p:cond delay="0"/>
+                                          </p:stCondLst>
+                                        </p:cTn>
+                                        <p:tgtEl>
+                                          <p:spTgt spid="3">
+                                            <p:txEl>
+                                              <p:pRg st="3" end="3"/>
+                                            </p:txEl>
+                                          </p:spTgt>
+                                        </p:tgtEl>
+                                        <p:attrNameLst>
+                                          <p:attrName>style.visibility</p:attrName>
+                                        </p:attrNameLst>
+                                      </p:cBhvr>
+                                      <p:to>
+                                        <p:strVal val="visible"/>
+                                      </p:to>
+                                    </p:set>
+                                    <p:animEffect transition="in" filter="fade">
+                                      <p:cBhvr>
+                                        <p:cTn id="41" dur="500"/>
+                                        <p:tgtEl>
+                                          <p:spTgt spid="3">
+                                            <p:txEl>
+                                              <p:pRg st="3" end="3"/>
+                                            </p:txEl>
+                                          </p:spTgt>
+                                        </p:tgtEl>
+                                      </p:cBhvr>
+                                    </p:animEffect>
+                                  </p:childTnLst>
+                                </p:cTn>
+                              </p:par>
+                            </p:childTnLst>
+                          </p:cTn>
+                        </p:par>
+                      </p:childTnLst>
+                    </p:cTn>
+                  </p:par>
+                  <p:par>
+                    <p:cTn id="42" fill="hold">
+                      <p:stCondLst>
+                        <p:cond delay="indefinite"/>
+                      </p:stCondLst>
+                      <p:childTnLst>
+                        <p:par>
+                          <p:cTn id="43" fill="hold">
+                            <p:stCondLst>
+                              <p:cond delay="0"/>
+                            </p:stCondLst>
+                            <p:childTnLst>
+                              <p:par>
+                                <p:cTn id="44" presetID="10" presetClass="entr" presetSubtype="0" fill="hold" grpId="0" nodeType="clickEffect">
+                                  <p:stCondLst>
+                                    <p:cond delay="0"/>
+                                  </p:stCondLst>
+                                  <p:childTnLst>
+                                    <p:set>
+                                      <p:cBhvr>
+                                        <p:cTn id="45" dur="1" fill="hold">
+                                          <p:stCondLst>
+                                            <p:cond delay="0"/>
+                                          </p:stCondLst>
+                                        </p:cTn>
+                                        <p:tgtEl>
+                                          <p:spTgt spid="3">
+                                            <p:txEl>
+                                              <p:pRg st="4" end="4"/>
+                                            </p:txEl>
+                                          </p:spTgt>
+                                        </p:tgtEl>
+                                        <p:attrNameLst>
+                                          <p:attrName>style.visibility</p:attrName>
+                                        </p:attrNameLst>
+                                      </p:cBhvr>
+                                      <p:to>
+                                        <p:strVal val="visible"/>
+                                      </p:to>
+                                    </p:set>
+                                    <p:animEffect transition="in" filter="fade">
+                                      <p:cBhvr>
+                                        <p:cTn id="46" dur="500"/>
+                                        <p:tgtEl>
+                                          <p:spTgt spid="3">
+                                            <p:txEl>
+                                              <p:pRg st="4" end="4"/>
+                                            </p:txEl>
+                                          </p:spTgt>
+                                        </p:tgtEl>
+                                      </p:cBhvr>
+                                    </p:animEffect>
+                                  </p:childTnLst>
+                                </p:cTn>
+                              </p:par>
+                            </p:childTnLst>
+                          </p:cTn>
+                        </p:par>
+                      </p:childTnLst>
+                    </p:cTn>
+                  </p:par>
+                </p:childTnLst>
+              </p:cTn>
+              <p:prevCondLst>
+                <p:cond evt="onPrev" delay="0">
+                  <p:tgtEl>
+                    <p:sldTgt/>
+                  </p:tgtEl>
+                </p:cond>
+              </p:prevCondLst>
+              <p:nextCondLst>
+                <p:cond evt="onNext" delay="0">
+                  <p:tgtEl>
+                    <p:sldTgt/>
+                  </p:tgtEl>
+                </p:cond>
+              </p:nextCondLst>
+            </p:seq>
+          </p:childTnLst>
+        </p:cTn>
+      </p:par>
+    </p:tnLst>
+    <p:bldLst>
+      <p:bldP spid="3" grpId="0" uiExpand="1" build="p"/>
+      <p:bldP spid="4" grpId="0"/>
+      <p:bldP spid="5" grpId="0"/>
+      <p:bldP spid="6" grpId="0"/>
+      <p:bldP spid="7" grpId="0" animBg="1"/>
+      <p:bldP spid="8" grpId="0" animBg="1"/>
+    </p:bldLst>
+  </p:timing>
 </p:sld>
 </file>
 

</xml_diff>

<commit_message>
added animation for higher dims of pi (2/2)
</commit_message>
<xml_diff>
--- a/slides_x_mas_2023.pptx
+++ b/slides_x_mas_2023.pptx
@@ -6629,6 +6629,276 @@
   <p:clrMapOvr>
     <a:masterClrMapping/>
   </p:clrMapOvr>
+  <p:timing>
+    <p:tnLst>
+      <p:par>
+        <p:cTn id="1" dur="indefinite" restart="never" nodeType="tmRoot">
+          <p:childTnLst>
+            <p:seq concurrent="1" nextAc="seek">
+              <p:cTn id="2" dur="indefinite" nodeType="mainSeq">
+                <p:childTnLst>
+                  <p:par>
+                    <p:cTn id="3" fill="hold">
+                      <p:stCondLst>
+                        <p:cond delay="indefinite"/>
+                      </p:stCondLst>
+                      <p:childTnLst>
+                        <p:par>
+                          <p:cTn id="4" fill="hold">
+                            <p:stCondLst>
+                              <p:cond delay="0"/>
+                            </p:stCondLst>
+                            <p:childTnLst>
+                              <p:par>
+                                <p:cTn id="5" presetID="10" presetClass="entr" presetSubtype="0" fill="hold" grpId="0" nodeType="clickEffect">
+                                  <p:stCondLst>
+                                    <p:cond delay="0"/>
+                                  </p:stCondLst>
+                                  <p:childTnLst>
+                                    <p:set>
+                                      <p:cBhvr>
+                                        <p:cTn id="6" dur="1" fill="hold">
+                                          <p:stCondLst>
+                                            <p:cond delay="0"/>
+                                          </p:stCondLst>
+                                        </p:cTn>
+                                        <p:tgtEl>
+                                          <p:spTgt spid="4"/>
+                                        </p:tgtEl>
+                                        <p:attrNameLst>
+                                          <p:attrName>style.visibility</p:attrName>
+                                        </p:attrNameLst>
+                                      </p:cBhvr>
+                                      <p:to>
+                                        <p:strVal val="visible"/>
+                                      </p:to>
+                                    </p:set>
+                                    <p:animEffect transition="in" filter="fade">
+                                      <p:cBhvr>
+                                        <p:cTn id="7" dur="500"/>
+                                        <p:tgtEl>
+                                          <p:spTgt spid="4"/>
+                                        </p:tgtEl>
+                                      </p:cBhvr>
+                                    </p:animEffect>
+                                  </p:childTnLst>
+                                </p:cTn>
+                              </p:par>
+                            </p:childTnLst>
+                          </p:cTn>
+                        </p:par>
+                      </p:childTnLst>
+                    </p:cTn>
+                  </p:par>
+                  <p:par>
+                    <p:cTn id="8" fill="hold">
+                      <p:stCondLst>
+                        <p:cond delay="indefinite"/>
+                      </p:stCondLst>
+                      <p:childTnLst>
+                        <p:par>
+                          <p:cTn id="9" fill="hold">
+                            <p:stCondLst>
+                              <p:cond delay="0"/>
+                            </p:stCondLst>
+                            <p:childTnLst>
+                              <p:par>
+                                <p:cTn id="10" presetID="10" presetClass="entr" presetSubtype="0" fill="hold" grpId="0" nodeType="clickEffect">
+                                  <p:stCondLst>
+                                    <p:cond delay="0"/>
+                                  </p:stCondLst>
+                                  <p:childTnLst>
+                                    <p:set>
+                                      <p:cBhvr>
+                                        <p:cTn id="11" dur="1" fill="hold">
+                                          <p:stCondLst>
+                                            <p:cond delay="0"/>
+                                          </p:stCondLst>
+                                        </p:cTn>
+                                        <p:tgtEl>
+                                          <p:spTgt spid="3">
+                                            <p:txEl>
+                                              <p:pRg st="5" end="5"/>
+                                            </p:txEl>
+                                          </p:spTgt>
+                                        </p:tgtEl>
+                                        <p:attrNameLst>
+                                          <p:attrName>style.visibility</p:attrName>
+                                        </p:attrNameLst>
+                                      </p:cBhvr>
+                                      <p:to>
+                                        <p:strVal val="visible"/>
+                                      </p:to>
+                                    </p:set>
+                                    <p:animEffect transition="in" filter="fade">
+                                      <p:cBhvr>
+                                        <p:cTn id="12" dur="500"/>
+                                        <p:tgtEl>
+                                          <p:spTgt spid="3">
+                                            <p:txEl>
+                                              <p:pRg st="5" end="5"/>
+                                            </p:txEl>
+                                          </p:spTgt>
+                                        </p:tgtEl>
+                                      </p:cBhvr>
+                                    </p:animEffect>
+                                  </p:childTnLst>
+                                </p:cTn>
+                              </p:par>
+                            </p:childTnLst>
+                          </p:cTn>
+                        </p:par>
+                      </p:childTnLst>
+                    </p:cTn>
+                  </p:par>
+                  <p:par>
+                    <p:cTn id="13" fill="hold">
+                      <p:stCondLst>
+                        <p:cond delay="indefinite"/>
+                      </p:stCondLst>
+                      <p:childTnLst>
+                        <p:par>
+                          <p:cTn id="14" fill="hold">
+                            <p:stCondLst>
+                              <p:cond delay="0"/>
+                            </p:stCondLst>
+                            <p:childTnLst>
+                              <p:par>
+                                <p:cTn id="15" presetID="10" presetClass="entr" presetSubtype="0" fill="hold" grpId="0" nodeType="clickEffect">
+                                  <p:stCondLst>
+                                    <p:cond delay="0"/>
+                                  </p:stCondLst>
+                                  <p:childTnLst>
+                                    <p:set>
+                                      <p:cBhvr>
+                                        <p:cTn id="16" dur="1" fill="hold">
+                                          <p:stCondLst>
+                                            <p:cond delay="0"/>
+                                          </p:stCondLst>
+                                        </p:cTn>
+                                        <p:tgtEl>
+                                          <p:spTgt spid="3">
+                                            <p:txEl>
+                                              <p:pRg st="6" end="6"/>
+                                            </p:txEl>
+                                          </p:spTgt>
+                                        </p:tgtEl>
+                                        <p:attrNameLst>
+                                          <p:attrName>style.visibility</p:attrName>
+                                        </p:attrNameLst>
+                                      </p:cBhvr>
+                                      <p:to>
+                                        <p:strVal val="visible"/>
+                                      </p:to>
+                                    </p:set>
+                                    <p:animEffect transition="in" filter="fade">
+                                      <p:cBhvr>
+                                        <p:cTn id="17" dur="500"/>
+                                        <p:tgtEl>
+                                          <p:spTgt spid="3">
+                                            <p:txEl>
+                                              <p:pRg st="6" end="6"/>
+                                            </p:txEl>
+                                          </p:spTgt>
+                                        </p:tgtEl>
+                                      </p:cBhvr>
+                                    </p:animEffect>
+                                  </p:childTnLst>
+                                </p:cTn>
+                              </p:par>
+                            </p:childTnLst>
+                          </p:cTn>
+                        </p:par>
+                      </p:childTnLst>
+                    </p:cTn>
+                  </p:par>
+                  <p:par>
+                    <p:cTn id="18" fill="hold">
+                      <p:stCondLst>
+                        <p:cond delay="indefinite"/>
+                      </p:stCondLst>
+                      <p:childTnLst>
+                        <p:par>
+                          <p:cTn id="19" fill="hold">
+                            <p:stCondLst>
+                              <p:cond delay="0"/>
+                            </p:stCondLst>
+                            <p:childTnLst>
+                              <p:par>
+                                <p:cTn id="20" presetID="10" presetClass="entr" presetSubtype="0" fill="hold" grpId="0" nodeType="clickEffect">
+                                  <p:stCondLst>
+                                    <p:cond delay="0"/>
+                                  </p:stCondLst>
+                                  <p:childTnLst>
+                                    <p:set>
+                                      <p:cBhvr>
+                                        <p:cTn id="21" dur="1" fill="hold">
+                                          <p:stCondLst>
+                                            <p:cond delay="0"/>
+                                          </p:stCondLst>
+                                        </p:cTn>
+                                        <p:tgtEl>
+                                          <p:spTgt spid="3">
+                                            <p:txEl>
+                                              <p:pRg st="7" end="7"/>
+                                            </p:txEl>
+                                          </p:spTgt>
+                                        </p:tgtEl>
+                                        <p:attrNameLst>
+                                          <p:attrName>style.visibility</p:attrName>
+                                        </p:attrNameLst>
+                                      </p:cBhvr>
+                                      <p:to>
+                                        <p:strVal val="visible"/>
+                                      </p:to>
+                                    </p:set>
+                                    <p:animEffect transition="in" filter="fade">
+                                      <p:cBhvr>
+                                        <p:cTn id="22" dur="500"/>
+                                        <p:tgtEl>
+                                          <p:spTgt spid="3">
+                                            <p:txEl>
+                                              <p:pRg st="7" end="7"/>
+                                            </p:txEl>
+                                          </p:spTgt>
+                                        </p:tgtEl>
+                                      </p:cBhvr>
+                                    </p:animEffect>
+                                  </p:childTnLst>
+                                </p:cTn>
+                              </p:par>
+                            </p:childTnLst>
+                          </p:cTn>
+                        </p:par>
+                      </p:childTnLst>
+                    </p:cTn>
+                  </p:par>
+                </p:childTnLst>
+              </p:cTn>
+              <p:prevCondLst>
+                <p:cond evt="onPrev" delay="0">
+                  <p:tgtEl>
+                    <p:sldTgt/>
+                  </p:tgtEl>
+                </p:cond>
+              </p:prevCondLst>
+              <p:nextCondLst>
+                <p:cond evt="onNext" delay="0">
+                  <p:tgtEl>
+                    <p:sldTgt/>
+                  </p:tgtEl>
+                </p:cond>
+              </p:nextCondLst>
+            </p:seq>
+          </p:childTnLst>
+        </p:cTn>
+      </p:par>
+    </p:tnLst>
+    <p:bldLst>
+      <p:bldP spid="3" grpId="0" uiExpand="1" build="p"/>
+      <p:bldP spid="4" grpId="0"/>
+    </p:bldLst>
+  </p:timing>
 </p:sld>
 </file>
 

</xml_diff>

<commit_message>
added 𝜀-width unit sphere vs unit ball
</commit_message>
<xml_diff>
--- a/slides_x_mas_2023.pptx
+++ b/slides_x_mas_2023.pptx
@@ -18,22 +18,23 @@
     <p:sldId id="288" r:id="rId12"/>
     <p:sldId id="286" r:id="rId13"/>
     <p:sldId id="290" r:id="rId14"/>
-    <p:sldId id="270" r:id="rId15"/>
-    <p:sldId id="268" r:id="rId16"/>
-    <p:sldId id="272" r:id="rId17"/>
-    <p:sldId id="273" r:id="rId18"/>
-    <p:sldId id="269" r:id="rId19"/>
-    <p:sldId id="274" r:id="rId20"/>
-    <p:sldId id="275" r:id="rId21"/>
-    <p:sldId id="276" r:id="rId22"/>
-    <p:sldId id="277" r:id="rId23"/>
-    <p:sldId id="279" r:id="rId24"/>
-    <p:sldId id="278" r:id="rId25"/>
-    <p:sldId id="280" r:id="rId26"/>
-    <p:sldId id="281" r:id="rId27"/>
-    <p:sldId id="282" r:id="rId28"/>
-    <p:sldId id="283" r:id="rId29"/>
-    <p:sldId id="285" r:id="rId30"/>
+    <p:sldId id="291" r:id="rId15"/>
+    <p:sldId id="270" r:id="rId16"/>
+    <p:sldId id="268" r:id="rId17"/>
+    <p:sldId id="272" r:id="rId18"/>
+    <p:sldId id="273" r:id="rId19"/>
+    <p:sldId id="269" r:id="rId20"/>
+    <p:sldId id="274" r:id="rId21"/>
+    <p:sldId id="275" r:id="rId22"/>
+    <p:sldId id="276" r:id="rId23"/>
+    <p:sldId id="277" r:id="rId24"/>
+    <p:sldId id="279" r:id="rId25"/>
+    <p:sldId id="278" r:id="rId26"/>
+    <p:sldId id="280" r:id="rId27"/>
+    <p:sldId id="281" r:id="rId28"/>
+    <p:sldId id="282" r:id="rId29"/>
+    <p:sldId id="283" r:id="rId30"/>
+    <p:sldId id="285" r:id="rId31"/>
   </p:sldIdLst>
   <p:sldSz cx="12192000" cy="6858000"/>
   <p:notesSz cx="6858000" cy="9144000"/>
@@ -158,6 +159,7 @@
             <p14:sldId id="288"/>
             <p14:sldId id="286"/>
             <p14:sldId id="290"/>
+            <p14:sldId id="291"/>
           </p14:sldIdLst>
         </p14:section>
         <p14:section name="Paradoxical" id="{E2223571-FAC5-4589-B421-244975766BB0}">
@@ -4245,8 +4247,8 @@
             </p:nvSpPr>
             <p:spPr>
               <a:xfrm>
-                <a:off x="8360160" y="643185"/>
-                <a:ext cx="3004862" cy="769441"/>
+                <a:off x="7523723" y="643185"/>
+                <a:ext cx="4177619" cy="769441"/>
               </a:xfrm>
               <a:prstGeom prst="rect">
                 <a:avLst/>
@@ -4291,10 +4293,41 @@
                         </m:sub>
                       </m:sSub>
                       <m:r>
-                        <a:rPr lang="en-US" sz="4400" b="1" i="1" smtClean="0">
+                        <a:rPr lang="en-US" sz="4400" b="1" i="1">
                           <a:latin typeface="Cambria Math" panose="02040503050406030204" pitchFamily="18" charset="0"/>
                         </a:rPr>
-                        <m:t>=</m:t>
+                        <m:t>(</m:t>
+                      </m:r>
+                      <m:sSub>
+                        <m:sSubPr>
+                          <m:ctrlPr>
+                            <a:rPr lang="en-US" sz="4400" b="1" i="1">
+                              <a:latin typeface="Cambria Math" panose="02040503050406030204" pitchFamily="18" charset="0"/>
+                            </a:rPr>
+                          </m:ctrlPr>
+                        </m:sSubPr>
+                        <m:e>
+                          <m:r>
+                            <a:rPr lang="en-US" sz="4400" b="1" i="1">
+                              <a:latin typeface="Cambria Math" panose="02040503050406030204" pitchFamily="18" charset="0"/>
+                            </a:rPr>
+                            <m:t>𝓑</m:t>
+                          </m:r>
+                        </m:e>
+                        <m:sub>
+                          <m:r>
+                            <a:rPr lang="en-US" sz="4400" b="1" i="1">
+                              <a:latin typeface="Cambria Math" panose="02040503050406030204" pitchFamily="18" charset="0"/>
+                            </a:rPr>
+                            <m:t>𝒏</m:t>
+                          </m:r>
+                        </m:sub>
+                      </m:sSub>
+                      <m:r>
+                        <a:rPr lang="en-US" sz="4400" b="1" i="1">
+                          <a:latin typeface="Cambria Math" panose="02040503050406030204" pitchFamily="18" charset="0"/>
+                        </a:rPr>
+                        <m:t>)=</m:t>
                       </m:r>
                       <m:sSub>
                         <m:sSubPr>
@@ -4371,8 +4404,8 @@
             </p:nvSpPr>
             <p:spPr>
               <a:xfrm>
-                <a:off x="8360160" y="643185"/>
-                <a:ext cx="3004862" cy="769441"/>
+                <a:off x="7523723" y="643185"/>
+                <a:ext cx="4177619" cy="769441"/>
               </a:xfrm>
               <a:prstGeom prst="rect">
                 <a:avLst/>
@@ -7049,6 +7082,987 @@
 </file>
 
 <file path=ppt/slides/slide14.xml><?xml version="1.0" encoding="utf-8"?>
+<p:sld xmlns:a="http://schemas.openxmlformats.org/drawingml/2006/main" xmlns:r="http://schemas.openxmlformats.org/officeDocument/2006/relationships" xmlns:p="http://schemas.openxmlformats.org/presentationml/2006/main">
+  <p:cSld>
+    <p:spTree>
+      <p:nvGrpSpPr>
+        <p:cNvPr id="1" name=""/>
+        <p:cNvGrpSpPr/>
+        <p:nvPr/>
+      </p:nvGrpSpPr>
+      <p:grpSpPr>
+        <a:xfrm>
+          <a:off x="0" y="0"/>
+          <a:ext cx="0" cy="0"/>
+          <a:chOff x="0" y="0"/>
+          <a:chExt cx="0" cy="0"/>
+        </a:xfrm>
+      </p:grpSpPr>
+      <mc:AlternateContent xmlns:mc="http://schemas.openxmlformats.org/markup-compatibility/2006">
+        <mc:Choice xmlns:a14="http://schemas.microsoft.com/office/drawing/2010/main" Requires="a14">
+          <p:sp>
+            <p:nvSpPr>
+              <p:cNvPr id="2" name="Title 1">
+                <a:extLst>
+                  <a:ext uri="{FF2B5EF4-FFF2-40B4-BE49-F238E27FC236}">
+                    <a16:creationId xmlns:a16="http://schemas.microsoft.com/office/drawing/2014/main" id="{29C855AC-5186-0374-6118-46FA3B8FB32B}"/>
+                  </a:ext>
+                </a:extLst>
+              </p:cNvPr>
+              <p:cNvSpPr>
+                <a:spLocks noGrp="1"/>
+              </p:cNvSpPr>
+              <p:nvPr>
+                <p:ph type="title"/>
+              </p:nvPr>
+            </p:nvSpPr>
+            <p:spPr/>
+            <p:txBody>
+              <a:bodyPr/>
+              <a:lstStyle/>
+              <a:p>
+                <a14:m>
+                  <m:oMath xmlns:m="http://schemas.openxmlformats.org/officeDocument/2006/math">
+                    <m:r>
+                      <a:rPr lang="en-US" b="0" i="1" smtClean="0">
+                        <a:latin typeface="Cambria Math" panose="02040503050406030204" pitchFamily="18" charset="0"/>
+                      </a:rPr>
+                      <m:t>𝜀</m:t>
+                    </m:r>
+                  </m:oMath>
+                </a14:m>
+                <a:r>
+                  <a:rPr lang="en-US" dirty="0"/>
+                  <a:t>-width unit sphere vs unit ball</a:t>
+                </a:r>
+              </a:p>
+            </p:txBody>
+          </p:sp>
+        </mc:Choice>
+        <mc:Fallback>
+          <p:sp>
+            <p:nvSpPr>
+              <p:cNvPr id="2" name="Title 1">
+                <a:extLst>
+                  <a:ext uri="{FF2B5EF4-FFF2-40B4-BE49-F238E27FC236}">
+                    <a16:creationId xmlns:a16="http://schemas.microsoft.com/office/drawing/2014/main" id="{29C855AC-5186-0374-6118-46FA3B8FB32B}"/>
+                  </a:ext>
+                </a:extLst>
+              </p:cNvPr>
+              <p:cNvSpPr>
+                <a:spLocks noGrp="1" noRot="1" noChangeAspect="1" noMove="1" noResize="1" noEditPoints="1" noAdjustHandles="1" noChangeArrowheads="1" noChangeShapeType="1" noTextEdit="1"/>
+              </p:cNvSpPr>
+              <p:nvPr>
+                <p:ph type="title"/>
+              </p:nvPr>
+            </p:nvSpPr>
+            <p:spPr>
+              <a:blipFill>
+                <a:blip r:embed="rId2"/>
+                <a:stretch>
+                  <a:fillRect/>
+                </a:stretch>
+              </a:blipFill>
+            </p:spPr>
+            <p:txBody>
+              <a:bodyPr/>
+              <a:lstStyle/>
+              <a:p>
+                <a:r>
+                  <a:rPr lang="en-US">
+                    <a:noFill/>
+                  </a:rPr>
+                  <a:t> </a:t>
+                </a:r>
+              </a:p>
+            </p:txBody>
+          </p:sp>
+        </mc:Fallback>
+      </mc:AlternateContent>
+      <mc:AlternateContent xmlns:mc="http://schemas.openxmlformats.org/markup-compatibility/2006">
+        <mc:Choice xmlns:a14="http://schemas.microsoft.com/office/drawing/2010/main" Requires="a14">
+          <p:sp>
+            <p:nvSpPr>
+              <p:cNvPr id="3" name="Content Placeholder 2">
+                <a:extLst>
+                  <a:ext uri="{FF2B5EF4-FFF2-40B4-BE49-F238E27FC236}">
+                    <a16:creationId xmlns:a16="http://schemas.microsoft.com/office/drawing/2014/main" id="{52ADD80A-04AB-65F4-C5CE-8EE8137D6514}"/>
+                  </a:ext>
+                </a:extLst>
+              </p:cNvPr>
+              <p:cNvSpPr>
+                <a:spLocks noGrp="1"/>
+              </p:cNvSpPr>
+              <p:nvPr>
+                <p:ph idx="1"/>
+              </p:nvPr>
+            </p:nvSpPr>
+            <p:spPr/>
+            <p:txBody>
+              <a:bodyPr/>
+              <a:lstStyle/>
+              <a:p>
+                <a:pPr marL="0" indent="0" algn="ctr">
+                  <a:lnSpc>
+                    <a:spcPct val="150000"/>
+                  </a:lnSpc>
+                  <a:buNone/>
+                </a:pPr>
+                <a14:m>
+                  <m:oMathPara xmlns:m="http://schemas.openxmlformats.org/officeDocument/2006/math">
+                    <m:oMathParaPr>
+                      <m:jc m:val="centerGroup"/>
+                    </m:oMathParaPr>
+                    <m:oMath xmlns:m="http://schemas.openxmlformats.org/officeDocument/2006/math">
+                      <m:sSub>
+                        <m:sSubPr>
+                          <m:ctrlPr>
+                            <a:rPr lang="en-US" sz="3200" b="1" i="1" smtClean="0">
+                              <a:latin typeface="Cambria Math" panose="02040503050406030204" pitchFamily="18" charset="0"/>
+                            </a:rPr>
+                          </m:ctrlPr>
+                        </m:sSubPr>
+                        <m:e>
+                          <m:r>
+                            <a:rPr lang="en-US" sz="3200" b="1" i="1">
+                              <a:latin typeface="Cambria Math" panose="02040503050406030204" pitchFamily="18" charset="0"/>
+                            </a:rPr>
+                            <m:t>𝓥</m:t>
+                          </m:r>
+                        </m:e>
+                        <m:sub>
+                          <m:r>
+                            <a:rPr lang="en-US" sz="3200" b="1" i="1">
+                              <a:latin typeface="Cambria Math" panose="02040503050406030204" pitchFamily="18" charset="0"/>
+                            </a:rPr>
+                            <m:t>𝒏</m:t>
+                          </m:r>
+                        </m:sub>
+                      </m:sSub>
+                      <m:r>
+                        <a:rPr lang="en-US" sz="3200" b="1" i="1">
+                          <a:latin typeface="Cambria Math" panose="02040503050406030204" pitchFamily="18" charset="0"/>
+                        </a:rPr>
+                        <m:t>(</m:t>
+                      </m:r>
+                      <m:sSub>
+                        <m:sSubPr>
+                          <m:ctrlPr>
+                            <a:rPr lang="en-US" sz="3200" b="1" i="1">
+                              <a:latin typeface="Cambria Math" panose="02040503050406030204" pitchFamily="18" charset="0"/>
+                            </a:rPr>
+                          </m:ctrlPr>
+                        </m:sSubPr>
+                        <m:e>
+                          <m:r>
+                            <a:rPr lang="en-US" sz="3200" b="1" i="1">
+                              <a:latin typeface="Cambria Math" panose="02040503050406030204" pitchFamily="18" charset="0"/>
+                            </a:rPr>
+                            <m:t>𝓑</m:t>
+                          </m:r>
+                        </m:e>
+                        <m:sub>
+                          <m:r>
+                            <a:rPr lang="en-US" sz="3200" b="1" i="1">
+                              <a:latin typeface="Cambria Math" panose="02040503050406030204" pitchFamily="18" charset="0"/>
+                            </a:rPr>
+                            <m:t>𝒏</m:t>
+                          </m:r>
+                        </m:sub>
+                      </m:sSub>
+                      <m:r>
+                        <a:rPr lang="en-US" sz="3200" b="1" i="1">
+                          <a:latin typeface="Cambria Math" panose="02040503050406030204" pitchFamily="18" charset="0"/>
+                        </a:rPr>
+                        <m:t>)=</m:t>
+                      </m:r>
+                      <m:sSub>
+                        <m:sSubPr>
+                          <m:ctrlPr>
+                            <a:rPr lang="en-US" sz="3200" b="1" i="1">
+                              <a:latin typeface="Cambria Math" panose="02040503050406030204" pitchFamily="18" charset="0"/>
+                            </a:rPr>
+                          </m:ctrlPr>
+                        </m:sSubPr>
+                        <m:e>
+                          <m:r>
+                            <a:rPr lang="en-US" sz="3200" b="1" i="1">
+                              <a:latin typeface="Cambria Math" panose="02040503050406030204" pitchFamily="18" charset="0"/>
+                            </a:rPr>
+                            <m:t>𝝅</m:t>
+                          </m:r>
+                        </m:e>
+                        <m:sub>
+                          <m:r>
+                            <a:rPr lang="en-US" sz="3200" b="1" i="1">
+                              <a:latin typeface="Cambria Math" panose="02040503050406030204" pitchFamily="18" charset="0"/>
+                            </a:rPr>
+                            <m:t>𝒏</m:t>
+                          </m:r>
+                        </m:sub>
+                      </m:sSub>
+                      <m:sSup>
+                        <m:sSupPr>
+                          <m:ctrlPr>
+                            <a:rPr lang="en-US" sz="3200" b="1" i="1">
+                              <a:latin typeface="Cambria Math" panose="02040503050406030204" pitchFamily="18" charset="0"/>
+                            </a:rPr>
+                          </m:ctrlPr>
+                        </m:sSupPr>
+                        <m:e>
+                          <m:r>
+                            <a:rPr lang="en-US" sz="3200" b="1" i="1">
+                              <a:latin typeface="Cambria Math" panose="02040503050406030204" pitchFamily="18" charset="0"/>
+                            </a:rPr>
+                            <m:t>𝒓</m:t>
+                          </m:r>
+                        </m:e>
+                        <m:sup>
+                          <m:r>
+                            <a:rPr lang="en-US" sz="3200" b="1" i="1">
+                              <a:latin typeface="Cambria Math" panose="02040503050406030204" pitchFamily="18" charset="0"/>
+                            </a:rPr>
+                            <m:t>𝒏</m:t>
+                          </m:r>
+                        </m:sup>
+                      </m:sSup>
+                    </m:oMath>
+                  </m:oMathPara>
+                </a14:m>
+                <a:endParaRPr lang="en-US" dirty="0"/>
+              </a:p>
+              <a:p>
+                <a:pPr marL="0" indent="0" algn="ctr">
+                  <a:lnSpc>
+                    <a:spcPct val="150000"/>
+                  </a:lnSpc>
+                  <a:buNone/>
+                </a:pPr>
+                <a14:m>
+                  <m:oMathPara xmlns:m="http://schemas.openxmlformats.org/officeDocument/2006/math">
+                    <m:oMathParaPr>
+                      <m:jc m:val="centerGroup"/>
+                    </m:oMathParaPr>
+                    <m:oMath xmlns:m="http://schemas.openxmlformats.org/officeDocument/2006/math">
+                      <m:sSub>
+                        <m:sSubPr>
+                          <m:ctrlPr>
+                            <a:rPr lang="en-US" sz="3200" b="1" i="1" smtClean="0">
+                              <a:latin typeface="Cambria Math" panose="02040503050406030204" pitchFamily="18" charset="0"/>
+                            </a:rPr>
+                          </m:ctrlPr>
+                        </m:sSubPr>
+                        <m:e>
+                          <m:r>
+                            <a:rPr lang="en-US" sz="3200" b="1" i="1" smtClean="0">
+                              <a:latin typeface="Cambria Math" panose="02040503050406030204" pitchFamily="18" charset="0"/>
+                            </a:rPr>
+                            <m:t>𝓥</m:t>
+                          </m:r>
+                        </m:e>
+                        <m:sub>
+                          <m:r>
+                            <a:rPr lang="en-US" sz="3200" b="1" i="1" smtClean="0">
+                              <a:latin typeface="Cambria Math" panose="02040503050406030204" pitchFamily="18" charset="0"/>
+                            </a:rPr>
+                            <m:t>𝒏</m:t>
+                          </m:r>
+                        </m:sub>
+                      </m:sSub>
+                      <m:d>
+                        <m:dPr>
+                          <m:ctrlPr>
+                            <a:rPr lang="en-US" sz="3200" b="1" i="1" smtClean="0">
+                              <a:latin typeface="Cambria Math" panose="02040503050406030204" pitchFamily="18" charset="0"/>
+                            </a:rPr>
+                          </m:ctrlPr>
+                        </m:dPr>
+                        <m:e>
+                          <m:sSub>
+                            <m:sSubPr>
+                              <m:ctrlPr>
+                                <a:rPr lang="en-US" sz="3200" b="1" i="1" smtClean="0">
+                                  <a:latin typeface="Cambria Math" panose="02040503050406030204" pitchFamily="18" charset="0"/>
+                                </a:rPr>
+                              </m:ctrlPr>
+                            </m:sSubPr>
+                            <m:e>
+                              <m:r>
+                                <a:rPr lang="en-US" sz="3200" b="1" i="1" smtClean="0">
+                                  <a:latin typeface="Cambria Math" panose="02040503050406030204" pitchFamily="18" charset="0"/>
+                                </a:rPr>
+                                <m:t>𝜺</m:t>
+                              </m:r>
+                              <m:r>
+                                <a:rPr lang="en-US" sz="3200" b="1" i="1" smtClean="0">
+                                  <a:latin typeface="Cambria Math" panose="02040503050406030204" pitchFamily="18" charset="0"/>
+                                </a:rPr>
+                                <m:t>𝓢</m:t>
+                              </m:r>
+                            </m:e>
+                            <m:sub>
+                              <m:r>
+                                <a:rPr lang="en-US" sz="3200" b="1" i="1" smtClean="0">
+                                  <a:latin typeface="Cambria Math" panose="02040503050406030204" pitchFamily="18" charset="0"/>
+                                </a:rPr>
+                                <m:t>𝒏</m:t>
+                              </m:r>
+                            </m:sub>
+                          </m:sSub>
+                        </m:e>
+                      </m:d>
+                      <m:r>
+                        <a:rPr lang="en-US" sz="3200" b="1" i="1" smtClean="0">
+                          <a:latin typeface="Cambria Math" panose="02040503050406030204" pitchFamily="18" charset="0"/>
+                        </a:rPr>
+                        <m:t>=</m:t>
+                      </m:r>
+                      <m:sSub>
+                        <m:sSubPr>
+                          <m:ctrlPr>
+                            <a:rPr lang="en-US" sz="3200" b="1" i="1" smtClean="0">
+                              <a:latin typeface="Cambria Math" panose="02040503050406030204" pitchFamily="18" charset="0"/>
+                            </a:rPr>
+                          </m:ctrlPr>
+                        </m:sSubPr>
+                        <m:e>
+                          <m:r>
+                            <a:rPr lang="en-US" sz="3200" b="1" i="1" smtClean="0">
+                              <a:latin typeface="Cambria Math" panose="02040503050406030204" pitchFamily="18" charset="0"/>
+                            </a:rPr>
+                            <m:t>𝝅</m:t>
+                          </m:r>
+                        </m:e>
+                        <m:sub>
+                          <m:r>
+                            <a:rPr lang="en-US" sz="3200" b="1" i="1" smtClean="0">
+                              <a:latin typeface="Cambria Math" panose="02040503050406030204" pitchFamily="18" charset="0"/>
+                            </a:rPr>
+                            <m:t>𝒏</m:t>
+                          </m:r>
+                        </m:sub>
+                      </m:sSub>
+                      <m:sSup>
+                        <m:sSupPr>
+                          <m:ctrlPr>
+                            <a:rPr lang="en-US" sz="3200" b="1" i="1" smtClean="0">
+                              <a:latin typeface="Cambria Math" panose="02040503050406030204" pitchFamily="18" charset="0"/>
+                            </a:rPr>
+                          </m:ctrlPr>
+                        </m:sSupPr>
+                        <m:e>
+                          <m:r>
+                            <a:rPr lang="en-US" sz="3200" b="1" i="1" smtClean="0">
+                              <a:latin typeface="Cambria Math" panose="02040503050406030204" pitchFamily="18" charset="0"/>
+                            </a:rPr>
+                            <m:t>𝒓</m:t>
+                          </m:r>
+                        </m:e>
+                        <m:sup>
+                          <m:r>
+                            <a:rPr lang="en-US" sz="3200" b="1" i="1" smtClean="0">
+                              <a:latin typeface="Cambria Math" panose="02040503050406030204" pitchFamily="18" charset="0"/>
+                            </a:rPr>
+                            <m:t>𝒏</m:t>
+                          </m:r>
+                        </m:sup>
+                      </m:sSup>
+                      <m:r>
+                        <a:rPr lang="en-US" sz="3200" b="1" i="1" smtClean="0">
+                          <a:latin typeface="Cambria Math" panose="02040503050406030204" pitchFamily="18" charset="0"/>
+                        </a:rPr>
+                        <m:t>−</m:t>
+                      </m:r>
+                      <m:sSub>
+                        <m:sSubPr>
+                          <m:ctrlPr>
+                            <a:rPr lang="en-US" sz="3200" b="1" i="1">
+                              <a:latin typeface="Cambria Math" panose="02040503050406030204" pitchFamily="18" charset="0"/>
+                            </a:rPr>
+                          </m:ctrlPr>
+                        </m:sSubPr>
+                        <m:e>
+                          <m:r>
+                            <a:rPr lang="en-US" sz="3200" b="1" i="1">
+                              <a:latin typeface="Cambria Math" panose="02040503050406030204" pitchFamily="18" charset="0"/>
+                            </a:rPr>
+                            <m:t>𝝅</m:t>
+                          </m:r>
+                        </m:e>
+                        <m:sub>
+                          <m:r>
+                            <a:rPr lang="en-US" sz="3200" b="1" i="1">
+                              <a:latin typeface="Cambria Math" panose="02040503050406030204" pitchFamily="18" charset="0"/>
+                            </a:rPr>
+                            <m:t>𝒏</m:t>
+                          </m:r>
+                        </m:sub>
+                      </m:sSub>
+                      <m:sSup>
+                        <m:sSupPr>
+                          <m:ctrlPr>
+                            <a:rPr lang="en-US" sz="3200" b="1" i="1" smtClean="0">
+                              <a:latin typeface="Cambria Math" panose="02040503050406030204" pitchFamily="18" charset="0"/>
+                            </a:rPr>
+                          </m:ctrlPr>
+                        </m:sSupPr>
+                        <m:e>
+                          <m:r>
+                            <a:rPr lang="en-US" sz="3200" b="1" i="1" smtClean="0">
+                              <a:latin typeface="Cambria Math" panose="02040503050406030204" pitchFamily="18" charset="0"/>
+                            </a:rPr>
+                            <m:t>𝒓</m:t>
+                          </m:r>
+                        </m:e>
+                        <m:sup>
+                          <m:r>
+                            <a:rPr lang="en-US" sz="3200" b="1" i="1" smtClean="0">
+                              <a:latin typeface="Cambria Math" panose="02040503050406030204" pitchFamily="18" charset="0"/>
+                            </a:rPr>
+                            <m:t>𝒏</m:t>
+                          </m:r>
+                        </m:sup>
+                      </m:sSup>
+                      <m:sSup>
+                        <m:sSupPr>
+                          <m:ctrlPr>
+                            <a:rPr lang="en-US" sz="3200" b="1" i="1">
+                              <a:latin typeface="Cambria Math" panose="02040503050406030204" pitchFamily="18" charset="0"/>
+                            </a:rPr>
+                          </m:ctrlPr>
+                        </m:sSupPr>
+                        <m:e>
+                          <m:r>
+                            <a:rPr lang="en-US" sz="3200" b="1" i="1" smtClean="0">
+                              <a:latin typeface="Cambria Math" panose="02040503050406030204" pitchFamily="18" charset="0"/>
+                            </a:rPr>
+                            <m:t>(</m:t>
+                          </m:r>
+                          <m:r>
+                            <a:rPr lang="en-US" sz="3200" b="1" i="1" smtClean="0">
+                              <a:latin typeface="Cambria Math" panose="02040503050406030204" pitchFamily="18" charset="0"/>
+                            </a:rPr>
+                            <m:t>𝟏</m:t>
+                          </m:r>
+                          <m:r>
+                            <a:rPr lang="en-US" sz="3200" b="1" i="1" smtClean="0">
+                              <a:latin typeface="Cambria Math" panose="02040503050406030204" pitchFamily="18" charset="0"/>
+                            </a:rPr>
+                            <m:t>−</m:t>
+                          </m:r>
+                          <m:r>
+                            <a:rPr lang="en-US" sz="3200" b="1" i="1" smtClean="0">
+                              <a:latin typeface="Cambria Math" panose="02040503050406030204" pitchFamily="18" charset="0"/>
+                            </a:rPr>
+                            <m:t>𝜺</m:t>
+                          </m:r>
+                          <m:r>
+                            <a:rPr lang="en-US" sz="3200" b="1" i="1" smtClean="0">
+                              <a:latin typeface="Cambria Math" panose="02040503050406030204" pitchFamily="18" charset="0"/>
+                            </a:rPr>
+                            <m:t>)</m:t>
+                          </m:r>
+                        </m:e>
+                        <m:sup>
+                          <m:r>
+                            <a:rPr lang="en-US" sz="3200" b="1" i="1">
+                              <a:latin typeface="Cambria Math" panose="02040503050406030204" pitchFamily="18" charset="0"/>
+                            </a:rPr>
+                            <m:t>𝒏</m:t>
+                          </m:r>
+                        </m:sup>
+                      </m:sSup>
+                    </m:oMath>
+                  </m:oMathPara>
+                </a14:m>
+                <a:endParaRPr lang="en-US" b="1" dirty="0"/>
+              </a:p>
+              <a:p>
+                <a:pPr marL="0" indent="0" algn="ctr">
+                  <a:lnSpc>
+                    <a:spcPct val="150000"/>
+                  </a:lnSpc>
+                  <a:buNone/>
+                </a:pPr>
+                <a14:m>
+                  <m:oMathPara xmlns:m="http://schemas.openxmlformats.org/officeDocument/2006/math">
+                    <m:oMathParaPr>
+                      <m:jc m:val="centerGroup"/>
+                    </m:oMathParaPr>
+                    <m:oMath xmlns:m="http://schemas.openxmlformats.org/officeDocument/2006/math">
+                      <m:f>
+                        <m:fPr>
+                          <m:ctrlPr>
+                            <a:rPr lang="en-US" sz="2800" b="1" i="1" smtClean="0">
+                              <a:latin typeface="Cambria Math" panose="02040503050406030204" pitchFamily="18" charset="0"/>
+                            </a:rPr>
+                          </m:ctrlPr>
+                        </m:fPr>
+                        <m:num>
+                          <m:sSub>
+                            <m:sSubPr>
+                              <m:ctrlPr>
+                                <a:rPr lang="en-US" sz="2800" b="1" i="1" smtClean="0">
+                                  <a:latin typeface="Cambria Math" panose="02040503050406030204" pitchFamily="18" charset="0"/>
+                                </a:rPr>
+                              </m:ctrlPr>
+                            </m:sSubPr>
+                            <m:e>
+                              <m:r>
+                                <a:rPr lang="en-US" sz="2800" b="1" i="1" smtClean="0">
+                                  <a:latin typeface="Cambria Math" panose="02040503050406030204" pitchFamily="18" charset="0"/>
+                                </a:rPr>
+                                <m:t>𝓥</m:t>
+                              </m:r>
+                            </m:e>
+                            <m:sub>
+                              <m:r>
+                                <a:rPr lang="en-US" sz="2800" b="1" i="1" smtClean="0">
+                                  <a:latin typeface="Cambria Math" panose="02040503050406030204" pitchFamily="18" charset="0"/>
+                                </a:rPr>
+                                <m:t>𝒏</m:t>
+                              </m:r>
+                            </m:sub>
+                          </m:sSub>
+                          <m:d>
+                            <m:dPr>
+                              <m:ctrlPr>
+                                <a:rPr lang="en-US" sz="2800" b="1" i="1" smtClean="0">
+                                  <a:latin typeface="Cambria Math" panose="02040503050406030204" pitchFamily="18" charset="0"/>
+                                </a:rPr>
+                              </m:ctrlPr>
+                            </m:dPr>
+                            <m:e>
+                              <m:sSub>
+                                <m:sSubPr>
+                                  <m:ctrlPr>
+                                    <a:rPr lang="en-US" sz="2800" b="1" i="1" smtClean="0">
+                                      <a:latin typeface="Cambria Math" panose="02040503050406030204" pitchFamily="18" charset="0"/>
+                                    </a:rPr>
+                                  </m:ctrlPr>
+                                </m:sSubPr>
+                                <m:e>
+                                  <m:r>
+                                    <a:rPr lang="en-US" sz="2800" b="1" i="1" smtClean="0">
+                                      <a:latin typeface="Cambria Math" panose="02040503050406030204" pitchFamily="18" charset="0"/>
+                                    </a:rPr>
+                                    <m:t>𝜺</m:t>
+                                  </m:r>
+                                  <m:r>
+                                    <a:rPr lang="en-US" sz="2800" b="1" i="1" smtClean="0">
+                                      <a:latin typeface="Cambria Math" panose="02040503050406030204" pitchFamily="18" charset="0"/>
+                                    </a:rPr>
+                                    <m:t>𝓢</m:t>
+                                  </m:r>
+                                </m:e>
+                                <m:sub>
+                                  <m:r>
+                                    <a:rPr lang="en-US" sz="2800" b="1" i="1" smtClean="0">
+                                      <a:latin typeface="Cambria Math" panose="02040503050406030204" pitchFamily="18" charset="0"/>
+                                    </a:rPr>
+                                    <m:t>𝒏</m:t>
+                                  </m:r>
+                                </m:sub>
+                              </m:sSub>
+                            </m:e>
+                          </m:d>
+                        </m:num>
+                        <m:den>
+                          <m:sSub>
+                            <m:sSubPr>
+                              <m:ctrlPr>
+                                <a:rPr lang="en-US" b="1" i="1">
+                                  <a:latin typeface="Cambria Math" panose="02040503050406030204" pitchFamily="18" charset="0"/>
+                                </a:rPr>
+                              </m:ctrlPr>
+                            </m:sSubPr>
+                            <m:e>
+                              <m:r>
+                                <a:rPr lang="en-US" b="1" i="1">
+                                  <a:latin typeface="Cambria Math" panose="02040503050406030204" pitchFamily="18" charset="0"/>
+                                </a:rPr>
+                                <m:t>𝓥</m:t>
+                              </m:r>
+                            </m:e>
+                            <m:sub>
+                              <m:r>
+                                <a:rPr lang="en-US" b="1" i="1">
+                                  <a:latin typeface="Cambria Math" panose="02040503050406030204" pitchFamily="18" charset="0"/>
+                                </a:rPr>
+                                <m:t>𝒏</m:t>
+                              </m:r>
+                            </m:sub>
+                          </m:sSub>
+                          <m:d>
+                            <m:dPr>
+                              <m:ctrlPr>
+                                <a:rPr lang="en-US" b="1" i="1">
+                                  <a:latin typeface="Cambria Math" panose="02040503050406030204" pitchFamily="18" charset="0"/>
+                                </a:rPr>
+                              </m:ctrlPr>
+                            </m:dPr>
+                            <m:e>
+                              <m:sSub>
+                                <m:sSubPr>
+                                  <m:ctrlPr>
+                                    <a:rPr lang="en-US" b="1" i="1">
+                                      <a:latin typeface="Cambria Math" panose="02040503050406030204" pitchFamily="18" charset="0"/>
+                                    </a:rPr>
+                                  </m:ctrlPr>
+                                </m:sSubPr>
+                                <m:e>
+                                  <m:r>
+                                    <a:rPr lang="en-US" b="1" i="1">
+                                      <a:latin typeface="Cambria Math" panose="02040503050406030204" pitchFamily="18" charset="0"/>
+                                    </a:rPr>
+                                    <m:t>𝓑</m:t>
+                                  </m:r>
+                                </m:e>
+                                <m:sub>
+                                  <m:r>
+                                    <a:rPr lang="en-US" b="1" i="1">
+                                      <a:latin typeface="Cambria Math" panose="02040503050406030204" pitchFamily="18" charset="0"/>
+                                    </a:rPr>
+                                    <m:t>𝒏</m:t>
+                                  </m:r>
+                                </m:sub>
+                              </m:sSub>
+                            </m:e>
+                          </m:d>
+                        </m:den>
+                      </m:f>
+                      <m:r>
+                        <a:rPr lang="en-US" sz="2800" b="1" i="1" smtClean="0">
+                          <a:latin typeface="Cambria Math" panose="02040503050406030204" pitchFamily="18" charset="0"/>
+                        </a:rPr>
+                        <m:t>=</m:t>
+                      </m:r>
+                      <m:r>
+                        <a:rPr lang="en-US" sz="2800" b="1" i="1" smtClean="0">
+                          <a:latin typeface="Cambria Math" panose="02040503050406030204" pitchFamily="18" charset="0"/>
+                        </a:rPr>
+                        <m:t>𝟏</m:t>
+                      </m:r>
+                      <m:r>
+                        <a:rPr lang="en-US" sz="2800" b="1" i="1" smtClean="0">
+                          <a:latin typeface="Cambria Math" panose="02040503050406030204" pitchFamily="18" charset="0"/>
+                        </a:rPr>
+                        <m:t>−</m:t>
+                      </m:r>
+                      <m:sSup>
+                        <m:sSupPr>
+                          <m:ctrlPr>
+                            <a:rPr lang="en-US" sz="2800" b="1" i="1" smtClean="0">
+                              <a:latin typeface="Cambria Math" panose="02040503050406030204" pitchFamily="18" charset="0"/>
+                            </a:rPr>
+                          </m:ctrlPr>
+                        </m:sSupPr>
+                        <m:e>
+                          <m:d>
+                            <m:dPr>
+                              <m:ctrlPr>
+                                <a:rPr lang="en-US" sz="2800" b="1" i="1" smtClean="0">
+                                  <a:latin typeface="Cambria Math" panose="02040503050406030204" pitchFamily="18" charset="0"/>
+                                </a:rPr>
+                              </m:ctrlPr>
+                            </m:dPr>
+                            <m:e>
+                              <m:r>
+                                <a:rPr lang="en-US" sz="2800" b="1" i="1" smtClean="0">
+                                  <a:latin typeface="Cambria Math" panose="02040503050406030204" pitchFamily="18" charset="0"/>
+                                </a:rPr>
+                                <m:t>𝟏</m:t>
+                              </m:r>
+                              <m:r>
+                                <a:rPr lang="en-US" sz="2800" b="1" i="1" smtClean="0">
+                                  <a:latin typeface="Cambria Math" panose="02040503050406030204" pitchFamily="18" charset="0"/>
+                                </a:rPr>
+                                <m:t>−</m:t>
+                              </m:r>
+                              <m:r>
+                                <a:rPr lang="en-US" sz="2800" b="1" i="1" smtClean="0">
+                                  <a:latin typeface="Cambria Math" panose="02040503050406030204" pitchFamily="18" charset="0"/>
+                                </a:rPr>
+                                <m:t>𝜺</m:t>
+                              </m:r>
+                            </m:e>
+                          </m:d>
+                        </m:e>
+                        <m:sup>
+                          <m:r>
+                            <a:rPr lang="en-US" sz="2800" b="1" i="1" smtClean="0">
+                              <a:latin typeface="Cambria Math" panose="02040503050406030204" pitchFamily="18" charset="0"/>
+                            </a:rPr>
+                            <m:t>𝒏</m:t>
+                          </m:r>
+                        </m:sup>
+                      </m:sSup>
+                    </m:oMath>
+                  </m:oMathPara>
+                </a14:m>
+                <a:endParaRPr lang="en-US" sz="2800" b="1" dirty="0"/>
+              </a:p>
+            </p:txBody>
+          </p:sp>
+        </mc:Choice>
+        <mc:Fallback>
+          <p:sp>
+            <p:nvSpPr>
+              <p:cNvPr id="3" name="Content Placeholder 2">
+                <a:extLst>
+                  <a:ext uri="{FF2B5EF4-FFF2-40B4-BE49-F238E27FC236}">
+                    <a16:creationId xmlns:a16="http://schemas.microsoft.com/office/drawing/2014/main" id="{52ADD80A-04AB-65F4-C5CE-8EE8137D6514}"/>
+                  </a:ext>
+                </a:extLst>
+              </p:cNvPr>
+              <p:cNvSpPr>
+                <a:spLocks noGrp="1" noRot="1" noChangeAspect="1" noMove="1" noResize="1" noEditPoints="1" noAdjustHandles="1" noChangeArrowheads="1" noChangeShapeType="1" noTextEdit="1"/>
+              </p:cNvSpPr>
+              <p:nvPr>
+                <p:ph idx="1"/>
+              </p:nvPr>
+            </p:nvSpPr>
+            <p:spPr>
+              <a:blipFill>
+                <a:blip r:embed="rId3"/>
+                <a:stretch>
+                  <a:fillRect/>
+                </a:stretch>
+              </a:blipFill>
+            </p:spPr>
+            <p:txBody>
+              <a:bodyPr/>
+              <a:lstStyle/>
+              <a:p>
+                <a:r>
+                  <a:rPr lang="en-US">
+                    <a:noFill/>
+                  </a:rPr>
+                  <a:t> </a:t>
+                </a:r>
+              </a:p>
+            </p:txBody>
+          </p:sp>
+        </mc:Fallback>
+      </mc:AlternateContent>
+      <mc:AlternateContent xmlns:mc="http://schemas.openxmlformats.org/markup-compatibility/2006">
+        <mc:Choice xmlns:a14="http://schemas.microsoft.com/office/drawing/2010/main" Requires="a14">
+          <p:sp>
+            <p:nvSpPr>
+              <p:cNvPr id="4" name="TextBox 3">
+                <a:extLst>
+                  <a:ext uri="{FF2B5EF4-FFF2-40B4-BE49-F238E27FC236}">
+                    <a16:creationId xmlns:a16="http://schemas.microsoft.com/office/drawing/2014/main" id="{0B31835B-E942-5970-70C4-863E5F73CF60}"/>
+                  </a:ext>
+                </a:extLst>
+              </p:cNvPr>
+              <p:cNvSpPr txBox="1"/>
+              <p:nvPr/>
+            </p:nvSpPr>
+            <p:spPr>
+              <a:xfrm>
+                <a:off x="9111968" y="3917950"/>
+                <a:ext cx="2241832" cy="523220"/>
+              </a:xfrm>
+              <a:prstGeom prst="rect">
+                <a:avLst/>
+              </a:prstGeom>
+              <a:noFill/>
+            </p:spPr>
+            <p:txBody>
+              <a:bodyPr wrap="none" rtlCol="0">
+                <a:spAutoFit/>
+              </a:bodyPr>
+              <a:lstStyle/>
+              <a:p>
+                <a:r>
+                  <a:rPr lang="en-US" sz="2800" dirty="0"/>
+                  <a:t>(as </a:t>
+                </a:r>
+                <a14:m>
+                  <m:oMath xmlns:m="http://schemas.openxmlformats.org/officeDocument/2006/math">
+                    <m:r>
+                      <a:rPr lang="en-US" sz="2800" b="0" i="1" smtClean="0">
+                        <a:latin typeface="Cambria Math" panose="02040503050406030204" pitchFamily="18" charset="0"/>
+                      </a:rPr>
+                      <m:t>𝑛</m:t>
+                    </m:r>
+                    <m:r>
+                      <a:rPr lang="en-US" sz="2800" b="0" i="1" smtClean="0">
+                        <a:latin typeface="Cambria Math" panose="02040503050406030204" pitchFamily="18" charset="0"/>
+                      </a:rPr>
+                      <m:t> → +∞</m:t>
+                    </m:r>
+                  </m:oMath>
+                </a14:m>
+                <a:r>
+                  <a:rPr lang="en-US" sz="2800" dirty="0"/>
+                  <a:t>)</a:t>
+                </a:r>
+              </a:p>
+            </p:txBody>
+          </p:sp>
+        </mc:Choice>
+        <mc:Fallback>
+          <p:sp>
+            <p:nvSpPr>
+              <p:cNvPr id="4" name="TextBox 3">
+                <a:extLst>
+                  <a:ext uri="{FF2B5EF4-FFF2-40B4-BE49-F238E27FC236}">
+                    <a16:creationId xmlns:a16="http://schemas.microsoft.com/office/drawing/2014/main" id="{0B31835B-E942-5970-70C4-863E5F73CF60}"/>
+                  </a:ext>
+                </a:extLst>
+              </p:cNvPr>
+              <p:cNvSpPr txBox="1">
+                <a:spLocks noRot="1" noChangeAspect="1" noMove="1" noResize="1" noEditPoints="1" noAdjustHandles="1" noChangeArrowheads="1" noChangeShapeType="1" noTextEdit="1"/>
+              </p:cNvSpPr>
+              <p:nvPr/>
+            </p:nvSpPr>
+            <p:spPr>
+              <a:xfrm>
+                <a:off x="9111968" y="3917950"/>
+                <a:ext cx="2241832" cy="523220"/>
+              </a:xfrm>
+              <a:prstGeom prst="rect">
+                <a:avLst/>
+              </a:prstGeom>
+              <a:blipFill>
+                <a:blip r:embed="rId4"/>
+                <a:stretch>
+                  <a:fillRect l="-5707" t="-11628" r="-4620" b="-32558"/>
+                </a:stretch>
+              </a:blipFill>
+            </p:spPr>
+            <p:txBody>
+              <a:bodyPr/>
+              <a:lstStyle/>
+              <a:p>
+                <a:r>
+                  <a:rPr lang="en-US">
+                    <a:noFill/>
+                  </a:rPr>
+                  <a:t> </a:t>
+                </a:r>
+              </a:p>
+            </p:txBody>
+          </p:sp>
+        </mc:Fallback>
+      </mc:AlternateContent>
+      <mc:AlternateContent xmlns:mc="http://schemas.openxmlformats.org/markup-compatibility/2006">
+        <mc:Choice xmlns:a14="http://schemas.microsoft.com/office/drawing/2010/main" Requires="a14">
+          <p:sp>
+            <p:nvSpPr>
+              <p:cNvPr id="5" name="TextBox 4">
+                <a:extLst>
+                  <a:ext uri="{FF2B5EF4-FFF2-40B4-BE49-F238E27FC236}">
+                    <a16:creationId xmlns:a16="http://schemas.microsoft.com/office/drawing/2014/main" id="{E1D53007-14D6-786C-A3F0-2A82AF0BBD84}"/>
+                  </a:ext>
+                </a:extLst>
+              </p:cNvPr>
+              <p:cNvSpPr txBox="1"/>
+              <p:nvPr/>
+            </p:nvSpPr>
+            <p:spPr>
+              <a:xfrm>
+                <a:off x="7847524" y="3917950"/>
+                <a:ext cx="882357" cy="523220"/>
+              </a:xfrm>
+              <a:prstGeom prst="rect">
+                <a:avLst/>
+              </a:prstGeom>
+              <a:noFill/>
+            </p:spPr>
+            <p:txBody>
+              <a:bodyPr wrap="none" rtlCol="0">
+                <a:spAutoFit/>
+              </a:bodyPr>
+              <a:lstStyle/>
+              <a:p>
+                <a14:m>
+                  <m:oMathPara xmlns:m="http://schemas.openxmlformats.org/officeDocument/2006/math">
+                    <m:oMathParaPr>
+                      <m:jc m:val="centerGroup"/>
+                    </m:oMathParaPr>
+                    <m:oMath xmlns:m="http://schemas.openxmlformats.org/officeDocument/2006/math">
+                      <m:r>
+                        <a:rPr lang="en-US" sz="2800" b="1" i="1" smtClean="0">
+                          <a:latin typeface="Cambria Math" panose="02040503050406030204" pitchFamily="18" charset="0"/>
+                        </a:rPr>
+                        <m:t>→</m:t>
+                      </m:r>
+                      <m:r>
+                        <a:rPr lang="en-US" sz="2800" b="1" i="1" smtClean="0">
+                          <a:latin typeface="Cambria Math" panose="02040503050406030204" pitchFamily="18" charset="0"/>
+                        </a:rPr>
+                        <m:t>𝟎</m:t>
+                      </m:r>
+                    </m:oMath>
+                  </m:oMathPara>
+                </a14:m>
+                <a:endParaRPr lang="en-US" sz="2800" dirty="0"/>
+              </a:p>
+            </p:txBody>
+          </p:sp>
+        </mc:Choice>
+        <mc:Fallback>
+          <p:sp>
+            <p:nvSpPr>
+              <p:cNvPr id="5" name="TextBox 4">
+                <a:extLst>
+                  <a:ext uri="{FF2B5EF4-FFF2-40B4-BE49-F238E27FC236}">
+                    <a16:creationId xmlns:a16="http://schemas.microsoft.com/office/drawing/2014/main" id="{E1D53007-14D6-786C-A3F0-2A82AF0BBD84}"/>
+                  </a:ext>
+                </a:extLst>
+              </p:cNvPr>
+              <p:cNvSpPr txBox="1">
+                <a:spLocks noRot="1" noChangeAspect="1" noMove="1" noResize="1" noEditPoints="1" noAdjustHandles="1" noChangeArrowheads="1" noChangeShapeType="1" noTextEdit="1"/>
+              </p:cNvSpPr>
+              <p:nvPr/>
+            </p:nvSpPr>
+            <p:spPr>
+              <a:xfrm>
+                <a:off x="7847524" y="3917950"/>
+                <a:ext cx="882357" cy="523220"/>
+              </a:xfrm>
+              <a:prstGeom prst="rect">
+                <a:avLst/>
+              </a:prstGeom>
+              <a:blipFill>
+                <a:blip r:embed="rId5"/>
+                <a:stretch>
+                  <a:fillRect/>
+                </a:stretch>
+              </a:blipFill>
+            </p:spPr>
+            <p:txBody>
+              <a:bodyPr/>
+              <a:lstStyle/>
+              <a:p>
+                <a:r>
+                  <a:rPr lang="en-US">
+                    <a:noFill/>
+                  </a:rPr>
+                  <a:t> </a:t>
+                </a:r>
+              </a:p>
+            </p:txBody>
+          </p:sp>
+        </mc:Fallback>
+      </mc:AlternateContent>
+    </p:spTree>
+    <p:extLst>
+      <p:ext uri="{BB962C8B-B14F-4D97-AF65-F5344CB8AC3E}">
+        <p14:creationId xmlns:p14="http://schemas.microsoft.com/office/powerpoint/2010/main" val="1294955237"/>
+      </p:ext>
+    </p:extLst>
+  </p:cSld>
+  <p:clrMapOvr>
+    <a:masterClrMapping/>
+  </p:clrMapOvr>
+</p:sld>
+</file>
+
+<file path=ppt/slides/slide15.xml><?xml version="1.0" encoding="utf-8"?>
 <p:sld xmlns:a="http://schemas.openxmlformats.org/drawingml/2006/main" xmlns:r="http://schemas.openxmlformats.org/officeDocument/2006/relationships" xmlns:p="http://schemas.openxmlformats.org/presentationml/2006/main" show="0">
   <p:cSld>
     <p:spTree>
@@ -8118,7 +9132,7 @@
 </p:sld>
 </file>
 
-<file path=ppt/slides/slide15.xml><?xml version="1.0" encoding="utf-8"?>
+<file path=ppt/slides/slide16.xml><?xml version="1.0" encoding="utf-8"?>
 <p:sld xmlns:a="http://schemas.openxmlformats.org/drawingml/2006/main" xmlns:r="http://schemas.openxmlformats.org/officeDocument/2006/relationships" xmlns:p="http://schemas.openxmlformats.org/presentationml/2006/main">
   <p:cSld>
     <p:spTree>
@@ -8312,7 +9326,7 @@
 </p:sld>
 </file>
 
-<file path=ppt/slides/slide16.xml><?xml version="1.0" encoding="utf-8"?>
+<file path=ppt/slides/slide17.xml><?xml version="1.0" encoding="utf-8"?>
 <p:sld xmlns:a="http://schemas.openxmlformats.org/drawingml/2006/main" xmlns:r="http://schemas.openxmlformats.org/officeDocument/2006/relationships" xmlns:p="http://schemas.openxmlformats.org/presentationml/2006/main">
   <p:cSld>
     <p:spTree>
@@ -8951,7 +9965,7 @@
 </p:sld>
 </file>
 
-<file path=ppt/slides/slide17.xml><?xml version="1.0" encoding="utf-8"?>
+<file path=ppt/slides/slide18.xml><?xml version="1.0" encoding="utf-8"?>
 <p:sld xmlns:a="http://schemas.openxmlformats.org/drawingml/2006/main" xmlns:r="http://schemas.openxmlformats.org/officeDocument/2006/relationships" xmlns:p="http://schemas.openxmlformats.org/presentationml/2006/main">
   <p:cSld>
     <p:spTree>
@@ -10862,7 +11876,7 @@
 </p:sld>
 </file>
 
-<file path=ppt/slides/slide18.xml><?xml version="1.0" encoding="utf-8"?>
+<file path=ppt/slides/slide19.xml><?xml version="1.0" encoding="utf-8"?>
 <p:sld xmlns:a="http://schemas.openxmlformats.org/drawingml/2006/main" xmlns:r="http://schemas.openxmlformats.org/officeDocument/2006/relationships" xmlns:p="http://schemas.openxmlformats.org/presentationml/2006/main">
   <p:cSld>
     <p:spTree>
@@ -12771,99 +13785,6 @@
 </p:sld>
 </file>
 
-<file path=ppt/slides/slide19.xml><?xml version="1.0" encoding="utf-8"?>
-<p:sld xmlns:a="http://schemas.openxmlformats.org/drawingml/2006/main" xmlns:r="http://schemas.openxmlformats.org/officeDocument/2006/relationships" xmlns:p="http://schemas.openxmlformats.org/presentationml/2006/main" show="0">
-  <p:cSld>
-    <p:spTree>
-      <p:nvGrpSpPr>
-        <p:cNvPr id="1" name=""/>
-        <p:cNvGrpSpPr/>
-        <p:nvPr/>
-      </p:nvGrpSpPr>
-      <p:grpSpPr>
-        <a:xfrm>
-          <a:off x="0" y="0"/>
-          <a:ext cx="0" cy="0"/>
-          <a:chOff x="0" y="0"/>
-          <a:chExt cx="0" cy="0"/>
-        </a:xfrm>
-      </p:grpSpPr>
-      <p:sp>
-        <p:nvSpPr>
-          <p:cNvPr id="2" name="Title 1">
-            <a:extLst>
-              <a:ext uri="{FF2B5EF4-FFF2-40B4-BE49-F238E27FC236}">
-                <a16:creationId xmlns:a16="http://schemas.microsoft.com/office/drawing/2014/main" id="{970BC690-40CA-30C2-4E91-661B86D51731}"/>
-              </a:ext>
-            </a:extLst>
-          </p:cNvPr>
-          <p:cNvSpPr>
-            <a:spLocks noGrp="1"/>
-          </p:cNvSpPr>
-          <p:nvPr>
-            <p:ph type="title"/>
-          </p:nvPr>
-        </p:nvSpPr>
-        <p:spPr/>
-        <p:txBody>
-          <a:bodyPr/>
-          <a:lstStyle/>
-          <a:p>
-            <a:r>
-              <a:rPr lang="en-US" dirty="0"/>
-              <a:t>8 balls paradox</a:t>
-            </a:r>
-          </a:p>
-        </p:txBody>
-      </p:sp>
-      <p:pic>
-        <p:nvPicPr>
-          <p:cNvPr id="5" name="Content Placeholder 4" descr="A group of spheres with a red center&#10;&#10;Description automatically generated">
-            <a:extLst>
-              <a:ext uri="{FF2B5EF4-FFF2-40B4-BE49-F238E27FC236}">
-                <a16:creationId xmlns:a16="http://schemas.microsoft.com/office/drawing/2014/main" id="{69A91BBA-9C9C-CD55-E284-F83F895A3387}"/>
-              </a:ext>
-            </a:extLst>
-          </p:cNvPr>
-          <p:cNvPicPr>
-            <a:picLocks noGrp="1" noChangeAspect="1"/>
-          </p:cNvPicPr>
-          <p:nvPr>
-            <p:ph idx="1"/>
-          </p:nvPr>
-        </p:nvPicPr>
-        <p:blipFill>
-          <a:blip r:embed="rId2">
-            <a:extLst>
-              <a:ext uri="{28A0092B-C50C-407E-A947-70E740481C1C}">
-                <a14:useLocalDpi xmlns:a14="http://schemas.microsoft.com/office/drawing/2010/main" val="0"/>
-              </a:ext>
-            </a:extLst>
-          </a:blip>
-          <a:stretch>
-            <a:fillRect/>
-          </a:stretch>
-        </p:blipFill>
-        <p:spPr>
-          <a:xfrm>
-            <a:off x="3578413" y="1144588"/>
-            <a:ext cx="5035174" cy="5713412"/>
-          </a:xfrm>
-        </p:spPr>
-      </p:pic>
-    </p:spTree>
-    <p:extLst>
-      <p:ext uri="{BB962C8B-B14F-4D97-AF65-F5344CB8AC3E}">
-        <p14:creationId xmlns:p14="http://schemas.microsoft.com/office/powerpoint/2010/main" val="3136315998"/>
-      </p:ext>
-    </p:extLst>
-  </p:cSld>
-  <p:clrMapOvr>
-    <a:masterClrMapping/>
-  </p:clrMapOvr>
-</p:sld>
-</file>
-
 <file path=ppt/slides/slide2.xml><?xml version="1.0" encoding="utf-8"?>
 <p:sld xmlns:a="http://schemas.openxmlformats.org/drawingml/2006/main" xmlns:r="http://schemas.openxmlformats.org/officeDocument/2006/relationships" xmlns:p="http://schemas.openxmlformats.org/presentationml/2006/main">
   <p:cSld>
@@ -13034,6 +13955,99 @@
 </file>
 
 <file path=ppt/slides/slide20.xml><?xml version="1.0" encoding="utf-8"?>
+<p:sld xmlns:a="http://schemas.openxmlformats.org/drawingml/2006/main" xmlns:r="http://schemas.openxmlformats.org/officeDocument/2006/relationships" xmlns:p="http://schemas.openxmlformats.org/presentationml/2006/main" show="0">
+  <p:cSld>
+    <p:spTree>
+      <p:nvGrpSpPr>
+        <p:cNvPr id="1" name=""/>
+        <p:cNvGrpSpPr/>
+        <p:nvPr/>
+      </p:nvGrpSpPr>
+      <p:grpSpPr>
+        <a:xfrm>
+          <a:off x="0" y="0"/>
+          <a:ext cx="0" cy="0"/>
+          <a:chOff x="0" y="0"/>
+          <a:chExt cx="0" cy="0"/>
+        </a:xfrm>
+      </p:grpSpPr>
+      <p:sp>
+        <p:nvSpPr>
+          <p:cNvPr id="2" name="Title 1">
+            <a:extLst>
+              <a:ext uri="{FF2B5EF4-FFF2-40B4-BE49-F238E27FC236}">
+                <a16:creationId xmlns:a16="http://schemas.microsoft.com/office/drawing/2014/main" id="{970BC690-40CA-30C2-4E91-661B86D51731}"/>
+              </a:ext>
+            </a:extLst>
+          </p:cNvPr>
+          <p:cNvSpPr>
+            <a:spLocks noGrp="1"/>
+          </p:cNvSpPr>
+          <p:nvPr>
+            <p:ph type="title"/>
+          </p:nvPr>
+        </p:nvSpPr>
+        <p:spPr/>
+        <p:txBody>
+          <a:bodyPr/>
+          <a:lstStyle/>
+          <a:p>
+            <a:r>
+              <a:rPr lang="en-US" dirty="0"/>
+              <a:t>8 balls paradox</a:t>
+            </a:r>
+          </a:p>
+        </p:txBody>
+      </p:sp>
+      <p:pic>
+        <p:nvPicPr>
+          <p:cNvPr id="5" name="Content Placeholder 4" descr="A group of spheres with a red center&#10;&#10;Description automatically generated">
+            <a:extLst>
+              <a:ext uri="{FF2B5EF4-FFF2-40B4-BE49-F238E27FC236}">
+                <a16:creationId xmlns:a16="http://schemas.microsoft.com/office/drawing/2014/main" id="{69A91BBA-9C9C-CD55-E284-F83F895A3387}"/>
+              </a:ext>
+            </a:extLst>
+          </p:cNvPr>
+          <p:cNvPicPr>
+            <a:picLocks noGrp="1" noChangeAspect="1"/>
+          </p:cNvPicPr>
+          <p:nvPr>
+            <p:ph idx="1"/>
+          </p:nvPr>
+        </p:nvPicPr>
+        <p:blipFill>
+          <a:blip r:embed="rId2">
+            <a:extLst>
+              <a:ext uri="{28A0092B-C50C-407E-A947-70E740481C1C}">
+                <a14:useLocalDpi xmlns:a14="http://schemas.microsoft.com/office/drawing/2010/main" val="0"/>
+              </a:ext>
+            </a:extLst>
+          </a:blip>
+          <a:stretch>
+            <a:fillRect/>
+          </a:stretch>
+        </p:blipFill>
+        <p:spPr>
+          <a:xfrm>
+            <a:off x="3578413" y="1144588"/>
+            <a:ext cx="5035174" cy="5713412"/>
+          </a:xfrm>
+        </p:spPr>
+      </p:pic>
+    </p:spTree>
+    <p:extLst>
+      <p:ext uri="{BB962C8B-B14F-4D97-AF65-F5344CB8AC3E}">
+        <p14:creationId xmlns:p14="http://schemas.microsoft.com/office/powerpoint/2010/main" val="3136315998"/>
+      </p:ext>
+    </p:extLst>
+  </p:cSld>
+  <p:clrMapOvr>
+    <a:masterClrMapping/>
+  </p:clrMapOvr>
+</p:sld>
+</file>
+
+<file path=ppt/slides/slide21.xml><?xml version="1.0" encoding="utf-8"?>
 <p:sld xmlns:a="http://schemas.openxmlformats.org/drawingml/2006/main" xmlns:r="http://schemas.openxmlformats.org/officeDocument/2006/relationships" xmlns:p="http://schemas.openxmlformats.org/presentationml/2006/main">
   <p:cSld>
     <p:spTree>
@@ -13426,7 +14440,7 @@
 </p:sld>
 </file>
 
-<file path=ppt/slides/slide21.xml><?xml version="1.0" encoding="utf-8"?>
+<file path=ppt/slides/slide22.xml><?xml version="1.0" encoding="utf-8"?>
 <p:sld xmlns:a="http://schemas.openxmlformats.org/drawingml/2006/main" xmlns:r="http://schemas.openxmlformats.org/officeDocument/2006/relationships" xmlns:p="http://schemas.openxmlformats.org/presentationml/2006/main">
   <p:cSld>
     <p:spTree>
@@ -13918,7 +14932,7 @@
 </p:sld>
 </file>
 
-<file path=ppt/slides/slide22.xml><?xml version="1.0" encoding="utf-8"?>
+<file path=ppt/slides/slide23.xml><?xml version="1.0" encoding="utf-8"?>
 <p:sld xmlns:a="http://schemas.openxmlformats.org/drawingml/2006/main" xmlns:r="http://schemas.openxmlformats.org/officeDocument/2006/relationships" xmlns:p="http://schemas.openxmlformats.org/presentationml/2006/main">
   <p:cSld>
     <p:spTree>
@@ -14285,7 +15299,7 @@
 </p:sld>
 </file>
 
-<file path=ppt/slides/slide23.xml><?xml version="1.0" encoding="utf-8"?>
+<file path=ppt/slides/slide24.xml><?xml version="1.0" encoding="utf-8"?>
 <p:sld xmlns:a="http://schemas.openxmlformats.org/drawingml/2006/main" xmlns:r="http://schemas.openxmlformats.org/officeDocument/2006/relationships" xmlns:p="http://schemas.openxmlformats.org/presentationml/2006/main">
   <p:cSld>
     <p:spTree>
@@ -15009,7 +16023,7 @@
 </p:sld>
 </file>
 
-<file path=ppt/slides/slide24.xml><?xml version="1.0" encoding="utf-8"?>
+<file path=ppt/slides/slide25.xml><?xml version="1.0" encoding="utf-8"?>
 <p:sld xmlns:a="http://schemas.openxmlformats.org/drawingml/2006/main" xmlns:r="http://schemas.openxmlformats.org/officeDocument/2006/relationships" xmlns:p="http://schemas.openxmlformats.org/presentationml/2006/main">
   <p:cSld>
     <p:spTree>
@@ -15608,7 +16622,7 @@
 </p:sld>
 </file>
 
-<file path=ppt/slides/slide25.xml><?xml version="1.0" encoding="utf-8"?>
+<file path=ppt/slides/slide26.xml><?xml version="1.0" encoding="utf-8"?>
 <p:sld xmlns:a="http://schemas.openxmlformats.org/drawingml/2006/main" xmlns:r="http://schemas.openxmlformats.org/officeDocument/2006/relationships" xmlns:p="http://schemas.openxmlformats.org/presentationml/2006/main">
   <p:cSld>
     <p:spTree>
@@ -17260,7 +18274,7 @@
 </p:sld>
 </file>
 
-<file path=ppt/slides/slide26.xml><?xml version="1.0" encoding="utf-8"?>
+<file path=ppt/slides/slide27.xml><?xml version="1.0" encoding="utf-8"?>
 <p:sld xmlns:a="http://schemas.openxmlformats.org/drawingml/2006/main" xmlns:r="http://schemas.openxmlformats.org/officeDocument/2006/relationships" xmlns:p="http://schemas.openxmlformats.org/presentationml/2006/main">
   <p:cSld>
     <p:spTree>
@@ -18330,7 +19344,7 @@
 </p:sld>
 </file>
 
-<file path=ppt/slides/slide27.xml><?xml version="1.0" encoding="utf-8"?>
+<file path=ppt/slides/slide28.xml><?xml version="1.0" encoding="utf-8"?>
 <p:sld xmlns:a="http://schemas.openxmlformats.org/drawingml/2006/main" xmlns:r="http://schemas.openxmlformats.org/officeDocument/2006/relationships" xmlns:p="http://schemas.openxmlformats.org/presentationml/2006/main">
   <p:cSld>
     <p:spTree>
@@ -20078,7 +21092,7 @@
 </p:sld>
 </file>
 
-<file path=ppt/slides/slide28.xml><?xml version="1.0" encoding="utf-8"?>
+<file path=ppt/slides/slide29.xml><?xml version="1.0" encoding="utf-8"?>
 <p:sld xmlns:a="http://schemas.openxmlformats.org/drawingml/2006/main" xmlns:r="http://schemas.openxmlformats.org/officeDocument/2006/relationships" xmlns:p="http://schemas.openxmlformats.org/presentationml/2006/main">
   <p:cSld>
     <p:spTree>
@@ -20171,7 +21185,94 @@
 </p:sld>
 </file>
 
-<file path=ppt/slides/slide29.xml><?xml version="1.0" encoding="utf-8"?>
+<file path=ppt/slides/slide3.xml><?xml version="1.0" encoding="utf-8"?>
+<p:sld xmlns:a="http://schemas.openxmlformats.org/drawingml/2006/main" xmlns:r="http://schemas.openxmlformats.org/officeDocument/2006/relationships" xmlns:p="http://schemas.openxmlformats.org/presentationml/2006/main">
+  <p:cSld>
+    <p:spTree>
+      <p:nvGrpSpPr>
+        <p:cNvPr id="1" name=""/>
+        <p:cNvGrpSpPr/>
+        <p:nvPr/>
+      </p:nvGrpSpPr>
+      <p:grpSpPr>
+        <a:xfrm>
+          <a:off x="0" y="0"/>
+          <a:ext cx="0" cy="0"/>
+          <a:chOff x="0" y="0"/>
+          <a:chExt cx="0" cy="0"/>
+        </a:xfrm>
+      </p:grpSpPr>
+      <p:sp>
+        <p:nvSpPr>
+          <p:cNvPr id="2" name="Title 1">
+            <a:extLst>
+              <a:ext uri="{FF2B5EF4-FFF2-40B4-BE49-F238E27FC236}">
+                <a16:creationId xmlns:a16="http://schemas.microsoft.com/office/drawing/2014/main" id="{CC4E5699-F629-549D-6652-8D97A182EC5D}"/>
+              </a:ext>
+            </a:extLst>
+          </p:cNvPr>
+          <p:cNvSpPr>
+            <a:spLocks noGrp="1"/>
+          </p:cNvSpPr>
+          <p:nvPr>
+            <p:ph type="title"/>
+          </p:nvPr>
+        </p:nvSpPr>
+        <p:spPr/>
+        <p:txBody>
+          <a:bodyPr/>
+          <a:lstStyle/>
+          <a:p>
+            <a:r>
+              <a:rPr lang="en-US" dirty="0"/>
+              <a:t>Curse of dimensionality</a:t>
+            </a:r>
+          </a:p>
+        </p:txBody>
+      </p:sp>
+      <p:pic>
+        <p:nvPicPr>
+          <p:cNvPr id="9" name="Content Placeholder 8">
+            <a:extLst>
+              <a:ext uri="{FF2B5EF4-FFF2-40B4-BE49-F238E27FC236}">
+                <a16:creationId xmlns:a16="http://schemas.microsoft.com/office/drawing/2014/main" id="{5A9EDBF9-D77D-D77B-137E-F61D5A6A3146}"/>
+              </a:ext>
+            </a:extLst>
+          </p:cNvPr>
+          <p:cNvPicPr>
+            <a:picLocks noGrp="1" noChangeAspect="1"/>
+          </p:cNvPicPr>
+          <p:nvPr>
+            <p:ph idx="1"/>
+          </p:nvPr>
+        </p:nvPicPr>
+        <p:blipFill>
+          <a:blip r:embed="rId2"/>
+          <a:stretch>
+            <a:fillRect/>
+          </a:stretch>
+        </p:blipFill>
+        <p:spPr>
+          <a:xfrm>
+            <a:off x="3163502" y="1690688"/>
+            <a:ext cx="5864996" cy="4621212"/>
+          </a:xfrm>
+        </p:spPr>
+      </p:pic>
+    </p:spTree>
+    <p:extLst>
+      <p:ext uri="{BB962C8B-B14F-4D97-AF65-F5344CB8AC3E}">
+        <p14:creationId xmlns:p14="http://schemas.microsoft.com/office/powerpoint/2010/main" val="3992215378"/>
+      </p:ext>
+    </p:extLst>
+  </p:cSld>
+  <p:clrMapOvr>
+    <a:masterClrMapping/>
+  </p:clrMapOvr>
+</p:sld>
+</file>
+
+<file path=ppt/slides/slide30.xml><?xml version="1.0" encoding="utf-8"?>
 <p:sld xmlns:a="http://schemas.openxmlformats.org/drawingml/2006/main" xmlns:r="http://schemas.openxmlformats.org/officeDocument/2006/relationships" xmlns:p="http://schemas.openxmlformats.org/presentationml/2006/main">
   <p:cSld>
     <p:spTree>
@@ -20661,93 +21762,6 @@
       <p:bldP spid="12" grpId="0" animBg="1"/>
     </p:bldLst>
   </p:timing>
-</p:sld>
-</file>
-
-<file path=ppt/slides/slide3.xml><?xml version="1.0" encoding="utf-8"?>
-<p:sld xmlns:a="http://schemas.openxmlformats.org/drawingml/2006/main" xmlns:r="http://schemas.openxmlformats.org/officeDocument/2006/relationships" xmlns:p="http://schemas.openxmlformats.org/presentationml/2006/main">
-  <p:cSld>
-    <p:spTree>
-      <p:nvGrpSpPr>
-        <p:cNvPr id="1" name=""/>
-        <p:cNvGrpSpPr/>
-        <p:nvPr/>
-      </p:nvGrpSpPr>
-      <p:grpSpPr>
-        <a:xfrm>
-          <a:off x="0" y="0"/>
-          <a:ext cx="0" cy="0"/>
-          <a:chOff x="0" y="0"/>
-          <a:chExt cx="0" cy="0"/>
-        </a:xfrm>
-      </p:grpSpPr>
-      <p:sp>
-        <p:nvSpPr>
-          <p:cNvPr id="2" name="Title 1">
-            <a:extLst>
-              <a:ext uri="{FF2B5EF4-FFF2-40B4-BE49-F238E27FC236}">
-                <a16:creationId xmlns:a16="http://schemas.microsoft.com/office/drawing/2014/main" id="{CC4E5699-F629-549D-6652-8D97A182EC5D}"/>
-              </a:ext>
-            </a:extLst>
-          </p:cNvPr>
-          <p:cNvSpPr>
-            <a:spLocks noGrp="1"/>
-          </p:cNvSpPr>
-          <p:nvPr>
-            <p:ph type="title"/>
-          </p:nvPr>
-        </p:nvSpPr>
-        <p:spPr/>
-        <p:txBody>
-          <a:bodyPr/>
-          <a:lstStyle/>
-          <a:p>
-            <a:r>
-              <a:rPr lang="en-US" dirty="0"/>
-              <a:t>Curse of dimensionality</a:t>
-            </a:r>
-          </a:p>
-        </p:txBody>
-      </p:sp>
-      <p:pic>
-        <p:nvPicPr>
-          <p:cNvPr id="9" name="Content Placeholder 8">
-            <a:extLst>
-              <a:ext uri="{FF2B5EF4-FFF2-40B4-BE49-F238E27FC236}">
-                <a16:creationId xmlns:a16="http://schemas.microsoft.com/office/drawing/2014/main" id="{5A9EDBF9-D77D-D77B-137E-F61D5A6A3146}"/>
-              </a:ext>
-            </a:extLst>
-          </p:cNvPr>
-          <p:cNvPicPr>
-            <a:picLocks noGrp="1" noChangeAspect="1"/>
-          </p:cNvPicPr>
-          <p:nvPr>
-            <p:ph idx="1"/>
-          </p:nvPr>
-        </p:nvPicPr>
-        <p:blipFill>
-          <a:blip r:embed="rId2"/>
-          <a:stretch>
-            <a:fillRect/>
-          </a:stretch>
-        </p:blipFill>
-        <p:spPr>
-          <a:xfrm>
-            <a:off x="3163502" y="1690688"/>
-            <a:ext cx="5864996" cy="4621212"/>
-          </a:xfrm>
-        </p:spPr>
-      </p:pic>
-    </p:spTree>
-    <p:extLst>
-      <p:ext uri="{BB962C8B-B14F-4D97-AF65-F5344CB8AC3E}">
-        <p14:creationId xmlns:p14="http://schemas.microsoft.com/office/powerpoint/2010/main" val="3992215378"/>
-      </p:ext>
-    </p:extLst>
-  </p:cSld>
-  <p:clrMapOvr>
-    <a:masterClrMapping/>
-  </p:clrMapOvr>
 </p:sld>
 </file>
 

</xml_diff>

<commit_message>
added example for 𝜀-width unit sphere vs unit ball
</commit_message>
<xml_diff>
--- a/slides_x_mas_2023.pptx
+++ b/slides_x_mas_2023.pptx
@@ -7802,6 +7802,458 @@
                 </a14:m>
                 <a:endParaRPr lang="en-US" sz="2800" b="1" dirty="0"/>
               </a:p>
+              <a:p>
+                <a:pPr marL="0" indent="0" algn="ctr">
+                  <a:lnSpc>
+                    <a:spcPct val="150000"/>
+                  </a:lnSpc>
+                  <a:buNone/>
+                </a:pPr>
+                <a14:m>
+                  <m:oMath xmlns:m="http://schemas.openxmlformats.org/officeDocument/2006/math">
+                    <m:r>
+                      <a:rPr lang="en-US" sz="2800" b="1" i="1" smtClean="0">
+                        <a:solidFill>
+                          <a:schemeClr val="tx1">
+                            <a:lumMod val="50000"/>
+                            <a:lumOff val="50000"/>
+                          </a:schemeClr>
+                        </a:solidFill>
+                        <a:latin typeface="Cambria Math" panose="02040503050406030204" pitchFamily="18" charset="0"/>
+                      </a:rPr>
+                      <m:t>𝒏</m:t>
+                    </m:r>
+                    <m:r>
+                      <a:rPr lang="en-US" sz="2800" b="1" i="1" smtClean="0">
+                        <a:solidFill>
+                          <a:schemeClr val="tx1">
+                            <a:lumMod val="50000"/>
+                            <a:lumOff val="50000"/>
+                          </a:schemeClr>
+                        </a:solidFill>
+                        <a:latin typeface="Cambria Math" panose="02040503050406030204" pitchFamily="18" charset="0"/>
+                      </a:rPr>
+                      <m:t>=</m:t>
+                    </m:r>
+                    <m:r>
+                      <a:rPr lang="en-US" sz="2800" b="1" i="1" smtClean="0">
+                        <a:solidFill>
+                          <a:schemeClr val="tx1">
+                            <a:lumMod val="50000"/>
+                            <a:lumOff val="50000"/>
+                          </a:schemeClr>
+                        </a:solidFill>
+                        <a:latin typeface="Cambria Math" panose="02040503050406030204" pitchFamily="18" charset="0"/>
+                      </a:rPr>
+                      <m:t>𝟑𝟎𝟎</m:t>
+                    </m:r>
+                    <m:r>
+                      <a:rPr lang="en-US" sz="2800" b="1" i="1" smtClean="0">
+                        <a:solidFill>
+                          <a:schemeClr val="tx1">
+                            <a:lumMod val="50000"/>
+                            <a:lumOff val="50000"/>
+                          </a:schemeClr>
+                        </a:solidFill>
+                        <a:latin typeface="Cambria Math" panose="02040503050406030204" pitchFamily="18" charset="0"/>
+                      </a:rPr>
+                      <m:t>, </m:t>
+                    </m:r>
+                    <m:r>
+                      <a:rPr lang="en-US" sz="2800" b="1" i="1" smtClean="0">
+                        <a:solidFill>
+                          <a:schemeClr val="tx1">
+                            <a:lumMod val="50000"/>
+                            <a:lumOff val="50000"/>
+                          </a:schemeClr>
+                        </a:solidFill>
+                        <a:latin typeface="Cambria Math" panose="02040503050406030204" pitchFamily="18" charset="0"/>
+                      </a:rPr>
+                      <m:t>𝜺</m:t>
+                    </m:r>
+                    <m:r>
+                      <a:rPr lang="en-US" sz="2800" b="1" i="1" smtClean="0">
+                        <a:solidFill>
+                          <a:schemeClr val="tx1">
+                            <a:lumMod val="50000"/>
+                            <a:lumOff val="50000"/>
+                          </a:schemeClr>
+                        </a:solidFill>
+                        <a:latin typeface="Cambria Math" panose="02040503050406030204" pitchFamily="18" charset="0"/>
+                      </a:rPr>
+                      <m:t>=</m:t>
+                    </m:r>
+                    <m:r>
+                      <a:rPr lang="en-US" sz="2800" b="1" i="1" smtClean="0">
+                        <a:solidFill>
+                          <a:schemeClr val="tx1">
+                            <a:lumMod val="50000"/>
+                            <a:lumOff val="50000"/>
+                          </a:schemeClr>
+                        </a:solidFill>
+                        <a:latin typeface="Cambria Math" panose="02040503050406030204" pitchFamily="18" charset="0"/>
+                      </a:rPr>
+                      <m:t>𝟎</m:t>
+                    </m:r>
+                    <m:r>
+                      <a:rPr lang="en-US" sz="2800" b="1" i="1" smtClean="0">
+                        <a:solidFill>
+                          <a:schemeClr val="tx1">
+                            <a:lumMod val="50000"/>
+                            <a:lumOff val="50000"/>
+                          </a:schemeClr>
+                        </a:solidFill>
+                        <a:latin typeface="Cambria Math" panose="02040503050406030204" pitchFamily="18" charset="0"/>
+                      </a:rPr>
+                      <m:t>.</m:t>
+                    </m:r>
+                    <m:r>
+                      <a:rPr lang="en-US" sz="2800" b="1" i="1" smtClean="0">
+                        <a:solidFill>
+                          <a:schemeClr val="tx1">
+                            <a:lumMod val="50000"/>
+                            <a:lumOff val="50000"/>
+                          </a:schemeClr>
+                        </a:solidFill>
+                        <a:latin typeface="Cambria Math" panose="02040503050406030204" pitchFamily="18" charset="0"/>
+                      </a:rPr>
+                      <m:t>𝟎𝟏</m:t>
+                    </m:r>
+                  </m:oMath>
+                </a14:m>
+                <a:r>
+                  <a:rPr lang="en-US" sz="2800" b="1" dirty="0">
+                    <a:solidFill>
+                      <a:schemeClr val="tx1">
+                        <a:lumMod val="50000"/>
+                        <a:lumOff val="50000"/>
+                      </a:schemeClr>
+                    </a:solidFill>
+                  </a:rPr>
+                  <a:t>:          </a:t>
+                </a:r>
+                <a14:m>
+                  <m:oMath xmlns:m="http://schemas.openxmlformats.org/officeDocument/2006/math">
+                    <m:f>
+                      <m:fPr>
+                        <m:ctrlPr>
+                          <a:rPr lang="en-US" b="1" i="1">
+                            <a:solidFill>
+                              <a:schemeClr val="tx1">
+                                <a:lumMod val="50000"/>
+                                <a:lumOff val="50000"/>
+                              </a:schemeClr>
+                            </a:solidFill>
+                            <a:latin typeface="Cambria Math" panose="02040503050406030204" pitchFamily="18" charset="0"/>
+                          </a:rPr>
+                        </m:ctrlPr>
+                      </m:fPr>
+                      <m:num>
+                        <m:sSub>
+                          <m:sSubPr>
+                            <m:ctrlPr>
+                              <a:rPr lang="en-US" b="1" i="1">
+                                <a:solidFill>
+                                  <a:schemeClr val="tx1">
+                                    <a:lumMod val="50000"/>
+                                    <a:lumOff val="50000"/>
+                                  </a:schemeClr>
+                                </a:solidFill>
+                                <a:latin typeface="Cambria Math" panose="02040503050406030204" pitchFamily="18" charset="0"/>
+                              </a:rPr>
+                            </m:ctrlPr>
+                          </m:sSubPr>
+                          <m:e>
+                            <m:r>
+                              <a:rPr lang="en-US" b="1" i="1">
+                                <a:solidFill>
+                                  <a:schemeClr val="tx1">
+                                    <a:lumMod val="50000"/>
+                                    <a:lumOff val="50000"/>
+                                  </a:schemeClr>
+                                </a:solidFill>
+                                <a:latin typeface="Cambria Math" panose="02040503050406030204" pitchFamily="18" charset="0"/>
+                              </a:rPr>
+                              <m:t>𝓥</m:t>
+                            </m:r>
+                          </m:e>
+                          <m:sub>
+                            <m:r>
+                              <a:rPr lang="en-US" b="1" i="1" smtClean="0">
+                                <a:solidFill>
+                                  <a:schemeClr val="tx1">
+                                    <a:lumMod val="50000"/>
+                                    <a:lumOff val="50000"/>
+                                  </a:schemeClr>
+                                </a:solidFill>
+                                <a:latin typeface="Cambria Math" panose="02040503050406030204" pitchFamily="18" charset="0"/>
+                              </a:rPr>
+                              <m:t>𝟑𝟎𝟎</m:t>
+                            </m:r>
+                          </m:sub>
+                        </m:sSub>
+                        <m:d>
+                          <m:dPr>
+                            <m:ctrlPr>
+                              <a:rPr lang="en-US" b="1" i="1">
+                                <a:solidFill>
+                                  <a:schemeClr val="tx1">
+                                    <a:lumMod val="50000"/>
+                                    <a:lumOff val="50000"/>
+                                  </a:schemeClr>
+                                </a:solidFill>
+                                <a:latin typeface="Cambria Math" panose="02040503050406030204" pitchFamily="18" charset="0"/>
+                              </a:rPr>
+                            </m:ctrlPr>
+                          </m:dPr>
+                          <m:e>
+                            <m:r>
+                              <a:rPr lang="en-US" b="1" i="1" smtClean="0">
+                                <a:solidFill>
+                                  <a:schemeClr val="tx1">
+                                    <a:lumMod val="50000"/>
+                                    <a:lumOff val="50000"/>
+                                  </a:schemeClr>
+                                </a:solidFill>
+                                <a:latin typeface="Cambria Math" panose="02040503050406030204" pitchFamily="18" charset="0"/>
+                              </a:rPr>
+                              <m:t>𝟎</m:t>
+                            </m:r>
+                            <m:r>
+                              <a:rPr lang="en-US" b="1" i="1" smtClean="0">
+                                <a:solidFill>
+                                  <a:schemeClr val="tx1">
+                                    <a:lumMod val="50000"/>
+                                    <a:lumOff val="50000"/>
+                                  </a:schemeClr>
+                                </a:solidFill>
+                                <a:latin typeface="Cambria Math" panose="02040503050406030204" pitchFamily="18" charset="0"/>
+                              </a:rPr>
+                              <m:t>.</m:t>
+                            </m:r>
+                            <m:r>
+                              <a:rPr lang="en-US" b="1" i="1" smtClean="0">
+                                <a:solidFill>
+                                  <a:schemeClr val="tx1">
+                                    <a:lumMod val="50000"/>
+                                    <a:lumOff val="50000"/>
+                                  </a:schemeClr>
+                                </a:solidFill>
+                                <a:latin typeface="Cambria Math" panose="02040503050406030204" pitchFamily="18" charset="0"/>
+                              </a:rPr>
+                              <m:t>𝟎𝟏</m:t>
+                            </m:r>
+                            <m:r>
+                              <a:rPr lang="en-US" b="1" i="1" smtClean="0">
+                                <a:solidFill>
+                                  <a:schemeClr val="tx1">
+                                    <a:lumMod val="50000"/>
+                                    <a:lumOff val="50000"/>
+                                  </a:schemeClr>
+                                </a:solidFill>
+                                <a:latin typeface="Cambria Math" panose="02040503050406030204" pitchFamily="18" charset="0"/>
+                              </a:rPr>
+                              <m:t> </m:t>
+                            </m:r>
+                            <m:sSub>
+                              <m:sSubPr>
+                                <m:ctrlPr>
+                                  <a:rPr lang="en-US" b="1" i="1" smtClean="0">
+                                    <a:solidFill>
+                                      <a:schemeClr val="tx1">
+                                        <a:lumMod val="50000"/>
+                                        <a:lumOff val="50000"/>
+                                      </a:schemeClr>
+                                    </a:solidFill>
+                                    <a:latin typeface="Cambria Math" panose="02040503050406030204" pitchFamily="18" charset="0"/>
+                                  </a:rPr>
+                                </m:ctrlPr>
+                              </m:sSubPr>
+                              <m:e>
+                                <m:r>
+                                  <a:rPr lang="en-US" b="1" i="1">
+                                    <a:solidFill>
+                                      <a:schemeClr val="tx1">
+                                        <a:lumMod val="50000"/>
+                                        <a:lumOff val="50000"/>
+                                      </a:schemeClr>
+                                    </a:solidFill>
+                                    <a:latin typeface="Cambria Math" panose="02040503050406030204" pitchFamily="18" charset="0"/>
+                                  </a:rPr>
+                                  <m:t>𝓢</m:t>
+                                </m:r>
+                              </m:e>
+                              <m:sub>
+                                <m:r>
+                                  <a:rPr lang="en-US" b="1" i="1" smtClean="0">
+                                    <a:solidFill>
+                                      <a:schemeClr val="tx1">
+                                        <a:lumMod val="50000"/>
+                                        <a:lumOff val="50000"/>
+                                      </a:schemeClr>
+                                    </a:solidFill>
+                                    <a:latin typeface="Cambria Math" panose="02040503050406030204" pitchFamily="18" charset="0"/>
+                                  </a:rPr>
+                                  <m:t>𝟑𝟎𝟎</m:t>
+                                </m:r>
+                              </m:sub>
+                            </m:sSub>
+                          </m:e>
+                        </m:d>
+                      </m:num>
+                      <m:den>
+                        <m:sSub>
+                          <m:sSubPr>
+                            <m:ctrlPr>
+                              <a:rPr lang="en-US" b="1" i="1">
+                                <a:solidFill>
+                                  <a:schemeClr val="tx1">
+                                    <a:lumMod val="50000"/>
+                                    <a:lumOff val="50000"/>
+                                  </a:schemeClr>
+                                </a:solidFill>
+                                <a:latin typeface="Cambria Math" panose="02040503050406030204" pitchFamily="18" charset="0"/>
+                              </a:rPr>
+                            </m:ctrlPr>
+                          </m:sSubPr>
+                          <m:e>
+                            <m:r>
+                              <a:rPr lang="en-US" b="1" i="1">
+                                <a:solidFill>
+                                  <a:schemeClr val="tx1">
+                                    <a:lumMod val="50000"/>
+                                    <a:lumOff val="50000"/>
+                                  </a:schemeClr>
+                                </a:solidFill>
+                                <a:latin typeface="Cambria Math" panose="02040503050406030204" pitchFamily="18" charset="0"/>
+                              </a:rPr>
+                              <m:t>𝓥</m:t>
+                            </m:r>
+                          </m:e>
+                          <m:sub>
+                            <m:r>
+                              <a:rPr lang="en-US" b="1" i="1" smtClean="0">
+                                <a:solidFill>
+                                  <a:schemeClr val="tx1">
+                                    <a:lumMod val="50000"/>
+                                    <a:lumOff val="50000"/>
+                                  </a:schemeClr>
+                                </a:solidFill>
+                                <a:latin typeface="Cambria Math" panose="02040503050406030204" pitchFamily="18" charset="0"/>
+                              </a:rPr>
+                              <m:t>𝟑𝟎𝟎</m:t>
+                            </m:r>
+                          </m:sub>
+                        </m:sSub>
+                        <m:d>
+                          <m:dPr>
+                            <m:ctrlPr>
+                              <a:rPr lang="en-US" b="1" i="1">
+                                <a:solidFill>
+                                  <a:schemeClr val="tx1">
+                                    <a:lumMod val="50000"/>
+                                    <a:lumOff val="50000"/>
+                                  </a:schemeClr>
+                                </a:solidFill>
+                                <a:latin typeface="Cambria Math" panose="02040503050406030204" pitchFamily="18" charset="0"/>
+                              </a:rPr>
+                            </m:ctrlPr>
+                          </m:dPr>
+                          <m:e>
+                            <m:sSub>
+                              <m:sSubPr>
+                                <m:ctrlPr>
+                                  <a:rPr lang="en-US" b="1" i="1">
+                                    <a:solidFill>
+                                      <a:schemeClr val="tx1">
+                                        <a:lumMod val="50000"/>
+                                        <a:lumOff val="50000"/>
+                                      </a:schemeClr>
+                                    </a:solidFill>
+                                    <a:latin typeface="Cambria Math" panose="02040503050406030204" pitchFamily="18" charset="0"/>
+                                  </a:rPr>
+                                </m:ctrlPr>
+                              </m:sSubPr>
+                              <m:e>
+                                <m:r>
+                                  <a:rPr lang="en-US" b="1" i="1">
+                                    <a:solidFill>
+                                      <a:schemeClr val="tx1">
+                                        <a:lumMod val="50000"/>
+                                        <a:lumOff val="50000"/>
+                                      </a:schemeClr>
+                                    </a:solidFill>
+                                    <a:latin typeface="Cambria Math" panose="02040503050406030204" pitchFamily="18" charset="0"/>
+                                  </a:rPr>
+                                  <m:t>𝓑</m:t>
+                                </m:r>
+                              </m:e>
+                              <m:sub>
+                                <m:r>
+                                  <a:rPr lang="en-US" b="1" i="1" smtClean="0">
+                                    <a:solidFill>
+                                      <a:schemeClr val="tx1">
+                                        <a:lumMod val="50000"/>
+                                        <a:lumOff val="50000"/>
+                                      </a:schemeClr>
+                                    </a:solidFill>
+                                    <a:latin typeface="Cambria Math" panose="02040503050406030204" pitchFamily="18" charset="0"/>
+                                  </a:rPr>
+                                  <m:t>𝟑𝟎𝟎</m:t>
+                                </m:r>
+                              </m:sub>
+                            </m:sSub>
+                          </m:e>
+                        </m:d>
+                      </m:den>
+                    </m:f>
+                    <m:r>
+                      <a:rPr lang="en-US" b="1" i="1" smtClean="0">
+                        <a:solidFill>
+                          <a:schemeClr val="tx1">
+                            <a:lumMod val="50000"/>
+                            <a:lumOff val="50000"/>
+                          </a:schemeClr>
+                        </a:solidFill>
+                        <a:latin typeface="Cambria Math" panose="02040503050406030204" pitchFamily="18" charset="0"/>
+                      </a:rPr>
+                      <m:t>&gt;</m:t>
+                    </m:r>
+                    <m:r>
+                      <a:rPr lang="en-US" b="1" i="1" smtClean="0">
+                        <a:solidFill>
+                          <a:schemeClr val="tx1">
+                            <a:lumMod val="50000"/>
+                            <a:lumOff val="50000"/>
+                          </a:schemeClr>
+                        </a:solidFill>
+                        <a:latin typeface="Cambria Math" panose="02040503050406030204" pitchFamily="18" charset="0"/>
+                      </a:rPr>
+                      <m:t>𝟗𝟓</m:t>
+                    </m:r>
+                    <m:r>
+                      <a:rPr lang="en-US" b="1" i="1" smtClean="0">
+                        <a:solidFill>
+                          <a:schemeClr val="tx1">
+                            <a:lumMod val="50000"/>
+                            <a:lumOff val="50000"/>
+                          </a:schemeClr>
+                        </a:solidFill>
+                        <a:latin typeface="Cambria Math" panose="02040503050406030204" pitchFamily="18" charset="0"/>
+                      </a:rPr>
+                      <m:t>%</m:t>
+                    </m:r>
+                  </m:oMath>
+                </a14:m>
+                <a:endParaRPr lang="en-US" sz="2800" b="1" dirty="0">
+                  <a:solidFill>
+                    <a:schemeClr val="tx1">
+                      <a:lumMod val="50000"/>
+                      <a:lumOff val="50000"/>
+                    </a:schemeClr>
+                  </a:solidFill>
+                </a:endParaRPr>
+              </a:p>
             </p:txBody>
           </p:sp>
         </mc:Choice>

</xml_diff>

<commit_message>
added 2nd example for 𝜀-width unit sphere vs unit ball
</commit_message>
<xml_diff>
--- a/slides_x_mas_2023.pptx
+++ b/slides_x_mas_2023.pptx
@@ -7197,9 +7197,16 @@
                 <p:ph idx="1"/>
               </p:nvPr>
             </p:nvSpPr>
-            <p:spPr/>
+            <p:spPr>
+              <a:xfrm>
+                <a:off x="838200" y="1690688"/>
+                <a:ext cx="10515600" cy="5167311"/>
+              </a:xfrm>
+            </p:spPr>
             <p:txBody>
-              <a:bodyPr/>
+              <a:bodyPr>
+                <a:normAutofit lnSpcReduction="10000"/>
+              </a:bodyPr>
               <a:lstStyle/>
               <a:p>
                 <a:pPr marL="0" indent="0" algn="ctr">
@@ -7845,7 +7852,7 @@
                         </a:solidFill>
                         <a:latin typeface="Cambria Math" panose="02040503050406030204" pitchFamily="18" charset="0"/>
                       </a:rPr>
-                      <m:t>𝟑𝟎𝟎</m:t>
+                      <m:t>𝟑</m:t>
                     </m:r>
                     <m:r>
                       <a:rPr lang="en-US" sz="2800" b="1" i="1" smtClean="0">
@@ -7857,7 +7864,7 @@
                         </a:solidFill>
                         <a:latin typeface="Cambria Math" panose="02040503050406030204" pitchFamily="18" charset="0"/>
                       </a:rPr>
-                      <m:t>, </m:t>
+                      <m:t>,      </m:t>
                     </m:r>
                     <m:r>
                       <a:rPr lang="en-US" sz="2800" b="1" i="1" smtClean="0">
@@ -7930,7 +7937,7 @@
                       </a:schemeClr>
                     </a:solidFill>
                   </a:rPr>
-                  <a:t>:          </a:t>
+                  <a:t>:            </a:t>
                 </a:r>
                 <a14:m>
                   <m:oMath xmlns:m="http://schemas.openxmlformats.org/officeDocument/2006/math">
@@ -7988,7 +7995,7 @@
                                 </a:solidFill>
                                 <a:latin typeface="Cambria Math" panose="02040503050406030204" pitchFamily="18" charset="0"/>
                               </a:rPr>
-                              <m:t>𝟑𝟎𝟎</m:t>
+                              <m:t>𝟑</m:t>
                             </m:r>
                           </m:sub>
                         </m:sSub>
@@ -8094,6 +8101,458 @@
                                     </a:solidFill>
                                     <a:latin typeface="Cambria Math" panose="02040503050406030204" pitchFamily="18" charset="0"/>
                                   </a:rPr>
+                                  <m:t>𝟑</m:t>
+                                </m:r>
+                              </m:sub>
+                            </m:sSub>
+                          </m:e>
+                        </m:d>
+                      </m:num>
+                      <m:den>
+                        <m:sSub>
+                          <m:sSubPr>
+                            <m:ctrlPr>
+                              <a:rPr lang="en-US" b="1" i="1">
+                                <a:solidFill>
+                                  <a:schemeClr val="tx1">
+                                    <a:lumMod val="50000"/>
+                                    <a:lumOff val="50000"/>
+                                  </a:schemeClr>
+                                </a:solidFill>
+                                <a:latin typeface="Cambria Math" panose="02040503050406030204" pitchFamily="18" charset="0"/>
+                              </a:rPr>
+                            </m:ctrlPr>
+                          </m:sSubPr>
+                          <m:e>
+                            <m:r>
+                              <a:rPr lang="en-US" b="1" i="1">
+                                <a:solidFill>
+                                  <a:schemeClr val="tx1">
+                                    <a:lumMod val="50000"/>
+                                    <a:lumOff val="50000"/>
+                                  </a:schemeClr>
+                                </a:solidFill>
+                                <a:latin typeface="Cambria Math" panose="02040503050406030204" pitchFamily="18" charset="0"/>
+                              </a:rPr>
+                              <m:t>𝓥</m:t>
+                            </m:r>
+                          </m:e>
+                          <m:sub>
+                            <m:r>
+                              <a:rPr lang="en-US" b="1" i="1" smtClean="0">
+                                <a:solidFill>
+                                  <a:schemeClr val="tx1">
+                                    <a:lumMod val="50000"/>
+                                    <a:lumOff val="50000"/>
+                                  </a:schemeClr>
+                                </a:solidFill>
+                                <a:latin typeface="Cambria Math" panose="02040503050406030204" pitchFamily="18" charset="0"/>
+                              </a:rPr>
+                              <m:t>𝟑</m:t>
+                            </m:r>
+                          </m:sub>
+                        </m:sSub>
+                        <m:d>
+                          <m:dPr>
+                            <m:ctrlPr>
+                              <a:rPr lang="en-US" b="1" i="1">
+                                <a:solidFill>
+                                  <a:schemeClr val="tx1">
+                                    <a:lumMod val="50000"/>
+                                    <a:lumOff val="50000"/>
+                                  </a:schemeClr>
+                                </a:solidFill>
+                                <a:latin typeface="Cambria Math" panose="02040503050406030204" pitchFamily="18" charset="0"/>
+                              </a:rPr>
+                            </m:ctrlPr>
+                          </m:dPr>
+                          <m:e>
+                            <m:sSub>
+                              <m:sSubPr>
+                                <m:ctrlPr>
+                                  <a:rPr lang="en-US" b="1" i="1">
+                                    <a:solidFill>
+                                      <a:schemeClr val="tx1">
+                                        <a:lumMod val="50000"/>
+                                        <a:lumOff val="50000"/>
+                                      </a:schemeClr>
+                                    </a:solidFill>
+                                    <a:latin typeface="Cambria Math" panose="02040503050406030204" pitchFamily="18" charset="0"/>
+                                  </a:rPr>
+                                </m:ctrlPr>
+                              </m:sSubPr>
+                              <m:e>
+                                <m:r>
+                                  <a:rPr lang="en-US" b="1" i="1">
+                                    <a:solidFill>
+                                      <a:schemeClr val="tx1">
+                                        <a:lumMod val="50000"/>
+                                        <a:lumOff val="50000"/>
+                                      </a:schemeClr>
+                                    </a:solidFill>
+                                    <a:latin typeface="Cambria Math" panose="02040503050406030204" pitchFamily="18" charset="0"/>
+                                  </a:rPr>
+                                  <m:t>𝓑</m:t>
+                                </m:r>
+                              </m:e>
+                              <m:sub>
+                                <m:r>
+                                  <a:rPr lang="en-US" b="1" i="1" smtClean="0">
+                                    <a:solidFill>
+                                      <a:schemeClr val="tx1">
+                                        <a:lumMod val="50000"/>
+                                        <a:lumOff val="50000"/>
+                                      </a:schemeClr>
+                                    </a:solidFill>
+                                    <a:latin typeface="Cambria Math" panose="02040503050406030204" pitchFamily="18" charset="0"/>
+                                  </a:rPr>
+                                  <m:t>𝟑</m:t>
+                                </m:r>
+                              </m:sub>
+                            </m:sSub>
+                          </m:e>
+                        </m:d>
+                      </m:den>
+                    </m:f>
+                    <m:r>
+                      <a:rPr lang="en-US" b="1" i="1" smtClean="0">
+                        <a:solidFill>
+                          <a:schemeClr val="tx1">
+                            <a:lumMod val="50000"/>
+                            <a:lumOff val="50000"/>
+                          </a:schemeClr>
+                        </a:solidFill>
+                        <a:latin typeface="Cambria Math" panose="02040503050406030204" pitchFamily="18" charset="0"/>
+                      </a:rPr>
+                      <m:t>    &lt;   </m:t>
+                    </m:r>
+                    <m:r>
+                      <a:rPr lang="en-US" b="1" i="1" smtClean="0">
+                        <a:solidFill>
+                          <a:schemeClr val="tx1">
+                            <a:lumMod val="50000"/>
+                            <a:lumOff val="50000"/>
+                          </a:schemeClr>
+                        </a:solidFill>
+                        <a:latin typeface="Cambria Math" panose="02040503050406030204" pitchFamily="18" charset="0"/>
+                      </a:rPr>
+                      <m:t>𝟑</m:t>
+                    </m:r>
+                    <m:r>
+                      <a:rPr lang="en-US" b="1" i="1" smtClean="0">
+                        <a:solidFill>
+                          <a:schemeClr val="tx1">
+                            <a:lumMod val="50000"/>
+                            <a:lumOff val="50000"/>
+                          </a:schemeClr>
+                        </a:solidFill>
+                        <a:latin typeface="Cambria Math" panose="02040503050406030204" pitchFamily="18" charset="0"/>
+                      </a:rPr>
+                      <m:t> %</m:t>
+                    </m:r>
+                  </m:oMath>
+                </a14:m>
+                <a:endParaRPr lang="en-US" sz="2800" b="1" dirty="0">
+                  <a:solidFill>
+                    <a:schemeClr val="tx1">
+                      <a:lumMod val="50000"/>
+                      <a:lumOff val="50000"/>
+                    </a:schemeClr>
+                  </a:solidFill>
+                </a:endParaRPr>
+              </a:p>
+              <a:p>
+                <a:pPr marL="0" indent="0" algn="ctr">
+                  <a:lnSpc>
+                    <a:spcPct val="150000"/>
+                  </a:lnSpc>
+                  <a:buNone/>
+                </a:pPr>
+                <a14:m>
+                  <m:oMath xmlns:m="http://schemas.openxmlformats.org/officeDocument/2006/math">
+                    <m:r>
+                      <a:rPr lang="en-US" b="1" i="1">
+                        <a:solidFill>
+                          <a:schemeClr val="tx1">
+                            <a:lumMod val="50000"/>
+                            <a:lumOff val="50000"/>
+                          </a:schemeClr>
+                        </a:solidFill>
+                        <a:latin typeface="Cambria Math" panose="02040503050406030204" pitchFamily="18" charset="0"/>
+                      </a:rPr>
+                      <m:t>𝒏</m:t>
+                    </m:r>
+                    <m:r>
+                      <a:rPr lang="en-US" b="1" i="1">
+                        <a:solidFill>
+                          <a:schemeClr val="tx1">
+                            <a:lumMod val="50000"/>
+                            <a:lumOff val="50000"/>
+                          </a:schemeClr>
+                        </a:solidFill>
+                        <a:latin typeface="Cambria Math" panose="02040503050406030204" pitchFamily="18" charset="0"/>
+                      </a:rPr>
+                      <m:t>=</m:t>
+                    </m:r>
+                    <m:r>
+                      <a:rPr lang="en-US" b="1" i="1">
+                        <a:solidFill>
+                          <a:schemeClr val="tx1">
+                            <a:lumMod val="50000"/>
+                            <a:lumOff val="50000"/>
+                          </a:schemeClr>
+                        </a:solidFill>
+                        <a:latin typeface="Cambria Math" panose="02040503050406030204" pitchFamily="18" charset="0"/>
+                      </a:rPr>
+                      <m:t>𝟑𝟎𝟎</m:t>
+                    </m:r>
+                    <m:r>
+                      <a:rPr lang="en-US" b="1" i="1">
+                        <a:solidFill>
+                          <a:schemeClr val="tx1">
+                            <a:lumMod val="50000"/>
+                            <a:lumOff val="50000"/>
+                          </a:schemeClr>
+                        </a:solidFill>
+                        <a:latin typeface="Cambria Math" panose="02040503050406030204" pitchFamily="18" charset="0"/>
+                      </a:rPr>
+                      <m:t>, </m:t>
+                    </m:r>
+                    <m:r>
+                      <a:rPr lang="en-US" b="1" i="1">
+                        <a:solidFill>
+                          <a:schemeClr val="tx1">
+                            <a:lumMod val="50000"/>
+                            <a:lumOff val="50000"/>
+                          </a:schemeClr>
+                        </a:solidFill>
+                        <a:latin typeface="Cambria Math" panose="02040503050406030204" pitchFamily="18" charset="0"/>
+                      </a:rPr>
+                      <m:t>𝜺</m:t>
+                    </m:r>
+                    <m:r>
+                      <a:rPr lang="en-US" b="1" i="1">
+                        <a:solidFill>
+                          <a:schemeClr val="tx1">
+                            <a:lumMod val="50000"/>
+                            <a:lumOff val="50000"/>
+                          </a:schemeClr>
+                        </a:solidFill>
+                        <a:latin typeface="Cambria Math" panose="02040503050406030204" pitchFamily="18" charset="0"/>
+                      </a:rPr>
+                      <m:t>=</m:t>
+                    </m:r>
+                    <m:r>
+                      <a:rPr lang="en-US" b="1" i="1">
+                        <a:solidFill>
+                          <a:schemeClr val="tx1">
+                            <a:lumMod val="50000"/>
+                            <a:lumOff val="50000"/>
+                          </a:schemeClr>
+                        </a:solidFill>
+                        <a:latin typeface="Cambria Math" panose="02040503050406030204" pitchFamily="18" charset="0"/>
+                      </a:rPr>
+                      <m:t>𝟎</m:t>
+                    </m:r>
+                    <m:r>
+                      <a:rPr lang="en-US" b="1" i="1">
+                        <a:solidFill>
+                          <a:schemeClr val="tx1">
+                            <a:lumMod val="50000"/>
+                            <a:lumOff val="50000"/>
+                          </a:schemeClr>
+                        </a:solidFill>
+                        <a:latin typeface="Cambria Math" panose="02040503050406030204" pitchFamily="18" charset="0"/>
+                      </a:rPr>
+                      <m:t>.</m:t>
+                    </m:r>
+                    <m:r>
+                      <a:rPr lang="en-US" b="1" i="1">
+                        <a:solidFill>
+                          <a:schemeClr val="tx1">
+                            <a:lumMod val="50000"/>
+                            <a:lumOff val="50000"/>
+                          </a:schemeClr>
+                        </a:solidFill>
+                        <a:latin typeface="Cambria Math" panose="02040503050406030204" pitchFamily="18" charset="0"/>
+                      </a:rPr>
+                      <m:t>𝟎𝟏</m:t>
+                    </m:r>
+                  </m:oMath>
+                </a14:m>
+                <a:r>
+                  <a:rPr lang="en-US" b="1" dirty="0">
+                    <a:solidFill>
+                      <a:schemeClr val="tx1">
+                        <a:lumMod val="50000"/>
+                        <a:lumOff val="50000"/>
+                      </a:schemeClr>
+                    </a:solidFill>
+                  </a:rPr>
+                  <a:t>:          </a:t>
+                </a:r>
+                <a14:m>
+                  <m:oMath xmlns:m="http://schemas.openxmlformats.org/officeDocument/2006/math">
+                    <m:f>
+                      <m:fPr>
+                        <m:ctrlPr>
+                          <a:rPr lang="en-US" b="1" i="1">
+                            <a:solidFill>
+                              <a:schemeClr val="tx1">
+                                <a:lumMod val="50000"/>
+                                <a:lumOff val="50000"/>
+                              </a:schemeClr>
+                            </a:solidFill>
+                            <a:latin typeface="Cambria Math" panose="02040503050406030204" pitchFamily="18" charset="0"/>
+                          </a:rPr>
+                        </m:ctrlPr>
+                      </m:fPr>
+                      <m:num>
+                        <m:sSub>
+                          <m:sSubPr>
+                            <m:ctrlPr>
+                              <a:rPr lang="en-US" b="1" i="1">
+                                <a:solidFill>
+                                  <a:schemeClr val="tx1">
+                                    <a:lumMod val="50000"/>
+                                    <a:lumOff val="50000"/>
+                                  </a:schemeClr>
+                                </a:solidFill>
+                                <a:latin typeface="Cambria Math" panose="02040503050406030204" pitchFamily="18" charset="0"/>
+                              </a:rPr>
+                            </m:ctrlPr>
+                          </m:sSubPr>
+                          <m:e>
+                            <m:r>
+                              <a:rPr lang="en-US" b="1" i="1">
+                                <a:solidFill>
+                                  <a:schemeClr val="tx1">
+                                    <a:lumMod val="50000"/>
+                                    <a:lumOff val="50000"/>
+                                  </a:schemeClr>
+                                </a:solidFill>
+                                <a:latin typeface="Cambria Math" panose="02040503050406030204" pitchFamily="18" charset="0"/>
+                              </a:rPr>
+                              <m:t>𝓥</m:t>
+                            </m:r>
+                          </m:e>
+                          <m:sub>
+                            <m:r>
+                              <a:rPr lang="en-US" b="1" i="1">
+                                <a:solidFill>
+                                  <a:schemeClr val="tx1">
+                                    <a:lumMod val="50000"/>
+                                    <a:lumOff val="50000"/>
+                                  </a:schemeClr>
+                                </a:solidFill>
+                                <a:latin typeface="Cambria Math" panose="02040503050406030204" pitchFamily="18" charset="0"/>
+                              </a:rPr>
+                              <m:t>𝟑𝟎𝟎</m:t>
+                            </m:r>
+                          </m:sub>
+                        </m:sSub>
+                        <m:d>
+                          <m:dPr>
+                            <m:ctrlPr>
+                              <a:rPr lang="en-US" b="1" i="1">
+                                <a:solidFill>
+                                  <a:schemeClr val="tx1">
+                                    <a:lumMod val="50000"/>
+                                    <a:lumOff val="50000"/>
+                                  </a:schemeClr>
+                                </a:solidFill>
+                                <a:latin typeface="Cambria Math" panose="02040503050406030204" pitchFamily="18" charset="0"/>
+                              </a:rPr>
+                            </m:ctrlPr>
+                          </m:dPr>
+                          <m:e>
+                            <m:r>
+                              <a:rPr lang="en-US" b="1" i="1">
+                                <a:solidFill>
+                                  <a:schemeClr val="tx1">
+                                    <a:lumMod val="50000"/>
+                                    <a:lumOff val="50000"/>
+                                  </a:schemeClr>
+                                </a:solidFill>
+                                <a:latin typeface="Cambria Math" panose="02040503050406030204" pitchFamily="18" charset="0"/>
+                              </a:rPr>
+                              <m:t>𝟎</m:t>
+                            </m:r>
+                            <m:r>
+                              <a:rPr lang="en-US" b="1" i="1">
+                                <a:solidFill>
+                                  <a:schemeClr val="tx1">
+                                    <a:lumMod val="50000"/>
+                                    <a:lumOff val="50000"/>
+                                  </a:schemeClr>
+                                </a:solidFill>
+                                <a:latin typeface="Cambria Math" panose="02040503050406030204" pitchFamily="18" charset="0"/>
+                              </a:rPr>
+                              <m:t>.</m:t>
+                            </m:r>
+                            <m:r>
+                              <a:rPr lang="en-US" b="1" i="1">
+                                <a:solidFill>
+                                  <a:schemeClr val="tx1">
+                                    <a:lumMod val="50000"/>
+                                    <a:lumOff val="50000"/>
+                                  </a:schemeClr>
+                                </a:solidFill>
+                                <a:latin typeface="Cambria Math" panose="02040503050406030204" pitchFamily="18" charset="0"/>
+                              </a:rPr>
+                              <m:t>𝟎𝟏</m:t>
+                            </m:r>
+                            <m:r>
+                              <a:rPr lang="en-US" b="1" i="1">
+                                <a:solidFill>
+                                  <a:schemeClr val="tx1">
+                                    <a:lumMod val="50000"/>
+                                    <a:lumOff val="50000"/>
+                                  </a:schemeClr>
+                                </a:solidFill>
+                                <a:latin typeface="Cambria Math" panose="02040503050406030204" pitchFamily="18" charset="0"/>
+                              </a:rPr>
+                              <m:t> </m:t>
+                            </m:r>
+                            <m:sSub>
+                              <m:sSubPr>
+                                <m:ctrlPr>
+                                  <a:rPr lang="en-US" b="1" i="1">
+                                    <a:solidFill>
+                                      <a:schemeClr val="tx1">
+                                        <a:lumMod val="50000"/>
+                                        <a:lumOff val="50000"/>
+                                      </a:schemeClr>
+                                    </a:solidFill>
+                                    <a:latin typeface="Cambria Math" panose="02040503050406030204" pitchFamily="18" charset="0"/>
+                                  </a:rPr>
+                                </m:ctrlPr>
+                              </m:sSubPr>
+                              <m:e>
+                                <m:r>
+                                  <a:rPr lang="en-US" b="1" i="1">
+                                    <a:solidFill>
+                                      <a:schemeClr val="tx1">
+                                        <a:lumMod val="50000"/>
+                                        <a:lumOff val="50000"/>
+                                      </a:schemeClr>
+                                    </a:solidFill>
+                                    <a:latin typeface="Cambria Math" panose="02040503050406030204" pitchFamily="18" charset="0"/>
+                                  </a:rPr>
+                                  <m:t>𝓢</m:t>
+                                </m:r>
+                              </m:e>
+                              <m:sub>
+                                <m:r>
+                                  <a:rPr lang="en-US" b="1" i="1">
+                                    <a:solidFill>
+                                      <a:schemeClr val="tx1">
+                                        <a:lumMod val="50000"/>
+                                        <a:lumOff val="50000"/>
+                                      </a:schemeClr>
+                                    </a:solidFill>
+                                    <a:latin typeface="Cambria Math" panose="02040503050406030204" pitchFamily="18" charset="0"/>
+                                  </a:rPr>
                                   <m:t>𝟑𝟎𝟎</m:t>
                                 </m:r>
                               </m:sub>
@@ -8132,7 +8591,7 @@
                           </m:e>
                           <m:sub>
                             <m:r>
-                              <a:rPr lang="en-US" b="1" i="1" smtClean="0">
+                              <a:rPr lang="en-US" b="1" i="1">
                                 <a:solidFill>
                                   <a:schemeClr val="tx1">
                                     <a:lumMod val="50000"/>
@@ -8190,7 +8649,7 @@
                               </m:e>
                               <m:sub>
                                 <m:r>
-                                  <a:rPr lang="en-US" b="1" i="1" smtClean="0">
+                                  <a:rPr lang="en-US" b="1" i="1">
                                     <a:solidFill>
                                       <a:schemeClr val="tx1">
                                         <a:lumMod val="50000"/>
@@ -8208,7 +8667,7 @@
                       </m:den>
                     </m:f>
                     <m:r>
-                      <a:rPr lang="en-US" b="1" i="1" smtClean="0">
+                      <a:rPr lang="en-US" b="1" i="1">
                         <a:solidFill>
                           <a:schemeClr val="tx1">
                             <a:lumMod val="50000"/>
@@ -8220,7 +8679,7 @@
                       <m:t>&gt;</m:t>
                     </m:r>
                     <m:r>
-                      <a:rPr lang="en-US" b="1" i="1" smtClean="0">
+                      <a:rPr lang="en-US" b="1" i="1">
                         <a:solidFill>
                           <a:schemeClr val="tx1">
                             <a:lumMod val="50000"/>
@@ -8232,7 +8691,7 @@
                       <m:t>𝟗𝟓</m:t>
                     </m:r>
                     <m:r>
-                      <a:rPr lang="en-US" b="1" i="1" smtClean="0">
+                      <a:rPr lang="en-US" b="1" i="1">
                         <a:solidFill>
                           <a:schemeClr val="tx1">
                             <a:lumMod val="50000"/>
@@ -8245,6 +8704,22 @@
                     </m:r>
                   </m:oMath>
                 </a14:m>
+                <a:endParaRPr lang="en-US" sz="2800" b="1" dirty="0">
+                  <a:solidFill>
+                    <a:schemeClr val="tx1">
+                      <a:lumMod val="50000"/>
+                      <a:lumOff val="50000"/>
+                    </a:schemeClr>
+                  </a:solidFill>
+                </a:endParaRPr>
+              </a:p>
+              <a:p>
+                <a:pPr marL="0" indent="0" algn="ctr">
+                  <a:lnSpc>
+                    <a:spcPct val="150000"/>
+                  </a:lnSpc>
+                  <a:buNone/>
+                </a:pPr>
                 <a:endParaRPr lang="en-US" sz="2800" b="1" dirty="0">
                   <a:solidFill>
                     <a:schemeClr val="tx1">
@@ -8275,6 +8750,10 @@
               </p:nvPr>
             </p:nvSpPr>
             <p:spPr>
+              <a:xfrm>
+                <a:off x="838200" y="1690688"/>
+                <a:ext cx="10515600" cy="5167311"/>
+              </a:xfrm>
               <a:blipFill>
                 <a:blip r:embed="rId3"/>
                 <a:stretch>
@@ -8313,7 +8792,7 @@
             </p:nvSpPr>
             <p:spPr>
               <a:xfrm>
-                <a:off x="9111968" y="3917950"/>
+                <a:off x="9111968" y="3756025"/>
                 <a:ext cx="2241832" cy="523220"/>
               </a:xfrm>
               <a:prstGeom prst="rect">
@@ -8372,7 +8851,7 @@
             </p:nvSpPr>
             <p:spPr>
               <a:xfrm>
-                <a:off x="9111968" y="3917950"/>
+                <a:off x="9111968" y="3756025"/>
                 <a:ext cx="2241832" cy="523220"/>
               </a:xfrm>
               <a:prstGeom prst="rect">
@@ -8381,7 +8860,7 @@
               <a:blipFill>
                 <a:blip r:embed="rId4"/>
                 <a:stretch>
-                  <a:fillRect l="-5707" t="-11628" r="-4620" b="-32558"/>
+                  <a:fillRect l="-5707" t="-10465" r="-4620" b="-32558"/>
                 </a:stretch>
               </a:blipFill>
             </p:spPr>
@@ -8416,7 +8895,7 @@
             </p:nvSpPr>
             <p:spPr>
               <a:xfrm>
-                <a:off x="7847524" y="3917950"/>
+                <a:off x="7847524" y="3756025"/>
                 <a:ext cx="882357" cy="523220"/>
               </a:xfrm>
               <a:prstGeom prst="rect">
@@ -8473,7 +8952,7 @@
             </p:nvSpPr>
             <p:spPr>
               <a:xfrm>
-                <a:off x="7847524" y="3917950"/>
+                <a:off x="7847524" y="3756025"/>
                 <a:ext cx="882357" cy="523220"/>
               </a:xfrm>
               <a:prstGeom prst="rect">

</xml_diff>

<commit_message>
added animations for 𝜀-width unit sphere vs unit ball
</commit_message>
<xml_diff>
--- a/slides_x_mas_2023.pptx
+++ b/slides_x_mas_2023.pptx
@@ -8990,6 +8990,434 @@
   <p:clrMapOvr>
     <a:masterClrMapping/>
   </p:clrMapOvr>
+  <p:timing>
+    <p:tnLst>
+      <p:par>
+        <p:cTn id="1" dur="indefinite" restart="never" nodeType="tmRoot">
+          <p:childTnLst>
+            <p:seq concurrent="1" nextAc="seek">
+              <p:cTn id="2" dur="indefinite" nodeType="mainSeq">
+                <p:childTnLst>
+                  <p:par>
+                    <p:cTn id="3" fill="hold">
+                      <p:stCondLst>
+                        <p:cond delay="indefinite"/>
+                      </p:stCondLst>
+                      <p:childTnLst>
+                        <p:par>
+                          <p:cTn id="4" fill="hold">
+                            <p:stCondLst>
+                              <p:cond delay="0"/>
+                            </p:stCondLst>
+                            <p:childTnLst>
+                              <p:par>
+                                <p:cTn id="5" presetID="10" presetClass="entr" presetSubtype="0" fill="hold" grpId="0" nodeType="clickEffect">
+                                  <p:stCondLst>
+                                    <p:cond delay="0"/>
+                                  </p:stCondLst>
+                                  <p:childTnLst>
+                                    <p:set>
+                                      <p:cBhvr>
+                                        <p:cTn id="6" dur="1" fill="hold">
+                                          <p:stCondLst>
+                                            <p:cond delay="0"/>
+                                          </p:stCondLst>
+                                        </p:cTn>
+                                        <p:tgtEl>
+                                          <p:spTgt spid="3">
+                                            <p:txEl>
+                                              <p:pRg st="0" end="0"/>
+                                            </p:txEl>
+                                          </p:spTgt>
+                                        </p:tgtEl>
+                                        <p:attrNameLst>
+                                          <p:attrName>style.visibility</p:attrName>
+                                        </p:attrNameLst>
+                                      </p:cBhvr>
+                                      <p:to>
+                                        <p:strVal val="visible"/>
+                                      </p:to>
+                                    </p:set>
+                                    <p:animEffect transition="in" filter="fade">
+                                      <p:cBhvr>
+                                        <p:cTn id="7" dur="500"/>
+                                        <p:tgtEl>
+                                          <p:spTgt spid="3">
+                                            <p:txEl>
+                                              <p:pRg st="0" end="0"/>
+                                            </p:txEl>
+                                          </p:spTgt>
+                                        </p:tgtEl>
+                                      </p:cBhvr>
+                                    </p:animEffect>
+                                  </p:childTnLst>
+                                </p:cTn>
+                              </p:par>
+                            </p:childTnLst>
+                          </p:cTn>
+                        </p:par>
+                      </p:childTnLst>
+                    </p:cTn>
+                  </p:par>
+                  <p:par>
+                    <p:cTn id="8" fill="hold">
+                      <p:stCondLst>
+                        <p:cond delay="indefinite"/>
+                      </p:stCondLst>
+                      <p:childTnLst>
+                        <p:par>
+                          <p:cTn id="9" fill="hold">
+                            <p:stCondLst>
+                              <p:cond delay="0"/>
+                            </p:stCondLst>
+                            <p:childTnLst>
+                              <p:par>
+                                <p:cTn id="10" presetID="10" presetClass="entr" presetSubtype="0" fill="hold" grpId="0" nodeType="clickEffect">
+                                  <p:stCondLst>
+                                    <p:cond delay="0"/>
+                                  </p:stCondLst>
+                                  <p:childTnLst>
+                                    <p:set>
+                                      <p:cBhvr>
+                                        <p:cTn id="11" dur="1" fill="hold">
+                                          <p:stCondLst>
+                                            <p:cond delay="0"/>
+                                          </p:stCondLst>
+                                        </p:cTn>
+                                        <p:tgtEl>
+                                          <p:spTgt spid="3">
+                                            <p:txEl>
+                                              <p:pRg st="1" end="1"/>
+                                            </p:txEl>
+                                          </p:spTgt>
+                                        </p:tgtEl>
+                                        <p:attrNameLst>
+                                          <p:attrName>style.visibility</p:attrName>
+                                        </p:attrNameLst>
+                                      </p:cBhvr>
+                                      <p:to>
+                                        <p:strVal val="visible"/>
+                                      </p:to>
+                                    </p:set>
+                                    <p:animEffect transition="in" filter="fade">
+                                      <p:cBhvr>
+                                        <p:cTn id="12" dur="500"/>
+                                        <p:tgtEl>
+                                          <p:spTgt spid="3">
+                                            <p:txEl>
+                                              <p:pRg st="1" end="1"/>
+                                            </p:txEl>
+                                          </p:spTgt>
+                                        </p:tgtEl>
+                                      </p:cBhvr>
+                                    </p:animEffect>
+                                  </p:childTnLst>
+                                </p:cTn>
+                              </p:par>
+                            </p:childTnLst>
+                          </p:cTn>
+                        </p:par>
+                      </p:childTnLst>
+                    </p:cTn>
+                  </p:par>
+                  <p:par>
+                    <p:cTn id="13" fill="hold">
+                      <p:stCondLst>
+                        <p:cond delay="indefinite"/>
+                      </p:stCondLst>
+                      <p:childTnLst>
+                        <p:par>
+                          <p:cTn id="14" fill="hold">
+                            <p:stCondLst>
+                              <p:cond delay="0"/>
+                            </p:stCondLst>
+                            <p:childTnLst>
+                              <p:par>
+                                <p:cTn id="15" presetID="10" presetClass="entr" presetSubtype="0" fill="hold" grpId="0" nodeType="clickEffect">
+                                  <p:stCondLst>
+                                    <p:cond delay="0"/>
+                                  </p:stCondLst>
+                                  <p:childTnLst>
+                                    <p:set>
+                                      <p:cBhvr>
+                                        <p:cTn id="16" dur="1" fill="hold">
+                                          <p:stCondLst>
+                                            <p:cond delay="0"/>
+                                          </p:stCondLst>
+                                        </p:cTn>
+                                        <p:tgtEl>
+                                          <p:spTgt spid="3">
+                                            <p:txEl>
+                                              <p:pRg st="2" end="2"/>
+                                            </p:txEl>
+                                          </p:spTgt>
+                                        </p:tgtEl>
+                                        <p:attrNameLst>
+                                          <p:attrName>style.visibility</p:attrName>
+                                        </p:attrNameLst>
+                                      </p:cBhvr>
+                                      <p:to>
+                                        <p:strVal val="visible"/>
+                                      </p:to>
+                                    </p:set>
+                                    <p:animEffect transition="in" filter="fade">
+                                      <p:cBhvr>
+                                        <p:cTn id="17" dur="500"/>
+                                        <p:tgtEl>
+                                          <p:spTgt spid="3">
+                                            <p:txEl>
+                                              <p:pRg st="2" end="2"/>
+                                            </p:txEl>
+                                          </p:spTgt>
+                                        </p:tgtEl>
+                                      </p:cBhvr>
+                                    </p:animEffect>
+                                  </p:childTnLst>
+                                </p:cTn>
+                              </p:par>
+                            </p:childTnLst>
+                          </p:cTn>
+                        </p:par>
+                        <p:par>
+                          <p:cTn id="18" fill="hold">
+                            <p:stCondLst>
+                              <p:cond delay="500"/>
+                            </p:stCondLst>
+                            <p:childTnLst>
+                              <p:par>
+                                <p:cTn id="19" presetID="10" presetClass="entr" presetSubtype="0" fill="hold" grpId="0" nodeType="afterEffect">
+                                  <p:stCondLst>
+                                    <p:cond delay="0"/>
+                                  </p:stCondLst>
+                                  <p:childTnLst>
+                                    <p:set>
+                                      <p:cBhvr>
+                                        <p:cTn id="20" dur="1" fill="hold">
+                                          <p:stCondLst>
+                                            <p:cond delay="0"/>
+                                          </p:stCondLst>
+                                        </p:cTn>
+                                        <p:tgtEl>
+                                          <p:spTgt spid="5"/>
+                                        </p:tgtEl>
+                                        <p:attrNameLst>
+                                          <p:attrName>style.visibility</p:attrName>
+                                        </p:attrNameLst>
+                                      </p:cBhvr>
+                                      <p:to>
+                                        <p:strVal val="visible"/>
+                                      </p:to>
+                                    </p:set>
+                                    <p:animEffect transition="in" filter="fade">
+                                      <p:cBhvr>
+                                        <p:cTn id="21" dur="500"/>
+                                        <p:tgtEl>
+                                          <p:spTgt spid="5"/>
+                                        </p:tgtEl>
+                                      </p:cBhvr>
+                                    </p:animEffect>
+                                  </p:childTnLst>
+                                </p:cTn>
+                              </p:par>
+                            </p:childTnLst>
+                          </p:cTn>
+                        </p:par>
+                        <p:par>
+                          <p:cTn id="22" fill="hold">
+                            <p:stCondLst>
+                              <p:cond delay="1000"/>
+                            </p:stCondLst>
+                            <p:childTnLst>
+                              <p:par>
+                                <p:cTn id="23" presetID="10" presetClass="entr" presetSubtype="0" fill="hold" grpId="0" nodeType="afterEffect">
+                                  <p:stCondLst>
+                                    <p:cond delay="0"/>
+                                  </p:stCondLst>
+                                  <p:childTnLst>
+                                    <p:set>
+                                      <p:cBhvr>
+                                        <p:cTn id="24" dur="1" fill="hold">
+                                          <p:stCondLst>
+                                            <p:cond delay="0"/>
+                                          </p:stCondLst>
+                                        </p:cTn>
+                                        <p:tgtEl>
+                                          <p:spTgt spid="4"/>
+                                        </p:tgtEl>
+                                        <p:attrNameLst>
+                                          <p:attrName>style.visibility</p:attrName>
+                                        </p:attrNameLst>
+                                      </p:cBhvr>
+                                      <p:to>
+                                        <p:strVal val="visible"/>
+                                      </p:to>
+                                    </p:set>
+                                    <p:animEffect transition="in" filter="fade">
+                                      <p:cBhvr>
+                                        <p:cTn id="25" dur="500"/>
+                                        <p:tgtEl>
+                                          <p:spTgt spid="4"/>
+                                        </p:tgtEl>
+                                      </p:cBhvr>
+                                    </p:animEffect>
+                                  </p:childTnLst>
+                                </p:cTn>
+                              </p:par>
+                            </p:childTnLst>
+                          </p:cTn>
+                        </p:par>
+                      </p:childTnLst>
+                    </p:cTn>
+                  </p:par>
+                  <p:par>
+                    <p:cTn id="26" fill="hold">
+                      <p:stCondLst>
+                        <p:cond delay="indefinite"/>
+                      </p:stCondLst>
+                      <p:childTnLst>
+                        <p:par>
+                          <p:cTn id="27" fill="hold">
+                            <p:stCondLst>
+                              <p:cond delay="0"/>
+                            </p:stCondLst>
+                            <p:childTnLst>
+                              <p:par>
+                                <p:cTn id="28" presetID="10" presetClass="entr" presetSubtype="0" fill="hold" grpId="0" nodeType="clickEffect">
+                                  <p:stCondLst>
+                                    <p:cond delay="0"/>
+                                  </p:stCondLst>
+                                  <p:childTnLst>
+                                    <p:set>
+                                      <p:cBhvr>
+                                        <p:cTn id="29" dur="1" fill="hold">
+                                          <p:stCondLst>
+                                            <p:cond delay="0"/>
+                                          </p:stCondLst>
+                                        </p:cTn>
+                                        <p:tgtEl>
+                                          <p:spTgt spid="3">
+                                            <p:txEl>
+                                              <p:pRg st="3" end="3"/>
+                                            </p:txEl>
+                                          </p:spTgt>
+                                        </p:tgtEl>
+                                        <p:attrNameLst>
+                                          <p:attrName>style.visibility</p:attrName>
+                                        </p:attrNameLst>
+                                      </p:cBhvr>
+                                      <p:to>
+                                        <p:strVal val="visible"/>
+                                      </p:to>
+                                    </p:set>
+                                    <p:animEffect transition="in" filter="fade">
+                                      <p:cBhvr>
+                                        <p:cTn id="30" dur="500"/>
+                                        <p:tgtEl>
+                                          <p:spTgt spid="3">
+                                            <p:txEl>
+                                              <p:pRg st="3" end="3"/>
+                                            </p:txEl>
+                                          </p:spTgt>
+                                        </p:tgtEl>
+                                      </p:cBhvr>
+                                    </p:animEffect>
+                                  </p:childTnLst>
+                                </p:cTn>
+                              </p:par>
+                            </p:childTnLst>
+                          </p:cTn>
+                        </p:par>
+                      </p:childTnLst>
+                    </p:cTn>
+                  </p:par>
+                  <p:par>
+                    <p:cTn id="31" fill="hold">
+                      <p:stCondLst>
+                        <p:cond delay="indefinite"/>
+                      </p:stCondLst>
+                      <p:childTnLst>
+                        <p:par>
+                          <p:cTn id="32" fill="hold">
+                            <p:stCondLst>
+                              <p:cond delay="0"/>
+                            </p:stCondLst>
+                            <p:childTnLst>
+                              <p:par>
+                                <p:cTn id="33" presetID="10" presetClass="entr" presetSubtype="0" fill="hold" grpId="0" nodeType="clickEffect">
+                                  <p:stCondLst>
+                                    <p:cond delay="0"/>
+                                  </p:stCondLst>
+                                  <p:childTnLst>
+                                    <p:set>
+                                      <p:cBhvr>
+                                        <p:cTn id="34" dur="1" fill="hold">
+                                          <p:stCondLst>
+                                            <p:cond delay="0"/>
+                                          </p:stCondLst>
+                                        </p:cTn>
+                                        <p:tgtEl>
+                                          <p:spTgt spid="3">
+                                            <p:txEl>
+                                              <p:pRg st="4" end="4"/>
+                                            </p:txEl>
+                                          </p:spTgt>
+                                        </p:tgtEl>
+                                        <p:attrNameLst>
+                                          <p:attrName>style.visibility</p:attrName>
+                                        </p:attrNameLst>
+                                      </p:cBhvr>
+                                      <p:to>
+                                        <p:strVal val="visible"/>
+                                      </p:to>
+                                    </p:set>
+                                    <p:animEffect transition="in" filter="fade">
+                                      <p:cBhvr>
+                                        <p:cTn id="35" dur="500"/>
+                                        <p:tgtEl>
+                                          <p:spTgt spid="3">
+                                            <p:txEl>
+                                              <p:pRg st="4" end="4"/>
+                                            </p:txEl>
+                                          </p:spTgt>
+                                        </p:tgtEl>
+                                      </p:cBhvr>
+                                    </p:animEffect>
+                                  </p:childTnLst>
+                                </p:cTn>
+                              </p:par>
+                            </p:childTnLst>
+                          </p:cTn>
+                        </p:par>
+                      </p:childTnLst>
+                    </p:cTn>
+                  </p:par>
+                </p:childTnLst>
+              </p:cTn>
+              <p:prevCondLst>
+                <p:cond evt="onPrev" delay="0">
+                  <p:tgtEl>
+                    <p:sldTgt/>
+                  </p:tgtEl>
+                </p:cond>
+              </p:prevCondLst>
+              <p:nextCondLst>
+                <p:cond evt="onNext" delay="0">
+                  <p:tgtEl>
+                    <p:sldTgt/>
+                  </p:tgtEl>
+                </p:cond>
+              </p:nextCondLst>
+            </p:seq>
+          </p:childTnLst>
+        </p:cTn>
+      </p:par>
+    </p:tnLst>
+    <p:bldLst>
+      <p:bldP spid="3" grpId="0" uiExpand="1" build="p"/>
+      <p:bldP spid="4" grpId="0"/>
+      <p:bldP spid="5" grpId="0"/>
+    </p:bldLst>
+  </p:timing>
 </p:sld>
 </file>
 

</xml_diff>

<commit_message>
added stats plane shot slide
</commit_message>
<xml_diff>
--- a/slides_x_mas_2023.pptx
+++ b/slides_x_mas_2023.pptx
@@ -35,6 +35,7 @@
     <p:sldId id="282" r:id="rId29"/>
     <p:sldId id="283" r:id="rId30"/>
     <p:sldId id="285" r:id="rId31"/>
+    <p:sldId id="292" r:id="rId32"/>
   </p:sldIdLst>
   <p:sldSz cx="12192000" cy="6858000"/>
   <p:notesSz cx="6858000" cy="9144000"/>
@@ -183,7 +184,9 @@
           </p14:sldIdLst>
         </p14:section>
         <p14:section name="Over-Interpretations" id="{9711BCF0-0EF2-435D-A2E2-B5014891C597}">
-          <p14:sldIdLst/>
+          <p14:sldIdLst>
+            <p14:sldId id="292"/>
+          </p14:sldIdLst>
         </p14:section>
       </p14:sectionLst>
     </p:ext>
@@ -23124,6 +23127,101 @@
 </p:sld>
 </file>
 
+<file path=ppt/slides/slide31.xml><?xml version="1.0" encoding="utf-8"?>
+<p:sld xmlns:a="http://schemas.openxmlformats.org/drawingml/2006/main" xmlns:r="http://schemas.openxmlformats.org/officeDocument/2006/relationships" xmlns:p="http://schemas.openxmlformats.org/presentationml/2006/main">
+  <p:cSld>
+    <p:spTree>
+      <p:nvGrpSpPr>
+        <p:cNvPr id="1" name=""/>
+        <p:cNvGrpSpPr/>
+        <p:nvPr/>
+      </p:nvGrpSpPr>
+      <p:grpSpPr>
+        <a:xfrm>
+          <a:off x="0" y="0"/>
+          <a:ext cx="0" cy="0"/>
+          <a:chOff x="0" y="0"/>
+          <a:chExt cx="0" cy="0"/>
+        </a:xfrm>
+      </p:grpSpPr>
+      <p:sp>
+        <p:nvSpPr>
+          <p:cNvPr id="4" name="Title 3">
+            <a:extLst>
+              <a:ext uri="{FF2B5EF4-FFF2-40B4-BE49-F238E27FC236}">
+                <a16:creationId xmlns:a16="http://schemas.microsoft.com/office/drawing/2014/main" id="{74558A5F-DFBD-1C68-6476-B830A0BB41E3}"/>
+              </a:ext>
+            </a:extLst>
+          </p:cNvPr>
+          <p:cNvSpPr>
+            <a:spLocks noGrp="1"/>
+          </p:cNvSpPr>
+          <p:nvPr>
+            <p:ph type="title"/>
+          </p:nvPr>
+        </p:nvSpPr>
+        <p:spPr/>
+        <p:txBody>
+          <a:bodyPr/>
+          <a:lstStyle/>
+          <a:p>
+            <a:r>
+              <a:rPr lang="en-US" dirty="0"/>
+              <a:t>Statistics</a:t>
+            </a:r>
+          </a:p>
+        </p:txBody>
+      </p:sp>
+      <p:pic>
+        <p:nvPicPr>
+          <p:cNvPr id="7" name="Content Placeholder 6">
+            <a:extLst>
+              <a:ext uri="{FF2B5EF4-FFF2-40B4-BE49-F238E27FC236}">
+                <a16:creationId xmlns:a16="http://schemas.microsoft.com/office/drawing/2014/main" id="{294D38F2-C4FF-BD3B-32F6-A3F03286446D}"/>
+              </a:ext>
+            </a:extLst>
+          </p:cNvPr>
+          <p:cNvPicPr>
+            <a:picLocks noGrp="1" noChangeAspect="1"/>
+          </p:cNvPicPr>
+          <p:nvPr>
+            <p:ph idx="1"/>
+          </p:nvPr>
+        </p:nvPicPr>
+        <p:blipFill>
+          <a:blip r:embed="rId2">
+            <a:extLst>
+              <a:ext uri="{28A0092B-C50C-407E-A947-70E740481C1C}">
+                <a14:useLocalDpi xmlns:a14="http://schemas.microsoft.com/office/drawing/2010/main" val="0"/>
+              </a:ext>
+              <a:ext uri="{96DAC541-7B7A-43D3-8B79-37D633B846F1}">
+                <asvg:svgBlip xmlns:asvg="http://schemas.microsoft.com/office/drawing/2016/SVG/main" r:embed="rId3"/>
+              </a:ext>
+            </a:extLst>
+          </a:blip>
+          <a:srcRect/>
+          <a:stretch/>
+        </p:blipFill>
+        <p:spPr>
+          <a:xfrm>
+            <a:off x="2629460" y="1690688"/>
+            <a:ext cx="6933080" cy="5167312"/>
+          </a:xfrm>
+        </p:spPr>
+      </p:pic>
+    </p:spTree>
+    <p:extLst>
+      <p:ext uri="{BB962C8B-B14F-4D97-AF65-F5344CB8AC3E}">
+        <p14:creationId xmlns:p14="http://schemas.microsoft.com/office/powerpoint/2010/main" val="288841016"/>
+      </p:ext>
+    </p:extLst>
+  </p:cSld>
+  <p:clrMapOvr>
+    <a:masterClrMapping/>
+  </p:clrMapOvr>
+</p:sld>
+</file>
+
 <file path=ppt/slides/slide4.xml><?xml version="1.0" encoding="utf-8"?>
 <p:sld xmlns:a="http://schemas.openxmlformats.org/drawingml/2006/main" xmlns:r="http://schemas.openxmlformats.org/officeDocument/2006/relationships" xmlns:p="http://schemas.openxmlformats.org/presentationml/2006/main">
   <p:cSld>

</xml_diff>